<commit_message>
Add slides about spin to presentation
</commit_message>
<xml_diff>
--- a/shatilina.pptx
+++ b/shatilina.pptx
@@ -5,7 +5,7 @@
     <p:sldMasterId id="2147483960" r:id="rId1"/>
   </p:sldMasterIdLst>
   <p:notesMasterIdLst>
-    <p:notesMasterId r:id="rId14"/>
+    <p:notesMasterId r:id="rId16"/>
   </p:notesMasterIdLst>
   <p:sldIdLst>
     <p:sldId id="257" r:id="rId2"/>
@@ -14,12 +14,14 @@
     <p:sldId id="267" r:id="rId5"/>
     <p:sldId id="266" r:id="rId6"/>
     <p:sldId id="268" r:id="rId7"/>
-    <p:sldId id="261" r:id="rId8"/>
-    <p:sldId id="263" r:id="rId9"/>
-    <p:sldId id="262" r:id="rId10"/>
-    <p:sldId id="260" r:id="rId11"/>
-    <p:sldId id="258" r:id="rId12"/>
-    <p:sldId id="259" r:id="rId13"/>
+    <p:sldId id="269" r:id="rId8"/>
+    <p:sldId id="270" r:id="rId9"/>
+    <p:sldId id="261" r:id="rId10"/>
+    <p:sldId id="263" r:id="rId11"/>
+    <p:sldId id="262" r:id="rId12"/>
+    <p:sldId id="260" r:id="rId13"/>
+    <p:sldId id="258" r:id="rId14"/>
+    <p:sldId id="259" r:id="rId15"/>
   </p:sldIdLst>
   <p:sldSz cx="9144000" cy="6858000" type="screen4x3"/>
   <p:notesSz cx="6858000" cy="9144000"/>
@@ -203,7 +205,7 @@
           <a:p>
             <a:fld id="{FDBFA82E-57DB-4151-B406-A26D33A7B30A}" type="datetimeFigureOut">
               <a:rPr lang="ru-RU" smtClean="0"/>
-              <a:t>06.05.2012</a:t>
+              <a:t>21.05.2012</a:t>
             </a:fld>
             <a:endParaRPr lang="ru-RU"/>
           </a:p>
@@ -540,7 +542,7 @@
           <a:p>
             <a:fld id="{D2C5C3F3-C17D-45D2-AA34-92C6E86E38D2}" type="slidenum">
               <a:rPr lang="ru-RU" smtClean="0"/>
-              <a:t>9</a:t>
+              <a:t>11</a:t>
             </a:fld>
             <a:endParaRPr lang="ru-RU"/>
           </a:p>
@@ -751,7 +753,7 @@
           <a:p>
             <a:fld id="{7107C0A0-79D6-46EB-BC7F-CC7D4716C47C}" type="datetimeFigureOut">
               <a:rPr lang="ru-RU" smtClean="0"/>
-              <a:t>06.05.2012</a:t>
+              <a:t>21.05.2012</a:t>
             </a:fld>
             <a:endParaRPr lang="ru-RU"/>
           </a:p>
@@ -916,7 +918,7 @@
           <a:p>
             <a:fld id="{7107C0A0-79D6-46EB-BC7F-CC7D4716C47C}" type="datetimeFigureOut">
               <a:rPr lang="ru-RU" smtClean="0"/>
-              <a:t>06.05.2012</a:t>
+              <a:t>21.05.2012</a:t>
             </a:fld>
             <a:endParaRPr lang="ru-RU"/>
           </a:p>
@@ -1091,7 +1093,7 @@
           <a:p>
             <a:fld id="{7107C0A0-79D6-46EB-BC7F-CC7D4716C47C}" type="datetimeFigureOut">
               <a:rPr lang="ru-RU" smtClean="0"/>
-              <a:t>06.05.2012</a:t>
+              <a:t>21.05.2012</a:t>
             </a:fld>
             <a:endParaRPr lang="ru-RU"/>
           </a:p>
@@ -1274,7 +1276,7 @@
           <a:p>
             <a:fld id="{7107C0A0-79D6-46EB-BC7F-CC7D4716C47C}" type="datetimeFigureOut">
               <a:rPr lang="ru-RU" smtClean="0"/>
-              <a:t>06.05.2012</a:t>
+              <a:t>21.05.2012</a:t>
             </a:fld>
             <a:endParaRPr lang="ru-RU"/>
           </a:p>
@@ -1536,7 +1538,7 @@
           <a:p>
             <a:fld id="{7107C0A0-79D6-46EB-BC7F-CC7D4716C47C}" type="datetimeFigureOut">
               <a:rPr lang="ru-RU" smtClean="0"/>
-              <a:t>06.05.2012</a:t>
+              <a:t>21.05.2012</a:t>
             </a:fld>
             <a:endParaRPr lang="ru-RU"/>
           </a:p>
@@ -1884,7 +1886,7 @@
           <a:p>
             <a:fld id="{7107C0A0-79D6-46EB-BC7F-CC7D4716C47C}" type="datetimeFigureOut">
               <a:rPr lang="ru-RU" smtClean="0"/>
-              <a:t>06.05.2012</a:t>
+              <a:t>21.05.2012</a:t>
             </a:fld>
             <a:endParaRPr lang="ru-RU"/>
           </a:p>
@@ -2192,7 +2194,7 @@
           <a:p>
             <a:fld id="{7107C0A0-79D6-46EB-BC7F-CC7D4716C47C}" type="datetimeFigureOut">
               <a:rPr lang="ru-RU" smtClean="0"/>
-              <a:t>06.05.2012</a:t>
+              <a:t>21.05.2012</a:t>
             </a:fld>
             <a:endParaRPr lang="ru-RU"/>
           </a:p>
@@ -2419,7 +2421,7 @@
           <a:p>
             <a:fld id="{7107C0A0-79D6-46EB-BC7F-CC7D4716C47C}" type="datetimeFigureOut">
               <a:rPr lang="ru-RU" smtClean="0"/>
-              <a:t>06.05.2012</a:t>
+              <a:t>21.05.2012</a:t>
             </a:fld>
             <a:endParaRPr lang="ru-RU"/>
           </a:p>
@@ -2509,7 +2511,7 @@
           <a:p>
             <a:fld id="{7107C0A0-79D6-46EB-BC7F-CC7D4716C47C}" type="datetimeFigureOut">
               <a:rPr lang="ru-RU" smtClean="0"/>
-              <a:t>06.05.2012</a:t>
+              <a:t>21.05.2012</a:t>
             </a:fld>
             <a:endParaRPr lang="ru-RU"/>
           </a:p>
@@ -2797,7 +2799,7 @@
           <a:p>
             <a:fld id="{7107C0A0-79D6-46EB-BC7F-CC7D4716C47C}" type="datetimeFigureOut">
               <a:rPr lang="ru-RU" smtClean="0"/>
-              <a:t>06.05.2012</a:t>
+              <a:t>21.05.2012</a:t>
             </a:fld>
             <a:endParaRPr lang="ru-RU"/>
           </a:p>
@@ -3066,7 +3068,7 @@
           <a:p>
             <a:fld id="{7107C0A0-79D6-46EB-BC7F-CC7D4716C47C}" type="datetimeFigureOut">
               <a:rPr lang="ru-RU" smtClean="0"/>
-              <a:t>06.05.2012</a:t>
+              <a:t>21.05.2012</a:t>
             </a:fld>
             <a:endParaRPr lang="ru-RU"/>
           </a:p>
@@ -3276,7 +3278,7 @@
           <a:p>
             <a:fld id="{7107C0A0-79D6-46EB-BC7F-CC7D4716C47C}" type="datetimeFigureOut">
               <a:rPr lang="ru-RU" smtClean="0"/>
-              <a:t>06.05.2012</a:t>
+              <a:t>21.05.2012</a:t>
             </a:fld>
             <a:endParaRPr lang="ru-RU"/>
           </a:p>
@@ -4055,11 +4057,7 @@
           <a:bodyPr/>
           <a:lstStyle/>
           <a:p>
-            <a:r>
-              <a:rPr lang="ru-RU" dirty="0" smtClean="0"/>
-              <a:t>Итоги</a:t>
-            </a:r>
-            <a:endParaRPr lang="ru-RU" dirty="0"/>
+            <a:endParaRPr lang="ru-RU"/>
           </a:p>
         </p:txBody>
       </p:sp>
@@ -4131,23 +4129,7 @@
                   <a:srgbClr val="045C75"/>
                 </a:solidFill>
               </a:rPr>
-              <a:t>Ползунова / ПОВТ, </a:t>
-            </a:r>
-            <a:r>
-              <a:rPr lang="ru-RU" sz="1300" dirty="0" smtClean="0">
-                <a:solidFill>
-                  <a:srgbClr val="045C75"/>
-                </a:solidFill>
-              </a:rPr>
-              <a:t>Юлия</a:t>
-            </a:r>
-            <a:r>
-              <a:rPr lang="ru-RU" sz="1300" dirty="0" smtClean="0">
-                <a:solidFill>
-                  <a:srgbClr val="045C75"/>
-                </a:solidFill>
-              </a:rPr>
-              <a:t> Шатилина</a:t>
+              <a:t>Ползунова / ПОВТ, Юлия Шатилина</a:t>
             </a:r>
             <a:endParaRPr lang="en-US" sz="1300" dirty="0">
               <a:solidFill>
@@ -4160,7 +4142,7 @@
     </p:spTree>
     <p:extLst>
       <p:ext uri="{BB962C8B-B14F-4D97-AF65-F5344CB8AC3E}">
-        <p14:creationId xmlns:p14="http://schemas.microsoft.com/office/powerpoint/2010/main" val="838073639"/>
+        <p14:creationId xmlns:p14="http://schemas.microsoft.com/office/powerpoint/2010/main" val="1742819723"/>
       </p:ext>
     </p:extLst>
   </p:cSld>
@@ -4211,7 +4193,7 @@
           <a:p>
             <a:r>
               <a:rPr lang="ru-RU" dirty="0" smtClean="0"/>
-              <a:t>Пути развития</a:t>
+              <a:t>Архитектура системы</a:t>
             </a:r>
             <a:endParaRPr lang="ru-RU" dirty="0"/>
           </a:p>
@@ -4285,7 +4267,137 @@
                   <a:srgbClr val="045C75"/>
                 </a:solidFill>
               </a:rPr>
-              <a:t>Ползунова / ПОВТ, </a:t>
+              <a:t>Ползунова / ПОВТ, Юлия Шатилина</a:t>
+            </a:r>
+            <a:endParaRPr lang="en-US" sz="1300" dirty="0">
+              <a:solidFill>
+                <a:srgbClr val="045C75"/>
+              </a:solidFill>
+            </a:endParaRPr>
+          </a:p>
+        </p:txBody>
+      </p:sp>
+    </p:spTree>
+    <p:extLst>
+      <p:ext uri="{BB962C8B-B14F-4D97-AF65-F5344CB8AC3E}">
+        <p14:creationId xmlns:p14="http://schemas.microsoft.com/office/powerpoint/2010/main" val="4061569519"/>
+      </p:ext>
+    </p:extLst>
+  </p:cSld>
+  <p:clrMapOvr>
+    <a:masterClrMapping/>
+  </p:clrMapOvr>
+  <p:timing>
+    <p:tnLst>
+      <p:par>
+        <p:cTn id="1" dur="indefinite" restart="never" nodeType="tmRoot"/>
+      </p:par>
+    </p:tnLst>
+  </p:timing>
+</p:sld>
+</file>
+
+<file path=ppt/slides/slide12.xml><?xml version="1.0" encoding="utf-8"?>
+<p:sld xmlns:a="http://schemas.openxmlformats.org/drawingml/2006/main" xmlns:r="http://schemas.openxmlformats.org/officeDocument/2006/relationships" xmlns:p="http://schemas.openxmlformats.org/presentationml/2006/main">
+  <p:cSld>
+    <p:spTree>
+      <p:nvGrpSpPr>
+        <p:cNvPr id="1" name=""/>
+        <p:cNvGrpSpPr/>
+        <p:nvPr/>
+      </p:nvGrpSpPr>
+      <p:grpSpPr>
+        <a:xfrm>
+          <a:off x="0" y="0"/>
+          <a:ext cx="0" cy="0"/>
+          <a:chOff x="0" y="0"/>
+          <a:chExt cx="0" cy="0"/>
+        </a:xfrm>
+      </p:grpSpPr>
+      <p:sp>
+        <p:nvSpPr>
+          <p:cNvPr id="2" name="Заголовок 1"/>
+          <p:cNvSpPr>
+            <a:spLocks noGrp="1"/>
+          </p:cNvSpPr>
+          <p:nvPr>
+            <p:ph type="title"/>
+          </p:nvPr>
+        </p:nvSpPr>
+        <p:spPr/>
+        <p:txBody>
+          <a:bodyPr/>
+          <a:lstStyle/>
+          <a:p>
+            <a:r>
+              <a:rPr lang="ru-RU" dirty="0" smtClean="0"/>
+              <a:t>Итоги</a:t>
+            </a:r>
+            <a:endParaRPr lang="ru-RU" dirty="0"/>
+          </a:p>
+        </p:txBody>
+      </p:sp>
+      <p:sp>
+        <p:nvSpPr>
+          <p:cNvPr id="3" name="Объект 2"/>
+          <p:cNvSpPr>
+            <a:spLocks noGrp="1"/>
+          </p:cNvSpPr>
+          <p:nvPr>
+            <p:ph idx="1"/>
+          </p:nvPr>
+        </p:nvSpPr>
+        <p:spPr/>
+        <p:txBody>
+          <a:bodyPr/>
+          <a:lstStyle/>
+          <a:p>
+            <a:endParaRPr lang="ru-RU"/>
+          </a:p>
+        </p:txBody>
+      </p:sp>
+      <p:sp>
+        <p:nvSpPr>
+          <p:cNvPr id="4" name="Text Box 5"/>
+          <p:cNvSpPr txBox="1">
+            <a:spLocks noChangeArrowheads="1"/>
+          </p:cNvSpPr>
+          <p:nvPr/>
+        </p:nvSpPr>
+        <p:spPr bwMode="auto">
+          <a:xfrm>
+            <a:off x="773262" y="6453336"/>
+            <a:ext cx="5886970" cy="190052"/>
+          </a:xfrm>
+          <a:prstGeom prst="rect">
+            <a:avLst/>
+          </a:prstGeom>
+          <a:noFill/>
+          <a:ln w="9525">
+            <a:noFill/>
+            <a:miter lim="800000"/>
+            <a:headEnd/>
+            <a:tailEnd/>
+          </a:ln>
+        </p:spPr>
+        <p:txBody>
+          <a:bodyPr wrap="square" lIns="0" tIns="0" rIns="0" bIns="0" anchor="b">
+            <a:spAutoFit/>
+          </a:bodyPr>
+          <a:lstStyle/>
+          <a:p>
+            <a:pPr>
+              <a:lnSpc>
+                <a:spcPct val="95000"/>
+              </a:lnSpc>
+            </a:pPr>
+            <a:r>
+              <a:rPr lang="ru-RU" sz="1300" dirty="0">
+                <a:solidFill>
+                  <a:srgbClr val="045C75"/>
+                </a:solidFill>
+              </a:rPr>
+              <a:t>АлтГТУ им. И. И. </a:t>
             </a:r>
             <a:r>
               <a:rPr lang="ru-RU" sz="1300" dirty="0" smtClean="0">
@@ -4293,7 +4405,137 @@
                   <a:srgbClr val="045C75"/>
                 </a:solidFill>
               </a:rPr>
-              <a:t>Юлия</a:t>
+              <a:t>Ползунова / ПОВТ, Юлия Шатилина</a:t>
+            </a:r>
+            <a:endParaRPr lang="en-US" sz="1300" dirty="0">
+              <a:solidFill>
+                <a:srgbClr val="045C75"/>
+              </a:solidFill>
+            </a:endParaRPr>
+          </a:p>
+        </p:txBody>
+      </p:sp>
+    </p:spTree>
+    <p:extLst>
+      <p:ext uri="{BB962C8B-B14F-4D97-AF65-F5344CB8AC3E}">
+        <p14:creationId xmlns:p14="http://schemas.microsoft.com/office/powerpoint/2010/main" val="838073639"/>
+      </p:ext>
+    </p:extLst>
+  </p:cSld>
+  <p:clrMapOvr>
+    <a:masterClrMapping/>
+  </p:clrMapOvr>
+  <p:timing>
+    <p:tnLst>
+      <p:par>
+        <p:cTn id="1" dur="indefinite" restart="never" nodeType="tmRoot"/>
+      </p:par>
+    </p:tnLst>
+  </p:timing>
+</p:sld>
+</file>
+
+<file path=ppt/slides/slide13.xml><?xml version="1.0" encoding="utf-8"?>
+<p:sld xmlns:a="http://schemas.openxmlformats.org/drawingml/2006/main" xmlns:r="http://schemas.openxmlformats.org/officeDocument/2006/relationships" xmlns:p="http://schemas.openxmlformats.org/presentationml/2006/main">
+  <p:cSld>
+    <p:spTree>
+      <p:nvGrpSpPr>
+        <p:cNvPr id="1" name=""/>
+        <p:cNvGrpSpPr/>
+        <p:nvPr/>
+      </p:nvGrpSpPr>
+      <p:grpSpPr>
+        <a:xfrm>
+          <a:off x="0" y="0"/>
+          <a:ext cx="0" cy="0"/>
+          <a:chOff x="0" y="0"/>
+          <a:chExt cx="0" cy="0"/>
+        </a:xfrm>
+      </p:grpSpPr>
+      <p:sp>
+        <p:nvSpPr>
+          <p:cNvPr id="2" name="Заголовок 1"/>
+          <p:cNvSpPr>
+            <a:spLocks noGrp="1"/>
+          </p:cNvSpPr>
+          <p:nvPr>
+            <p:ph type="title"/>
+          </p:nvPr>
+        </p:nvSpPr>
+        <p:spPr/>
+        <p:txBody>
+          <a:bodyPr/>
+          <a:lstStyle/>
+          <a:p>
+            <a:r>
+              <a:rPr lang="ru-RU" dirty="0" smtClean="0"/>
+              <a:t>Пути развития</a:t>
+            </a:r>
+            <a:endParaRPr lang="ru-RU" dirty="0"/>
+          </a:p>
+        </p:txBody>
+      </p:sp>
+      <p:sp>
+        <p:nvSpPr>
+          <p:cNvPr id="3" name="Объект 2"/>
+          <p:cNvSpPr>
+            <a:spLocks noGrp="1"/>
+          </p:cNvSpPr>
+          <p:nvPr>
+            <p:ph idx="1"/>
+          </p:nvPr>
+        </p:nvSpPr>
+        <p:spPr/>
+        <p:txBody>
+          <a:bodyPr/>
+          <a:lstStyle/>
+          <a:p>
+            <a:endParaRPr lang="ru-RU"/>
+          </a:p>
+        </p:txBody>
+      </p:sp>
+      <p:sp>
+        <p:nvSpPr>
+          <p:cNvPr id="4" name="Text Box 5"/>
+          <p:cNvSpPr txBox="1">
+            <a:spLocks noChangeArrowheads="1"/>
+          </p:cNvSpPr>
+          <p:nvPr/>
+        </p:nvSpPr>
+        <p:spPr bwMode="auto">
+          <a:xfrm>
+            <a:off x="773262" y="6453336"/>
+            <a:ext cx="5886970" cy="190052"/>
+          </a:xfrm>
+          <a:prstGeom prst="rect">
+            <a:avLst/>
+          </a:prstGeom>
+          <a:noFill/>
+          <a:ln w="9525">
+            <a:noFill/>
+            <a:miter lim="800000"/>
+            <a:headEnd/>
+            <a:tailEnd/>
+          </a:ln>
+        </p:spPr>
+        <p:txBody>
+          <a:bodyPr wrap="square" lIns="0" tIns="0" rIns="0" bIns="0" anchor="b">
+            <a:spAutoFit/>
+          </a:bodyPr>
+          <a:lstStyle/>
+          <a:p>
+            <a:pPr>
+              <a:lnSpc>
+                <a:spcPct val="95000"/>
+              </a:lnSpc>
+            </a:pPr>
+            <a:r>
+              <a:rPr lang="ru-RU" sz="1300" dirty="0">
+                <a:solidFill>
+                  <a:srgbClr val="045C75"/>
+                </a:solidFill>
+              </a:rPr>
+              <a:t>АлтГТУ им. И. И. </a:t>
             </a:r>
             <a:r>
               <a:rPr lang="ru-RU" sz="1300" dirty="0" smtClean="0">
@@ -4301,7 +4543,7 @@
                   <a:srgbClr val="045C75"/>
                 </a:solidFill>
               </a:rPr>
-              <a:t> Шатилина</a:t>
+              <a:t>Ползунова / ПОВТ, Юлия Шатилина</a:t>
             </a:r>
             <a:endParaRPr lang="en-US" sz="1300" dirty="0">
               <a:solidFill>
@@ -4331,7 +4573,7 @@
 </p:sld>
 </file>
 
-<file path=ppt/slides/slide12.xml><?xml version="1.0" encoding="utf-8"?>
+<file path=ppt/slides/slide14.xml><?xml version="1.0" encoding="utf-8"?>
 <p:sld xmlns:a="http://schemas.openxmlformats.org/drawingml/2006/main" xmlns:r="http://schemas.openxmlformats.org/officeDocument/2006/relationships" xmlns:p="http://schemas.openxmlformats.org/presentationml/2006/main">
   <p:cSld>
     <p:spTree>
@@ -4566,23 +4808,7 @@
                   <a:srgbClr val="045C75"/>
                 </a:solidFill>
               </a:rPr>
-              <a:t>Ползунова / ПОВТ, </a:t>
-            </a:r>
-            <a:r>
-              <a:rPr lang="ru-RU" sz="1300" dirty="0" smtClean="0">
-                <a:solidFill>
-                  <a:srgbClr val="045C75"/>
-                </a:solidFill>
-              </a:rPr>
-              <a:t>Юлия</a:t>
-            </a:r>
-            <a:r>
-              <a:rPr lang="ru-RU" sz="1300" dirty="0" smtClean="0">
-                <a:solidFill>
-                  <a:srgbClr val="045C75"/>
-                </a:solidFill>
-              </a:rPr>
-              <a:t> Шатилина</a:t>
+              <a:t>Ползунова / ПОВТ, Юлия Шатилина</a:t>
             </a:r>
             <a:endParaRPr lang="en-US" sz="1300" dirty="0">
               <a:solidFill>
@@ -4720,23 +4946,7 @@
                   <a:srgbClr val="045C75"/>
                 </a:solidFill>
               </a:rPr>
-              <a:t>Ползунова / ПОВТ, </a:t>
-            </a:r>
-            <a:r>
-              <a:rPr lang="ru-RU" sz="1300" dirty="0" smtClean="0">
-                <a:solidFill>
-                  <a:srgbClr val="045C75"/>
-                </a:solidFill>
-              </a:rPr>
-              <a:t>Юлия</a:t>
-            </a:r>
-            <a:r>
-              <a:rPr lang="ru-RU" sz="1300" dirty="0" smtClean="0">
-                <a:solidFill>
-                  <a:srgbClr val="045C75"/>
-                </a:solidFill>
-              </a:rPr>
-              <a:t> Шатилина</a:t>
+              <a:t>Ползунова / ПОВТ, Юлия Шатилина</a:t>
             </a:r>
             <a:endParaRPr lang="en-US" sz="1300" dirty="0">
               <a:solidFill>
@@ -4913,7 +5123,6 @@
               <a:rPr lang="ru-RU" dirty="0"/>
               <a:t> – множество сценариев использования прототипа</a:t>
             </a:r>
-            <a:endParaRPr lang="ru-RU" dirty="0"/>
           </a:p>
         </p:txBody>
       </p:sp>
@@ -4966,23 +5175,7 @@
                   <a:srgbClr val="045C75"/>
                 </a:solidFill>
               </a:rPr>
-              <a:t>Ползунова / ПОВТ, </a:t>
-            </a:r>
-            <a:r>
-              <a:rPr lang="ru-RU" sz="1300" dirty="0" smtClean="0">
-                <a:solidFill>
-                  <a:srgbClr val="045C75"/>
-                </a:solidFill>
-              </a:rPr>
-              <a:t>Юлия</a:t>
-            </a:r>
-            <a:r>
-              <a:rPr lang="ru-RU" sz="1300" dirty="0" smtClean="0">
-                <a:solidFill>
-                  <a:srgbClr val="045C75"/>
-                </a:solidFill>
-              </a:rPr>
-              <a:t> Шатилина</a:t>
+              <a:t>Ползунова / ПОВТ, Юлия Шатилина</a:t>
             </a:r>
             <a:endParaRPr lang="en-US" sz="1300" dirty="0">
               <a:solidFill>
@@ -5120,23 +5313,7 @@
                   <a:srgbClr val="045C75"/>
                 </a:solidFill>
               </a:rPr>
-              <a:t>Ползунова / ПОВТ, </a:t>
-            </a:r>
-            <a:r>
-              <a:rPr lang="ru-RU" sz="1300" dirty="0" smtClean="0">
-                <a:solidFill>
-                  <a:srgbClr val="045C75"/>
-                </a:solidFill>
-              </a:rPr>
-              <a:t>Юлия</a:t>
-            </a:r>
-            <a:r>
-              <a:rPr lang="ru-RU" sz="1300" dirty="0" smtClean="0">
-                <a:solidFill>
-                  <a:srgbClr val="045C75"/>
-                </a:solidFill>
-              </a:rPr>
-              <a:t> Шатилина</a:t>
+              <a:t>Ползунова / ПОВТ, Юлия Шатилина</a:t>
             </a:r>
             <a:endParaRPr lang="en-US" sz="1300" dirty="0">
               <a:solidFill>
@@ -5206,25 +5383,35 @@
           </a:p>
         </p:txBody>
       </p:sp>
-      <p:sp>
-        <p:nvSpPr>
-          <p:cNvPr id="3" name="Объект 2"/>
-          <p:cNvSpPr>
-            <a:spLocks noGrp="1"/>
-          </p:cNvSpPr>
+      <p:pic>
+        <p:nvPicPr>
+          <p:cNvPr id="5" name="Объект 4"/>
+          <p:cNvPicPr>
+            <a:picLocks noGrp="1" noChangeAspect="1"/>
+          </p:cNvPicPr>
           <p:nvPr>
             <p:ph idx="1"/>
           </p:nvPr>
-        </p:nvSpPr>
-        <p:spPr/>
-        <p:txBody>
-          <a:bodyPr/>
-          <a:lstStyle/>
-          <a:p>
-            <a:endParaRPr lang="ru-RU"/>
-          </a:p>
-        </p:txBody>
-      </p:sp>
+        </p:nvPicPr>
+        <p:blipFill>
+          <a:blip r:embed="rId2">
+            <a:extLst>
+              <a:ext uri="{28A0092B-C50C-407E-A947-70E740481C1C}">
+                <a14:useLocalDpi xmlns:a14="http://schemas.microsoft.com/office/drawing/2010/main" val="0"/>
+              </a:ext>
+            </a:extLst>
+          </a:blip>
+          <a:stretch>
+            <a:fillRect/>
+          </a:stretch>
+        </p:blipFill>
+        <p:spPr>
+          <a:xfrm>
+            <a:off x="2147590" y="1600200"/>
+            <a:ext cx="4848819" cy="4525963"/>
+          </a:xfrm>
+        </p:spPr>
+      </p:pic>
       <p:sp>
         <p:nvSpPr>
           <p:cNvPr id="4" name="Text Box 5"/>
@@ -5274,23 +5461,7 @@
                   <a:srgbClr val="045C75"/>
                 </a:solidFill>
               </a:rPr>
-              <a:t>Ползунова / ПОВТ, </a:t>
-            </a:r>
-            <a:r>
-              <a:rPr lang="ru-RU" sz="1300" dirty="0" smtClean="0">
-                <a:solidFill>
-                  <a:srgbClr val="045C75"/>
-                </a:solidFill>
-              </a:rPr>
-              <a:t>Юлия</a:t>
-            </a:r>
-            <a:r>
-              <a:rPr lang="ru-RU" sz="1300" dirty="0" smtClean="0">
-                <a:solidFill>
-                  <a:srgbClr val="045C75"/>
-                </a:solidFill>
-              </a:rPr>
-              <a:t> Шатилина</a:t>
+              <a:t>Ползунова / ПОВТ, Юлия Шатилина</a:t>
             </a:r>
             <a:endParaRPr lang="en-US" sz="1300" dirty="0">
               <a:solidFill>
@@ -5337,127 +5508,179 @@
           <a:chExt cx="0" cy="0"/>
         </a:xfrm>
       </p:grpSpPr>
-      <p:sp>
-        <p:nvSpPr>
-          <p:cNvPr id="2" name="Заголовок 1"/>
-          <p:cNvSpPr>
-            <a:spLocks noGrp="1"/>
-          </p:cNvSpPr>
-          <p:nvPr>
-            <p:ph type="title"/>
-          </p:nvPr>
-        </p:nvSpPr>
-        <p:spPr/>
-        <p:txBody>
-          <a:bodyPr/>
-          <a:lstStyle/>
-          <a:p>
-            <a:r>
-              <a:rPr lang="ru-RU" dirty="0" smtClean="0"/>
-              <a:t>Структура системы</a:t>
-            </a:r>
-            <a:endParaRPr lang="ru-RU" dirty="0"/>
-          </a:p>
-        </p:txBody>
-      </p:sp>
-      <p:sp>
-        <p:nvSpPr>
-          <p:cNvPr id="3" name="Объект 2"/>
-          <p:cNvSpPr>
-            <a:spLocks noGrp="1"/>
-          </p:cNvSpPr>
-          <p:nvPr>
-            <p:ph idx="1"/>
-          </p:nvPr>
-        </p:nvSpPr>
-        <p:spPr/>
-        <p:txBody>
-          <a:bodyPr/>
-          <a:lstStyle/>
-          <a:p>
-            <a:endParaRPr lang="ru-RU"/>
-          </a:p>
-        </p:txBody>
-      </p:sp>
-      <p:sp>
-        <p:nvSpPr>
-          <p:cNvPr id="4" name="Text Box 5"/>
-          <p:cNvSpPr txBox="1">
-            <a:spLocks noChangeArrowheads="1"/>
-          </p:cNvSpPr>
+      <p:pic>
+        <p:nvPicPr>
+          <p:cNvPr id="5" name="Рисунок 4"/>
+          <p:cNvPicPr>
+            <a:picLocks noChangeAspect="1"/>
+          </p:cNvPicPr>
           <p:nvPr/>
-        </p:nvSpPr>
-        <p:spPr bwMode="auto">
+        </p:nvPicPr>
+        <p:blipFill>
+          <a:blip r:embed="rId2">
+            <a:extLst>
+              <a:ext uri="{28A0092B-C50C-407E-A947-70E740481C1C}">
+                <a14:useLocalDpi xmlns:a14="http://schemas.microsoft.com/office/drawing/2010/main" val="0"/>
+              </a:ext>
+            </a:extLst>
+          </a:blip>
+          <a:stretch>
+            <a:fillRect/>
+          </a:stretch>
+        </p:blipFill>
+        <p:spPr>
           <a:xfrm>
-            <a:off x="773262" y="6453336"/>
-            <a:ext cx="5886970" cy="190052"/>
+            <a:off x="3865775" y="1152675"/>
+            <a:ext cx="5196699" cy="5228653"/>
           </a:xfrm>
           <a:prstGeom prst="rect">
             <a:avLst/>
           </a:prstGeom>
-          <a:noFill/>
-          <a:ln w="9525">
-            <a:noFill/>
-            <a:miter lim="800000"/>
-            <a:headEnd/>
-            <a:tailEnd/>
-          </a:ln>
         </p:spPr>
-        <p:txBody>
-          <a:bodyPr wrap="square" lIns="0" tIns="0" rIns="0" bIns="0" anchor="b">
-            <a:spAutoFit/>
+      </p:pic>
+      <p:sp>
+        <p:nvSpPr>
+          <p:cNvPr id="8" name="Заголовок 1"/>
+          <p:cNvSpPr txBox="1">
+            <a:spLocks/>
+          </p:cNvSpPr>
+          <p:nvPr/>
+        </p:nvSpPr>
+        <p:spPr>
+          <a:xfrm>
+            <a:off x="457200" y="-603448"/>
+            <a:ext cx="8229600" cy="1600200"/>
+          </a:xfrm>
+          <a:prstGeom prst="rect">
+            <a:avLst/>
+          </a:prstGeom>
+        </p:spPr>
+        <p:txBody>
+          <a:bodyPr vert="horz" lIns="91440" tIns="45720" rIns="91440" bIns="45720" rtlCol="0" anchor="b">
+            <a:noAutofit/>
           </a:bodyPr>
-          <a:lstStyle/>
-          <a:p>
-            <a:pPr>
+          <a:lstStyle>
+            <a:lvl1pPr algn="ctr" defTabSz="914400" rtl="0" eaLnBrk="1" latinLnBrk="0" hangingPunct="1">
               <a:lnSpc>
-                <a:spcPct val="95000"/>
+                <a:spcPts val="5800"/>
               </a:lnSpc>
+              <a:spcBef>
+                <a:spcPct val="0"/>
+              </a:spcBef>
+              <a:buNone/>
+              <a:defRPr sz="5400" kern="1200">
+                <a:solidFill>
+                  <a:schemeClr val="tx2"/>
+                </a:solidFill>
+                <a:effectLst>
+                  <a:outerShdw blurRad="63500" dist="38100" dir="5400000" algn="t" rotWithShape="0">
+                    <a:prstClr val="black">
+                      <a:alpha val="25000"/>
+                    </a:prstClr>
+                  </a:outerShdw>
+                </a:effectLst>
+                <a:latin typeface="+mn-lt"/>
+                <a:ea typeface="+mj-ea"/>
+                <a:cs typeface="+mj-cs"/>
+              </a:defRPr>
+            </a:lvl1pPr>
+          </a:lstStyle>
+          <a:p>
+            <a:r>
+              <a:rPr lang="en-US" smtClean="0"/>
+              <a:t>SPIN</a:t>
+            </a:r>
+            <a:endParaRPr lang="ru-RU" dirty="0"/>
+          </a:p>
+        </p:txBody>
+      </p:sp>
+      <p:sp>
+        <p:nvSpPr>
+          <p:cNvPr id="11" name="Объект 10"/>
+          <p:cNvSpPr>
+            <a:spLocks noGrp="1"/>
+          </p:cNvSpPr>
+          <p:nvPr>
+            <p:ph sz="quarter" idx="13"/>
+          </p:nvPr>
+        </p:nvSpPr>
+        <p:spPr>
+          <a:xfrm>
+            <a:off x="179512" y="1340768"/>
+            <a:ext cx="4536504" cy="5040560"/>
+          </a:xfrm>
+        </p:spPr>
+        <p:txBody>
+          <a:bodyPr>
+            <a:normAutofit fontScale="92500" lnSpcReduction="10000"/>
+          </a:bodyPr>
+          <a:lstStyle/>
+          <a:p>
+            <a:pPr marL="0" indent="0">
+              <a:buNone/>
             </a:pPr>
             <a:r>
-              <a:rPr lang="ru-RU" sz="1300" dirty="0">
-                <a:solidFill>
-                  <a:srgbClr val="045C75"/>
-                </a:solidFill>
-              </a:rPr>
-              <a:t>АлтГТУ им. И. И. </a:t>
-            </a:r>
-            <a:r>
-              <a:rPr lang="ru-RU" sz="1300" dirty="0" smtClean="0">
-                <a:solidFill>
-                  <a:srgbClr val="045C75"/>
-                </a:solidFill>
-              </a:rPr>
-              <a:t>Ползунова / ПОВТ, </a:t>
-            </a:r>
-            <a:r>
-              <a:rPr lang="ru-RU" sz="1300" dirty="0" smtClean="0">
-                <a:solidFill>
-                  <a:srgbClr val="045C75"/>
-                </a:solidFill>
-              </a:rPr>
-              <a:t>Юлия</a:t>
-            </a:r>
-            <a:r>
-              <a:rPr lang="ru-RU" sz="1300" dirty="0" smtClean="0">
-                <a:solidFill>
-                  <a:srgbClr val="045C75"/>
-                </a:solidFill>
-              </a:rPr>
-              <a:t> Шатилина</a:t>
-            </a:r>
-            <a:endParaRPr lang="en-US" sz="1300" dirty="0">
-              <a:solidFill>
-                <a:srgbClr val="045C75"/>
-              </a:solidFill>
-            </a:endParaRPr>
+              <a:rPr lang="ru-RU" sz="3600" b="1" dirty="0" err="1" smtClean="0"/>
+              <a:t>S</a:t>
+            </a:r>
+            <a:r>
+              <a:rPr lang="ru-RU" sz="3600" dirty="0" err="1" smtClean="0"/>
+              <a:t>imple</a:t>
+            </a:r>
+            <a:r>
+              <a:rPr lang="ru-RU" sz="3600" dirty="0" smtClean="0"/>
+              <a:t> </a:t>
+            </a:r>
+            <a:r>
+              <a:rPr lang="ru-RU" sz="3600" b="1" dirty="0" err="1"/>
+              <a:t>P</a:t>
+            </a:r>
+            <a:r>
+              <a:rPr lang="ru-RU" sz="3600" dirty="0" err="1"/>
+              <a:t>romela</a:t>
+            </a:r>
+            <a:r>
+              <a:rPr lang="ru-RU" sz="3600" dirty="0"/>
+              <a:t> </a:t>
+            </a:r>
+            <a:r>
+              <a:rPr lang="ru-RU" sz="3600" b="1" dirty="0" err="1" smtClean="0"/>
+              <a:t>In</a:t>
+            </a:r>
+            <a:r>
+              <a:rPr lang="ru-RU" sz="3600" dirty="0" err="1" smtClean="0"/>
+              <a:t>terpreter</a:t>
+            </a:r>
+            <a:endParaRPr lang="en-US" sz="3600" dirty="0"/>
+          </a:p>
+          <a:p>
+            <a:r>
+              <a:rPr lang="ru-RU" sz="3200" dirty="0" smtClean="0"/>
+              <a:t>средство </a:t>
+            </a:r>
+            <a:r>
+              <a:rPr lang="ru-RU" sz="3200" dirty="0"/>
+              <a:t>верификации протоколов, параллельных программ и широкого класса дискретных систем</a:t>
+            </a:r>
+            <a:endParaRPr lang="en-US" sz="3200" dirty="0"/>
+          </a:p>
+          <a:p>
+            <a:r>
+              <a:rPr lang="ru-RU" sz="3200" dirty="0"/>
+              <a:t>язык описания моделей </a:t>
+            </a:r>
+            <a:r>
+              <a:rPr lang="ru-RU" sz="3200" dirty="0" err="1"/>
+              <a:t>Promela</a:t>
+            </a:r>
+            <a:endParaRPr lang="ru-RU" sz="3200" dirty="0"/>
           </a:p>
         </p:txBody>
       </p:sp>
     </p:spTree>
     <p:extLst>
       <p:ext uri="{BB962C8B-B14F-4D97-AF65-F5344CB8AC3E}">
-        <p14:creationId xmlns:p14="http://schemas.microsoft.com/office/powerpoint/2010/main" val="3176338446"/>
+        <p14:creationId xmlns:p14="http://schemas.microsoft.com/office/powerpoint/2010/main" val="591149455"/>
       </p:ext>
     </p:extLst>
   </p:cSld>
@@ -5501,113 +5724,222 @@
             <p:ph type="title"/>
           </p:nvPr>
         </p:nvSpPr>
-        <p:spPr/>
-        <p:txBody>
-          <a:bodyPr/>
-          <a:lstStyle/>
-          <a:p>
-            <a:endParaRPr lang="ru-RU"/>
-          </a:p>
-        </p:txBody>
-      </p:sp>
-      <p:sp>
-        <p:nvSpPr>
-          <p:cNvPr id="3" name="Объект 2"/>
-          <p:cNvSpPr>
-            <a:spLocks noGrp="1"/>
-          </p:cNvSpPr>
-          <p:nvPr>
-            <p:ph idx="1"/>
-          </p:nvPr>
-        </p:nvSpPr>
-        <p:spPr/>
-        <p:txBody>
-          <a:bodyPr/>
-          <a:lstStyle/>
-          <a:p>
-            <a:endParaRPr lang="ru-RU"/>
-          </a:p>
-        </p:txBody>
-      </p:sp>
-      <p:sp>
-        <p:nvSpPr>
-          <p:cNvPr id="4" name="Text Box 5"/>
-          <p:cNvSpPr txBox="1">
-            <a:spLocks noChangeArrowheads="1"/>
-          </p:cNvSpPr>
-          <p:nvPr/>
-        </p:nvSpPr>
-        <p:spPr bwMode="auto">
+        <p:spPr>
           <a:xfrm>
-            <a:off x="773262" y="6453336"/>
-            <a:ext cx="5886970" cy="190052"/>
+            <a:off x="457200" y="-603448"/>
+            <a:ext cx="8229600" cy="1600200"/>
           </a:xfrm>
-          <a:prstGeom prst="rect">
-            <a:avLst/>
-          </a:prstGeom>
-          <a:noFill/>
-          <a:ln w="9525">
-            <a:noFill/>
-            <a:miter lim="800000"/>
-            <a:headEnd/>
-            <a:tailEnd/>
-          </a:ln>
         </p:spPr>
         <p:txBody>
-          <a:bodyPr wrap="square" lIns="0" tIns="0" rIns="0" bIns="0" anchor="b">
-            <a:spAutoFit/>
+          <a:bodyPr/>
+          <a:lstStyle/>
+          <a:p>
+            <a:r>
+              <a:rPr lang="en-US" dirty="0" smtClean="0"/>
+              <a:t>SPIN</a:t>
+            </a:r>
+            <a:endParaRPr lang="ru-RU" dirty="0"/>
+          </a:p>
+        </p:txBody>
+      </p:sp>
+      <p:pic>
+        <p:nvPicPr>
+          <p:cNvPr id="4" name="Объект 3"/>
+          <p:cNvPicPr>
+            <a:picLocks noGrp="1" noChangeAspect="1"/>
+          </p:cNvPicPr>
+          <p:nvPr>
+            <p:ph sz="half" idx="2"/>
+          </p:nvPr>
+        </p:nvPicPr>
+        <p:blipFill>
+          <a:blip r:embed="rId2">
+            <a:extLst>
+              <a:ext uri="{28A0092B-C50C-407E-A947-70E740481C1C}">
+                <a14:useLocalDpi xmlns:a14="http://schemas.microsoft.com/office/drawing/2010/main" val="0"/>
+              </a:ext>
+            </a:extLst>
+          </a:blip>
+          <a:stretch>
+            <a:fillRect/>
+          </a:stretch>
+        </p:blipFill>
+        <p:spPr>
+          <a:xfrm>
+            <a:off x="3851920" y="1153736"/>
+            <a:ext cx="5224750" cy="5443616"/>
+          </a:xfrm>
+        </p:spPr>
+      </p:pic>
+      <p:sp>
+        <p:nvSpPr>
+          <p:cNvPr id="5" name="Объект 4"/>
+          <p:cNvSpPr>
+            <a:spLocks noGrp="1"/>
+          </p:cNvSpPr>
+          <p:nvPr>
+            <p:ph sz="quarter" idx="13"/>
+          </p:nvPr>
+        </p:nvSpPr>
+        <p:spPr>
+          <a:xfrm>
+            <a:off x="35496" y="1196752"/>
+            <a:ext cx="4041648" cy="5328592"/>
+          </a:xfrm>
+        </p:spPr>
+        <p:txBody>
+          <a:bodyPr>
+            <a:normAutofit/>
           </a:bodyPr>
           <a:lstStyle/>
           <a:p>
-            <a:pPr>
-              <a:lnSpc>
-                <a:spcPct val="95000"/>
-              </a:lnSpc>
-            </a:pPr>
-            <a:r>
-              <a:rPr lang="ru-RU" sz="1300" dirty="0">
-                <a:solidFill>
-                  <a:srgbClr val="045C75"/>
-                </a:solidFill>
-              </a:rPr>
-              <a:t>АлтГТУ им. И. И. </a:t>
-            </a:r>
-            <a:r>
-              <a:rPr lang="ru-RU" sz="1300" dirty="0" smtClean="0">
-                <a:solidFill>
-                  <a:srgbClr val="045C75"/>
-                </a:solidFill>
-              </a:rPr>
-              <a:t>Ползунова / ПОВТ, </a:t>
-            </a:r>
-            <a:r>
-              <a:rPr lang="ru-RU" sz="1300" dirty="0" smtClean="0">
-                <a:solidFill>
-                  <a:srgbClr val="045C75"/>
-                </a:solidFill>
-              </a:rPr>
-              <a:t>Юлия</a:t>
-            </a:r>
-            <a:r>
-              <a:rPr lang="ru-RU" sz="1300" dirty="0" smtClean="0">
-                <a:solidFill>
-                  <a:srgbClr val="045C75"/>
-                </a:solidFill>
-              </a:rPr>
-              <a:t> Шатилина</a:t>
-            </a:r>
-            <a:endParaRPr lang="en-US" sz="1300" dirty="0">
-              <a:solidFill>
-                <a:srgbClr val="045C75"/>
-              </a:solidFill>
-            </a:endParaRPr>
+            <a:r>
+              <a:rPr lang="ru-RU" sz="2800" dirty="0" err="1" smtClean="0"/>
+              <a:t>Promela</a:t>
+            </a:r>
+            <a:r>
+              <a:rPr lang="ru-RU" sz="2800" dirty="0" smtClean="0"/>
+              <a:t> </a:t>
+            </a:r>
+            <a:r>
+              <a:rPr lang="ru-RU" sz="2800" dirty="0"/>
+              <a:t>(= </a:t>
+            </a:r>
+            <a:r>
+              <a:rPr lang="ru-RU" sz="2800" dirty="0" err="1"/>
+              <a:t>Protocol</a:t>
+            </a:r>
+            <a:r>
+              <a:rPr lang="ru-RU" sz="2800" dirty="0"/>
+              <a:t> </a:t>
+            </a:r>
+            <a:r>
+              <a:rPr lang="ru-RU" sz="2800" dirty="0" err="1"/>
+              <a:t>Meta</a:t>
+            </a:r>
+            <a:r>
+              <a:rPr lang="ru-RU" sz="2800" dirty="0"/>
+              <a:t> </a:t>
+            </a:r>
+            <a:r>
+              <a:rPr lang="ru-RU" sz="2800" dirty="0" err="1" smtClean="0"/>
+              <a:t>Language</a:t>
+            </a:r>
+            <a:r>
+              <a:rPr lang="ru-RU" sz="2800" dirty="0" smtClean="0"/>
+              <a:t>)</a:t>
+            </a:r>
+            <a:endParaRPr lang="en-US" sz="2800" dirty="0" smtClean="0"/>
+          </a:p>
+          <a:p>
+            <a:pPr lvl="1"/>
+            <a:r>
+              <a:rPr lang="ru-RU" sz="2000" dirty="0" smtClean="0"/>
+              <a:t>язык </a:t>
+            </a:r>
+            <a:r>
+              <a:rPr lang="ru-RU" sz="2000" dirty="0"/>
+              <a:t>для создания </a:t>
+            </a:r>
+            <a:r>
+              <a:rPr lang="ru-RU" sz="2000" dirty="0" smtClean="0"/>
+              <a:t>моделей</a:t>
+            </a:r>
+            <a:r>
+              <a:rPr lang="en-US" sz="2000" dirty="0" smtClean="0"/>
+              <a:t> </a:t>
+            </a:r>
+            <a:r>
+              <a:rPr lang="ru-RU" sz="2000" dirty="0" smtClean="0"/>
+              <a:t>взаимодействующих </a:t>
+            </a:r>
+            <a:r>
+              <a:rPr lang="ru-RU" sz="2000" dirty="0"/>
+              <a:t>процессов </a:t>
+            </a:r>
+            <a:endParaRPr lang="en-US" sz="2000" dirty="0" smtClean="0"/>
+          </a:p>
+          <a:p>
+            <a:pPr lvl="1"/>
+            <a:r>
+              <a:rPr lang="ru-RU" sz="2000" dirty="0" smtClean="0"/>
+              <a:t>модели </a:t>
+            </a:r>
+            <a:r>
+              <a:rPr lang="ru-RU" sz="2000" dirty="0"/>
+              <a:t>с конечным числом </a:t>
+            </a:r>
+            <a:r>
+              <a:rPr lang="ru-RU" sz="2000" dirty="0" smtClean="0"/>
+              <a:t>состояний</a:t>
+            </a:r>
+            <a:endParaRPr lang="ru-RU" sz="2000" dirty="0"/>
+          </a:p>
+          <a:p>
+            <a:r>
+              <a:rPr lang="ru-RU" sz="2800" dirty="0"/>
+              <a:t>Редактор </a:t>
+            </a:r>
+            <a:r>
+              <a:rPr lang="ru-RU" sz="2800" dirty="0" smtClean="0"/>
+              <a:t>формул </a:t>
+            </a:r>
+            <a:r>
+              <a:rPr lang="ru-RU" sz="2800" dirty="0" err="1" smtClean="0"/>
+              <a:t>темпоральной</a:t>
+            </a:r>
+            <a:r>
+              <a:rPr lang="ru-RU" sz="2800" dirty="0" smtClean="0"/>
+              <a:t> логики </a:t>
+            </a:r>
+            <a:r>
+              <a:rPr lang="en-US" sz="2800" dirty="0"/>
+              <a:t>LTL</a:t>
+            </a:r>
+            <a:r>
+              <a:rPr lang="ru-RU" sz="2800" dirty="0"/>
+              <a:t>(</a:t>
+            </a:r>
+            <a:r>
+              <a:rPr lang="en-US" sz="2800" dirty="0"/>
+              <a:t>L</a:t>
+            </a:r>
+            <a:r>
+              <a:rPr lang="ru-RU" sz="2800" dirty="0" err="1"/>
+              <a:t>inear</a:t>
+            </a:r>
+            <a:r>
+              <a:rPr lang="ru-RU" sz="2800" dirty="0"/>
+              <a:t> </a:t>
+            </a:r>
+            <a:r>
+              <a:rPr lang="en-US" sz="2800" dirty="0"/>
+              <a:t>T</a:t>
+            </a:r>
+            <a:r>
+              <a:rPr lang="ru-RU" sz="2800" dirty="0" err="1"/>
+              <a:t>emporal</a:t>
+            </a:r>
+            <a:r>
+              <a:rPr lang="ru-RU" sz="2800" dirty="0"/>
+              <a:t> </a:t>
+            </a:r>
+            <a:r>
+              <a:rPr lang="en-US" sz="2800" dirty="0"/>
+              <a:t>L</a:t>
+            </a:r>
+            <a:r>
+              <a:rPr lang="ru-RU" sz="2800" dirty="0" err="1"/>
+              <a:t>ogic</a:t>
+            </a:r>
+            <a:endParaRPr lang="ru-RU" sz="2800" dirty="0"/>
           </a:p>
         </p:txBody>
       </p:sp>
     </p:spTree>
     <p:extLst>
       <p:ext uri="{BB962C8B-B14F-4D97-AF65-F5344CB8AC3E}">
-        <p14:creationId xmlns:p14="http://schemas.microsoft.com/office/powerpoint/2010/main" val="1742819723"/>
+        <p14:creationId xmlns:p14="http://schemas.microsoft.com/office/powerpoint/2010/main" val="30331259"/>
       </p:ext>
     </p:extLst>
   </p:cSld>
@@ -5658,7 +5990,7 @@
           <a:p>
             <a:r>
               <a:rPr lang="ru-RU" dirty="0" smtClean="0"/>
-              <a:t>Архитектура системы</a:t>
+              <a:t>Структура системы</a:t>
             </a:r>
             <a:endParaRPr lang="ru-RU" dirty="0"/>
           </a:p>
@@ -5732,23 +6064,7 @@
                   <a:srgbClr val="045C75"/>
                 </a:solidFill>
               </a:rPr>
-              <a:t>Ползунова / ПОВТ, </a:t>
-            </a:r>
-            <a:r>
-              <a:rPr lang="ru-RU" sz="1300" dirty="0" smtClean="0">
-                <a:solidFill>
-                  <a:srgbClr val="045C75"/>
-                </a:solidFill>
-              </a:rPr>
-              <a:t>Юлия</a:t>
-            </a:r>
-            <a:r>
-              <a:rPr lang="ru-RU" sz="1300" dirty="0" smtClean="0">
-                <a:solidFill>
-                  <a:srgbClr val="045C75"/>
-                </a:solidFill>
-              </a:rPr>
-              <a:t> Шатилина</a:t>
+              <a:t>Ползунова / ПОВТ, Юлия Шатилина</a:t>
             </a:r>
             <a:endParaRPr lang="en-US" sz="1300" dirty="0">
               <a:solidFill>
@@ -5761,7 +6077,7 @@
     </p:spTree>
     <p:extLst>
       <p:ext uri="{BB962C8B-B14F-4D97-AF65-F5344CB8AC3E}">
-        <p14:creationId xmlns:p14="http://schemas.microsoft.com/office/powerpoint/2010/main" val="4061569519"/>
+        <p14:creationId xmlns:p14="http://schemas.microsoft.com/office/powerpoint/2010/main" val="3176338446"/>
       </p:ext>
     </p:extLst>
   </p:cSld>

</xml_diff>

<commit_message>
Structure of system added
</commit_message>
<xml_diff>
--- a/shatilina.pptx
+++ b/shatilina.pptx
@@ -5370,7 +5370,12 @@
             <p:ph type="title"/>
           </p:nvPr>
         </p:nvSpPr>
-        <p:spPr/>
+        <p:spPr>
+          <a:xfrm>
+            <a:off x="457200" y="-531440"/>
+            <a:ext cx="8229600" cy="1600200"/>
+          </a:xfrm>
+        </p:spPr>
         <p:txBody>
           <a:bodyPr/>
           <a:lstStyle/>
@@ -5383,35 +5388,6 @@
           </a:p>
         </p:txBody>
       </p:sp>
-      <p:pic>
-        <p:nvPicPr>
-          <p:cNvPr id="5" name="Объект 4"/>
-          <p:cNvPicPr>
-            <a:picLocks noGrp="1" noChangeAspect="1"/>
-          </p:cNvPicPr>
-          <p:nvPr>
-            <p:ph idx="1"/>
-          </p:nvPr>
-        </p:nvPicPr>
-        <p:blipFill>
-          <a:blip r:embed="rId2">
-            <a:extLst>
-              <a:ext uri="{28A0092B-C50C-407E-A947-70E740481C1C}">
-                <a14:useLocalDpi xmlns:a14="http://schemas.microsoft.com/office/drawing/2010/main" val="0"/>
-              </a:ext>
-            </a:extLst>
-          </a:blip>
-          <a:stretch>
-            <a:fillRect/>
-          </a:stretch>
-        </p:blipFill>
-        <p:spPr>
-          <a:xfrm>
-            <a:off x="2147590" y="1600200"/>
-            <a:ext cx="4848819" cy="4525963"/>
-          </a:xfrm>
-        </p:spPr>
-      </p:pic>
       <p:sp>
         <p:nvSpPr>
           <p:cNvPr id="4" name="Text Box 5"/>
@@ -5468,6 +5444,71 @@
                 <a:srgbClr val="045C75"/>
               </a:solidFill>
             </a:endParaRPr>
+          </a:p>
+        </p:txBody>
+      </p:sp>
+      <p:pic>
+        <p:nvPicPr>
+          <p:cNvPr id="8" name="Рисунок 7"/>
+          <p:cNvPicPr>
+            <a:picLocks noChangeAspect="1"/>
+          </p:cNvPicPr>
+          <p:nvPr/>
+        </p:nvPicPr>
+        <p:blipFill>
+          <a:blip r:embed="rId2">
+            <a:extLst>
+              <a:ext uri="{28A0092B-C50C-407E-A947-70E740481C1C}">
+                <a14:useLocalDpi xmlns:a14="http://schemas.microsoft.com/office/drawing/2010/main" val="0"/>
+              </a:ext>
+            </a:extLst>
+          </a:blip>
+          <a:stretch>
+            <a:fillRect/>
+          </a:stretch>
+        </p:blipFill>
+        <p:spPr>
+          <a:xfrm>
+            <a:off x="3865775" y="1152675"/>
+            <a:ext cx="5196699" cy="5228653"/>
+          </a:xfrm>
+          <a:prstGeom prst="rect">
+            <a:avLst/>
+          </a:prstGeom>
+        </p:spPr>
+      </p:pic>
+      <p:sp>
+        <p:nvSpPr>
+          <p:cNvPr id="9" name="Объект 10"/>
+          <p:cNvSpPr>
+            <a:spLocks noGrp="1"/>
+          </p:cNvSpPr>
+          <p:nvPr>
+            <p:ph sz="quarter" idx="4294967295"/>
+          </p:nvPr>
+        </p:nvSpPr>
+        <p:spPr>
+          <a:xfrm>
+            <a:off x="179512" y="1772816"/>
+            <a:ext cx="4536504" cy="4608512"/>
+          </a:xfrm>
+          <a:prstGeom prst="rect">
+            <a:avLst/>
+          </a:prstGeom>
+        </p:spPr>
+        <p:txBody>
+          <a:bodyPr>
+            <a:normAutofit/>
+          </a:bodyPr>
+          <a:lstStyle/>
+          <a:p>
+            <a:pPr marL="0" indent="0">
+              <a:buNone/>
+            </a:pPr>
+            <a:r>
+              <a:rPr lang="ru-RU" sz="3200" dirty="0"/>
+              <a:t>метод автоматической формальной верификации систем с конечным числом состояний</a:t>
+            </a:r>
           </a:p>
         </p:txBody>
       </p:sp>
@@ -5508,36 +5549,6 @@
           <a:chExt cx="0" cy="0"/>
         </a:xfrm>
       </p:grpSpPr>
-      <p:pic>
-        <p:nvPicPr>
-          <p:cNvPr id="5" name="Рисунок 4"/>
-          <p:cNvPicPr>
-            <a:picLocks noChangeAspect="1"/>
-          </p:cNvPicPr>
-          <p:nvPr/>
-        </p:nvPicPr>
-        <p:blipFill>
-          <a:blip r:embed="rId2">
-            <a:extLst>
-              <a:ext uri="{28A0092B-C50C-407E-A947-70E740481C1C}">
-                <a14:useLocalDpi xmlns:a14="http://schemas.microsoft.com/office/drawing/2010/main" val="0"/>
-              </a:ext>
-            </a:extLst>
-          </a:blip>
-          <a:stretch>
-            <a:fillRect/>
-          </a:stretch>
-        </p:blipFill>
-        <p:spPr>
-          <a:xfrm>
-            <a:off x="3865775" y="1152675"/>
-            <a:ext cx="5196699" cy="5228653"/>
-          </a:xfrm>
-          <a:prstGeom prst="rect">
-            <a:avLst/>
-          </a:prstGeom>
-        </p:spPr>
-      </p:pic>
       <p:sp>
         <p:nvSpPr>
           <p:cNvPr id="8" name="Заголовок 1"/>
@@ -5677,6 +5688,35 @@
           </a:p>
         </p:txBody>
       </p:sp>
+      <p:pic>
+        <p:nvPicPr>
+          <p:cNvPr id="12" name="Объект 3"/>
+          <p:cNvPicPr>
+            <a:picLocks noGrp="1" noChangeAspect="1"/>
+          </p:cNvPicPr>
+          <p:nvPr>
+            <p:ph sz="half" idx="2"/>
+          </p:nvPr>
+        </p:nvPicPr>
+        <p:blipFill>
+          <a:blip r:embed="rId2">
+            <a:extLst>
+              <a:ext uri="{28A0092B-C50C-407E-A947-70E740481C1C}">
+                <a14:useLocalDpi xmlns:a14="http://schemas.microsoft.com/office/drawing/2010/main" val="0"/>
+              </a:ext>
+            </a:extLst>
+          </a:blip>
+          <a:stretch>
+            <a:fillRect/>
+          </a:stretch>
+        </p:blipFill>
+        <p:spPr>
+          <a:xfrm>
+            <a:off x="3851920" y="1153736"/>
+            <a:ext cx="5224750" cy="5443616"/>
+          </a:xfrm>
+        </p:spPr>
+      </p:pic>
     </p:spTree>
     <p:extLst>
       <p:ext uri="{BB962C8B-B14F-4D97-AF65-F5344CB8AC3E}">
@@ -5998,25 +6038,6 @@
       </p:sp>
       <p:sp>
         <p:nvSpPr>
-          <p:cNvPr id="3" name="Объект 2"/>
-          <p:cNvSpPr>
-            <a:spLocks noGrp="1"/>
-          </p:cNvSpPr>
-          <p:nvPr>
-            <p:ph idx="1"/>
-          </p:nvPr>
-        </p:nvSpPr>
-        <p:spPr/>
-        <p:txBody>
-          <a:bodyPr/>
-          <a:lstStyle/>
-          <a:p>
-            <a:endParaRPr lang="ru-RU"/>
-          </a:p>
-        </p:txBody>
-      </p:sp>
-      <p:sp>
-        <p:nvSpPr>
           <p:cNvPr id="4" name="Text Box 5"/>
           <p:cNvSpPr txBox="1">
             <a:spLocks noChangeArrowheads="1"/>
@@ -6074,6 +6095,35 @@
           </a:p>
         </p:txBody>
       </p:sp>
+      <p:pic>
+        <p:nvPicPr>
+          <p:cNvPr id="9" name="Объект 8"/>
+          <p:cNvPicPr>
+            <a:picLocks noGrp="1" noChangeAspect="1"/>
+          </p:cNvPicPr>
+          <p:nvPr>
+            <p:ph idx="1"/>
+          </p:nvPr>
+        </p:nvPicPr>
+        <p:blipFill>
+          <a:blip r:embed="rId2">
+            <a:extLst>
+              <a:ext uri="{28A0092B-C50C-407E-A947-70E740481C1C}">
+                <a14:useLocalDpi xmlns:a14="http://schemas.microsoft.com/office/drawing/2010/main" val="0"/>
+              </a:ext>
+            </a:extLst>
+          </a:blip>
+          <a:stretch>
+            <a:fillRect/>
+          </a:stretch>
+        </p:blipFill>
+        <p:spPr>
+          <a:xfrm>
+            <a:off x="1842743" y="1600200"/>
+            <a:ext cx="5254157" cy="4709120"/>
+          </a:xfrm>
+        </p:spPr>
+      </p:pic>
     </p:spTree>
     <p:extLst>
       <p:ext uri="{BB962C8B-B14F-4D97-AF65-F5344CB8AC3E}">

</xml_diff>

<commit_message>
Architecture picture in proccess
</commit_message>
<xml_diff>
--- a/shatilina.pptx
+++ b/shatilina.pptx
@@ -4229,6 +4229,19 @@
           </a:bodyPr>
           <a:lstStyle/>
           <a:p>
+            <a:pPr>
+              <a:buFont typeface="Courier New" pitchFamily="49" charset="0"/>
+              <a:buChar char="o"/>
+            </a:pPr>
+            <a:endParaRPr lang="ru-RU" dirty="0" smtClean="0">
+              <a:latin typeface="+mn-lt"/>
+            </a:endParaRPr>
+          </a:p>
+          <a:p>
+            <a:pPr>
+              <a:buFont typeface="Courier New" pitchFamily="49" charset="0"/>
+              <a:buChar char="o"/>
+            </a:pPr>
             <a:r>
               <a:rPr lang="ru-RU" dirty="0" smtClean="0">
                 <a:latin typeface="+mn-lt"/>
@@ -4236,38 +4249,17 @@
               <a:t>разработана </a:t>
             </a:r>
             <a:r>
-              <a:rPr lang="ru-RU" b="1" dirty="0">
+              <a:rPr lang="ru-RU" b="1" dirty="0" smtClean="0">
                 <a:latin typeface="+mn-lt"/>
               </a:rPr>
               <a:t>модель</a:t>
             </a:r>
-            <a:endParaRPr lang="ru-RU" dirty="0">
-              <a:latin typeface="+mn-lt"/>
-            </a:endParaRPr>
-          </a:p>
-          <a:p>
-            <a:pPr lvl="1"/>
-            <a:r>
-              <a:rPr lang="ru-RU" sz="1800" dirty="0">
+            <a:r>
+              <a:rPr lang="ru-RU" dirty="0" smtClean="0">
                 <a:latin typeface="+mn-lt"/>
               </a:rPr>
-              <a:t>м</a:t>
-            </a:r>
-            <a:r>
-              <a:rPr lang="ru-RU" sz="1800" dirty="0" smtClean="0">
-                <a:latin typeface="+mn-lt"/>
-              </a:rPr>
-              <a:t>одель системы </a:t>
-            </a:r>
-            <a:r>
-              <a:rPr lang="ru-RU" sz="1800" dirty="0">
-                <a:latin typeface="+mn-lt"/>
-              </a:rPr>
-              <a:t>с динамически расширяемым функционалом </a:t>
-            </a:r>
-            <a:endParaRPr lang="ru-RU" sz="1800" dirty="0" smtClean="0">
-              <a:latin typeface="+mn-lt"/>
-            </a:endParaRPr>
+              <a:t> системы</a:t>
+            </a:r>
           </a:p>
           <a:p>
             <a:pPr lvl="1"/>
@@ -4276,6 +4268,10 @@
             </a:endParaRPr>
           </a:p>
           <a:p>
+            <a:pPr>
+              <a:buFont typeface="Courier New" pitchFamily="49" charset="0"/>
+              <a:buChar char="o"/>
+            </a:pPr>
             <a:r>
               <a:rPr lang="ru-RU" dirty="0" smtClean="0">
                 <a:latin typeface="+mn-lt"/>
@@ -4283,22 +4279,16 @@
               <a:t>спроектирована </a:t>
             </a:r>
             <a:r>
-              <a:rPr lang="ru-RU" b="1" dirty="0">
+              <a:rPr lang="ru-RU" b="1" dirty="0" smtClean="0">
                 <a:latin typeface="+mn-lt"/>
               </a:rPr>
-              <a:t>архитектура</a:t>
-            </a:r>
-            <a:endParaRPr lang="ru-RU" dirty="0">
-              <a:latin typeface="+mn-lt"/>
-            </a:endParaRPr>
-          </a:p>
-          <a:p>
-            <a:pPr lvl="1"/>
-            <a:r>
-              <a:rPr lang="ru-RU" sz="1800" dirty="0" smtClean="0">
+              <a:t>архитектура </a:t>
+            </a:r>
+            <a:r>
+              <a:rPr lang="ru-RU" dirty="0" smtClean="0">
                 <a:latin typeface="+mn-lt"/>
               </a:rPr>
-              <a:t>архитектура системы для создания и верификации прототипов программных систем</a:t>
+              <a:t>системы</a:t>
             </a:r>
           </a:p>
           <a:p>
@@ -4308,100 +4298,122 @@
             </a:endParaRPr>
           </a:p>
           <a:p>
+            <a:pPr>
+              <a:buFont typeface="Courier New" pitchFamily="49" charset="0"/>
+              <a:buChar char="o"/>
+            </a:pPr>
             <a:r>
               <a:rPr lang="ru-RU" dirty="0" smtClean="0">
                 <a:latin typeface="+mn-lt"/>
               </a:rPr>
-              <a:t>реализовано </a:t>
+              <a:t>реализовано кроссплатформенное </a:t>
             </a:r>
             <a:r>
               <a:rPr lang="ru-RU" b="1" dirty="0" smtClean="0">
                 <a:latin typeface="+mn-lt"/>
               </a:rPr>
-              <a:t>приложение</a:t>
-            </a:r>
-            <a:endParaRPr lang="ru-RU" dirty="0" smtClean="0">
-              <a:latin typeface="+mn-lt"/>
-            </a:endParaRPr>
-          </a:p>
-          <a:p>
-            <a:pPr marL="457200" lvl="2"/>
-            <a:r>
-              <a:rPr lang="ru-RU" sz="1800" dirty="0" smtClean="0">
-                <a:latin typeface="+mn-lt"/>
-              </a:rPr>
-              <a:t>кроссплатформенное приложение состоящее из:</a:t>
-            </a:r>
-          </a:p>
-          <a:p>
-            <a:pPr marL="914400" lvl="3">
-              <a:buFont typeface="Arial" pitchFamily="34" charset="0"/>
-              <a:buChar char="•"/>
-            </a:pPr>
+              <a:t>приложение, </a:t>
+            </a:r>
             <a:r>
               <a:rPr lang="ru-RU" dirty="0" smtClean="0">
                 <a:latin typeface="+mn-lt"/>
               </a:rPr>
-              <a:t>подсистема лексического и синтаксического анализа</a:t>
-            </a:r>
-            <a:endParaRPr lang="ru-RU" dirty="0">
+              <a:t>состоящее из:</a:t>
+            </a:r>
+          </a:p>
+          <a:p>
+            <a:pPr marL="971550" lvl="3" indent="-285750"/>
+            <a:r>
+              <a:rPr lang="ru-RU" sz="2000" dirty="0" smtClean="0">
+                <a:latin typeface="+mn-lt"/>
+              </a:rPr>
+              <a:t>подсистемы лексического и синтаксического анализа</a:t>
+            </a:r>
+            <a:endParaRPr lang="ru-RU" sz="2000" dirty="0">
               <a:latin typeface="+mn-lt"/>
             </a:endParaRPr>
           </a:p>
           <a:p>
-            <a:pPr marL="914400" lvl="3">
-              <a:buFont typeface="Arial" pitchFamily="34" charset="0"/>
-              <a:buChar char="•"/>
+            <a:pPr marL="971550" lvl="3" indent="-285750"/>
+            <a:r>
+              <a:rPr lang="ru-RU" sz="2000" dirty="0" smtClean="0">
+                <a:latin typeface="+mn-lt"/>
+              </a:rPr>
+              <a:t>подсистемы построения </a:t>
+            </a:r>
+            <a:r>
+              <a:rPr lang="en-US" sz="2000" dirty="0" smtClean="0">
+                <a:latin typeface="+mn-lt"/>
+              </a:rPr>
+              <a:t>AST</a:t>
+            </a:r>
+            <a:r>
+              <a:rPr lang="ru-RU" sz="2000" dirty="0" smtClean="0">
+                <a:latin typeface="+mn-lt"/>
+              </a:rPr>
+              <a:t> и </a:t>
+            </a:r>
+            <a:r>
+              <a:rPr lang="en-US" sz="2000" dirty="0" smtClean="0">
+                <a:latin typeface="+mn-lt"/>
+              </a:rPr>
+              <a:t>Call Graph</a:t>
+            </a:r>
+          </a:p>
+          <a:p>
+            <a:pPr marL="971550" lvl="3" indent="-285750"/>
+            <a:r>
+              <a:rPr lang="ru-RU" sz="2000" dirty="0" smtClean="0">
+                <a:latin typeface="+mn-lt"/>
+              </a:rPr>
+              <a:t>подсистемы </a:t>
+            </a:r>
+            <a:r>
+              <a:rPr lang="ru-RU" sz="2000" dirty="0" err="1" smtClean="0">
+                <a:latin typeface="+mn-lt"/>
+              </a:rPr>
+              <a:t>кодогенерации</a:t>
+            </a:r>
+            <a:endParaRPr lang="ru-RU" sz="2000" dirty="0" smtClean="0">
+              <a:latin typeface="+mn-lt"/>
+            </a:endParaRPr>
+          </a:p>
+          <a:p>
+            <a:pPr marL="914400" lvl="3"/>
+            <a:endParaRPr lang="ru-RU" sz="1200" dirty="0" smtClean="0">
+              <a:latin typeface="+mn-lt"/>
+            </a:endParaRPr>
+          </a:p>
+          <a:p>
+            <a:pPr>
+              <a:buFont typeface="Courier New" pitchFamily="49" charset="0"/>
+              <a:buChar char="o"/>
             </a:pPr>
             <a:r>
               <a:rPr lang="ru-RU" dirty="0" smtClean="0">
                 <a:latin typeface="+mn-lt"/>
               </a:rPr>
-              <a:t>подсистемы построения </a:t>
-            </a:r>
-            <a:r>
-              <a:rPr lang="en-US" dirty="0" smtClean="0">
+              <a:t>создан </a:t>
+            </a:r>
+            <a:r>
+              <a:rPr lang="en-US" b="1" dirty="0" smtClean="0">
                 <a:latin typeface="+mn-lt"/>
               </a:rPr>
-              <a:t>AST</a:t>
-            </a:r>
-            <a:r>
-              <a:rPr lang="ru-RU" dirty="0" smtClean="0">
+              <a:t>plug-in </a:t>
+            </a:r>
+            <a:r>
+              <a:rPr lang="ru-RU" b="1" dirty="0">
                 <a:latin typeface="+mn-lt"/>
               </a:rPr>
-              <a:t> и </a:t>
-            </a:r>
-            <a:r>
-              <a:rPr lang="en-US" dirty="0" smtClean="0">
+              <a:t>для </a:t>
+            </a:r>
+            <a:r>
+              <a:rPr lang="en-US" b="1" dirty="0" smtClean="0">
                 <a:latin typeface="+mn-lt"/>
               </a:rPr>
-              <a:t>Call Graph</a:t>
-            </a:r>
-          </a:p>
-          <a:p>
-            <a:pPr marL="914400" lvl="3">
-              <a:buFont typeface="Arial" pitchFamily="34" charset="0"/>
-              <a:buChar char="•"/>
-            </a:pPr>
-            <a:r>
-              <a:rPr lang="ru-RU" dirty="0">
-                <a:latin typeface="+mn-lt"/>
-              </a:rPr>
-              <a:t>п</a:t>
-            </a:r>
-            <a:r>
-              <a:rPr lang="ru-RU" dirty="0" smtClean="0">
-                <a:latin typeface="+mn-lt"/>
-              </a:rPr>
-              <a:t>одсистема </a:t>
-            </a:r>
-            <a:r>
-              <a:rPr lang="ru-RU" dirty="0" err="1" smtClean="0">
-                <a:latin typeface="+mn-lt"/>
-              </a:rPr>
-              <a:t>кодогенератора</a:t>
-            </a:r>
-            <a:endParaRPr lang="ru-RU" sz="1200" dirty="0">
+              <a:t>Eclipse</a:t>
+            </a:r>
+            <a:endParaRPr lang="ru-RU" b="1" dirty="0">
               <a:latin typeface="+mn-lt"/>
             </a:endParaRPr>
           </a:p>
@@ -4547,17 +4559,20 @@
               <a:buFont typeface="Courier New" pitchFamily="49" charset="0"/>
               <a:buChar char="o"/>
             </a:pPr>
-            <a:r>
-              <a:rPr lang="ru-RU" dirty="0">
-                <a:latin typeface="+mn-lt"/>
-              </a:rPr>
-              <a:t>п</a:t>
-            </a:r>
+            <a:endParaRPr lang="ru-RU" dirty="0" smtClean="0">
+              <a:latin typeface="+mn-lt"/>
+            </a:endParaRPr>
+          </a:p>
+          <a:p>
+            <a:pPr>
+              <a:buFont typeface="Courier New" pitchFamily="49" charset="0"/>
+              <a:buChar char="o"/>
+            </a:pPr>
             <a:r>
               <a:rPr lang="ru-RU" dirty="0" smtClean="0">
                 <a:latin typeface="+mn-lt"/>
               </a:rPr>
-              <a:t>оддержка </a:t>
+              <a:t>поддержка </a:t>
             </a:r>
             <a:r>
               <a:rPr lang="ru-RU" b="1" dirty="0" smtClean="0">
@@ -4635,48 +4650,6 @@
               <a:t>платформы</a:t>
             </a:r>
             <a:endParaRPr lang="en-US" dirty="0" smtClean="0">
-              <a:latin typeface="+mn-lt"/>
-            </a:endParaRPr>
-          </a:p>
-          <a:p>
-            <a:pPr>
-              <a:buFont typeface="Courier New" pitchFamily="49" charset="0"/>
-              <a:buChar char="o"/>
-            </a:pPr>
-            <a:endParaRPr lang="ru-RU" dirty="0">
-              <a:latin typeface="+mn-lt"/>
-            </a:endParaRPr>
-          </a:p>
-          <a:p>
-            <a:pPr>
-              <a:buFont typeface="Courier New" pitchFamily="49" charset="0"/>
-              <a:buChar char="o"/>
-            </a:pPr>
-            <a:r>
-              <a:rPr lang="ru-RU" dirty="0" smtClean="0">
-                <a:latin typeface="+mn-lt"/>
-              </a:rPr>
-              <a:t>создание полноценного </a:t>
-            </a:r>
-            <a:r>
-              <a:rPr lang="en-US" b="1" dirty="0" smtClean="0">
-                <a:latin typeface="+mn-lt"/>
-              </a:rPr>
-              <a:t>plug-in </a:t>
-            </a:r>
-            <a:r>
-              <a:rPr lang="ru-RU" b="1" dirty="0" smtClean="0">
-                <a:latin typeface="+mn-lt"/>
-              </a:rPr>
-              <a:t>для </a:t>
-            </a:r>
-            <a:r>
-              <a:rPr lang="en-US" b="1" dirty="0" smtClean="0">
-                <a:latin typeface="+mn-lt"/>
-              </a:rPr>
-              <a:t>Eclipse</a:t>
-            </a:r>
-            <a:endParaRPr lang="ru-RU" b="1" dirty="0">
               <a:latin typeface="+mn-lt"/>
             </a:endParaRPr>
           </a:p>

</xml_diff>

<commit_message>
Change pictures colors. Edit them on slides
</commit_message>
<xml_diff>
--- a/shatilina.pptx
+++ b/shatilina.pptx
@@ -4130,13 +4130,11 @@
       </p:sp>
       <p:pic>
         <p:nvPicPr>
-          <p:cNvPr id="9" name="Объект 8"/>
+          <p:cNvPr id="10" name="Рисунок 9"/>
           <p:cNvPicPr>
-            <a:picLocks noGrp="1" noChangeAspect="1"/>
+            <a:picLocks noChangeAspect="1"/>
           </p:cNvPicPr>
-          <p:nvPr>
-            <p:ph idx="1"/>
-          </p:nvPr>
+          <p:nvPr/>
         </p:nvPicPr>
         <p:blipFill>
           <a:blip r:embed="rId3">
@@ -4152,9 +4150,12 @@
         </p:blipFill>
         <p:spPr>
           <a:xfrm>
-            <a:off x="2267744" y="1315773"/>
-            <a:ext cx="4680520" cy="5017623"/>
+            <a:off x="1907981" y="1268759"/>
+            <a:ext cx="4824259" cy="5184577"/>
           </a:xfrm>
+          <a:prstGeom prst="rect">
+            <a:avLst/>
+          </a:prstGeom>
         </p:spPr>
       </p:pic>
     </p:spTree>
@@ -4362,7 +4363,7 @@
               <a:rPr lang="en-US" sz="2000" dirty="0" smtClean="0">
                 <a:latin typeface="+mn-lt"/>
               </a:rPr>
-              <a:t>Call Graph</a:t>
+              <a:t>CFG</a:t>
             </a:r>
           </a:p>
           <a:p>
@@ -4893,7 +4894,12 @@
             <p:ph type="title"/>
           </p:nvPr>
         </p:nvSpPr>
-        <p:spPr/>
+        <p:spPr>
+          <a:xfrm>
+            <a:off x="457200" y="-387424"/>
+            <a:ext cx="8229600" cy="1600200"/>
+          </a:xfrm>
+        </p:spPr>
         <p:txBody>
           <a:bodyPr/>
           <a:lstStyle/>
@@ -5031,7 +5037,12 @@
             <p:ph type="title"/>
           </p:nvPr>
         </p:nvSpPr>
-        <p:spPr/>
+        <p:spPr>
+          <a:xfrm>
+            <a:off x="457200" y="-531440"/>
+            <a:ext cx="8229600" cy="1600200"/>
+          </a:xfrm>
+        </p:spPr>
         <p:txBody>
           <a:bodyPr/>
           <a:lstStyle/>
@@ -5169,7 +5180,12 @@
             <p:ph type="title"/>
           </p:nvPr>
         </p:nvSpPr>
-        <p:spPr/>
+        <p:spPr>
+          <a:xfrm>
+            <a:off x="457200" y="-459432"/>
+            <a:ext cx="8229600" cy="1600200"/>
+          </a:xfrm>
+        </p:spPr>
         <p:txBody>
           <a:bodyPr/>
           <a:lstStyle/>
@@ -5398,7 +5414,12 @@
             <p:ph type="title"/>
           </p:nvPr>
         </p:nvSpPr>
-        <p:spPr/>
+        <p:spPr>
+          <a:xfrm>
+            <a:off x="457200" y="-459432"/>
+            <a:ext cx="8229600" cy="1600200"/>
+          </a:xfrm>
+        </p:spPr>
         <p:txBody>
           <a:bodyPr/>
           <a:lstStyle/>
@@ -5613,9 +5634,44 @@
           </a:p>
         </p:txBody>
       </p:sp>
+      <p:sp>
+        <p:nvSpPr>
+          <p:cNvPr id="9" name="Объект 10"/>
+          <p:cNvSpPr>
+            <a:spLocks noGrp="1"/>
+          </p:cNvSpPr>
+          <p:nvPr>
+            <p:ph sz="quarter" idx="4294967295"/>
+          </p:nvPr>
+        </p:nvSpPr>
+        <p:spPr>
+          <a:xfrm>
+            <a:off x="179512" y="1772816"/>
+            <a:ext cx="4536504" cy="4608512"/>
+          </a:xfrm>
+          <a:prstGeom prst="rect">
+            <a:avLst/>
+          </a:prstGeom>
+        </p:spPr>
+        <p:txBody>
+          <a:bodyPr>
+            <a:normAutofit/>
+          </a:bodyPr>
+          <a:lstStyle/>
+          <a:p>
+            <a:pPr marL="0" indent="0">
+              <a:buNone/>
+            </a:pPr>
+            <a:r>
+              <a:rPr lang="ru-RU" sz="3200" dirty="0"/>
+              <a:t>метод автоматической формальной верификации систем с конечным числом состояний</a:t>
+            </a:r>
+          </a:p>
+        </p:txBody>
+      </p:sp>
       <p:pic>
         <p:nvPicPr>
-          <p:cNvPr id="8" name="Рисунок 7"/>
+          <p:cNvPr id="10" name="Рисунок 9"/>
           <p:cNvPicPr>
             <a:picLocks noChangeAspect="1"/>
           </p:cNvPicPr>
@@ -5635,49 +5691,14 @@
         </p:blipFill>
         <p:spPr>
           <a:xfrm>
-            <a:off x="3865775" y="1152675"/>
-            <a:ext cx="5196699" cy="5228653"/>
+            <a:off x="3851920" y="1080120"/>
+            <a:ext cx="5244992" cy="5301208"/>
           </a:xfrm>
           <a:prstGeom prst="rect">
             <a:avLst/>
           </a:prstGeom>
         </p:spPr>
       </p:pic>
-      <p:sp>
-        <p:nvSpPr>
-          <p:cNvPr id="9" name="Объект 10"/>
-          <p:cNvSpPr>
-            <a:spLocks noGrp="1"/>
-          </p:cNvSpPr>
-          <p:nvPr>
-            <p:ph sz="quarter" idx="4294967295"/>
-          </p:nvPr>
-        </p:nvSpPr>
-        <p:spPr>
-          <a:xfrm>
-            <a:off x="179512" y="1772816"/>
-            <a:ext cx="4536504" cy="4608512"/>
-          </a:xfrm>
-          <a:prstGeom prst="rect">
-            <a:avLst/>
-          </a:prstGeom>
-        </p:spPr>
-        <p:txBody>
-          <a:bodyPr>
-            <a:normAutofit/>
-          </a:bodyPr>
-          <a:lstStyle/>
-          <a:p>
-            <a:pPr marL="0" indent="0">
-              <a:buNone/>
-            </a:pPr>
-            <a:r>
-              <a:rPr lang="ru-RU" sz="3200" dirty="0"/>
-              <a:t>метод автоматической формальной верификации систем с конечным числом состояний</a:t>
-            </a:r>
-          </a:p>
-        </p:txBody>
-      </p:sp>
     </p:spTree>
     <p:extLst>
       <p:ext uri="{BB962C8B-B14F-4D97-AF65-F5344CB8AC3E}">
@@ -6201,7 +6222,12 @@
             <p:ph type="title"/>
           </p:nvPr>
         </p:nvSpPr>
-        <p:spPr/>
+        <p:spPr>
+          <a:xfrm>
+            <a:off x="457200" y="-531440"/>
+            <a:ext cx="8229600" cy="1600200"/>
+          </a:xfrm>
+        </p:spPr>
         <p:txBody>
           <a:bodyPr/>
           <a:lstStyle/>
@@ -6275,7 +6301,7 @@
       </p:sp>
       <p:pic>
         <p:nvPicPr>
-          <p:cNvPr id="13" name="Объект 12"/>
+          <p:cNvPr id="17" name="Объект 16"/>
           <p:cNvPicPr>
             <a:picLocks noGrp="1" noChangeAspect="1"/>
           </p:cNvPicPr>
@@ -6297,8 +6323,8 @@
         </p:blipFill>
         <p:spPr>
           <a:xfrm>
-            <a:off x="1979712" y="1658422"/>
-            <a:ext cx="5189196" cy="4650898"/>
+            <a:off x="1619672" y="1124744"/>
+            <a:ext cx="5951627" cy="5328592"/>
           </a:xfrm>
         </p:spPr>
       </p:pic>

</xml_diff>

<commit_message>
Change work descr pic
</commit_message>
<xml_diff>
--- a/shatilina.pptx
+++ b/shatilina.pptx
@@ -796,7 +796,23 @@
             </a:r>
             <a:r>
               <a:rPr lang="ru-RU" baseline="0" dirty="0" smtClean="0"/>
-              <a:t>сказанное означает, что у любой модели </a:t>
+              <a:t>сказанное означает, что у любой модели описанной с помощью языка </a:t>
+            </a:r>
+            <a:r>
+              <a:rPr lang="en-US" baseline="0" dirty="0" err="1" smtClean="0"/>
+              <a:t>Promela</a:t>
+            </a:r>
+            <a:r>
+              <a:rPr lang="ru-RU" baseline="0" dirty="0" smtClean="0"/>
+              <a:t> конечное число состояний. За </a:t>
+            </a:r>
+            <a:r>
+              <a:rPr lang="ru-RU" baseline="0" dirty="0" err="1" smtClean="0"/>
+              <a:t>счет</a:t>
+            </a:r>
+            <a:r>
+              <a:rPr lang="ru-RU" baseline="0" dirty="0" smtClean="0"/>
+              <a:t> чего это достигается мы увидим дальше.</a:t>
             </a:r>
             <a:endParaRPr lang="ru-RU" dirty="0"/>
           </a:p>
@@ -4856,7 +4872,7 @@
       </p:sp>
       <p:pic>
         <p:nvPicPr>
-          <p:cNvPr id="17" name="Объект 16"/>
+          <p:cNvPr id="19" name="Объект 18"/>
           <p:cNvPicPr>
             <a:picLocks noGrp="1" noChangeAspect="1"/>
           </p:cNvPicPr>
@@ -4878,7 +4894,7 @@
         </p:blipFill>
         <p:spPr>
           <a:xfrm>
-            <a:off x="1619672" y="1124744"/>
+            <a:off x="1631123" y="1124744"/>
             <a:ext cx="5951627" cy="5328592"/>
           </a:xfrm>
         </p:spPr>

</xml_diff>

<commit_message>
Developing software slide was added
</commit_message>
<xml_diff>
--- a/shatilina.pptx
+++ b/shatilina.pptx
@@ -5,24 +5,25 @@
     <p:sldMasterId id="2147483960" r:id="rId1"/>
   </p:sldMasterIdLst>
   <p:notesMasterIdLst>
-    <p:notesMasterId r:id="rId17"/>
+    <p:notesMasterId r:id="rId18"/>
   </p:notesMasterIdLst>
   <p:sldIdLst>
     <p:sldId id="257" r:id="rId2"/>
-    <p:sldId id="264" r:id="rId3"/>
-    <p:sldId id="265" r:id="rId4"/>
-    <p:sldId id="267" r:id="rId5"/>
-    <p:sldId id="266" r:id="rId6"/>
-    <p:sldId id="268" r:id="rId7"/>
-    <p:sldId id="269" r:id="rId8"/>
-    <p:sldId id="270" r:id="rId9"/>
-    <p:sldId id="272" r:id="rId10"/>
-    <p:sldId id="271" r:id="rId11"/>
-    <p:sldId id="261" r:id="rId12"/>
-    <p:sldId id="262" r:id="rId13"/>
-    <p:sldId id="260" r:id="rId14"/>
-    <p:sldId id="258" r:id="rId15"/>
-    <p:sldId id="259" r:id="rId16"/>
+    <p:sldId id="273" r:id="rId3"/>
+    <p:sldId id="264" r:id="rId4"/>
+    <p:sldId id="265" r:id="rId5"/>
+    <p:sldId id="267" r:id="rId6"/>
+    <p:sldId id="266" r:id="rId7"/>
+    <p:sldId id="268" r:id="rId8"/>
+    <p:sldId id="269" r:id="rId9"/>
+    <p:sldId id="270" r:id="rId10"/>
+    <p:sldId id="272" r:id="rId11"/>
+    <p:sldId id="271" r:id="rId12"/>
+    <p:sldId id="261" r:id="rId13"/>
+    <p:sldId id="262" r:id="rId14"/>
+    <p:sldId id="260" r:id="rId15"/>
+    <p:sldId id="258" r:id="rId16"/>
+    <p:sldId id="259" r:id="rId17"/>
   </p:sldIdLst>
   <p:sldSz cx="9144000" cy="6858000" type="screen4x3"/>
   <p:notesSz cx="6858000" cy="9144000"/>
@@ -520,37 +521,73 @@
           <a:p>
             <a:r>
               <a:rPr lang="ru-RU" dirty="0" smtClean="0"/>
-              <a:t>!Пересечение</a:t>
+              <a:t>Существует</a:t>
             </a:r>
             <a:r>
               <a:rPr lang="ru-RU" baseline="0" dirty="0" smtClean="0"/>
-              <a:t> Возможного поведения программы с неправильным должно быть пусто</a:t>
-            </a:r>
-          </a:p>
-          <a:p>
-            <a:r>
-              <a:rPr lang="ru-RU" dirty="0" smtClean="0"/>
-              <a:t>Инженерный язык программирования</a:t>
+              <a:t> масса подходов к построению и разработке ПО, поэтому </a:t>
+            </a:r>
+            <a:r>
+              <a:rPr lang="ru-RU" baseline="0" dirty="0" err="1" smtClean="0"/>
+              <a:t>опищем</a:t>
             </a:r>
             <a:r>
               <a:rPr lang="ru-RU" baseline="0" dirty="0" smtClean="0"/>
-              <a:t> может ограничивать возможности пользователя писать неправильные программы. У языка описания моделей другие задачи.</a:t>
+              <a:t> лишь общие этапы, не вдаваясь в подробности</a:t>
             </a:r>
           </a:p>
           <a:p>
             <a:r>
               <a:rPr lang="ru-RU" baseline="0" dirty="0" smtClean="0"/>
-              <a:t>Язык описания моделей должен позволять пользователю написать любую программу, которую он захочет, поскольку в исходной системе могут быть </a:t>
+              <a:t>Анализ – включает в себя анализ предметной области, требования к пользователю и завершается разработкой спецификации ПО</a:t>
+            </a:r>
+          </a:p>
+          <a:p>
+            <a:r>
+              <a:rPr lang="ru-RU" baseline="0" dirty="0" smtClean="0"/>
+              <a:t>Проектирование – разрабатываем архитектуру программного средства и </a:t>
             </a:r>
             <a:r>
               <a:rPr lang="ru-RU" baseline="0" dirty="0" err="1" smtClean="0"/>
-              <a:t>произ</a:t>
+              <a:t>ее</a:t>
             </a:r>
             <a:r>
               <a:rPr lang="ru-RU" baseline="0" dirty="0" smtClean="0"/>
-              <a:t> ошибки. Главное что для любой программы написанной на языке описания моделей верификация должна быть разрешена.</a:t>
-            </a:r>
-            <a:endParaRPr lang="ru-RU" dirty="0"/>
+              <a:t> детализация</a:t>
+            </a:r>
+          </a:p>
+          <a:p>
+            <a:r>
+              <a:rPr lang="ru-RU" baseline="0" dirty="0" smtClean="0"/>
+              <a:t>Реализация – кодирование</a:t>
+            </a:r>
+          </a:p>
+          <a:p>
+            <a:r>
+              <a:rPr lang="ru-RU" baseline="0" dirty="0" smtClean="0"/>
+              <a:t>Тестирование – компонентное и системное</a:t>
+            </a:r>
+          </a:p>
+          <a:p>
+            <a:r>
+              <a:rPr lang="ru-RU" baseline="0" dirty="0" smtClean="0"/>
+              <a:t>Эксплуатация – внедрение, использование и поддержка программы</a:t>
+            </a:r>
+          </a:p>
+          <a:p>
+            <a:r>
+              <a:rPr lang="ru-RU" baseline="0" dirty="0" err="1" smtClean="0"/>
+              <a:t>Ощибки</a:t>
+            </a:r>
+            <a:r>
+              <a:rPr lang="ru-RU" baseline="0" dirty="0" smtClean="0"/>
+              <a:t> могут появится на любом </a:t>
+            </a:r>
+            <a:r>
+              <a:rPr lang="ru-RU" baseline="0" smtClean="0"/>
+              <a:t>из этапов</a:t>
+            </a:r>
+            <a:endParaRPr lang="ru-RU"/>
           </a:p>
         </p:txBody>
       </p:sp>
@@ -571,7 +608,7 @@
           <a:p>
             <a:fld id="{D2C5C3F3-C17D-45D2-AA34-92C6E86E38D2}" type="slidenum">
               <a:rPr lang="ru-RU" smtClean="0"/>
-              <a:t>5</a:t>
+              <a:t>2</a:t>
             </a:fld>
             <a:endParaRPr lang="ru-RU"/>
           </a:p>
@@ -580,7 +617,7 @@
     </p:spTree>
     <p:extLst>
       <p:ext uri="{BB962C8B-B14F-4D97-AF65-F5344CB8AC3E}">
-        <p14:creationId xmlns:p14="http://schemas.microsoft.com/office/powerpoint/2010/main" val="2273666312"/>
+        <p14:creationId xmlns:p14="http://schemas.microsoft.com/office/powerpoint/2010/main" val="3953832954"/>
       </p:ext>
     </p:extLst>
   </p:cSld>
@@ -634,47 +671,37 @@
           <a:bodyPr/>
           <a:lstStyle/>
           <a:p>
-            <a:pPr marL="228600" indent="-228600">
-              <a:buAutoNum type="arabicPeriod"/>
-            </a:pPr>
-            <a:r>
-              <a:rPr lang="ru-RU" dirty="0" err="1" smtClean="0"/>
-              <a:t>Задаем</a:t>
+            <a:r>
+              <a:rPr lang="ru-RU" dirty="0" smtClean="0"/>
+              <a:t>!Пересечение</a:t>
             </a:r>
             <a:r>
               <a:rPr lang="ru-RU" baseline="0" dirty="0" smtClean="0"/>
-              <a:t> как система устроена и как она должна быть устроена</a:t>
-            </a:r>
-          </a:p>
-          <a:p>
-            <a:pPr marL="228600" indent="-228600">
-              <a:buAutoNum type="arabicPeriod"/>
-            </a:pPr>
+              <a:t> Возможного поведения программы с неправильным должно быть пусто</a:t>
+            </a:r>
+          </a:p>
+          <a:p>
+            <a:r>
+              <a:rPr lang="ru-RU" dirty="0" smtClean="0"/>
+              <a:t>Инженерный язык программирования</a:t>
+            </a:r>
+            <a:r>
+              <a:rPr lang="ru-RU" baseline="0" dirty="0" smtClean="0"/>
+              <a:t> может ограничивать возможности пользователя писать неправильные программы. У языка описания моделей другие задачи.</a:t>
+            </a:r>
+          </a:p>
+          <a:p>
+            <a:r>
+              <a:rPr lang="ru-RU" baseline="0" dirty="0" smtClean="0"/>
+              <a:t>Язык описания моделей должен позволять пользователю написать любую программу, которую он захочет, поскольку в исходной системе могут быть </a:t>
+            </a:r>
             <a:r>
               <a:rPr lang="ru-RU" baseline="0" dirty="0" err="1" smtClean="0"/>
-              <a:t>Т.о</a:t>
+              <a:t>произ</a:t>
             </a:r>
             <a:r>
               <a:rPr lang="ru-RU" baseline="0" dirty="0" smtClean="0"/>
-              <a:t>. Две нотации: описание поведения(устройство системы), описание требований (свойства правильности)</a:t>
-            </a:r>
-          </a:p>
-          <a:p>
-            <a:pPr marL="228600" indent="-228600">
-              <a:buAutoNum type="arabicPeriod"/>
-            </a:pPr>
-            <a:r>
-              <a:rPr lang="ru-RU" baseline="0" dirty="0" smtClean="0"/>
-              <a:t>Программа-верификатор проверяет, что устройство системы удовлетворяет свойствам правильности</a:t>
-            </a:r>
-          </a:p>
-          <a:p>
-            <a:pPr marL="228600" indent="-228600">
-              <a:buAutoNum type="arabicPeriod"/>
-            </a:pPr>
-            <a:r>
-              <a:rPr lang="ru-RU" baseline="0" dirty="0" smtClean="0"/>
-              <a:t>Выбранная нотация гарантирует разрешимость проверки любого свойства любой модели</a:t>
+              <a:t> ошибки. Главное что для любой программы написанной на языке описания моделей верификация должна быть разрешена.</a:t>
             </a:r>
             <a:endParaRPr lang="ru-RU" dirty="0"/>
           </a:p>
@@ -706,7 +733,7 @@
     </p:spTree>
     <p:extLst>
       <p:ext uri="{BB962C8B-B14F-4D97-AF65-F5344CB8AC3E}">
-        <p14:creationId xmlns:p14="http://schemas.microsoft.com/office/powerpoint/2010/main" val="179302113"/>
+        <p14:creationId xmlns:p14="http://schemas.microsoft.com/office/powerpoint/2010/main" val="2273666312"/>
       </p:ext>
     </p:extLst>
   </p:cSld>
@@ -760,59 +787,47 @@
           <a:bodyPr/>
           <a:lstStyle/>
           <a:p>
-            <a:pPr marL="171450" indent="-171450">
-              <a:buFont typeface="Arial" pitchFamily="34" charset="0"/>
-              <a:buChar char="•"/>
+            <a:pPr marL="228600" indent="-228600">
+              <a:buAutoNum type="arabicPeriod"/>
             </a:pPr>
             <a:r>
-              <a:rPr lang="ru-RU" dirty="0" smtClean="0"/>
-              <a:t>На</a:t>
+              <a:rPr lang="ru-RU" dirty="0" err="1" smtClean="0"/>
+              <a:t>Задаем</a:t>
             </a:r>
             <a:r>
               <a:rPr lang="ru-RU" baseline="0" dirty="0" smtClean="0"/>
-              <a:t> языке можем описывать недетерминизм. То есть его удобно использовать для абстракции от несущественных деталей. Охраняемые команды означают реализацию недетерминизма. Это значит что с каждой командой языка связано понятие выполнимости и если в </a:t>
-            </a:r>
+              <a:t> как система устроена и как она должна быть устроена</a:t>
+            </a:r>
+          </a:p>
+          <a:p>
+            <a:pPr marL="228600" indent="-228600">
+              <a:buAutoNum type="arabicPeriod"/>
+            </a:pPr>
             <a:r>
               <a:rPr lang="ru-RU" baseline="0" dirty="0" err="1" smtClean="0"/>
-              <a:t>определенном</a:t>
+              <a:t>Т.о</a:t>
             </a:r>
             <a:r>
               <a:rPr lang="ru-RU" baseline="0" dirty="0" smtClean="0"/>
-              <a:t> блоке модели присутствует несколько команд, выполнимых одновременно, то может быть выполнена любая из них.</a:t>
-            </a:r>
-          </a:p>
-          <a:p>
-            <a:pPr marL="171450" indent="-171450">
-              <a:buFont typeface="Arial" pitchFamily="34" charset="0"/>
-              <a:buChar char="•"/>
+              <a:t>. Две нотации: описание поведения(устройство системы), описание требований (свойства правильности)</a:t>
+            </a:r>
+          </a:p>
+          <a:p>
+            <a:pPr marL="228600" indent="-228600">
+              <a:buAutoNum type="arabicPeriod"/>
             </a:pPr>
             <a:r>
               <a:rPr lang="ru-RU" baseline="0" dirty="0" smtClean="0"/>
-              <a:t>Поскольку способ верификации </a:t>
-            </a:r>
-            <a:r>
-              <a:rPr lang="en-US" baseline="0" dirty="0" smtClean="0"/>
-              <a:t>model checking </a:t>
-            </a:r>
+              <a:t>Программа-верификатор проверяет, что устройство системы удовлетворяет свойствам правильности</a:t>
+            </a:r>
+          </a:p>
+          <a:p>
+            <a:pPr marL="228600" indent="-228600">
+              <a:buAutoNum type="arabicPeriod"/>
+            </a:pPr>
             <a:r>
               <a:rPr lang="ru-RU" baseline="0" dirty="0" smtClean="0"/>
-              <a:t>сказанное означает, что у любой модели описанной с помощью языка </a:t>
-            </a:r>
-            <a:r>
-              <a:rPr lang="en-US" baseline="0" dirty="0" err="1" smtClean="0"/>
-              <a:t>Promela</a:t>
-            </a:r>
-            <a:r>
-              <a:rPr lang="ru-RU" baseline="0" dirty="0" smtClean="0"/>
-              <a:t> конечное число состояний. За </a:t>
-            </a:r>
-            <a:r>
-              <a:rPr lang="ru-RU" baseline="0" dirty="0" err="1" smtClean="0"/>
-              <a:t>счет</a:t>
-            </a:r>
-            <a:r>
-              <a:rPr lang="ru-RU" baseline="0" dirty="0" smtClean="0"/>
-              <a:t> чего это достигается мы увидим дальше.</a:t>
+              <a:t>Выбранная нотация гарантирует разрешимость проверки любого свойства любой модели</a:t>
             </a:r>
             <a:endParaRPr lang="ru-RU" dirty="0"/>
           </a:p>
@@ -835,7 +850,7 @@
           <a:p>
             <a:fld id="{D2C5C3F3-C17D-45D2-AA34-92C6E86E38D2}" type="slidenum">
               <a:rPr lang="ru-RU" smtClean="0"/>
-              <a:t>8</a:t>
+              <a:t>7</a:t>
             </a:fld>
             <a:endParaRPr lang="ru-RU"/>
           </a:p>
@@ -844,7 +859,7 @@
     </p:spTree>
     <p:extLst>
       <p:ext uri="{BB962C8B-B14F-4D97-AF65-F5344CB8AC3E}">
-        <p14:creationId xmlns:p14="http://schemas.microsoft.com/office/powerpoint/2010/main" val="3247691620"/>
+        <p14:creationId xmlns:p14="http://schemas.microsoft.com/office/powerpoint/2010/main" val="179302113"/>
       </p:ext>
     </p:extLst>
   </p:cSld>
@@ -898,33 +913,59 @@
           <a:bodyPr/>
           <a:lstStyle/>
           <a:p>
-            <a:r>
-              <a:rPr lang="ru-RU" dirty="0" err="1" smtClean="0"/>
+            <a:pPr marL="171450" indent="-171450">
+              <a:buFont typeface="Arial" pitchFamily="34" charset="0"/>
+              <a:buChar char="•"/>
+            </a:pPr>
+            <a:r>
+              <a:rPr lang="ru-RU" dirty="0" smtClean="0"/>
+              <a:t>На</a:t>
+            </a:r>
+            <a:r>
+              <a:rPr lang="ru-RU" baseline="0" dirty="0" smtClean="0"/>
+              <a:t> языке можем описывать недетерминизм. То есть его удобно использовать для абстракции от несущественных деталей. Охраняемые команды означают реализацию недетерминизма. Это значит что с каждой командой языка связано понятие выполнимости и если в </a:t>
+            </a:r>
+            <a:r>
+              <a:rPr lang="ru-RU" baseline="0" dirty="0" err="1" smtClean="0"/>
+              <a:t>определенном</a:t>
+            </a:r>
+            <a:r>
+              <a:rPr lang="ru-RU" baseline="0" dirty="0" smtClean="0"/>
+              <a:t> блоке модели присутствует несколько команд, выполнимых одновременно, то может быть выполнена любая из них.</a:t>
+            </a:r>
+          </a:p>
+          <a:p>
+            <a:pPr marL="171450" indent="-171450">
+              <a:buFont typeface="Arial" pitchFamily="34" charset="0"/>
+              <a:buChar char="•"/>
+            </a:pPr>
+            <a:r>
+              <a:rPr lang="ru-RU" baseline="0" dirty="0" smtClean="0"/>
+              <a:t>Поскольку способ верификации </a:t>
+            </a:r>
+            <a:r>
+              <a:rPr lang="en-US" baseline="0" dirty="0" smtClean="0"/>
+              <a:t>model checking </a:t>
+            </a:r>
+            <a:r>
+              <a:rPr lang="ru-RU" baseline="0" dirty="0" smtClean="0"/>
+              <a:t>сказанное означает, что у любой модели описанной с помощью языка </a:t>
+            </a:r>
+            <a:r>
+              <a:rPr lang="en-US" baseline="0" dirty="0" err="1" smtClean="0"/>
               <a:t>Promela</a:t>
             </a:r>
             <a:r>
-              <a:rPr lang="ru-RU" dirty="0" smtClean="0"/>
-              <a:t> включает примитивы для создания процессов и описания </a:t>
-            </a:r>
-            <a:r>
-              <a:rPr lang="ru-RU" dirty="0" err="1" smtClean="0"/>
-              <a:t>межпроцессного</a:t>
-            </a:r>
-            <a:r>
-              <a:rPr lang="ru-RU" dirty="0" smtClean="0"/>
-              <a:t> взаимодействия</a:t>
-            </a:r>
-          </a:p>
-          <a:p>
-            <a:r>
-              <a:rPr lang="ru-RU" dirty="0" smtClean="0"/>
-              <a:t> НО! в нем отсутствует ряд средств, которые есть в языках программирования высокого уровня </a:t>
-            </a:r>
-          </a:p>
-          <a:p>
-            <a:r>
-              <a:rPr lang="ru-RU" dirty="0" smtClean="0"/>
-              <a:t> Например, указатели на данные и функции, не включено понятие времени или часов, отсутствуют операции с плавающей точкой и пр.</a:t>
+              <a:rPr lang="ru-RU" baseline="0" dirty="0" smtClean="0"/>
+              <a:t> конечное число состояний. За </a:t>
+            </a:r>
+            <a:r>
+              <a:rPr lang="ru-RU" baseline="0" dirty="0" err="1" smtClean="0"/>
+              <a:t>счет</a:t>
+            </a:r>
+            <a:r>
+              <a:rPr lang="ru-RU" baseline="0" dirty="0" smtClean="0"/>
+              <a:t> чего это достигается мы увидим дальше.</a:t>
             </a:r>
             <a:endParaRPr lang="ru-RU" dirty="0"/>
           </a:p>
@@ -956,7 +997,7 @@
     </p:spTree>
     <p:extLst>
       <p:ext uri="{BB962C8B-B14F-4D97-AF65-F5344CB8AC3E}">
-        <p14:creationId xmlns:p14="http://schemas.microsoft.com/office/powerpoint/2010/main" val="1589152162"/>
+        <p14:creationId xmlns:p14="http://schemas.microsoft.com/office/powerpoint/2010/main" val="3247691620"/>
       </p:ext>
     </p:extLst>
   </p:cSld>
@@ -1011,6 +1052,118 @@
           <a:lstStyle/>
           <a:p>
             <a:r>
+              <a:rPr lang="ru-RU" dirty="0" err="1" smtClean="0"/>
+              <a:t>Promela</a:t>
+            </a:r>
+            <a:r>
+              <a:rPr lang="ru-RU" dirty="0" smtClean="0"/>
+              <a:t> включает примитивы для создания процессов и описания </a:t>
+            </a:r>
+            <a:r>
+              <a:rPr lang="ru-RU" dirty="0" err="1" smtClean="0"/>
+              <a:t>межпроцессного</a:t>
+            </a:r>
+            <a:r>
+              <a:rPr lang="ru-RU" dirty="0" smtClean="0"/>
+              <a:t> взаимодействия</a:t>
+            </a:r>
+          </a:p>
+          <a:p>
+            <a:r>
+              <a:rPr lang="ru-RU" dirty="0" smtClean="0"/>
+              <a:t> НО! в нем отсутствует ряд средств, которые есть в языках программирования высокого уровня </a:t>
+            </a:r>
+          </a:p>
+          <a:p>
+            <a:r>
+              <a:rPr lang="ru-RU" dirty="0" smtClean="0"/>
+              <a:t> Например, указатели на данные и функции, не включено понятие времени или часов, отсутствуют операции с плавающей точкой и пр.</a:t>
+            </a:r>
+            <a:endParaRPr lang="ru-RU" dirty="0"/>
+          </a:p>
+        </p:txBody>
+      </p:sp>
+      <p:sp>
+        <p:nvSpPr>
+          <p:cNvPr id="4" name="Номер слайда 3"/>
+          <p:cNvSpPr>
+            <a:spLocks noGrp="1"/>
+          </p:cNvSpPr>
+          <p:nvPr>
+            <p:ph type="sldNum" sz="quarter" idx="10"/>
+          </p:nvPr>
+        </p:nvSpPr>
+        <p:spPr/>
+        <p:txBody>
+          <a:bodyPr/>
+          <a:lstStyle/>
+          <a:p>
+            <a:fld id="{D2C5C3F3-C17D-45D2-AA34-92C6E86E38D2}" type="slidenum">
+              <a:rPr lang="ru-RU" smtClean="0"/>
+              <a:t>10</a:t>
+            </a:fld>
+            <a:endParaRPr lang="ru-RU"/>
+          </a:p>
+        </p:txBody>
+      </p:sp>
+    </p:spTree>
+    <p:extLst>
+      <p:ext uri="{BB962C8B-B14F-4D97-AF65-F5344CB8AC3E}">
+        <p14:creationId xmlns:p14="http://schemas.microsoft.com/office/powerpoint/2010/main" val="1589152162"/>
+      </p:ext>
+    </p:extLst>
+  </p:cSld>
+  <p:clrMapOvr>
+    <a:masterClrMapping/>
+  </p:clrMapOvr>
+</p:notes>
+</file>
+
+<file path=ppt/notesSlides/notesSlide6.xml><?xml version="1.0" encoding="utf-8"?>
+<p:notes xmlns:a="http://schemas.openxmlformats.org/drawingml/2006/main" xmlns:r="http://schemas.openxmlformats.org/officeDocument/2006/relationships" xmlns:p="http://schemas.openxmlformats.org/presentationml/2006/main">
+  <p:cSld>
+    <p:spTree>
+      <p:nvGrpSpPr>
+        <p:cNvPr id="1" name=""/>
+        <p:cNvGrpSpPr/>
+        <p:nvPr/>
+      </p:nvGrpSpPr>
+      <p:grpSpPr>
+        <a:xfrm>
+          <a:off x="0" y="0"/>
+          <a:ext cx="0" cy="0"/>
+          <a:chOff x="0" y="0"/>
+          <a:chExt cx="0" cy="0"/>
+        </a:xfrm>
+      </p:grpSpPr>
+      <p:sp>
+        <p:nvSpPr>
+          <p:cNvPr id="2" name="Образ слайда 1"/>
+          <p:cNvSpPr>
+            <a:spLocks noGrp="1" noRot="1" noChangeAspect="1"/>
+          </p:cNvSpPr>
+          <p:nvPr>
+            <p:ph type="sldImg"/>
+          </p:nvPr>
+        </p:nvSpPr>
+        <p:spPr/>
+      </p:sp>
+      <p:sp>
+        <p:nvSpPr>
+          <p:cNvPr id="3" name="Заметки 2"/>
+          <p:cNvSpPr>
+            <a:spLocks noGrp="1"/>
+          </p:cNvSpPr>
+          <p:nvPr>
+            <p:ph type="body" idx="1"/>
+          </p:nvPr>
+        </p:nvSpPr>
+        <p:spPr/>
+        <p:txBody>
+          <a:bodyPr/>
+          <a:lstStyle/>
+          <a:p>
+            <a:r>
               <a:rPr lang="ru-RU" dirty="0" smtClean="0"/>
               <a:t>Диаграмма классов всей системы</a:t>
             </a:r>
@@ -1035,7 +1188,7 @@
           <a:p>
             <a:fld id="{D2C5C3F3-C17D-45D2-AA34-92C6E86E38D2}" type="slidenum">
               <a:rPr lang="ru-RU" smtClean="0"/>
-              <a:t>12</a:t>
+              <a:t>13</a:t>
             </a:fld>
             <a:endParaRPr lang="ru-RU"/>
           </a:p>
@@ -4547,6 +4700,213 @@
         </p:nvSpPr>
         <p:spPr>
           <a:xfrm>
+            <a:off x="457200" y="28600"/>
+            <a:ext cx="8229600" cy="1600200"/>
+          </a:xfrm>
+        </p:spPr>
+        <p:txBody>
+          <a:bodyPr/>
+          <a:lstStyle/>
+          <a:p>
+            <a:pPr marL="0" indent="0"/>
+            <a:r>
+              <a:rPr lang="ru-RU" dirty="0"/>
+              <a:t>Модель на языке </a:t>
+            </a:r>
+            <a:r>
+              <a:rPr lang="en-US" dirty="0" err="1" smtClean="0"/>
+              <a:t>Promela</a:t>
+            </a:r>
+            <a:endParaRPr lang="en-US" dirty="0"/>
+          </a:p>
+        </p:txBody>
+      </p:sp>
+      <p:sp>
+        <p:nvSpPr>
+          <p:cNvPr id="5" name="Объект 4"/>
+          <p:cNvSpPr>
+            <a:spLocks noGrp="1"/>
+          </p:cNvSpPr>
+          <p:nvPr>
+            <p:ph sz="quarter" idx="13"/>
+          </p:nvPr>
+        </p:nvSpPr>
+        <p:spPr>
+          <a:xfrm>
+            <a:off x="179512" y="1556792"/>
+            <a:ext cx="8784976" cy="4896544"/>
+          </a:xfrm>
+        </p:spPr>
+        <p:txBody>
+          <a:bodyPr>
+            <a:normAutofit/>
+          </a:bodyPr>
+          <a:lstStyle/>
+          <a:p>
+            <a:r>
+              <a:rPr lang="ru-RU" sz="2800" dirty="0" smtClean="0"/>
+              <a:t>абстракция </a:t>
+            </a:r>
+            <a:r>
+              <a:rPr lang="ru-RU" sz="2800" dirty="0"/>
+              <a:t>реальной системы, </a:t>
+            </a:r>
+            <a:r>
+              <a:rPr lang="ru-RU" sz="2800" dirty="0" smtClean="0"/>
+              <a:t>содержащая </a:t>
+            </a:r>
+            <a:r>
+              <a:rPr lang="ru-RU" sz="2800" dirty="0"/>
+              <a:t>характеристики, которые </a:t>
+            </a:r>
+            <a:r>
+              <a:rPr lang="ru-RU" sz="2800" dirty="0" smtClean="0"/>
+              <a:t>значимы </a:t>
+            </a:r>
+            <a:r>
+              <a:rPr lang="ru-RU" sz="2800" dirty="0"/>
+              <a:t>для описания взаимодействия процессов</a:t>
+            </a:r>
+          </a:p>
+          <a:p>
+            <a:r>
+              <a:rPr lang="ru-RU" sz="2800" dirty="0" smtClean="0"/>
+              <a:t>не </a:t>
+            </a:r>
+            <a:r>
+              <a:rPr lang="ru-RU" sz="2800" dirty="0"/>
+              <a:t>является программной реализацией системы</a:t>
+            </a:r>
+          </a:p>
+          <a:p>
+            <a:r>
+              <a:rPr lang="ru-RU" sz="2800" dirty="0" smtClean="0"/>
+              <a:t>может </a:t>
+            </a:r>
+            <a:r>
+              <a:rPr lang="ru-RU" sz="2800" dirty="0"/>
+              <a:t>содержать части, которые важны только для </a:t>
+            </a:r>
+            <a:r>
+              <a:rPr lang="ru-RU" sz="2800" dirty="0" smtClean="0"/>
+              <a:t>верификации </a:t>
+            </a:r>
+            <a:r>
+              <a:rPr lang="ru-RU" sz="2800" dirty="0"/>
+              <a:t>протоколов</a:t>
+            </a:r>
+            <a:endParaRPr lang="en-US" sz="2800" dirty="0"/>
+          </a:p>
+        </p:txBody>
+      </p:sp>
+      <p:sp>
+        <p:nvSpPr>
+          <p:cNvPr id="9" name="Text Box 5"/>
+          <p:cNvSpPr txBox="1">
+            <a:spLocks noChangeArrowheads="1"/>
+          </p:cNvSpPr>
+          <p:nvPr/>
+        </p:nvSpPr>
+        <p:spPr bwMode="auto">
+          <a:xfrm>
+            <a:off x="773262" y="6453336"/>
+            <a:ext cx="5886970" cy="190052"/>
+          </a:xfrm>
+          <a:prstGeom prst="rect">
+            <a:avLst/>
+          </a:prstGeom>
+          <a:noFill/>
+          <a:ln w="9525">
+            <a:noFill/>
+            <a:miter lim="800000"/>
+            <a:headEnd/>
+            <a:tailEnd/>
+          </a:ln>
+        </p:spPr>
+        <p:txBody>
+          <a:bodyPr wrap="square" lIns="0" tIns="0" rIns="0" bIns="0" anchor="b">
+            <a:spAutoFit/>
+          </a:bodyPr>
+          <a:lstStyle/>
+          <a:p>
+            <a:pPr>
+              <a:lnSpc>
+                <a:spcPct val="95000"/>
+              </a:lnSpc>
+            </a:pPr>
+            <a:r>
+              <a:rPr lang="ru-RU" sz="1300" dirty="0">
+                <a:solidFill>
+                  <a:srgbClr val="045C75"/>
+                </a:solidFill>
+              </a:rPr>
+              <a:t>АлтГТУ им. И. И. </a:t>
+            </a:r>
+            <a:r>
+              <a:rPr lang="ru-RU" sz="1300" dirty="0" smtClean="0">
+                <a:solidFill>
+                  <a:srgbClr val="045C75"/>
+                </a:solidFill>
+              </a:rPr>
+              <a:t>Ползунова / ПОВТ, Юлия Шатилина</a:t>
+            </a:r>
+            <a:endParaRPr lang="en-US" sz="1300" dirty="0">
+              <a:solidFill>
+                <a:srgbClr val="045C75"/>
+              </a:solidFill>
+            </a:endParaRPr>
+          </a:p>
+        </p:txBody>
+      </p:sp>
+    </p:spTree>
+    <p:extLst>
+      <p:ext uri="{BB962C8B-B14F-4D97-AF65-F5344CB8AC3E}">
+        <p14:creationId xmlns:p14="http://schemas.microsoft.com/office/powerpoint/2010/main" val="342838871"/>
+      </p:ext>
+    </p:extLst>
+  </p:cSld>
+  <p:clrMapOvr>
+    <a:masterClrMapping/>
+  </p:clrMapOvr>
+  <p:timing>
+    <p:tnLst>
+      <p:par>
+        <p:cTn id="1" dur="indefinite" restart="never" nodeType="tmRoot"/>
+      </p:par>
+    </p:tnLst>
+  </p:timing>
+</p:sld>
+</file>
+
+<file path=ppt/slides/slide11.xml><?xml version="1.0" encoding="utf-8"?>
+<p:sld xmlns:a="http://schemas.openxmlformats.org/drawingml/2006/main" xmlns:r="http://schemas.openxmlformats.org/officeDocument/2006/relationships" xmlns:p="http://schemas.openxmlformats.org/presentationml/2006/main">
+  <p:cSld>
+    <p:spTree>
+      <p:nvGrpSpPr>
+        <p:cNvPr id="1" name=""/>
+        <p:cNvGrpSpPr/>
+        <p:nvPr/>
+      </p:nvGrpSpPr>
+      <p:grpSpPr>
+        <a:xfrm>
+          <a:off x="0" y="0"/>
+          <a:ext cx="0" cy="0"/>
+          <a:chOff x="0" y="0"/>
+          <a:chExt cx="0" cy="0"/>
+        </a:xfrm>
+      </p:grpSpPr>
+      <p:sp>
+        <p:nvSpPr>
+          <p:cNvPr id="2" name="Заголовок 1"/>
+          <p:cNvSpPr>
+            <a:spLocks noGrp="1"/>
+          </p:cNvSpPr>
+          <p:nvPr>
+            <p:ph type="title"/>
+          </p:nvPr>
+        </p:nvSpPr>
+        <p:spPr>
+          <a:xfrm>
             <a:off x="0" y="-27384"/>
             <a:ext cx="9144000" cy="1600200"/>
           </a:xfrm>
@@ -4766,7 +5126,7 @@
 </p:sld>
 </file>
 
-<file path=ppt/slides/slide11.xml><?xml version="1.0" encoding="utf-8"?>
+<file path=ppt/slides/slide12.xml><?xml version="1.0" encoding="utf-8"?>
 <p:sld xmlns:a="http://schemas.openxmlformats.org/drawingml/2006/main" xmlns:r="http://schemas.openxmlformats.org/officeDocument/2006/relationships" xmlns:p="http://schemas.openxmlformats.org/presentationml/2006/main">
   <p:cSld>
     <p:spTree>
@@ -4919,7 +5279,7 @@
 </p:sld>
 </file>
 
-<file path=ppt/slides/slide12.xml><?xml version="1.0" encoding="utf-8"?>
+<file path=ppt/slides/slide13.xml><?xml version="1.0" encoding="utf-8"?>
 <p:sld xmlns:a="http://schemas.openxmlformats.org/drawingml/2006/main" xmlns:r="http://schemas.openxmlformats.org/officeDocument/2006/relationships" xmlns:p="http://schemas.openxmlformats.org/presentationml/2006/main">
   <p:cSld>
     <p:spTree>
@@ -5073,7 +5433,7 @@
 </p:sld>
 </file>
 
-<file path=ppt/slides/slide13.xml><?xml version="1.0" encoding="utf-8"?>
+<file path=ppt/slides/slide14.xml><?xml version="1.0" encoding="utf-8"?>
 <p:sld xmlns:a="http://schemas.openxmlformats.org/drawingml/2006/main" xmlns:r="http://schemas.openxmlformats.org/officeDocument/2006/relationships" xmlns:p="http://schemas.openxmlformats.org/presentationml/2006/main">
   <p:cSld>
     <p:spTree>
@@ -5399,7 +5759,7 @@
 </p:sld>
 </file>
 
-<file path=ppt/slides/slide14.xml><?xml version="1.0" encoding="utf-8"?>
+<file path=ppt/slides/slide15.xml><?xml version="1.0" encoding="utf-8"?>
 <p:sld xmlns:a="http://schemas.openxmlformats.org/drawingml/2006/main" xmlns:r="http://schemas.openxmlformats.org/officeDocument/2006/relationships" xmlns:p="http://schemas.openxmlformats.org/presentationml/2006/main">
   <p:cSld>
     <p:spTree>
@@ -5635,7 +5995,7 @@
 </p:sld>
 </file>
 
-<file path=ppt/slides/slide15.xml><?xml version="1.0" encoding="utf-8"?>
+<file path=ppt/slides/slide16.xml><?xml version="1.0" encoding="utf-8"?>
 <p:sld xmlns:a="http://schemas.openxmlformats.org/drawingml/2006/main" xmlns:r="http://schemas.openxmlformats.org/officeDocument/2006/relationships" xmlns:p="http://schemas.openxmlformats.org/presentationml/2006/main">
   <p:cSld>
     <p:spTree>
@@ -5779,25 +6139,35 @@
           <a:chExt cx="0" cy="0"/>
         </a:xfrm>
       </p:grpSpPr>
-      <p:sp>
-        <p:nvSpPr>
-          <p:cNvPr id="3" name="Объект 2"/>
-          <p:cNvSpPr>
-            <a:spLocks noGrp="1"/>
-          </p:cNvSpPr>
+      <p:pic>
+        <p:nvPicPr>
+          <p:cNvPr id="2" name="Объект 1"/>
+          <p:cNvPicPr>
+            <a:picLocks noGrp="1" noChangeAspect="1"/>
+          </p:cNvPicPr>
           <p:nvPr>
             <p:ph idx="1"/>
           </p:nvPr>
-        </p:nvSpPr>
-        <p:spPr/>
-        <p:txBody>
-          <a:bodyPr/>
-          <a:lstStyle/>
-          <a:p>
-            <a:endParaRPr lang="ru-RU"/>
-          </a:p>
-        </p:txBody>
-      </p:sp>
+        </p:nvPicPr>
+        <p:blipFill>
+          <a:blip r:embed="rId3">
+            <a:extLst>
+              <a:ext uri="{28A0092B-C50C-407E-A947-70E740481C1C}">
+                <a14:useLocalDpi xmlns:a14="http://schemas.microsoft.com/office/drawing/2010/main" val="0"/>
+              </a:ext>
+            </a:extLst>
+          </a:blip>
+          <a:stretch>
+            <a:fillRect/>
+          </a:stretch>
+        </p:blipFill>
+        <p:spPr>
+          <a:xfrm>
+            <a:off x="336210" y="1068761"/>
+            <a:ext cx="8556270" cy="5240560"/>
+          </a:xfrm>
+        </p:spPr>
+      </p:pic>
       <p:sp>
         <p:nvSpPr>
           <p:cNvPr id="4" name="Text Box 5"/>
@@ -5906,16 +6276,17 @@
           </a:lstStyle>
           <a:p>
             <a:r>
-              <a:rPr lang="ru-RU" dirty="0"/>
-              <a:t>Базовая терминология</a:t>
-            </a:r>
+              <a:rPr lang="ru-RU" dirty="0" smtClean="0"/>
+              <a:t>Разработка ПО</a:t>
+            </a:r>
+            <a:endParaRPr lang="ru-RU" dirty="0"/>
           </a:p>
         </p:txBody>
       </p:sp>
     </p:spTree>
     <p:extLst>
       <p:ext uri="{BB962C8B-B14F-4D97-AF65-F5344CB8AC3E}">
-        <p14:creationId xmlns:p14="http://schemas.microsoft.com/office/powerpoint/2010/main" val="2430698498"/>
+        <p14:creationId xmlns:p14="http://schemas.microsoft.com/office/powerpoint/2010/main" val="244101009"/>
       </p:ext>
     </p:extLst>
   </p:cSld>
@@ -5951,34 +6322,6 @@
       </p:grpSpPr>
       <p:sp>
         <p:nvSpPr>
-          <p:cNvPr id="2" name="Заголовок 1"/>
-          <p:cNvSpPr>
-            <a:spLocks noGrp="1"/>
-          </p:cNvSpPr>
-          <p:nvPr>
-            <p:ph type="title"/>
-          </p:nvPr>
-        </p:nvSpPr>
-        <p:spPr>
-          <a:xfrm>
-            <a:off x="457200" y="-531440"/>
-            <a:ext cx="8229600" cy="1600200"/>
-          </a:xfrm>
-        </p:spPr>
-        <p:txBody>
-          <a:bodyPr/>
-          <a:lstStyle/>
-          <a:p>
-            <a:r>
-              <a:rPr lang="ru-RU" dirty="0" smtClean="0"/>
-              <a:t>Прототип архитектуры</a:t>
-            </a:r>
-            <a:endParaRPr lang="ru-RU" dirty="0"/>
-          </a:p>
-        </p:txBody>
-      </p:sp>
-      <p:sp>
-        <p:nvSpPr>
           <p:cNvPr id="3" name="Объект 2"/>
           <p:cNvSpPr>
             <a:spLocks noGrp="1"/>
@@ -6055,10 +6398,65 @@
           </a:p>
         </p:txBody>
       </p:sp>
+      <p:sp>
+        <p:nvSpPr>
+          <p:cNvPr id="5" name="Заголовок 1"/>
+          <p:cNvSpPr txBox="1">
+            <a:spLocks/>
+          </p:cNvSpPr>
+          <p:nvPr/>
+        </p:nvSpPr>
+        <p:spPr>
+          <a:xfrm>
+            <a:off x="457200" y="-531440"/>
+            <a:ext cx="8229600" cy="1600200"/>
+          </a:xfrm>
+          <a:prstGeom prst="rect">
+            <a:avLst/>
+          </a:prstGeom>
+        </p:spPr>
+        <p:txBody>
+          <a:bodyPr vert="horz" lIns="91440" tIns="45720" rIns="91440" bIns="45720" rtlCol="0" anchor="b">
+            <a:noAutofit/>
+          </a:bodyPr>
+          <a:lstStyle>
+            <a:lvl1pPr algn="ctr" defTabSz="914400" rtl="0" eaLnBrk="1" latinLnBrk="0" hangingPunct="1">
+              <a:lnSpc>
+                <a:spcPts val="5800"/>
+              </a:lnSpc>
+              <a:spcBef>
+                <a:spcPct val="0"/>
+              </a:spcBef>
+              <a:buNone/>
+              <a:defRPr sz="5400" kern="1200">
+                <a:solidFill>
+                  <a:schemeClr val="tx2"/>
+                </a:solidFill>
+                <a:effectLst>
+                  <a:outerShdw blurRad="63500" dist="38100" dir="5400000" algn="t" rotWithShape="0">
+                    <a:prstClr val="black">
+                      <a:alpha val="25000"/>
+                    </a:prstClr>
+                  </a:outerShdw>
+                </a:effectLst>
+                <a:latin typeface="+mn-lt"/>
+                <a:ea typeface="+mj-ea"/>
+                <a:cs typeface="+mj-cs"/>
+              </a:defRPr>
+            </a:lvl1pPr>
+          </a:lstStyle>
+          <a:p>
+            <a:r>
+              <a:rPr lang="ru-RU" dirty="0"/>
+              <a:t>Базовая терминология</a:t>
+            </a:r>
+          </a:p>
+        </p:txBody>
+      </p:sp>
     </p:spTree>
     <p:extLst>
       <p:ext uri="{BB962C8B-B14F-4D97-AF65-F5344CB8AC3E}">
-        <p14:creationId xmlns:p14="http://schemas.microsoft.com/office/powerpoint/2010/main" val="1515724298"/>
+        <p14:creationId xmlns:p14="http://schemas.microsoft.com/office/powerpoint/2010/main" val="2430698498"/>
       </p:ext>
     </p:extLst>
   </p:cSld>
@@ -6094,6 +6492,149 @@
       </p:grpSpPr>
       <p:sp>
         <p:nvSpPr>
+          <p:cNvPr id="2" name="Заголовок 1"/>
+          <p:cNvSpPr>
+            <a:spLocks noGrp="1"/>
+          </p:cNvSpPr>
+          <p:nvPr>
+            <p:ph type="title"/>
+          </p:nvPr>
+        </p:nvSpPr>
+        <p:spPr>
+          <a:xfrm>
+            <a:off x="457200" y="-531440"/>
+            <a:ext cx="8229600" cy="1600200"/>
+          </a:xfrm>
+        </p:spPr>
+        <p:txBody>
+          <a:bodyPr/>
+          <a:lstStyle/>
+          <a:p>
+            <a:r>
+              <a:rPr lang="ru-RU" dirty="0" smtClean="0"/>
+              <a:t>Прототип архитектуры</a:t>
+            </a:r>
+            <a:endParaRPr lang="ru-RU" dirty="0"/>
+          </a:p>
+        </p:txBody>
+      </p:sp>
+      <p:sp>
+        <p:nvSpPr>
+          <p:cNvPr id="3" name="Объект 2"/>
+          <p:cNvSpPr>
+            <a:spLocks noGrp="1"/>
+          </p:cNvSpPr>
+          <p:nvPr>
+            <p:ph idx="1"/>
+          </p:nvPr>
+        </p:nvSpPr>
+        <p:spPr/>
+        <p:txBody>
+          <a:bodyPr/>
+          <a:lstStyle/>
+          <a:p>
+            <a:endParaRPr lang="ru-RU"/>
+          </a:p>
+        </p:txBody>
+      </p:sp>
+      <p:sp>
+        <p:nvSpPr>
+          <p:cNvPr id="4" name="Text Box 5"/>
+          <p:cNvSpPr txBox="1">
+            <a:spLocks noChangeArrowheads="1"/>
+          </p:cNvSpPr>
+          <p:nvPr/>
+        </p:nvSpPr>
+        <p:spPr bwMode="auto">
+          <a:xfrm>
+            <a:off x="773262" y="6453336"/>
+            <a:ext cx="5886970" cy="190052"/>
+          </a:xfrm>
+          <a:prstGeom prst="rect">
+            <a:avLst/>
+          </a:prstGeom>
+          <a:noFill/>
+          <a:ln w="9525">
+            <a:noFill/>
+            <a:miter lim="800000"/>
+            <a:headEnd/>
+            <a:tailEnd/>
+          </a:ln>
+        </p:spPr>
+        <p:txBody>
+          <a:bodyPr wrap="square" lIns="0" tIns="0" rIns="0" bIns="0" anchor="b">
+            <a:spAutoFit/>
+          </a:bodyPr>
+          <a:lstStyle/>
+          <a:p>
+            <a:pPr>
+              <a:lnSpc>
+                <a:spcPct val="95000"/>
+              </a:lnSpc>
+            </a:pPr>
+            <a:r>
+              <a:rPr lang="ru-RU" sz="1300" dirty="0">
+                <a:solidFill>
+                  <a:srgbClr val="045C75"/>
+                </a:solidFill>
+              </a:rPr>
+              <a:t>АлтГТУ им. И. И. </a:t>
+            </a:r>
+            <a:r>
+              <a:rPr lang="ru-RU" sz="1300" dirty="0" smtClean="0">
+                <a:solidFill>
+                  <a:srgbClr val="045C75"/>
+                </a:solidFill>
+              </a:rPr>
+              <a:t>Ползунова / ПОВТ, Юлия Шатилина</a:t>
+            </a:r>
+            <a:endParaRPr lang="en-US" sz="1300" dirty="0">
+              <a:solidFill>
+                <a:srgbClr val="045C75"/>
+              </a:solidFill>
+            </a:endParaRPr>
+          </a:p>
+        </p:txBody>
+      </p:sp>
+    </p:spTree>
+    <p:extLst>
+      <p:ext uri="{BB962C8B-B14F-4D97-AF65-F5344CB8AC3E}">
+        <p14:creationId xmlns:p14="http://schemas.microsoft.com/office/powerpoint/2010/main" val="1515724298"/>
+      </p:ext>
+    </p:extLst>
+  </p:cSld>
+  <p:clrMapOvr>
+    <a:masterClrMapping/>
+  </p:clrMapOvr>
+  <p:timing>
+    <p:tnLst>
+      <p:par>
+        <p:cTn id="1" dur="indefinite" restart="never" nodeType="tmRoot"/>
+      </p:par>
+    </p:tnLst>
+  </p:timing>
+</p:sld>
+</file>
+
+<file path=ppt/slides/slide5.xml><?xml version="1.0" encoding="utf-8"?>
+<p:sld xmlns:a="http://schemas.openxmlformats.org/drawingml/2006/main" xmlns:r="http://schemas.openxmlformats.org/officeDocument/2006/relationships" xmlns:p="http://schemas.openxmlformats.org/presentationml/2006/main">
+  <p:cSld>
+    <p:spTree>
+      <p:nvGrpSpPr>
+        <p:cNvPr id="1" name=""/>
+        <p:cNvGrpSpPr/>
+        <p:nvPr/>
+      </p:nvGrpSpPr>
+      <p:grpSpPr>
+        <a:xfrm>
+          <a:off x="0" y="0"/>
+          <a:ext cx="0" cy="0"/>
+          <a:chOff x="0" y="0"/>
+          <a:chExt cx="0" cy="0"/>
+        </a:xfrm>
+      </p:grpSpPr>
+      <p:sp>
+        <p:nvSpPr>
           <p:cNvPr id="3" name="Объект 2"/>
           <p:cNvSpPr>
             <a:spLocks noGrp="1"/>
@@ -6336,7 +6877,7 @@
 </p:sld>
 </file>
 
-<file path=ppt/slides/slide5.xml><?xml version="1.0" encoding="utf-8"?>
+<file path=ppt/slides/slide6.xml><?xml version="1.0" encoding="utf-8"?>
 <p:sld xmlns:a="http://schemas.openxmlformats.org/drawingml/2006/main" xmlns:r="http://schemas.openxmlformats.org/officeDocument/2006/relationships" xmlns:p="http://schemas.openxmlformats.org/presentationml/2006/main">
   <p:cSld>
     <p:spTree>
@@ -6517,7 +7058,7 @@
 </p:sld>
 </file>
 
-<file path=ppt/slides/slide6.xml><?xml version="1.0" encoding="utf-8"?>
+<file path=ppt/slides/slide7.xml><?xml version="1.0" encoding="utf-8"?>
 <p:sld xmlns:a="http://schemas.openxmlformats.org/drawingml/2006/main" xmlns:r="http://schemas.openxmlformats.org/officeDocument/2006/relationships" xmlns:p="http://schemas.openxmlformats.org/presentationml/2006/main">
   <p:cSld>
     <p:spTree>
@@ -6718,271 +7259,6 @@
     <p:extLst>
       <p:ext uri="{BB962C8B-B14F-4D97-AF65-F5344CB8AC3E}">
         <p14:creationId xmlns:p14="http://schemas.microsoft.com/office/powerpoint/2010/main" val="1069108268"/>
-      </p:ext>
-    </p:extLst>
-  </p:cSld>
-  <p:clrMapOvr>
-    <a:masterClrMapping/>
-  </p:clrMapOvr>
-  <p:timing>
-    <p:tnLst>
-      <p:par>
-        <p:cTn id="1" dur="indefinite" restart="never" nodeType="tmRoot"/>
-      </p:par>
-    </p:tnLst>
-  </p:timing>
-</p:sld>
-</file>
-
-<file path=ppt/slides/slide7.xml><?xml version="1.0" encoding="utf-8"?>
-<p:sld xmlns:a="http://schemas.openxmlformats.org/drawingml/2006/main" xmlns:r="http://schemas.openxmlformats.org/officeDocument/2006/relationships" xmlns:p="http://schemas.openxmlformats.org/presentationml/2006/main">
-  <p:cSld>
-    <p:spTree>
-      <p:nvGrpSpPr>
-        <p:cNvPr id="1" name=""/>
-        <p:cNvGrpSpPr/>
-        <p:nvPr/>
-      </p:nvGrpSpPr>
-      <p:grpSpPr>
-        <a:xfrm>
-          <a:off x="0" y="0"/>
-          <a:ext cx="0" cy="0"/>
-          <a:chOff x="0" y="0"/>
-          <a:chExt cx="0" cy="0"/>
-        </a:xfrm>
-      </p:grpSpPr>
-      <p:sp>
-        <p:nvSpPr>
-          <p:cNvPr id="8" name="Заголовок 1"/>
-          <p:cNvSpPr txBox="1">
-            <a:spLocks/>
-          </p:cNvSpPr>
-          <p:nvPr/>
-        </p:nvSpPr>
-        <p:spPr>
-          <a:xfrm>
-            <a:off x="457200" y="-603448"/>
-            <a:ext cx="8229600" cy="1600200"/>
-          </a:xfrm>
-          <a:prstGeom prst="rect">
-            <a:avLst/>
-          </a:prstGeom>
-        </p:spPr>
-        <p:txBody>
-          <a:bodyPr vert="horz" lIns="91440" tIns="45720" rIns="91440" bIns="45720" rtlCol="0" anchor="b">
-            <a:noAutofit/>
-          </a:bodyPr>
-          <a:lstStyle>
-            <a:lvl1pPr algn="ctr" defTabSz="914400" rtl="0" eaLnBrk="1" latinLnBrk="0" hangingPunct="1">
-              <a:lnSpc>
-                <a:spcPts val="5800"/>
-              </a:lnSpc>
-              <a:spcBef>
-                <a:spcPct val="0"/>
-              </a:spcBef>
-              <a:buNone/>
-              <a:defRPr sz="5400" kern="1200">
-                <a:solidFill>
-                  <a:schemeClr val="tx2"/>
-                </a:solidFill>
-                <a:effectLst>
-                  <a:outerShdw blurRad="63500" dist="38100" dir="5400000" algn="t" rotWithShape="0">
-                    <a:prstClr val="black">
-                      <a:alpha val="25000"/>
-                    </a:prstClr>
-                  </a:outerShdw>
-                </a:effectLst>
-                <a:latin typeface="+mn-lt"/>
-                <a:ea typeface="+mj-ea"/>
-                <a:cs typeface="+mj-cs"/>
-              </a:defRPr>
-            </a:lvl1pPr>
-          </a:lstStyle>
-          <a:p>
-            <a:r>
-              <a:rPr lang="en-US" dirty="0" smtClean="0"/>
-              <a:t>SPIN</a:t>
-            </a:r>
-            <a:endParaRPr lang="ru-RU" dirty="0"/>
-          </a:p>
-        </p:txBody>
-      </p:sp>
-      <p:sp>
-        <p:nvSpPr>
-          <p:cNvPr id="11" name="Объект 10"/>
-          <p:cNvSpPr>
-            <a:spLocks noGrp="1"/>
-          </p:cNvSpPr>
-          <p:nvPr>
-            <p:ph sz="quarter" idx="13"/>
-          </p:nvPr>
-        </p:nvSpPr>
-        <p:spPr>
-          <a:xfrm>
-            <a:off x="179512" y="1340768"/>
-            <a:ext cx="4536504" cy="5040560"/>
-          </a:xfrm>
-        </p:spPr>
-        <p:txBody>
-          <a:bodyPr>
-            <a:normAutofit fontScale="92500" lnSpcReduction="20000"/>
-          </a:bodyPr>
-          <a:lstStyle/>
-          <a:p>
-            <a:pPr marL="0" indent="0">
-              <a:buNone/>
-            </a:pPr>
-            <a:r>
-              <a:rPr lang="ru-RU" sz="3600" b="1" dirty="0" err="1" smtClean="0"/>
-              <a:t>S</a:t>
-            </a:r>
-            <a:r>
-              <a:rPr lang="ru-RU" sz="3600" dirty="0" err="1" smtClean="0"/>
-              <a:t>imple</a:t>
-            </a:r>
-            <a:r>
-              <a:rPr lang="ru-RU" sz="3600" dirty="0" smtClean="0"/>
-              <a:t> </a:t>
-            </a:r>
-            <a:r>
-              <a:rPr lang="ru-RU" sz="3600" b="1" dirty="0" err="1"/>
-              <a:t>P</a:t>
-            </a:r>
-            <a:r>
-              <a:rPr lang="ru-RU" sz="3600" dirty="0" err="1"/>
-              <a:t>romela</a:t>
-            </a:r>
-            <a:r>
-              <a:rPr lang="ru-RU" sz="3600" dirty="0"/>
-              <a:t> </a:t>
-            </a:r>
-            <a:r>
-              <a:rPr lang="ru-RU" sz="3600" b="1" dirty="0" err="1" smtClean="0"/>
-              <a:t>In</a:t>
-            </a:r>
-            <a:r>
-              <a:rPr lang="ru-RU" sz="3600" dirty="0" err="1" smtClean="0"/>
-              <a:t>terpreter</a:t>
-            </a:r>
-            <a:endParaRPr lang="en-US" sz="3600" dirty="0"/>
-          </a:p>
-          <a:p>
-            <a:r>
-              <a:rPr lang="ru-RU" sz="3200" dirty="0" smtClean="0"/>
-              <a:t>средство моделирования и верификации </a:t>
-            </a:r>
-            <a:r>
-              <a:rPr lang="ru-RU" sz="3200" dirty="0"/>
-              <a:t>протоколов, параллельных программ и широкого класса дискретных систем</a:t>
-            </a:r>
-            <a:endParaRPr lang="en-US" sz="3200" dirty="0"/>
-          </a:p>
-          <a:p>
-            <a:r>
-              <a:rPr lang="ru-RU" sz="3200" dirty="0"/>
-              <a:t>язык описания моделей </a:t>
-            </a:r>
-            <a:r>
-              <a:rPr lang="ru-RU" sz="3200" dirty="0" err="1"/>
-              <a:t>Promela</a:t>
-            </a:r>
-            <a:endParaRPr lang="ru-RU" sz="3200" dirty="0"/>
-          </a:p>
-        </p:txBody>
-      </p:sp>
-      <p:pic>
-        <p:nvPicPr>
-          <p:cNvPr id="13" name="Рисунок 12"/>
-          <p:cNvPicPr>
-            <a:picLocks noChangeAspect="1"/>
-          </p:cNvPicPr>
-          <p:nvPr/>
-        </p:nvPicPr>
-        <p:blipFill>
-          <a:blip r:embed="rId2">
-            <a:extLst>
-              <a:ext uri="{28A0092B-C50C-407E-A947-70E740481C1C}">
-                <a14:useLocalDpi xmlns:a14="http://schemas.microsoft.com/office/drawing/2010/main" val="0"/>
-              </a:ext>
-            </a:extLst>
-          </a:blip>
-          <a:stretch>
-            <a:fillRect/>
-          </a:stretch>
-        </p:blipFill>
-        <p:spPr>
-          <a:xfrm>
-            <a:off x="3861203" y="1045243"/>
-            <a:ext cx="5247301" cy="5624117"/>
-          </a:xfrm>
-          <a:prstGeom prst="rect">
-            <a:avLst/>
-          </a:prstGeom>
-        </p:spPr>
-      </p:pic>
-      <p:sp>
-        <p:nvSpPr>
-          <p:cNvPr id="15" name="Text Box 5"/>
-          <p:cNvSpPr txBox="1">
-            <a:spLocks noChangeArrowheads="1"/>
-          </p:cNvSpPr>
-          <p:nvPr/>
-        </p:nvSpPr>
-        <p:spPr bwMode="auto">
-          <a:xfrm>
-            <a:off x="773262" y="6453336"/>
-            <a:ext cx="5886970" cy="190052"/>
-          </a:xfrm>
-          <a:prstGeom prst="rect">
-            <a:avLst/>
-          </a:prstGeom>
-          <a:noFill/>
-          <a:ln w="9525">
-            <a:noFill/>
-            <a:miter lim="800000"/>
-            <a:headEnd/>
-            <a:tailEnd/>
-          </a:ln>
-        </p:spPr>
-        <p:txBody>
-          <a:bodyPr wrap="square" lIns="0" tIns="0" rIns="0" bIns="0" anchor="b">
-            <a:spAutoFit/>
-          </a:bodyPr>
-          <a:lstStyle/>
-          <a:p>
-            <a:pPr>
-              <a:lnSpc>
-                <a:spcPct val="95000"/>
-              </a:lnSpc>
-            </a:pPr>
-            <a:r>
-              <a:rPr lang="ru-RU" sz="1300" dirty="0">
-                <a:solidFill>
-                  <a:srgbClr val="045C75"/>
-                </a:solidFill>
-              </a:rPr>
-              <a:t>АлтГТУ им. И. И. </a:t>
-            </a:r>
-            <a:r>
-              <a:rPr lang="ru-RU" sz="1300" dirty="0" smtClean="0">
-                <a:solidFill>
-                  <a:srgbClr val="045C75"/>
-                </a:solidFill>
-              </a:rPr>
-              <a:t>Ползунова / ПОВТ, Юлия Шатилина</a:t>
-            </a:r>
-            <a:endParaRPr lang="en-US" sz="1300" dirty="0">
-              <a:solidFill>
-                <a:srgbClr val="045C75"/>
-              </a:solidFill>
-            </a:endParaRPr>
-          </a:p>
-        </p:txBody>
-      </p:sp>
-    </p:spTree>
-    <p:extLst>
-      <p:ext uri="{BB962C8B-B14F-4D97-AF65-F5344CB8AC3E}">
-        <p14:creationId xmlns:p14="http://schemas.microsoft.com/office/powerpoint/2010/main" val="591149455"/>
       </p:ext>
     </p:extLst>
   </p:cSld>
@@ -7018,74 +7294,55 @@
       </p:grpSpPr>
       <p:sp>
         <p:nvSpPr>
-          <p:cNvPr id="2" name="Заголовок 1"/>
-          <p:cNvSpPr>
-            <a:spLocks noGrp="1"/>
-          </p:cNvSpPr>
-          <p:nvPr>
-            <p:ph type="title"/>
-          </p:nvPr>
+          <p:cNvPr id="8" name="Заголовок 1"/>
+          <p:cNvSpPr txBox="1">
+            <a:spLocks/>
+          </p:cNvSpPr>
+          <p:nvPr/>
         </p:nvSpPr>
         <p:spPr>
           <a:xfrm>
-            <a:off x="457200" y="28600"/>
+            <a:off x="457200" y="-603448"/>
             <a:ext cx="8229600" cy="1600200"/>
           </a:xfrm>
+          <a:prstGeom prst="rect">
+            <a:avLst/>
+          </a:prstGeom>
         </p:spPr>
         <p:txBody>
-          <a:bodyPr/>
-          <a:lstStyle/>
-          <a:p>
-            <a:r>
-              <a:rPr lang="en-US" dirty="0" err="1" smtClean="0"/>
-              <a:t>Promela</a:t>
-            </a:r>
+          <a:bodyPr vert="horz" lIns="91440" tIns="45720" rIns="91440" bIns="45720" rtlCol="0" anchor="b">
+            <a:noAutofit/>
+          </a:bodyPr>
+          <a:lstStyle>
+            <a:lvl1pPr algn="ctr" defTabSz="914400" rtl="0" eaLnBrk="1" latinLnBrk="0" hangingPunct="1">
+              <a:lnSpc>
+                <a:spcPts val="5800"/>
+              </a:lnSpc>
+              <a:spcBef>
+                <a:spcPct val="0"/>
+              </a:spcBef>
+              <a:buNone/>
+              <a:defRPr sz="5400" kern="1200">
+                <a:solidFill>
+                  <a:schemeClr val="tx2"/>
+                </a:solidFill>
+                <a:effectLst>
+                  <a:outerShdw blurRad="63500" dist="38100" dir="5400000" algn="t" rotWithShape="0">
+                    <a:prstClr val="black">
+                      <a:alpha val="25000"/>
+                    </a:prstClr>
+                  </a:outerShdw>
+                </a:effectLst>
+                <a:latin typeface="+mn-lt"/>
+                <a:ea typeface="+mj-ea"/>
+                <a:cs typeface="+mj-cs"/>
+              </a:defRPr>
+            </a:lvl1pPr>
+          </a:lstStyle>
+          <a:p>
             <a:r>
               <a:rPr lang="en-US" dirty="0" smtClean="0"/>
-              <a:t> </a:t>
-            </a:r>
-            <a:br>
-              <a:rPr lang="en-US" dirty="0" smtClean="0"/>
-            </a:br>
-            <a:r>
-              <a:rPr lang="en-US" dirty="0" smtClean="0"/>
-              <a:t>(</a:t>
-            </a:r>
-            <a:r>
-              <a:rPr lang="ru-RU" u="sng" dirty="0" err="1"/>
-              <a:t>Pro</a:t>
-            </a:r>
-            <a:r>
-              <a:rPr lang="ru-RU" dirty="0" err="1"/>
-              <a:t>tocol</a:t>
-            </a:r>
-            <a:r>
-              <a:rPr lang="ru-RU" dirty="0"/>
-              <a:t> </a:t>
-            </a:r>
-            <a:r>
-              <a:rPr lang="ru-RU" u="sng" dirty="0" err="1"/>
-              <a:t>Me</a:t>
-            </a:r>
-            <a:r>
-              <a:rPr lang="ru-RU" dirty="0" err="1"/>
-              <a:t>ta</a:t>
-            </a:r>
-            <a:r>
-              <a:rPr lang="ru-RU" dirty="0"/>
-              <a:t> </a:t>
-            </a:r>
-            <a:r>
-              <a:rPr lang="ru-RU" u="sng" dirty="0" err="1" smtClean="0"/>
-              <a:t>La</a:t>
-            </a:r>
-            <a:r>
-              <a:rPr lang="ru-RU" dirty="0" err="1" smtClean="0"/>
-              <a:t>nguage</a:t>
-            </a:r>
-            <a:r>
-              <a:rPr lang="en-US" dirty="0" smtClean="0"/>
-              <a:t>)</a:t>
+              <a:t>SPIN</a:t>
             </a:r>
             <a:endParaRPr lang="ru-RU" dirty="0"/>
           </a:p>
@@ -7093,7 +7350,7 @@
       </p:sp>
       <p:sp>
         <p:nvSpPr>
-          <p:cNvPr id="5" name="Объект 4"/>
+          <p:cNvPr id="11" name="Объект 10"/>
           <p:cNvSpPr>
             <a:spLocks noGrp="1"/>
           </p:cNvSpPr>
@@ -7103,63 +7360,110 @@
         </p:nvSpPr>
         <p:spPr>
           <a:xfrm>
-            <a:off x="179512" y="1556792"/>
-            <a:ext cx="8784976" cy="4896544"/>
+            <a:off x="179512" y="1340768"/>
+            <a:ext cx="4536504" cy="5040560"/>
           </a:xfrm>
         </p:spPr>
         <p:txBody>
           <a:bodyPr>
-            <a:normAutofit/>
+            <a:normAutofit fontScale="92500" lnSpcReduction="20000"/>
           </a:bodyPr>
           <a:lstStyle/>
           <a:p>
-            <a:pPr marL="0" indent="0" algn="ctr">
+            <a:pPr marL="0" indent="0">
               <a:buNone/>
             </a:pPr>
             <a:r>
-              <a:rPr lang="ru-RU" sz="2800" dirty="0" smtClean="0"/>
-              <a:t>Описание поведения</a:t>
-            </a:r>
-          </a:p>
-          <a:p>
-            <a:r>
-              <a:rPr lang="ru-RU" sz="2800" dirty="0"/>
-              <a:t>н</a:t>
-            </a:r>
-            <a:r>
-              <a:rPr lang="ru-RU" sz="2800" dirty="0" smtClean="0"/>
-              <a:t>едетерминированный язык с охраняемыми командами</a:t>
-            </a:r>
-          </a:p>
-          <a:p>
-            <a:r>
-              <a:rPr lang="ru-RU" sz="2800" dirty="0"/>
-              <a:t>з</a:t>
-            </a:r>
-            <a:r>
-              <a:rPr lang="ru-RU" sz="2800" dirty="0" smtClean="0"/>
-              <a:t>адача языка – </a:t>
-            </a:r>
-            <a:r>
-              <a:rPr lang="ru-RU" sz="2800" b="1" dirty="0" smtClean="0"/>
-              <a:t>не</a:t>
-            </a:r>
-            <a:r>
-              <a:rPr lang="ru-RU" sz="2800" dirty="0" smtClean="0"/>
-              <a:t> предотвратить описание моделей плохих программ</a:t>
-            </a:r>
-          </a:p>
-          <a:p>
-            <a:r>
-              <a:rPr lang="ru-RU" sz="2800" dirty="0" smtClean="0"/>
-              <a:t>задача языка – разрешить описание моделей, которые могут быть верифицированы</a:t>
-            </a:r>
-          </a:p>
-        </p:txBody>
-      </p:sp>
-      <p:sp>
-        <p:nvSpPr>
-          <p:cNvPr id="9" name="Text Box 5"/>
+              <a:rPr lang="ru-RU" sz="3600" b="1" dirty="0" err="1" smtClean="0"/>
+              <a:t>S</a:t>
+            </a:r>
+            <a:r>
+              <a:rPr lang="ru-RU" sz="3600" dirty="0" err="1" smtClean="0"/>
+              <a:t>imple</a:t>
+            </a:r>
+            <a:r>
+              <a:rPr lang="ru-RU" sz="3600" dirty="0" smtClean="0"/>
+              <a:t> </a:t>
+            </a:r>
+            <a:r>
+              <a:rPr lang="ru-RU" sz="3600" b="1" dirty="0" err="1"/>
+              <a:t>P</a:t>
+            </a:r>
+            <a:r>
+              <a:rPr lang="ru-RU" sz="3600" dirty="0" err="1"/>
+              <a:t>romela</a:t>
+            </a:r>
+            <a:r>
+              <a:rPr lang="ru-RU" sz="3600" dirty="0"/>
+              <a:t> </a:t>
+            </a:r>
+            <a:r>
+              <a:rPr lang="ru-RU" sz="3600" b="1" dirty="0" err="1" smtClean="0"/>
+              <a:t>In</a:t>
+            </a:r>
+            <a:r>
+              <a:rPr lang="ru-RU" sz="3600" dirty="0" err="1" smtClean="0"/>
+              <a:t>terpreter</a:t>
+            </a:r>
+            <a:endParaRPr lang="en-US" sz="3600" dirty="0"/>
+          </a:p>
+          <a:p>
+            <a:r>
+              <a:rPr lang="ru-RU" sz="3200" dirty="0" smtClean="0"/>
+              <a:t>средство моделирования и верификации </a:t>
+            </a:r>
+            <a:r>
+              <a:rPr lang="ru-RU" sz="3200" dirty="0"/>
+              <a:t>протоколов, параллельных программ и широкого класса дискретных систем</a:t>
+            </a:r>
+            <a:endParaRPr lang="en-US" sz="3200" dirty="0"/>
+          </a:p>
+          <a:p>
+            <a:r>
+              <a:rPr lang="ru-RU" sz="3200" dirty="0"/>
+              <a:t>язык описания моделей </a:t>
+            </a:r>
+            <a:r>
+              <a:rPr lang="ru-RU" sz="3200" dirty="0" err="1"/>
+              <a:t>Promela</a:t>
+            </a:r>
+            <a:endParaRPr lang="ru-RU" sz="3200" dirty="0"/>
+          </a:p>
+        </p:txBody>
+      </p:sp>
+      <p:pic>
+        <p:nvPicPr>
+          <p:cNvPr id="13" name="Рисунок 12"/>
+          <p:cNvPicPr>
+            <a:picLocks noChangeAspect="1"/>
+          </p:cNvPicPr>
+          <p:nvPr/>
+        </p:nvPicPr>
+        <p:blipFill>
+          <a:blip r:embed="rId2">
+            <a:extLst>
+              <a:ext uri="{28A0092B-C50C-407E-A947-70E740481C1C}">
+                <a14:useLocalDpi xmlns:a14="http://schemas.microsoft.com/office/drawing/2010/main" val="0"/>
+              </a:ext>
+            </a:extLst>
+          </a:blip>
+          <a:stretch>
+            <a:fillRect/>
+          </a:stretch>
+        </p:blipFill>
+        <p:spPr>
+          <a:xfrm>
+            <a:off x="3861203" y="1045243"/>
+            <a:ext cx="5247301" cy="5624117"/>
+          </a:xfrm>
+          <a:prstGeom prst="rect">
+            <a:avLst/>
+          </a:prstGeom>
+        </p:spPr>
+      </p:pic>
+      <p:sp>
+        <p:nvSpPr>
+          <p:cNvPr id="15" name="Text Box 5"/>
           <p:cNvSpPr txBox="1">
             <a:spLocks noChangeArrowheads="1"/>
           </p:cNvSpPr>
@@ -7219,7 +7523,7 @@
     </p:spTree>
     <p:extLst>
       <p:ext uri="{BB962C8B-B14F-4D97-AF65-F5344CB8AC3E}">
-        <p14:creationId xmlns:p14="http://schemas.microsoft.com/office/powerpoint/2010/main" val="30331259"/>
+        <p14:creationId xmlns:p14="http://schemas.microsoft.com/office/powerpoint/2010/main" val="591149455"/>
       </p:ext>
     </p:extLst>
   </p:cSld>
@@ -7273,16 +7577,58 @@
           <a:bodyPr/>
           <a:lstStyle/>
           <a:p>
-            <a:pPr marL="0" indent="0"/>
-            <a:r>
-              <a:rPr lang="ru-RU" dirty="0"/>
-              <a:t>Модель на языке </a:t>
-            </a:r>
             <a:r>
               <a:rPr lang="en-US" dirty="0" err="1" smtClean="0"/>
               <a:t>Promela</a:t>
             </a:r>
-            <a:endParaRPr lang="en-US" dirty="0"/>
+            <a:r>
+              <a:rPr lang="en-US" dirty="0" smtClean="0"/>
+              <a:t> </a:t>
+            </a:r>
+            <a:br>
+              <a:rPr lang="en-US" dirty="0" smtClean="0"/>
+            </a:br>
+            <a:r>
+              <a:rPr lang="en-US" dirty="0" smtClean="0"/>
+              <a:t>(</a:t>
+            </a:r>
+            <a:r>
+              <a:rPr lang="ru-RU" u="sng" dirty="0" err="1"/>
+              <a:t>Pro</a:t>
+            </a:r>
+            <a:r>
+              <a:rPr lang="ru-RU" dirty="0" err="1"/>
+              <a:t>tocol</a:t>
+            </a:r>
+            <a:r>
+              <a:rPr lang="ru-RU" dirty="0"/>
+              <a:t> </a:t>
+            </a:r>
+            <a:r>
+              <a:rPr lang="ru-RU" u="sng" dirty="0" err="1"/>
+              <a:t>Me</a:t>
+            </a:r>
+            <a:r>
+              <a:rPr lang="ru-RU" dirty="0" err="1"/>
+              <a:t>ta</a:t>
+            </a:r>
+            <a:r>
+              <a:rPr lang="ru-RU" dirty="0"/>
+              <a:t> </a:t>
+            </a:r>
+            <a:r>
+              <a:rPr lang="ru-RU" u="sng" dirty="0" err="1" smtClean="0"/>
+              <a:t>La</a:t>
+            </a:r>
+            <a:r>
+              <a:rPr lang="ru-RU" dirty="0" err="1" smtClean="0"/>
+              <a:t>nguage</a:t>
+            </a:r>
+            <a:r>
+              <a:rPr lang="en-US" dirty="0" smtClean="0"/>
+              <a:t>)</a:t>
+            </a:r>
+            <a:endParaRPr lang="ru-RU" dirty="0"/>
           </a:p>
         </p:txBody>
       </p:sp>
@@ -7308,59 +7654,47 @@
           </a:bodyPr>
           <a:lstStyle/>
           <a:p>
+            <a:pPr marL="0" indent="0" algn="ctr">
+              <a:buNone/>
+            </a:pPr>
             <a:r>
               <a:rPr lang="ru-RU" sz="2800" dirty="0" smtClean="0"/>
-              <a:t>абстракция </a:t>
-            </a:r>
+              <a:t>Описание поведения</a:t>
+            </a:r>
+          </a:p>
+          <a:p>
             <a:r>
               <a:rPr lang="ru-RU" sz="2800" dirty="0"/>
-              <a:t>реальной системы, </a:t>
+              <a:t>н</a:t>
             </a:r>
             <a:r>
               <a:rPr lang="ru-RU" sz="2800" dirty="0" smtClean="0"/>
-              <a:t>содержащая </a:t>
-            </a:r>
+              <a:t>едетерминированный язык с охраняемыми командами</a:t>
+            </a:r>
+          </a:p>
+          <a:p>
             <a:r>
               <a:rPr lang="ru-RU" sz="2800" dirty="0"/>
-              <a:t>характеристики, которые </a:t>
+              <a:t>з</a:t>
             </a:r>
             <a:r>
               <a:rPr lang="ru-RU" sz="2800" dirty="0" smtClean="0"/>
-              <a:t>значимы </a:t>
-            </a:r>
-            <a:r>
-              <a:rPr lang="ru-RU" sz="2800" dirty="0"/>
-              <a:t>для описания взаимодействия процессов</a:t>
-            </a:r>
-          </a:p>
-          <a:p>
+              <a:t>адача языка – </a:t>
+            </a:r>
+            <a:r>
+              <a:rPr lang="ru-RU" sz="2800" b="1" dirty="0" smtClean="0"/>
+              <a:t>не</a:t>
+            </a:r>
             <a:r>
               <a:rPr lang="ru-RU" sz="2800" dirty="0" smtClean="0"/>
-              <a:t>не </a:t>
-            </a:r>
-            <a:r>
-              <a:rPr lang="ru-RU" sz="2800" dirty="0"/>
-              <a:t>является программной реализацией системы</a:t>
+              <a:t> предотвратить описание моделей плохих программ</a:t>
             </a:r>
           </a:p>
           <a:p>
             <a:r>
               <a:rPr lang="ru-RU" sz="2800" dirty="0" smtClean="0"/>
-              <a:t>может </a:t>
-            </a:r>
-            <a:r>
-              <a:rPr lang="ru-RU" sz="2800" dirty="0"/>
-              <a:t>содержать части, которые важны только для </a:t>
-            </a:r>
-            <a:r>
-              <a:rPr lang="ru-RU" sz="2800" dirty="0" smtClean="0"/>
-              <a:t>верификации </a:t>
-            </a:r>
-            <a:r>
-              <a:rPr lang="ru-RU" sz="2800" dirty="0"/>
-              <a:t>протоколов</a:t>
-            </a:r>
-            <a:endParaRPr lang="en-US" sz="2800" dirty="0"/>
+              <a:t>задача языка – разрешить описание моделей, которые могут быть верифицированы</a:t>
+            </a:r>
           </a:p>
         </p:txBody>
       </p:sp>
@@ -7426,7 +7760,7 @@
     </p:spTree>
     <p:extLst>
       <p:ext uri="{BB962C8B-B14F-4D97-AF65-F5344CB8AC3E}">
-        <p14:creationId xmlns:p14="http://schemas.microsoft.com/office/powerpoint/2010/main" val="342838871"/>
+        <p14:creationId xmlns:p14="http://schemas.microsoft.com/office/powerpoint/2010/main" val="30331259"/>
       </p:ext>
     </p:extLst>
   </p:cSld>

</xml_diff>

<commit_message>
Sitting in EN office and listening
</commit_message>
<xml_diff>
--- a/shatilina.pptx
+++ b/shatilina.pptx
@@ -5,7 +5,7 @@
     <p:sldMasterId id="2147483960" r:id="rId1"/>
   </p:sldMasterIdLst>
   <p:notesMasterIdLst>
-    <p:notesMasterId r:id="rId20"/>
+    <p:notesMasterId r:id="rId23"/>
   </p:notesMasterIdLst>
   <p:sldIdLst>
     <p:sldId id="257" r:id="rId2"/>
@@ -15,17 +15,20 @@
     <p:sldId id="267" r:id="rId6"/>
     <p:sldId id="266" r:id="rId7"/>
     <p:sldId id="268" r:id="rId8"/>
-    <p:sldId id="274" r:id="rId9"/>
-    <p:sldId id="275" r:id="rId10"/>
-    <p:sldId id="269" r:id="rId11"/>
-    <p:sldId id="270" r:id="rId12"/>
-    <p:sldId id="272" r:id="rId13"/>
-    <p:sldId id="271" r:id="rId14"/>
-    <p:sldId id="261" r:id="rId15"/>
-    <p:sldId id="262" r:id="rId16"/>
+    <p:sldId id="275" r:id="rId9"/>
+    <p:sldId id="269" r:id="rId10"/>
+    <p:sldId id="270" r:id="rId11"/>
+    <p:sldId id="272" r:id="rId12"/>
+    <p:sldId id="271" r:id="rId13"/>
+    <p:sldId id="261" r:id="rId14"/>
+    <p:sldId id="262" r:id="rId15"/>
+    <p:sldId id="276" r:id="rId16"/>
     <p:sldId id="260" r:id="rId17"/>
     <p:sldId id="258" r:id="rId18"/>
     <p:sldId id="259" r:id="rId19"/>
+    <p:sldId id="277" r:id="rId20"/>
+    <p:sldId id="278" r:id="rId21"/>
+    <p:sldId id="279" r:id="rId22"/>
   </p:sldIdLst>
   <p:sldSz cx="9144000" cy="6858000" type="screen4x3"/>
   <p:notesSz cx="6858000" cy="9144000"/>
@@ -713,6 +716,118 @@
 </p:notes>
 </file>
 
+<file path=ppt/notesSlides/notesSlide11.xml><?xml version="1.0" encoding="utf-8"?>
+<p:notes xmlns:a="http://schemas.openxmlformats.org/drawingml/2006/main" xmlns:r="http://schemas.openxmlformats.org/officeDocument/2006/relationships" xmlns:p="http://schemas.openxmlformats.org/presentationml/2006/main">
+  <p:cSld>
+    <p:spTree>
+      <p:nvGrpSpPr>
+        <p:cNvPr id="1" name=""/>
+        <p:cNvGrpSpPr/>
+        <p:nvPr/>
+      </p:nvGrpSpPr>
+      <p:grpSpPr>
+        <a:xfrm>
+          <a:off x="0" y="0"/>
+          <a:ext cx="0" cy="0"/>
+          <a:chOff x="0" y="0"/>
+          <a:chExt cx="0" cy="0"/>
+        </a:xfrm>
+      </p:grpSpPr>
+      <p:sp>
+        <p:nvSpPr>
+          <p:cNvPr id="2" name="Образ слайда 1"/>
+          <p:cNvSpPr>
+            <a:spLocks noGrp="1" noRot="1" noChangeAspect="1"/>
+          </p:cNvSpPr>
+          <p:nvPr>
+            <p:ph type="sldImg"/>
+          </p:nvPr>
+        </p:nvSpPr>
+        <p:spPr/>
+      </p:sp>
+      <p:sp>
+        <p:nvSpPr>
+          <p:cNvPr id="3" name="Заметки 2"/>
+          <p:cNvSpPr>
+            <a:spLocks noGrp="1"/>
+          </p:cNvSpPr>
+          <p:nvPr>
+            <p:ph type="body" idx="1"/>
+          </p:nvPr>
+        </p:nvSpPr>
+        <p:spPr/>
+        <p:txBody>
+          <a:bodyPr/>
+          <a:lstStyle/>
+          <a:p>
+            <a:r>
+              <a:rPr lang="ru-RU" dirty="0" err="1" smtClean="0"/>
+              <a:t>Ув</a:t>
+            </a:r>
+            <a:r>
+              <a:rPr lang="ru-RU" baseline="0" dirty="0" smtClean="0"/>
+              <a:t> члена </a:t>
+            </a:r>
+            <a:r>
+              <a:rPr lang="ru-RU" baseline="0" dirty="0" err="1" smtClean="0"/>
+              <a:t>гос</a:t>
+            </a:r>
+            <a:r>
+              <a:rPr lang="ru-RU" baseline="0" dirty="0" smtClean="0"/>
+              <a:t> </a:t>
+            </a:r>
+            <a:r>
+              <a:rPr lang="ru-RU" baseline="0" dirty="0" err="1" smtClean="0"/>
+              <a:t>атт</a:t>
+            </a:r>
+            <a:r>
+              <a:rPr lang="ru-RU" baseline="0" dirty="0" smtClean="0"/>
+              <a:t> комиссии вашему вниманию </a:t>
+            </a:r>
+            <a:r>
+              <a:rPr lang="ru-RU" baseline="0" smtClean="0"/>
+              <a:t>предлагается диплом</a:t>
+            </a:r>
+            <a:endParaRPr lang="ru-RU"/>
+          </a:p>
+        </p:txBody>
+      </p:sp>
+      <p:sp>
+        <p:nvSpPr>
+          <p:cNvPr id="4" name="Номер слайда 3"/>
+          <p:cNvSpPr>
+            <a:spLocks noGrp="1"/>
+          </p:cNvSpPr>
+          <p:nvPr>
+            <p:ph type="sldNum" sz="quarter" idx="10"/>
+          </p:nvPr>
+        </p:nvSpPr>
+        <p:spPr/>
+        <p:txBody>
+          <a:bodyPr/>
+          <a:lstStyle/>
+          <a:p>
+            <a:fld id="{D2C5C3F3-C17D-45D2-AA34-92C6E86E38D2}" type="slidenum">
+              <a:rPr lang="ru-RU" smtClean="0"/>
+              <a:t>21</a:t>
+            </a:fld>
+            <a:endParaRPr lang="ru-RU"/>
+          </a:p>
+        </p:txBody>
+      </p:sp>
+    </p:spTree>
+    <p:extLst>
+      <p:ext uri="{BB962C8B-B14F-4D97-AF65-F5344CB8AC3E}">
+        <p14:creationId xmlns:p14="http://schemas.microsoft.com/office/powerpoint/2010/main" val="226382266"/>
+      </p:ext>
+    </p:extLst>
+  </p:cSld>
+  <p:clrMapOvr>
+    <a:masterClrMapping/>
+  </p:clrMapOvr>
+</p:notes>
+</file>
+
 <file path=ppt/notesSlides/notesSlide2.xml><?xml version="1.0" encoding="utf-8"?>
 <p:notes xmlns:a="http://schemas.openxmlformats.org/drawingml/2006/main" xmlns:r="http://schemas.openxmlformats.org/officeDocument/2006/relationships" xmlns:p="http://schemas.openxmlformats.org/presentationml/2006/main">
   <p:cSld>
@@ -882,6 +997,30 @@
           <a:bodyPr/>
           <a:lstStyle/>
           <a:p>
+            <a:pPr marL="0" marR="0" indent="0" algn="l" defTabSz="914400" rtl="0" eaLnBrk="1" fontAlgn="auto" latinLnBrk="0" hangingPunct="1">
+              <a:lnSpc>
+                <a:spcPct val="100000"/>
+              </a:lnSpc>
+              <a:spcBef>
+                <a:spcPts val="0"/>
+              </a:spcBef>
+              <a:spcAft>
+                <a:spcPts val="0"/>
+              </a:spcAft>
+              <a:buClrTx/>
+              <a:buSzTx/>
+              <a:buFontTx/>
+              <a:buNone/>
+              <a:tabLst/>
+              <a:defRPr/>
+            </a:pPr>
+            <a:r>
+              <a:rPr lang="ru-RU" sz="1200" dirty="0" smtClean="0"/>
+              <a:t>метод автоматической формальной верификации систем с конечным числом состояний</a:t>
+            </a:r>
+            <a:endParaRPr lang="en-US" dirty="0" smtClean="0"/>
+          </a:p>
+          <a:p>
             <a:pPr marL="228600" indent="-228600">
               <a:buAutoNum type="arabicPeriod"/>
             </a:pPr>
@@ -924,6 +1063,33 @@
               <a:rPr lang="ru-RU" baseline="0" dirty="0" smtClean="0"/>
               <a:t>Выбранная нотация гарантирует разрешимость проверки любого свойства любой модели</a:t>
             </a:r>
+            <a:endParaRPr lang="en-US" baseline="0" dirty="0" smtClean="0"/>
+          </a:p>
+          <a:p>
+            <a:pPr marL="228600" indent="-228600">
+              <a:buAutoNum type="arabicPeriod"/>
+            </a:pPr>
+            <a:endParaRPr lang="en-US" baseline="0" dirty="0" smtClean="0"/>
+          </a:p>
+          <a:p>
+            <a:r>
+              <a:rPr lang="ru-RU" sz="1200" dirty="0" smtClean="0"/>
+              <a:t>Проверка свойства на конечной модели программы</a:t>
+            </a:r>
+            <a:endParaRPr lang="en-US" sz="1200" dirty="0" smtClean="0"/>
+          </a:p>
+          <a:p>
+            <a:r>
+              <a:rPr lang="ru-RU" sz="1200" dirty="0" smtClean="0"/>
+              <a:t>Свойства – в терминах значения предикатов в состоянии программы и последовательность значений</a:t>
+            </a:r>
+          </a:p>
+          <a:p>
+            <a:r>
+              <a:rPr lang="ru-RU" sz="1200" dirty="0" smtClean="0"/>
+              <a:t>Исчерпывающий поиск по пространству состояний</a:t>
+            </a:r>
+            <a:endParaRPr lang="en-US" sz="1200" dirty="0" smtClean="0"/>
           </a:p>
         </p:txBody>
       </p:sp>
@@ -1012,30 +1178,60 @@
             </a:pPr>
             <a:r>
               <a:rPr lang="ru-RU" dirty="0" smtClean="0"/>
-              <a:t>Строится конечная модель системы и проверяется выполняются ли</a:t>
+              <a:t>Хорошо</a:t>
             </a:r>
             <a:r>
               <a:rPr lang="ru-RU" baseline="0" dirty="0" smtClean="0"/>
-              <a:t> на ней представленные свойства</a:t>
-            </a:r>
+              <a:t> автоматизируем – участие человека ограничивается анализом </a:t>
+            </a:r>
+            <a:r>
+              <a:rPr lang="ru-RU" baseline="0" dirty="0" err="1" smtClean="0"/>
+              <a:t>контрпримера</a:t>
+            </a:r>
+            <a:endParaRPr lang="ru-RU" baseline="0" dirty="0" smtClean="0"/>
           </a:p>
           <a:p>
             <a:pPr marL="228600" indent="-228600">
               <a:buAutoNum type="arabicPeriod"/>
             </a:pPr>
             <a:r>
+              <a:rPr lang="ru-RU" dirty="0" smtClean="0"/>
+              <a:t>Если модель конечна, корректна и адекватна проверяемому свойству, то </a:t>
+            </a:r>
+            <a:r>
+              <a:rPr lang="ru-RU" dirty="0" err="1" smtClean="0"/>
+              <a:t>дается</a:t>
+            </a:r>
+            <a:r>
+              <a:rPr lang="ru-RU" dirty="0" smtClean="0"/>
+              <a:t> точный ответ</a:t>
+            </a:r>
+            <a:r>
               <a:rPr lang="ru-RU" baseline="0" dirty="0" smtClean="0"/>
-              <a:t>В общих чертах проверка выполняется как исчерпывающий поиск по пространству состояний, который гарантировано заканчивается в силу того, что построенная модель конечна</a:t>
+              <a:t> – либо ошибок нет, либо </a:t>
+            </a:r>
+            <a:r>
+              <a:rPr lang="ru-RU" baseline="0" dirty="0" err="1" smtClean="0"/>
+              <a:t>выдается</a:t>
+            </a:r>
+            <a:r>
+              <a:rPr lang="ru-RU" baseline="0" dirty="0" smtClean="0"/>
+              <a:t> </a:t>
+            </a:r>
+            <a:r>
+              <a:rPr lang="ru-RU" baseline="0" dirty="0" err="1" smtClean="0"/>
+              <a:t>контрпример</a:t>
+            </a:r>
+            <a:r>
+              <a:rPr lang="ru-RU" baseline="0" dirty="0" smtClean="0"/>
+              <a:t> с ошибкой</a:t>
             </a:r>
           </a:p>
           <a:p>
             <a:pPr marL="228600" indent="-228600">
               <a:buAutoNum type="arabicPeriod"/>
             </a:pPr>
-            <a:r>
-              <a:rPr lang="ru-RU" baseline="0" dirty="0" smtClean="0"/>
-              <a:t>Проверяются не все свойства системы, а лишь те, которые мы хотим проверить – модель системы может быть значительно более простой в сравнении с системой</a:t>
-            </a:r>
+            <a:endParaRPr lang="ru-RU" baseline="0" dirty="0" smtClean="0"/>
           </a:p>
           <a:p>
             <a:pPr marL="228600" indent="-228600">
@@ -1043,9 +1239,9 @@
             </a:pPr>
             <a:r>
               <a:rPr lang="ru-RU" baseline="0" dirty="0" smtClean="0"/>
-              <a:t>Основной вопрос: соответствует ли построенная модель исходной системе и свойствам, которые мы хотим проверить</a:t>
-            </a:r>
-            <a:endParaRPr lang="ru-RU" dirty="0"/>
+              <a:t>В ряде случаев построить конечную модель системы, при этом адекватную тому свойству, которое мы хотим проверить достаточно сложно</a:t>
+            </a:r>
+            <a:endParaRPr lang="ru-RU" dirty="0" smtClean="0"/>
           </a:p>
         </p:txBody>
       </p:sp>
@@ -1129,75 +1325,75 @@
           <a:bodyPr/>
           <a:lstStyle/>
           <a:p>
-            <a:pPr marL="228600" indent="-228600">
-              <a:buAutoNum type="arabicPeriod"/>
+            <a:pPr marL="0" marR="0" indent="0" algn="l" defTabSz="914400" rtl="0" eaLnBrk="1" fontAlgn="auto" latinLnBrk="0" hangingPunct="1">
+              <a:lnSpc>
+                <a:spcPct val="100000"/>
+              </a:lnSpc>
+              <a:spcBef>
+                <a:spcPts val="0"/>
+              </a:spcBef>
+              <a:spcAft>
+                <a:spcPts val="0"/>
+              </a:spcAft>
+              <a:buClrTx/>
+              <a:buSzTx/>
+              <a:buFontTx/>
+              <a:buNone/>
+              <a:tabLst/>
+              <a:defRPr/>
             </a:pPr>
             <a:r>
+              <a:rPr lang="ru-RU" sz="1200" dirty="0" smtClean="0"/>
+              <a:t>средство моделирования и верификации протоколов, параллельных программ и широкого класса дискретных систем</a:t>
+            </a:r>
+            <a:endParaRPr lang="ru-RU" baseline="0" dirty="0" smtClean="0"/>
+          </a:p>
+          <a:p>
+            <a:pPr marL="0" marR="0" indent="0" algn="l" defTabSz="914400" rtl="0" eaLnBrk="1" fontAlgn="auto" latinLnBrk="0" hangingPunct="1">
+              <a:lnSpc>
+                <a:spcPct val="100000"/>
+              </a:lnSpc>
+              <a:spcBef>
+                <a:spcPts val="0"/>
+              </a:spcBef>
+              <a:spcAft>
+                <a:spcPts val="0"/>
+              </a:spcAft>
+              <a:buClrTx/>
+              <a:buSzTx/>
+              <a:buFontTx/>
+              <a:buNone/>
+              <a:tabLst/>
+              <a:defRPr/>
+            </a:pPr>
+            <a:r>
+              <a:rPr lang="ru-RU" baseline="0" dirty="0" err="1" smtClean="0"/>
+              <a:t>Контрпример</a:t>
+            </a:r>
+            <a:r>
+              <a:rPr lang="ru-RU" baseline="0" dirty="0" smtClean="0"/>
+              <a:t> – </a:t>
+            </a:r>
+            <a:r>
+              <a:rPr lang="ru-RU" baseline="0" dirty="0" err="1" smtClean="0"/>
+              <a:t>трассса</a:t>
+            </a:r>
+            <a:r>
+              <a:rPr lang="ru-RU" baseline="0" dirty="0" smtClean="0"/>
+              <a:t>, содержащая ошибку</a:t>
+            </a:r>
+            <a:endParaRPr lang="ru-RU" dirty="0" smtClean="0"/>
+          </a:p>
+          <a:p>
+            <a:r>
               <a:rPr lang="ru-RU" dirty="0" smtClean="0"/>
-              <a:t>Хорошо</a:t>
+              <a:t>Примеры использования: верификация системы управления дамбами в Нидерландах,</a:t>
             </a:r>
             <a:r>
               <a:rPr lang="ru-RU" baseline="0" dirty="0" smtClean="0"/>
-              <a:t> автоматизируем – участие человека ограничивается анализом </a:t>
-            </a:r>
-            <a:r>
-              <a:rPr lang="ru-RU" baseline="0" dirty="0" err="1" smtClean="0"/>
-              <a:t>контрпримера</a:t>
-            </a:r>
-            <a:endParaRPr lang="ru-RU" baseline="0" dirty="0" smtClean="0"/>
-          </a:p>
-          <a:p>
-            <a:pPr marL="228600" indent="-228600">
-              <a:buAutoNum type="arabicPeriod"/>
-            </a:pPr>
-            <a:r>
-              <a:rPr lang="ru-RU" dirty="0" smtClean="0"/>
-              <a:t>Если модель конечна, корректна и адекватна проверяемому свойству, то </a:t>
-            </a:r>
-            <a:r>
-              <a:rPr lang="ru-RU" dirty="0" err="1" smtClean="0"/>
-              <a:t>дается</a:t>
-            </a:r>
-            <a:r>
-              <a:rPr lang="ru-RU" dirty="0" smtClean="0"/>
-              <a:t> точный ответ</a:t>
-            </a:r>
-            <a:r>
-              <a:rPr lang="ru-RU" baseline="0" dirty="0" smtClean="0"/>
-              <a:t> – либо ошибок нет, либо </a:t>
-            </a:r>
-            <a:r>
-              <a:rPr lang="ru-RU" baseline="0" dirty="0" err="1" smtClean="0"/>
-              <a:t>выдается</a:t>
-            </a:r>
-            <a:r>
-              <a:rPr lang="ru-RU" baseline="0" dirty="0" smtClean="0"/>
-              <a:t> </a:t>
-            </a:r>
-            <a:r>
-              <a:rPr lang="ru-RU" baseline="0" dirty="0" err="1" smtClean="0"/>
-              <a:t>контрпример</a:t>
-            </a:r>
-            <a:r>
-              <a:rPr lang="ru-RU" baseline="0" dirty="0" smtClean="0"/>
-              <a:t> с ошибкой</a:t>
-            </a:r>
-          </a:p>
-          <a:p>
-            <a:pPr marL="228600" indent="-228600">
-              <a:buAutoNum type="arabicPeriod"/>
-            </a:pPr>
-            <a:endParaRPr lang="ru-RU" baseline="0" dirty="0" smtClean="0"/>
-          </a:p>
-          <a:p>
-            <a:pPr marL="228600" indent="-228600">
-              <a:buAutoNum type="arabicPeriod"/>
-            </a:pPr>
-            <a:r>
-              <a:rPr lang="ru-RU" baseline="0" dirty="0" smtClean="0"/>
-              <a:t>В ряде случаев построить конечную модель системы, при этом адекватную тому свойству, которое мы хотим проверить достаточно сложно</a:t>
-            </a:r>
-            <a:endParaRPr lang="ru-RU" dirty="0" smtClean="0"/>
+              <a:t> верификация аэрокосмических систем</a:t>
+            </a:r>
+            <a:endParaRPr lang="ru-RU" dirty="0"/>
           </a:p>
         </p:txBody>
       </p:sp>
@@ -1227,7 +1423,7 @@
     </p:spTree>
     <p:extLst>
       <p:ext uri="{BB962C8B-B14F-4D97-AF65-F5344CB8AC3E}">
-        <p14:creationId xmlns:p14="http://schemas.microsoft.com/office/powerpoint/2010/main" val="179302113"/>
+        <p14:creationId xmlns:p14="http://schemas.microsoft.com/office/powerpoint/2010/main" val="3875426799"/>
       </p:ext>
     </p:extLst>
   </p:cSld>
@@ -1281,53 +1477,59 @@
           <a:bodyPr/>
           <a:lstStyle/>
           <a:p>
-            <a:pPr marL="0" marR="0" indent="0" algn="l" defTabSz="914400" rtl="0" eaLnBrk="1" fontAlgn="auto" latinLnBrk="0" hangingPunct="1">
-              <a:lnSpc>
-                <a:spcPct val="100000"/>
-              </a:lnSpc>
-              <a:spcBef>
-                <a:spcPts val="0"/>
-              </a:spcBef>
-              <a:spcAft>
-                <a:spcPts val="0"/>
-              </a:spcAft>
-              <a:buClrTx/>
-              <a:buSzTx/>
-              <a:buFontTx/>
-              <a:buNone/>
-              <a:tabLst/>
-              <a:defRPr/>
+            <a:pPr marL="171450" indent="-171450">
+              <a:buFont typeface="Arial" pitchFamily="34" charset="0"/>
+              <a:buChar char="•"/>
             </a:pPr>
             <a:r>
+              <a:rPr lang="ru-RU" dirty="0" smtClean="0"/>
+              <a:t>На</a:t>
+            </a:r>
+            <a:r>
+              <a:rPr lang="ru-RU" baseline="0" dirty="0" smtClean="0"/>
+              <a:t> языке можем описывать недетерминизм. То есть его удобно использовать для абстракции от несущественных деталей. Охраняемые команды означают реализацию недетерминизма. Это значит что с каждой командой языка связано понятие выполнимости и если в </a:t>
+            </a:r>
+            <a:r>
               <a:rPr lang="ru-RU" baseline="0" dirty="0" err="1" smtClean="0"/>
-              <a:t>Контрпример</a:t>
+              <a:t>определенном</a:t>
             </a:r>
             <a:r>
               <a:rPr lang="ru-RU" baseline="0" dirty="0" smtClean="0"/>
-              <a:t> – </a:t>
+              <a:t> блоке модели присутствует несколько команд, выполнимых одновременно, то может быть выполнена любая из них.</a:t>
+            </a:r>
+          </a:p>
+          <a:p>
+            <a:pPr marL="171450" indent="-171450">
+              <a:buFont typeface="Arial" pitchFamily="34" charset="0"/>
+              <a:buChar char="•"/>
+            </a:pPr>
+            <a:r>
+              <a:rPr lang="ru-RU" baseline="0" dirty="0" smtClean="0"/>
+              <a:t>Поскольку способ верификации </a:t>
+            </a:r>
+            <a:r>
+              <a:rPr lang="en-US" baseline="0" dirty="0" smtClean="0"/>
+              <a:t>model checking </a:t>
+            </a:r>
+            <a:r>
+              <a:rPr lang="ru-RU" baseline="0" dirty="0" smtClean="0"/>
+              <a:t>сказанное означает, что у любой модели описанной с помощью языка </a:t>
+            </a:r>
+            <a:r>
+              <a:rPr lang="en-US" baseline="0" dirty="0" err="1" smtClean="0"/>
+              <a:t>Promela</a:t>
+            </a:r>
+            <a:r>
+              <a:rPr lang="ru-RU" baseline="0" dirty="0" smtClean="0"/>
+              <a:t> конечное число состояний. За </a:t>
             </a:r>
             <a:r>
               <a:rPr lang="ru-RU" baseline="0" dirty="0" err="1" smtClean="0"/>
-              <a:t>трассса</a:t>
+              <a:t>счет</a:t>
             </a:r>
             <a:r>
               <a:rPr lang="ru-RU" baseline="0" dirty="0" smtClean="0"/>
-              <a:t>, содержащая ошибку</a:t>
-            </a:r>
-            <a:endParaRPr lang="ru-RU" dirty="0" smtClean="0"/>
-          </a:p>
-          <a:p>
-            <a:r>
-              <a:rPr lang="ru-RU" dirty="0" smtClean="0"/>
-              <a:t>Примеры использования: верификация системы управления дамбами в Нидерландах,</a:t>
-            </a:r>
-            <a:r>
-              <a:rPr lang="ru-RU" baseline="0" dirty="0" smtClean="0"/>
-              <a:t> верификация </a:t>
-            </a:r>
-            <a:r>
-              <a:rPr lang="ru-RU" baseline="0" smtClean="0"/>
-              <a:t>аэрокосмических систем</a:t>
+              <a:t> чего это достигается мы увидим дальше.</a:t>
             </a:r>
             <a:endParaRPr lang="ru-RU" dirty="0"/>
           </a:p>
@@ -1359,7 +1561,7 @@
     </p:spTree>
     <p:extLst>
       <p:ext uri="{BB962C8B-B14F-4D97-AF65-F5344CB8AC3E}">
-        <p14:creationId xmlns:p14="http://schemas.microsoft.com/office/powerpoint/2010/main" val="3875426799"/>
+        <p14:creationId xmlns:p14="http://schemas.microsoft.com/office/powerpoint/2010/main" val="3247691620"/>
       </p:ext>
     </p:extLst>
   </p:cSld>
@@ -1413,59 +1615,33 @@
           <a:bodyPr/>
           <a:lstStyle/>
           <a:p>
-            <a:pPr marL="171450" indent="-171450">
-              <a:buFont typeface="Arial" pitchFamily="34" charset="0"/>
-              <a:buChar char="•"/>
-            </a:pPr>
+            <a:r>
+              <a:rPr lang="ru-RU" dirty="0" err="1" smtClean="0"/>
+              <a:t>Promela</a:t>
+            </a:r>
             <a:r>
               <a:rPr lang="ru-RU" dirty="0" smtClean="0"/>
-              <a:t>На</a:t>
-            </a:r>
-            <a:r>
-              <a:rPr lang="ru-RU" baseline="0" dirty="0" smtClean="0"/>
-              <a:t> языке можем описывать недетерминизм. То есть его удобно использовать для абстракции от несущественных деталей. Охраняемые команды означают реализацию недетерминизма. Это значит что с каждой командой языка связано понятие выполнимости и если в </a:t>
-            </a:r>
-            <a:r>
-              <a:rPr lang="ru-RU" baseline="0" dirty="0" err="1" smtClean="0"/>
-              <a:t>определенном</a:t>
-            </a:r>
-            <a:r>
-              <a:rPr lang="ru-RU" baseline="0" dirty="0" smtClean="0"/>
-              <a:t> блоке модели присутствует несколько команд, выполнимых одновременно, то может быть выполнена любая из них.</a:t>
-            </a:r>
-          </a:p>
-          <a:p>
-            <a:pPr marL="171450" indent="-171450">
-              <a:buFont typeface="Arial" pitchFamily="34" charset="0"/>
-              <a:buChar char="•"/>
-            </a:pPr>
-            <a:r>
-              <a:rPr lang="ru-RU" baseline="0" dirty="0" smtClean="0"/>
-              <a:t>Поскольку способ верификации </a:t>
-            </a:r>
-            <a:r>
-              <a:rPr lang="en-US" baseline="0" dirty="0" smtClean="0"/>
-              <a:t>model checking </a:t>
-            </a:r>
-            <a:r>
-              <a:rPr lang="ru-RU" baseline="0" dirty="0" smtClean="0"/>
-              <a:t>сказанное означает, что у любой модели описанной с помощью языка </a:t>
-            </a:r>
-            <a:r>
-              <a:rPr lang="en-US" baseline="0" dirty="0" err="1" smtClean="0"/>
-              <a:t>Promela</a:t>
-            </a:r>
-            <a:r>
-              <a:rPr lang="ru-RU" baseline="0" dirty="0" smtClean="0"/>
-              <a:t> конечное число состояний. За </a:t>
-            </a:r>
-            <a:r>
-              <a:rPr lang="ru-RU" baseline="0" dirty="0" err="1" smtClean="0"/>
-              <a:t>счет</a:t>
-            </a:r>
-            <a:r>
-              <a:rPr lang="ru-RU" baseline="0" dirty="0" smtClean="0"/>
-              <a:t> чего это достигается мы увидим дальше.</a:t>
+              <a:t> включает примитивы для создания процессов и описания </a:t>
+            </a:r>
+            <a:r>
+              <a:rPr lang="ru-RU" dirty="0" err="1" smtClean="0"/>
+              <a:t>межпроцессного</a:t>
+            </a:r>
+            <a:r>
+              <a:rPr lang="ru-RU" dirty="0" smtClean="0"/>
+              <a:t> взаимодействия</a:t>
+            </a:r>
+          </a:p>
+          <a:p>
+            <a:r>
+              <a:rPr lang="ru-RU" dirty="0" smtClean="0"/>
+              <a:t> НО! в нем отсутствует ряд средств, которые есть в языках программирования высокого уровня </a:t>
+            </a:r>
+          </a:p>
+          <a:p>
+            <a:r>
+              <a:rPr lang="ru-RU" dirty="0" smtClean="0"/>
+              <a:t> Например, указатели на данные и функции, не включено понятие времени или часов, отсутствуют операции с плавающей точкой и пр.</a:t>
             </a:r>
             <a:endParaRPr lang="ru-RU" dirty="0"/>
           </a:p>
@@ -1497,7 +1673,7 @@
     </p:spTree>
     <p:extLst>
       <p:ext uri="{BB962C8B-B14F-4D97-AF65-F5344CB8AC3E}">
-        <p14:creationId xmlns:p14="http://schemas.microsoft.com/office/powerpoint/2010/main" val="3247691620"/>
+        <p14:creationId xmlns:p14="http://schemas.microsoft.com/office/powerpoint/2010/main" val="1589152162"/>
       </p:ext>
     </p:extLst>
   </p:cSld>
@@ -1552,32 +1728,12 @@
           <a:lstStyle/>
           <a:p>
             <a:r>
-              <a:rPr lang="ru-RU" dirty="0" err="1" smtClean="0"/>
-              <a:t>Promela</a:t>
-            </a:r>
-            <a:r>
               <a:rPr lang="ru-RU" dirty="0" smtClean="0"/>
-              <a:t> включает примитивы для создания процессов и описания </a:t>
-            </a:r>
-            <a:r>
-              <a:rPr lang="ru-RU" dirty="0" err="1" smtClean="0"/>
-              <a:t>межпроцессного</a:t>
-            </a:r>
-            <a:r>
-              <a:rPr lang="ru-RU" dirty="0" smtClean="0"/>
-              <a:t> взаимодействия</a:t>
-            </a:r>
-          </a:p>
-          <a:p>
-            <a:r>
-              <a:rPr lang="ru-RU" dirty="0" smtClean="0"/>
-              <a:t> НО! в нем отсутствует ряд средств, которые есть в языках программирования высокого уровня </a:t>
-            </a:r>
-          </a:p>
-          <a:p>
-            <a:r>
-              <a:rPr lang="ru-RU" dirty="0" smtClean="0"/>
-              <a:t> Например, указатели на данные и функции, не включено понятие времени или часов, отсутствуют операции с плавающей точкой и пр.</a:t>
+              <a:t>ПРОБЛЕМА: Полнота спецификации – охватывают</a:t>
+            </a:r>
+            <a:r>
+              <a:rPr lang="ru-RU" baseline="0" dirty="0" smtClean="0"/>
+              <a:t> ли спецификации всё поведение системы</a:t>
             </a:r>
             <a:endParaRPr lang="ru-RU" dirty="0"/>
           </a:p>
@@ -1609,7 +1765,7 @@
     </p:spTree>
     <p:extLst>
       <p:ext uri="{BB962C8B-B14F-4D97-AF65-F5344CB8AC3E}">
-        <p14:creationId xmlns:p14="http://schemas.microsoft.com/office/powerpoint/2010/main" val="1589152162"/>
+        <p14:creationId xmlns:p14="http://schemas.microsoft.com/office/powerpoint/2010/main" val="725484770"/>
       </p:ext>
     </p:extLst>
   </p:cSld>
@@ -1665,11 +1821,7 @@
           <a:p>
             <a:r>
               <a:rPr lang="ru-RU" dirty="0" smtClean="0"/>
-              <a:t>ПРОБЛЕМА: Полнота спецификации – охватывают</a:t>
-            </a:r>
-            <a:r>
-              <a:rPr lang="ru-RU" baseline="0" dirty="0" smtClean="0"/>
-              <a:t> ли спецификации всё поведение системы</a:t>
+              <a:t>Диаграмма классов всей системы</a:t>
             </a:r>
             <a:endParaRPr lang="ru-RU" dirty="0"/>
           </a:p>
@@ -1692,7 +1844,7 @@
           <a:p>
             <a:fld id="{D2C5C3F3-C17D-45D2-AA34-92C6E86E38D2}" type="slidenum">
               <a:rPr lang="ru-RU" smtClean="0"/>
-              <a:t>13</a:t>
+              <a:t>14</a:t>
             </a:fld>
             <a:endParaRPr lang="ru-RU"/>
           </a:p>
@@ -1701,7 +1853,7 @@
     </p:spTree>
     <p:extLst>
       <p:ext uri="{BB962C8B-B14F-4D97-AF65-F5344CB8AC3E}">
-        <p14:creationId xmlns:p14="http://schemas.microsoft.com/office/powerpoint/2010/main" val="725484770"/>
+        <p14:creationId xmlns:p14="http://schemas.microsoft.com/office/powerpoint/2010/main" val="1951951640"/>
       </p:ext>
     </p:extLst>
   </p:cSld>
@@ -5194,55 +5346,74 @@
       </p:grpSpPr>
       <p:sp>
         <p:nvSpPr>
-          <p:cNvPr id="8" name="Заголовок 1"/>
-          <p:cNvSpPr txBox="1">
-            <a:spLocks/>
-          </p:cNvSpPr>
-          <p:nvPr/>
+          <p:cNvPr id="2" name="Заголовок 1"/>
+          <p:cNvSpPr>
+            <a:spLocks noGrp="1"/>
+          </p:cNvSpPr>
+          <p:nvPr>
+            <p:ph type="title"/>
+          </p:nvPr>
         </p:nvSpPr>
         <p:spPr>
           <a:xfrm>
-            <a:off x="457200" y="-603448"/>
+            <a:off x="457200" y="28600"/>
             <a:ext cx="8229600" cy="1600200"/>
           </a:xfrm>
-          <a:prstGeom prst="rect">
-            <a:avLst/>
-          </a:prstGeom>
         </p:spPr>
         <p:txBody>
-          <a:bodyPr vert="horz" lIns="91440" tIns="45720" rIns="91440" bIns="45720" rtlCol="0" anchor="b">
-            <a:noAutofit/>
-          </a:bodyPr>
-          <a:lstStyle>
-            <a:lvl1pPr algn="ctr" defTabSz="914400" rtl="0" eaLnBrk="1" latinLnBrk="0" hangingPunct="1">
-              <a:lnSpc>
-                <a:spcPts val="5800"/>
-              </a:lnSpc>
-              <a:spcBef>
-                <a:spcPct val="0"/>
-              </a:spcBef>
-              <a:buNone/>
-              <a:defRPr sz="5400" kern="1200">
-                <a:solidFill>
-                  <a:schemeClr val="tx2"/>
-                </a:solidFill>
-                <a:effectLst>
-                  <a:outerShdw blurRad="63500" dist="38100" dir="5400000" algn="t" rotWithShape="0">
-                    <a:prstClr val="black">
-                      <a:alpha val="25000"/>
-                    </a:prstClr>
-                  </a:outerShdw>
-                </a:effectLst>
-                <a:latin typeface="+mn-lt"/>
-                <a:ea typeface="+mj-ea"/>
-                <a:cs typeface="+mj-cs"/>
-              </a:defRPr>
-            </a:lvl1pPr>
-          </a:lstStyle>
-          <a:p>
+          <a:bodyPr/>
+          <a:lstStyle/>
+          <a:p>
+            <a:r>
+              <a:rPr lang="en-US" dirty="0" err="1" smtClean="0"/>
+              <a:t>Promela</a:t>
+            </a:r>
             <a:r>
               <a:rPr lang="en-US" dirty="0" smtClean="0"/>
-              <a:t>SPIN</a:t>
+              <a:t> </a:t>
+            </a:r>
+            <a:br>
+              <a:rPr lang="en-US" dirty="0" smtClean="0"/>
+            </a:br>
+            <a:r>
+              <a:rPr lang="en-US" dirty="0" smtClean="0"/>
+              <a:t>(</a:t>
+            </a:r>
+            <a:r>
+              <a:rPr lang="ru-RU" u="sng" dirty="0" err="1"/>
+              <a:t>Pro</a:t>
+            </a:r>
+            <a:r>
+              <a:rPr lang="ru-RU" dirty="0" err="1"/>
+              <a:t>tocol</a:t>
+            </a:r>
+            <a:r>
+              <a:rPr lang="ru-RU" dirty="0"/>
+              <a:t> </a:t>
+            </a:r>
+            <a:r>
+              <a:rPr lang="ru-RU" u="sng" dirty="0" err="1"/>
+              <a:t>Me</a:t>
+            </a:r>
+            <a:r>
+              <a:rPr lang="ru-RU" dirty="0" err="1"/>
+              <a:t>ta</a:t>
+            </a:r>
+            <a:r>
+              <a:rPr lang="ru-RU" dirty="0"/>
+              <a:t> </a:t>
+            </a:r>
+            <a:r>
+              <a:rPr lang="ru-RU" u="sng" dirty="0" err="1" smtClean="0"/>
+              <a:t>La</a:t>
+            </a:r>
+            <a:r>
+              <a:rPr lang="ru-RU" dirty="0" err="1" smtClean="0"/>
+              <a:t>nguage</a:t>
+            </a:r>
+            <a:r>
+              <a:rPr lang="en-US" dirty="0" smtClean="0"/>
+              <a:t>)</a:t>
             </a:r>
             <a:endParaRPr lang="ru-RU" dirty="0"/>
           </a:p>
@@ -5250,7 +5421,7 @@
       </p:sp>
       <p:sp>
         <p:nvSpPr>
-          <p:cNvPr id="11" name="Объект 10"/>
+          <p:cNvPr id="5" name="Объект 4"/>
           <p:cNvSpPr>
             <a:spLocks noGrp="1"/>
           </p:cNvSpPr>
@@ -5260,110 +5431,63 @@
         </p:nvSpPr>
         <p:spPr>
           <a:xfrm>
-            <a:off x="179512" y="1340768"/>
-            <a:ext cx="4536504" cy="5040560"/>
+            <a:off x="179512" y="1556792"/>
+            <a:ext cx="8784976" cy="4896544"/>
           </a:xfrm>
         </p:spPr>
         <p:txBody>
           <a:bodyPr>
-            <a:normAutofit fontScale="92500" lnSpcReduction="20000"/>
+            <a:normAutofit/>
           </a:bodyPr>
           <a:lstStyle/>
           <a:p>
-            <a:pPr marL="0" indent="0">
+            <a:pPr marL="0" indent="0" algn="ctr">
               <a:buNone/>
             </a:pPr>
             <a:r>
-              <a:rPr lang="ru-RU" sz="3600" b="1" dirty="0" err="1" smtClean="0"/>
-              <a:t>S</a:t>
-            </a:r>
-            <a:r>
-              <a:rPr lang="ru-RU" sz="3600" dirty="0" err="1" smtClean="0"/>
-              <a:t>imple</a:t>
-            </a:r>
-            <a:r>
-              <a:rPr lang="ru-RU" sz="3600" dirty="0" smtClean="0"/>
-              <a:t> </a:t>
-            </a:r>
-            <a:r>
-              <a:rPr lang="ru-RU" sz="3600" b="1" dirty="0" err="1"/>
-              <a:t>P</a:t>
-            </a:r>
-            <a:r>
-              <a:rPr lang="ru-RU" sz="3600" dirty="0" err="1"/>
-              <a:t>romela</a:t>
-            </a:r>
-            <a:r>
-              <a:rPr lang="ru-RU" sz="3600" dirty="0"/>
-              <a:t> </a:t>
-            </a:r>
-            <a:r>
-              <a:rPr lang="ru-RU" sz="3600" b="1" dirty="0" err="1" smtClean="0"/>
-              <a:t>In</a:t>
-            </a:r>
-            <a:r>
-              <a:rPr lang="ru-RU" sz="3600" dirty="0" err="1" smtClean="0"/>
-              <a:t>terpreter</a:t>
-            </a:r>
-            <a:endParaRPr lang="en-US" sz="3600" dirty="0"/>
-          </a:p>
-          <a:p>
-            <a:r>
-              <a:rPr lang="ru-RU" sz="3200" dirty="0" smtClean="0"/>
-              <a:t>средство моделирования и верификации </a:t>
-            </a:r>
-            <a:r>
-              <a:rPr lang="ru-RU" sz="3200" dirty="0"/>
-              <a:t>протоколов, параллельных программ и широкого класса дискретных систем</a:t>
-            </a:r>
-            <a:endParaRPr lang="en-US" sz="3200" dirty="0"/>
-          </a:p>
-          <a:p>
-            <a:r>
-              <a:rPr lang="ru-RU" sz="3200" dirty="0"/>
-              <a:t>язык описания моделей </a:t>
-            </a:r>
-            <a:r>
-              <a:rPr lang="ru-RU" sz="3200" dirty="0" err="1"/>
-              <a:t>Promela</a:t>
-            </a:r>
-            <a:endParaRPr lang="ru-RU" sz="3200" dirty="0"/>
-          </a:p>
-        </p:txBody>
-      </p:sp>
-      <p:pic>
-        <p:nvPicPr>
-          <p:cNvPr id="13" name="Рисунок 12"/>
-          <p:cNvPicPr>
-            <a:picLocks noChangeAspect="1"/>
-          </p:cNvPicPr>
-          <p:nvPr/>
-        </p:nvPicPr>
-        <p:blipFill>
-          <a:blip r:embed="rId3">
-            <a:extLst>
-              <a:ext uri="{28A0092B-C50C-407E-A947-70E740481C1C}">
-                <a14:useLocalDpi xmlns:a14="http://schemas.microsoft.com/office/drawing/2010/main" val="0"/>
-              </a:ext>
-            </a:extLst>
-          </a:blip>
-          <a:stretch>
-            <a:fillRect/>
-          </a:stretch>
-        </p:blipFill>
-        <p:spPr>
-          <a:xfrm>
-            <a:off x="3861203" y="1045243"/>
-            <a:ext cx="5247301" cy="5624117"/>
-          </a:xfrm>
-          <a:prstGeom prst="rect">
-            <a:avLst/>
-          </a:prstGeom>
-        </p:spPr>
-      </p:pic>
-      <p:sp>
-        <p:nvSpPr>
-          <p:cNvPr id="15" name="Text Box 5"/>
+              <a:rPr lang="ru-RU" sz="2800" dirty="0" smtClean="0"/>
+              <a:t>Описание поведения</a:t>
+            </a:r>
+          </a:p>
+          <a:p>
+            <a:r>
+              <a:rPr lang="ru-RU" sz="2800" dirty="0"/>
+              <a:t>н</a:t>
+            </a:r>
+            <a:r>
+              <a:rPr lang="ru-RU" sz="2800" dirty="0" smtClean="0"/>
+              <a:t>едетерминированный язык с охраняемыми командами</a:t>
+            </a:r>
+          </a:p>
+          <a:p>
+            <a:r>
+              <a:rPr lang="ru-RU" sz="2800" dirty="0"/>
+              <a:t>з</a:t>
+            </a:r>
+            <a:r>
+              <a:rPr lang="ru-RU" sz="2800" dirty="0" smtClean="0"/>
+              <a:t>адача языка – </a:t>
+            </a:r>
+            <a:r>
+              <a:rPr lang="ru-RU" sz="2800" b="1" dirty="0" smtClean="0"/>
+              <a:t>не</a:t>
+            </a:r>
+            <a:r>
+              <a:rPr lang="ru-RU" sz="2800" dirty="0" smtClean="0"/>
+              <a:t> предотвратить описание моделей плохих программ</a:t>
+            </a:r>
+          </a:p>
+          <a:p>
+            <a:r>
+              <a:rPr lang="ru-RU" sz="2800" dirty="0" smtClean="0"/>
+              <a:t>задача языка – разрешить описание моделей, которые могут быть верифицированы</a:t>
+            </a:r>
+          </a:p>
+        </p:txBody>
+      </p:sp>
+      <p:sp>
+        <p:nvSpPr>
+          <p:cNvPr id="9" name="Text Box 5"/>
           <p:cNvSpPr txBox="1">
             <a:spLocks noChangeArrowheads="1"/>
           </p:cNvSpPr>
@@ -5423,7 +5547,7 @@
     </p:spTree>
     <p:extLst>
       <p:ext uri="{BB962C8B-B14F-4D97-AF65-F5344CB8AC3E}">
-        <p14:creationId xmlns:p14="http://schemas.microsoft.com/office/powerpoint/2010/main" val="591149455"/>
+        <p14:creationId xmlns:p14="http://schemas.microsoft.com/office/powerpoint/2010/main" val="30331259"/>
       </p:ext>
     </p:extLst>
   </p:cSld>
@@ -5477,58 +5601,16 @@
           <a:bodyPr/>
           <a:lstStyle/>
           <a:p>
+            <a:pPr marL="0" indent="0"/>
+            <a:r>
+              <a:rPr lang="ru-RU" dirty="0"/>
+              <a:t>Модель на языке </a:t>
+            </a:r>
             <a:r>
               <a:rPr lang="en-US" dirty="0" err="1" smtClean="0"/>
               <a:t>Promela</a:t>
             </a:r>
-            <a:r>
-              <a:rPr lang="en-US" dirty="0" smtClean="0"/>
-              <a:t> </a:t>
-            </a:r>
-            <a:br>
-              <a:rPr lang="en-US" dirty="0" smtClean="0"/>
-            </a:br>
-            <a:r>
-              <a:rPr lang="en-US" dirty="0" smtClean="0"/>
-              <a:t>(</a:t>
-            </a:r>
-            <a:r>
-              <a:rPr lang="ru-RU" u="sng" dirty="0" err="1"/>
-              <a:t>Pro</a:t>
-            </a:r>
-            <a:r>
-              <a:rPr lang="ru-RU" dirty="0" err="1"/>
-              <a:t>tocol</a:t>
-            </a:r>
-            <a:r>
-              <a:rPr lang="ru-RU" dirty="0"/>
-              <a:t> </a:t>
-            </a:r>
-            <a:r>
-              <a:rPr lang="ru-RU" u="sng" dirty="0" err="1"/>
-              <a:t>Me</a:t>
-            </a:r>
-            <a:r>
-              <a:rPr lang="ru-RU" dirty="0" err="1"/>
-              <a:t>ta</a:t>
-            </a:r>
-            <a:r>
-              <a:rPr lang="ru-RU" dirty="0"/>
-              <a:t> </a:t>
-            </a:r>
-            <a:r>
-              <a:rPr lang="ru-RU" u="sng" dirty="0" err="1" smtClean="0"/>
-              <a:t>La</a:t>
-            </a:r>
-            <a:r>
-              <a:rPr lang="ru-RU" dirty="0" err="1" smtClean="0"/>
-              <a:t>nguage</a:t>
-            </a:r>
-            <a:r>
-              <a:rPr lang="en-US" dirty="0" smtClean="0"/>
-              <a:t>)</a:t>
-            </a:r>
-            <a:endParaRPr lang="ru-RU" dirty="0"/>
+            <a:endParaRPr lang="en-US" dirty="0"/>
           </a:p>
         </p:txBody>
       </p:sp>
@@ -5554,47 +5636,59 @@
           </a:bodyPr>
           <a:lstStyle/>
           <a:p>
-            <a:pPr marL="0" indent="0" algn="ctr">
-              <a:buNone/>
-            </a:pPr>
             <a:r>
               <a:rPr lang="ru-RU" sz="2800" dirty="0" smtClean="0"/>
-              <a:t>Описание поведения</a:t>
-            </a:r>
-          </a:p>
-          <a:p>
+              <a:t>абстракция </a:t>
+            </a:r>
             <a:r>
               <a:rPr lang="ru-RU" sz="2800" dirty="0"/>
-              <a:t>н</a:t>
+              <a:t>реальной системы, </a:t>
             </a:r>
             <a:r>
               <a:rPr lang="ru-RU" sz="2800" dirty="0" smtClean="0"/>
-              <a:t>едетерминированный язык с охраняемыми командами</a:t>
-            </a:r>
-          </a:p>
-          <a:p>
+              <a:t>содержащая </a:t>
+            </a:r>
             <a:r>
               <a:rPr lang="ru-RU" sz="2800" dirty="0"/>
-              <a:t>з</a:t>
+              <a:t>характеристики, которые </a:t>
             </a:r>
             <a:r>
               <a:rPr lang="ru-RU" sz="2800" dirty="0" smtClean="0"/>
-              <a:t>адача языка – </a:t>
-            </a:r>
-            <a:r>
-              <a:rPr lang="ru-RU" sz="2800" b="1" dirty="0" smtClean="0"/>
-              <a:t>не</a:t>
-            </a:r>
+              <a:t>значимы </a:t>
+            </a:r>
+            <a:r>
+              <a:rPr lang="ru-RU" sz="2800" dirty="0"/>
+              <a:t>для описания взаимодействия процессов</a:t>
+            </a:r>
+          </a:p>
+          <a:p>
             <a:r>
               <a:rPr lang="ru-RU" sz="2800" dirty="0" smtClean="0"/>
-              <a:t> предотвратить описание моделей плохих программ</a:t>
+              <a:t>не </a:t>
+            </a:r>
+            <a:r>
+              <a:rPr lang="ru-RU" sz="2800" dirty="0"/>
+              <a:t>является программной реализацией системы</a:t>
             </a:r>
           </a:p>
           <a:p>
             <a:r>
               <a:rPr lang="ru-RU" sz="2800" dirty="0" smtClean="0"/>
-              <a:t>задача языка – разрешить описание моделей, которые могут быть верифицированы</a:t>
-            </a:r>
+              <a:t>может </a:t>
+            </a:r>
+            <a:r>
+              <a:rPr lang="ru-RU" sz="2800" dirty="0"/>
+              <a:t>содержать части, которые важны только для </a:t>
+            </a:r>
+            <a:r>
+              <a:rPr lang="ru-RU" sz="2800" dirty="0" smtClean="0"/>
+              <a:t>верификации </a:t>
+            </a:r>
+            <a:r>
+              <a:rPr lang="ru-RU" sz="2800" dirty="0"/>
+              <a:t>протоколов</a:t>
+            </a:r>
+            <a:endParaRPr lang="en-US" sz="2800" dirty="0"/>
           </a:p>
         </p:txBody>
       </p:sp>
@@ -5660,7 +5754,7 @@
     </p:spTree>
     <p:extLst>
       <p:ext uri="{BB962C8B-B14F-4D97-AF65-F5344CB8AC3E}">
-        <p14:creationId xmlns:p14="http://schemas.microsoft.com/office/powerpoint/2010/main" val="30331259"/>
+        <p14:creationId xmlns:p14="http://schemas.microsoft.com/office/powerpoint/2010/main" val="342838871"/>
       </p:ext>
     </p:extLst>
   </p:cSld>
@@ -5706,213 +5800,6 @@
         </p:nvSpPr>
         <p:spPr>
           <a:xfrm>
-            <a:off x="457200" y="28600"/>
-            <a:ext cx="8229600" cy="1600200"/>
-          </a:xfrm>
-        </p:spPr>
-        <p:txBody>
-          <a:bodyPr/>
-          <a:lstStyle/>
-          <a:p>
-            <a:pPr marL="0" indent="0"/>
-            <a:r>
-              <a:rPr lang="ru-RU" dirty="0"/>
-              <a:t>Модель на языке </a:t>
-            </a:r>
-            <a:r>
-              <a:rPr lang="en-US" dirty="0" err="1" smtClean="0"/>
-              <a:t>Promela</a:t>
-            </a:r>
-            <a:endParaRPr lang="en-US" dirty="0"/>
-          </a:p>
-        </p:txBody>
-      </p:sp>
-      <p:sp>
-        <p:nvSpPr>
-          <p:cNvPr id="5" name="Объект 4"/>
-          <p:cNvSpPr>
-            <a:spLocks noGrp="1"/>
-          </p:cNvSpPr>
-          <p:nvPr>
-            <p:ph sz="quarter" idx="13"/>
-          </p:nvPr>
-        </p:nvSpPr>
-        <p:spPr>
-          <a:xfrm>
-            <a:off x="179512" y="1556792"/>
-            <a:ext cx="8784976" cy="4896544"/>
-          </a:xfrm>
-        </p:spPr>
-        <p:txBody>
-          <a:bodyPr>
-            <a:normAutofit/>
-          </a:bodyPr>
-          <a:lstStyle/>
-          <a:p>
-            <a:r>
-              <a:rPr lang="ru-RU" sz="2800" dirty="0" smtClean="0"/>
-              <a:t>абстракция </a:t>
-            </a:r>
-            <a:r>
-              <a:rPr lang="ru-RU" sz="2800" dirty="0"/>
-              <a:t>реальной системы, </a:t>
-            </a:r>
-            <a:r>
-              <a:rPr lang="ru-RU" sz="2800" dirty="0" smtClean="0"/>
-              <a:t>содержащая </a:t>
-            </a:r>
-            <a:r>
-              <a:rPr lang="ru-RU" sz="2800" dirty="0"/>
-              <a:t>характеристики, которые </a:t>
-            </a:r>
-            <a:r>
-              <a:rPr lang="ru-RU" sz="2800" dirty="0" smtClean="0"/>
-              <a:t>значимы </a:t>
-            </a:r>
-            <a:r>
-              <a:rPr lang="ru-RU" sz="2800" dirty="0"/>
-              <a:t>для описания взаимодействия процессов</a:t>
-            </a:r>
-          </a:p>
-          <a:p>
-            <a:r>
-              <a:rPr lang="ru-RU" sz="2800" dirty="0" smtClean="0"/>
-              <a:t>не </a:t>
-            </a:r>
-            <a:r>
-              <a:rPr lang="ru-RU" sz="2800" dirty="0"/>
-              <a:t>является программной реализацией системы</a:t>
-            </a:r>
-          </a:p>
-          <a:p>
-            <a:r>
-              <a:rPr lang="ru-RU" sz="2800" dirty="0" smtClean="0"/>
-              <a:t>может </a:t>
-            </a:r>
-            <a:r>
-              <a:rPr lang="ru-RU" sz="2800" dirty="0"/>
-              <a:t>содержать части, которые важны только для </a:t>
-            </a:r>
-            <a:r>
-              <a:rPr lang="ru-RU" sz="2800" dirty="0" smtClean="0"/>
-              <a:t>верификации </a:t>
-            </a:r>
-            <a:r>
-              <a:rPr lang="ru-RU" sz="2800" dirty="0"/>
-              <a:t>протоколов</a:t>
-            </a:r>
-            <a:endParaRPr lang="en-US" sz="2800" dirty="0"/>
-          </a:p>
-        </p:txBody>
-      </p:sp>
-      <p:sp>
-        <p:nvSpPr>
-          <p:cNvPr id="9" name="Text Box 5"/>
-          <p:cNvSpPr txBox="1">
-            <a:spLocks noChangeArrowheads="1"/>
-          </p:cNvSpPr>
-          <p:nvPr/>
-        </p:nvSpPr>
-        <p:spPr bwMode="auto">
-          <a:xfrm>
-            <a:off x="773262" y="6453336"/>
-            <a:ext cx="5886970" cy="190052"/>
-          </a:xfrm>
-          <a:prstGeom prst="rect">
-            <a:avLst/>
-          </a:prstGeom>
-          <a:noFill/>
-          <a:ln w="9525">
-            <a:noFill/>
-            <a:miter lim="800000"/>
-            <a:headEnd/>
-            <a:tailEnd/>
-          </a:ln>
-        </p:spPr>
-        <p:txBody>
-          <a:bodyPr wrap="square" lIns="0" tIns="0" rIns="0" bIns="0" anchor="b">
-            <a:spAutoFit/>
-          </a:bodyPr>
-          <a:lstStyle/>
-          <a:p>
-            <a:pPr>
-              <a:lnSpc>
-                <a:spcPct val="95000"/>
-              </a:lnSpc>
-            </a:pPr>
-            <a:r>
-              <a:rPr lang="ru-RU" sz="1300" dirty="0">
-                <a:solidFill>
-                  <a:srgbClr val="045C75"/>
-                </a:solidFill>
-              </a:rPr>
-              <a:t>АлтГТУ им. И. И. </a:t>
-            </a:r>
-            <a:r>
-              <a:rPr lang="ru-RU" sz="1300" dirty="0" smtClean="0">
-                <a:solidFill>
-                  <a:srgbClr val="045C75"/>
-                </a:solidFill>
-              </a:rPr>
-              <a:t>Ползунова / ПОВТ, Юлия Шатилина</a:t>
-            </a:r>
-            <a:endParaRPr lang="en-US" sz="1300" dirty="0">
-              <a:solidFill>
-                <a:srgbClr val="045C75"/>
-              </a:solidFill>
-            </a:endParaRPr>
-          </a:p>
-        </p:txBody>
-      </p:sp>
-    </p:spTree>
-    <p:extLst>
-      <p:ext uri="{BB962C8B-B14F-4D97-AF65-F5344CB8AC3E}">
-        <p14:creationId xmlns:p14="http://schemas.microsoft.com/office/powerpoint/2010/main" val="342838871"/>
-      </p:ext>
-    </p:extLst>
-  </p:cSld>
-  <p:clrMapOvr>
-    <a:masterClrMapping/>
-  </p:clrMapOvr>
-  <p:timing>
-    <p:tnLst>
-      <p:par>
-        <p:cTn id="1" dur="indefinite" restart="never" nodeType="tmRoot"/>
-      </p:par>
-    </p:tnLst>
-  </p:timing>
-</p:sld>
-</file>
-
-<file path=ppt/slides/slide13.xml><?xml version="1.0" encoding="utf-8"?>
-<p:sld xmlns:a="http://schemas.openxmlformats.org/drawingml/2006/main" xmlns:r="http://schemas.openxmlformats.org/officeDocument/2006/relationships" xmlns:p="http://schemas.openxmlformats.org/presentationml/2006/main">
-  <p:cSld>
-    <p:spTree>
-      <p:nvGrpSpPr>
-        <p:cNvPr id="1" name=""/>
-        <p:cNvGrpSpPr/>
-        <p:nvPr/>
-      </p:nvGrpSpPr>
-      <p:grpSpPr>
-        <a:xfrm>
-          <a:off x="0" y="0"/>
-          <a:ext cx="0" cy="0"/>
-          <a:chOff x="0" y="0"/>
-          <a:chExt cx="0" cy="0"/>
-        </a:xfrm>
-      </p:grpSpPr>
-      <p:sp>
-        <p:nvSpPr>
-          <p:cNvPr id="2" name="Заголовок 1"/>
-          <p:cNvSpPr>
-            <a:spLocks noGrp="1"/>
-          </p:cNvSpPr>
-          <p:nvPr>
-            <p:ph type="title"/>
-          </p:nvPr>
-        </p:nvSpPr>
-        <p:spPr>
-          <a:xfrm>
             <a:off x="0" y="-27384"/>
             <a:ext cx="9144000" cy="1600200"/>
           </a:xfrm>
@@ -6009,61 +5896,6 @@
             <a:r>
               <a:rPr lang="ru-RU" sz="2000" dirty="0" smtClean="0"/>
               <a:t>Позволяет описать как поведение системы представляется  во времени</a:t>
-            </a:r>
-          </a:p>
-          <a:p>
-            <a:pPr marL="0" indent="0" algn="ctr">
-              <a:buNone/>
-            </a:pPr>
-            <a:endParaRPr lang="ru-RU" sz="2000" dirty="0" smtClean="0"/>
-          </a:p>
-          <a:p>
-            <a:pPr marL="0" indent="0">
-              <a:buNone/>
-            </a:pPr>
-            <a:r>
-              <a:rPr lang="ru-RU" sz="2000" dirty="0" smtClean="0"/>
-              <a:t>Запись </a:t>
-            </a:r>
-            <a:r>
-              <a:rPr lang="ru-RU" sz="2000" dirty="0"/>
-              <a:t>LTL формул в SPIN:</a:t>
-            </a:r>
-          </a:p>
-          <a:p>
-            <a:r>
-              <a:rPr lang="ru-RU" sz="2000" dirty="0"/>
-              <a:t>&lt;&gt;  F когда-нибудь в будущем на каком-нибудь пути будет </a:t>
-            </a:r>
-          </a:p>
-          <a:p>
-            <a:pPr marL="0" indent="0">
-              <a:buNone/>
-            </a:pPr>
-            <a:r>
-              <a:rPr lang="ru-RU" sz="2000" dirty="0"/>
-              <a:t>выполняться свойство</a:t>
-            </a:r>
-          </a:p>
-          <a:p>
-            <a:r>
-              <a:rPr lang="ru-RU" sz="2000" dirty="0"/>
-              <a:t>[]  G всегда в будущем на всех путях будет выполняться </a:t>
-            </a:r>
-          </a:p>
-          <a:p>
-            <a:pPr marL="0" indent="0">
-              <a:buNone/>
-            </a:pPr>
-            <a:r>
-              <a:rPr lang="ru-RU" sz="2000" dirty="0"/>
-              <a:t>заданное свойство</a:t>
-            </a:r>
-          </a:p>
-          <a:p>
-            <a:r>
-              <a:rPr lang="ru-RU" sz="2000" dirty="0"/>
-              <a:t>!   ¬  отрицание</a:t>
             </a:r>
           </a:p>
         </p:txBody>
@@ -6147,7 +5979,7 @@
 </p:sld>
 </file>
 
-<file path=ppt/slides/slide14.xml><?xml version="1.0" encoding="utf-8"?>
+<file path=ppt/slides/slide13.xml><?xml version="1.0" encoding="utf-8"?>
 <p:sld xmlns:a="http://schemas.openxmlformats.org/drawingml/2006/main" xmlns:r="http://schemas.openxmlformats.org/officeDocument/2006/relationships" xmlns:p="http://schemas.openxmlformats.org/presentationml/2006/main">
   <p:cSld>
     <p:spTree>
@@ -6300,7 +6132,7 @@
 </p:sld>
 </file>
 
-<file path=ppt/slides/slide15.xml><?xml version="1.0" encoding="utf-8"?>
+<file path=ppt/slides/slide14.xml><?xml version="1.0" encoding="utf-8"?>
 <p:sld xmlns:a="http://schemas.openxmlformats.org/drawingml/2006/main" xmlns:r="http://schemas.openxmlformats.org/officeDocument/2006/relationships" xmlns:p="http://schemas.openxmlformats.org/presentationml/2006/main">
   <p:cSld>
     <p:spTree>
@@ -6454,6 +6286,266 @@
 </p:sld>
 </file>
 
+<file path=ppt/slides/slide15.xml><?xml version="1.0" encoding="utf-8"?>
+<p:sld xmlns:a="http://schemas.openxmlformats.org/drawingml/2006/main" xmlns:r="http://schemas.openxmlformats.org/officeDocument/2006/relationships" xmlns:p="http://schemas.openxmlformats.org/presentationml/2006/main">
+  <p:cSld>
+    <p:spTree>
+      <p:nvGrpSpPr>
+        <p:cNvPr id="1" name=""/>
+        <p:cNvGrpSpPr/>
+        <p:nvPr/>
+      </p:nvGrpSpPr>
+      <p:grpSpPr>
+        <a:xfrm>
+          <a:off x="0" y="0"/>
+          <a:ext cx="0" cy="0"/>
+          <a:chOff x="0" y="0"/>
+          <a:chExt cx="0" cy="0"/>
+        </a:xfrm>
+      </p:grpSpPr>
+      <p:sp>
+        <p:nvSpPr>
+          <p:cNvPr id="2" name="Заголовок 1"/>
+          <p:cNvSpPr>
+            <a:spLocks noGrp="1"/>
+          </p:cNvSpPr>
+          <p:nvPr>
+            <p:ph type="title"/>
+          </p:nvPr>
+        </p:nvSpPr>
+        <p:spPr>
+          <a:xfrm>
+            <a:off x="518864" y="-115416"/>
+            <a:ext cx="8229600" cy="1600200"/>
+          </a:xfrm>
+        </p:spPr>
+        <p:txBody>
+          <a:bodyPr/>
+          <a:lstStyle/>
+          <a:p>
+            <a:r>
+              <a:rPr lang="ru-RU" dirty="0" smtClean="0"/>
+              <a:t>Входные и выходные данные</a:t>
+            </a:r>
+            <a:endParaRPr lang="ru-RU" dirty="0"/>
+          </a:p>
+        </p:txBody>
+      </p:sp>
+      <p:sp>
+        <p:nvSpPr>
+          <p:cNvPr id="3" name="Текст 2"/>
+          <p:cNvSpPr>
+            <a:spLocks noGrp="1"/>
+          </p:cNvSpPr>
+          <p:nvPr>
+            <p:ph type="body" idx="1"/>
+          </p:nvPr>
+        </p:nvSpPr>
+        <p:spPr/>
+        <p:txBody>
+          <a:bodyPr/>
+          <a:lstStyle/>
+          <a:p>
+            <a:endParaRPr lang="ru-RU" dirty="0"/>
+          </a:p>
+        </p:txBody>
+      </p:sp>
+      <p:sp>
+        <p:nvSpPr>
+          <p:cNvPr id="5" name="Текст 4"/>
+          <p:cNvSpPr>
+            <a:spLocks noGrp="1"/>
+          </p:cNvSpPr>
+          <p:nvPr>
+            <p:ph type="body" sz="quarter" idx="3"/>
+          </p:nvPr>
+        </p:nvSpPr>
+        <p:spPr/>
+        <p:txBody>
+          <a:bodyPr/>
+          <a:lstStyle/>
+          <a:p>
+            <a:endParaRPr lang="ru-RU"/>
+          </a:p>
+        </p:txBody>
+      </p:sp>
+      <p:pic>
+        <p:nvPicPr>
+          <p:cNvPr id="8" name="Объект 7"/>
+          <p:cNvPicPr>
+            <a:picLocks noGrp="1" noChangeAspect="1"/>
+          </p:cNvPicPr>
+          <p:nvPr>
+            <p:ph sz="quarter" idx="13"/>
+          </p:nvPr>
+        </p:nvPicPr>
+        <p:blipFill>
+          <a:blip r:embed="rId3">
+            <a:extLst>
+              <a:ext uri="{28A0092B-C50C-407E-A947-70E740481C1C}">
+                <a14:useLocalDpi xmlns:a14="http://schemas.microsoft.com/office/drawing/2010/main" val="0"/>
+              </a:ext>
+            </a:extLst>
+          </a:blip>
+          <a:stretch>
+            <a:fillRect/>
+          </a:stretch>
+        </p:blipFill>
+        <p:spPr>
+          <a:xfrm>
+            <a:off x="107503" y="1412776"/>
+            <a:ext cx="3766331" cy="4968552"/>
+          </a:xfrm>
+        </p:spPr>
+      </p:pic>
+      <p:pic>
+        <p:nvPicPr>
+          <p:cNvPr id="9" name="Объект 8"/>
+          <p:cNvPicPr>
+            <a:picLocks noGrp="1" noChangeAspect="1"/>
+          </p:cNvPicPr>
+          <p:nvPr>
+            <p:ph sz="quarter" idx="14"/>
+          </p:nvPr>
+        </p:nvPicPr>
+        <p:blipFill>
+          <a:blip r:embed="rId4">
+            <a:extLst>
+              <a:ext uri="{28A0092B-C50C-407E-A947-70E740481C1C}">
+                <a14:useLocalDpi xmlns:a14="http://schemas.microsoft.com/office/drawing/2010/main" val="0"/>
+              </a:ext>
+            </a:extLst>
+          </a:blip>
+          <a:stretch>
+            <a:fillRect/>
+          </a:stretch>
+        </p:blipFill>
+        <p:spPr>
+          <a:xfrm>
+            <a:off x="4499992" y="1484784"/>
+            <a:ext cx="4464496" cy="4857312"/>
+          </a:xfrm>
+        </p:spPr>
+      </p:pic>
+      <p:sp>
+        <p:nvSpPr>
+          <p:cNvPr id="4" name="Text Box 5"/>
+          <p:cNvSpPr txBox="1">
+            <a:spLocks noChangeArrowheads="1"/>
+          </p:cNvSpPr>
+          <p:nvPr/>
+        </p:nvSpPr>
+        <p:spPr bwMode="auto">
+          <a:xfrm>
+            <a:off x="773262" y="6453336"/>
+            <a:ext cx="5886970" cy="190052"/>
+          </a:xfrm>
+          <a:prstGeom prst="rect">
+            <a:avLst/>
+          </a:prstGeom>
+          <a:noFill/>
+          <a:ln w="9525">
+            <a:noFill/>
+            <a:miter lim="800000"/>
+            <a:headEnd/>
+            <a:tailEnd/>
+          </a:ln>
+        </p:spPr>
+        <p:txBody>
+          <a:bodyPr wrap="square" lIns="0" tIns="0" rIns="0" bIns="0" anchor="b">
+            <a:spAutoFit/>
+          </a:bodyPr>
+          <a:lstStyle/>
+          <a:p>
+            <a:pPr>
+              <a:lnSpc>
+                <a:spcPct val="95000"/>
+              </a:lnSpc>
+            </a:pPr>
+            <a:r>
+              <a:rPr lang="ru-RU" sz="1300" dirty="0">
+                <a:solidFill>
+                  <a:srgbClr val="045C75"/>
+                </a:solidFill>
+              </a:rPr>
+              <a:t>АлтГТУ им. И. И. </a:t>
+            </a:r>
+            <a:r>
+              <a:rPr lang="ru-RU" sz="1300" dirty="0" smtClean="0">
+                <a:solidFill>
+                  <a:srgbClr val="045C75"/>
+                </a:solidFill>
+              </a:rPr>
+              <a:t>Ползунова / ПОВТ, Юлия Шатилина</a:t>
+            </a:r>
+            <a:endParaRPr lang="en-US" sz="1300" dirty="0">
+              <a:solidFill>
+                <a:srgbClr val="045C75"/>
+              </a:solidFill>
+            </a:endParaRPr>
+          </a:p>
+        </p:txBody>
+      </p:sp>
+      <p:sp>
+        <p:nvSpPr>
+          <p:cNvPr id="12" name="Стрелка вправо с вырезом 11"/>
+          <p:cNvSpPr/>
+          <p:nvPr/>
+        </p:nvSpPr>
+        <p:spPr>
+          <a:xfrm>
+            <a:off x="3716747" y="3477384"/>
+            <a:ext cx="1431317" cy="648072"/>
+          </a:xfrm>
+          <a:prstGeom prst="notchedRightArrow">
+            <a:avLst/>
+          </a:prstGeom>
+        </p:spPr>
+        <p:style>
+          <a:lnRef idx="2">
+            <a:schemeClr val="accent1">
+              <a:shade val="50000"/>
+            </a:schemeClr>
+          </a:lnRef>
+          <a:fillRef idx="1">
+            <a:schemeClr val="accent1"/>
+          </a:fillRef>
+          <a:effectRef idx="0">
+            <a:schemeClr val="accent1"/>
+          </a:effectRef>
+          <a:fontRef idx="minor">
+            <a:schemeClr val="lt1"/>
+          </a:fontRef>
+        </p:style>
+        <p:txBody>
+          <a:bodyPr rtlCol="0" anchor="ctr"/>
+          <a:lstStyle/>
+          <a:p>
+            <a:pPr algn="ctr"/>
+            <a:endParaRPr lang="ru-RU"/>
+          </a:p>
+        </p:txBody>
+      </p:sp>
+    </p:spTree>
+    <p:extLst>
+      <p:ext uri="{BB962C8B-B14F-4D97-AF65-F5344CB8AC3E}">
+        <p14:creationId xmlns:p14="http://schemas.microsoft.com/office/powerpoint/2010/main" val="3348012950"/>
+      </p:ext>
+    </p:extLst>
+  </p:cSld>
+  <p:clrMapOvr>
+    <a:masterClrMapping/>
+  </p:clrMapOvr>
+  <p:timing>
+    <p:tnLst>
+      <p:par>
+        <p:cTn id="1" dur="indefinite" restart="never" nodeType="tmRoot"/>
+      </p:par>
+    </p:tnLst>
+  </p:timing>
+</p:sld>
+</file>
+
 <file path=ppt/slides/slide16.xml><?xml version="1.0" encoding="utf-8"?>
 <p:sld xmlns:a="http://schemas.openxmlformats.org/drawingml/2006/main" xmlns:r="http://schemas.openxmlformats.org/officeDocument/2006/relationships" xmlns:p="http://schemas.openxmlformats.org/presentationml/2006/main">
   <p:cSld>
@@ -6760,6 +6852,96 @@
           </a:p>
         </p:txBody>
       </p:sp>
+      <p:pic>
+        <p:nvPicPr>
+          <p:cNvPr id="5" name="Рисунок 4"/>
+          <p:cNvPicPr>
+            <a:picLocks noChangeAspect="1"/>
+          </p:cNvPicPr>
+          <p:nvPr/>
+        </p:nvPicPr>
+        <p:blipFill>
+          <a:blip r:embed="rId2" cstate="print">
+            <a:extLst>
+              <a:ext uri="{28A0092B-C50C-407E-A947-70E740481C1C}">
+                <a14:useLocalDpi xmlns:a14="http://schemas.microsoft.com/office/drawing/2010/main" val="0"/>
+              </a:ext>
+            </a:extLst>
+          </a:blip>
+          <a:stretch>
+            <a:fillRect/>
+          </a:stretch>
+        </p:blipFill>
+        <p:spPr>
+          <a:xfrm>
+            <a:off x="7236296" y="2348879"/>
+            <a:ext cx="1005055" cy="1080121"/>
+          </a:xfrm>
+          <a:prstGeom prst="rect">
+            <a:avLst/>
+          </a:prstGeom>
+        </p:spPr>
+      </p:pic>
+      <p:pic>
+        <p:nvPicPr>
+          <p:cNvPr id="6" name="Объект 18"/>
+          <p:cNvPicPr>
+            <a:picLocks noChangeAspect="1"/>
+          </p:cNvPicPr>
+          <p:nvPr/>
+        </p:nvPicPr>
+        <p:blipFill>
+          <a:blip r:embed="rId3" cstate="print">
+            <a:extLst>
+              <a:ext uri="{28A0092B-C50C-407E-A947-70E740481C1C}">
+                <a14:useLocalDpi xmlns:a14="http://schemas.microsoft.com/office/drawing/2010/main" val="0"/>
+              </a:ext>
+            </a:extLst>
+          </a:blip>
+          <a:stretch>
+            <a:fillRect/>
+          </a:stretch>
+        </p:blipFill>
+        <p:spPr>
+          <a:xfrm>
+            <a:off x="5940152" y="1844824"/>
+            <a:ext cx="884701" cy="792088"/>
+          </a:xfrm>
+          <a:prstGeom prst="rect">
+            <a:avLst/>
+          </a:prstGeom>
+        </p:spPr>
+      </p:pic>
+      <p:pic>
+        <p:nvPicPr>
+          <p:cNvPr id="7" name="Рисунок 6"/>
+          <p:cNvPicPr>
+            <a:picLocks noChangeAspect="1"/>
+          </p:cNvPicPr>
+          <p:nvPr/>
+        </p:nvPicPr>
+        <p:blipFill>
+          <a:blip r:embed="rId4" cstate="print">
+            <a:extLst>
+              <a:ext uri="{28A0092B-C50C-407E-A947-70E740481C1C}">
+                <a14:useLocalDpi xmlns:a14="http://schemas.microsoft.com/office/drawing/2010/main" val="0"/>
+              </a:ext>
+            </a:extLst>
+          </a:blip>
+          <a:stretch>
+            <a:fillRect/>
+          </a:stretch>
+        </p:blipFill>
+        <p:spPr>
+          <a:xfrm>
+            <a:off x="7007034" y="5013176"/>
+            <a:ext cx="1882389" cy="1058327"/>
+          </a:xfrm>
+          <a:prstGeom prst="rect">
+            <a:avLst/>
+          </a:prstGeom>
+        </p:spPr>
+      </p:pic>
     </p:spTree>
     <p:extLst>
       <p:ext uri="{BB962C8B-B14F-4D97-AF65-F5344CB8AC3E}">
@@ -6833,7 +7015,7 @@
         <p:spPr/>
         <p:txBody>
           <a:bodyPr>
-            <a:normAutofit/>
+            <a:normAutofit lnSpcReduction="10000"/>
           </a:bodyPr>
           <a:lstStyle/>
           <a:p>
@@ -6930,6 +7112,42 @@
                 <a:latin typeface="+mn-lt"/>
               </a:rPr>
               <a:t>платформы</a:t>
+            </a:r>
+            <a:endParaRPr lang="en-US" dirty="0" smtClean="0">
+              <a:latin typeface="+mn-lt"/>
+            </a:endParaRPr>
+          </a:p>
+          <a:p>
+            <a:pPr>
+              <a:buFont typeface="Courier New" pitchFamily="49" charset="0"/>
+              <a:buChar char="o"/>
+            </a:pPr>
+            <a:endParaRPr lang="en-US" dirty="0">
+              <a:latin typeface="+mn-lt"/>
+            </a:endParaRPr>
+          </a:p>
+          <a:p>
+            <a:pPr>
+              <a:buFont typeface="Courier New" pitchFamily="49" charset="0"/>
+              <a:buChar char="o"/>
+            </a:pPr>
+            <a:r>
+              <a:rPr lang="ru-RU" b="1" dirty="0">
+                <a:latin typeface="+mn-lt"/>
+              </a:rPr>
+              <a:t>в</a:t>
+            </a:r>
+            <a:r>
+              <a:rPr lang="ru-RU" b="1" dirty="0" smtClean="0">
+                <a:latin typeface="+mn-lt"/>
+              </a:rPr>
+              <a:t>изуализация</a:t>
+            </a:r>
+            <a:r>
+              <a:rPr lang="ru-RU" dirty="0" smtClean="0">
+                <a:latin typeface="+mn-lt"/>
+              </a:rPr>
+              <a:t> внутреннего представления</a:t>
             </a:r>
             <a:endParaRPr lang="en-US" dirty="0" smtClean="0">
               <a:latin typeface="+mn-lt"/>
@@ -7143,6 +7361,101 @@
 </p:sld>
 </file>
 
+<file path=ppt/slides/slide19.xml><?xml version="1.0" encoding="utf-8"?>
+<p:sld xmlns:a="http://schemas.openxmlformats.org/drawingml/2006/main" xmlns:r="http://schemas.openxmlformats.org/officeDocument/2006/relationships" xmlns:p="http://schemas.openxmlformats.org/presentationml/2006/main">
+  <p:cSld>
+    <p:spTree>
+      <p:nvGrpSpPr>
+        <p:cNvPr id="1" name=""/>
+        <p:cNvGrpSpPr/>
+        <p:nvPr/>
+      </p:nvGrpSpPr>
+      <p:grpSpPr>
+        <a:xfrm>
+          <a:off x="0" y="0"/>
+          <a:ext cx="0" cy="0"/>
+          <a:chOff x="0" y="0"/>
+          <a:chExt cx="0" cy="0"/>
+        </a:xfrm>
+      </p:grpSpPr>
+      <p:sp>
+        <p:nvSpPr>
+          <p:cNvPr id="4" name="Заголовок 3"/>
+          <p:cNvSpPr>
+            <a:spLocks noGrp="1"/>
+          </p:cNvSpPr>
+          <p:nvPr>
+            <p:ph type="title"/>
+          </p:nvPr>
+        </p:nvSpPr>
+        <p:spPr/>
+        <p:txBody>
+          <a:bodyPr/>
+          <a:lstStyle/>
+          <a:p>
+            <a:r>
+              <a:rPr lang="en-US" dirty="0" smtClean="0"/>
+              <a:t>Backup</a:t>
+            </a:r>
+            <a:endParaRPr lang="ru-RU" dirty="0"/>
+          </a:p>
+        </p:txBody>
+      </p:sp>
+      <p:sp>
+        <p:nvSpPr>
+          <p:cNvPr id="5" name="Объект 4"/>
+          <p:cNvSpPr>
+            <a:spLocks noGrp="1"/>
+          </p:cNvSpPr>
+          <p:nvPr>
+            <p:ph idx="1"/>
+          </p:nvPr>
+        </p:nvSpPr>
+        <p:spPr/>
+        <p:txBody>
+          <a:bodyPr/>
+          <a:lstStyle/>
+          <a:p>
+            <a:r>
+              <a:rPr lang="en-US" dirty="0" smtClean="0"/>
+              <a:t>AST</a:t>
+            </a:r>
+            <a:r>
+              <a:rPr lang="ru-RU" dirty="0" smtClean="0"/>
+              <a:t> (</a:t>
+            </a:r>
+            <a:r>
+              <a:rPr lang="en-US" dirty="0" smtClean="0"/>
+              <a:t>Abstract Syntax Tree</a:t>
+            </a:r>
+            <a:r>
+              <a:rPr lang="ru-RU" dirty="0" smtClean="0"/>
+              <a:t>)</a:t>
+            </a:r>
+            <a:endParaRPr lang="en-US" dirty="0" smtClean="0"/>
+          </a:p>
+          <a:p>
+            <a:r>
+              <a:rPr lang="en-US" dirty="0" smtClean="0"/>
+              <a:t>CFG (Control Flow Graph)</a:t>
+            </a:r>
+            <a:endParaRPr lang="ru-RU" dirty="0"/>
+          </a:p>
+        </p:txBody>
+      </p:sp>
+    </p:spTree>
+    <p:extLst>
+      <p:ext uri="{BB962C8B-B14F-4D97-AF65-F5344CB8AC3E}">
+        <p14:creationId xmlns:p14="http://schemas.microsoft.com/office/powerpoint/2010/main" val="3915480845"/>
+      </p:ext>
+    </p:extLst>
+  </p:cSld>
+  <p:clrMapOvr>
+    <a:masterClrMapping/>
+  </p:clrMapOvr>
+</p:sld>
+</file>
+
 <file path=ppt/slides/slide2.xml><?xml version="1.0" encoding="utf-8"?>
 <p:sld xmlns:a="http://schemas.openxmlformats.org/drawingml/2006/main" xmlns:r="http://schemas.openxmlformats.org/officeDocument/2006/relationships" xmlns:p="http://schemas.openxmlformats.org/presentationml/2006/main">
   <p:cSld>
@@ -7321,6 +7634,166 @@
       </p:par>
     </p:tnLst>
   </p:timing>
+</p:sld>
+</file>
+
+<file path=ppt/slides/slide20.xml><?xml version="1.0" encoding="utf-8"?>
+<p:sld xmlns:a="http://schemas.openxmlformats.org/drawingml/2006/main" xmlns:r="http://schemas.openxmlformats.org/officeDocument/2006/relationships" xmlns:p="http://schemas.openxmlformats.org/presentationml/2006/main">
+  <p:cSld>
+    <p:spTree>
+      <p:nvGrpSpPr>
+        <p:cNvPr id="1" name=""/>
+        <p:cNvGrpSpPr/>
+        <p:nvPr/>
+      </p:nvGrpSpPr>
+      <p:grpSpPr>
+        <a:xfrm>
+          <a:off x="0" y="0"/>
+          <a:ext cx="0" cy="0"/>
+          <a:chOff x="0" y="0"/>
+          <a:chExt cx="0" cy="0"/>
+        </a:xfrm>
+      </p:grpSpPr>
+      <p:sp>
+        <p:nvSpPr>
+          <p:cNvPr id="4" name="Заголовок 3"/>
+          <p:cNvSpPr>
+            <a:spLocks noGrp="1"/>
+          </p:cNvSpPr>
+          <p:nvPr>
+            <p:ph type="title"/>
+          </p:nvPr>
+        </p:nvSpPr>
+        <p:spPr/>
+        <p:txBody>
+          <a:bodyPr/>
+          <a:lstStyle/>
+          <a:p>
+            <a:r>
+              <a:rPr lang="en-US" dirty="0" smtClean="0"/>
+              <a:t>Backup</a:t>
+            </a:r>
+            <a:endParaRPr lang="ru-RU" dirty="0"/>
+          </a:p>
+        </p:txBody>
+      </p:sp>
+      <p:sp>
+        <p:nvSpPr>
+          <p:cNvPr id="5" name="Объект 4"/>
+          <p:cNvSpPr>
+            <a:spLocks noGrp="1"/>
+          </p:cNvSpPr>
+          <p:nvPr>
+            <p:ph idx="1"/>
+          </p:nvPr>
+        </p:nvSpPr>
+        <p:spPr/>
+        <p:txBody>
+          <a:bodyPr/>
+          <a:lstStyle/>
+          <a:p>
+            <a:r>
+              <a:rPr lang="ru-RU" dirty="0" smtClean="0"/>
+              <a:t>Грамматика в форме Бэкуса-Наура</a:t>
+            </a:r>
+            <a:endParaRPr lang="ru-RU" dirty="0"/>
+          </a:p>
+        </p:txBody>
+      </p:sp>
+    </p:spTree>
+    <p:extLst>
+      <p:ext uri="{BB962C8B-B14F-4D97-AF65-F5344CB8AC3E}">
+        <p14:creationId xmlns:p14="http://schemas.microsoft.com/office/powerpoint/2010/main" val="224204687"/>
+      </p:ext>
+    </p:extLst>
+  </p:cSld>
+  <p:clrMapOvr>
+    <a:masterClrMapping/>
+  </p:clrMapOvr>
+</p:sld>
+</file>
+
+<file path=ppt/slides/slide21.xml><?xml version="1.0" encoding="utf-8"?>
+<p:sld xmlns:a="http://schemas.openxmlformats.org/drawingml/2006/main" xmlns:r="http://schemas.openxmlformats.org/officeDocument/2006/relationships" xmlns:p="http://schemas.openxmlformats.org/presentationml/2006/main">
+  <p:cSld>
+    <p:spTree>
+      <p:nvGrpSpPr>
+        <p:cNvPr id="1" name=""/>
+        <p:cNvGrpSpPr/>
+        <p:nvPr/>
+      </p:nvGrpSpPr>
+      <p:grpSpPr>
+        <a:xfrm>
+          <a:off x="0" y="0"/>
+          <a:ext cx="0" cy="0"/>
+          <a:chOff x="0" y="0"/>
+          <a:chExt cx="0" cy="0"/>
+        </a:xfrm>
+      </p:grpSpPr>
+      <p:sp>
+        <p:nvSpPr>
+          <p:cNvPr id="4" name="Заголовок 3"/>
+          <p:cNvSpPr>
+            <a:spLocks noGrp="1"/>
+          </p:cNvSpPr>
+          <p:nvPr>
+            <p:ph type="title"/>
+          </p:nvPr>
+        </p:nvSpPr>
+        <p:spPr/>
+        <p:txBody>
+          <a:bodyPr/>
+          <a:lstStyle/>
+          <a:p>
+            <a:r>
+              <a:rPr lang="en-US" dirty="0" smtClean="0"/>
+              <a:t>Backup</a:t>
+            </a:r>
+            <a:endParaRPr lang="ru-RU" dirty="0"/>
+          </a:p>
+        </p:txBody>
+      </p:sp>
+      <p:sp>
+        <p:nvSpPr>
+          <p:cNvPr id="5" name="Объект 4"/>
+          <p:cNvSpPr>
+            <a:spLocks noGrp="1"/>
+          </p:cNvSpPr>
+          <p:nvPr>
+            <p:ph idx="1"/>
+          </p:nvPr>
+        </p:nvSpPr>
+        <p:spPr/>
+        <p:txBody>
+          <a:bodyPr/>
+          <a:lstStyle/>
+          <a:p>
+            <a:r>
+              <a:rPr lang="en-US" dirty="0" smtClean="0"/>
+              <a:t>Plug-in </a:t>
+            </a:r>
+            <a:r>
+              <a:rPr lang="ru-RU" dirty="0" smtClean="0"/>
+              <a:t>для </a:t>
+            </a:r>
+            <a:r>
+              <a:rPr lang="en-US" dirty="0" smtClean="0"/>
+              <a:t>Eclipse</a:t>
+            </a:r>
+            <a:endParaRPr lang="ru-RU" dirty="0"/>
+          </a:p>
+        </p:txBody>
+      </p:sp>
+    </p:spTree>
+    <p:extLst>
+      <p:ext uri="{BB962C8B-B14F-4D97-AF65-F5344CB8AC3E}">
+        <p14:creationId xmlns:p14="http://schemas.microsoft.com/office/powerpoint/2010/main" val="224204687"/>
+      </p:ext>
+    </p:extLst>
+  </p:cSld>
+  <p:clrMapOvr>
+    <a:masterClrMapping/>
+  </p:clrMapOvr>
 </p:sld>
 </file>
 
@@ -8213,41 +8686,6 @@
           </a:p>
         </p:txBody>
       </p:sp>
-      <p:sp>
-        <p:nvSpPr>
-          <p:cNvPr id="9" name="Объект 10"/>
-          <p:cNvSpPr>
-            <a:spLocks noGrp="1"/>
-          </p:cNvSpPr>
-          <p:nvPr>
-            <p:ph sz="quarter" idx="4294967295"/>
-          </p:nvPr>
-        </p:nvSpPr>
-        <p:spPr>
-          <a:xfrm>
-            <a:off x="179512" y="1772816"/>
-            <a:ext cx="4536504" cy="4608512"/>
-          </a:xfrm>
-          <a:prstGeom prst="rect">
-            <a:avLst/>
-          </a:prstGeom>
-        </p:spPr>
-        <p:txBody>
-          <a:bodyPr>
-            <a:normAutofit/>
-          </a:bodyPr>
-          <a:lstStyle/>
-          <a:p>
-            <a:pPr marL="0" indent="0">
-              <a:buNone/>
-            </a:pPr>
-            <a:r>
-              <a:rPr lang="ru-RU" sz="3200" dirty="0"/>
-              <a:t>метод автоматической формальной верификации систем с конечным числом состояний</a:t>
-            </a:r>
-          </a:p>
-        </p:txBody>
-      </p:sp>
       <p:pic>
         <p:nvPicPr>
           <p:cNvPr id="10" name="Рисунок 9"/>
@@ -8270,8 +8708,8 @@
         </p:blipFill>
         <p:spPr>
           <a:xfrm>
-            <a:off x="3851920" y="1080120"/>
-            <a:ext cx="5244992" cy="5301208"/>
+            <a:off x="1991304" y="861009"/>
+            <a:ext cx="5533024" cy="5592327"/>
           </a:xfrm>
           <a:prstGeom prst="rect">
             <a:avLst/>
@@ -8437,14 +8875,10 @@
             <a:spLocks noGrp="1"/>
           </p:cNvSpPr>
           <p:nvPr>
-            <p:ph sz="quarter" idx="4294967295"/>
+            <p:ph idx="1"/>
           </p:nvPr>
         </p:nvSpPr>
         <p:spPr>
-          <a:xfrm>
-            <a:off x="457200" y="1412776"/>
-            <a:ext cx="8229600" cy="4968552"/>
-          </a:xfrm>
           <a:prstGeom prst="rect">
             <a:avLst/>
           </a:prstGeom>
@@ -8456,29 +8890,52 @@
           <a:lstStyle/>
           <a:p>
             <a:r>
-              <a:rPr lang="ru-RU" sz="3200" dirty="0" smtClean="0"/>
-              <a:t>Проверка свойства на конечной модели программы</a:t>
-            </a:r>
-            <a:endParaRPr lang="en-US" sz="3200" dirty="0"/>
-          </a:p>
-          <a:p>
-            <a:r>
-              <a:rPr lang="ru-RU" sz="3200" dirty="0" smtClean="0"/>
-              <a:t>Свойства – в терминах значения предикатов в состоянии программы и последовательность значений</a:t>
-            </a:r>
-          </a:p>
-          <a:p>
-            <a:r>
-              <a:rPr lang="ru-RU" sz="3200" dirty="0" smtClean="0"/>
-              <a:t>Исчерпывающий поиск по пространству состояний</a:t>
-            </a:r>
-            <a:endParaRPr lang="en-US" sz="3200" dirty="0" smtClean="0"/>
-          </a:p>
-          <a:p>
-            <a:pPr marL="0" indent="0">
-              <a:buNone/>
-            </a:pPr>
-            <a:endParaRPr lang="ru-RU" sz="3200" dirty="0"/>
+              <a:rPr lang="ru-RU" sz="4000" dirty="0" smtClean="0"/>
+              <a:t>Достоинства</a:t>
+            </a:r>
+          </a:p>
+          <a:p>
+            <a:pPr lvl="1"/>
+            <a:r>
+              <a:rPr lang="ru-RU" sz="2000" dirty="0" smtClean="0"/>
+              <a:t>Хорошо автоматизируется</a:t>
+            </a:r>
+          </a:p>
+          <a:p>
+            <a:pPr lvl="1"/>
+            <a:r>
+              <a:rPr lang="ru-RU" sz="2000" dirty="0" smtClean="0"/>
+              <a:t>Если модель конечна, корректна и адекватна проверяемому свойству, то да</a:t>
+            </a:r>
+            <a:r>
+              <a:rPr lang="ru-RU" sz="2000" dirty="0"/>
+              <a:t>ё</a:t>
+            </a:r>
+            <a:r>
+              <a:rPr lang="ru-RU" sz="2000" dirty="0" smtClean="0"/>
+              <a:t>тся точный ответ</a:t>
+            </a:r>
+          </a:p>
+          <a:p>
+            <a:pPr lvl="1"/>
+            <a:r>
+              <a:rPr lang="ru-RU" sz="2000" dirty="0" smtClean="0"/>
+              <a:t>Выявляются все ошибки, в том числе редкие</a:t>
+            </a:r>
+          </a:p>
+          <a:p>
+            <a:r>
+              <a:rPr lang="ru-RU" sz="4000" dirty="0" smtClean="0"/>
+              <a:t>Недостатки</a:t>
+            </a:r>
+          </a:p>
+          <a:p>
+            <a:pPr lvl="1"/>
+            <a:r>
+              <a:rPr lang="ru-RU" sz="2000" dirty="0" smtClean="0"/>
+              <a:t>Работает только для конечных моделей</a:t>
+            </a:r>
+            <a:endParaRPr lang="ru-RU" sz="2000" dirty="0"/>
           </a:p>
         </p:txBody>
       </p:sp>
@@ -8541,7 +8998,7 @@
     </p:spTree>
     <p:extLst>
       <p:ext uri="{BB962C8B-B14F-4D97-AF65-F5344CB8AC3E}">
-        <p14:creationId xmlns:p14="http://schemas.microsoft.com/office/powerpoint/2010/main" val="1595038213"/>
+        <p14:creationId xmlns:p14="http://schemas.microsoft.com/office/powerpoint/2010/main" val="1962961086"/>
       </p:ext>
     </p:extLst>
   </p:cSld>
@@ -8577,137 +9034,7 @@
       </p:grpSpPr>
       <p:sp>
         <p:nvSpPr>
-          <p:cNvPr id="4" name="Text Box 5"/>
-          <p:cNvSpPr txBox="1">
-            <a:spLocks noChangeArrowheads="1"/>
-          </p:cNvSpPr>
-          <p:nvPr/>
-        </p:nvSpPr>
-        <p:spPr bwMode="auto">
-          <a:xfrm>
-            <a:off x="773262" y="6453336"/>
-            <a:ext cx="5886970" cy="190052"/>
-          </a:xfrm>
-          <a:prstGeom prst="rect">
-            <a:avLst/>
-          </a:prstGeom>
-          <a:noFill/>
-          <a:ln w="9525">
-            <a:noFill/>
-            <a:miter lim="800000"/>
-            <a:headEnd/>
-            <a:tailEnd/>
-          </a:ln>
-        </p:spPr>
-        <p:txBody>
-          <a:bodyPr wrap="square" lIns="0" tIns="0" rIns="0" bIns="0" anchor="b">
-            <a:spAutoFit/>
-          </a:bodyPr>
-          <a:lstStyle/>
-          <a:p>
-            <a:pPr>
-              <a:lnSpc>
-                <a:spcPct val="95000"/>
-              </a:lnSpc>
-            </a:pPr>
-            <a:r>
-              <a:rPr lang="ru-RU" sz="1300" dirty="0">
-                <a:solidFill>
-                  <a:srgbClr val="045C75"/>
-                </a:solidFill>
-              </a:rPr>
-              <a:t>АлтГТУ им. И. И. </a:t>
-            </a:r>
-            <a:r>
-              <a:rPr lang="ru-RU" sz="1300" dirty="0" smtClean="0">
-                <a:solidFill>
-                  <a:srgbClr val="045C75"/>
-                </a:solidFill>
-              </a:rPr>
-              <a:t>Ползунова / ПОВТ, Юлия Шатилина</a:t>
-            </a:r>
-            <a:endParaRPr lang="en-US" sz="1300" dirty="0">
-              <a:solidFill>
-                <a:srgbClr val="045C75"/>
-              </a:solidFill>
-            </a:endParaRPr>
-          </a:p>
-        </p:txBody>
-      </p:sp>
-      <p:sp>
-        <p:nvSpPr>
-          <p:cNvPr id="9" name="Объект 10"/>
-          <p:cNvSpPr>
-            <a:spLocks noGrp="1"/>
-          </p:cNvSpPr>
-          <p:nvPr>
-            <p:ph idx="1"/>
-          </p:nvPr>
-        </p:nvSpPr>
-        <p:spPr>
-          <a:prstGeom prst="rect">
-            <a:avLst/>
-          </a:prstGeom>
-        </p:spPr>
-        <p:txBody>
-          <a:bodyPr>
-            <a:normAutofit/>
-          </a:bodyPr>
-          <a:lstStyle/>
-          <a:p>
-            <a:r>
-              <a:rPr lang="ru-RU" sz="4000" dirty="0" smtClean="0"/>
-              <a:t>Достоинства</a:t>
-            </a:r>
-          </a:p>
-          <a:p>
-            <a:pPr lvl="1"/>
-            <a:r>
-              <a:rPr lang="ru-RU" sz="2000" dirty="0" smtClean="0"/>
-              <a:t>Хорошо автоматизируется</a:t>
-            </a:r>
-          </a:p>
-          <a:p>
-            <a:pPr lvl="1"/>
-            <a:r>
-              <a:rPr lang="ru-RU" sz="2000" dirty="0" smtClean="0"/>
-              <a:t>Если модель конечна, корректна и адекватна проверяемому свойству, то </a:t>
-            </a:r>
-            <a:r>
-              <a:rPr lang="ru-RU" sz="2000" dirty="0" err="1" smtClean="0"/>
-              <a:t>дается</a:t>
-            </a:r>
-            <a:r>
-              <a:rPr lang="ru-RU" sz="2000" dirty="0" smtClean="0"/>
-              <a:t> точный ответ</a:t>
-            </a:r>
-          </a:p>
-          <a:p>
-            <a:pPr lvl="1"/>
-            <a:r>
-              <a:rPr lang="ru-RU" sz="2000" dirty="0" smtClean="0"/>
-              <a:t>Выявляются все ошибки, в том числе редкие</a:t>
-            </a:r>
-          </a:p>
-          <a:p>
-            <a:r>
-              <a:rPr lang="ru-RU" sz="4000" dirty="0" smtClean="0"/>
-              <a:t>Недостатки</a:t>
-            </a:r>
-          </a:p>
-          <a:p>
-            <a:pPr lvl="1"/>
-            <a:r>
-              <a:rPr lang="ru-RU" sz="2000" dirty="0" smtClean="0"/>
-              <a:t>Работает только для конечных моделей</a:t>
-            </a:r>
-            <a:endParaRPr lang="ru-RU" sz="2000" dirty="0"/>
-          </a:p>
-        </p:txBody>
-      </p:sp>
-      <p:sp>
-        <p:nvSpPr>
-          <p:cNvPr id="11" name="Заголовок 1"/>
+          <p:cNvPr id="8" name="Заголовок 1"/>
           <p:cNvSpPr txBox="1">
             <a:spLocks/>
           </p:cNvSpPr>
@@ -8754,17 +9081,229 @@
           </a:lstStyle>
           <a:p>
             <a:r>
-              <a:rPr lang="en-US" dirty="0"/>
-              <a:t>Model Checking</a:t>
+              <a:rPr lang="en-US" dirty="0" smtClean="0"/>
+              <a:t>SPIN</a:t>
             </a:r>
             <a:endParaRPr lang="ru-RU" dirty="0"/>
+          </a:p>
+        </p:txBody>
+      </p:sp>
+      <p:pic>
+        <p:nvPicPr>
+          <p:cNvPr id="13" name="Рисунок 12"/>
+          <p:cNvPicPr>
+            <a:picLocks noChangeAspect="1"/>
+          </p:cNvPicPr>
+          <p:nvPr/>
+        </p:nvPicPr>
+        <p:blipFill>
+          <a:blip r:embed="rId3">
+            <a:extLst>
+              <a:ext uri="{28A0092B-C50C-407E-A947-70E740481C1C}">
+                <a14:useLocalDpi xmlns:a14="http://schemas.microsoft.com/office/drawing/2010/main" val="0"/>
+              </a:ext>
+            </a:extLst>
+          </a:blip>
+          <a:stretch>
+            <a:fillRect/>
+          </a:stretch>
+        </p:blipFill>
+        <p:spPr>
+          <a:xfrm>
+            <a:off x="2061003" y="836712"/>
+            <a:ext cx="5247301" cy="5624117"/>
+          </a:xfrm>
+          <a:prstGeom prst="rect">
+            <a:avLst/>
+          </a:prstGeom>
+        </p:spPr>
+      </p:pic>
+      <p:sp>
+        <p:nvSpPr>
+          <p:cNvPr id="15" name="Text Box 5"/>
+          <p:cNvSpPr txBox="1">
+            <a:spLocks noChangeArrowheads="1"/>
+          </p:cNvSpPr>
+          <p:nvPr/>
+        </p:nvSpPr>
+        <p:spPr bwMode="auto">
+          <a:xfrm>
+            <a:off x="773262" y="6453336"/>
+            <a:ext cx="5886970" cy="190052"/>
+          </a:xfrm>
+          <a:prstGeom prst="rect">
+            <a:avLst/>
+          </a:prstGeom>
+          <a:noFill/>
+          <a:ln w="9525">
+            <a:noFill/>
+            <a:miter lim="800000"/>
+            <a:headEnd/>
+            <a:tailEnd/>
+          </a:ln>
+        </p:spPr>
+        <p:txBody>
+          <a:bodyPr wrap="square" lIns="0" tIns="0" rIns="0" bIns="0" anchor="b">
+            <a:spAutoFit/>
+          </a:bodyPr>
+          <a:lstStyle/>
+          <a:p>
+            <a:pPr>
+              <a:lnSpc>
+                <a:spcPct val="95000"/>
+              </a:lnSpc>
+            </a:pPr>
+            <a:r>
+              <a:rPr lang="ru-RU" sz="1300" dirty="0">
+                <a:solidFill>
+                  <a:srgbClr val="045C75"/>
+                </a:solidFill>
+              </a:rPr>
+              <a:t>АлтГТУ им. И. И. </a:t>
+            </a:r>
+            <a:r>
+              <a:rPr lang="ru-RU" sz="1300" dirty="0" smtClean="0">
+                <a:solidFill>
+                  <a:srgbClr val="045C75"/>
+                </a:solidFill>
+              </a:rPr>
+              <a:t>Ползунова / ПОВТ, Юлия Шатилина</a:t>
+            </a:r>
+            <a:endParaRPr lang="en-US" sz="1300" dirty="0">
+              <a:solidFill>
+                <a:srgbClr val="045C75"/>
+              </a:solidFill>
+            </a:endParaRPr>
+          </a:p>
+        </p:txBody>
+      </p:sp>
+      <p:sp>
+        <p:nvSpPr>
+          <p:cNvPr id="16" name="TextBox 15"/>
+          <p:cNvSpPr txBox="1"/>
+          <p:nvPr/>
+        </p:nvSpPr>
+        <p:spPr>
+          <a:xfrm>
+            <a:off x="1043608" y="3356992"/>
+            <a:ext cx="184731" cy="369332"/>
+          </a:xfrm>
+          <a:prstGeom prst="rect">
+            <a:avLst/>
+          </a:prstGeom>
+          <a:noFill/>
+        </p:spPr>
+        <p:txBody>
+          <a:bodyPr wrap="none" rtlCol="0">
+            <a:spAutoFit/>
+          </a:bodyPr>
+          <a:lstStyle/>
+          <a:p>
+            <a:endParaRPr lang="ru-RU" dirty="0"/>
+          </a:p>
+        </p:txBody>
+      </p:sp>
+      <p:sp>
+        <p:nvSpPr>
+          <p:cNvPr id="19" name="Объект 18"/>
+          <p:cNvSpPr>
+            <a:spLocks noGrp="1"/>
+          </p:cNvSpPr>
+          <p:nvPr>
+            <p:ph sz="quarter" idx="13"/>
+          </p:nvPr>
+        </p:nvSpPr>
+        <p:spPr>
+          <a:xfrm>
+            <a:off x="611560" y="3472408"/>
+            <a:ext cx="1944216" cy="892696"/>
+          </a:xfrm>
+        </p:spPr>
+        <p:txBody>
+          <a:bodyPr>
+            <a:noAutofit/>
+          </a:bodyPr>
+          <a:lstStyle/>
+          <a:p>
+            <a:pPr marL="0" indent="0">
+              <a:buNone/>
+            </a:pPr>
+            <a:r>
+              <a:rPr lang="ru-RU" b="1" dirty="0" err="1"/>
+              <a:t>S</a:t>
+            </a:r>
+            <a:r>
+              <a:rPr lang="ru-RU" dirty="0" err="1"/>
+              <a:t>imple</a:t>
+            </a:r>
+            <a:r>
+              <a:rPr lang="ru-RU" dirty="0"/>
+              <a:t> </a:t>
+            </a:r>
+            <a:r>
+              <a:rPr lang="ru-RU" b="1" dirty="0" err="1"/>
+              <a:t>P</a:t>
+            </a:r>
+            <a:r>
+              <a:rPr lang="ru-RU" dirty="0" err="1"/>
+              <a:t>romela</a:t>
+            </a:r>
+            <a:r>
+              <a:rPr lang="ru-RU" dirty="0"/>
+              <a:t> </a:t>
+            </a:r>
+            <a:r>
+              <a:rPr lang="ru-RU" b="1" dirty="0" err="1"/>
+              <a:t>In</a:t>
+            </a:r>
+            <a:r>
+              <a:rPr lang="ru-RU" dirty="0" err="1"/>
+              <a:t>terpreter</a:t>
+            </a:r>
+            <a:endParaRPr lang="en-US" dirty="0"/>
+          </a:p>
+          <a:p>
+            <a:endParaRPr lang="ru-RU" dirty="0"/>
+          </a:p>
+        </p:txBody>
+      </p:sp>
+      <p:sp>
+        <p:nvSpPr>
+          <p:cNvPr id="20" name="Объект 18"/>
+          <p:cNvSpPr>
+            <a:spLocks noGrp="1"/>
+          </p:cNvSpPr>
+          <p:nvPr>
+            <p:ph sz="quarter" idx="13"/>
+          </p:nvPr>
+        </p:nvSpPr>
+        <p:spPr>
+          <a:xfrm>
+            <a:off x="107504" y="3212976"/>
+            <a:ext cx="1944216" cy="576064"/>
+          </a:xfrm>
+        </p:spPr>
+        <p:txBody>
+          <a:bodyPr>
+            <a:noAutofit/>
+          </a:bodyPr>
+          <a:lstStyle/>
+          <a:p>
+            <a:pPr marL="0" indent="0">
+              <a:buNone/>
+            </a:pPr>
+            <a:r>
+              <a:rPr lang="en-US" sz="8800" b="1" dirty="0"/>
+              <a:t>{</a:t>
+            </a:r>
+            <a:endParaRPr lang="ru-RU" sz="8800" dirty="0"/>
           </a:p>
         </p:txBody>
       </p:sp>
     </p:spTree>
     <p:extLst>
       <p:ext uri="{BB962C8B-B14F-4D97-AF65-F5344CB8AC3E}">
-        <p14:creationId xmlns:p14="http://schemas.microsoft.com/office/powerpoint/2010/main" val="1962961086"/>
+        <p14:creationId xmlns:p14="http://schemas.microsoft.com/office/powerpoint/2010/main" val="591149455"/>
       </p:ext>
     </p:extLst>
   </p:cSld>

</xml_diff>

<commit_message>
Final version of presentation w/o speech
</commit_message>
<xml_diff>
--- a/shatilina.pptx
+++ b/shatilina.pptx
@@ -16,9 +16,9 @@
     <p:sldId id="269" r:id="rId7"/>
     <p:sldId id="262" r:id="rId8"/>
     <p:sldId id="285" r:id="rId9"/>
-    <p:sldId id="284" r:id="rId10"/>
+    <p:sldId id="289" r:id="rId10"/>
     <p:sldId id="286" r:id="rId11"/>
-    <p:sldId id="287" r:id="rId12"/>
+    <p:sldId id="284" r:id="rId12"/>
     <p:sldId id="288" r:id="rId13"/>
     <p:sldId id="280" r:id="rId14"/>
     <p:sldId id="281" r:id="rId15"/>
@@ -530,67 +530,19 @@
           <a:p>
             <a:r>
               <a:rPr lang="ru-RU" dirty="0" smtClean="0"/>
-              <a:t>Существует</a:t>
+              <a:t>Здравствуйте</a:t>
             </a:r>
             <a:r>
               <a:rPr lang="ru-RU" baseline="0" dirty="0" smtClean="0"/>
-              <a:t> масса подходов к построению и разработке ПО, поэтому </a:t>
+              <a:t>, уважаемая аттестационная комиссия! Вашему вниманию представляется диплом на тему «Система проектирования и тестирования каркасов программных продуктов», выполненный студенткой </a:t>
             </a:r>
             <a:r>
               <a:rPr lang="ru-RU" baseline="0" dirty="0" err="1" smtClean="0"/>
-              <a:t>опищем</a:t>
+              <a:t>Шатилиной</a:t>
             </a:r>
             <a:r>
               <a:rPr lang="ru-RU" baseline="0" dirty="0" smtClean="0"/>
-              <a:t> лишь общие этапы, не вдаваясь в подробности</a:t>
-            </a:r>
-          </a:p>
-          <a:p>
-            <a:r>
-              <a:rPr lang="ru-RU" baseline="0" dirty="0" smtClean="0"/>
-              <a:t>Анализ – включает в себя анализ предметной области, требования к пользователю и завершается разработкой спецификации ПО</a:t>
-            </a:r>
-          </a:p>
-          <a:p>
-            <a:r>
-              <a:rPr lang="ru-RU" baseline="0" dirty="0" smtClean="0"/>
-              <a:t>Проектирование – разрабатываем архитектуру программного средства и </a:t>
-            </a:r>
-            <a:r>
-              <a:rPr lang="ru-RU" baseline="0" dirty="0" err="1" smtClean="0"/>
-              <a:t>ее</a:t>
-            </a:r>
-            <a:r>
-              <a:rPr lang="ru-RU" baseline="0" dirty="0" smtClean="0"/>
-              <a:t> детализация</a:t>
-            </a:r>
-          </a:p>
-          <a:p>
-            <a:r>
-              <a:rPr lang="ru-RU" baseline="0" dirty="0" smtClean="0"/>
-              <a:t>Реализация – кодирование</a:t>
-            </a:r>
-          </a:p>
-          <a:p>
-            <a:r>
-              <a:rPr lang="ru-RU" baseline="0" dirty="0" smtClean="0"/>
-              <a:t>Тестирование – компонентное и системное</a:t>
-            </a:r>
-          </a:p>
-          <a:p>
-            <a:r>
-              <a:rPr lang="ru-RU" baseline="0" dirty="0" smtClean="0"/>
-              <a:t>Эксплуатация – внедрение, использование и поддержка программы</a:t>
-            </a:r>
-          </a:p>
-          <a:p>
-            <a:r>
-              <a:rPr lang="ru-RU" baseline="0" dirty="0" err="1" smtClean="0"/>
-              <a:t>Ощибки</a:t>
-            </a:r>
-            <a:r>
-              <a:rPr lang="ru-RU" baseline="0" dirty="0" smtClean="0"/>
-              <a:t> могут появится на любом из этапов</a:t>
+              <a:t> Юлией под руководством профессора кандидата </a:t>
             </a:r>
             <a:endParaRPr lang="ru-RU" dirty="0"/>
           </a:p>
@@ -613,7 +565,7 @@
           <a:p>
             <a:fld id="{D2C5C3F3-C17D-45D2-AA34-92C6E86E38D2}" type="slidenum">
               <a:rPr lang="ru-RU" smtClean="0"/>
-              <a:t>2</a:t>
+              <a:t>1</a:t>
             </a:fld>
             <a:endParaRPr lang="ru-RU"/>
           </a:p>
@@ -622,7 +574,7 @@
     </p:spTree>
     <p:extLst>
       <p:ext uri="{BB962C8B-B14F-4D97-AF65-F5344CB8AC3E}">
-        <p14:creationId xmlns:p14="http://schemas.microsoft.com/office/powerpoint/2010/main" val="3953832954"/>
+        <p14:creationId xmlns:p14="http://schemas.microsoft.com/office/powerpoint/2010/main" val="3855421462"/>
       </p:ext>
     </p:extLst>
   </p:cSld>
@@ -677,22 +629,75 @@
           <a:lstStyle/>
           <a:p>
             <a:r>
-              <a:rPr lang="ru-RU" dirty="0" smtClean="0"/>
-              <a:t>В</a:t>
-            </a:r>
-            <a:r>
-              <a:rPr lang="ru-RU" baseline="0" dirty="0" smtClean="0"/>
-              <a:t> основе подсистемы </a:t>
-            </a:r>
-            <a:r>
-              <a:rPr lang="en-US" baseline="0" dirty="0" smtClean="0"/>
-              <a:t>ANTLR </a:t>
-            </a:r>
-            <a:r>
-              <a:rPr lang="ru-RU" baseline="0" dirty="0" smtClean="0"/>
-              <a:t>лежит грамматика разработанного язык описания моделей прототипов архитектуры</a:t>
-            </a:r>
-            <a:endParaRPr lang="ru-RU" dirty="0"/>
+              <a:rPr lang="ru-RU" sz="1200" b="0" i="0" u="none" strike="noStrike" kern="1200" baseline="0" dirty="0" err="1" smtClean="0">
+                <a:solidFill>
+                  <a:schemeClr val="tx1"/>
+                </a:solidFill>
+                <a:latin typeface="+mn-lt"/>
+                <a:ea typeface="+mn-ea"/>
+                <a:cs typeface="+mn-cs"/>
+              </a:rPr>
+              <a:t>Promela</a:t>
+            </a:r>
+            <a:r>
+              <a:rPr lang="ru-RU" sz="1200" b="0" i="0" u="none" strike="noStrike" kern="1200" baseline="0" dirty="0" smtClean="0">
+                <a:solidFill>
+                  <a:schemeClr val="tx1"/>
+                </a:solidFill>
+                <a:latin typeface="+mn-lt"/>
+                <a:ea typeface="+mn-ea"/>
+                <a:cs typeface="+mn-cs"/>
+              </a:rPr>
+              <a:t> предоставляет простые механизмы обеспечения недетерминизма </a:t>
+            </a:r>
+          </a:p>
+          <a:p>
+            <a:r>
+              <a:rPr lang="ru-RU" sz="1200" b="0" i="0" u="none" strike="noStrike" kern="1200" baseline="0" dirty="0" smtClean="0">
+                <a:solidFill>
+                  <a:schemeClr val="tx1"/>
+                </a:solidFill>
+                <a:latin typeface="+mn-lt"/>
+                <a:ea typeface="+mn-ea"/>
+                <a:cs typeface="+mn-cs"/>
+              </a:rPr>
+              <a:t>•Если не выполняется ни одно из условий, процесс блокируется </a:t>
+            </a:r>
+          </a:p>
+          <a:p>
+            <a:r>
+              <a:rPr lang="ru-RU" sz="1200" b="0" i="0" u="none" strike="noStrike" kern="1200" baseline="0" dirty="0" smtClean="0">
+                <a:solidFill>
+                  <a:schemeClr val="tx1"/>
+                </a:solidFill>
+                <a:latin typeface="+mn-lt"/>
+                <a:ea typeface="+mn-ea"/>
+                <a:cs typeface="+mn-cs"/>
+              </a:rPr>
+              <a:t>•Операторы в </a:t>
+            </a:r>
+            <a:r>
+              <a:rPr lang="ru-RU" sz="1200" b="0" i="0" u="none" strike="noStrike" kern="1200" baseline="0" dirty="0" err="1" smtClean="0">
+                <a:solidFill>
+                  <a:schemeClr val="tx1"/>
+                </a:solidFill>
+                <a:latin typeface="+mn-lt"/>
+                <a:ea typeface="+mn-ea"/>
+                <a:cs typeface="+mn-cs"/>
+              </a:rPr>
+              <a:t>Promela</a:t>
+            </a:r>
+            <a:r>
+              <a:rPr lang="ru-RU" sz="1200" b="0" i="0" u="none" strike="noStrike" kern="1200" baseline="0" dirty="0" smtClean="0">
+                <a:solidFill>
+                  <a:schemeClr val="tx1"/>
+                </a:solidFill>
+                <a:latin typeface="+mn-lt"/>
+                <a:ea typeface="+mn-ea"/>
+                <a:cs typeface="+mn-cs"/>
+              </a:rPr>
+              <a:t> являются блокирующими </a:t>
+            </a:r>
           </a:p>
         </p:txBody>
       </p:sp>
@@ -713,7 +718,7 @@
           <a:p>
             <a:fld id="{D2C5C3F3-C17D-45D2-AA34-92C6E86E38D2}" type="slidenum">
               <a:rPr lang="ru-RU" smtClean="0"/>
-              <a:t>13</a:t>
+              <a:t>12</a:t>
             </a:fld>
             <a:endParaRPr lang="ru-RU"/>
           </a:p>
@@ -776,6 +781,22 @@
           <a:bodyPr/>
           <a:lstStyle/>
           <a:p>
+            <a:r>
+              <a:rPr lang="ru-RU" dirty="0" smtClean="0"/>
+              <a:t>В</a:t>
+            </a:r>
+            <a:r>
+              <a:rPr lang="ru-RU" baseline="0" dirty="0" smtClean="0"/>
+              <a:t> основе подсистемы </a:t>
+            </a:r>
+            <a:r>
+              <a:rPr lang="en-US" baseline="0" dirty="0" smtClean="0"/>
+              <a:t>ANTLR </a:t>
+            </a:r>
+            <a:r>
+              <a:rPr lang="ru-RU" baseline="0" dirty="0" smtClean="0"/>
+              <a:t>лежит грамматика разработанного язык описания моделей прототипов архитектуры</a:t>
+            </a:r>
             <a:endParaRPr lang="ru-RU" dirty="0"/>
           </a:p>
         </p:txBody>
@@ -797,7 +818,7 @@
           <a:p>
             <a:fld id="{D2C5C3F3-C17D-45D2-AA34-92C6E86E38D2}" type="slidenum">
               <a:rPr lang="ru-RU" smtClean="0"/>
-              <a:t>14</a:t>
+              <a:t>13</a:t>
             </a:fld>
             <a:endParaRPr lang="ru-RU"/>
           </a:p>
@@ -860,46 +881,6 @@
           <a:bodyPr/>
           <a:lstStyle/>
           <a:p>
-            <a:r>
-              <a:rPr lang="ru-RU" dirty="0" smtClean="0"/>
-              <a:t>По</a:t>
-            </a:r>
-            <a:r>
-              <a:rPr lang="ru-RU" baseline="0" dirty="0" smtClean="0"/>
-              <a:t> </a:t>
-            </a:r>
-            <a:r>
-              <a:rPr lang="en-US" baseline="0" dirty="0" smtClean="0"/>
-              <a:t>LTL-</a:t>
-            </a:r>
-            <a:r>
-              <a:rPr lang="ru-RU" baseline="0" dirty="0" smtClean="0"/>
-              <a:t>формуле </a:t>
-            </a:r>
-            <a:r>
-              <a:rPr lang="en-US" baseline="0" dirty="0" smtClean="0"/>
-              <a:t>SPIN </a:t>
-            </a:r>
-            <a:r>
-              <a:rPr lang="ru-RU" baseline="0" dirty="0" smtClean="0"/>
-              <a:t>генерирует конструкцию </a:t>
-            </a:r>
-            <a:r>
-              <a:rPr lang="en-US" baseline="0" dirty="0" smtClean="0"/>
-              <a:t>never claim, </a:t>
-            </a:r>
-            <a:r>
-              <a:rPr lang="ru-RU" baseline="0" dirty="0" smtClean="0"/>
-              <a:t>которая представляет собой автомат </a:t>
-            </a:r>
-            <a:r>
-              <a:rPr lang="ru-RU" baseline="0" dirty="0" err="1" smtClean="0"/>
-              <a:t>Бюхи</a:t>
-            </a:r>
-            <a:r>
-              <a:rPr lang="ru-RU" baseline="0" dirty="0" smtClean="0"/>
-              <a:t>, записанный на языке промела</a:t>
-            </a:r>
             <a:endParaRPr lang="ru-RU" dirty="0"/>
           </a:p>
         </p:txBody>
@@ -921,7 +902,7 @@
           <a:p>
             <a:fld id="{D2C5C3F3-C17D-45D2-AA34-92C6E86E38D2}" type="slidenum">
               <a:rPr lang="ru-RU" smtClean="0"/>
-              <a:t>15</a:t>
+              <a:t>14</a:t>
             </a:fld>
             <a:endParaRPr lang="ru-RU"/>
           </a:p>
@@ -986,7 +967,43 @@
           <a:p>
             <a:r>
               <a:rPr lang="ru-RU" dirty="0" smtClean="0"/>
-              <a:t>Диаграмма классов всей системы</a:t>
+              <a:t>По</a:t>
+            </a:r>
+            <a:r>
+              <a:rPr lang="ru-RU" baseline="0" dirty="0" smtClean="0"/>
+              <a:t> </a:t>
+            </a:r>
+            <a:r>
+              <a:rPr lang="en-US" baseline="0" dirty="0" smtClean="0"/>
+              <a:t>LTL-</a:t>
+            </a:r>
+            <a:r>
+              <a:rPr lang="ru-RU" baseline="0" dirty="0" smtClean="0"/>
+              <a:t>формуле </a:t>
+            </a:r>
+            <a:r>
+              <a:rPr lang="en-US" baseline="0" dirty="0" smtClean="0"/>
+              <a:t>SPIN </a:t>
+            </a:r>
+            <a:r>
+              <a:rPr lang="ru-RU" baseline="0" dirty="0" smtClean="0"/>
+              <a:t>генерирует конструкцию </a:t>
+            </a:r>
+            <a:r>
+              <a:rPr lang="en-US" baseline="0" dirty="0" smtClean="0"/>
+              <a:t>never claim, </a:t>
+            </a:r>
+            <a:r>
+              <a:rPr lang="ru-RU" baseline="0" dirty="0" smtClean="0"/>
+              <a:t>которая представляет собой автомат </a:t>
+            </a:r>
+            <a:r>
+              <a:rPr lang="ru-RU" baseline="0" dirty="0" err="1" smtClean="0"/>
+              <a:t>Бюхи</a:t>
+            </a:r>
+            <a:r>
+              <a:rPr lang="ru-RU" baseline="0" dirty="0" smtClean="0"/>
+              <a:t>, записанный на языке промела</a:t>
             </a:r>
             <a:endParaRPr lang="ru-RU" dirty="0"/>
           </a:p>
@@ -1009,7 +1026,7 @@
           <a:p>
             <a:fld id="{D2C5C3F3-C17D-45D2-AA34-92C6E86E38D2}" type="slidenum">
               <a:rPr lang="ru-RU" smtClean="0"/>
-              <a:t>16</a:t>
+              <a:t>15</a:t>
             </a:fld>
             <a:endParaRPr lang="ru-RU"/>
           </a:p>
@@ -1072,6 +1089,10 @@
           <a:bodyPr/>
           <a:lstStyle/>
           <a:p>
+            <a:r>
+              <a:rPr lang="ru-RU" dirty="0" smtClean="0"/>
+              <a:t>Диаграмма классов всей системы</a:t>
+            </a:r>
             <a:endParaRPr lang="ru-RU" dirty="0"/>
           </a:p>
         </p:txBody>
@@ -1093,7 +1114,7 @@
           <a:p>
             <a:fld id="{D2C5C3F3-C17D-45D2-AA34-92C6E86E38D2}" type="slidenum">
               <a:rPr lang="ru-RU" smtClean="0"/>
-              <a:t>17</a:t>
+              <a:t>16</a:t>
             </a:fld>
             <a:endParaRPr lang="ru-RU"/>
           </a:p>
@@ -1156,99 +1177,7 @@
           <a:bodyPr/>
           <a:lstStyle/>
           <a:p>
-            <a:pPr marL="0" marR="0" indent="0" algn="l" defTabSz="914400" rtl="0" eaLnBrk="1" fontAlgn="auto" latinLnBrk="0" hangingPunct="1">
-              <a:lnSpc>
-                <a:spcPct val="100000"/>
-              </a:lnSpc>
-              <a:spcBef>
-                <a:spcPts val="0"/>
-              </a:spcBef>
-              <a:spcAft>
-                <a:spcPts val="0"/>
-              </a:spcAft>
-              <a:buClrTx/>
-              <a:buSzTx/>
-              <a:buFontTx/>
-              <a:buNone/>
-              <a:tabLst/>
-              <a:defRPr/>
-            </a:pPr>
-            <a:r>
-              <a:rPr lang="ru-RU" sz="1200" dirty="0" smtClean="0"/>
-              <a:t>метод автоматической формальной верификации систем с конечным числом состояний</a:t>
-            </a:r>
-            <a:endParaRPr lang="en-US" dirty="0" smtClean="0"/>
-          </a:p>
-          <a:p>
-            <a:pPr marL="228600" indent="-228600">
-              <a:buAutoNum type="arabicPeriod"/>
-            </a:pPr>
-            <a:r>
-              <a:rPr lang="ru-RU" dirty="0" err="1" smtClean="0"/>
-              <a:t>Задаем</a:t>
-            </a:r>
-            <a:r>
-              <a:rPr lang="ru-RU" baseline="0" dirty="0" smtClean="0"/>
-              <a:t> как система устроена и как она должна быть устроена</a:t>
-            </a:r>
-          </a:p>
-          <a:p>
-            <a:pPr marL="228600" indent="-228600">
-              <a:buAutoNum type="arabicPeriod"/>
-            </a:pPr>
-            <a:r>
-              <a:rPr lang="ru-RU" baseline="0" dirty="0" err="1" smtClean="0"/>
-              <a:t>Т.о</a:t>
-            </a:r>
-            <a:r>
-              <a:rPr lang="ru-RU" baseline="0" dirty="0" smtClean="0"/>
-              <a:t>. Две нотации: описание поведения(устройство системы), описание требований (свойства правильности)</a:t>
-            </a:r>
-          </a:p>
-          <a:p>
-            <a:pPr marL="228600" indent="-228600">
-              <a:buAutoNum type="arabicPeriod"/>
-            </a:pPr>
-            <a:r>
-              <a:rPr lang="ru-RU" baseline="0" dirty="0" smtClean="0"/>
-              <a:t>Программа-верификатор проверяет, что устройство системы удовлетворяет свойствам правильности</a:t>
-            </a:r>
-          </a:p>
-          <a:p>
-            <a:pPr marL="228600" indent="-228600">
-              <a:buAutoNum type="arabicPeriod"/>
-            </a:pPr>
-            <a:r>
-              <a:rPr lang="ru-RU" baseline="0" dirty="0" smtClean="0"/>
-              <a:t>Выбранная нотация гарантирует разрешимость проверки любого свойства любой модели</a:t>
-            </a:r>
-            <a:endParaRPr lang="en-US" baseline="0" dirty="0" smtClean="0"/>
-          </a:p>
-          <a:p>
-            <a:pPr marL="228600" indent="-228600">
-              <a:buAutoNum type="arabicPeriod"/>
-            </a:pPr>
-            <a:endParaRPr lang="en-US" baseline="0" dirty="0" smtClean="0"/>
-          </a:p>
-          <a:p>
-            <a:r>
-              <a:rPr lang="ru-RU" sz="1200" dirty="0" smtClean="0"/>
-              <a:t>Проверка свойства на конечной модели программы</a:t>
-            </a:r>
-            <a:endParaRPr lang="en-US" sz="1200" dirty="0" smtClean="0"/>
-          </a:p>
-          <a:p>
-            <a:r>
-              <a:rPr lang="ru-RU" sz="1200" dirty="0" smtClean="0"/>
-              <a:t>Свойства – в терминах значения предикатов в состоянии программы и последовательность значений</a:t>
-            </a:r>
-          </a:p>
-          <a:p>
-            <a:r>
-              <a:rPr lang="ru-RU" sz="1200" dirty="0" smtClean="0"/>
-              <a:t>Исчерпывающий поиск по пространству состояний</a:t>
-            </a:r>
-            <a:endParaRPr lang="en-US" sz="1200" dirty="0" smtClean="0"/>
+            <a:endParaRPr lang="ru-RU" dirty="0"/>
           </a:p>
         </p:txBody>
       </p:sp>
@@ -1269,7 +1198,7 @@
           <a:p>
             <a:fld id="{D2C5C3F3-C17D-45D2-AA34-92C6E86E38D2}" type="slidenum">
               <a:rPr lang="ru-RU" smtClean="0"/>
-              <a:t>21</a:t>
+              <a:t>17</a:t>
             </a:fld>
             <a:endParaRPr lang="ru-RU"/>
           </a:p>
@@ -1278,7 +1207,7 @@
     </p:spTree>
     <p:extLst>
       <p:ext uri="{BB962C8B-B14F-4D97-AF65-F5344CB8AC3E}">
-        <p14:creationId xmlns:p14="http://schemas.microsoft.com/office/powerpoint/2010/main" val="179302113"/>
+        <p14:creationId xmlns:p14="http://schemas.microsoft.com/office/powerpoint/2010/main" val="1951951640"/>
       </p:ext>
     </p:extLst>
   </p:cSld>
@@ -1332,65 +1261,63 @@
           <a:bodyPr/>
           <a:lstStyle/>
           <a:p>
+            <a:pPr marL="0" marR="0" indent="0" algn="l" defTabSz="914400" rtl="0" eaLnBrk="1" fontAlgn="auto" latinLnBrk="0" hangingPunct="1">
+              <a:lnSpc>
+                <a:spcPct val="100000"/>
+              </a:lnSpc>
+              <a:spcBef>
+                <a:spcPts val="0"/>
+              </a:spcBef>
+              <a:spcAft>
+                <a:spcPts val="0"/>
+              </a:spcAft>
+              <a:buClrTx/>
+              <a:buSzTx/>
+              <a:buFontTx/>
+              <a:buNone/>
+              <a:tabLst/>
+              <a:defRPr/>
+            </a:pPr>
+            <a:r>
+              <a:rPr lang="ru-RU" sz="1200" dirty="0" smtClean="0"/>
+              <a:t>метод автоматической формальной верификации систем с конечным числом состояний</a:t>
+            </a:r>
+            <a:endParaRPr lang="en-US" dirty="0" smtClean="0"/>
+          </a:p>
+          <a:p>
             <a:pPr marL="228600" indent="-228600">
               <a:buAutoNum type="arabicPeriod"/>
             </a:pPr>
             <a:r>
-              <a:rPr lang="ru-RU" dirty="0" smtClean="0"/>
-              <a:t>Хорошо</a:t>
+              <a:rPr lang="ru-RU" dirty="0" err="1" smtClean="0"/>
+              <a:t>Задаем</a:t>
             </a:r>
             <a:r>
               <a:rPr lang="ru-RU" baseline="0" dirty="0" smtClean="0"/>
-              <a:t> автоматизируем – участие человека ограничивается анализом </a:t>
-            </a:r>
-            <a:r>
-              <a:rPr lang="ru-RU" baseline="0" dirty="0" err="1" smtClean="0"/>
-              <a:t>контрпримера</a:t>
-            </a:r>
-            <a:endParaRPr lang="ru-RU" baseline="0" dirty="0" smtClean="0"/>
+              <a:t> как система устроена и как она должна быть устроена</a:t>
+            </a:r>
           </a:p>
           <a:p>
             <a:pPr marL="228600" indent="-228600">
               <a:buAutoNum type="arabicPeriod"/>
             </a:pPr>
             <a:r>
-              <a:rPr lang="ru-RU" dirty="0" smtClean="0"/>
-              <a:t>Если модель конечна, корректна и адекватна проверяемому свойству, то </a:t>
-            </a:r>
-            <a:r>
-              <a:rPr lang="ru-RU" dirty="0" err="1" smtClean="0"/>
-              <a:t>дается</a:t>
-            </a:r>
-            <a:r>
-              <a:rPr lang="ru-RU" dirty="0" smtClean="0"/>
-              <a:t> точный ответ</a:t>
+              <a:rPr lang="ru-RU" baseline="0" dirty="0" err="1" smtClean="0"/>
+              <a:t>Т.о</a:t>
             </a:r>
             <a:r>
               <a:rPr lang="ru-RU" baseline="0" dirty="0" smtClean="0"/>
-              <a:t> – либо ошибок нет, либо </a:t>
-            </a:r>
-            <a:r>
-              <a:rPr lang="ru-RU" baseline="0" dirty="0" err="1" smtClean="0"/>
-              <a:t>выдается</a:t>
-            </a:r>
-            <a:r>
-              <a:rPr lang="ru-RU" baseline="0" dirty="0" smtClean="0"/>
-              <a:t> </a:t>
-            </a:r>
-            <a:r>
-              <a:rPr lang="ru-RU" baseline="0" dirty="0" err="1" smtClean="0"/>
-              <a:t>контрпример</a:t>
-            </a:r>
-            <a:r>
-              <a:rPr lang="ru-RU" baseline="0" dirty="0" smtClean="0"/>
-              <a:t> с ошибкой</a:t>
+              <a:t>. Две нотации: описание поведения(устройство системы), описание требований (свойства правильности)</a:t>
             </a:r>
           </a:p>
           <a:p>
             <a:pPr marL="228600" indent="-228600">
               <a:buAutoNum type="arabicPeriod"/>
             </a:pPr>
-            <a:endParaRPr lang="ru-RU" baseline="0" dirty="0" smtClean="0"/>
+            <a:r>
+              <a:rPr lang="ru-RU" baseline="0" dirty="0" smtClean="0"/>
+              <a:t>Программа-верификатор проверяет, что устройство системы удовлетворяет свойствам правильности</a:t>
+            </a:r>
           </a:p>
           <a:p>
             <a:pPr marL="228600" indent="-228600">
@@ -1398,9 +1325,35 @@
             </a:pPr>
             <a:r>
               <a:rPr lang="ru-RU" baseline="0" dirty="0" smtClean="0"/>
-              <a:t>В ряде случаев построить конечную модель системы, при этом адекватную тому свойству, которое мы хотим проверить достаточно сложно</a:t>
-            </a:r>
-            <a:endParaRPr lang="ru-RU" dirty="0" smtClean="0"/>
+              <a:t>Выбранная нотация гарантирует разрешимость проверки любого свойства любой модели</a:t>
+            </a:r>
+            <a:endParaRPr lang="en-US" baseline="0" dirty="0" smtClean="0"/>
+          </a:p>
+          <a:p>
+            <a:pPr marL="228600" indent="-228600">
+              <a:buAutoNum type="arabicPeriod"/>
+            </a:pPr>
+            <a:endParaRPr lang="en-US" baseline="0" dirty="0" smtClean="0"/>
+          </a:p>
+          <a:p>
+            <a:r>
+              <a:rPr lang="ru-RU" sz="1200" dirty="0" smtClean="0"/>
+              <a:t>Проверка свойства на конечной модели программы</a:t>
+            </a:r>
+            <a:endParaRPr lang="en-US" sz="1200" dirty="0" smtClean="0"/>
+          </a:p>
+          <a:p>
+            <a:r>
+              <a:rPr lang="ru-RU" sz="1200" dirty="0" smtClean="0"/>
+              <a:t>Свойства – в терминах значения предикатов в состоянии программы и последовательность значений</a:t>
+            </a:r>
+          </a:p>
+          <a:p>
+            <a:r>
+              <a:rPr lang="ru-RU" sz="1200" dirty="0" smtClean="0"/>
+              <a:t>Исчерпывающий поиск по пространству состояний</a:t>
+            </a:r>
+            <a:endParaRPr lang="en-US" sz="1200" dirty="0" smtClean="0"/>
           </a:p>
         </p:txBody>
       </p:sp>
@@ -1421,7 +1374,7 @@
           <a:p>
             <a:fld id="{D2C5C3F3-C17D-45D2-AA34-92C6E86E38D2}" type="slidenum">
               <a:rPr lang="ru-RU" smtClean="0"/>
-              <a:t>22</a:t>
+              <a:t>21</a:t>
             </a:fld>
             <a:endParaRPr lang="ru-RU"/>
           </a:p>
@@ -1484,61 +1437,75 @@
           <a:bodyPr/>
           <a:lstStyle/>
           <a:p>
-            <a:pPr marL="171450" indent="-171450">
-              <a:buFont typeface="Arial" pitchFamily="34" charset="0"/>
-              <a:buChar char="•"/>
+            <a:pPr marL="228600" indent="-228600">
+              <a:buAutoNum type="arabicPeriod"/>
             </a:pPr>
             <a:r>
               <a:rPr lang="ru-RU" dirty="0" smtClean="0"/>
-              <a:t>На</a:t>
+              <a:t>Хорошо</a:t>
             </a:r>
             <a:r>
               <a:rPr lang="ru-RU" baseline="0" dirty="0" smtClean="0"/>
-              <a:t> языке можем описывать недетерминизм. То есть его удобно использовать для абстракции от несущественных деталей. Охраняемые команды означают реализацию недетерминизма. Это значит что с каждой командой языка связано понятие выполнимости и если в </a:t>
+              <a:t> автоматизируем – участие человека ограничивается анализом </a:t>
             </a:r>
             <a:r>
               <a:rPr lang="ru-RU" baseline="0" dirty="0" err="1" smtClean="0"/>
-              <a:t>определенном</a:t>
+              <a:t>контрпримера</a:t>
+            </a:r>
+            <a:endParaRPr lang="ru-RU" baseline="0" dirty="0" smtClean="0"/>
+          </a:p>
+          <a:p>
+            <a:pPr marL="228600" indent="-228600">
+              <a:buAutoNum type="arabicPeriod"/>
+            </a:pPr>
+            <a:r>
+              <a:rPr lang="ru-RU" dirty="0" smtClean="0"/>
+              <a:t>Если модель конечна, корректна и адекватна проверяемому свойству, то </a:t>
+            </a:r>
+            <a:r>
+              <a:rPr lang="ru-RU" dirty="0" err="1" smtClean="0"/>
+              <a:t>дается</a:t>
+            </a:r>
+            <a:r>
+              <a:rPr lang="ru-RU" dirty="0" smtClean="0"/>
+              <a:t> точный ответ</a:t>
             </a:r>
             <a:r>
               <a:rPr lang="ru-RU" baseline="0" dirty="0" smtClean="0"/>
-              <a:t> блоке модели присутствует несколько команд, выполнимых одновременно, то может быть выполнена любая из них.</a:t>
-            </a:r>
-          </a:p>
-          <a:p>
-            <a:pPr marL="171450" indent="-171450">
-              <a:buFont typeface="Arial" pitchFamily="34" charset="0"/>
-              <a:buChar char="•"/>
+              <a:t> – либо ошибок нет, либо </a:t>
+            </a:r>
+            <a:r>
+              <a:rPr lang="ru-RU" baseline="0" dirty="0" err="1" smtClean="0"/>
+              <a:t>выдается</a:t>
+            </a:r>
+            <a:r>
+              <a:rPr lang="ru-RU" baseline="0" dirty="0" smtClean="0"/>
+              <a:t> </a:t>
+            </a:r>
+            <a:r>
+              <a:rPr lang="ru-RU" baseline="0" dirty="0" err="1" smtClean="0"/>
+              <a:t>контрпример</a:t>
+            </a:r>
+            <a:r>
+              <a:rPr lang="ru-RU" baseline="0" dirty="0" smtClean="0"/>
+              <a:t> с ошибкой</a:t>
+            </a:r>
+          </a:p>
+          <a:p>
+            <a:pPr marL="228600" indent="-228600">
+              <a:buAutoNum type="arabicPeriod"/>
             </a:pPr>
+            <a:endParaRPr lang="ru-RU" baseline="0" dirty="0" smtClean="0"/>
+          </a:p>
+          <a:p>
+            <a:pPr marL="228600" indent="-228600">
+              <a:buAutoNum type="arabicPeriod"/>
+            </a:pPr>
             <a:r>
               <a:rPr lang="ru-RU" baseline="0" dirty="0" smtClean="0"/>
-              <a:t>Поскольку способ верификации </a:t>
-            </a:r>
-            <a:r>
-              <a:rPr lang="en-US" baseline="0" dirty="0" smtClean="0"/>
-              <a:t>model checking </a:t>
-            </a:r>
-            <a:r>
-              <a:rPr lang="ru-RU" baseline="0" dirty="0" smtClean="0"/>
-              <a:t>сказанное означает, что у любой модели описанной с помощью языка </a:t>
-            </a:r>
-            <a:r>
-              <a:rPr lang="en-US" baseline="0" dirty="0" err="1" smtClean="0"/>
-              <a:t>Promela</a:t>
-            </a:r>
-            <a:r>
-              <a:rPr lang="ru-RU" baseline="0" dirty="0" smtClean="0"/>
-              <a:t> конечное число состояний. За </a:t>
-            </a:r>
-            <a:r>
-              <a:rPr lang="ru-RU" baseline="0" dirty="0" err="1" smtClean="0"/>
-              <a:t>счет</a:t>
-            </a:r>
-            <a:r>
-              <a:rPr lang="ru-RU" baseline="0" dirty="0" smtClean="0"/>
-              <a:t> чего это достигается мы увидим дальше.</a:t>
-            </a:r>
-            <a:endParaRPr lang="ru-RU" dirty="0"/>
+              <a:t>В ряде случаев построить конечную модель системы, при этом адекватную тому свойству, которое мы хотим проверить достаточно сложно</a:t>
+            </a:r>
+            <a:endParaRPr lang="ru-RU" dirty="0" smtClean="0"/>
           </a:p>
         </p:txBody>
       </p:sp>
@@ -1559,7 +1526,7 @@
           <a:p>
             <a:fld id="{D2C5C3F3-C17D-45D2-AA34-92C6E86E38D2}" type="slidenum">
               <a:rPr lang="ru-RU" smtClean="0"/>
-              <a:t>23</a:t>
+              <a:t>22</a:t>
             </a:fld>
             <a:endParaRPr lang="ru-RU"/>
           </a:p>
@@ -1568,7 +1535,7 @@
     </p:spTree>
     <p:extLst>
       <p:ext uri="{BB962C8B-B14F-4D97-AF65-F5344CB8AC3E}">
-        <p14:creationId xmlns:p14="http://schemas.microsoft.com/office/powerpoint/2010/main" val="3247691620"/>
+        <p14:creationId xmlns:p14="http://schemas.microsoft.com/office/powerpoint/2010/main" val="179302113"/>
       </p:ext>
     </p:extLst>
   </p:cSld>
@@ -1622,33 +1589,59 @@
           <a:bodyPr/>
           <a:lstStyle/>
           <a:p>
-            <a:r>
-              <a:rPr lang="ru-RU" dirty="0" err="1" smtClean="0"/>
+            <a:pPr marL="171450" indent="-171450">
+              <a:buFont typeface="Arial" pitchFamily="34" charset="0"/>
+              <a:buChar char="•"/>
+            </a:pPr>
+            <a:r>
+              <a:rPr lang="ru-RU" dirty="0" smtClean="0"/>
+              <a:t>На</a:t>
+            </a:r>
+            <a:r>
+              <a:rPr lang="ru-RU" baseline="0" dirty="0" smtClean="0"/>
+              <a:t> языке можем описывать недетерминизм. То есть его удобно использовать для абстракции от несущественных деталей. Охраняемые команды означают реализацию недетерминизма. Это значит что с каждой командой языка связано понятие выполнимости и если в </a:t>
+            </a:r>
+            <a:r>
+              <a:rPr lang="ru-RU" baseline="0" dirty="0" err="1" smtClean="0"/>
+              <a:t>определенном</a:t>
+            </a:r>
+            <a:r>
+              <a:rPr lang="ru-RU" baseline="0" dirty="0" smtClean="0"/>
+              <a:t> блоке модели присутствует несколько команд, выполнимых одновременно, то может быть выполнена любая из них.</a:t>
+            </a:r>
+          </a:p>
+          <a:p>
+            <a:pPr marL="171450" indent="-171450">
+              <a:buFont typeface="Arial" pitchFamily="34" charset="0"/>
+              <a:buChar char="•"/>
+            </a:pPr>
+            <a:r>
+              <a:rPr lang="ru-RU" baseline="0" dirty="0" smtClean="0"/>
+              <a:t>Поскольку способ верификации </a:t>
+            </a:r>
+            <a:r>
+              <a:rPr lang="en-US" baseline="0" dirty="0" smtClean="0"/>
+              <a:t>model checking </a:t>
+            </a:r>
+            <a:r>
+              <a:rPr lang="ru-RU" baseline="0" dirty="0" smtClean="0"/>
+              <a:t>сказанное означает, что у любой модели описанной с помощью языка </a:t>
+            </a:r>
+            <a:r>
+              <a:rPr lang="en-US" baseline="0" dirty="0" err="1" smtClean="0"/>
               <a:t>Promela</a:t>
             </a:r>
             <a:r>
-              <a:rPr lang="ru-RU" dirty="0" smtClean="0"/>
-              <a:t> включает примитивы для создания процессов и описания </a:t>
-            </a:r>
-            <a:r>
-              <a:rPr lang="ru-RU" dirty="0" err="1" smtClean="0"/>
-              <a:t>межпроцессного</a:t>
-            </a:r>
-            <a:r>
-              <a:rPr lang="ru-RU" dirty="0" smtClean="0"/>
-              <a:t> взаимодействия</a:t>
-            </a:r>
-          </a:p>
-          <a:p>
-            <a:r>
-              <a:rPr lang="ru-RU" dirty="0" smtClean="0"/>
-              <a:t> НО! в нем отсутствует ряд средств, которые есть в языках программирования высокого уровня </a:t>
-            </a:r>
-          </a:p>
-          <a:p>
-            <a:r>
-              <a:rPr lang="ru-RU" dirty="0" smtClean="0"/>
-              <a:t> Например, указатели на данные и функции, не включено понятие времени или часов, отсутствуют операции с плавающей точкой и пр.</a:t>
+              <a:rPr lang="ru-RU" baseline="0" dirty="0" smtClean="0"/>
+              <a:t> конечное число состояний. За </a:t>
+            </a:r>
+            <a:r>
+              <a:rPr lang="ru-RU" baseline="0" dirty="0" err="1" smtClean="0"/>
+              <a:t>счет</a:t>
+            </a:r>
+            <a:r>
+              <a:rPr lang="ru-RU" baseline="0" dirty="0" smtClean="0"/>
+              <a:t> чего это достигается мы увидим дальше.</a:t>
             </a:r>
             <a:endParaRPr lang="ru-RU" dirty="0"/>
           </a:p>
@@ -1671,7 +1664,7 @@
           <a:p>
             <a:fld id="{D2C5C3F3-C17D-45D2-AA34-92C6E86E38D2}" type="slidenum">
               <a:rPr lang="ru-RU" smtClean="0"/>
-              <a:t>24</a:t>
+              <a:t>23</a:t>
             </a:fld>
             <a:endParaRPr lang="ru-RU"/>
           </a:p>
@@ -1680,7 +1673,7 @@
     </p:spTree>
     <p:extLst>
       <p:ext uri="{BB962C8B-B14F-4D97-AF65-F5344CB8AC3E}">
-        <p14:creationId xmlns:p14="http://schemas.microsoft.com/office/powerpoint/2010/main" val="1589152162"/>
+        <p14:creationId xmlns:p14="http://schemas.microsoft.com/office/powerpoint/2010/main" val="3247691620"/>
       </p:ext>
     </p:extLst>
   </p:cSld>
@@ -1735,12 +1728,32 @@
           <a:lstStyle/>
           <a:p>
             <a:r>
+              <a:rPr lang="ru-RU" dirty="0" err="1" smtClean="0"/>
+              <a:t>Promela</a:t>
+            </a:r>
+            <a:r>
               <a:rPr lang="ru-RU" dirty="0" smtClean="0"/>
-              <a:t>ПРОБЛЕМА: Полнота спецификации – охватывают</a:t>
-            </a:r>
-            <a:r>
-              <a:rPr lang="ru-RU" baseline="0" dirty="0" smtClean="0"/>
-              <a:t> ли спецификации всё поведение системы</a:t>
+              <a:t> включает примитивы для создания процессов и описания </a:t>
+            </a:r>
+            <a:r>
+              <a:rPr lang="ru-RU" dirty="0" err="1" smtClean="0"/>
+              <a:t>межпроцессного</a:t>
+            </a:r>
+            <a:r>
+              <a:rPr lang="ru-RU" dirty="0" smtClean="0"/>
+              <a:t> взаимодействия</a:t>
+            </a:r>
+          </a:p>
+          <a:p>
+            <a:r>
+              <a:rPr lang="ru-RU" dirty="0" smtClean="0"/>
+              <a:t> НО! в нем отсутствует ряд средств, которые есть в языках программирования высокого уровня </a:t>
+            </a:r>
+          </a:p>
+          <a:p>
+            <a:r>
+              <a:rPr lang="ru-RU" dirty="0" smtClean="0"/>
+              <a:t> Например, указатели на данные и функции, не включено понятие времени или часов, отсутствуют операции с плавающей точкой и пр.</a:t>
             </a:r>
             <a:endParaRPr lang="ru-RU" dirty="0"/>
           </a:p>
@@ -1763,7 +1776,7 @@
           <a:p>
             <a:fld id="{D2C5C3F3-C17D-45D2-AA34-92C6E86E38D2}" type="slidenum">
               <a:rPr lang="ru-RU" smtClean="0"/>
-              <a:t>25</a:t>
+              <a:t>24</a:t>
             </a:fld>
             <a:endParaRPr lang="ru-RU"/>
           </a:p>
@@ -1772,7 +1785,7 @@
     </p:spTree>
     <p:extLst>
       <p:ext uri="{BB962C8B-B14F-4D97-AF65-F5344CB8AC3E}">
-        <p14:creationId xmlns:p14="http://schemas.microsoft.com/office/powerpoint/2010/main" val="725484770"/>
+        <p14:creationId xmlns:p14="http://schemas.microsoft.com/office/powerpoint/2010/main" val="1589152162"/>
       </p:ext>
     </p:extLst>
   </p:cSld>
@@ -1828,44 +1841,67 @@
           <a:p>
             <a:r>
               <a:rPr lang="ru-RU" dirty="0" smtClean="0"/>
-              <a:t>!Пересечение</a:t>
+              <a:t>Существует</a:t>
             </a:r>
             <a:r>
               <a:rPr lang="ru-RU" baseline="0" dirty="0" smtClean="0"/>
-              <a:t> Возможного поведения программы с неправильным должно быть пусто</a:t>
-            </a:r>
-          </a:p>
-          <a:p>
-            <a:r>
-              <a:rPr lang="ru-RU" dirty="0" smtClean="0"/>
-              <a:t>Инженерный язык программирования</a:t>
+              <a:t> масса подходов к построению и разработке ПО, поэтому </a:t>
+            </a:r>
+            <a:r>
+              <a:rPr lang="ru-RU" baseline="0" dirty="0" err="1" smtClean="0"/>
+              <a:t>опищем</a:t>
             </a:r>
             <a:r>
               <a:rPr lang="ru-RU" baseline="0" dirty="0" smtClean="0"/>
-              <a:t> может ограничивать возможности пользователя писать неправильные программы. У языка описания моделей другие задачи.</a:t>
+              <a:t> лишь общие этапы, не вдаваясь в подробности</a:t>
             </a:r>
           </a:p>
           <a:p>
             <a:r>
               <a:rPr lang="ru-RU" baseline="0" dirty="0" smtClean="0"/>
-              <a:t>Язык описания моделей должен позволять пользователю написать любую программу, которую он захочет, поскольку в исходной системе могут быть </a:t>
+              <a:t>Анализ – включает в себя анализ предметной области, требования к пользователю и завершается разработкой спецификации ПО</a:t>
+            </a:r>
+          </a:p>
+          <a:p>
+            <a:r>
+              <a:rPr lang="ru-RU" baseline="0" dirty="0" smtClean="0"/>
+              <a:t>Проектирование – разрабатываем архитектуру программного средства и </a:t>
             </a:r>
             <a:r>
               <a:rPr lang="ru-RU" baseline="0" dirty="0" err="1" smtClean="0"/>
-              <a:t>произ</a:t>
+              <a:t>ее</a:t>
             </a:r>
             <a:r>
               <a:rPr lang="ru-RU" baseline="0" dirty="0" smtClean="0"/>
-              <a:t> ошибки. Главное что для любой программы написанной на языке описания моделей верификация должна быть разрешена.</a:t>
-            </a:r>
-          </a:p>
-          <a:p>
-            <a:endParaRPr lang="ru-RU" baseline="0" dirty="0" smtClean="0"/>
+              <a:t> детализация</a:t>
+            </a:r>
           </a:p>
           <a:p>
             <a:r>
               <a:rPr lang="ru-RU" baseline="0" dirty="0" smtClean="0"/>
-              <a:t>Верификация программ в общем случае алгоритмически неразрешима (см. Теорема Райса)</a:t>
+              <a:t>Реализация – кодирование</a:t>
+            </a:r>
+          </a:p>
+          <a:p>
+            <a:r>
+              <a:rPr lang="ru-RU" baseline="0" dirty="0" smtClean="0"/>
+              <a:t>Тестирование – компонентное и системное</a:t>
+            </a:r>
+          </a:p>
+          <a:p>
+            <a:r>
+              <a:rPr lang="ru-RU" baseline="0" dirty="0" smtClean="0"/>
+              <a:t>Эксплуатация – внедрение, использование и поддержка программы</a:t>
+            </a:r>
+          </a:p>
+          <a:p>
+            <a:r>
+              <a:rPr lang="ru-RU" baseline="0" dirty="0" err="1" smtClean="0"/>
+              <a:t>Ощибки</a:t>
+            </a:r>
+            <a:r>
+              <a:rPr lang="ru-RU" baseline="0" dirty="0" smtClean="0"/>
+              <a:t> могут появится на любом из этапов</a:t>
             </a:r>
             <a:endParaRPr lang="ru-RU" dirty="0"/>
           </a:p>
@@ -1888,7 +1924,7 @@
           <a:p>
             <a:fld id="{D2C5C3F3-C17D-45D2-AA34-92C6E86E38D2}" type="slidenum">
               <a:rPr lang="ru-RU" smtClean="0"/>
-              <a:t>4</a:t>
+              <a:t>2</a:t>
             </a:fld>
             <a:endParaRPr lang="ru-RU"/>
           </a:p>
@@ -1897,7 +1933,99 @@
     </p:spTree>
     <p:extLst>
       <p:ext uri="{BB962C8B-B14F-4D97-AF65-F5344CB8AC3E}">
-        <p14:creationId xmlns:p14="http://schemas.microsoft.com/office/powerpoint/2010/main" val="2273666312"/>
+        <p14:creationId xmlns:p14="http://schemas.microsoft.com/office/powerpoint/2010/main" val="3953832954"/>
+      </p:ext>
+    </p:extLst>
+  </p:cSld>
+  <p:clrMapOvr>
+    <a:masterClrMapping/>
+  </p:clrMapOvr>
+</p:notes>
+</file>
+
+<file path=ppt/notesSlides/notesSlide20.xml><?xml version="1.0" encoding="utf-8"?>
+<p:notes xmlns:a="http://schemas.openxmlformats.org/drawingml/2006/main" xmlns:r="http://schemas.openxmlformats.org/officeDocument/2006/relationships" xmlns:p="http://schemas.openxmlformats.org/presentationml/2006/main">
+  <p:cSld>
+    <p:spTree>
+      <p:nvGrpSpPr>
+        <p:cNvPr id="1" name=""/>
+        <p:cNvGrpSpPr/>
+        <p:nvPr/>
+      </p:nvGrpSpPr>
+      <p:grpSpPr>
+        <a:xfrm>
+          <a:off x="0" y="0"/>
+          <a:ext cx="0" cy="0"/>
+          <a:chOff x="0" y="0"/>
+          <a:chExt cx="0" cy="0"/>
+        </a:xfrm>
+      </p:grpSpPr>
+      <p:sp>
+        <p:nvSpPr>
+          <p:cNvPr id="2" name="Образ слайда 1"/>
+          <p:cNvSpPr>
+            <a:spLocks noGrp="1" noRot="1" noChangeAspect="1"/>
+          </p:cNvSpPr>
+          <p:nvPr>
+            <p:ph type="sldImg"/>
+          </p:nvPr>
+        </p:nvSpPr>
+        <p:spPr/>
+      </p:sp>
+      <p:sp>
+        <p:nvSpPr>
+          <p:cNvPr id="3" name="Заметки 2"/>
+          <p:cNvSpPr>
+            <a:spLocks noGrp="1"/>
+          </p:cNvSpPr>
+          <p:nvPr>
+            <p:ph type="body" idx="1"/>
+          </p:nvPr>
+        </p:nvSpPr>
+        <p:spPr/>
+        <p:txBody>
+          <a:bodyPr/>
+          <a:lstStyle/>
+          <a:p>
+            <a:r>
+              <a:rPr lang="ru-RU" dirty="0" smtClean="0"/>
+              <a:t>ПРОБЛЕМА: Полнота спецификации – охватывают</a:t>
+            </a:r>
+            <a:r>
+              <a:rPr lang="ru-RU" baseline="0" dirty="0" smtClean="0"/>
+              <a:t> ли спецификации всё поведение системы</a:t>
+            </a:r>
+            <a:endParaRPr lang="ru-RU" dirty="0"/>
+          </a:p>
+        </p:txBody>
+      </p:sp>
+      <p:sp>
+        <p:nvSpPr>
+          <p:cNvPr id="4" name="Номер слайда 3"/>
+          <p:cNvSpPr>
+            <a:spLocks noGrp="1"/>
+          </p:cNvSpPr>
+          <p:nvPr>
+            <p:ph type="sldNum" sz="quarter" idx="10"/>
+          </p:nvPr>
+        </p:nvSpPr>
+        <p:spPr/>
+        <p:txBody>
+          <a:bodyPr/>
+          <a:lstStyle/>
+          <a:p>
+            <a:fld id="{D2C5C3F3-C17D-45D2-AA34-92C6E86E38D2}" type="slidenum">
+              <a:rPr lang="ru-RU" smtClean="0"/>
+              <a:t>25</a:t>
+            </a:fld>
+            <a:endParaRPr lang="ru-RU"/>
+          </a:p>
+        </p:txBody>
+      </p:sp>
+    </p:spTree>
+    <p:extLst>
+      <p:ext uri="{BB962C8B-B14F-4D97-AF65-F5344CB8AC3E}">
+        <p14:creationId xmlns:p14="http://schemas.microsoft.com/office/powerpoint/2010/main" val="725484770"/>
       </p:ext>
     </p:extLst>
   </p:cSld>
@@ -1951,73 +2079,46 @@
           <a:bodyPr/>
           <a:lstStyle/>
           <a:p>
-            <a:pPr marL="0" marR="0" indent="0" algn="l" defTabSz="914400" rtl="0" eaLnBrk="1" fontAlgn="auto" latinLnBrk="0" hangingPunct="1">
-              <a:lnSpc>
-                <a:spcPct val="100000"/>
-              </a:lnSpc>
-              <a:spcBef>
-                <a:spcPts val="0"/>
-              </a:spcBef>
-              <a:spcAft>
-                <a:spcPts val="0"/>
-              </a:spcAft>
-              <a:buClrTx/>
-              <a:buSzTx/>
-              <a:buFontTx/>
-              <a:buNone/>
-              <a:tabLst/>
-              <a:defRPr/>
-            </a:pPr>
-            <a:r>
-              <a:rPr lang="ru-RU" sz="1200" dirty="0" smtClean="0"/>
-              <a:t>средство моделирования и верификации протоколов, параллельных программ и широкого класса дискретных систем</a:t>
-            </a:r>
+            <a:r>
+              <a:rPr lang="ru-RU" dirty="0" smtClean="0"/>
+              <a:t>!Пересечение</a:t>
+            </a:r>
+            <a:r>
+              <a:rPr lang="ru-RU" baseline="0" dirty="0" smtClean="0"/>
+              <a:t> Возможного поведения программы с неправильным должно быть пусто</a:t>
+            </a:r>
+          </a:p>
+          <a:p>
+            <a:r>
+              <a:rPr lang="ru-RU" dirty="0" smtClean="0"/>
+              <a:t>Инженерный язык программирования</a:t>
+            </a:r>
+            <a:r>
+              <a:rPr lang="ru-RU" baseline="0" dirty="0" smtClean="0"/>
+              <a:t> может ограничивать возможности пользователя писать неправильные программы. У языка описания моделей другие задачи.</a:t>
+            </a:r>
+          </a:p>
+          <a:p>
+            <a:r>
+              <a:rPr lang="ru-RU" baseline="0" dirty="0" smtClean="0"/>
+              <a:t>Язык описания моделей должен позволять пользователю написать любую программу, которую он захочет, поскольку в исходной системе могут быть </a:t>
+            </a:r>
+            <a:r>
+              <a:rPr lang="ru-RU" baseline="0" dirty="0" err="1" smtClean="0"/>
+              <a:t>произ</a:t>
+            </a:r>
+            <a:r>
+              <a:rPr lang="ru-RU" baseline="0" dirty="0" smtClean="0"/>
+              <a:t> ошибки. Главное что для любой программы написанной на языке описания моделей верификация должна быть разрешена.</a:t>
+            </a:r>
+          </a:p>
+          <a:p>
             <a:endParaRPr lang="ru-RU" baseline="0" dirty="0" smtClean="0"/>
           </a:p>
           <a:p>
-            <a:pPr marL="0" marR="0" indent="0" algn="l" defTabSz="914400" rtl="0" eaLnBrk="1" fontAlgn="auto" latinLnBrk="0" hangingPunct="1">
-              <a:lnSpc>
-                <a:spcPct val="100000"/>
-              </a:lnSpc>
-              <a:spcBef>
-                <a:spcPts val="0"/>
-              </a:spcBef>
-              <a:spcAft>
-                <a:spcPts val="0"/>
-              </a:spcAft>
-              <a:buClrTx/>
-              <a:buSzTx/>
-              <a:buFontTx/>
-              <a:buNone/>
-              <a:tabLst/>
-              <a:defRPr/>
-            </a:pPr>
-            <a:r>
-              <a:rPr lang="ru-RU" baseline="0" dirty="0" err="1" smtClean="0"/>
-              <a:t>Контрпример</a:t>
-            </a:r>
             <a:r>
               <a:rPr lang="ru-RU" baseline="0" dirty="0" smtClean="0"/>
-              <a:t> – </a:t>
-            </a:r>
-            <a:r>
-              <a:rPr lang="ru-RU" baseline="0" dirty="0" err="1" smtClean="0"/>
-              <a:t>трассса</a:t>
-            </a:r>
-            <a:r>
-              <a:rPr lang="ru-RU" baseline="0" dirty="0" smtClean="0"/>
-              <a:t>, содержащая ошибку</a:t>
-            </a:r>
-            <a:endParaRPr lang="ru-RU" dirty="0" smtClean="0"/>
-          </a:p>
-          <a:p>
-            <a:r>
-              <a:rPr lang="ru-RU" dirty="0" smtClean="0"/>
-              <a:t>Примеры использования: верификация системы управления дамбами в Нидерландах,</a:t>
-            </a:r>
-            <a:r>
-              <a:rPr lang="ru-RU" baseline="0" dirty="0" smtClean="0"/>
-              <a:t> верификация аэрокосмических систем</a:t>
+              <a:t>Верификация программ в общем случае алгоритмически неразрешима (см. Теорема Райса)</a:t>
             </a:r>
             <a:endParaRPr lang="ru-RU" dirty="0"/>
           </a:p>
@@ -2040,7 +2141,7 @@
           <a:p>
             <a:fld id="{D2C5C3F3-C17D-45D2-AA34-92C6E86E38D2}" type="slidenum">
               <a:rPr lang="ru-RU" smtClean="0"/>
-              <a:t>6</a:t>
+              <a:t>4</a:t>
             </a:fld>
             <a:endParaRPr lang="ru-RU"/>
           </a:p>
@@ -2049,7 +2150,7 @@
     </p:spTree>
     <p:extLst>
       <p:ext uri="{BB962C8B-B14F-4D97-AF65-F5344CB8AC3E}">
-        <p14:creationId xmlns:p14="http://schemas.microsoft.com/office/powerpoint/2010/main" val="3875426799"/>
+        <p14:creationId xmlns:p14="http://schemas.microsoft.com/office/powerpoint/2010/main" val="2273666312"/>
       </p:ext>
     </p:extLst>
   </p:cSld>
@@ -2103,9 +2204,73 @@
           <a:bodyPr/>
           <a:lstStyle/>
           <a:p>
+            <a:pPr marL="0" marR="0" indent="0" algn="l" defTabSz="914400" rtl="0" eaLnBrk="1" fontAlgn="auto" latinLnBrk="0" hangingPunct="1">
+              <a:lnSpc>
+                <a:spcPct val="100000"/>
+              </a:lnSpc>
+              <a:spcBef>
+                <a:spcPts val="0"/>
+              </a:spcBef>
+              <a:spcAft>
+                <a:spcPts val="0"/>
+              </a:spcAft>
+              <a:buClrTx/>
+              <a:buSzTx/>
+              <a:buFontTx/>
+              <a:buNone/>
+              <a:tabLst/>
+              <a:defRPr/>
+            </a:pPr>
+            <a:r>
+              <a:rPr lang="ru-RU" sz="1200" dirty="0" smtClean="0"/>
+              <a:t>средство моделирования и верификации протоколов, параллельных программ и широкого класса дискретных систем</a:t>
+            </a:r>
+            <a:endParaRPr lang="ru-RU" baseline="0" dirty="0" smtClean="0"/>
+          </a:p>
+          <a:p>
+            <a:pPr marL="0" marR="0" indent="0" algn="l" defTabSz="914400" rtl="0" eaLnBrk="1" fontAlgn="auto" latinLnBrk="0" hangingPunct="1">
+              <a:lnSpc>
+                <a:spcPct val="100000"/>
+              </a:lnSpc>
+              <a:spcBef>
+                <a:spcPts val="0"/>
+              </a:spcBef>
+              <a:spcAft>
+                <a:spcPts val="0"/>
+              </a:spcAft>
+              <a:buClrTx/>
+              <a:buSzTx/>
+              <a:buFontTx/>
+              <a:buNone/>
+              <a:tabLst/>
+              <a:defRPr/>
+            </a:pPr>
+            <a:r>
+              <a:rPr lang="ru-RU" baseline="0" dirty="0" err="1" smtClean="0"/>
+              <a:t>Контрпример</a:t>
+            </a:r>
+            <a:r>
+              <a:rPr lang="ru-RU" baseline="0" dirty="0" smtClean="0"/>
+              <a:t> – </a:t>
+            </a:r>
+            <a:r>
+              <a:rPr lang="ru-RU" baseline="0" dirty="0" err="1" smtClean="0"/>
+              <a:t>трассса</a:t>
+            </a:r>
+            <a:r>
+              <a:rPr lang="ru-RU" baseline="0" dirty="0" smtClean="0"/>
+              <a:t>, содержащая ошибку</a:t>
+            </a:r>
+            <a:endParaRPr lang="ru-RU" dirty="0" smtClean="0"/>
+          </a:p>
+          <a:p>
             <a:r>
               <a:rPr lang="ru-RU" dirty="0" smtClean="0"/>
-              <a:t>Диаграмма классов всей системы</a:t>
+              <a:t>Примеры использования: верификация системы управления дамбами в Нидерландах,</a:t>
+            </a:r>
+            <a:r>
+              <a:rPr lang="ru-RU" baseline="0" dirty="0" smtClean="0"/>
+              <a:t> верификация аэрокосмических систем</a:t>
             </a:r>
             <a:endParaRPr lang="ru-RU" dirty="0"/>
           </a:p>
@@ -2128,7 +2293,7 @@
           <a:p>
             <a:fld id="{D2C5C3F3-C17D-45D2-AA34-92C6E86E38D2}" type="slidenum">
               <a:rPr lang="ru-RU" smtClean="0"/>
-              <a:t>7</a:t>
+              <a:t>6</a:t>
             </a:fld>
             <a:endParaRPr lang="ru-RU"/>
           </a:p>
@@ -2137,7 +2302,7 @@
     </p:spTree>
     <p:extLst>
       <p:ext uri="{BB962C8B-B14F-4D97-AF65-F5344CB8AC3E}">
-        <p14:creationId xmlns:p14="http://schemas.microsoft.com/office/powerpoint/2010/main" val="1951951640"/>
+        <p14:creationId xmlns:p14="http://schemas.microsoft.com/office/powerpoint/2010/main" val="3875426799"/>
       </p:ext>
     </p:extLst>
   </p:cSld>
@@ -2192,75 +2357,10 @@
           <a:lstStyle/>
           <a:p>
             <a:r>
-              <a:rPr lang="ru-RU" sz="1200" b="0" i="0" u="none" strike="noStrike" kern="1200" baseline="0" dirty="0" err="1" smtClean="0">
-                <a:solidFill>
-                  <a:schemeClr val="tx1"/>
-                </a:solidFill>
-                <a:latin typeface="+mn-lt"/>
-                <a:ea typeface="+mn-ea"/>
-                <a:cs typeface="+mn-cs"/>
-              </a:rPr>
-              <a:t>Promela</a:t>
-            </a:r>
-            <a:r>
-              <a:rPr lang="ru-RU" sz="1200" b="0" i="0" u="none" strike="noStrike" kern="1200" baseline="0" dirty="0" smtClean="0">
-                <a:solidFill>
-                  <a:schemeClr val="tx1"/>
-                </a:solidFill>
-                <a:latin typeface="+mn-lt"/>
-                <a:ea typeface="+mn-ea"/>
-                <a:cs typeface="+mn-cs"/>
-              </a:rPr>
-              <a:t> предоставляет простые механизмы обеспечения недетерминизма </a:t>
-            </a:r>
-          </a:p>
-          <a:p>
-            <a:r>
-              <a:rPr lang="ru-RU" sz="1200" b="0" i="0" u="none" strike="noStrike" kern="1200" baseline="0" dirty="0" smtClean="0">
-                <a:solidFill>
-                  <a:schemeClr val="tx1"/>
-                </a:solidFill>
-                <a:latin typeface="+mn-lt"/>
-                <a:ea typeface="+mn-ea"/>
-                <a:cs typeface="+mn-cs"/>
-              </a:rPr>
-              <a:t>•Если не выполняется ни одно из условий, процесс блокируется </a:t>
-            </a:r>
-          </a:p>
-          <a:p>
-            <a:r>
-              <a:rPr lang="ru-RU" sz="1200" b="0" i="0" u="none" strike="noStrike" kern="1200" baseline="0" dirty="0" smtClean="0">
-                <a:solidFill>
-                  <a:schemeClr val="tx1"/>
-                </a:solidFill>
-                <a:latin typeface="+mn-lt"/>
-                <a:ea typeface="+mn-ea"/>
-                <a:cs typeface="+mn-cs"/>
-              </a:rPr>
-              <a:t>•Операторы в </a:t>
-            </a:r>
-            <a:r>
-              <a:rPr lang="ru-RU" sz="1200" b="0" i="0" u="none" strike="noStrike" kern="1200" baseline="0" dirty="0" err="1" smtClean="0">
-                <a:solidFill>
-                  <a:schemeClr val="tx1"/>
-                </a:solidFill>
-                <a:latin typeface="+mn-lt"/>
-                <a:ea typeface="+mn-ea"/>
-                <a:cs typeface="+mn-cs"/>
-              </a:rPr>
-              <a:t>Promela</a:t>
-            </a:r>
-            <a:r>
-              <a:rPr lang="ru-RU" sz="1200" b="0" i="0" u="none" strike="noStrike" kern="1200" baseline="0" dirty="0" smtClean="0">
-                <a:solidFill>
-                  <a:schemeClr val="tx1"/>
-                </a:solidFill>
-                <a:latin typeface="+mn-lt"/>
-                <a:ea typeface="+mn-ea"/>
-                <a:cs typeface="+mn-cs"/>
-              </a:rPr>
-              <a:t> являются блокирующими </a:t>
-            </a:r>
+              <a:rPr lang="ru-RU" dirty="0" smtClean="0"/>
+              <a:t>Диаграмма классов всей системы</a:t>
+            </a:r>
+            <a:endParaRPr lang="ru-RU" dirty="0"/>
           </a:p>
         </p:txBody>
       </p:sp>
@@ -2281,7 +2381,7 @@
           <a:p>
             <a:fld id="{D2C5C3F3-C17D-45D2-AA34-92C6E86E38D2}" type="slidenum">
               <a:rPr lang="ru-RU" smtClean="0"/>
-              <a:t>8</a:t>
+              <a:t>7</a:t>
             </a:fld>
             <a:endParaRPr lang="ru-RU"/>
           </a:p>
@@ -2434,7 +2534,7 @@
           <a:p>
             <a:fld id="{D2C5C3F3-C17D-45D2-AA34-92C6E86E38D2}" type="slidenum">
               <a:rPr lang="ru-RU" smtClean="0"/>
-              <a:t>9</a:t>
+              <a:t>8</a:t>
             </a:fld>
             <a:endParaRPr lang="ru-RU"/>
           </a:p>
@@ -2587,7 +2687,7 @@
           <a:p>
             <a:fld id="{D2C5C3F3-C17D-45D2-AA34-92C6E86E38D2}" type="slidenum">
               <a:rPr lang="ru-RU" smtClean="0"/>
-              <a:t>10</a:t>
+              <a:t>9</a:t>
             </a:fld>
             <a:endParaRPr lang="ru-RU"/>
           </a:p>
@@ -2740,7 +2840,7 @@
           <a:p>
             <a:fld id="{D2C5C3F3-C17D-45D2-AA34-92C6E86E38D2}" type="slidenum">
               <a:rPr lang="ru-RU" smtClean="0"/>
-              <a:t>11</a:t>
+              <a:t>10</a:t>
             </a:fld>
             <a:endParaRPr lang="ru-RU"/>
           </a:p>
@@ -2893,7 +2993,7 @@
           <a:p>
             <a:fld id="{D2C5C3F3-C17D-45D2-AA34-92C6E86E38D2}" type="slidenum">
               <a:rPr lang="ru-RU" smtClean="0"/>
-              <a:t>12</a:t>
+              <a:t>11</a:t>
             </a:fld>
             <a:endParaRPr lang="ru-RU"/>
           </a:p>
@@ -6341,7 +6441,7 @@
           <p:nvPr/>
         </p:nvPicPr>
         <p:blipFill>
-          <a:blip r:embed="rId2">
+          <a:blip r:embed="rId3">
             <a:extLst>
               <a:ext uri="{28A0092B-C50C-407E-A947-70E740481C1C}">
                 <a14:useLocalDpi xmlns:a14="http://schemas.microsoft.com/office/drawing/2010/main" val="0"/>
@@ -6483,29 +6583,6 @@
       </p:sp>
       <p:sp>
         <p:nvSpPr>
-          <p:cNvPr id="3" name="Объект 2"/>
-          <p:cNvSpPr>
-            <a:spLocks noGrp="1"/>
-          </p:cNvSpPr>
-          <p:nvPr>
-            <p:ph idx="1"/>
-          </p:nvPr>
-        </p:nvSpPr>
-        <p:spPr/>
-        <p:txBody>
-          <a:bodyPr/>
-          <a:lstStyle/>
-          <a:p>
-            <a:r>
-              <a:rPr lang="ru-RU" dirty="0" smtClean="0"/>
-              <a:t>дерево</a:t>
-            </a:r>
-            <a:endParaRPr lang="ru-RU" dirty="0"/>
-          </a:p>
-        </p:txBody>
-      </p:sp>
-      <p:sp>
-        <p:nvSpPr>
           <p:cNvPr id="9" name="Заголовок 1"/>
           <p:cNvSpPr>
             <a:spLocks noGrp="1"/>
@@ -6724,6 +6801,230 @@
               <a:t>Имитация автоматической коробки передач</a:t>
             </a:r>
             <a:endParaRPr lang="en-US" b="1" dirty="0" smtClean="0"/>
+          </a:p>
+        </p:txBody>
+      </p:sp>
+      <p:pic>
+        <p:nvPicPr>
+          <p:cNvPr id="13" name="Объект 12"/>
+          <p:cNvPicPr>
+            <a:picLocks noGrp="1" noChangeAspect="1"/>
+          </p:cNvPicPr>
+          <p:nvPr>
+            <p:ph idx="1"/>
+          </p:nvPr>
+        </p:nvPicPr>
+        <p:blipFill>
+          <a:blip r:embed="rId3">
+            <a:extLst>
+              <a:ext uri="{28A0092B-C50C-407E-A947-70E740481C1C}">
+                <a14:useLocalDpi xmlns:a14="http://schemas.microsoft.com/office/drawing/2010/main" val="0"/>
+              </a:ext>
+            </a:extLst>
+          </a:blip>
+          <a:stretch>
+            <a:fillRect/>
+          </a:stretch>
+        </p:blipFill>
+        <p:spPr>
+          <a:xfrm>
+            <a:off x="683568" y="1340768"/>
+            <a:ext cx="7704856" cy="4981028"/>
+          </a:xfrm>
+        </p:spPr>
+      </p:pic>
+      <p:sp>
+        <p:nvSpPr>
+          <p:cNvPr id="14" name="Объект 9"/>
+          <p:cNvSpPr txBox="1">
+            <a:spLocks/>
+          </p:cNvSpPr>
+          <p:nvPr/>
+        </p:nvSpPr>
+        <p:spPr>
+          <a:xfrm>
+            <a:off x="5220072" y="5733256"/>
+            <a:ext cx="2448272" cy="504056"/>
+          </a:xfrm>
+          <a:prstGeom prst="rect">
+            <a:avLst/>
+          </a:prstGeom>
+        </p:spPr>
+        <p:txBody>
+          <a:bodyPr/>
+          <a:lstStyle>
+            <a:lvl1pPr marL="342900" indent="-342900" algn="l" defTabSz="914400" rtl="0" eaLnBrk="1" latinLnBrk="0" hangingPunct="1">
+              <a:spcBef>
+                <a:spcPct val="20000"/>
+              </a:spcBef>
+              <a:buFont typeface="Arial" pitchFamily="34" charset="0"/>
+              <a:buChar char="•"/>
+              <a:defRPr sz="2400" kern="1200">
+                <a:solidFill>
+                  <a:schemeClr val="tx1">
+                    <a:lumMod val="50000"/>
+                    <a:lumOff val="50000"/>
+                  </a:schemeClr>
+                </a:solidFill>
+                <a:latin typeface="+mj-lt"/>
+                <a:ea typeface="+mn-ea"/>
+                <a:cs typeface="+mn-cs"/>
+              </a:defRPr>
+            </a:lvl1pPr>
+            <a:lvl2pPr marL="742950" indent="-285750" algn="l" defTabSz="914400" rtl="0" eaLnBrk="1" latinLnBrk="0" hangingPunct="1">
+              <a:spcBef>
+                <a:spcPct val="20000"/>
+              </a:spcBef>
+              <a:buFont typeface="Courier New" pitchFamily="49" charset="0"/>
+              <a:buChar char="o"/>
+              <a:defRPr sz="1600" kern="1200">
+                <a:solidFill>
+                  <a:schemeClr val="tx1">
+                    <a:lumMod val="50000"/>
+                    <a:lumOff val="50000"/>
+                  </a:schemeClr>
+                </a:solidFill>
+                <a:latin typeface="+mj-lt"/>
+                <a:ea typeface="+mn-ea"/>
+                <a:cs typeface="+mn-cs"/>
+              </a:defRPr>
+            </a:lvl2pPr>
+            <a:lvl3pPr marL="1143000" indent="-228600" algn="l" defTabSz="914400" rtl="0" eaLnBrk="1" latinLnBrk="0" hangingPunct="1">
+              <a:spcBef>
+                <a:spcPct val="20000"/>
+              </a:spcBef>
+              <a:buFont typeface="Arial" pitchFamily="34" charset="0"/>
+              <a:buChar char="•"/>
+              <a:defRPr sz="1600" kern="1200">
+                <a:solidFill>
+                  <a:schemeClr val="tx1">
+                    <a:lumMod val="50000"/>
+                    <a:lumOff val="50000"/>
+                  </a:schemeClr>
+                </a:solidFill>
+                <a:latin typeface="+mj-lt"/>
+                <a:ea typeface="+mn-ea"/>
+                <a:cs typeface="+mn-cs"/>
+              </a:defRPr>
+            </a:lvl3pPr>
+            <a:lvl4pPr marL="1600200" indent="-228600" algn="l" defTabSz="914400" rtl="0" eaLnBrk="1" latinLnBrk="0" hangingPunct="1">
+              <a:spcBef>
+                <a:spcPct val="20000"/>
+              </a:spcBef>
+              <a:buFont typeface="Courier New" pitchFamily="49" charset="0"/>
+              <a:buChar char="o"/>
+              <a:defRPr sz="1600" kern="1200">
+                <a:solidFill>
+                  <a:schemeClr val="tx1">
+                    <a:lumMod val="50000"/>
+                    <a:lumOff val="50000"/>
+                  </a:schemeClr>
+                </a:solidFill>
+                <a:latin typeface="+mj-lt"/>
+                <a:ea typeface="+mn-ea"/>
+                <a:cs typeface="+mn-cs"/>
+              </a:defRPr>
+            </a:lvl4pPr>
+            <a:lvl5pPr marL="2057400" indent="-228600" algn="l" defTabSz="914400" rtl="0" eaLnBrk="1" latinLnBrk="0" hangingPunct="1">
+              <a:spcBef>
+                <a:spcPct val="20000"/>
+              </a:spcBef>
+              <a:buFont typeface="Arial" pitchFamily="34" charset="0"/>
+              <a:buChar char="•"/>
+              <a:defRPr sz="1600" kern="1200">
+                <a:solidFill>
+                  <a:schemeClr val="tx1">
+                    <a:lumMod val="50000"/>
+                    <a:lumOff val="50000"/>
+                  </a:schemeClr>
+                </a:solidFill>
+                <a:latin typeface="+mj-lt"/>
+                <a:ea typeface="+mn-ea"/>
+                <a:cs typeface="+mn-cs"/>
+              </a:defRPr>
+            </a:lvl5pPr>
+            <a:lvl6pPr marL="2514600" indent="-228600" algn="l" defTabSz="914400" rtl="0" eaLnBrk="1" latinLnBrk="0" hangingPunct="1">
+              <a:spcBef>
+                <a:spcPct val="20000"/>
+              </a:spcBef>
+              <a:buFont typeface="Courier New" pitchFamily="49" charset="0"/>
+              <a:buChar char="o"/>
+              <a:defRPr sz="1600" kern="1200">
+                <a:solidFill>
+                  <a:schemeClr val="tx1">
+                    <a:lumMod val="50000"/>
+                    <a:lumOff val="50000"/>
+                  </a:schemeClr>
+                </a:solidFill>
+                <a:latin typeface="+mj-lt"/>
+                <a:ea typeface="+mn-ea"/>
+                <a:cs typeface="+mn-cs"/>
+              </a:defRPr>
+            </a:lvl6pPr>
+            <a:lvl7pPr marL="2971800" indent="-228600" algn="l" defTabSz="914400" rtl="0" eaLnBrk="1" latinLnBrk="0" hangingPunct="1">
+              <a:spcBef>
+                <a:spcPct val="20000"/>
+              </a:spcBef>
+              <a:buFont typeface="Arial" pitchFamily="34" charset="0"/>
+              <a:buChar char="•"/>
+              <a:defRPr sz="1600" kern="1200">
+                <a:solidFill>
+                  <a:schemeClr val="tx1">
+                    <a:lumMod val="50000"/>
+                    <a:lumOff val="50000"/>
+                  </a:schemeClr>
+                </a:solidFill>
+                <a:latin typeface="+mj-lt"/>
+                <a:ea typeface="+mn-ea"/>
+                <a:cs typeface="+mn-cs"/>
+              </a:defRPr>
+            </a:lvl7pPr>
+            <a:lvl8pPr marL="3429000" indent="-228600" algn="l" defTabSz="914400" rtl="0" eaLnBrk="1" latinLnBrk="0" hangingPunct="1">
+              <a:spcBef>
+                <a:spcPct val="20000"/>
+              </a:spcBef>
+              <a:buFont typeface="Courier New" pitchFamily="49" charset="0"/>
+              <a:buChar char="o"/>
+              <a:defRPr sz="1600" kern="1200">
+                <a:solidFill>
+                  <a:schemeClr val="tx1">
+                    <a:lumMod val="50000"/>
+                    <a:lumOff val="50000"/>
+                  </a:schemeClr>
+                </a:solidFill>
+                <a:latin typeface="+mj-lt"/>
+                <a:ea typeface="+mn-ea"/>
+                <a:cs typeface="+mn-cs"/>
+              </a:defRPr>
+            </a:lvl8pPr>
+            <a:lvl9pPr marL="3886200" indent="-228600" algn="l" defTabSz="914400" rtl="0" eaLnBrk="1" latinLnBrk="0" hangingPunct="1">
+              <a:spcBef>
+                <a:spcPct val="20000"/>
+              </a:spcBef>
+              <a:buFont typeface="Arial" pitchFamily="34" charset="0"/>
+              <a:buChar char="•"/>
+              <a:defRPr sz="1600" kern="1200">
+                <a:solidFill>
+                  <a:schemeClr val="tx1">
+                    <a:lumMod val="50000"/>
+                    <a:lumOff val="50000"/>
+                  </a:schemeClr>
+                </a:solidFill>
+                <a:latin typeface="+mj-lt"/>
+                <a:ea typeface="+mn-ea"/>
+                <a:cs typeface="+mn-cs"/>
+              </a:defRPr>
+            </a:lvl9pPr>
+          </a:lstStyle>
+          <a:p>
+            <a:pPr marL="0" indent="0" algn="ctr">
+              <a:buNone/>
+            </a:pPr>
+            <a:r>
+              <a:rPr lang="en-US" sz="3200" b="1" dirty="0" smtClean="0"/>
+              <a:t>[AST]</a:t>
+            </a:r>
+            <a:endParaRPr lang="en-US" sz="2000" b="1" dirty="0" smtClean="0"/>
           </a:p>
         </p:txBody>
       </p:sp>
@@ -6848,49 +7149,54 @@
       </p:sp>
       <p:sp>
         <p:nvSpPr>
-          <p:cNvPr id="3" name="Объект 2"/>
-          <p:cNvSpPr>
-            <a:spLocks noGrp="1"/>
-          </p:cNvSpPr>
-          <p:nvPr>
-            <p:ph idx="1"/>
-          </p:nvPr>
-        </p:nvSpPr>
-        <p:spPr/>
-        <p:txBody>
-          <a:bodyPr/>
-          <a:lstStyle/>
-          <a:p>
-            <a:r>
-              <a:rPr lang="ru-RU" dirty="0" smtClean="0"/>
-              <a:t>Кол граф</a:t>
-            </a:r>
-            <a:endParaRPr lang="ru-RU" dirty="0"/>
-          </a:p>
-        </p:txBody>
-      </p:sp>
-      <p:sp>
-        <p:nvSpPr>
           <p:cNvPr id="9" name="Заголовок 1"/>
-          <p:cNvSpPr>
-            <a:spLocks noGrp="1"/>
-          </p:cNvSpPr>
-          <p:nvPr>
-            <p:ph type="title"/>
-          </p:nvPr>
+          <p:cNvSpPr txBox="1">
+            <a:spLocks/>
+          </p:cNvSpPr>
+          <p:nvPr/>
         </p:nvSpPr>
         <p:spPr>
           <a:xfrm>
             <a:off x="457200" y="-675456"/>
             <a:ext cx="8229600" cy="1600200"/>
           </a:xfrm>
+          <a:prstGeom prst="rect">
+            <a:avLst/>
+          </a:prstGeom>
         </p:spPr>
         <p:txBody>
-          <a:bodyPr/>
-          <a:lstStyle/>
-          <a:p>
-            <a:r>
-              <a:rPr lang="ru-RU" dirty="0" smtClean="0"/>
+          <a:bodyPr vert="horz" lIns="91440" tIns="45720" rIns="91440" bIns="45720" rtlCol="0" anchor="b">
+            <a:noAutofit/>
+          </a:bodyPr>
+          <a:lstStyle>
+            <a:lvl1pPr algn="ctr" defTabSz="914400" rtl="0" eaLnBrk="1" latinLnBrk="0" hangingPunct="1">
+              <a:lnSpc>
+                <a:spcPts val="5800"/>
+              </a:lnSpc>
+              <a:spcBef>
+                <a:spcPct val="0"/>
+              </a:spcBef>
+              <a:buNone/>
+              <a:defRPr sz="5400" kern="1200">
+                <a:solidFill>
+                  <a:schemeClr val="tx2"/>
+                </a:solidFill>
+                <a:effectLst>
+                  <a:outerShdw blurRad="63500" dist="38100" dir="5400000" algn="t" rotWithShape="0">
+                    <a:prstClr val="black">
+                      <a:alpha val="25000"/>
+                    </a:prstClr>
+                  </a:outerShdw>
+                </a:effectLst>
+                <a:latin typeface="+mn-lt"/>
+                <a:ea typeface="+mj-ea"/>
+                <a:cs typeface="+mj-cs"/>
+              </a:defRPr>
+            </a:lvl1pPr>
+          </a:lstStyle>
+          <a:p>
+            <a:r>
+              <a:rPr lang="ru-RU" smtClean="0"/>
               <a:t>Пример системы</a:t>
             </a:r>
             <a:endParaRPr lang="ru-RU" dirty="0"/>
@@ -7092,10 +7398,233 @@
           </a:p>
         </p:txBody>
       </p:sp>
+      <p:pic>
+        <p:nvPicPr>
+          <p:cNvPr id="15" name="Объект 14"/>
+          <p:cNvPicPr>
+            <a:picLocks noGrp="1" noChangeAspect="1"/>
+          </p:cNvPicPr>
+          <p:nvPr>
+            <p:ph idx="1"/>
+          </p:nvPr>
+        </p:nvPicPr>
+        <p:blipFill rotWithShape="1">
+          <a:blip r:embed="rId3">
+            <a:extLst>
+              <a:ext uri="{28A0092B-C50C-407E-A947-70E740481C1C}">
+                <a14:useLocalDpi xmlns:a14="http://schemas.microsoft.com/office/drawing/2010/main" val="0"/>
+              </a:ext>
+            </a:extLst>
+          </a:blip>
+          <a:srcRect r="12059"/>
+          <a:stretch/>
+        </p:blipFill>
+        <p:spPr>
+          <a:xfrm>
+            <a:off x="837749" y="1700808"/>
+            <a:ext cx="7478667" cy="4498784"/>
+          </a:xfrm>
+        </p:spPr>
+      </p:pic>
+      <p:sp>
+        <p:nvSpPr>
+          <p:cNvPr id="16" name="Объект 9"/>
+          <p:cNvSpPr txBox="1">
+            <a:spLocks/>
+          </p:cNvSpPr>
+          <p:nvPr/>
+        </p:nvSpPr>
+        <p:spPr>
+          <a:xfrm>
+            <a:off x="5436096" y="5517232"/>
+            <a:ext cx="2448272" cy="504056"/>
+          </a:xfrm>
+          <a:prstGeom prst="rect">
+            <a:avLst/>
+          </a:prstGeom>
+        </p:spPr>
+        <p:txBody>
+          <a:bodyPr/>
+          <a:lstStyle>
+            <a:lvl1pPr marL="342900" indent="-342900" algn="l" defTabSz="914400" rtl="0" eaLnBrk="1" latinLnBrk="0" hangingPunct="1">
+              <a:spcBef>
+                <a:spcPct val="20000"/>
+              </a:spcBef>
+              <a:buFont typeface="Arial" pitchFamily="34" charset="0"/>
+              <a:buChar char="•"/>
+              <a:defRPr sz="2400" kern="1200">
+                <a:solidFill>
+                  <a:schemeClr val="tx1">
+                    <a:lumMod val="50000"/>
+                    <a:lumOff val="50000"/>
+                  </a:schemeClr>
+                </a:solidFill>
+                <a:latin typeface="+mj-lt"/>
+                <a:ea typeface="+mn-ea"/>
+                <a:cs typeface="+mn-cs"/>
+              </a:defRPr>
+            </a:lvl1pPr>
+            <a:lvl2pPr marL="742950" indent="-285750" algn="l" defTabSz="914400" rtl="0" eaLnBrk="1" latinLnBrk="0" hangingPunct="1">
+              <a:spcBef>
+                <a:spcPct val="20000"/>
+              </a:spcBef>
+              <a:buFont typeface="Courier New" pitchFamily="49" charset="0"/>
+              <a:buChar char="o"/>
+              <a:defRPr sz="1600" kern="1200">
+                <a:solidFill>
+                  <a:schemeClr val="tx1">
+                    <a:lumMod val="50000"/>
+                    <a:lumOff val="50000"/>
+                  </a:schemeClr>
+                </a:solidFill>
+                <a:latin typeface="+mj-lt"/>
+                <a:ea typeface="+mn-ea"/>
+                <a:cs typeface="+mn-cs"/>
+              </a:defRPr>
+            </a:lvl2pPr>
+            <a:lvl3pPr marL="1143000" indent="-228600" algn="l" defTabSz="914400" rtl="0" eaLnBrk="1" latinLnBrk="0" hangingPunct="1">
+              <a:spcBef>
+                <a:spcPct val="20000"/>
+              </a:spcBef>
+              <a:buFont typeface="Arial" pitchFamily="34" charset="0"/>
+              <a:buChar char="•"/>
+              <a:defRPr sz="1600" kern="1200">
+                <a:solidFill>
+                  <a:schemeClr val="tx1">
+                    <a:lumMod val="50000"/>
+                    <a:lumOff val="50000"/>
+                  </a:schemeClr>
+                </a:solidFill>
+                <a:latin typeface="+mj-lt"/>
+                <a:ea typeface="+mn-ea"/>
+                <a:cs typeface="+mn-cs"/>
+              </a:defRPr>
+            </a:lvl3pPr>
+            <a:lvl4pPr marL="1600200" indent="-228600" algn="l" defTabSz="914400" rtl="0" eaLnBrk="1" latinLnBrk="0" hangingPunct="1">
+              <a:spcBef>
+                <a:spcPct val="20000"/>
+              </a:spcBef>
+              <a:buFont typeface="Courier New" pitchFamily="49" charset="0"/>
+              <a:buChar char="o"/>
+              <a:defRPr sz="1600" kern="1200">
+                <a:solidFill>
+                  <a:schemeClr val="tx1">
+                    <a:lumMod val="50000"/>
+                    <a:lumOff val="50000"/>
+                  </a:schemeClr>
+                </a:solidFill>
+                <a:latin typeface="+mj-lt"/>
+                <a:ea typeface="+mn-ea"/>
+                <a:cs typeface="+mn-cs"/>
+              </a:defRPr>
+            </a:lvl4pPr>
+            <a:lvl5pPr marL="2057400" indent="-228600" algn="l" defTabSz="914400" rtl="0" eaLnBrk="1" latinLnBrk="0" hangingPunct="1">
+              <a:spcBef>
+                <a:spcPct val="20000"/>
+              </a:spcBef>
+              <a:buFont typeface="Arial" pitchFamily="34" charset="0"/>
+              <a:buChar char="•"/>
+              <a:defRPr sz="1600" kern="1200">
+                <a:solidFill>
+                  <a:schemeClr val="tx1">
+                    <a:lumMod val="50000"/>
+                    <a:lumOff val="50000"/>
+                  </a:schemeClr>
+                </a:solidFill>
+                <a:latin typeface="+mj-lt"/>
+                <a:ea typeface="+mn-ea"/>
+                <a:cs typeface="+mn-cs"/>
+              </a:defRPr>
+            </a:lvl5pPr>
+            <a:lvl6pPr marL="2514600" indent="-228600" algn="l" defTabSz="914400" rtl="0" eaLnBrk="1" latinLnBrk="0" hangingPunct="1">
+              <a:spcBef>
+                <a:spcPct val="20000"/>
+              </a:spcBef>
+              <a:buFont typeface="Courier New" pitchFamily="49" charset="0"/>
+              <a:buChar char="o"/>
+              <a:defRPr sz="1600" kern="1200">
+                <a:solidFill>
+                  <a:schemeClr val="tx1">
+                    <a:lumMod val="50000"/>
+                    <a:lumOff val="50000"/>
+                  </a:schemeClr>
+                </a:solidFill>
+                <a:latin typeface="+mj-lt"/>
+                <a:ea typeface="+mn-ea"/>
+                <a:cs typeface="+mn-cs"/>
+              </a:defRPr>
+            </a:lvl6pPr>
+            <a:lvl7pPr marL="2971800" indent="-228600" algn="l" defTabSz="914400" rtl="0" eaLnBrk="1" latinLnBrk="0" hangingPunct="1">
+              <a:spcBef>
+                <a:spcPct val="20000"/>
+              </a:spcBef>
+              <a:buFont typeface="Arial" pitchFamily="34" charset="0"/>
+              <a:buChar char="•"/>
+              <a:defRPr sz="1600" kern="1200">
+                <a:solidFill>
+                  <a:schemeClr val="tx1">
+                    <a:lumMod val="50000"/>
+                    <a:lumOff val="50000"/>
+                  </a:schemeClr>
+                </a:solidFill>
+                <a:latin typeface="+mj-lt"/>
+                <a:ea typeface="+mn-ea"/>
+                <a:cs typeface="+mn-cs"/>
+              </a:defRPr>
+            </a:lvl7pPr>
+            <a:lvl8pPr marL="3429000" indent="-228600" algn="l" defTabSz="914400" rtl="0" eaLnBrk="1" latinLnBrk="0" hangingPunct="1">
+              <a:spcBef>
+                <a:spcPct val="20000"/>
+              </a:spcBef>
+              <a:buFont typeface="Courier New" pitchFamily="49" charset="0"/>
+              <a:buChar char="o"/>
+              <a:defRPr sz="1600" kern="1200">
+                <a:solidFill>
+                  <a:schemeClr val="tx1">
+                    <a:lumMod val="50000"/>
+                    <a:lumOff val="50000"/>
+                  </a:schemeClr>
+                </a:solidFill>
+                <a:latin typeface="+mj-lt"/>
+                <a:ea typeface="+mn-ea"/>
+                <a:cs typeface="+mn-cs"/>
+              </a:defRPr>
+            </a:lvl8pPr>
+            <a:lvl9pPr marL="3886200" indent="-228600" algn="l" defTabSz="914400" rtl="0" eaLnBrk="1" latinLnBrk="0" hangingPunct="1">
+              <a:spcBef>
+                <a:spcPct val="20000"/>
+              </a:spcBef>
+              <a:buFont typeface="Arial" pitchFamily="34" charset="0"/>
+              <a:buChar char="•"/>
+              <a:defRPr sz="1600" kern="1200">
+                <a:solidFill>
+                  <a:schemeClr val="tx1">
+                    <a:lumMod val="50000"/>
+                    <a:lumOff val="50000"/>
+                  </a:schemeClr>
+                </a:solidFill>
+                <a:latin typeface="+mj-lt"/>
+                <a:ea typeface="+mn-ea"/>
+                <a:cs typeface="+mn-cs"/>
+              </a:defRPr>
+            </a:lvl9pPr>
+          </a:lstStyle>
+          <a:p>
+            <a:pPr marL="0" indent="0" algn="ctr">
+              <a:buNone/>
+            </a:pPr>
+            <a:r>
+              <a:rPr lang="en-US" sz="3200" b="1" dirty="0" smtClean="0"/>
+              <a:t>[CFG]</a:t>
+            </a:r>
+            <a:endParaRPr lang="en-US" sz="2000" b="1" dirty="0" smtClean="0"/>
+          </a:p>
+        </p:txBody>
+      </p:sp>
     </p:spTree>
     <p:extLst>
       <p:ext uri="{BB962C8B-B14F-4D97-AF65-F5344CB8AC3E}">
-        <p14:creationId xmlns:p14="http://schemas.microsoft.com/office/powerpoint/2010/main" val="2695758369"/>
+        <p14:creationId xmlns:p14="http://schemas.microsoft.com/office/powerpoint/2010/main" val="3062141827"/>
       </p:ext>
     </p:extLst>
   </p:cSld>
@@ -7211,29 +7740,35 @@
           </a:p>
         </p:txBody>
       </p:sp>
-      <p:sp>
-        <p:nvSpPr>
-          <p:cNvPr id="3" name="Объект 2"/>
-          <p:cNvSpPr>
-            <a:spLocks noGrp="1"/>
-          </p:cNvSpPr>
+      <p:pic>
+        <p:nvPicPr>
+          <p:cNvPr id="11" name="Объект 10"/>
+          <p:cNvPicPr>
+            <a:picLocks noGrp="1" noChangeAspect="1"/>
+          </p:cNvPicPr>
           <p:nvPr>
             <p:ph idx="1"/>
           </p:nvPr>
-        </p:nvSpPr>
-        <p:spPr/>
-        <p:txBody>
-          <a:bodyPr/>
-          <a:lstStyle/>
-          <a:p>
-            <a:r>
-              <a:rPr lang="ru-RU" dirty="0" smtClean="0"/>
-              <a:t>промела</a:t>
-            </a:r>
-            <a:endParaRPr lang="ru-RU" dirty="0"/>
-          </a:p>
-        </p:txBody>
-      </p:sp>
+        </p:nvPicPr>
+        <p:blipFill>
+          <a:blip r:embed="rId3">
+            <a:extLst>
+              <a:ext uri="{28A0092B-C50C-407E-A947-70E740481C1C}">
+                <a14:useLocalDpi xmlns:a14="http://schemas.microsoft.com/office/drawing/2010/main" val="0"/>
+              </a:ext>
+            </a:extLst>
+          </a:blip>
+          <a:stretch>
+            <a:fillRect/>
+          </a:stretch>
+        </p:blipFill>
+        <p:spPr>
+          <a:xfrm>
+            <a:off x="107504" y="2132856"/>
+            <a:ext cx="8880318" cy="3384375"/>
+          </a:xfrm>
+        </p:spPr>
+      </p:pic>
       <p:sp>
         <p:nvSpPr>
           <p:cNvPr id="9" name="Заголовок 1"/>
@@ -7454,6 +7989,209 @@
               <a:t>Имитация автоматической коробки передач</a:t>
             </a:r>
             <a:endParaRPr lang="en-US" b="1" dirty="0" smtClean="0"/>
+          </a:p>
+        </p:txBody>
+      </p:sp>
+      <p:sp>
+        <p:nvSpPr>
+          <p:cNvPr id="12" name="Объект 9"/>
+          <p:cNvSpPr txBox="1">
+            <a:spLocks/>
+          </p:cNvSpPr>
+          <p:nvPr/>
+        </p:nvSpPr>
+        <p:spPr>
+          <a:xfrm>
+            <a:off x="3059832" y="1525219"/>
+            <a:ext cx="3240360" cy="504056"/>
+          </a:xfrm>
+          <a:prstGeom prst="rect">
+            <a:avLst/>
+          </a:prstGeom>
+        </p:spPr>
+        <p:txBody>
+          <a:bodyPr/>
+          <a:lstStyle>
+            <a:lvl1pPr marL="342900" indent="-342900" algn="l" defTabSz="914400" rtl="0" eaLnBrk="1" latinLnBrk="0" hangingPunct="1">
+              <a:spcBef>
+                <a:spcPct val="20000"/>
+              </a:spcBef>
+              <a:buFont typeface="Arial" pitchFamily="34" charset="0"/>
+              <a:buChar char="•"/>
+              <a:defRPr sz="2400" kern="1200">
+                <a:solidFill>
+                  <a:schemeClr val="tx1">
+                    <a:lumMod val="50000"/>
+                    <a:lumOff val="50000"/>
+                  </a:schemeClr>
+                </a:solidFill>
+                <a:latin typeface="+mj-lt"/>
+                <a:ea typeface="+mn-ea"/>
+                <a:cs typeface="+mn-cs"/>
+              </a:defRPr>
+            </a:lvl1pPr>
+            <a:lvl2pPr marL="742950" indent="-285750" algn="l" defTabSz="914400" rtl="0" eaLnBrk="1" latinLnBrk="0" hangingPunct="1">
+              <a:spcBef>
+                <a:spcPct val="20000"/>
+              </a:spcBef>
+              <a:buFont typeface="Courier New" pitchFamily="49" charset="0"/>
+              <a:buChar char="o"/>
+              <a:defRPr sz="1600" kern="1200">
+                <a:solidFill>
+                  <a:schemeClr val="tx1">
+                    <a:lumMod val="50000"/>
+                    <a:lumOff val="50000"/>
+                  </a:schemeClr>
+                </a:solidFill>
+                <a:latin typeface="+mj-lt"/>
+                <a:ea typeface="+mn-ea"/>
+                <a:cs typeface="+mn-cs"/>
+              </a:defRPr>
+            </a:lvl2pPr>
+            <a:lvl3pPr marL="1143000" indent="-228600" algn="l" defTabSz="914400" rtl="0" eaLnBrk="1" latinLnBrk="0" hangingPunct="1">
+              <a:spcBef>
+                <a:spcPct val="20000"/>
+              </a:spcBef>
+              <a:buFont typeface="Arial" pitchFamily="34" charset="0"/>
+              <a:buChar char="•"/>
+              <a:defRPr sz="1600" kern="1200">
+                <a:solidFill>
+                  <a:schemeClr val="tx1">
+                    <a:lumMod val="50000"/>
+                    <a:lumOff val="50000"/>
+                  </a:schemeClr>
+                </a:solidFill>
+                <a:latin typeface="+mj-lt"/>
+                <a:ea typeface="+mn-ea"/>
+                <a:cs typeface="+mn-cs"/>
+              </a:defRPr>
+            </a:lvl3pPr>
+            <a:lvl4pPr marL="1600200" indent="-228600" algn="l" defTabSz="914400" rtl="0" eaLnBrk="1" latinLnBrk="0" hangingPunct="1">
+              <a:spcBef>
+                <a:spcPct val="20000"/>
+              </a:spcBef>
+              <a:buFont typeface="Courier New" pitchFamily="49" charset="0"/>
+              <a:buChar char="o"/>
+              <a:defRPr sz="1600" kern="1200">
+                <a:solidFill>
+                  <a:schemeClr val="tx1">
+                    <a:lumMod val="50000"/>
+                    <a:lumOff val="50000"/>
+                  </a:schemeClr>
+                </a:solidFill>
+                <a:latin typeface="+mj-lt"/>
+                <a:ea typeface="+mn-ea"/>
+                <a:cs typeface="+mn-cs"/>
+              </a:defRPr>
+            </a:lvl4pPr>
+            <a:lvl5pPr marL="2057400" indent="-228600" algn="l" defTabSz="914400" rtl="0" eaLnBrk="1" latinLnBrk="0" hangingPunct="1">
+              <a:spcBef>
+                <a:spcPct val="20000"/>
+              </a:spcBef>
+              <a:buFont typeface="Arial" pitchFamily="34" charset="0"/>
+              <a:buChar char="•"/>
+              <a:defRPr sz="1600" kern="1200">
+                <a:solidFill>
+                  <a:schemeClr val="tx1">
+                    <a:lumMod val="50000"/>
+                    <a:lumOff val="50000"/>
+                  </a:schemeClr>
+                </a:solidFill>
+                <a:latin typeface="+mj-lt"/>
+                <a:ea typeface="+mn-ea"/>
+                <a:cs typeface="+mn-cs"/>
+              </a:defRPr>
+            </a:lvl5pPr>
+            <a:lvl6pPr marL="2514600" indent="-228600" algn="l" defTabSz="914400" rtl="0" eaLnBrk="1" latinLnBrk="0" hangingPunct="1">
+              <a:spcBef>
+                <a:spcPct val="20000"/>
+              </a:spcBef>
+              <a:buFont typeface="Courier New" pitchFamily="49" charset="0"/>
+              <a:buChar char="o"/>
+              <a:defRPr sz="1600" kern="1200">
+                <a:solidFill>
+                  <a:schemeClr val="tx1">
+                    <a:lumMod val="50000"/>
+                    <a:lumOff val="50000"/>
+                  </a:schemeClr>
+                </a:solidFill>
+                <a:latin typeface="+mj-lt"/>
+                <a:ea typeface="+mn-ea"/>
+                <a:cs typeface="+mn-cs"/>
+              </a:defRPr>
+            </a:lvl6pPr>
+            <a:lvl7pPr marL="2971800" indent="-228600" algn="l" defTabSz="914400" rtl="0" eaLnBrk="1" latinLnBrk="0" hangingPunct="1">
+              <a:spcBef>
+                <a:spcPct val="20000"/>
+              </a:spcBef>
+              <a:buFont typeface="Arial" pitchFamily="34" charset="0"/>
+              <a:buChar char="•"/>
+              <a:defRPr sz="1600" kern="1200">
+                <a:solidFill>
+                  <a:schemeClr val="tx1">
+                    <a:lumMod val="50000"/>
+                    <a:lumOff val="50000"/>
+                  </a:schemeClr>
+                </a:solidFill>
+                <a:latin typeface="+mj-lt"/>
+                <a:ea typeface="+mn-ea"/>
+                <a:cs typeface="+mn-cs"/>
+              </a:defRPr>
+            </a:lvl7pPr>
+            <a:lvl8pPr marL="3429000" indent="-228600" algn="l" defTabSz="914400" rtl="0" eaLnBrk="1" latinLnBrk="0" hangingPunct="1">
+              <a:spcBef>
+                <a:spcPct val="20000"/>
+              </a:spcBef>
+              <a:buFont typeface="Courier New" pitchFamily="49" charset="0"/>
+              <a:buChar char="o"/>
+              <a:defRPr sz="1600" kern="1200">
+                <a:solidFill>
+                  <a:schemeClr val="tx1">
+                    <a:lumMod val="50000"/>
+                    <a:lumOff val="50000"/>
+                  </a:schemeClr>
+                </a:solidFill>
+                <a:latin typeface="+mj-lt"/>
+                <a:ea typeface="+mn-ea"/>
+                <a:cs typeface="+mn-cs"/>
+              </a:defRPr>
+            </a:lvl8pPr>
+            <a:lvl9pPr marL="3886200" indent="-228600" algn="l" defTabSz="914400" rtl="0" eaLnBrk="1" latinLnBrk="0" hangingPunct="1">
+              <a:spcBef>
+                <a:spcPct val="20000"/>
+              </a:spcBef>
+              <a:buFont typeface="Arial" pitchFamily="34" charset="0"/>
+              <a:buChar char="•"/>
+              <a:defRPr sz="1600" kern="1200">
+                <a:solidFill>
+                  <a:schemeClr val="tx1">
+                    <a:lumMod val="50000"/>
+                    <a:lumOff val="50000"/>
+                  </a:schemeClr>
+                </a:solidFill>
+                <a:latin typeface="+mj-lt"/>
+                <a:ea typeface="+mn-ea"/>
+                <a:cs typeface="+mn-cs"/>
+              </a:defRPr>
+            </a:lvl9pPr>
+          </a:lstStyle>
+          <a:p>
+            <a:pPr marL="0" indent="0" algn="ctr">
+              <a:buNone/>
+            </a:pPr>
+            <a:r>
+              <a:rPr lang="en-US" sz="3200" b="1" dirty="0" smtClean="0"/>
+              <a:t>[</a:t>
+            </a:r>
+            <a:r>
+              <a:rPr lang="en-US" sz="3200" b="1" dirty="0" err="1" smtClean="0"/>
+              <a:t>Autogear.pml</a:t>
+            </a:r>
+            <a:r>
+              <a:rPr lang="en-US" sz="3200" b="1" dirty="0" smtClean="0"/>
+              <a:t>]</a:t>
+            </a:r>
+            <a:endParaRPr lang="en-US" sz="2000" b="1" dirty="0" smtClean="0"/>
           </a:p>
         </p:txBody>
       </p:sp>
@@ -12793,29 +13531,35 @@
           </a:p>
         </p:txBody>
       </p:sp>
-      <p:sp>
-        <p:nvSpPr>
-          <p:cNvPr id="3" name="Объект 2"/>
-          <p:cNvSpPr>
-            <a:spLocks noGrp="1"/>
-          </p:cNvSpPr>
+      <p:pic>
+        <p:nvPicPr>
+          <p:cNvPr id="9" name="Объект 8"/>
+          <p:cNvPicPr>
+            <a:picLocks noGrp="1" noChangeAspect="1"/>
+          </p:cNvPicPr>
           <p:nvPr>
             <p:ph idx="1"/>
           </p:nvPr>
-        </p:nvSpPr>
-        <p:spPr/>
-        <p:txBody>
-          <a:bodyPr/>
-          <a:lstStyle/>
-          <a:p>
-            <a:r>
-              <a:rPr lang="ru-RU" dirty="0" smtClean="0"/>
-              <a:t>программа</a:t>
-            </a:r>
-            <a:endParaRPr lang="ru-RU" dirty="0"/>
-          </a:p>
-        </p:txBody>
-      </p:sp>
+        </p:nvPicPr>
+        <p:blipFill>
+          <a:blip r:embed="rId3">
+            <a:extLst>
+              <a:ext uri="{28A0092B-C50C-407E-A947-70E740481C1C}">
+                <a14:useLocalDpi xmlns:a14="http://schemas.microsoft.com/office/drawing/2010/main" val="0"/>
+              </a:ext>
+            </a:extLst>
+          </a:blip>
+          <a:stretch>
+            <a:fillRect/>
+          </a:stretch>
+        </p:blipFill>
+        <p:spPr>
+          <a:xfrm>
+            <a:off x="2674352" y="1268760"/>
+            <a:ext cx="3798421" cy="5184576"/>
+          </a:xfrm>
+        </p:spPr>
+      </p:pic>
       <p:sp>
         <p:nvSpPr>
           <p:cNvPr id="8" name="Объект 9"/>
@@ -13008,6 +13752,209 @@
               <a:t>Имитация автоматической коробки передач</a:t>
             </a:r>
             <a:endParaRPr lang="en-US" b="1" dirty="0" smtClean="0"/>
+          </a:p>
+        </p:txBody>
+      </p:sp>
+      <p:sp>
+        <p:nvSpPr>
+          <p:cNvPr id="10" name="Объект 9"/>
+          <p:cNvSpPr txBox="1">
+            <a:spLocks/>
+          </p:cNvSpPr>
+          <p:nvPr/>
+        </p:nvSpPr>
+        <p:spPr>
+          <a:xfrm>
+            <a:off x="107504" y="2420888"/>
+            <a:ext cx="2448272" cy="504056"/>
+          </a:xfrm>
+          <a:prstGeom prst="rect">
+            <a:avLst/>
+          </a:prstGeom>
+        </p:spPr>
+        <p:txBody>
+          <a:bodyPr/>
+          <a:lstStyle>
+            <a:lvl1pPr marL="342900" indent="-342900" algn="l" defTabSz="914400" rtl="0" eaLnBrk="1" latinLnBrk="0" hangingPunct="1">
+              <a:spcBef>
+                <a:spcPct val="20000"/>
+              </a:spcBef>
+              <a:buFont typeface="Arial" pitchFamily="34" charset="0"/>
+              <a:buChar char="•"/>
+              <a:defRPr sz="2400" kern="1200">
+                <a:solidFill>
+                  <a:schemeClr val="tx1">
+                    <a:lumMod val="50000"/>
+                    <a:lumOff val="50000"/>
+                  </a:schemeClr>
+                </a:solidFill>
+                <a:latin typeface="+mj-lt"/>
+                <a:ea typeface="+mn-ea"/>
+                <a:cs typeface="+mn-cs"/>
+              </a:defRPr>
+            </a:lvl1pPr>
+            <a:lvl2pPr marL="742950" indent="-285750" algn="l" defTabSz="914400" rtl="0" eaLnBrk="1" latinLnBrk="0" hangingPunct="1">
+              <a:spcBef>
+                <a:spcPct val="20000"/>
+              </a:spcBef>
+              <a:buFont typeface="Courier New" pitchFamily="49" charset="0"/>
+              <a:buChar char="o"/>
+              <a:defRPr sz="1600" kern="1200">
+                <a:solidFill>
+                  <a:schemeClr val="tx1">
+                    <a:lumMod val="50000"/>
+                    <a:lumOff val="50000"/>
+                  </a:schemeClr>
+                </a:solidFill>
+                <a:latin typeface="+mj-lt"/>
+                <a:ea typeface="+mn-ea"/>
+                <a:cs typeface="+mn-cs"/>
+              </a:defRPr>
+            </a:lvl2pPr>
+            <a:lvl3pPr marL="1143000" indent="-228600" algn="l" defTabSz="914400" rtl="0" eaLnBrk="1" latinLnBrk="0" hangingPunct="1">
+              <a:spcBef>
+                <a:spcPct val="20000"/>
+              </a:spcBef>
+              <a:buFont typeface="Arial" pitchFamily="34" charset="0"/>
+              <a:buChar char="•"/>
+              <a:defRPr sz="1600" kern="1200">
+                <a:solidFill>
+                  <a:schemeClr val="tx1">
+                    <a:lumMod val="50000"/>
+                    <a:lumOff val="50000"/>
+                  </a:schemeClr>
+                </a:solidFill>
+                <a:latin typeface="+mj-lt"/>
+                <a:ea typeface="+mn-ea"/>
+                <a:cs typeface="+mn-cs"/>
+              </a:defRPr>
+            </a:lvl3pPr>
+            <a:lvl4pPr marL="1600200" indent="-228600" algn="l" defTabSz="914400" rtl="0" eaLnBrk="1" latinLnBrk="0" hangingPunct="1">
+              <a:spcBef>
+                <a:spcPct val="20000"/>
+              </a:spcBef>
+              <a:buFont typeface="Courier New" pitchFamily="49" charset="0"/>
+              <a:buChar char="o"/>
+              <a:defRPr sz="1600" kern="1200">
+                <a:solidFill>
+                  <a:schemeClr val="tx1">
+                    <a:lumMod val="50000"/>
+                    <a:lumOff val="50000"/>
+                  </a:schemeClr>
+                </a:solidFill>
+                <a:latin typeface="+mj-lt"/>
+                <a:ea typeface="+mn-ea"/>
+                <a:cs typeface="+mn-cs"/>
+              </a:defRPr>
+            </a:lvl4pPr>
+            <a:lvl5pPr marL="2057400" indent="-228600" algn="l" defTabSz="914400" rtl="0" eaLnBrk="1" latinLnBrk="0" hangingPunct="1">
+              <a:spcBef>
+                <a:spcPct val="20000"/>
+              </a:spcBef>
+              <a:buFont typeface="Arial" pitchFamily="34" charset="0"/>
+              <a:buChar char="•"/>
+              <a:defRPr sz="1600" kern="1200">
+                <a:solidFill>
+                  <a:schemeClr val="tx1">
+                    <a:lumMod val="50000"/>
+                    <a:lumOff val="50000"/>
+                  </a:schemeClr>
+                </a:solidFill>
+                <a:latin typeface="+mj-lt"/>
+                <a:ea typeface="+mn-ea"/>
+                <a:cs typeface="+mn-cs"/>
+              </a:defRPr>
+            </a:lvl5pPr>
+            <a:lvl6pPr marL="2514600" indent="-228600" algn="l" defTabSz="914400" rtl="0" eaLnBrk="1" latinLnBrk="0" hangingPunct="1">
+              <a:spcBef>
+                <a:spcPct val="20000"/>
+              </a:spcBef>
+              <a:buFont typeface="Courier New" pitchFamily="49" charset="0"/>
+              <a:buChar char="o"/>
+              <a:defRPr sz="1600" kern="1200">
+                <a:solidFill>
+                  <a:schemeClr val="tx1">
+                    <a:lumMod val="50000"/>
+                    <a:lumOff val="50000"/>
+                  </a:schemeClr>
+                </a:solidFill>
+                <a:latin typeface="+mj-lt"/>
+                <a:ea typeface="+mn-ea"/>
+                <a:cs typeface="+mn-cs"/>
+              </a:defRPr>
+            </a:lvl6pPr>
+            <a:lvl7pPr marL="2971800" indent="-228600" algn="l" defTabSz="914400" rtl="0" eaLnBrk="1" latinLnBrk="0" hangingPunct="1">
+              <a:spcBef>
+                <a:spcPct val="20000"/>
+              </a:spcBef>
+              <a:buFont typeface="Arial" pitchFamily="34" charset="0"/>
+              <a:buChar char="•"/>
+              <a:defRPr sz="1600" kern="1200">
+                <a:solidFill>
+                  <a:schemeClr val="tx1">
+                    <a:lumMod val="50000"/>
+                    <a:lumOff val="50000"/>
+                  </a:schemeClr>
+                </a:solidFill>
+                <a:latin typeface="+mj-lt"/>
+                <a:ea typeface="+mn-ea"/>
+                <a:cs typeface="+mn-cs"/>
+              </a:defRPr>
+            </a:lvl7pPr>
+            <a:lvl8pPr marL="3429000" indent="-228600" algn="l" defTabSz="914400" rtl="0" eaLnBrk="1" latinLnBrk="0" hangingPunct="1">
+              <a:spcBef>
+                <a:spcPct val="20000"/>
+              </a:spcBef>
+              <a:buFont typeface="Courier New" pitchFamily="49" charset="0"/>
+              <a:buChar char="o"/>
+              <a:defRPr sz="1600" kern="1200">
+                <a:solidFill>
+                  <a:schemeClr val="tx1">
+                    <a:lumMod val="50000"/>
+                    <a:lumOff val="50000"/>
+                  </a:schemeClr>
+                </a:solidFill>
+                <a:latin typeface="+mj-lt"/>
+                <a:ea typeface="+mn-ea"/>
+                <a:cs typeface="+mn-cs"/>
+              </a:defRPr>
+            </a:lvl8pPr>
+            <a:lvl9pPr marL="3886200" indent="-228600" algn="l" defTabSz="914400" rtl="0" eaLnBrk="1" latinLnBrk="0" hangingPunct="1">
+              <a:spcBef>
+                <a:spcPct val="20000"/>
+              </a:spcBef>
+              <a:buFont typeface="Arial" pitchFamily="34" charset="0"/>
+              <a:buChar char="•"/>
+              <a:defRPr sz="1600" kern="1200">
+                <a:solidFill>
+                  <a:schemeClr val="tx1">
+                    <a:lumMod val="50000"/>
+                    <a:lumOff val="50000"/>
+                  </a:schemeClr>
+                </a:solidFill>
+                <a:latin typeface="+mj-lt"/>
+                <a:ea typeface="+mn-ea"/>
+                <a:cs typeface="+mn-cs"/>
+              </a:defRPr>
+            </a:lvl9pPr>
+          </a:lstStyle>
+          <a:p>
+            <a:pPr marL="0" indent="0" algn="ctr">
+              <a:buNone/>
+            </a:pPr>
+            <a:r>
+              <a:rPr lang="en-US" sz="3200" b="1" dirty="0" smtClean="0"/>
+              <a:t>[</a:t>
+            </a:r>
+            <a:r>
+              <a:rPr lang="en-US" sz="2000" b="1" dirty="0" err="1" smtClean="0"/>
+              <a:t>Autogear.proto</a:t>
+            </a:r>
+            <a:r>
+              <a:rPr lang="en-US" sz="3200" b="1" dirty="0" smtClean="0"/>
+              <a:t>]</a:t>
+            </a:r>
+            <a:endParaRPr lang="en-US" sz="2000" b="1" dirty="0" smtClean="0"/>
           </a:p>
         </p:txBody>
       </p:sp>
@@ -13413,7 +14360,7 @@
     </p:spTree>
     <p:extLst>
       <p:ext uri="{BB962C8B-B14F-4D97-AF65-F5344CB8AC3E}">
-        <p14:creationId xmlns:p14="http://schemas.microsoft.com/office/powerpoint/2010/main" val="3062141827"/>
+        <p14:creationId xmlns:p14="http://schemas.microsoft.com/office/powerpoint/2010/main" val="2683861495"/>
       </p:ext>
     </p:extLst>
   </p:cSld>

</xml_diff>

<commit_message>
Page numbers and so on
</commit_message>
<xml_diff>
--- a/shatilina.pptx
+++ b/shatilina.pptx
@@ -215,7 +215,7 @@
           <a:p>
             <a:fld id="{FDBFA82E-57DB-4151-B406-A26D33A7B30A}" type="datetimeFigureOut">
               <a:rPr lang="ru-RU" smtClean="0"/>
-              <a:t>23.05.2012</a:t>
+              <a:t>05.06.2012</a:t>
             </a:fld>
             <a:endParaRPr lang="ru-RU"/>
           </a:p>
@@ -1896,15 +1896,7 @@
           <a:p>
             <a:r>
               <a:rPr lang="ru-RU" baseline="0" dirty="0" smtClean="0"/>
-              <a:t>Ошибки </a:t>
-            </a:r>
-            <a:r>
-              <a:rPr lang="ru-RU" baseline="0" dirty="0" smtClean="0"/>
-              <a:t>могут появится на любом из </a:t>
-            </a:r>
-            <a:r>
-              <a:rPr lang="ru-RU" baseline="0" dirty="0" smtClean="0"/>
-              <a:t>этапов, но как правило большинство из них возникает </a:t>
+              <a:t>Ошибки могут появится на любом из этапов, но как правило большинство из них возникает </a:t>
             </a:r>
             <a:r>
               <a:rPr lang="ru-RU" baseline="0" dirty="0" err="1" smtClean="0"/>
@@ -3158,7 +3150,7 @@
           <a:p>
             <a:fld id="{552675F8-BD14-4374-B02F-E97046C6A1D8}" type="datetime1">
               <a:rPr lang="ru-RU" smtClean="0"/>
-              <a:t>23.05.2012</a:t>
+              <a:t>05.06.2012</a:t>
             </a:fld>
             <a:endParaRPr lang="ru-RU"/>
           </a:p>
@@ -3323,7 +3315,7 @@
           <a:p>
             <a:fld id="{13305062-1292-4A0A-901B-840835479DE3}" type="datetime1">
               <a:rPr lang="ru-RU" smtClean="0"/>
-              <a:t>23.05.2012</a:t>
+              <a:t>05.06.2012</a:t>
             </a:fld>
             <a:endParaRPr lang="ru-RU"/>
           </a:p>
@@ -3498,7 +3490,7 @@
           <a:p>
             <a:fld id="{A5E6030C-CC2F-4B88-9E22-1301D15C6E18}" type="datetime1">
               <a:rPr lang="ru-RU" smtClean="0"/>
-              <a:t>23.05.2012</a:t>
+              <a:t>05.06.2012</a:t>
             </a:fld>
             <a:endParaRPr lang="ru-RU"/>
           </a:p>
@@ -3681,7 +3673,7 @@
           <a:p>
             <a:fld id="{0A0FAE21-78CF-42F8-87C9-7DD460720D76}" type="datetime1">
               <a:rPr lang="ru-RU" smtClean="0"/>
-              <a:t>23.05.2012</a:t>
+              <a:t>05.06.2012</a:t>
             </a:fld>
             <a:endParaRPr lang="ru-RU"/>
           </a:p>
@@ -3943,7 +3935,7 @@
           <a:p>
             <a:fld id="{18F12A8A-6C04-42EC-B5A1-B4AFF8CBAF88}" type="datetime1">
               <a:rPr lang="ru-RU" smtClean="0"/>
-              <a:t>23.05.2012</a:t>
+              <a:t>05.06.2012</a:t>
             </a:fld>
             <a:endParaRPr lang="ru-RU"/>
           </a:p>
@@ -4291,7 +4283,7 @@
           <a:p>
             <a:fld id="{19CFC13F-C6B8-4F7A-A899-3C34CBE9DBBB}" type="datetime1">
               <a:rPr lang="ru-RU" smtClean="0"/>
-              <a:t>23.05.2012</a:t>
+              <a:t>05.06.2012</a:t>
             </a:fld>
             <a:endParaRPr lang="ru-RU"/>
           </a:p>
@@ -4599,7 +4591,7 @@
           <a:p>
             <a:fld id="{369881D4-64C9-4E16-B703-8323AC55B24A}" type="datetime1">
               <a:rPr lang="ru-RU" smtClean="0"/>
-              <a:t>23.05.2012</a:t>
+              <a:t>05.06.2012</a:t>
             </a:fld>
             <a:endParaRPr lang="ru-RU"/>
           </a:p>
@@ -4826,7 +4818,7 @@
           <a:p>
             <a:fld id="{B390CDAC-3E70-4C31-AE15-3B712A8B5CDB}" type="datetime1">
               <a:rPr lang="ru-RU" smtClean="0"/>
-              <a:t>23.05.2012</a:t>
+              <a:t>05.06.2012</a:t>
             </a:fld>
             <a:endParaRPr lang="ru-RU"/>
           </a:p>
@@ -4916,7 +4908,7 @@
           <a:p>
             <a:fld id="{ACB1905C-D82E-41CE-9D44-986AF8D5825C}" type="datetime1">
               <a:rPr lang="ru-RU" smtClean="0"/>
-              <a:t>23.05.2012</a:t>
+              <a:t>05.06.2012</a:t>
             </a:fld>
             <a:endParaRPr lang="ru-RU"/>
           </a:p>
@@ -5204,7 +5196,7 @@
           <a:p>
             <a:fld id="{B95BD760-218D-4ADE-BF67-3949E0E07828}" type="datetime1">
               <a:rPr lang="ru-RU" smtClean="0"/>
-              <a:t>23.05.2012</a:t>
+              <a:t>05.06.2012</a:t>
             </a:fld>
             <a:endParaRPr lang="ru-RU"/>
           </a:p>
@@ -5473,7 +5465,7 @@
           <a:p>
             <a:fld id="{F10398F0-CE1C-454F-A887-B107A33F827E}" type="datetime1">
               <a:rPr lang="ru-RU" smtClean="0"/>
-              <a:t>23.05.2012</a:t>
+              <a:t>05.06.2012</a:t>
             </a:fld>
             <a:endParaRPr lang="ru-RU"/>
           </a:p>
@@ -5683,7 +5675,7 @@
           <a:p>
             <a:fld id="{5C0B48E2-D838-453B-B855-F590F6E7746E}" type="datetime1">
               <a:rPr lang="ru-RU" smtClean="0"/>
-              <a:t>23.05.2012</a:t>
+              <a:t>05.06.2012</a:t>
             </a:fld>
             <a:endParaRPr lang="ru-RU"/>
           </a:p>

</xml_diff>

<commit_message>
Finish editing note for today
</commit_message>
<xml_diff>
--- a/shatilina.pptx
+++ b/shatilina.pptx
@@ -11275,129 +11275,222 @@
           <a:chExt cx="0" cy="0"/>
         </a:xfrm>
       </p:grpSpPr>
-      <p:sp>
-        <p:nvSpPr>
-          <p:cNvPr id="3" name="Объект 2"/>
-          <p:cNvSpPr>
-            <a:spLocks noGrp="1"/>
-          </p:cNvSpPr>
-          <p:nvPr>
-            <p:ph idx="1"/>
-          </p:nvPr>
-        </p:nvSpPr>
-        <p:spPr>
-          <a:xfrm>
-            <a:off x="107503" y="1567333"/>
-            <a:ext cx="3744417" cy="5030019"/>
-          </a:xfrm>
-        </p:spPr>
-        <p:txBody>
-          <a:bodyPr>
-            <a:normAutofit fontScale="92500" lnSpcReduction="10000"/>
-          </a:bodyPr>
-          <a:lstStyle/>
-          <a:p>
-            <a:pPr marL="0" indent="0">
-              <a:buNone/>
-            </a:pPr>
-            <a:r>
-              <a:rPr lang="en-US" sz="3000" b="1" i="1" dirty="0"/>
-              <a:t>M</a:t>
-            </a:r>
-            <a:r>
-              <a:rPr lang="ru-RU" sz="3000" b="1" i="1" dirty="0"/>
-              <a:t> = (</a:t>
-            </a:r>
-            <a:r>
-              <a:rPr lang="en-US" sz="3000" b="1" i="1" dirty="0"/>
-              <a:t>P</a:t>
-            </a:r>
-            <a:r>
-              <a:rPr lang="ru-RU" sz="3000" b="1" i="1" dirty="0"/>
-              <a:t>, </a:t>
-            </a:r>
-            <a:r>
-              <a:rPr lang="en-US" sz="3000" b="1" i="1" dirty="0"/>
-              <a:t>S</a:t>
-            </a:r>
-            <a:r>
-              <a:rPr lang="ru-RU" sz="3000" b="1" i="1" dirty="0"/>
-              <a:t>, </a:t>
-            </a:r>
-            <a:r>
-              <a:rPr lang="en-US" sz="3000" b="1" i="1" dirty="0"/>
-              <a:t>R</a:t>
-            </a:r>
-            <a:r>
-              <a:rPr lang="ru-RU" sz="3000" b="1" i="1" dirty="0"/>
-              <a:t>, </a:t>
-            </a:r>
-            <a:r>
-              <a:rPr lang="en-US" sz="3000" b="1" i="1" dirty="0"/>
-              <a:t>U</a:t>
-            </a:r>
-            <a:r>
-              <a:rPr lang="ru-RU" sz="3000" b="1" i="1" dirty="0"/>
-              <a:t>)</a:t>
-            </a:r>
-            <a:r>
-              <a:rPr lang="ru-RU" sz="3000" dirty="0"/>
-              <a:t>, </a:t>
-            </a:r>
-            <a:endParaRPr lang="en-US" sz="3000" dirty="0" smtClean="0"/>
-          </a:p>
-          <a:p>
-            <a:pPr marL="0" indent="0">
-              <a:buNone/>
-            </a:pPr>
-            <a:r>
-              <a:rPr lang="ru-RU" dirty="0" smtClean="0"/>
-              <a:t>где</a:t>
-            </a:r>
-            <a:endParaRPr lang="ru-RU" dirty="0"/>
-          </a:p>
-          <a:p>
-            <a:r>
-              <a:rPr lang="en-US" b="1" dirty="0"/>
-              <a:t>P</a:t>
-            </a:r>
-            <a:r>
-              <a:rPr lang="ru-RU" dirty="0"/>
-              <a:t> – прототип архитектуры,</a:t>
-            </a:r>
-          </a:p>
-          <a:p>
-            <a:r>
-              <a:rPr lang="en-US" b="1" dirty="0"/>
-              <a:t>S</a:t>
-            </a:r>
-            <a:r>
-              <a:rPr lang="ru-RU" dirty="0"/>
-              <a:t> – множество состояний прототипа,</a:t>
-            </a:r>
-          </a:p>
-          <a:p>
-            <a:r>
-              <a:rPr lang="en-US" b="1" dirty="0"/>
-              <a:t>R</a:t>
-            </a:r>
-            <a:r>
-              <a:rPr lang="ru-RU" dirty="0"/>
-              <a:t> – набор спецификаций требований прототипа,</a:t>
-            </a:r>
-          </a:p>
-          <a:p>
-            <a:r>
-              <a:rPr lang="en-US" b="1" dirty="0"/>
-              <a:t>U</a:t>
-            </a:r>
-            <a:r>
-              <a:rPr lang="ru-RU" dirty="0"/>
-              <a:t> – множество сценариев использования прототипа</a:t>
-            </a:r>
-          </a:p>
-        </p:txBody>
-      </p:sp>
+      <mc:AlternateContent xmlns:mc="http://schemas.openxmlformats.org/markup-compatibility/2006">
+        <mc:Choice xmlns:a14="http://schemas.microsoft.com/office/drawing/2010/main" Requires="a14">
+          <p:sp>
+            <p:nvSpPr>
+              <p:cNvPr id="3" name="Объект 2"/>
+              <p:cNvSpPr>
+                <a:spLocks noGrp="1"/>
+              </p:cNvSpPr>
+              <p:nvPr>
+                <p:ph idx="1"/>
+              </p:nvPr>
+            </p:nvSpPr>
+            <p:spPr>
+              <a:xfrm>
+                <a:off x="107503" y="1567333"/>
+                <a:ext cx="3744417" cy="5030019"/>
+              </a:xfrm>
+            </p:spPr>
+            <p:txBody>
+              <a:bodyPr>
+                <a:normAutofit fontScale="70000" lnSpcReduction="20000"/>
+              </a:bodyPr>
+              <a:lstStyle/>
+              <a:p>
+                <a:r>
+                  <a:rPr lang="en-US" sz="3200" i="1" dirty="0"/>
+                  <a:t>M</a:t>
+                </a:r>
+                <a:r>
+                  <a:rPr lang="ru-RU" sz="3200" i="1" dirty="0"/>
+                  <a:t> = (</a:t>
+                </a:r>
+                <a:r>
+                  <a:rPr lang="en-US" sz="3200" i="1" dirty="0"/>
+                  <a:t>S</a:t>
+                </a:r>
+                <a:r>
+                  <a:rPr lang="ru-RU" sz="3200" i="1" dirty="0"/>
+                  <a:t>, </a:t>
+                </a:r>
+                <a:r>
+                  <a:rPr lang="en-US" sz="3200" i="1" dirty="0"/>
+                  <a:t>s</a:t>
+                </a:r>
+                <a:r>
+                  <a:rPr lang="ru-RU" sz="3200" i="1" baseline="-25000" dirty="0"/>
+                  <a:t>0</a:t>
+                </a:r>
+                <a:r>
+                  <a:rPr lang="ru-RU" sz="3200" i="1" dirty="0"/>
+                  <a:t>, </a:t>
+                </a:r>
+                <a:r>
+                  <a:rPr lang="en-US" sz="3200" i="1" dirty="0"/>
+                  <a:t>F, R</a:t>
+                </a:r>
+                <a:r>
+                  <a:rPr lang="ru-RU" sz="3200" i="1" dirty="0"/>
+                  <a:t>, </a:t>
+                </a:r>
+                <a:r>
+                  <a:rPr lang="en-US" sz="3200" i="1" dirty="0"/>
+                  <a:t>U</a:t>
+                </a:r>
+                <a:r>
+                  <a:rPr lang="ru-RU" sz="3200" i="1" dirty="0"/>
+                  <a:t>)</a:t>
+                </a:r>
+                <a:r>
+                  <a:rPr lang="ru-RU" sz="3200" dirty="0"/>
+                  <a:t>, где</a:t>
+                </a:r>
+              </a:p>
+              <a:p>
+                <a:r>
+                  <a:rPr lang="en-US" sz="3200" dirty="0"/>
+                  <a:t>S</a:t>
+                </a:r>
+                <a:r>
+                  <a:rPr lang="ru-RU" sz="3200" dirty="0"/>
+                  <a:t> – конечное множество состояний прототипа,</a:t>
+                </a:r>
+              </a:p>
+              <a:p>
+                <a:r>
+                  <a:rPr lang="en-US" sz="3200" dirty="0"/>
+                  <a:t>s</a:t>
+                </a:r>
+                <a:r>
+                  <a:rPr lang="ru-RU" sz="3200" baseline="-25000" dirty="0"/>
+                  <a:t>0</a:t>
+                </a:r>
+                <a:r>
+                  <a:rPr lang="ru-RU" sz="3200" dirty="0"/>
+                  <a:t> – начальное состояние, </a:t>
+                </a:r>
+                <a:r>
+                  <a:rPr lang="en-US" sz="3200" dirty="0"/>
+                  <a:t>s</a:t>
+                </a:r>
+                <a:r>
+                  <a:rPr lang="ru-RU" sz="3200" baseline="-25000" dirty="0"/>
+                  <a:t>0</a:t>
+                </a:r>
+                <a:r>
+                  <a:rPr lang="ru-RU" sz="3200" dirty="0"/>
+                  <a:t> </a:t>
+                </a:r>
+                <a14:m>
+                  <m:oMath xmlns:m="http://schemas.openxmlformats.org/officeDocument/2006/math">
+                    <m:r>
+                      <a:rPr lang="ru-RU" sz="3200" i="1"/>
+                      <m:t>∈</m:t>
+                    </m:r>
+                  </m:oMath>
+                </a14:m>
+                <a:r>
+                  <a:rPr lang="ru-RU" sz="3200" dirty="0"/>
+                  <a:t> </a:t>
+                </a:r>
+                <a:r>
+                  <a:rPr lang="en-US" sz="3200" dirty="0"/>
+                  <a:t>S</a:t>
+                </a:r>
+                <a:r>
+                  <a:rPr lang="ru-RU" sz="3200" dirty="0"/>
+                  <a:t>,</a:t>
+                </a:r>
+              </a:p>
+              <a:p>
+                <a:r>
+                  <a:rPr lang="en-US" sz="3200" dirty="0"/>
+                  <a:t>F </a:t>
+                </a:r>
+                <a:r>
+                  <a:rPr lang="ru-RU" sz="3200" dirty="0"/>
+                  <a:t>– множество конечных состоянии, </a:t>
+                </a:r>
+                <a:r>
+                  <a:rPr lang="en-US" sz="3200" dirty="0"/>
+                  <a:t>F </a:t>
+                </a:r>
+                <a:r>
+                  <a:rPr lang="ru-RU" sz="3200" dirty="0"/>
+                  <a:t>⊆ </a:t>
+                </a:r>
+                <a:r>
+                  <a:rPr lang="en-US" sz="3200" dirty="0"/>
+                  <a:t>S</a:t>
+                </a:r>
+                <a:r>
+                  <a:rPr lang="ru-RU" sz="3200" dirty="0"/>
+                  <a:t>,</a:t>
+                </a:r>
+              </a:p>
+              <a:p>
+                <a:r>
+                  <a:rPr lang="en-US" sz="3200" dirty="0"/>
+                  <a:t>R</a:t>
+                </a:r>
+                <a:r>
+                  <a:rPr lang="ru-RU" sz="3200" dirty="0"/>
+                  <a:t> – набор спецификаций требований прототипа,</a:t>
+                </a:r>
+              </a:p>
+              <a:p>
+                <a:r>
+                  <a:rPr lang="en-US" sz="3200" dirty="0"/>
+                  <a:t>U</a:t>
+                </a:r>
+                <a:r>
+                  <a:rPr lang="ru-RU" sz="3200" dirty="0"/>
+                  <a:t> – множество сценариев использования прототипа.</a:t>
+                </a:r>
+              </a:p>
+            </p:txBody>
+          </p:sp>
+        </mc:Choice>
+        <mc:Fallback>
+          <p:sp>
+            <p:nvSpPr>
+              <p:cNvPr id="3" name="Объект 2"/>
+              <p:cNvSpPr>
+                <a:spLocks noGrp="1" noRot="1" noChangeAspect="1" noMove="1" noResize="1" noEditPoints="1" noAdjustHandles="1" noChangeArrowheads="1" noChangeShapeType="1" noTextEdit="1"/>
+              </p:cNvSpPr>
+              <p:nvPr>
+                <p:ph idx="1"/>
+              </p:nvPr>
+            </p:nvSpPr>
+            <p:spPr>
+              <a:xfrm>
+                <a:off x="107503" y="1567333"/>
+                <a:ext cx="3744417" cy="5030019"/>
+              </a:xfrm>
+              <a:blipFill rotWithShape="1">
+                <a:blip r:embed="rId3"/>
+                <a:stretch>
+                  <a:fillRect l="-1954" t="-2061" r="-1954" b="-1576"/>
+                </a:stretch>
+              </a:blipFill>
+            </p:spPr>
+            <p:txBody>
+              <a:bodyPr/>
+              <a:lstStyle/>
+              <a:p>
+                <a:r>
+                  <a:rPr lang="ru-RU">
+                    <a:noFill/>
+                  </a:rPr>
+                  <a:t> </a:t>
+                </a:r>
+              </a:p>
+            </p:txBody>
+          </p:sp>
+        </mc:Fallback>
+      </mc:AlternateContent>
       <p:sp>
         <p:nvSpPr>
           <p:cNvPr id="4" name="Text Box 5"/>
@@ -11549,7 +11642,7 @@
           <p:nvPr/>
         </p:nvPicPr>
         <p:blipFill>
-          <a:blip r:embed="rId3">
+          <a:blip r:embed="rId4">
             <a:extLst>
               <a:ext uri="{28A0092B-C50C-407E-A947-70E740481C1C}">
                 <a14:useLocalDpi xmlns:a14="http://schemas.microsoft.com/office/drawing/2010/main" val="0"/>

</xml_diff>

<commit_message>
Write speech (partly)..Its too late to run away
</commit_message>
<xml_diff>
--- a/shatilina.pptx
+++ b/shatilina.pptx
@@ -5,7 +5,7 @@
     <p:sldMasterId id="2147483960" r:id="rId1"/>
   </p:sldMasterIdLst>
   <p:notesMasterIdLst>
-    <p:notesMasterId r:id="rId24"/>
+    <p:notesMasterId r:id="rId21"/>
   </p:notesMasterIdLst>
   <p:sldIdLst>
     <p:sldId id="257" r:id="rId2"/>
@@ -14,8 +14,8 @@
     <p:sldId id="266" r:id="rId5"/>
     <p:sldId id="261" r:id="rId6"/>
     <p:sldId id="269" r:id="rId7"/>
-    <p:sldId id="286" r:id="rId8"/>
-    <p:sldId id="287" r:id="rId9"/>
+    <p:sldId id="288" r:id="rId8"/>
+    <p:sldId id="290" r:id="rId9"/>
     <p:sldId id="262" r:id="rId10"/>
     <p:sldId id="280" r:id="rId11"/>
     <p:sldId id="281" r:id="rId12"/>
@@ -27,9 +27,6 @@
     <p:sldId id="258" r:id="rId18"/>
     <p:sldId id="259" r:id="rId19"/>
     <p:sldId id="275" r:id="rId20"/>
-    <p:sldId id="270" r:id="rId21"/>
-    <p:sldId id="272" r:id="rId22"/>
-    <p:sldId id="271" r:id="rId23"/>
   </p:sldIdLst>
   <p:sldSz cx="9144000" cy="6858000" type="screen4x3"/>
   <p:notesSz cx="6797675" cy="9926638"/>
@@ -622,8 +619,66 @@
           <a:lstStyle/>
           <a:p>
             <a:r>
-              <a:rPr lang="ru-RU" baseline="0" dirty="0" smtClean="0"/>
-              <a:t>подсистема отвечающая за начальный этап работы всей системы.</a:t>
+              <a:rPr lang="ru-RU" sz="1200" kern="1200" dirty="0" smtClean="0">
+                <a:solidFill>
+                  <a:schemeClr val="tx1"/>
+                </a:solidFill>
+                <a:effectLst/>
+                <a:latin typeface="+mn-lt"/>
+                <a:ea typeface="+mn-ea"/>
+                <a:cs typeface="+mn-cs"/>
+              </a:rPr>
+              <a:t>Основополагающей компонентой разработанной системы является – подсистема</a:t>
+            </a:r>
+            <a:r>
+              <a:rPr lang="ru-RU" sz="1200" kern="1200" baseline="0" dirty="0" smtClean="0">
+                <a:solidFill>
+                  <a:schemeClr val="tx1"/>
+                </a:solidFill>
+                <a:effectLst/>
+                <a:latin typeface="+mn-lt"/>
+                <a:ea typeface="+mn-ea"/>
+                <a:cs typeface="+mn-cs"/>
+              </a:rPr>
+              <a:t> лексического и синтаксического анализа</a:t>
+            </a:r>
+            <a:r>
+              <a:rPr lang="ru-RU" sz="1200" kern="1200" dirty="0" smtClean="0">
+                <a:solidFill>
+                  <a:schemeClr val="tx1"/>
+                </a:solidFill>
+                <a:effectLst/>
+                <a:latin typeface="+mn-lt"/>
+                <a:ea typeface="+mn-ea"/>
+                <a:cs typeface="+mn-cs"/>
+              </a:rPr>
+              <a:t>. </a:t>
+            </a:r>
+          </a:p>
+          <a:p>
+            <a:r>
+              <a:rPr lang="ru-RU" sz="1200" kern="1200" dirty="0" smtClean="0">
+                <a:solidFill>
+                  <a:schemeClr val="tx1"/>
+                </a:solidFill>
+                <a:effectLst/>
+                <a:latin typeface="+mn-lt"/>
+                <a:ea typeface="+mn-ea"/>
+                <a:cs typeface="+mn-cs"/>
+              </a:rPr>
+              <a:t>Данная</a:t>
+            </a:r>
+            <a:r>
+              <a:rPr lang="ru-RU" sz="1200" kern="1200" baseline="0" dirty="0" smtClean="0">
+                <a:solidFill>
+                  <a:schemeClr val="tx1"/>
+                </a:solidFill>
+                <a:effectLst/>
+                <a:latin typeface="+mn-lt"/>
+                <a:ea typeface="+mn-ea"/>
+                <a:cs typeface="+mn-cs"/>
+              </a:rPr>
+              <a:t> подсистема отвечает за разбор исходного файла прототипа архитектуры на языке описания моделей прототипов и построение абстрактного синтаксического дерева, соответствующего исходному прототипу архитектуры.</a:t>
             </a:r>
           </a:p>
           <a:p>
@@ -637,43 +692,28 @@
             </a:r>
             <a:r>
               <a:rPr lang="ru-RU" baseline="0" dirty="0" smtClean="0"/>
-              <a:t>основе подсистемы </a:t>
-            </a:r>
-            <a:r>
-              <a:rPr lang="en-US" baseline="0" dirty="0" smtClean="0"/>
-              <a:t>ANTLR </a:t>
+              <a:t>основе </a:t>
             </a:r>
             <a:r>
               <a:rPr lang="ru-RU" baseline="0" dirty="0" smtClean="0"/>
-              <a:t>лежит грамматика разработанного язык описания моделей прототипов </a:t>
+              <a:t>рассматриваемой подсистемы лежит </a:t>
             </a:r>
             <a:r>
               <a:rPr lang="ru-RU" baseline="0" dirty="0" smtClean="0"/>
-              <a:t>архитектуры</a:t>
-            </a:r>
-          </a:p>
-          <a:p>
+              <a:t>грамматика разработанного </a:t>
+            </a:r>
             <a:r>
               <a:rPr lang="ru-RU" baseline="0" dirty="0" smtClean="0"/>
-              <a:t>С помощью средств инструмента </a:t>
-            </a:r>
-            <a:r>
-              <a:rPr lang="en-US" baseline="0" dirty="0" smtClean="0"/>
-              <a:t>ANTLR </a:t>
+              <a:t>языка </a:t>
             </a:r>
             <a:r>
               <a:rPr lang="ru-RU" baseline="0" dirty="0" smtClean="0"/>
-              <a:t>выполняется построения специального вида абстрактного синтаксического дерева</a:t>
-            </a:r>
-          </a:p>
-          <a:p>
+              <a:t>описания моделей прототипов </a:t>
+            </a:r>
             <a:r>
               <a:rPr lang="ru-RU" baseline="0" dirty="0" smtClean="0"/>
-              <a:t>Специфика этого дерева состоит в том, что оно содержит только ту информацию о работе модели прототипа архитектуры, которая раскрывает его специфику поведения во времени. ????</a:t>
-            </a:r>
-          </a:p>
-          <a:p>
-            <a:endParaRPr lang="ru-RU" dirty="0"/>
+              <a:t>архитектур и специально разработанная структура абстрактного синтаксического дерева.</a:t>
+            </a:r>
           </a:p>
         </p:txBody>
       </p:sp>
@@ -759,17 +799,27 @@
           <a:p>
             <a:r>
               <a:rPr lang="ru-RU" dirty="0" smtClean="0"/>
-              <a:t>Данная подсистема ответственна за перевод</a:t>
+              <a:t>Компонентой внутреннего</a:t>
             </a:r>
             <a:r>
               <a:rPr lang="ru-RU" baseline="0" dirty="0" smtClean="0"/>
-              <a:t> информации, содержащейся в абстрактном синтаксическом дереве, в более удобную с точки зрения автоматных языков форму – граф потока исполнения.</a:t>
-            </a:r>
-          </a:p>
-          <a:p>
+              <a:t> слоя системы является </a:t>
+            </a:r>
+            <a:r>
+              <a:rPr lang="ru-RU" dirty="0" smtClean="0"/>
+              <a:t>подсистема построения графа потока исполнения.</a:t>
+            </a:r>
             <a:r>
               <a:rPr lang="ru-RU" baseline="0" dirty="0" smtClean="0"/>
-              <a:t>При построении такого графа для каждому узлу ставится в соответствие состояние в исходной модели. Кроме того выделяются два базовых состояния, которые должны присутствовать в любой модели прототипа – начальное и конечное. </a:t>
+              <a:t> Данная подсистема</a:t>
+            </a:r>
+            <a:r>
+              <a:rPr lang="ru-RU" dirty="0" smtClean="0"/>
+              <a:t> ответственна за перевод</a:t>
+            </a:r>
+            <a:r>
+              <a:rPr lang="ru-RU" baseline="0" dirty="0" smtClean="0"/>
+              <a:t> информации, содержащейся в абстрактном синтаксическом дереве, в более удобную с точки зрения автоматных языков форму – граф потока исполнения. При построении такого графа для каждому узлу ставится в соответствие состояние в исходной модели, а каждой инструкции перехода между состояниями соответствует направленная дуга между соответствующими состояниями. Кроме того выделяются два базовых состояния, которые должны присутствовать в любой модели прототипа – начальное и конечное. </a:t>
             </a:r>
             <a:endParaRPr lang="ru-RU" dirty="0"/>
           </a:p>
@@ -871,29 +921,27 @@
             </a:r>
             <a:r>
               <a:rPr lang="ru-RU" baseline="0" dirty="0" smtClean="0"/>
-              <a:t> модели описанные с помощью разработанного языка описания приводятся к специализированному виду, пригодному для использования верификатором </a:t>
+              <a:t> модели описанные с помощью разработанного языка описания </a:t>
+            </a:r>
+            <a:r>
+              <a:rPr lang="ru-RU" baseline="0" dirty="0" err="1" smtClean="0"/>
+              <a:t>моделй</a:t>
+            </a:r>
+            <a:r>
+              <a:rPr lang="ru-RU" baseline="0" dirty="0" smtClean="0"/>
+              <a:t> приводятся к специализированному виду, пригодному для использования верификатором </a:t>
             </a:r>
             <a:r>
               <a:rPr lang="en-US" baseline="0" dirty="0" smtClean="0"/>
               <a:t>SPIN. </a:t>
             </a:r>
-          </a:p>
-          <a:p>
             <a:r>
               <a:rPr lang="ru-RU" dirty="0" smtClean="0"/>
               <a:t>Для</a:t>
             </a:r>
             <a:r>
               <a:rPr lang="ru-RU" baseline="0" dirty="0" smtClean="0"/>
-              <a:t> каждого требования спецификации модели прототипа, представленного в виде </a:t>
-            </a:r>
-            <a:r>
-              <a:rPr lang="en-US" baseline="0" dirty="0" smtClean="0"/>
-              <a:t>LTL-</a:t>
-            </a:r>
-            <a:r>
-              <a:rPr lang="ru-RU" baseline="0" dirty="0" smtClean="0"/>
-              <a:t>формулы верификатором </a:t>
+              <a:t> каждого преобразованного требования спецификации модели прототипа, представленного в виде формулы темпоральной логики верификатором </a:t>
             </a:r>
             <a:r>
               <a:rPr lang="en-US" baseline="0" dirty="0" smtClean="0"/>
@@ -909,15 +957,11 @@
             </a:r>
             <a:r>
               <a:rPr lang="ru-RU" baseline="0" dirty="0" smtClean="0"/>
-              <a:t>которая представляет собой автомат </a:t>
-            </a:r>
-            <a:r>
-              <a:rPr lang="ru-RU" baseline="0" dirty="0" err="1" smtClean="0"/>
-              <a:t>Бюхи</a:t>
+              <a:t>которая представляет собой автомат Бюхи, записанный на языке </a:t>
             </a:r>
             <a:r>
               <a:rPr lang="ru-RU" baseline="0" dirty="0" smtClean="0"/>
-              <a:t>, записанный на языке промела</a:t>
+              <a:t>промела.</a:t>
             </a:r>
             <a:endParaRPr lang="ru-RU" dirty="0"/>
           </a:p>
@@ -1301,12 +1345,99 @@
           <a:bodyPr/>
           <a:lstStyle/>
           <a:p>
-            <a:r>
-              <a:rPr lang="ru-RU" dirty="0" smtClean="0"/>
-              <a:t>Более расширенно по каждому пункту (они спали и только проснулись)</a:t>
-            </a:r>
-          </a:p>
-          <a:p>
+            <a:pPr marL="0" marR="0" indent="0" algn="l" defTabSz="914400" rtl="0" eaLnBrk="1" fontAlgn="auto" latinLnBrk="0" hangingPunct="1">
+              <a:lnSpc>
+                <a:spcPct val="100000"/>
+              </a:lnSpc>
+              <a:spcBef>
+                <a:spcPts val="0"/>
+              </a:spcBef>
+              <a:spcAft>
+                <a:spcPts val="0"/>
+              </a:spcAft>
+              <a:buClrTx/>
+              <a:buSzTx/>
+              <a:buFontTx/>
+              <a:buNone/>
+              <a:tabLst/>
+              <a:defRPr/>
+            </a:pPr>
+            <a:r>
+              <a:rPr lang="ru-RU" sz="1200" kern="1200" dirty="0" smtClean="0">
+                <a:solidFill>
+                  <a:schemeClr val="tx1"/>
+                </a:solidFill>
+                <a:effectLst/>
+                <a:latin typeface="+mn-lt"/>
+                <a:ea typeface="+mn-ea"/>
+                <a:cs typeface="+mn-cs"/>
+              </a:rPr>
+              <a:t>В результате работы над дипломным проектом, мною была разработана и формализована модель системы проектирования и тестирования каркасов</a:t>
+            </a:r>
+            <a:r>
+              <a:rPr lang="ru-RU" sz="1200" kern="1200" baseline="0" dirty="0" smtClean="0">
+                <a:solidFill>
+                  <a:schemeClr val="tx1"/>
+                </a:solidFill>
+                <a:effectLst/>
+                <a:latin typeface="+mn-lt"/>
+                <a:ea typeface="+mn-ea"/>
+                <a:cs typeface="+mn-cs"/>
+              </a:rPr>
+              <a:t> программных продуктов.</a:t>
+            </a:r>
+            <a:r>
+              <a:rPr lang="ru-RU" sz="1200" kern="1200" dirty="0" smtClean="0">
+                <a:solidFill>
+                  <a:schemeClr val="tx1"/>
+                </a:solidFill>
+                <a:effectLst/>
+                <a:latin typeface="+mn-lt"/>
+                <a:ea typeface="+mn-ea"/>
+                <a:cs typeface="+mn-cs"/>
+              </a:rPr>
+              <a:t> На базе модели спроектирована архитектура системы. На основе формализованной модели был спроектирован и реализован каркас системы проектирования и тестирования прототипов архитектур, с применением современных подходов и технологий программирования. </a:t>
+            </a:r>
+            <a:endParaRPr lang="en-US" sz="1200" kern="1200" dirty="0" smtClean="0">
+              <a:solidFill>
+                <a:schemeClr val="tx1"/>
+              </a:solidFill>
+              <a:effectLst/>
+              <a:latin typeface="+mn-lt"/>
+              <a:ea typeface="+mn-ea"/>
+              <a:cs typeface="+mn-cs"/>
+            </a:endParaRPr>
+          </a:p>
+          <a:p>
+            <a:pPr marL="0" marR="0" indent="0" algn="l" defTabSz="914400" rtl="0" eaLnBrk="1" fontAlgn="auto" latinLnBrk="0" hangingPunct="1">
+              <a:lnSpc>
+                <a:spcPct val="100000"/>
+              </a:lnSpc>
+              <a:spcBef>
+                <a:spcPts val="0"/>
+              </a:spcBef>
+              <a:spcAft>
+                <a:spcPts val="0"/>
+              </a:spcAft>
+              <a:buClrTx/>
+              <a:buSzTx/>
+              <a:buFontTx/>
+              <a:buNone/>
+              <a:tabLst/>
+              <a:defRPr/>
+            </a:pPr>
+            <a:r>
+              <a:rPr lang="en-US" sz="1200" kern="1200" dirty="0" smtClean="0">
+                <a:solidFill>
+                  <a:schemeClr val="tx1"/>
+                </a:solidFill>
+                <a:effectLst/>
+                <a:latin typeface="+mn-lt"/>
+                <a:ea typeface="+mn-ea"/>
+                <a:cs typeface="+mn-cs"/>
+              </a:rPr>
+              <a:t>{</a:t>
+            </a:r>
             <a:r>
               <a:rPr lang="ru-RU" dirty="0" smtClean="0"/>
               <a:t>Модель системы, представляющая из</a:t>
@@ -1327,7 +1458,27 @@
               <a:rPr lang="en-US" baseline="0" dirty="0" smtClean="0"/>
               <a:t>Promela</a:t>
             </a:r>
-            <a:endParaRPr lang="ru-RU" dirty="0"/>
+            <a:r>
+              <a:rPr lang="en-US" sz="1200" kern="1200" dirty="0" smtClean="0">
+                <a:solidFill>
+                  <a:schemeClr val="tx1"/>
+                </a:solidFill>
+                <a:effectLst/>
+                <a:latin typeface="+mn-lt"/>
+                <a:ea typeface="+mn-ea"/>
+                <a:cs typeface="+mn-cs"/>
+              </a:rPr>
+              <a:t>}</a:t>
+            </a:r>
+            <a:endParaRPr lang="ru-RU" sz="1200" kern="1200" dirty="0" smtClean="0">
+              <a:solidFill>
+                <a:schemeClr val="tx1"/>
+              </a:solidFill>
+              <a:effectLst/>
+              <a:latin typeface="+mn-lt"/>
+              <a:ea typeface="+mn-ea"/>
+              <a:cs typeface="+mn-cs"/>
+            </a:endParaRPr>
           </a:p>
         </p:txBody>
       </p:sp>
@@ -1419,7 +1570,217 @@
               <a:rPr lang="ru-RU" baseline="0" dirty="0" smtClean="0"/>
               <a:t> по каждому пункту</a:t>
             </a:r>
-            <a:endParaRPr lang="ru-RU" dirty="0"/>
+          </a:p>
+          <a:p>
+            <a:r>
+              <a:rPr lang="ru-RU" sz="1200" kern="1200" dirty="0" smtClean="0">
+                <a:solidFill>
+                  <a:schemeClr val="tx1"/>
+                </a:solidFill>
+                <a:effectLst/>
+                <a:latin typeface="+mn-lt"/>
+                <a:ea typeface="+mn-ea"/>
+                <a:cs typeface="+mn-cs"/>
+              </a:rPr>
+              <a:t>Можно выделить следующие пути развития проекта. </a:t>
+            </a:r>
+          </a:p>
+          <a:p>
+            <a:r>
+              <a:rPr lang="ru-RU" sz="1200" kern="1200" dirty="0" smtClean="0">
+                <a:solidFill>
+                  <a:schemeClr val="tx1"/>
+                </a:solidFill>
+                <a:effectLst/>
+                <a:latin typeface="+mn-lt"/>
+                <a:ea typeface="+mn-ea"/>
+                <a:cs typeface="+mn-cs"/>
+              </a:rPr>
+              <a:t>Во-первых, для наделения системы расширения возможностей</a:t>
+            </a:r>
+            <a:r>
+              <a:rPr lang="ru-RU" sz="1200" kern="1200" baseline="0" dirty="0" smtClean="0">
+                <a:solidFill>
+                  <a:schemeClr val="tx1"/>
+                </a:solidFill>
+                <a:effectLst/>
+                <a:latin typeface="+mn-lt"/>
+                <a:ea typeface="+mn-ea"/>
+                <a:cs typeface="+mn-cs"/>
+              </a:rPr>
+              <a:t> системы</a:t>
+            </a:r>
+            <a:r>
+              <a:rPr lang="ru-RU" sz="1200" kern="1200" dirty="0" smtClean="0">
+                <a:solidFill>
+                  <a:schemeClr val="tx1"/>
+                </a:solidFill>
+                <a:effectLst/>
+                <a:latin typeface="+mn-lt"/>
+                <a:ea typeface="+mn-ea"/>
+                <a:cs typeface="+mn-cs"/>
+              </a:rPr>
+              <a:t> требуется добавить</a:t>
+            </a:r>
+            <a:r>
+              <a:rPr lang="ru-RU" sz="1200" kern="1200" baseline="0" dirty="0" smtClean="0">
+                <a:solidFill>
+                  <a:schemeClr val="tx1"/>
+                </a:solidFill>
+                <a:effectLst/>
+                <a:latin typeface="+mn-lt"/>
+                <a:ea typeface="+mn-ea"/>
+                <a:cs typeface="+mn-cs"/>
+              </a:rPr>
+              <a:t> поддержку верификации </a:t>
+            </a:r>
+            <a:r>
+              <a:rPr lang="ru-RU" sz="1200" kern="1200" baseline="0" dirty="0" err="1" smtClean="0">
+                <a:solidFill>
+                  <a:schemeClr val="tx1"/>
+                </a:solidFill>
+                <a:effectLst/>
+                <a:latin typeface="+mn-lt"/>
+                <a:ea typeface="+mn-ea"/>
+                <a:cs typeface="+mn-cs"/>
+              </a:rPr>
+              <a:t>распределенных</a:t>
+            </a:r>
+            <a:r>
+              <a:rPr lang="ru-RU" sz="1200" kern="1200" baseline="0" dirty="0" smtClean="0">
+                <a:solidFill>
+                  <a:schemeClr val="tx1"/>
+                </a:solidFill>
+                <a:effectLst/>
+                <a:latin typeface="+mn-lt"/>
+                <a:ea typeface="+mn-ea"/>
+                <a:cs typeface="+mn-cs"/>
+              </a:rPr>
+              <a:t> и параллельных систем</a:t>
+            </a:r>
+            <a:r>
+              <a:rPr lang="en-US" sz="1200" kern="1200" baseline="0" dirty="0" smtClean="0">
+                <a:solidFill>
+                  <a:schemeClr val="tx1"/>
+                </a:solidFill>
+                <a:effectLst/>
+                <a:latin typeface="+mn-lt"/>
+                <a:ea typeface="+mn-ea"/>
+                <a:cs typeface="+mn-cs"/>
+              </a:rPr>
+              <a:t>;</a:t>
+            </a:r>
+            <a:endParaRPr lang="ru-RU" sz="1200" kern="1200" baseline="0" dirty="0" smtClean="0">
+              <a:solidFill>
+                <a:schemeClr val="tx1"/>
+              </a:solidFill>
+              <a:effectLst/>
+              <a:latin typeface="+mn-lt"/>
+              <a:ea typeface="+mn-ea"/>
+              <a:cs typeface="+mn-cs"/>
+            </a:endParaRPr>
+          </a:p>
+          <a:p>
+            <a:r>
+              <a:rPr lang="ru-RU" sz="1200" kern="1200" baseline="0" dirty="0" smtClean="0">
+                <a:solidFill>
+                  <a:schemeClr val="tx1"/>
+                </a:solidFill>
+                <a:effectLst/>
+                <a:latin typeface="+mn-lt"/>
+                <a:ea typeface="+mn-ea"/>
+                <a:cs typeface="+mn-cs"/>
+              </a:rPr>
+              <a:t>Во-вторых, генерация других целевых языков позволит расширить список используемых верификаторов</a:t>
+            </a:r>
+            <a:endParaRPr lang="ru-RU" sz="1200" kern="1200" dirty="0" smtClean="0">
+              <a:solidFill>
+                <a:schemeClr val="tx1"/>
+              </a:solidFill>
+              <a:effectLst/>
+              <a:latin typeface="+mn-lt"/>
+              <a:ea typeface="+mn-ea"/>
+              <a:cs typeface="+mn-cs"/>
+            </a:endParaRPr>
+          </a:p>
+          <a:p>
+            <a:pPr marL="0" marR="0" indent="0" algn="l" defTabSz="914400" rtl="0" eaLnBrk="1" fontAlgn="auto" latinLnBrk="0" hangingPunct="1">
+              <a:lnSpc>
+                <a:spcPct val="100000"/>
+              </a:lnSpc>
+              <a:spcBef>
+                <a:spcPts val="0"/>
+              </a:spcBef>
+              <a:spcAft>
+                <a:spcPts val="0"/>
+              </a:spcAft>
+              <a:buClrTx/>
+              <a:buSzTx/>
+              <a:buFontTx/>
+              <a:buNone/>
+              <a:tabLst/>
+              <a:defRPr/>
+            </a:pPr>
+            <a:r>
+              <a:rPr lang="ru-RU" sz="1200" kern="1200" dirty="0" smtClean="0">
+                <a:solidFill>
+                  <a:schemeClr val="tx1"/>
+                </a:solidFill>
+                <a:effectLst/>
+                <a:latin typeface="+mn-lt"/>
+                <a:ea typeface="+mn-ea"/>
+                <a:cs typeface="+mn-cs"/>
+              </a:rPr>
+              <a:t>Наконец, совершенствование компонентов и оптимизация алгоритмов базовой платформы системы позволит повысить </a:t>
+            </a:r>
+            <a:r>
+              <a:rPr lang="ru-RU" sz="1200" kern="1200" dirty="0" err="1" smtClean="0">
+                <a:solidFill>
+                  <a:schemeClr val="tx1"/>
+                </a:solidFill>
+                <a:effectLst/>
+                <a:latin typeface="+mn-lt"/>
+                <a:ea typeface="+mn-ea"/>
+                <a:cs typeface="+mn-cs"/>
+              </a:rPr>
+              <a:t>эффектиность</a:t>
+            </a:r>
+            <a:r>
+              <a:rPr lang="ru-RU" sz="1200" kern="1200" dirty="0" smtClean="0">
+                <a:solidFill>
+                  <a:schemeClr val="tx1"/>
+                </a:solidFill>
+                <a:effectLst/>
+                <a:latin typeface="+mn-lt"/>
+                <a:ea typeface="+mn-ea"/>
+                <a:cs typeface="+mn-cs"/>
+              </a:rPr>
+              <a:t> </a:t>
+            </a:r>
+            <a:r>
+              <a:rPr lang="ru-RU" sz="1200" kern="1200" dirty="0" err="1" smtClean="0">
+                <a:solidFill>
+                  <a:schemeClr val="tx1"/>
+                </a:solidFill>
+                <a:effectLst/>
+                <a:latin typeface="+mn-lt"/>
+                <a:ea typeface="+mn-ea"/>
+                <a:cs typeface="+mn-cs"/>
+              </a:rPr>
+              <a:t>ее</a:t>
+            </a:r>
+            <a:r>
+              <a:rPr lang="ru-RU" sz="1200" kern="1200" dirty="0" smtClean="0">
+                <a:solidFill>
+                  <a:schemeClr val="tx1"/>
+                </a:solidFill>
+                <a:effectLst/>
+                <a:latin typeface="+mn-lt"/>
+                <a:ea typeface="+mn-ea"/>
+                <a:cs typeface="+mn-cs"/>
+              </a:rPr>
+              <a:t> использования и сократить накладные расходы в работе полезной части. </a:t>
+            </a:r>
           </a:p>
         </p:txBody>
       </p:sp>
@@ -1503,66 +1864,19 @@
           <a:bodyPr/>
           <a:lstStyle/>
           <a:p>
-            <a:pPr marL="228600" indent="-228600">
-              <a:buAutoNum type="arabicPeriod"/>
-            </a:pPr>
-            <a:r>
-              <a:rPr lang="ru-RU" dirty="0" smtClean="0"/>
-              <a:t>Хорошо</a:t>
-            </a:r>
-            <a:r>
-              <a:rPr lang="ru-RU" baseline="0" dirty="0" smtClean="0"/>
-              <a:t> автоматизируем – участие человека ограничивается анализом </a:t>
-            </a:r>
-            <a:r>
-              <a:rPr lang="ru-RU" baseline="0" dirty="0" err="1" smtClean="0"/>
-              <a:t>контрпримера</a:t>
-            </a:r>
-            <a:endParaRPr lang="ru-RU" baseline="0" dirty="0" smtClean="0"/>
-          </a:p>
-          <a:p>
-            <a:pPr marL="228600" indent="-228600">
-              <a:buAutoNum type="arabicPeriod"/>
-            </a:pPr>
-            <a:r>
-              <a:rPr lang="ru-RU" dirty="0" smtClean="0"/>
-              <a:t>Если модель конечна, корректна и адекватна проверяемому свойству, то </a:t>
-            </a:r>
-            <a:r>
-              <a:rPr lang="ru-RU" dirty="0" err="1" smtClean="0"/>
-              <a:t>дается</a:t>
-            </a:r>
-            <a:r>
-              <a:rPr lang="ru-RU" dirty="0" smtClean="0"/>
-              <a:t> точный ответ</a:t>
-            </a:r>
-            <a:r>
-              <a:rPr lang="ru-RU" baseline="0" dirty="0" smtClean="0"/>
-              <a:t> – либо ошибок нет, либо </a:t>
-            </a:r>
-            <a:r>
-              <a:rPr lang="ru-RU" baseline="0" dirty="0" err="1" smtClean="0"/>
-              <a:t>выдается</a:t>
-            </a:r>
-            <a:r>
-              <a:rPr lang="ru-RU" baseline="0" dirty="0" smtClean="0"/>
-              <a:t> контрпример с </a:t>
-            </a:r>
-            <a:r>
-              <a:rPr lang="ru-RU" baseline="0" dirty="0" smtClean="0"/>
-              <a:t>ошибкой</a:t>
-            </a:r>
-            <a:endParaRPr lang="ru-RU" baseline="0" dirty="0" smtClean="0"/>
-          </a:p>
-          <a:p>
-            <a:pPr marL="228600" indent="-228600">
-              <a:buAutoNum type="arabicPeriod"/>
-            </a:pPr>
-            <a:r>
-              <a:rPr lang="ru-RU" baseline="0" dirty="0" smtClean="0"/>
-              <a:t>В ряде случаев построить конечную модель системы, при этом адекватную тому свойству, которое мы хотим проверить достаточно сложно</a:t>
-            </a:r>
-            <a:endParaRPr lang="ru-RU" dirty="0" smtClean="0"/>
+            <a:r>
+              <a:rPr lang="ru-RU" sz="1200" kern="1200" dirty="0" smtClean="0">
+                <a:solidFill>
+                  <a:schemeClr val="tx1"/>
+                </a:solidFill>
+                <a:effectLst/>
+                <a:latin typeface="+mn-lt"/>
+                <a:ea typeface="+mn-ea"/>
+                <a:cs typeface="+mn-cs"/>
+              </a:rPr>
+              <a:t>На этом, у меня все. Спасибо за Ваше внимание. Я готова ответить на возникшие вопросы.</a:t>
+            </a:r>
+            <a:endParaRPr lang="ru-RU" dirty="0"/>
           </a:p>
         </p:txBody>
       </p:sp>
@@ -1583,7 +1897,7 @@
           <a:p>
             <a:fld id="{D2C5C3F3-C17D-45D2-AA34-92C6E86E38D2}" type="slidenum">
               <a:rPr lang="ru-RU" smtClean="0"/>
-              <a:t>19</a:t>
+              <a:t>18</a:t>
             </a:fld>
             <a:endParaRPr lang="ru-RU"/>
           </a:p>
@@ -1592,7 +1906,7 @@
     </p:spTree>
     <p:extLst>
       <p:ext uri="{BB962C8B-B14F-4D97-AF65-F5344CB8AC3E}">
-        <p14:creationId xmlns:p14="http://schemas.microsoft.com/office/powerpoint/2010/main" val="179302113"/>
+        <p14:creationId xmlns:p14="http://schemas.microsoft.com/office/powerpoint/2010/main" val="3726416636"/>
       </p:ext>
     </p:extLst>
   </p:cSld>
@@ -1646,61 +1960,66 @@
           <a:bodyPr/>
           <a:lstStyle/>
           <a:p>
-            <a:pPr marL="171450" indent="-171450">
-              <a:buFont typeface="Arial" pitchFamily="34" charset="0"/>
-              <a:buChar char="•"/>
+            <a:pPr marL="228600" indent="-228600">
+              <a:buAutoNum type="arabicPeriod"/>
             </a:pPr>
             <a:r>
               <a:rPr lang="ru-RU" dirty="0" smtClean="0"/>
-              <a:t>На</a:t>
+              <a:t>Хорошо</a:t>
             </a:r>
             <a:r>
               <a:rPr lang="ru-RU" baseline="0" dirty="0" smtClean="0"/>
-              <a:t> языке можем описывать недетерминизм. То есть его удобно использовать для абстракции от несущественных деталей. Охраняемые команды означают реализацию недетерминизма. Это значит что с каждой командой языка связано понятие выполнимости и если в </a:t>
+              <a:t> автоматизируем – участие человека ограничивается анализом </a:t>
             </a:r>
             <a:r>
               <a:rPr lang="ru-RU" baseline="0" dirty="0" err="1" smtClean="0"/>
-              <a:t>определенном</a:t>
+              <a:t>контрпримера</a:t>
+            </a:r>
+            <a:endParaRPr lang="ru-RU" baseline="0" dirty="0" smtClean="0"/>
+          </a:p>
+          <a:p>
+            <a:pPr marL="228600" indent="-228600">
+              <a:buAutoNum type="arabicPeriod"/>
+            </a:pPr>
+            <a:r>
+              <a:rPr lang="ru-RU" dirty="0" smtClean="0"/>
+              <a:t>Если модель конечна, корректна и адекватна проверяемому свойству, то </a:t>
+            </a:r>
+            <a:r>
+              <a:rPr lang="ru-RU" dirty="0" err="1" smtClean="0"/>
+              <a:t>дается</a:t>
+            </a:r>
+            <a:r>
+              <a:rPr lang="ru-RU" dirty="0" smtClean="0"/>
+              <a:t> точный ответ</a:t>
             </a:r>
             <a:r>
               <a:rPr lang="ru-RU" baseline="0" dirty="0" smtClean="0"/>
-              <a:t> блоке модели присутствует несколько команд, выполнимых одновременно, то может быть выполнена любая из них.</a:t>
-            </a:r>
-          </a:p>
-          <a:p>
-            <a:pPr marL="171450" indent="-171450">
-              <a:buFont typeface="Arial" pitchFamily="34" charset="0"/>
-              <a:buChar char="•"/>
+              <a:t> – либо ошибок нет, либо </a:t>
+            </a:r>
+            <a:r>
+              <a:rPr lang="ru-RU" baseline="0" dirty="0" err="1" smtClean="0"/>
+              <a:t>выдается</a:t>
+            </a:r>
+            <a:r>
+              <a:rPr lang="ru-RU" baseline="0" dirty="0" smtClean="0"/>
+              <a:t> контрпример с </a:t>
+            </a:r>
+            <a:r>
+              <a:rPr lang="ru-RU" baseline="0" dirty="0" smtClean="0"/>
+              <a:t>ошибкой</a:t>
+            </a:r>
+            <a:endParaRPr lang="ru-RU" baseline="0" dirty="0" smtClean="0"/>
+          </a:p>
+          <a:p>
+            <a:pPr marL="228600" indent="-228600">
+              <a:buAutoNum type="arabicPeriod"/>
             </a:pPr>
             <a:r>
               <a:rPr lang="ru-RU" baseline="0" dirty="0" smtClean="0"/>
-              <a:t>Поскольку способ верификации </a:t>
-            </a:r>
-            <a:r>
-              <a:rPr lang="en-US" baseline="0" dirty="0" smtClean="0"/>
-              <a:t>model checking </a:t>
-            </a:r>
-            <a:r>
-              <a:rPr lang="ru-RU" baseline="0" dirty="0" smtClean="0"/>
-              <a:t>сказанное означает, что у любой модели описанной с помощью языка </a:t>
-            </a:r>
-            <a:r>
-              <a:rPr lang="en-US" baseline="0" dirty="0" err="1" smtClean="0"/>
-              <a:t>Promela</a:t>
-            </a:r>
-            <a:r>
-              <a:rPr lang="ru-RU" baseline="0" dirty="0" smtClean="0"/>
-              <a:t> конечное число состояний. За </a:t>
-            </a:r>
-            <a:r>
-              <a:rPr lang="ru-RU" baseline="0" dirty="0" err="1" smtClean="0"/>
-              <a:t>счет</a:t>
-            </a:r>
-            <a:r>
-              <a:rPr lang="ru-RU" baseline="0" dirty="0" smtClean="0"/>
-              <a:t> чего это достигается мы увидим дальше.</a:t>
-            </a:r>
-            <a:endParaRPr lang="ru-RU" dirty="0"/>
+              <a:t>В ряде случаев построить конечную модель системы, при этом адекватную тому свойству, которое мы хотим проверить достаточно сложно</a:t>
+            </a:r>
+            <a:endParaRPr lang="ru-RU" dirty="0" smtClean="0"/>
           </a:p>
         </p:txBody>
       </p:sp>
@@ -1721,7 +2040,7 @@
           <a:p>
             <a:fld id="{D2C5C3F3-C17D-45D2-AA34-92C6E86E38D2}" type="slidenum">
               <a:rPr lang="ru-RU" smtClean="0"/>
-              <a:t>20</a:t>
+              <a:t>19</a:t>
             </a:fld>
             <a:endParaRPr lang="ru-RU"/>
           </a:p>
@@ -1730,7 +2049,7 @@
     </p:spTree>
     <p:extLst>
       <p:ext uri="{BB962C8B-B14F-4D97-AF65-F5344CB8AC3E}">
-        <p14:creationId xmlns:p14="http://schemas.microsoft.com/office/powerpoint/2010/main" val="3247691620"/>
+        <p14:creationId xmlns:p14="http://schemas.microsoft.com/office/powerpoint/2010/main" val="179302113"/>
       </p:ext>
     </p:extLst>
   </p:cSld>
@@ -1932,210 +2251,6 @@
 </p:notes>
 </file>
 
-<file path=ppt/notesSlides/notesSlide20.xml><?xml version="1.0" encoding="utf-8"?>
-<p:notes xmlns:a="http://schemas.openxmlformats.org/drawingml/2006/main" xmlns:r="http://schemas.openxmlformats.org/officeDocument/2006/relationships" xmlns:p="http://schemas.openxmlformats.org/presentationml/2006/main">
-  <p:cSld>
-    <p:spTree>
-      <p:nvGrpSpPr>
-        <p:cNvPr id="1" name=""/>
-        <p:cNvGrpSpPr/>
-        <p:nvPr/>
-      </p:nvGrpSpPr>
-      <p:grpSpPr>
-        <a:xfrm>
-          <a:off x="0" y="0"/>
-          <a:ext cx="0" cy="0"/>
-          <a:chOff x="0" y="0"/>
-          <a:chExt cx="0" cy="0"/>
-        </a:xfrm>
-      </p:grpSpPr>
-      <p:sp>
-        <p:nvSpPr>
-          <p:cNvPr id="2" name="Образ слайда 1"/>
-          <p:cNvSpPr>
-            <a:spLocks noGrp="1" noRot="1" noChangeAspect="1"/>
-          </p:cNvSpPr>
-          <p:nvPr>
-            <p:ph type="sldImg"/>
-          </p:nvPr>
-        </p:nvSpPr>
-        <p:spPr/>
-      </p:sp>
-      <p:sp>
-        <p:nvSpPr>
-          <p:cNvPr id="3" name="Заметки 2"/>
-          <p:cNvSpPr>
-            <a:spLocks noGrp="1"/>
-          </p:cNvSpPr>
-          <p:nvPr>
-            <p:ph type="body" idx="1"/>
-          </p:nvPr>
-        </p:nvSpPr>
-        <p:spPr/>
-        <p:txBody>
-          <a:bodyPr/>
-          <a:lstStyle/>
-          <a:p>
-            <a:r>
-              <a:rPr lang="ru-RU" dirty="0" err="1" smtClean="0"/>
-              <a:t>Promela</a:t>
-            </a:r>
-            <a:r>
-              <a:rPr lang="ru-RU" dirty="0" smtClean="0"/>
-              <a:t> включает примитивы для создания процессов и описания </a:t>
-            </a:r>
-            <a:r>
-              <a:rPr lang="ru-RU" dirty="0" err="1" smtClean="0"/>
-              <a:t>межпроцессного</a:t>
-            </a:r>
-            <a:r>
-              <a:rPr lang="ru-RU" dirty="0" smtClean="0"/>
-              <a:t> взаимодействия</a:t>
-            </a:r>
-          </a:p>
-          <a:p>
-            <a:r>
-              <a:rPr lang="ru-RU" dirty="0" smtClean="0"/>
-              <a:t> НО! в нем отсутствует ряд средств, которые есть в языках программирования высокого уровня </a:t>
-            </a:r>
-          </a:p>
-          <a:p>
-            <a:r>
-              <a:rPr lang="ru-RU" dirty="0" smtClean="0"/>
-              <a:t> Например, указатели на данные и функции, не включено понятие времени или часов, отсутствуют операции с плавающей точкой и пр.</a:t>
-            </a:r>
-            <a:endParaRPr lang="ru-RU" dirty="0"/>
-          </a:p>
-        </p:txBody>
-      </p:sp>
-      <p:sp>
-        <p:nvSpPr>
-          <p:cNvPr id="4" name="Номер слайда 3"/>
-          <p:cNvSpPr>
-            <a:spLocks noGrp="1"/>
-          </p:cNvSpPr>
-          <p:nvPr>
-            <p:ph type="sldNum" sz="quarter" idx="10"/>
-          </p:nvPr>
-        </p:nvSpPr>
-        <p:spPr/>
-        <p:txBody>
-          <a:bodyPr/>
-          <a:lstStyle/>
-          <a:p>
-            <a:fld id="{D2C5C3F3-C17D-45D2-AA34-92C6E86E38D2}" type="slidenum">
-              <a:rPr lang="ru-RU" smtClean="0"/>
-              <a:t>21</a:t>
-            </a:fld>
-            <a:endParaRPr lang="ru-RU"/>
-          </a:p>
-        </p:txBody>
-      </p:sp>
-    </p:spTree>
-    <p:extLst>
-      <p:ext uri="{BB962C8B-B14F-4D97-AF65-F5344CB8AC3E}">
-        <p14:creationId xmlns:p14="http://schemas.microsoft.com/office/powerpoint/2010/main" val="1589152162"/>
-      </p:ext>
-    </p:extLst>
-  </p:cSld>
-  <p:clrMapOvr>
-    <a:masterClrMapping/>
-  </p:clrMapOvr>
-</p:notes>
-</file>
-
-<file path=ppt/notesSlides/notesSlide21.xml><?xml version="1.0" encoding="utf-8"?>
-<p:notes xmlns:a="http://schemas.openxmlformats.org/drawingml/2006/main" xmlns:r="http://schemas.openxmlformats.org/officeDocument/2006/relationships" xmlns:p="http://schemas.openxmlformats.org/presentationml/2006/main">
-  <p:cSld>
-    <p:spTree>
-      <p:nvGrpSpPr>
-        <p:cNvPr id="1" name=""/>
-        <p:cNvGrpSpPr/>
-        <p:nvPr/>
-      </p:nvGrpSpPr>
-      <p:grpSpPr>
-        <a:xfrm>
-          <a:off x="0" y="0"/>
-          <a:ext cx="0" cy="0"/>
-          <a:chOff x="0" y="0"/>
-          <a:chExt cx="0" cy="0"/>
-        </a:xfrm>
-      </p:grpSpPr>
-      <p:sp>
-        <p:nvSpPr>
-          <p:cNvPr id="2" name="Образ слайда 1"/>
-          <p:cNvSpPr>
-            <a:spLocks noGrp="1" noRot="1" noChangeAspect="1"/>
-          </p:cNvSpPr>
-          <p:nvPr>
-            <p:ph type="sldImg"/>
-          </p:nvPr>
-        </p:nvSpPr>
-        <p:spPr/>
-      </p:sp>
-      <p:sp>
-        <p:nvSpPr>
-          <p:cNvPr id="3" name="Заметки 2"/>
-          <p:cNvSpPr>
-            <a:spLocks noGrp="1"/>
-          </p:cNvSpPr>
-          <p:nvPr>
-            <p:ph type="body" idx="1"/>
-          </p:nvPr>
-        </p:nvSpPr>
-        <p:spPr/>
-        <p:txBody>
-          <a:bodyPr/>
-          <a:lstStyle/>
-          <a:p>
-            <a:r>
-              <a:rPr lang="ru-RU" dirty="0" smtClean="0"/>
-              <a:t>ПРОБЛЕМА: Полнота спецификации – охватывают</a:t>
-            </a:r>
-            <a:r>
-              <a:rPr lang="ru-RU" baseline="0" dirty="0" smtClean="0"/>
-              <a:t> ли спецификации всё поведение системы</a:t>
-            </a:r>
-            <a:endParaRPr lang="ru-RU" dirty="0"/>
-          </a:p>
-        </p:txBody>
-      </p:sp>
-      <p:sp>
-        <p:nvSpPr>
-          <p:cNvPr id="4" name="Номер слайда 3"/>
-          <p:cNvSpPr>
-            <a:spLocks noGrp="1"/>
-          </p:cNvSpPr>
-          <p:nvPr>
-            <p:ph type="sldNum" sz="quarter" idx="10"/>
-          </p:nvPr>
-        </p:nvSpPr>
-        <p:spPr/>
-        <p:txBody>
-          <a:bodyPr/>
-          <a:lstStyle/>
-          <a:p>
-            <a:fld id="{D2C5C3F3-C17D-45D2-AA34-92C6E86E38D2}" type="slidenum">
-              <a:rPr lang="ru-RU" smtClean="0"/>
-              <a:t>22</a:t>
-            </a:fld>
-            <a:endParaRPr lang="ru-RU"/>
-          </a:p>
-        </p:txBody>
-      </p:sp>
-    </p:spTree>
-    <p:extLst>
-      <p:ext uri="{BB962C8B-B14F-4D97-AF65-F5344CB8AC3E}">
-        <p14:creationId xmlns:p14="http://schemas.microsoft.com/office/powerpoint/2010/main" val="725484770"/>
-      </p:ext>
-    </p:extLst>
-  </p:cSld>
-  <p:clrMapOvr>
-    <a:masterClrMapping/>
-  </p:clrMapOvr>
-</p:notes>
-</file>
-
 <file path=ppt/notesSlides/notesSlide3.xml><?xml version="1.0" encoding="utf-8"?>
 <p:notes xmlns:a="http://schemas.openxmlformats.org/drawingml/2006/main" xmlns:r="http://schemas.openxmlformats.org/officeDocument/2006/relationships" xmlns:p="http://schemas.openxmlformats.org/presentationml/2006/main">
   <p:cSld>
@@ -2181,52 +2296,164 @@
           <a:lstStyle/>
           <a:p>
             <a:r>
-              <a:rPr lang="ru-RU" dirty="0" smtClean="0"/>
-              <a:t>На этом слайде </a:t>
-            </a:r>
-            <a:r>
-              <a:rPr lang="ru-RU" dirty="0" smtClean="0"/>
-              <a:t>представлена </a:t>
-            </a:r>
-            <a:r>
-              <a:rPr lang="ru-RU" dirty="0" smtClean="0"/>
-              <a:t>модель </a:t>
-            </a:r>
-            <a:r>
-              <a:rPr lang="ru-RU" dirty="0" smtClean="0"/>
-              <a:t>прототипа </a:t>
-            </a:r>
-            <a:r>
-              <a:rPr lang="ru-RU" i="1" dirty="0" smtClean="0"/>
-              <a:t>(так можно описать любую систему)</a:t>
-            </a:r>
-          </a:p>
-          <a:p>
-            <a:endParaRPr lang="ru-RU" dirty="0" smtClean="0"/>
-          </a:p>
-          <a:p>
-            <a:r>
-              <a:rPr lang="ru-RU" baseline="0" dirty="0" smtClean="0"/>
-              <a:t>Состояние описывает </a:t>
-            </a:r>
-            <a:r>
-              <a:rPr lang="ru-RU" baseline="0" dirty="0" err="1" smtClean="0"/>
-              <a:t>тото</a:t>
-            </a:r>
-            <a:endParaRPr lang="ru-RU" baseline="0" dirty="0" smtClean="0"/>
-          </a:p>
-          <a:p>
-            <a:r>
-              <a:rPr lang="ru-RU" baseline="0" dirty="0" smtClean="0"/>
+              <a:rPr lang="ru-RU" sz="1200" kern="1200" dirty="0" smtClean="0">
+                <a:solidFill>
+                  <a:schemeClr val="tx1"/>
+                </a:solidFill>
+                <a:effectLst/>
+                <a:latin typeface="+mn-lt"/>
+                <a:ea typeface="+mn-ea"/>
+                <a:cs typeface="+mn-cs"/>
+              </a:rPr>
+              <a:t>Рассмотрим формальное описание модели прототипа</a:t>
+            </a:r>
+            <a:r>
+              <a:rPr lang="ru-RU" sz="1200" kern="1200" baseline="0" dirty="0" smtClean="0">
+                <a:solidFill>
+                  <a:schemeClr val="tx1"/>
+                </a:solidFill>
+                <a:effectLst/>
+                <a:latin typeface="+mn-lt"/>
+                <a:ea typeface="+mn-ea"/>
+                <a:cs typeface="+mn-cs"/>
+              </a:rPr>
+              <a:t> архитектуры.</a:t>
+            </a:r>
+          </a:p>
+          <a:p>
+            <a:r>
+              <a:rPr lang="ru-RU" sz="1200" kern="1200" baseline="0" dirty="0" smtClean="0">
+                <a:solidFill>
+                  <a:schemeClr val="tx1"/>
+                </a:solidFill>
+                <a:effectLst/>
+                <a:latin typeface="+mn-lt"/>
+                <a:ea typeface="+mn-ea"/>
+                <a:cs typeface="+mn-cs"/>
+              </a:rPr>
+              <a:t>Модель прототипа является результатом отображения исходной архитектуры разрабатываемой системы в программную среду и представляет собой сущность, характеризующуюся: конечным множеством состояний, начальным состоянием, множеством конечных состояний, набором спецификаций требований и множеством сценариев использования. </a:t>
+            </a:r>
+          </a:p>
+          <a:p>
+            <a:r>
+              <a:rPr lang="ru-RU" sz="1200" kern="1200" dirty="0" smtClean="0">
+                <a:solidFill>
+                  <a:schemeClr val="tx1"/>
+                </a:solidFill>
+                <a:effectLst/>
+                <a:latin typeface="+mn-lt"/>
+                <a:ea typeface="+mn-ea"/>
+                <a:cs typeface="+mn-cs"/>
+              </a:rPr>
+              <a:t>Состояние в работе прототипа можно определить как момент в работе прототипа архитектуры, который объединяет в неявной форме все входные воздействия прошлого, а также влияет на реакцию в текущий момент времени. Каждое состояние имеет вполне определённый смысл и качественно отличается от всех других состоянии, и кроме того однозначно определяет действия, которые могут совершаться в этом состоянии.</a:t>
+            </a:r>
+            <a:endParaRPr lang="ru-RU" sz="1200" kern="1200" baseline="0" dirty="0" smtClean="0">
+              <a:solidFill>
+                <a:schemeClr val="tx1"/>
+              </a:solidFill>
+              <a:effectLst/>
+              <a:latin typeface="+mn-lt"/>
+              <a:ea typeface="+mn-ea"/>
+              <a:cs typeface="+mn-cs"/>
+            </a:endParaRPr>
+          </a:p>
+          <a:p>
+            <a:endParaRPr lang="ru-RU" sz="1200" kern="1200" baseline="0" dirty="0" smtClean="0">
+              <a:solidFill>
+                <a:schemeClr val="tx1"/>
+              </a:solidFill>
+              <a:effectLst/>
+              <a:latin typeface="+mn-lt"/>
+              <a:ea typeface="+mn-ea"/>
+              <a:cs typeface="+mn-cs"/>
+            </a:endParaRPr>
+          </a:p>
+          <a:p>
+            <a:r>
+              <a:rPr lang="en-US" sz="1200" kern="1200" baseline="0" dirty="0" smtClean="0">
+                <a:solidFill>
+                  <a:schemeClr val="tx1"/>
+                </a:solidFill>
+                <a:effectLst/>
+                <a:latin typeface="+mn-lt"/>
+                <a:ea typeface="+mn-ea"/>
+                <a:cs typeface="+mn-cs"/>
+              </a:rPr>
+              <a:t>{</a:t>
+            </a:r>
+            <a:r>
+              <a:rPr lang="ru-RU" sz="1200" kern="1200" dirty="0" smtClean="0">
+                <a:solidFill>
+                  <a:schemeClr val="tx1"/>
+                </a:solidFill>
+                <a:effectLst/>
+                <a:latin typeface="+mn-lt"/>
+                <a:ea typeface="+mn-ea"/>
+                <a:cs typeface="+mn-cs"/>
+              </a:rPr>
+              <a:t>Сценарий прототипа представляет собой множество правил перехода между состояниями, каждое из которых отражает возможность выполнения каждого требования спецификации. Главная задача сценария состоит в том, чтобы подтвердить или опровергнуть выполнение какого-либо свойства из набора спецификации.</a:t>
+            </a:r>
+            <a:r>
+              <a:rPr lang="en-US" sz="1200" kern="1200" baseline="0" dirty="0" smtClean="0">
+                <a:solidFill>
+                  <a:schemeClr val="tx1"/>
+                </a:solidFill>
+                <a:effectLst/>
+                <a:latin typeface="+mn-lt"/>
+                <a:ea typeface="+mn-ea"/>
+                <a:cs typeface="+mn-cs"/>
+              </a:rPr>
+              <a:t>}</a:t>
+            </a:r>
+          </a:p>
+          <a:p>
+            <a:endParaRPr lang="ru-RU" sz="1200" kern="1200" baseline="0" dirty="0" smtClean="0">
+              <a:solidFill>
+                <a:schemeClr val="tx1"/>
+              </a:solidFill>
+              <a:effectLst/>
+              <a:latin typeface="+mn-lt"/>
+              <a:ea typeface="+mn-ea"/>
+              <a:cs typeface="+mn-cs"/>
+            </a:endParaRPr>
+          </a:p>
+          <a:p>
+            <a:r>
+              <a:rPr lang="ru-RU" sz="1200" kern="1200" baseline="0" dirty="0" smtClean="0">
+                <a:solidFill>
+                  <a:schemeClr val="tx1"/>
+                </a:solidFill>
+                <a:effectLst/>
+                <a:latin typeface="+mn-lt"/>
+                <a:ea typeface="+mn-ea"/>
+                <a:cs typeface="+mn-cs"/>
+              </a:rPr>
+              <a:t>Понятие модели прототипа архитектуры было введено для обобщения описания архитектур систем</a:t>
+            </a:r>
+          </a:p>
+          <a:p>
+            <a:endParaRPr lang="ru-RU" sz="1200" kern="1200" baseline="0" dirty="0" smtClean="0">
+              <a:solidFill>
+                <a:schemeClr val="tx1"/>
+              </a:solidFill>
+              <a:effectLst/>
+              <a:latin typeface="+mn-lt"/>
+              <a:ea typeface="+mn-ea"/>
+              <a:cs typeface="+mn-cs"/>
+            </a:endParaRPr>
+          </a:p>
+          <a:p>
+            <a:r>
+              <a:rPr lang="ru-RU" b="1" baseline="0" dirty="0" smtClean="0"/>
               <a:t>Почему так удобно описывать систему</a:t>
             </a:r>
           </a:p>
           <a:p>
             <a:r>
-              <a:rPr lang="ru-RU" baseline="0" dirty="0" smtClean="0"/>
+              <a:rPr lang="ru-RU" b="1" baseline="0" dirty="0" smtClean="0"/>
               <a:t>Зачем это надо</a:t>
             </a:r>
-            <a:endParaRPr lang="ru-RU" dirty="0" smtClean="0"/>
+            <a:endParaRPr lang="en-US" b="1" baseline="0" dirty="0" smtClean="0"/>
           </a:p>
         </p:txBody>
       </p:sp>
@@ -2311,26 +2538,12 @@
           <a:lstStyle/>
           <a:p>
             <a:r>
-              <a:rPr lang="ru-RU" i="1" dirty="0" smtClean="0"/>
-              <a:t>(так можно</a:t>
-            </a:r>
-            <a:r>
-              <a:rPr lang="ru-RU" i="1" baseline="0" dirty="0" smtClean="0"/>
-              <a:t> </a:t>
-            </a:r>
-            <a:r>
-              <a:rPr lang="ru-RU" i="1" dirty="0" smtClean="0"/>
-              <a:t>проводить верификацию описанных ранее систем)</a:t>
-            </a:r>
-          </a:p>
-          <a:p>
-            <a:r>
               <a:rPr lang="ru-RU" dirty="0" smtClean="0"/>
               <a:t>Описав таким образом</a:t>
             </a:r>
             <a:r>
               <a:rPr lang="ru-RU" baseline="0" dirty="0" smtClean="0"/>
-              <a:t> архитектуру приложения можно провести верификацию, то есть проверить соответствие между прототипом и требованиями к нему.</a:t>
+              <a:t> архитектуру приложения можно провести её верификацию, то есть проверить соответствие между прототипом и требованиями к нему.</a:t>
             </a:r>
             <a:endParaRPr lang="ru-RU" dirty="0" smtClean="0"/>
           </a:p>
@@ -2357,8 +2570,24 @@
           </a:p>
           <a:p>
             <a:r>
+              <a:rPr lang="en-US" baseline="0" dirty="0" smtClean="0"/>
+              <a:t>{</a:t>
+            </a:r>
+            <a:r>
               <a:rPr lang="ru-RU" baseline="0" dirty="0" smtClean="0"/>
-              <a:t>Верификация программ в общем случае алгоритмически неразрешима (см. Теорема Райса)</a:t>
+              <a:t>Верификация </a:t>
+            </a:r>
+            <a:r>
+              <a:rPr lang="ru-RU" baseline="0" dirty="0" smtClean="0"/>
+              <a:t>программ в общем случае алгоритмически неразрешима (см. Теорема Райса</a:t>
+            </a:r>
+            <a:r>
+              <a:rPr lang="ru-RU" baseline="0" dirty="0" smtClean="0"/>
+              <a:t>)</a:t>
+            </a:r>
+            <a:r>
+              <a:rPr lang="en-US" baseline="0" dirty="0" smtClean="0"/>
+              <a:t>}</a:t>
             </a:r>
             <a:endParaRPr lang="ru-RU" dirty="0"/>
           </a:p>
@@ -2459,20 +2688,133 @@
           </a:p>
           <a:p>
             <a:r>
-              <a:rPr lang="ru-RU" dirty="0" smtClean="0"/>
-              <a:t>На</a:t>
-            </a:r>
-            <a:r>
               <a:rPr lang="ru-RU" baseline="0" dirty="0" smtClean="0"/>
-              <a:t> данном слайде представлена структура системы</a:t>
-            </a:r>
-          </a:p>
-          <a:p>
-            <a:r>
-              <a:rPr lang="ru-RU" baseline="0" dirty="0" smtClean="0"/>
-              <a:t>Предлагается с помощью системы производить проектирование каркаса приложения и получать его представление на некотором автоматном языке. Представление на автоматном языке должно позволять использование верификатора из набора существующих на данный момент верификаторов.</a:t>
-            </a:r>
-            <a:endParaRPr lang="ru-RU" dirty="0"/>
+              <a:t>На основе формальной модели мной была спроектирована структура системы проектирования и тестирования.</a:t>
+            </a:r>
+          </a:p>
+          <a:p>
+            <a:pPr marL="0" marR="0" indent="0" algn="l" defTabSz="914400" rtl="0" eaLnBrk="1" fontAlgn="auto" latinLnBrk="0" hangingPunct="1">
+              <a:lnSpc>
+                <a:spcPct val="100000"/>
+              </a:lnSpc>
+              <a:spcBef>
+                <a:spcPts val="0"/>
+              </a:spcBef>
+              <a:spcAft>
+                <a:spcPts val="0"/>
+              </a:spcAft>
+              <a:buClrTx/>
+              <a:buSzTx/>
+              <a:buFontTx/>
+              <a:buNone/>
+              <a:tabLst/>
+              <a:defRPr/>
+            </a:pPr>
+            <a:r>
+              <a:rPr lang="ru-RU" sz="1200" kern="1200" dirty="0" smtClean="0">
+                <a:solidFill>
+                  <a:schemeClr val="tx1"/>
+                </a:solidFill>
+                <a:effectLst/>
+                <a:latin typeface="+mn-lt"/>
+                <a:ea typeface="+mn-ea"/>
+                <a:cs typeface="+mn-cs"/>
+              </a:rPr>
+              <a:t>Для понимая общей структуры системы можно рассмотреть типичный вариант её использования. Пользователь, в терминах предметной области, согласно интерфейсу программирования, разрабатывает требуемый</a:t>
+            </a:r>
+            <a:r>
+              <a:rPr lang="ru-RU" sz="1200" kern="1200" baseline="0" dirty="0" smtClean="0">
+                <a:solidFill>
+                  <a:schemeClr val="tx1"/>
+                </a:solidFill>
+                <a:effectLst/>
+                <a:latin typeface="+mn-lt"/>
+                <a:ea typeface="+mn-ea"/>
+                <a:cs typeface="+mn-cs"/>
+              </a:rPr>
+              <a:t> </a:t>
+            </a:r>
+            <a:r>
+              <a:rPr lang="ru-RU" sz="1200" kern="1200" dirty="0" smtClean="0">
+                <a:solidFill>
+                  <a:schemeClr val="tx1"/>
+                </a:solidFill>
+                <a:effectLst/>
+                <a:latin typeface="+mn-lt"/>
+                <a:ea typeface="+mn-ea"/>
+                <a:cs typeface="+mn-cs"/>
+              </a:rPr>
+              <a:t>прототип архитектуры на специализированном разработанном языке</a:t>
+            </a:r>
+            <a:r>
+              <a:rPr lang="ru-RU" sz="1200" kern="1200" baseline="0" dirty="0" smtClean="0">
+                <a:solidFill>
+                  <a:schemeClr val="tx1"/>
+                </a:solidFill>
+                <a:effectLst/>
+                <a:latin typeface="+mn-lt"/>
+                <a:ea typeface="+mn-ea"/>
+                <a:cs typeface="+mn-cs"/>
+              </a:rPr>
+              <a:t> описания моделей прототипов</a:t>
+            </a:r>
+            <a:r>
+              <a:rPr lang="ru-RU" sz="1200" kern="1200" dirty="0" smtClean="0">
+                <a:solidFill>
+                  <a:schemeClr val="tx1"/>
+                </a:solidFill>
+                <a:effectLst/>
+                <a:latin typeface="+mn-lt"/>
+                <a:ea typeface="+mn-ea"/>
+                <a:cs typeface="+mn-cs"/>
+              </a:rPr>
+              <a:t>. Система</a:t>
+            </a:r>
+            <a:r>
+              <a:rPr lang="ru-RU" sz="1200" kern="1200" baseline="0" dirty="0" smtClean="0">
+                <a:solidFill>
+                  <a:schemeClr val="tx1"/>
+                </a:solidFill>
+                <a:effectLst/>
+                <a:latin typeface="+mn-lt"/>
+                <a:ea typeface="+mn-ea"/>
+                <a:cs typeface="+mn-cs"/>
+              </a:rPr>
+              <a:t> транслирует полученный прототип архитектуры на выбранный целевой язык автоматного программирования. Полученная модель на целевом языке автоматного программирования является пригодной для верификации существующим верификатором. При помощи верификатора можно получить анализатор модели прототипа и получить результат верификации – узнать что ошибок нет или посмотреть путь, который </a:t>
+            </a:r>
+            <a:r>
+              <a:rPr lang="ru-RU" sz="1200" kern="1200" baseline="0" dirty="0" err="1" smtClean="0">
+                <a:solidFill>
+                  <a:schemeClr val="tx1"/>
+                </a:solidFill>
+                <a:effectLst/>
+                <a:latin typeface="+mn-lt"/>
+                <a:ea typeface="+mn-ea"/>
+                <a:cs typeface="+mn-cs"/>
+              </a:rPr>
+              <a:t>привел</a:t>
+            </a:r>
+            <a:r>
+              <a:rPr lang="ru-RU" sz="1200" kern="1200" baseline="0" dirty="0" smtClean="0">
+                <a:solidFill>
+                  <a:schemeClr val="tx1"/>
+                </a:solidFill>
+                <a:effectLst/>
+                <a:latin typeface="+mn-lt"/>
+                <a:ea typeface="+mn-ea"/>
+                <a:cs typeface="+mn-cs"/>
+              </a:rPr>
+              <a:t> к ошибке (контрпример)</a:t>
+            </a:r>
+            <a:endParaRPr lang="ru-RU" sz="1200" kern="1200" dirty="0" smtClean="0">
+              <a:solidFill>
+                <a:schemeClr val="tx1"/>
+              </a:solidFill>
+              <a:effectLst/>
+              <a:latin typeface="+mn-lt"/>
+              <a:ea typeface="+mn-ea"/>
+              <a:cs typeface="+mn-cs"/>
+            </a:endParaRPr>
           </a:p>
         </p:txBody>
       </p:sp>
@@ -2625,6 +2967,7 @@
               <a:rPr lang="ru-RU" sz="1200" dirty="0" smtClean="0"/>
               <a:t>систем.</a:t>
             </a:r>
+            <a:endParaRPr lang="ru-RU" baseline="0" dirty="0" smtClean="0"/>
           </a:p>
           <a:p>
             <a:pPr marL="0" marR="0" indent="0" algn="l" defTabSz="914400" rtl="0" eaLnBrk="1" fontAlgn="auto" latinLnBrk="0" hangingPunct="1">
@@ -2644,7 +2987,50 @@
               <a:tabLst/>
               <a:defRPr/>
             </a:pPr>
-            <a:endParaRPr lang="ru-RU" baseline="0" dirty="0" smtClean="0"/>
+            <a:r>
+              <a:rPr lang="en-US" baseline="0" dirty="0" smtClean="0"/>
+              <a:t>{</a:t>
+            </a:r>
+            <a:r>
+              <a:rPr lang="ru-RU" baseline="0" dirty="0" smtClean="0"/>
+              <a:t>Контрпример </a:t>
+            </a:r>
+            <a:r>
+              <a:rPr lang="ru-RU" baseline="0" dirty="0" smtClean="0"/>
+              <a:t>– </a:t>
+            </a:r>
+            <a:r>
+              <a:rPr lang="ru-RU" baseline="0" dirty="0" err="1" smtClean="0"/>
+              <a:t>трассса</a:t>
+            </a:r>
+            <a:r>
+              <a:rPr lang="ru-RU" baseline="0" dirty="0" smtClean="0"/>
+              <a:t>, содержащая </a:t>
+            </a:r>
+            <a:r>
+              <a:rPr lang="ru-RU" baseline="0" dirty="0" smtClean="0"/>
+              <a:t>ошибку. </a:t>
+            </a:r>
+            <a:r>
+              <a:rPr lang="ru-RU" dirty="0" smtClean="0"/>
+              <a:t>Примеры </a:t>
+            </a:r>
+            <a:r>
+              <a:rPr lang="ru-RU" dirty="0" smtClean="0"/>
+              <a:t>использования: верификация системы управления дамбами в Нидерландах,</a:t>
+            </a:r>
+            <a:r>
+              <a:rPr lang="ru-RU" baseline="0" dirty="0" smtClean="0"/>
+              <a:t> верификация аэрокосмических </a:t>
+            </a:r>
+            <a:r>
+              <a:rPr lang="ru-RU" baseline="0" dirty="0" smtClean="0"/>
+              <a:t>систем</a:t>
+            </a:r>
+            <a:r>
+              <a:rPr lang="en-US" baseline="0" dirty="0" smtClean="0"/>
+              <a:t>}</a:t>
+            </a:r>
           </a:p>
           <a:p>
             <a:pPr marL="0" marR="0" indent="0" algn="l" defTabSz="914400" rtl="0" eaLnBrk="1" fontAlgn="auto" latinLnBrk="0" hangingPunct="1">
@@ -2665,75 +3051,6 @@
               <a:defRPr/>
             </a:pPr>
             <a:r>
-              <a:rPr lang="en-US" baseline="0" dirty="0" smtClean="0"/>
-              <a:t>{ 	</a:t>
-            </a:r>
-            <a:r>
-              <a:rPr lang="ru-RU" baseline="0" dirty="0" smtClean="0"/>
-              <a:t>Контрпример </a:t>
-            </a:r>
-            <a:r>
-              <a:rPr lang="ru-RU" baseline="0" dirty="0" smtClean="0"/>
-              <a:t>– </a:t>
-            </a:r>
-            <a:r>
-              <a:rPr lang="ru-RU" baseline="0" dirty="0" err="1" smtClean="0"/>
-              <a:t>трассса</a:t>
-            </a:r>
-            <a:r>
-              <a:rPr lang="ru-RU" baseline="0" dirty="0" smtClean="0"/>
-              <a:t>, содержащая ошибку</a:t>
-            </a:r>
-            <a:endParaRPr lang="ru-RU" dirty="0" smtClean="0"/>
-          </a:p>
-          <a:p>
-            <a:r>
-              <a:rPr lang="en-US" dirty="0" smtClean="0"/>
-              <a:t>	</a:t>
-            </a:r>
-            <a:r>
-              <a:rPr lang="ru-RU" dirty="0" smtClean="0"/>
-              <a:t>Примеры </a:t>
-            </a:r>
-            <a:r>
-              <a:rPr lang="ru-RU" dirty="0" smtClean="0"/>
-              <a:t>использования: верификация системы управления дамбами в Нидерландах,</a:t>
-            </a:r>
-            <a:r>
-              <a:rPr lang="ru-RU" baseline="0" dirty="0" smtClean="0"/>
-              <a:t> верификация аэрокосмических </a:t>
-            </a:r>
-            <a:r>
-              <a:rPr lang="ru-RU" baseline="0" dirty="0" smtClean="0"/>
-              <a:t>систем</a:t>
-            </a:r>
-            <a:endParaRPr lang="en-US" baseline="0" dirty="0" smtClean="0"/>
-          </a:p>
-          <a:p>
-            <a:r>
-              <a:rPr lang="en-US" baseline="0" dirty="0" smtClean="0"/>
-              <a:t>}</a:t>
-            </a:r>
-          </a:p>
-          <a:p>
-            <a:pPr marL="0" marR="0" indent="0" algn="l" defTabSz="914400" rtl="0" eaLnBrk="1" fontAlgn="auto" latinLnBrk="0" hangingPunct="1">
-              <a:lnSpc>
-                <a:spcPct val="100000"/>
-              </a:lnSpc>
-              <a:spcBef>
-                <a:spcPts val="0"/>
-              </a:spcBef>
-              <a:spcAft>
-                <a:spcPts val="0"/>
-              </a:spcAft>
-              <a:buClrTx/>
-              <a:buSzTx/>
-              <a:buFontTx/>
-              <a:buNone/>
-              <a:tabLst/>
-              <a:defRPr/>
-            </a:pPr>
-            <a:r>
               <a:rPr lang="ru-RU" sz="1200" dirty="0" smtClean="0"/>
               <a:t>В основе верификации лежит метод </a:t>
             </a:r>
@@ -2793,24 +3110,29 @@
             <a:endParaRPr lang="en-US" baseline="0" dirty="0" smtClean="0"/>
           </a:p>
           <a:p>
-            <a:pPr marL="228600" indent="-228600">
-              <a:buAutoNum type="arabicPeriod"/>
+            <a:pPr marL="0" indent="0">
+              <a:buNone/>
             </a:pPr>
-            <a:endParaRPr lang="en-US" baseline="0" dirty="0" smtClean="0"/>
-          </a:p>
-          <a:p>
+            <a:r>
+              <a:rPr lang="en-US" baseline="0" dirty="0" smtClean="0"/>
+              <a:t>{</a:t>
+            </a:r>
             <a:r>
               <a:rPr lang="ru-RU" sz="1200" dirty="0" smtClean="0"/>
               <a:t>Проверка свойства на конечной модели программы</a:t>
             </a:r>
-            <a:endParaRPr lang="en-US" sz="1200" dirty="0" smtClean="0"/>
-          </a:p>
-          <a:p>
+            <a:r>
+              <a:rPr lang="en-US" sz="1200" dirty="0" smtClean="0"/>
+              <a:t>/</a:t>
+            </a:r>
             <a:r>
               <a:rPr lang="ru-RU" sz="1200" dirty="0" smtClean="0"/>
               <a:t>Исчерпывающий поиск по пространству состояний</a:t>
             </a:r>
-            <a:endParaRPr lang="en-US" sz="1200" dirty="0" smtClean="0"/>
+            <a:r>
+              <a:rPr lang="en-US" sz="1200" dirty="0" smtClean="0"/>
+              <a:t>}</a:t>
+            </a:r>
           </a:p>
         </p:txBody>
       </p:sp>
@@ -2894,261 +3216,132 @@
           <a:bodyPr/>
           <a:lstStyle/>
           <a:p>
-            <a:pPr marL="0" marR="0" indent="0" algn="l" defTabSz="914400" rtl="0" eaLnBrk="1" fontAlgn="auto" latinLnBrk="0" hangingPunct="1">
-              <a:lnSpc>
-                <a:spcPct val="100000"/>
-              </a:lnSpc>
-              <a:spcBef>
-                <a:spcPts val="0"/>
-              </a:spcBef>
-              <a:spcAft>
-                <a:spcPts val="0"/>
-              </a:spcAft>
-              <a:buClrTx/>
-              <a:buSzTx/>
-              <a:buFontTx/>
-              <a:buNone/>
-              <a:tabLst/>
-              <a:defRPr/>
+            <a:pPr marL="171450" indent="-171450">
+              <a:buFont typeface="Arial" pitchFamily="34" charset="0"/>
+              <a:buChar char="•"/>
             </a:pPr>
             <a:r>
+              <a:rPr lang="ru-RU" dirty="0" smtClean="0"/>
+              <a:t>На</a:t>
+            </a:r>
+            <a:r>
+              <a:rPr lang="ru-RU" baseline="0" dirty="0" smtClean="0"/>
+              <a:t> языке можем описывать недетерминизм. То есть его удобно использовать для абстракции от несущественных деталей. Охраняемые команды означают реализацию недетерминизма. Это значит что с каждой командой языка связано понятие выполнимости и если в </a:t>
+            </a:r>
+            <a:r>
+              <a:rPr lang="ru-RU" baseline="0" dirty="0" err="1" smtClean="0"/>
+              <a:t>определенном</a:t>
+            </a:r>
+            <a:r>
+              <a:rPr lang="ru-RU" baseline="0" dirty="0" smtClean="0"/>
+              <a:t> блоке модели присутствует несколько команд, выполнимых одновременно, то может быть выполнена любая из них.</a:t>
+            </a:r>
+          </a:p>
+          <a:p>
+            <a:pPr marL="171450" indent="-171450">
+              <a:buFont typeface="Arial" pitchFamily="34" charset="0"/>
+              <a:buChar char="•"/>
+            </a:pPr>
+            <a:r>
+              <a:rPr lang="ru-RU" baseline="0" dirty="0" smtClean="0"/>
+              <a:t>Поскольку способ верификации </a:t>
+            </a:r>
+            <a:r>
+              <a:rPr lang="en-US" baseline="0" dirty="0" smtClean="0"/>
+              <a:t>model checking </a:t>
+            </a:r>
+            <a:r>
+              <a:rPr lang="ru-RU" baseline="0" dirty="0" smtClean="0"/>
+              <a:t>сказанное означает, что у любой модели описанной с помощью языка </a:t>
+            </a:r>
+            <a:r>
+              <a:rPr lang="en-US" baseline="0" dirty="0" smtClean="0"/>
+              <a:t>Promela</a:t>
+            </a:r>
+            <a:r>
+              <a:rPr lang="ru-RU" baseline="0" dirty="0" smtClean="0"/>
+              <a:t> конечное число состояний. За </a:t>
+            </a:r>
+            <a:r>
+              <a:rPr lang="ru-RU" baseline="0" dirty="0" err="1" smtClean="0"/>
+              <a:t>счет</a:t>
+            </a:r>
+            <a:r>
+              <a:rPr lang="ru-RU" baseline="0" dirty="0" smtClean="0"/>
+              <a:t> чего это достигается мы увидим дальше.</a:t>
+            </a:r>
+            <a:endParaRPr lang="ru-RU" dirty="0" smtClean="0"/>
+          </a:p>
+          <a:p>
+            <a:pPr marL="171450" indent="-171450">
+              <a:buFont typeface="Arial" pitchFamily="34" charset="0"/>
+              <a:buChar char="•"/>
+            </a:pPr>
+            <a:endParaRPr lang="ru-RU" dirty="0" smtClean="0"/>
+          </a:p>
+          <a:p>
+            <a:r>
+              <a:rPr lang="ru-RU" dirty="0" smtClean="0"/>
+              <a:t>Модель на языке </a:t>
+            </a:r>
+            <a:r>
+              <a:rPr lang="en-US" dirty="0" smtClean="0"/>
+              <a:t>Promela</a:t>
+            </a:r>
+            <a:r>
+              <a:rPr lang="ru-RU" dirty="0" smtClean="0"/>
+              <a:t>: </a:t>
+            </a:r>
+            <a:r>
               <a:rPr lang="ru-RU" sz="1200" dirty="0" smtClean="0"/>
-              <a:t>В качестве базового верификатора</a:t>
-            </a:r>
-            <a:r>
-              <a:rPr lang="ru-RU" sz="1200" baseline="0" dirty="0" smtClean="0"/>
-              <a:t> будем рассматривать верификатор </a:t>
-            </a:r>
-            <a:r>
-              <a:rPr lang="en-US" sz="1200" baseline="0" dirty="0" smtClean="0"/>
-              <a:t>SPIN.</a:t>
-            </a:r>
-            <a:endParaRPr lang="ru-RU" sz="1200" dirty="0" smtClean="0"/>
-          </a:p>
-          <a:p>
-            <a:pPr marL="0" marR="0" indent="0" algn="l" defTabSz="914400" rtl="0" eaLnBrk="1" fontAlgn="auto" latinLnBrk="0" hangingPunct="1">
-              <a:lnSpc>
-                <a:spcPct val="100000"/>
-              </a:lnSpc>
-              <a:spcBef>
-                <a:spcPts val="0"/>
-              </a:spcBef>
-              <a:spcAft>
-                <a:spcPts val="0"/>
-              </a:spcAft>
-              <a:buClrTx/>
-              <a:buSzTx/>
-              <a:buFontTx/>
-              <a:buNone/>
-              <a:tabLst/>
-              <a:defRPr/>
+              <a:t>абстракция реальной системы, содержащая характеристики, которые значимы для описания взаимодействия процессов</a:t>
+            </a:r>
+          </a:p>
+          <a:p>
+            <a:r>
+              <a:rPr lang="ru-RU" sz="1200" dirty="0" smtClean="0"/>
+              <a:t>не является программной реализацией системы</a:t>
+            </a:r>
+          </a:p>
+          <a:p>
+            <a:r>
+              <a:rPr lang="ru-RU" sz="1200" dirty="0" smtClean="0"/>
+              <a:t>может содержать части, которые важны только для верификации протоколов</a:t>
+            </a:r>
+            <a:endParaRPr lang="en-US" sz="1200" dirty="0" smtClean="0"/>
+          </a:p>
+          <a:p>
+            <a:r>
+              <a:rPr lang="ru-RU" dirty="0" smtClean="0"/>
+              <a:t>Promela включает примитивы для создания процессов и описания </a:t>
+            </a:r>
+            <a:r>
+              <a:rPr lang="ru-RU" dirty="0" err="1" smtClean="0"/>
+              <a:t>межпроцессного</a:t>
+            </a:r>
+            <a:r>
+              <a:rPr lang="ru-RU" dirty="0" smtClean="0"/>
+              <a:t> взаимодействия</a:t>
+            </a:r>
+          </a:p>
+          <a:p>
+            <a:r>
+              <a:rPr lang="ru-RU" dirty="0" smtClean="0"/>
+              <a:t> НО! в нем отсутствует ряд средств, которые есть в языках программирования высокого уровня </a:t>
+            </a:r>
+          </a:p>
+          <a:p>
+            <a:r>
+              <a:rPr lang="ru-RU" dirty="0" smtClean="0"/>
+              <a:t> Например, указатели на данные и функции, не включено понятие времени или часов, отсутствуют операции с плавающей точкой и пр.</a:t>
+            </a:r>
+          </a:p>
+          <a:p>
+            <a:pPr marL="171450" indent="-171450">
+              <a:buFont typeface="Arial" pitchFamily="34" charset="0"/>
+              <a:buChar char="•"/>
             </a:pPr>
-            <a:r>
-              <a:rPr lang="ru-RU" sz="1200" dirty="0" smtClean="0"/>
-              <a:t>Данный</a:t>
-            </a:r>
-            <a:r>
-              <a:rPr lang="ru-RU" sz="1200" baseline="0" dirty="0" smtClean="0"/>
-              <a:t> верификатор представляет собой </a:t>
-            </a:r>
-            <a:r>
-              <a:rPr lang="ru-RU" sz="1200" dirty="0" smtClean="0"/>
-              <a:t>средство </a:t>
-            </a:r>
-            <a:r>
-              <a:rPr lang="ru-RU" sz="1200" dirty="0" smtClean="0"/>
-              <a:t>моделирования и верификации протоколов, параллельных программ и широкого класса дискретных </a:t>
-            </a:r>
-            <a:r>
-              <a:rPr lang="ru-RU" sz="1200" dirty="0" smtClean="0"/>
-              <a:t>систем.</a:t>
-            </a:r>
-          </a:p>
-          <a:p>
-            <a:pPr marL="0" marR="0" indent="0" algn="l" defTabSz="914400" rtl="0" eaLnBrk="1" fontAlgn="auto" latinLnBrk="0" hangingPunct="1">
-              <a:lnSpc>
-                <a:spcPct val="100000"/>
-              </a:lnSpc>
-              <a:spcBef>
-                <a:spcPts val="0"/>
-              </a:spcBef>
-              <a:spcAft>
-                <a:spcPts val="0"/>
-              </a:spcAft>
-              <a:buClrTx/>
-              <a:buSzTx/>
-              <a:buFontTx/>
-              <a:buNone/>
-              <a:tabLst/>
-              <a:defRPr/>
-            </a:pPr>
-            <a:endParaRPr lang="ru-RU" baseline="0" dirty="0" smtClean="0"/>
-          </a:p>
-          <a:p>
-            <a:pPr marL="0" marR="0" indent="0" algn="l" defTabSz="914400" rtl="0" eaLnBrk="1" fontAlgn="auto" latinLnBrk="0" hangingPunct="1">
-              <a:lnSpc>
-                <a:spcPct val="100000"/>
-              </a:lnSpc>
-              <a:spcBef>
-                <a:spcPts val="0"/>
-              </a:spcBef>
-              <a:spcAft>
-                <a:spcPts val="0"/>
-              </a:spcAft>
-              <a:buClrTx/>
-              <a:buSzTx/>
-              <a:buFontTx/>
-              <a:buNone/>
-              <a:tabLst/>
-              <a:defRPr/>
-            </a:pPr>
-            <a:r>
-              <a:rPr lang="en-US" baseline="0" dirty="0" smtClean="0"/>
-              <a:t>{ 	</a:t>
-            </a:r>
-            <a:r>
-              <a:rPr lang="ru-RU" baseline="0" dirty="0" smtClean="0"/>
-              <a:t>Контрпример </a:t>
-            </a:r>
-            <a:r>
-              <a:rPr lang="ru-RU" baseline="0" dirty="0" smtClean="0"/>
-              <a:t>– </a:t>
-            </a:r>
-            <a:r>
-              <a:rPr lang="ru-RU" baseline="0" dirty="0" err="1" smtClean="0"/>
-              <a:t>трассса</a:t>
-            </a:r>
-            <a:r>
-              <a:rPr lang="ru-RU" baseline="0" dirty="0" smtClean="0"/>
-              <a:t>, содержащая ошибку</a:t>
-            </a:r>
-            <a:endParaRPr lang="ru-RU" dirty="0" smtClean="0"/>
-          </a:p>
-          <a:p>
-            <a:r>
-              <a:rPr lang="en-US" dirty="0" smtClean="0"/>
-              <a:t>	</a:t>
-            </a:r>
-            <a:r>
-              <a:rPr lang="ru-RU" dirty="0" smtClean="0"/>
-              <a:t>Примеры </a:t>
-            </a:r>
-            <a:r>
-              <a:rPr lang="ru-RU" dirty="0" smtClean="0"/>
-              <a:t>использования: верификация системы управления дамбами в Нидерландах,</a:t>
-            </a:r>
-            <a:r>
-              <a:rPr lang="ru-RU" baseline="0" dirty="0" smtClean="0"/>
-              <a:t> верификация аэрокосмических </a:t>
-            </a:r>
-            <a:r>
-              <a:rPr lang="ru-RU" baseline="0" dirty="0" smtClean="0"/>
-              <a:t>систем</a:t>
-            </a:r>
-            <a:endParaRPr lang="en-US" baseline="0" dirty="0" smtClean="0"/>
-          </a:p>
-          <a:p>
-            <a:r>
-              <a:rPr lang="en-US" baseline="0" dirty="0" smtClean="0"/>
-              <a:t>}</a:t>
-            </a:r>
-          </a:p>
-          <a:p>
-            <a:pPr marL="0" marR="0" indent="0" algn="l" defTabSz="914400" rtl="0" eaLnBrk="1" fontAlgn="auto" latinLnBrk="0" hangingPunct="1">
-              <a:lnSpc>
-                <a:spcPct val="100000"/>
-              </a:lnSpc>
-              <a:spcBef>
-                <a:spcPts val="0"/>
-              </a:spcBef>
-              <a:spcAft>
-                <a:spcPts val="0"/>
-              </a:spcAft>
-              <a:buClrTx/>
-              <a:buSzTx/>
-              <a:buFontTx/>
-              <a:buNone/>
-              <a:tabLst/>
-              <a:defRPr/>
-            </a:pPr>
-            <a:r>
-              <a:rPr lang="ru-RU" sz="1200" dirty="0" smtClean="0"/>
-              <a:t>В основе верификации лежит метод </a:t>
-            </a:r>
-            <a:r>
-              <a:rPr lang="en-US" sz="1200" dirty="0" smtClean="0"/>
-              <a:t>Model Checking: </a:t>
-            </a:r>
-            <a:r>
-              <a:rPr lang="ru-RU" sz="1200" dirty="0" smtClean="0"/>
-              <a:t>Метод автоматической формальной верификации систем с конечным числом состояний</a:t>
-            </a:r>
-            <a:endParaRPr lang="en-US" dirty="0" smtClean="0"/>
-          </a:p>
-          <a:p>
-            <a:pPr marL="228600" indent="-228600">
-              <a:buAutoNum type="arabicPeriod"/>
-            </a:pPr>
-            <a:r>
-              <a:rPr lang="ru-RU" dirty="0" err="1" smtClean="0"/>
-              <a:t>Задаем</a:t>
-            </a:r>
-            <a:r>
-              <a:rPr lang="ru-RU" baseline="0" dirty="0" smtClean="0"/>
-              <a:t> как система устроена и как она должна быть устроена</a:t>
-            </a:r>
-          </a:p>
-          <a:p>
-            <a:pPr marL="228600" indent="-228600">
-              <a:buAutoNum type="arabicPeriod"/>
-            </a:pPr>
-            <a:r>
-              <a:rPr lang="ru-RU" baseline="0" dirty="0" err="1" smtClean="0"/>
-              <a:t>Т.о</a:t>
-            </a:r>
-            <a:r>
-              <a:rPr lang="ru-RU" baseline="0" dirty="0" smtClean="0"/>
-              <a:t>. Две нотации: описание поведения(устройство системы), описание требований (свойства правильности)</a:t>
-            </a:r>
-          </a:p>
-          <a:p>
-            <a:pPr marL="228600" indent="-228600">
-              <a:buAutoNum type="arabicPeriod"/>
-            </a:pPr>
-            <a:r>
-              <a:rPr lang="ru-RU" baseline="0" dirty="0" smtClean="0"/>
-              <a:t>Программа-верификатор проверяет, что устройство системы удовлетворяет свойствам правильности</a:t>
-            </a:r>
-          </a:p>
-          <a:p>
-            <a:pPr marL="228600" indent="-228600">
-              <a:buAutoNum type="arabicPeriod"/>
-            </a:pPr>
-            <a:r>
-              <a:rPr lang="ru-RU" baseline="0" dirty="0" smtClean="0"/>
-              <a:t>Выбранная нотация гарантирует разрешимость проверки любого свойства любой модели</a:t>
-            </a:r>
-            <a:endParaRPr lang="en-US" baseline="0" dirty="0" smtClean="0"/>
-          </a:p>
-          <a:p>
-            <a:pPr marL="228600" indent="-228600">
-              <a:buAutoNum type="arabicPeriod"/>
-            </a:pPr>
-            <a:endParaRPr lang="en-US" baseline="0" dirty="0" smtClean="0"/>
-          </a:p>
-          <a:p>
-            <a:r>
-              <a:rPr lang="ru-RU" sz="1200" dirty="0" smtClean="0"/>
-              <a:t>Проверка свойства на конечной модели программы</a:t>
-            </a:r>
-            <a:endParaRPr lang="en-US" sz="1200" dirty="0" smtClean="0"/>
-          </a:p>
-          <a:p>
-            <a:r>
-              <a:rPr lang="ru-RU" sz="1200" dirty="0" smtClean="0"/>
-              <a:t>Исчерпывающий поиск по пространству состояний</a:t>
-            </a:r>
-            <a:endParaRPr lang="en-US" sz="1200" dirty="0" smtClean="0"/>
+            <a:endParaRPr lang="ru-RU" dirty="0"/>
           </a:p>
         </p:txBody>
       </p:sp>
@@ -3178,7 +3371,7 @@
     </p:spTree>
     <p:extLst>
       <p:ext uri="{BB962C8B-B14F-4D97-AF65-F5344CB8AC3E}">
-        <p14:creationId xmlns:p14="http://schemas.microsoft.com/office/powerpoint/2010/main" val="3875426799"/>
+        <p14:creationId xmlns:p14="http://schemas.microsoft.com/office/powerpoint/2010/main" val="3247691620"/>
       </p:ext>
     </p:extLst>
   </p:cSld>
@@ -3232,261 +3425,15 @@
           <a:bodyPr/>
           <a:lstStyle/>
           <a:p>
-            <a:pPr marL="0" marR="0" indent="0" algn="l" defTabSz="914400" rtl="0" eaLnBrk="1" fontAlgn="auto" latinLnBrk="0" hangingPunct="1">
-              <a:lnSpc>
-                <a:spcPct val="100000"/>
-              </a:lnSpc>
-              <a:spcBef>
-                <a:spcPts val="0"/>
-              </a:spcBef>
-              <a:spcAft>
-                <a:spcPts val="0"/>
-              </a:spcAft>
-              <a:buClrTx/>
-              <a:buSzTx/>
-              <a:buFontTx/>
-              <a:buNone/>
-              <a:tabLst/>
-              <a:defRPr/>
-            </a:pPr>
-            <a:r>
-              <a:rPr lang="ru-RU" sz="1200" dirty="0" smtClean="0"/>
-              <a:t>В качестве базового верификатора</a:t>
-            </a:r>
-            <a:r>
-              <a:rPr lang="ru-RU" sz="1200" baseline="0" dirty="0" smtClean="0"/>
-              <a:t> будем рассматривать верификатор </a:t>
-            </a:r>
-            <a:r>
-              <a:rPr lang="en-US" sz="1200" baseline="0" dirty="0" smtClean="0"/>
-              <a:t>SPIN.</a:t>
-            </a:r>
-            <a:endParaRPr lang="ru-RU" sz="1200" dirty="0" smtClean="0"/>
-          </a:p>
-          <a:p>
-            <a:pPr marL="0" marR="0" indent="0" algn="l" defTabSz="914400" rtl="0" eaLnBrk="1" fontAlgn="auto" latinLnBrk="0" hangingPunct="1">
-              <a:lnSpc>
-                <a:spcPct val="100000"/>
-              </a:lnSpc>
-              <a:spcBef>
-                <a:spcPts val="0"/>
-              </a:spcBef>
-              <a:spcAft>
-                <a:spcPts val="0"/>
-              </a:spcAft>
-              <a:buClrTx/>
-              <a:buSzTx/>
-              <a:buFontTx/>
-              <a:buNone/>
-              <a:tabLst/>
-              <a:defRPr/>
-            </a:pPr>
-            <a:r>
-              <a:rPr lang="ru-RU" sz="1200" dirty="0" smtClean="0"/>
-              <a:t>Данный</a:t>
-            </a:r>
-            <a:r>
-              <a:rPr lang="ru-RU" sz="1200" baseline="0" dirty="0" smtClean="0"/>
-              <a:t> верификатор представляет собой </a:t>
-            </a:r>
-            <a:r>
-              <a:rPr lang="ru-RU" sz="1200" dirty="0" smtClean="0"/>
-              <a:t>средство </a:t>
-            </a:r>
-            <a:r>
-              <a:rPr lang="ru-RU" sz="1200" dirty="0" smtClean="0"/>
-              <a:t>моделирования и верификации протоколов, параллельных программ и широкого класса дискретных </a:t>
-            </a:r>
-            <a:r>
-              <a:rPr lang="ru-RU" sz="1200" dirty="0" smtClean="0"/>
-              <a:t>систем.</a:t>
-            </a:r>
-          </a:p>
-          <a:p>
-            <a:pPr marL="0" marR="0" indent="0" algn="l" defTabSz="914400" rtl="0" eaLnBrk="1" fontAlgn="auto" latinLnBrk="0" hangingPunct="1">
-              <a:lnSpc>
-                <a:spcPct val="100000"/>
-              </a:lnSpc>
-              <a:spcBef>
-                <a:spcPts val="0"/>
-              </a:spcBef>
-              <a:spcAft>
-                <a:spcPts val="0"/>
-              </a:spcAft>
-              <a:buClrTx/>
-              <a:buSzTx/>
-              <a:buFontTx/>
-              <a:buNone/>
-              <a:tabLst/>
-              <a:defRPr/>
-            </a:pPr>
-            <a:endParaRPr lang="ru-RU" baseline="0" dirty="0" smtClean="0"/>
-          </a:p>
-          <a:p>
-            <a:pPr marL="0" marR="0" indent="0" algn="l" defTabSz="914400" rtl="0" eaLnBrk="1" fontAlgn="auto" latinLnBrk="0" hangingPunct="1">
-              <a:lnSpc>
-                <a:spcPct val="100000"/>
-              </a:lnSpc>
-              <a:spcBef>
-                <a:spcPts val="0"/>
-              </a:spcBef>
-              <a:spcAft>
-                <a:spcPts val="0"/>
-              </a:spcAft>
-              <a:buClrTx/>
-              <a:buSzTx/>
-              <a:buFontTx/>
-              <a:buNone/>
-              <a:tabLst/>
-              <a:defRPr/>
-            </a:pPr>
-            <a:r>
-              <a:rPr lang="en-US" baseline="0" dirty="0" smtClean="0"/>
-              <a:t>{ 	</a:t>
+            <a:r>
+              <a:rPr lang="ru-RU" dirty="0" smtClean="0"/>
+              <a:t>ПРОБЛЕМА: Полнота спецификации – охватывают</a:t>
             </a:r>
             <a:r>
               <a:rPr lang="ru-RU" baseline="0" dirty="0" smtClean="0"/>
-              <a:t>Контрпример </a:t>
-            </a:r>
-            <a:r>
-              <a:rPr lang="ru-RU" baseline="0" dirty="0" smtClean="0"/>
-              <a:t>– </a:t>
-            </a:r>
-            <a:r>
-              <a:rPr lang="ru-RU" baseline="0" dirty="0" err="1" smtClean="0"/>
-              <a:t>трассса</a:t>
-            </a:r>
-            <a:r>
-              <a:rPr lang="ru-RU" baseline="0" dirty="0" smtClean="0"/>
-              <a:t>, содержащая ошибку</a:t>
-            </a:r>
-            <a:endParaRPr lang="ru-RU" dirty="0" smtClean="0"/>
-          </a:p>
-          <a:p>
-            <a:r>
-              <a:rPr lang="en-US" dirty="0" smtClean="0"/>
-              <a:t>	</a:t>
-            </a:r>
-            <a:r>
-              <a:rPr lang="ru-RU" dirty="0" smtClean="0"/>
-              <a:t>Примеры </a:t>
-            </a:r>
-            <a:r>
-              <a:rPr lang="ru-RU" dirty="0" smtClean="0"/>
-              <a:t>использования: верификация системы управления дамбами в Нидерландах,</a:t>
-            </a:r>
-            <a:r>
-              <a:rPr lang="ru-RU" baseline="0" dirty="0" smtClean="0"/>
-              <a:t> верификация аэрокосмических </a:t>
-            </a:r>
-            <a:r>
-              <a:rPr lang="ru-RU" baseline="0" dirty="0" smtClean="0"/>
-              <a:t>систем</a:t>
-            </a:r>
-            <a:endParaRPr lang="en-US" baseline="0" dirty="0" smtClean="0"/>
-          </a:p>
-          <a:p>
-            <a:r>
-              <a:rPr lang="en-US" baseline="0" dirty="0" smtClean="0"/>
-              <a:t>}</a:t>
-            </a:r>
-          </a:p>
-          <a:p>
-            <a:pPr marL="0" marR="0" indent="0" algn="l" defTabSz="914400" rtl="0" eaLnBrk="1" fontAlgn="auto" latinLnBrk="0" hangingPunct="1">
-              <a:lnSpc>
-                <a:spcPct val="100000"/>
-              </a:lnSpc>
-              <a:spcBef>
-                <a:spcPts val="0"/>
-              </a:spcBef>
-              <a:spcAft>
-                <a:spcPts val="0"/>
-              </a:spcAft>
-              <a:buClrTx/>
-              <a:buSzTx/>
-              <a:buFontTx/>
-              <a:buNone/>
-              <a:tabLst/>
-              <a:defRPr/>
-            </a:pPr>
-            <a:r>
-              <a:rPr lang="ru-RU" sz="1200" dirty="0" smtClean="0"/>
-              <a:t>В основе верификации лежит метод </a:t>
-            </a:r>
-            <a:r>
-              <a:rPr lang="en-US" sz="1200" dirty="0" smtClean="0"/>
-              <a:t>Model Checking: </a:t>
-            </a:r>
-            <a:r>
-              <a:rPr lang="ru-RU" sz="1200" dirty="0" smtClean="0"/>
-              <a:t>Метод автоматической формальной верификации систем с конечным числом состояний</a:t>
-            </a:r>
-            <a:endParaRPr lang="en-US" dirty="0" smtClean="0"/>
-          </a:p>
-          <a:p>
-            <a:pPr marL="228600" indent="-228600">
-              <a:buAutoNum type="arabicPeriod"/>
-            </a:pPr>
-            <a:r>
-              <a:rPr lang="ru-RU" dirty="0" err="1" smtClean="0"/>
-              <a:t>Задаем</a:t>
-            </a:r>
-            <a:r>
-              <a:rPr lang="ru-RU" baseline="0" dirty="0" smtClean="0"/>
-              <a:t> как система устроена и как она должна быть устроена</a:t>
-            </a:r>
-          </a:p>
-          <a:p>
-            <a:pPr marL="228600" indent="-228600">
-              <a:buAutoNum type="arabicPeriod"/>
-            </a:pPr>
-            <a:r>
-              <a:rPr lang="ru-RU" baseline="0" dirty="0" err="1" smtClean="0"/>
-              <a:t>Т.о</a:t>
-            </a:r>
-            <a:r>
-              <a:rPr lang="ru-RU" baseline="0" dirty="0" smtClean="0"/>
-              <a:t>. Две нотации: описание поведения(устройство системы), описание требований (свойства правильности)</a:t>
-            </a:r>
-          </a:p>
-          <a:p>
-            <a:pPr marL="228600" indent="-228600">
-              <a:buAutoNum type="arabicPeriod"/>
-            </a:pPr>
-            <a:r>
-              <a:rPr lang="ru-RU" baseline="0" dirty="0" smtClean="0"/>
-              <a:t>Программа-верификатор проверяет, что устройство системы удовлетворяет свойствам правильности</a:t>
-            </a:r>
-          </a:p>
-          <a:p>
-            <a:pPr marL="228600" indent="-228600">
-              <a:buAutoNum type="arabicPeriod"/>
-            </a:pPr>
-            <a:r>
-              <a:rPr lang="ru-RU" baseline="0" dirty="0" smtClean="0"/>
-              <a:t>Выбранная нотация гарантирует разрешимость проверки любого свойства любой модели</a:t>
-            </a:r>
-            <a:endParaRPr lang="en-US" baseline="0" dirty="0" smtClean="0"/>
-          </a:p>
-          <a:p>
-            <a:pPr marL="228600" indent="-228600">
-              <a:buAutoNum type="arabicPeriod"/>
-            </a:pPr>
-            <a:endParaRPr lang="en-US" baseline="0" dirty="0" smtClean="0"/>
-          </a:p>
-          <a:p>
-            <a:r>
-              <a:rPr lang="ru-RU" sz="1200" dirty="0" smtClean="0"/>
-              <a:t>Проверка свойства на конечной модели программы</a:t>
-            </a:r>
-            <a:endParaRPr lang="en-US" sz="1200" dirty="0" smtClean="0"/>
-          </a:p>
-          <a:p>
-            <a:r>
-              <a:rPr lang="ru-RU" sz="1200" dirty="0" smtClean="0"/>
-              <a:t>Исчерпывающий поиск по пространству состояний</a:t>
-            </a:r>
-            <a:endParaRPr lang="en-US" sz="1200" dirty="0" smtClean="0"/>
+              <a:t> ли спецификации всё поведение системы</a:t>
+            </a:r>
+            <a:endParaRPr lang="ru-RU" dirty="0"/>
           </a:p>
         </p:txBody>
       </p:sp>
@@ -3516,7 +3463,7 @@
     </p:spTree>
     <p:extLst>
       <p:ext uri="{BB962C8B-B14F-4D97-AF65-F5344CB8AC3E}">
-        <p14:creationId xmlns:p14="http://schemas.microsoft.com/office/powerpoint/2010/main" val="3875426799"/>
+        <p14:creationId xmlns:p14="http://schemas.microsoft.com/office/powerpoint/2010/main" val="725484770"/>
       </p:ext>
     </p:extLst>
   </p:cSld>
@@ -3570,13 +3517,88 @@
           <a:bodyPr/>
           <a:lstStyle/>
           <a:p>
-            <a:r>
-              <a:rPr lang="ru-RU" dirty="0" smtClean="0"/>
-              <a:t>На данном слайде представлена</a:t>
-            </a:r>
+            <a:pPr marL="0" marR="0" indent="0" algn="l" defTabSz="914400" rtl="0" eaLnBrk="1" fontAlgn="auto" latinLnBrk="0" hangingPunct="1">
+              <a:lnSpc>
+                <a:spcPct val="100000"/>
+              </a:lnSpc>
+              <a:spcBef>
+                <a:spcPts val="0"/>
+              </a:spcBef>
+              <a:spcAft>
+                <a:spcPts val="0"/>
+              </a:spcAft>
+              <a:buClrTx/>
+              <a:buSzTx/>
+              <a:buFontTx/>
+              <a:buNone/>
+              <a:tabLst/>
+              <a:defRPr/>
+            </a:pPr>
+            <a:r>
+              <a:rPr lang="ru-RU" sz="1200" kern="1200" dirty="0" smtClean="0">
+                <a:solidFill>
+                  <a:schemeClr val="tx1"/>
+                </a:solidFill>
+                <a:effectLst/>
+                <a:latin typeface="+mn-lt"/>
+                <a:ea typeface="+mn-ea"/>
+                <a:cs typeface="+mn-cs"/>
+              </a:rPr>
+              <a:t>На основе структуры</a:t>
+            </a:r>
+            <a:r>
+              <a:rPr lang="ru-RU" sz="1200" kern="1200" baseline="0" dirty="0" smtClean="0">
+                <a:solidFill>
+                  <a:schemeClr val="tx1"/>
+                </a:solidFill>
+                <a:effectLst/>
+                <a:latin typeface="+mn-lt"/>
+                <a:ea typeface="+mn-ea"/>
+                <a:cs typeface="+mn-cs"/>
+              </a:rPr>
+              <a:t> систему</a:t>
+            </a:r>
+            <a:r>
+              <a:rPr lang="ru-RU" sz="1200" kern="1200" dirty="0" smtClean="0">
+                <a:solidFill>
+                  <a:schemeClr val="tx1"/>
+                </a:solidFill>
+                <a:effectLst/>
+                <a:latin typeface="+mn-lt"/>
+                <a:ea typeface="+mn-ea"/>
+                <a:cs typeface="+mn-cs"/>
+              </a:rPr>
+              <a:t>, нами была спроектирована архитектура системы проектирования и тестирования каркасов программных продуктов, состоящая из трёх основных компонентов – подсистемы</a:t>
+            </a:r>
+            <a:r>
+              <a:rPr lang="ru-RU" sz="1200" kern="1200" baseline="0" dirty="0" smtClean="0">
+                <a:solidFill>
+                  <a:schemeClr val="tx1"/>
+                </a:solidFill>
+                <a:effectLst/>
+                <a:latin typeface="+mn-lt"/>
+                <a:ea typeface="+mn-ea"/>
+                <a:cs typeface="+mn-cs"/>
+              </a:rPr>
+              <a:t> лексического и синтаксического анализа, подсистемы построения графа потока исполнения и подсистемы кодогенерации</a:t>
+            </a:r>
+            <a:r>
+              <a:rPr lang="ru-RU" sz="1200" kern="1200" dirty="0" smtClean="0">
+                <a:solidFill>
+                  <a:schemeClr val="tx1"/>
+                </a:solidFill>
+                <a:effectLst/>
+                <a:latin typeface="+mn-lt"/>
+                <a:ea typeface="+mn-ea"/>
+                <a:cs typeface="+mn-cs"/>
+              </a:rPr>
+              <a:t>. </a:t>
+            </a:r>
+          </a:p>
+          <a:p>
             <a:r>
               <a:rPr lang="ru-RU" baseline="0" dirty="0" smtClean="0"/>
-              <a:t> архитектура разработанной системы. В качестве входных данных система принимает описание прототипа архитектуры с использованием специализированного языка описания прототипов архитектур. В качестве выходных данных система </a:t>
+              <a:t>В качестве входных данных система принимает описание прототипа архитектуры с использованием специализированного языка описания прототипов архитектур. В качестве выходных данных система </a:t>
             </a:r>
             <a:r>
               <a:rPr lang="ru-RU" baseline="0" dirty="0" err="1" smtClean="0"/>
@@ -3584,15 +3606,8 @@
             </a:r>
             <a:r>
               <a:rPr lang="ru-RU" baseline="0" dirty="0" smtClean="0"/>
-              <a:t> представление исходного прототипа на целевом языке автоматного программирования. Представление полученное в результате работы системы можно использовать для верификации любым пригодным верификатором.</a:t>
-            </a:r>
-          </a:p>
-          <a:p>
-            <a:r>
-              <a:rPr lang="ru-RU" baseline="0" dirty="0" smtClean="0"/>
-              <a:t>Рассмотрим архитектуру системы подробнее – состоит из след подсистем</a:t>
-            </a:r>
-            <a:endParaRPr lang="ru-RU" dirty="0"/>
+              <a:t> представление исходного прототипа на целевом языке автоматного программирования.</a:t>
+            </a:r>
           </a:p>
         </p:txBody>
       </p:sp>
@@ -7553,7 +7568,9 @@
           </a:xfrm>
         </p:spPr>
         <p:txBody>
-          <a:bodyPr/>
+          <a:bodyPr>
+            <a:noAutofit/>
+          </a:bodyPr>
           <a:lstStyle/>
           <a:p>
             <a:r>
@@ -9580,7 +9597,7 @@
         <p:spPr/>
         <p:txBody>
           <a:bodyPr>
-            <a:normAutofit lnSpcReduction="10000"/>
+            <a:normAutofit/>
           </a:bodyPr>
           <a:lstStyle/>
           <a:p>
@@ -9677,42 +9694,6 @@
                 <a:latin typeface="+mn-lt"/>
               </a:rPr>
               <a:t>платформы</a:t>
-            </a:r>
-            <a:endParaRPr lang="en-US" dirty="0" smtClean="0">
-              <a:latin typeface="+mn-lt"/>
-            </a:endParaRPr>
-          </a:p>
-          <a:p>
-            <a:pPr>
-              <a:buFont typeface="Courier New" pitchFamily="49" charset="0"/>
-              <a:buChar char="o"/>
-            </a:pPr>
-            <a:endParaRPr lang="en-US" dirty="0">
-              <a:latin typeface="+mn-lt"/>
-            </a:endParaRPr>
-          </a:p>
-          <a:p>
-            <a:pPr>
-              <a:buFont typeface="Courier New" pitchFamily="49" charset="0"/>
-              <a:buChar char="o"/>
-            </a:pPr>
-            <a:r>
-              <a:rPr lang="ru-RU" b="1" dirty="0">
-                <a:latin typeface="+mn-lt"/>
-              </a:rPr>
-              <a:t>в</a:t>
-            </a:r>
-            <a:r>
-              <a:rPr lang="ru-RU" b="1" dirty="0" smtClean="0">
-                <a:latin typeface="+mn-lt"/>
-              </a:rPr>
-              <a:t>изуализация</a:t>
-            </a:r>
-            <a:r>
-              <a:rPr lang="ru-RU" dirty="0" smtClean="0">
-                <a:latin typeface="+mn-lt"/>
-              </a:rPr>
-              <a:t> внутреннего представления</a:t>
             </a:r>
             <a:endParaRPr lang="en-US" dirty="0" smtClean="0">
               <a:latin typeface="+mn-lt"/>
@@ -9871,7 +9852,7 @@
           <p:nvPr/>
         </p:nvPicPr>
         <p:blipFill>
-          <a:blip r:embed="rId2">
+          <a:blip r:embed="rId3">
             <a:extLst>
               <a:ext uri="{28A0092B-C50C-407E-A947-70E740481C1C}">
                 <a14:useLocalDpi xmlns:a14="http://schemas.microsoft.com/office/drawing/2010/main" val="0"/>
@@ -9901,7 +9882,7 @@
           <p:nvPr/>
         </p:nvPicPr>
         <p:blipFill>
-          <a:blip r:embed="rId3">
+          <a:blip r:embed="rId4">
             <a:extLst>
               <a:ext uri="{28A0092B-C50C-407E-A947-70E740481C1C}">
                 <a14:useLocalDpi xmlns:a14="http://schemas.microsoft.com/office/drawing/2010/main" val="0"/>
@@ -10413,751 +10394,6 @@
   <p:clrMapOvr>
     <a:masterClrMapping/>
   </p:clrMapOvr>
-  <p:timing>
-    <p:tnLst>
-      <p:par>
-        <p:cTn id="1" dur="indefinite" restart="never" nodeType="tmRoot"/>
-      </p:par>
-    </p:tnLst>
-  </p:timing>
-</p:sld>
-</file>
-
-<file path=ppt/slides/slide20.xml><?xml version="1.0" encoding="utf-8"?>
-<p:sld xmlns:a="http://schemas.openxmlformats.org/drawingml/2006/main" xmlns:r="http://schemas.openxmlformats.org/officeDocument/2006/relationships" xmlns:p="http://schemas.openxmlformats.org/presentationml/2006/main" show="0">
-  <p:cSld>
-    <p:spTree>
-      <p:nvGrpSpPr>
-        <p:cNvPr id="1" name=""/>
-        <p:cNvGrpSpPr/>
-        <p:nvPr/>
-      </p:nvGrpSpPr>
-      <p:grpSpPr>
-        <a:xfrm>
-          <a:off x="0" y="0"/>
-          <a:ext cx="0" cy="0"/>
-          <a:chOff x="0" y="0"/>
-          <a:chExt cx="0" cy="0"/>
-        </a:xfrm>
-      </p:grpSpPr>
-      <p:sp>
-        <p:nvSpPr>
-          <p:cNvPr id="2" name="Заголовок 1"/>
-          <p:cNvSpPr>
-            <a:spLocks noGrp="1"/>
-          </p:cNvSpPr>
-          <p:nvPr>
-            <p:ph type="title"/>
-          </p:nvPr>
-        </p:nvSpPr>
-        <p:spPr>
-          <a:xfrm>
-            <a:off x="457200" y="28600"/>
-            <a:ext cx="8229600" cy="1600200"/>
-          </a:xfrm>
-        </p:spPr>
-        <p:txBody>
-          <a:bodyPr/>
-          <a:lstStyle/>
-          <a:p>
-            <a:r>
-              <a:rPr lang="en-US" dirty="0" err="1" smtClean="0"/>
-              <a:t>Promela</a:t>
-            </a:r>
-            <a:r>
-              <a:rPr lang="en-US" dirty="0" smtClean="0"/>
-              <a:t> </a:t>
-            </a:r>
-            <a:br>
-              <a:rPr lang="en-US" dirty="0" smtClean="0"/>
-            </a:br>
-            <a:r>
-              <a:rPr lang="en-US" dirty="0" smtClean="0"/>
-              <a:t>(</a:t>
-            </a:r>
-            <a:r>
-              <a:rPr lang="ru-RU" u="sng" dirty="0" err="1"/>
-              <a:t>Pro</a:t>
-            </a:r>
-            <a:r>
-              <a:rPr lang="ru-RU" dirty="0" err="1"/>
-              <a:t>tocol</a:t>
-            </a:r>
-            <a:r>
-              <a:rPr lang="ru-RU" dirty="0"/>
-              <a:t> </a:t>
-            </a:r>
-            <a:r>
-              <a:rPr lang="ru-RU" u="sng" dirty="0" err="1"/>
-              <a:t>Me</a:t>
-            </a:r>
-            <a:r>
-              <a:rPr lang="ru-RU" dirty="0" err="1"/>
-              <a:t>ta</a:t>
-            </a:r>
-            <a:r>
-              <a:rPr lang="ru-RU" dirty="0"/>
-              <a:t> </a:t>
-            </a:r>
-            <a:r>
-              <a:rPr lang="ru-RU" u="sng" dirty="0" err="1" smtClean="0"/>
-              <a:t>La</a:t>
-            </a:r>
-            <a:r>
-              <a:rPr lang="ru-RU" dirty="0" err="1" smtClean="0"/>
-              <a:t>nguage</a:t>
-            </a:r>
-            <a:r>
-              <a:rPr lang="en-US" dirty="0" smtClean="0"/>
-              <a:t>)</a:t>
-            </a:r>
-            <a:endParaRPr lang="ru-RU" dirty="0"/>
-          </a:p>
-        </p:txBody>
-      </p:sp>
-      <p:sp>
-        <p:nvSpPr>
-          <p:cNvPr id="5" name="Объект 4"/>
-          <p:cNvSpPr>
-            <a:spLocks noGrp="1"/>
-          </p:cNvSpPr>
-          <p:nvPr>
-            <p:ph sz="quarter" idx="13"/>
-          </p:nvPr>
-        </p:nvSpPr>
-        <p:spPr>
-          <a:xfrm>
-            <a:off x="179512" y="1556792"/>
-            <a:ext cx="8784976" cy="4896544"/>
-          </a:xfrm>
-        </p:spPr>
-        <p:txBody>
-          <a:bodyPr>
-            <a:normAutofit/>
-          </a:bodyPr>
-          <a:lstStyle/>
-          <a:p>
-            <a:pPr marL="0" indent="0" algn="ctr">
-              <a:buNone/>
-            </a:pPr>
-            <a:r>
-              <a:rPr lang="ru-RU" sz="2800" dirty="0" smtClean="0"/>
-              <a:t>Описание поведения</a:t>
-            </a:r>
-          </a:p>
-          <a:p>
-            <a:r>
-              <a:rPr lang="ru-RU" sz="2800" dirty="0"/>
-              <a:t>н</a:t>
-            </a:r>
-            <a:r>
-              <a:rPr lang="ru-RU" sz="2800" dirty="0" smtClean="0"/>
-              <a:t>едетерминированный язык с охраняемыми командами</a:t>
-            </a:r>
-          </a:p>
-          <a:p>
-            <a:r>
-              <a:rPr lang="ru-RU" sz="2800" dirty="0"/>
-              <a:t>з</a:t>
-            </a:r>
-            <a:r>
-              <a:rPr lang="ru-RU" sz="2800" dirty="0" smtClean="0"/>
-              <a:t>адача языка – </a:t>
-            </a:r>
-            <a:r>
-              <a:rPr lang="ru-RU" sz="2800" b="1" dirty="0" smtClean="0"/>
-              <a:t>не</a:t>
-            </a:r>
-            <a:r>
-              <a:rPr lang="ru-RU" sz="2800" dirty="0" smtClean="0"/>
-              <a:t> предотвратить описание моделей плохих программ</a:t>
-            </a:r>
-          </a:p>
-          <a:p>
-            <a:r>
-              <a:rPr lang="ru-RU" sz="2800" dirty="0" smtClean="0"/>
-              <a:t>задача языка – разрешить описание моделей, которые могут быть верифицированы</a:t>
-            </a:r>
-          </a:p>
-        </p:txBody>
-      </p:sp>
-      <p:sp>
-        <p:nvSpPr>
-          <p:cNvPr id="9" name="Text Box 5"/>
-          <p:cNvSpPr txBox="1">
-            <a:spLocks noChangeArrowheads="1"/>
-          </p:cNvSpPr>
-          <p:nvPr/>
-        </p:nvSpPr>
-        <p:spPr bwMode="auto">
-          <a:xfrm>
-            <a:off x="773262" y="6453336"/>
-            <a:ext cx="5886970" cy="190052"/>
-          </a:xfrm>
-          <a:prstGeom prst="rect">
-            <a:avLst/>
-          </a:prstGeom>
-          <a:noFill/>
-          <a:ln w="9525">
-            <a:noFill/>
-            <a:miter lim="800000"/>
-            <a:headEnd/>
-            <a:tailEnd/>
-          </a:ln>
-        </p:spPr>
-        <p:txBody>
-          <a:bodyPr wrap="square" lIns="0" tIns="0" rIns="0" bIns="0" anchor="b">
-            <a:spAutoFit/>
-          </a:bodyPr>
-          <a:lstStyle/>
-          <a:p>
-            <a:pPr>
-              <a:lnSpc>
-                <a:spcPct val="95000"/>
-              </a:lnSpc>
-            </a:pPr>
-            <a:r>
-              <a:rPr lang="ru-RU" sz="1300" dirty="0">
-                <a:solidFill>
-                  <a:srgbClr val="045C75"/>
-                </a:solidFill>
-              </a:rPr>
-              <a:t>АлтГТУ им. И. И. </a:t>
-            </a:r>
-            <a:r>
-              <a:rPr lang="ru-RU" sz="1300" dirty="0" smtClean="0">
-                <a:solidFill>
-                  <a:srgbClr val="045C75"/>
-                </a:solidFill>
-              </a:rPr>
-              <a:t>Ползунова / ПОВТ, Юлия Шатилина</a:t>
-            </a:r>
-            <a:endParaRPr lang="en-US" sz="1300" dirty="0">
-              <a:solidFill>
-                <a:srgbClr val="045C75"/>
-              </a:solidFill>
-            </a:endParaRPr>
-          </a:p>
-        </p:txBody>
-      </p:sp>
-      <p:sp>
-        <p:nvSpPr>
-          <p:cNvPr id="3" name="Номер слайда 2"/>
-          <p:cNvSpPr>
-            <a:spLocks noGrp="1"/>
-          </p:cNvSpPr>
-          <p:nvPr>
-            <p:ph type="sldNum" sz="quarter" idx="12"/>
-          </p:nvPr>
-        </p:nvSpPr>
-        <p:spPr/>
-        <p:txBody>
-          <a:bodyPr/>
-          <a:lstStyle/>
-          <a:p>
-            <a:fld id="{0119AA8D-81DD-40BD-8E0C-7D93F639C7BB}" type="slidenum">
-              <a:rPr lang="ru-RU" smtClean="0"/>
-              <a:t>20</a:t>
-            </a:fld>
-            <a:endParaRPr lang="ru-RU"/>
-          </a:p>
-        </p:txBody>
-      </p:sp>
-    </p:spTree>
-    <p:extLst>
-      <p:ext uri="{BB962C8B-B14F-4D97-AF65-F5344CB8AC3E}">
-        <p14:creationId xmlns:p14="http://schemas.microsoft.com/office/powerpoint/2010/main" val="30331259"/>
-      </p:ext>
-    </p:extLst>
-  </p:cSld>
-  <p:clrMapOvr>
-    <a:masterClrMapping/>
-  </p:clrMapOvr>
-  <mc:AlternateContent xmlns:mc="http://schemas.openxmlformats.org/markup-compatibility/2006" xmlns:p14="http://schemas.microsoft.com/office/powerpoint/2010/main">
-    <mc:Choice Requires="p14">
-      <p:transition spd="slow" p14:dur="2000"/>
-    </mc:Choice>
-    <mc:Fallback xmlns="">
-      <p:transition spd="slow"/>
-    </mc:Fallback>
-  </mc:AlternateContent>
-  <p:timing>
-    <p:tnLst>
-      <p:par>
-        <p:cTn id="1" dur="indefinite" restart="never" nodeType="tmRoot"/>
-      </p:par>
-    </p:tnLst>
-  </p:timing>
-</p:sld>
-</file>
-
-<file path=ppt/slides/slide21.xml><?xml version="1.0" encoding="utf-8"?>
-<p:sld xmlns:a="http://schemas.openxmlformats.org/drawingml/2006/main" xmlns:r="http://schemas.openxmlformats.org/officeDocument/2006/relationships" xmlns:p="http://schemas.openxmlformats.org/presentationml/2006/main" show="0">
-  <p:cSld>
-    <p:spTree>
-      <p:nvGrpSpPr>
-        <p:cNvPr id="1" name=""/>
-        <p:cNvGrpSpPr/>
-        <p:nvPr/>
-      </p:nvGrpSpPr>
-      <p:grpSpPr>
-        <a:xfrm>
-          <a:off x="0" y="0"/>
-          <a:ext cx="0" cy="0"/>
-          <a:chOff x="0" y="0"/>
-          <a:chExt cx="0" cy="0"/>
-        </a:xfrm>
-      </p:grpSpPr>
-      <p:sp>
-        <p:nvSpPr>
-          <p:cNvPr id="2" name="Заголовок 1"/>
-          <p:cNvSpPr>
-            <a:spLocks noGrp="1"/>
-          </p:cNvSpPr>
-          <p:nvPr>
-            <p:ph type="title"/>
-          </p:nvPr>
-        </p:nvSpPr>
-        <p:spPr>
-          <a:xfrm>
-            <a:off x="457200" y="28600"/>
-            <a:ext cx="8229600" cy="1600200"/>
-          </a:xfrm>
-        </p:spPr>
-        <p:txBody>
-          <a:bodyPr/>
-          <a:lstStyle/>
-          <a:p>
-            <a:pPr marL="0" indent="0"/>
-            <a:r>
-              <a:rPr lang="ru-RU" dirty="0"/>
-              <a:t>Модель на языке </a:t>
-            </a:r>
-            <a:r>
-              <a:rPr lang="en-US" dirty="0" err="1" smtClean="0"/>
-              <a:t>Promela</a:t>
-            </a:r>
-            <a:endParaRPr lang="en-US" dirty="0"/>
-          </a:p>
-        </p:txBody>
-      </p:sp>
-      <p:sp>
-        <p:nvSpPr>
-          <p:cNvPr id="5" name="Объект 4"/>
-          <p:cNvSpPr>
-            <a:spLocks noGrp="1"/>
-          </p:cNvSpPr>
-          <p:nvPr>
-            <p:ph sz="quarter" idx="13"/>
-          </p:nvPr>
-        </p:nvSpPr>
-        <p:spPr>
-          <a:xfrm>
-            <a:off x="179512" y="1556792"/>
-            <a:ext cx="8784976" cy="4896544"/>
-          </a:xfrm>
-        </p:spPr>
-        <p:txBody>
-          <a:bodyPr>
-            <a:normAutofit/>
-          </a:bodyPr>
-          <a:lstStyle/>
-          <a:p>
-            <a:r>
-              <a:rPr lang="ru-RU" sz="2800" dirty="0" smtClean="0"/>
-              <a:t>абстракция </a:t>
-            </a:r>
-            <a:r>
-              <a:rPr lang="ru-RU" sz="2800" dirty="0"/>
-              <a:t>реальной системы, </a:t>
-            </a:r>
-            <a:r>
-              <a:rPr lang="ru-RU" sz="2800" dirty="0" smtClean="0"/>
-              <a:t>содержащая </a:t>
-            </a:r>
-            <a:r>
-              <a:rPr lang="ru-RU" sz="2800" dirty="0"/>
-              <a:t>характеристики, которые </a:t>
-            </a:r>
-            <a:r>
-              <a:rPr lang="ru-RU" sz="2800" dirty="0" smtClean="0"/>
-              <a:t>значимы </a:t>
-            </a:r>
-            <a:r>
-              <a:rPr lang="ru-RU" sz="2800" dirty="0"/>
-              <a:t>для описания взаимодействия процессов</a:t>
-            </a:r>
-          </a:p>
-          <a:p>
-            <a:r>
-              <a:rPr lang="ru-RU" sz="2800" dirty="0" smtClean="0"/>
-              <a:t>не </a:t>
-            </a:r>
-            <a:r>
-              <a:rPr lang="ru-RU" sz="2800" dirty="0"/>
-              <a:t>является программной реализацией системы</a:t>
-            </a:r>
-          </a:p>
-          <a:p>
-            <a:r>
-              <a:rPr lang="ru-RU" sz="2800" dirty="0" smtClean="0"/>
-              <a:t>может </a:t>
-            </a:r>
-            <a:r>
-              <a:rPr lang="ru-RU" sz="2800" dirty="0"/>
-              <a:t>содержать части, которые важны только для </a:t>
-            </a:r>
-            <a:r>
-              <a:rPr lang="ru-RU" sz="2800" dirty="0" smtClean="0"/>
-              <a:t>верификации </a:t>
-            </a:r>
-            <a:r>
-              <a:rPr lang="ru-RU" sz="2800" dirty="0"/>
-              <a:t>протоколов</a:t>
-            </a:r>
-            <a:endParaRPr lang="en-US" sz="2800" dirty="0"/>
-          </a:p>
-        </p:txBody>
-      </p:sp>
-      <p:sp>
-        <p:nvSpPr>
-          <p:cNvPr id="9" name="Text Box 5"/>
-          <p:cNvSpPr txBox="1">
-            <a:spLocks noChangeArrowheads="1"/>
-          </p:cNvSpPr>
-          <p:nvPr/>
-        </p:nvSpPr>
-        <p:spPr bwMode="auto">
-          <a:xfrm>
-            <a:off x="773262" y="6453336"/>
-            <a:ext cx="5886970" cy="190052"/>
-          </a:xfrm>
-          <a:prstGeom prst="rect">
-            <a:avLst/>
-          </a:prstGeom>
-          <a:noFill/>
-          <a:ln w="9525">
-            <a:noFill/>
-            <a:miter lim="800000"/>
-            <a:headEnd/>
-            <a:tailEnd/>
-          </a:ln>
-        </p:spPr>
-        <p:txBody>
-          <a:bodyPr wrap="square" lIns="0" tIns="0" rIns="0" bIns="0" anchor="b">
-            <a:spAutoFit/>
-          </a:bodyPr>
-          <a:lstStyle/>
-          <a:p>
-            <a:pPr>
-              <a:lnSpc>
-                <a:spcPct val="95000"/>
-              </a:lnSpc>
-            </a:pPr>
-            <a:r>
-              <a:rPr lang="ru-RU" sz="1300" dirty="0">
-                <a:solidFill>
-                  <a:srgbClr val="045C75"/>
-                </a:solidFill>
-              </a:rPr>
-              <a:t>АлтГТУ им. И. И. </a:t>
-            </a:r>
-            <a:r>
-              <a:rPr lang="ru-RU" sz="1300" dirty="0" smtClean="0">
-                <a:solidFill>
-                  <a:srgbClr val="045C75"/>
-                </a:solidFill>
-              </a:rPr>
-              <a:t>Ползунова / ПОВТ, Юлия Шатилина</a:t>
-            </a:r>
-            <a:endParaRPr lang="en-US" sz="1300" dirty="0">
-              <a:solidFill>
-                <a:srgbClr val="045C75"/>
-              </a:solidFill>
-            </a:endParaRPr>
-          </a:p>
-        </p:txBody>
-      </p:sp>
-      <p:sp>
-        <p:nvSpPr>
-          <p:cNvPr id="3" name="Номер слайда 2"/>
-          <p:cNvSpPr>
-            <a:spLocks noGrp="1"/>
-          </p:cNvSpPr>
-          <p:nvPr>
-            <p:ph type="sldNum" sz="quarter" idx="12"/>
-          </p:nvPr>
-        </p:nvSpPr>
-        <p:spPr/>
-        <p:txBody>
-          <a:bodyPr/>
-          <a:lstStyle/>
-          <a:p>
-            <a:fld id="{0119AA8D-81DD-40BD-8E0C-7D93F639C7BB}" type="slidenum">
-              <a:rPr lang="ru-RU" smtClean="0"/>
-              <a:t>21</a:t>
-            </a:fld>
-            <a:endParaRPr lang="ru-RU"/>
-          </a:p>
-        </p:txBody>
-      </p:sp>
-    </p:spTree>
-    <p:extLst>
-      <p:ext uri="{BB962C8B-B14F-4D97-AF65-F5344CB8AC3E}">
-        <p14:creationId xmlns:p14="http://schemas.microsoft.com/office/powerpoint/2010/main" val="342838871"/>
-      </p:ext>
-    </p:extLst>
-  </p:cSld>
-  <p:clrMapOvr>
-    <a:masterClrMapping/>
-  </p:clrMapOvr>
-  <mc:AlternateContent xmlns:mc="http://schemas.openxmlformats.org/markup-compatibility/2006" xmlns:p14="http://schemas.microsoft.com/office/powerpoint/2010/main">
-    <mc:Choice Requires="p14">
-      <p:transition spd="slow" p14:dur="2000"/>
-    </mc:Choice>
-    <mc:Fallback xmlns="">
-      <p:transition spd="slow"/>
-    </mc:Fallback>
-  </mc:AlternateContent>
-  <p:timing>
-    <p:tnLst>
-      <p:par>
-        <p:cTn id="1" dur="indefinite" restart="never" nodeType="tmRoot"/>
-      </p:par>
-    </p:tnLst>
-  </p:timing>
-</p:sld>
-</file>
-
-<file path=ppt/slides/slide22.xml><?xml version="1.0" encoding="utf-8"?>
-<p:sld xmlns:a="http://schemas.openxmlformats.org/drawingml/2006/main" xmlns:r="http://schemas.openxmlformats.org/officeDocument/2006/relationships" xmlns:p="http://schemas.openxmlformats.org/presentationml/2006/main" show="0">
-  <p:cSld>
-    <p:spTree>
-      <p:nvGrpSpPr>
-        <p:cNvPr id="1" name=""/>
-        <p:cNvGrpSpPr/>
-        <p:nvPr/>
-      </p:nvGrpSpPr>
-      <p:grpSpPr>
-        <a:xfrm>
-          <a:off x="0" y="0"/>
-          <a:ext cx="0" cy="0"/>
-          <a:chOff x="0" y="0"/>
-          <a:chExt cx="0" cy="0"/>
-        </a:xfrm>
-      </p:grpSpPr>
-      <p:sp>
-        <p:nvSpPr>
-          <p:cNvPr id="2" name="Заголовок 1"/>
-          <p:cNvSpPr>
-            <a:spLocks noGrp="1"/>
-          </p:cNvSpPr>
-          <p:nvPr>
-            <p:ph type="title"/>
-          </p:nvPr>
-        </p:nvSpPr>
-        <p:spPr>
-          <a:xfrm>
-            <a:off x="0" y="-27384"/>
-            <a:ext cx="9144000" cy="1600200"/>
-          </a:xfrm>
-        </p:spPr>
-        <p:txBody>
-          <a:bodyPr/>
-          <a:lstStyle/>
-          <a:p>
-            <a:r>
-              <a:rPr lang="en-US" dirty="0" smtClean="0"/>
-              <a:t>LTL</a:t>
-            </a:r>
-            <a:br>
-              <a:rPr lang="en-US" dirty="0" smtClean="0"/>
-            </a:br>
-            <a:r>
-              <a:rPr lang="en-US" dirty="0" smtClean="0"/>
-              <a:t>(</a:t>
-            </a:r>
-            <a:r>
-              <a:rPr lang="en-US" dirty="0"/>
-              <a:t>L</a:t>
-            </a:r>
-            <a:r>
-              <a:rPr lang="ru-RU" dirty="0" err="1" smtClean="0"/>
-              <a:t>inear</a:t>
-            </a:r>
-            <a:r>
-              <a:rPr lang="ru-RU" dirty="0" smtClean="0"/>
-              <a:t> </a:t>
-            </a:r>
-            <a:r>
-              <a:rPr lang="en-US" dirty="0"/>
-              <a:t>T</a:t>
-            </a:r>
-            <a:r>
-              <a:rPr lang="ru-RU" dirty="0" err="1"/>
-              <a:t>emporal</a:t>
-            </a:r>
-            <a:r>
-              <a:rPr lang="ru-RU" dirty="0"/>
-              <a:t> </a:t>
-            </a:r>
-            <a:r>
-              <a:rPr lang="en-US" dirty="0"/>
-              <a:t>L</a:t>
-            </a:r>
-            <a:r>
-              <a:rPr lang="ru-RU" dirty="0" err="1" smtClean="0"/>
-              <a:t>ogic</a:t>
-            </a:r>
-            <a:r>
-              <a:rPr lang="en-US" dirty="0" smtClean="0"/>
-              <a:t>)</a:t>
-            </a:r>
-            <a:endParaRPr lang="ru-RU" dirty="0"/>
-          </a:p>
-        </p:txBody>
-      </p:sp>
-      <p:sp>
-        <p:nvSpPr>
-          <p:cNvPr id="5" name="Объект 4"/>
-          <p:cNvSpPr>
-            <a:spLocks noGrp="1"/>
-          </p:cNvSpPr>
-          <p:nvPr>
-            <p:ph sz="quarter" idx="13"/>
-          </p:nvPr>
-        </p:nvSpPr>
-        <p:spPr>
-          <a:xfrm>
-            <a:off x="179512" y="1700808"/>
-            <a:ext cx="8784976" cy="4824536"/>
-          </a:xfrm>
-        </p:spPr>
-        <p:txBody>
-          <a:bodyPr>
-            <a:normAutofit/>
-          </a:bodyPr>
-          <a:lstStyle/>
-          <a:p>
-            <a:pPr marL="0" indent="0" algn="ctr">
-              <a:buNone/>
-            </a:pPr>
-            <a:r>
-              <a:rPr lang="ru-RU" sz="2000" dirty="0" smtClean="0"/>
-              <a:t>Описание свойств</a:t>
-            </a:r>
-          </a:p>
-          <a:p>
-            <a:pPr marL="0" indent="0" algn="ctr">
-              <a:buNone/>
-            </a:pPr>
-            <a:r>
-              <a:rPr lang="ru-RU" sz="2000" dirty="0" smtClean="0"/>
-              <a:t>Позволяет описать как поведение системы представляется  во времени</a:t>
-            </a:r>
-          </a:p>
-        </p:txBody>
-      </p:sp>
-      <p:sp>
-        <p:nvSpPr>
-          <p:cNvPr id="9" name="Text Box 5"/>
-          <p:cNvSpPr txBox="1">
-            <a:spLocks noChangeArrowheads="1"/>
-          </p:cNvSpPr>
-          <p:nvPr/>
-        </p:nvSpPr>
-        <p:spPr bwMode="auto">
-          <a:xfrm>
-            <a:off x="773262" y="6453336"/>
-            <a:ext cx="5886970" cy="190052"/>
-          </a:xfrm>
-          <a:prstGeom prst="rect">
-            <a:avLst/>
-          </a:prstGeom>
-          <a:noFill/>
-          <a:ln w="9525">
-            <a:noFill/>
-            <a:miter lim="800000"/>
-            <a:headEnd/>
-            <a:tailEnd/>
-          </a:ln>
-        </p:spPr>
-        <p:txBody>
-          <a:bodyPr wrap="square" lIns="0" tIns="0" rIns="0" bIns="0" anchor="b">
-            <a:spAutoFit/>
-          </a:bodyPr>
-          <a:lstStyle/>
-          <a:p>
-            <a:pPr>
-              <a:lnSpc>
-                <a:spcPct val="95000"/>
-              </a:lnSpc>
-            </a:pPr>
-            <a:r>
-              <a:rPr lang="ru-RU" sz="1300" dirty="0">
-                <a:solidFill>
-                  <a:srgbClr val="045C75"/>
-                </a:solidFill>
-              </a:rPr>
-              <a:t>АлтГТУ им. И. И. </a:t>
-            </a:r>
-            <a:r>
-              <a:rPr lang="ru-RU" sz="1300" dirty="0" smtClean="0">
-                <a:solidFill>
-                  <a:srgbClr val="045C75"/>
-                </a:solidFill>
-              </a:rPr>
-              <a:t>Ползунова / ПОВТ, Юлия Шатилина</a:t>
-            </a:r>
-            <a:endParaRPr lang="en-US" sz="1300" dirty="0">
-              <a:solidFill>
-                <a:srgbClr val="045C75"/>
-              </a:solidFill>
-            </a:endParaRPr>
-          </a:p>
-        </p:txBody>
-      </p:sp>
-      <p:sp>
-        <p:nvSpPr>
-          <p:cNvPr id="3" name="Номер слайда 2"/>
-          <p:cNvSpPr>
-            <a:spLocks noGrp="1"/>
-          </p:cNvSpPr>
-          <p:nvPr>
-            <p:ph type="sldNum" sz="quarter" idx="12"/>
-          </p:nvPr>
-        </p:nvSpPr>
-        <p:spPr/>
-        <p:txBody>
-          <a:bodyPr/>
-          <a:lstStyle/>
-          <a:p>
-            <a:fld id="{0119AA8D-81DD-40BD-8E0C-7D93F639C7BB}" type="slidenum">
-              <a:rPr lang="ru-RU" smtClean="0"/>
-              <a:t>22</a:t>
-            </a:fld>
-            <a:endParaRPr lang="ru-RU"/>
-          </a:p>
-        </p:txBody>
-      </p:sp>
-    </p:spTree>
-    <p:extLst>
-      <p:ext uri="{BB962C8B-B14F-4D97-AF65-F5344CB8AC3E}">
-        <p14:creationId xmlns:p14="http://schemas.microsoft.com/office/powerpoint/2010/main" val="3433607286"/>
-      </p:ext>
-    </p:extLst>
-  </p:cSld>
-  <p:clrMapOvr>
-    <a:masterClrMapping/>
-  </p:clrMapOvr>
-  <mc:AlternateContent xmlns:mc="http://schemas.openxmlformats.org/markup-compatibility/2006" xmlns:p14="http://schemas.microsoft.com/office/powerpoint/2010/main">
-    <mc:Choice Requires="p14">
-      <p:transition spd="slow" p14:dur="2000"/>
-    </mc:Choice>
-    <mc:Fallback xmlns="">
-      <p:transition spd="slow"/>
-    </mc:Fallback>
-  </mc:AlternateContent>
   <p:timing>
     <p:tnLst>
       <p:par>
@@ -12387,67 +11623,148 @@
       </p:grpSpPr>
       <p:sp>
         <p:nvSpPr>
-          <p:cNvPr id="8" name="Заголовок 1"/>
-          <p:cNvSpPr txBox="1">
-            <a:spLocks/>
-          </p:cNvSpPr>
-          <p:nvPr/>
+          <p:cNvPr id="2" name="Заголовок 1"/>
+          <p:cNvSpPr>
+            <a:spLocks noGrp="1"/>
+          </p:cNvSpPr>
+          <p:nvPr>
+            <p:ph type="title"/>
+          </p:nvPr>
         </p:nvSpPr>
         <p:spPr>
           <a:xfrm>
-            <a:off x="457200" y="-603448"/>
+            <a:off x="457200" y="28600"/>
             <a:ext cx="8229600" cy="1600200"/>
           </a:xfrm>
-          <a:prstGeom prst="rect">
-            <a:avLst/>
-          </a:prstGeom>
         </p:spPr>
         <p:txBody>
-          <a:bodyPr vert="horz" lIns="91440" tIns="45720" rIns="91440" bIns="45720" rtlCol="0" anchor="b">
-            <a:noAutofit/>
+          <a:bodyPr/>
+          <a:lstStyle/>
+          <a:p>
+            <a:r>
+              <a:rPr lang="en-US" dirty="0" err="1" smtClean="0"/>
+              <a:t>Promela</a:t>
+            </a:r>
+            <a:r>
+              <a:rPr lang="en-US" dirty="0" smtClean="0"/>
+              <a:t> </a:t>
+            </a:r>
+            <a:br>
+              <a:rPr lang="en-US" dirty="0" smtClean="0"/>
+            </a:br>
+            <a:r>
+              <a:rPr lang="en-US" dirty="0" smtClean="0"/>
+              <a:t>(</a:t>
+            </a:r>
+            <a:r>
+              <a:rPr lang="ru-RU" u="sng" dirty="0" err="1"/>
+              <a:t>Pro</a:t>
+            </a:r>
+            <a:r>
+              <a:rPr lang="ru-RU" dirty="0" err="1"/>
+              <a:t>tocol</a:t>
+            </a:r>
+            <a:r>
+              <a:rPr lang="ru-RU" dirty="0"/>
+              <a:t> </a:t>
+            </a:r>
+            <a:r>
+              <a:rPr lang="ru-RU" u="sng" dirty="0" err="1"/>
+              <a:t>Me</a:t>
+            </a:r>
+            <a:r>
+              <a:rPr lang="ru-RU" dirty="0" err="1"/>
+              <a:t>ta</a:t>
+            </a:r>
+            <a:r>
+              <a:rPr lang="ru-RU" dirty="0"/>
+              <a:t> </a:t>
+            </a:r>
+            <a:r>
+              <a:rPr lang="ru-RU" u="sng" dirty="0" err="1" smtClean="0"/>
+              <a:t>La</a:t>
+            </a:r>
+            <a:r>
+              <a:rPr lang="ru-RU" dirty="0" err="1" smtClean="0"/>
+              <a:t>nguage</a:t>
+            </a:r>
+            <a:r>
+              <a:rPr lang="en-US" dirty="0" smtClean="0"/>
+              <a:t>)</a:t>
+            </a:r>
+            <a:endParaRPr lang="ru-RU" dirty="0"/>
+          </a:p>
+        </p:txBody>
+      </p:sp>
+      <p:sp>
+        <p:nvSpPr>
+          <p:cNvPr id="5" name="Объект 4"/>
+          <p:cNvSpPr>
+            <a:spLocks noGrp="1"/>
+          </p:cNvSpPr>
+          <p:nvPr>
+            <p:ph sz="quarter" idx="13"/>
+          </p:nvPr>
+        </p:nvSpPr>
+        <p:spPr>
+          <a:xfrm>
+            <a:off x="179512" y="1556792"/>
+            <a:ext cx="8784976" cy="4896544"/>
+          </a:xfrm>
+        </p:spPr>
+        <p:txBody>
+          <a:bodyPr>
+            <a:normAutofit/>
           </a:bodyPr>
-          <a:lstStyle>
-            <a:lvl1pPr algn="ctr" defTabSz="914400" rtl="0" eaLnBrk="1" latinLnBrk="0" hangingPunct="1">
-              <a:lnSpc>
-                <a:spcPts val="5800"/>
-              </a:lnSpc>
-              <a:spcBef>
-                <a:spcPct val="0"/>
-              </a:spcBef>
+          <a:lstStyle/>
+          <a:p>
+            <a:pPr marL="0" indent="0" algn="ctr">
               <a:buNone/>
-              <a:defRPr sz="5400" kern="1200">
-                <a:solidFill>
-                  <a:schemeClr val="tx2"/>
-                </a:solidFill>
-                <a:effectLst>
-                  <a:outerShdw blurRad="63500" dist="38100" dir="5400000" algn="t" rotWithShape="0">
-                    <a:prstClr val="black">
-                      <a:alpha val="25000"/>
-                    </a:prstClr>
-                  </a:outerShdw>
-                </a:effectLst>
-                <a:latin typeface="+mn-lt"/>
-                <a:ea typeface="+mj-ea"/>
-                <a:cs typeface="+mj-cs"/>
-              </a:defRPr>
-            </a:lvl1pPr>
-          </a:lstStyle>
-          <a:p>
-            <a:r>
-              <a:rPr lang="ru-RU" dirty="0" smtClean="0"/>
-              <a:t>Промела+</a:t>
-            </a:r>
-            <a:r>
-              <a:rPr lang="en-US" dirty="0" smtClean="0"/>
-              <a:t>LTL</a:t>
-            </a:r>
-            <a:endParaRPr lang="ru-RU" dirty="0"/>
-          </a:p>
-        </p:txBody>
-      </p:sp>
-      <p:sp>
-        <p:nvSpPr>
-          <p:cNvPr id="15" name="Text Box 5"/>
+            </a:pPr>
+            <a:r>
+              <a:rPr lang="ru-RU" sz="2800" dirty="0" smtClean="0"/>
+              <a:t>Описание поведения</a:t>
+            </a:r>
+          </a:p>
+          <a:p>
+            <a:r>
+              <a:rPr lang="ru-RU" sz="2800" dirty="0"/>
+              <a:t>н</a:t>
+            </a:r>
+            <a:r>
+              <a:rPr lang="ru-RU" sz="2800" dirty="0" smtClean="0"/>
+              <a:t>едетерминированный язык с охраняемыми командами</a:t>
+            </a:r>
+          </a:p>
+          <a:p>
+            <a:r>
+              <a:rPr lang="ru-RU" sz="2800" dirty="0"/>
+              <a:t>з</a:t>
+            </a:r>
+            <a:r>
+              <a:rPr lang="ru-RU" sz="2800" dirty="0" smtClean="0"/>
+              <a:t>адача языка – </a:t>
+            </a:r>
+            <a:r>
+              <a:rPr lang="ru-RU" sz="2800" b="1" dirty="0" smtClean="0"/>
+              <a:t>не</a:t>
+            </a:r>
+            <a:r>
+              <a:rPr lang="ru-RU" sz="2800" dirty="0" smtClean="0"/>
+              <a:t> предотвратить описание моделей плохих программ</a:t>
+            </a:r>
+          </a:p>
+          <a:p>
+            <a:r>
+              <a:rPr lang="ru-RU" sz="2800" dirty="0" smtClean="0"/>
+              <a:t>задача языка – разрешить описание моделей, которые могут быть верифицированы</a:t>
+            </a:r>
+          </a:p>
+        </p:txBody>
+      </p:sp>
+      <p:sp>
+        <p:nvSpPr>
+          <p:cNvPr id="9" name="Text Box 5"/>
           <p:cNvSpPr txBox="1">
             <a:spLocks noChangeArrowheads="1"/>
           </p:cNvSpPr>
@@ -12506,33 +11823,7 @@
       </p:sp>
       <p:sp>
         <p:nvSpPr>
-          <p:cNvPr id="16" name="TextBox 15"/>
-          <p:cNvSpPr txBox="1"/>
-          <p:nvPr/>
-        </p:nvSpPr>
-        <p:spPr>
-          <a:xfrm>
-            <a:off x="1043608" y="3356992"/>
-            <a:ext cx="184731" cy="369332"/>
-          </a:xfrm>
-          <a:prstGeom prst="rect">
-            <a:avLst/>
-          </a:prstGeom>
-          <a:noFill/>
-        </p:spPr>
-        <p:txBody>
-          <a:bodyPr wrap="none" rtlCol="0">
-            <a:spAutoFit/>
-          </a:bodyPr>
-          <a:lstStyle/>
-          <a:p>
-            <a:endParaRPr lang="ru-RU" dirty="0"/>
-          </a:p>
-        </p:txBody>
-      </p:sp>
-      <p:sp>
-        <p:nvSpPr>
-          <p:cNvPr id="2" name="Номер слайда 1"/>
+          <p:cNvPr id="3" name="Номер слайда 2"/>
           <p:cNvSpPr>
             <a:spLocks noGrp="1"/>
           </p:cNvSpPr>
@@ -12553,35 +11844,24 @@
           </a:p>
         </p:txBody>
       </p:sp>
-      <p:sp>
-        <p:nvSpPr>
-          <p:cNvPr id="3" name="Объект 2"/>
-          <p:cNvSpPr>
-            <a:spLocks noGrp="1"/>
-          </p:cNvSpPr>
-          <p:nvPr>
-            <p:ph sz="quarter" idx="13"/>
-          </p:nvPr>
-        </p:nvSpPr>
-        <p:spPr/>
-        <p:txBody>
-          <a:bodyPr/>
-          <a:lstStyle/>
-          <a:p>
-            <a:endParaRPr lang="ru-RU" dirty="0"/>
-          </a:p>
-        </p:txBody>
-      </p:sp>
     </p:spTree>
     <p:extLst>
       <p:ext uri="{BB962C8B-B14F-4D97-AF65-F5344CB8AC3E}">
-        <p14:creationId xmlns:p14="http://schemas.microsoft.com/office/powerpoint/2010/main" val="62486603"/>
+        <p14:creationId xmlns:p14="http://schemas.microsoft.com/office/powerpoint/2010/main" val="1418351375"/>
       </p:ext>
     </p:extLst>
   </p:cSld>
   <p:clrMapOvr>
     <a:masterClrMapping/>
   </p:clrMapOvr>
+  <mc:AlternateContent xmlns:mc="http://schemas.openxmlformats.org/markup-compatibility/2006">
+    <mc:Choice xmlns:p14="http://schemas.microsoft.com/office/powerpoint/2010/main" Requires="p14">
+      <p:transition spd="slow" p14:dur="2000"/>
+    </mc:Choice>
+    <mc:Fallback>
+      <p:transition spd="slow"/>
+    </mc:Fallback>
+  </mc:AlternateContent>
   <p:timing>
     <p:tnLst>
       <p:par>
@@ -12611,63 +11891,197 @@
       </p:grpSpPr>
       <p:sp>
         <p:nvSpPr>
-          <p:cNvPr id="8" name="Заголовок 1"/>
-          <p:cNvSpPr txBox="1">
-            <a:spLocks/>
-          </p:cNvSpPr>
-          <p:nvPr/>
+          <p:cNvPr id="2" name="Заголовок 1"/>
+          <p:cNvSpPr>
+            <a:spLocks noGrp="1"/>
+          </p:cNvSpPr>
+          <p:nvPr>
+            <p:ph type="title"/>
+          </p:nvPr>
         </p:nvSpPr>
         <p:spPr>
           <a:xfrm>
-            <a:off x="457200" y="-603448"/>
-            <a:ext cx="8229600" cy="1600200"/>
+            <a:off x="0" y="-27384"/>
+            <a:ext cx="9144000" cy="1600200"/>
           </a:xfrm>
-          <a:prstGeom prst="rect">
-            <a:avLst/>
-          </a:prstGeom>
         </p:spPr>
         <p:txBody>
-          <a:bodyPr vert="horz" lIns="91440" tIns="45720" rIns="91440" bIns="45720" rtlCol="0" anchor="b">
-            <a:noAutofit/>
+          <a:bodyPr/>
+          <a:lstStyle/>
+          <a:p>
+            <a:r>
+              <a:rPr lang="en-US" dirty="0" smtClean="0"/>
+              <a:t>LTL</a:t>
+            </a:r>
+            <a:br>
+              <a:rPr lang="en-US" dirty="0" smtClean="0"/>
+            </a:br>
+            <a:r>
+              <a:rPr lang="en-US" dirty="0" smtClean="0"/>
+              <a:t>(</a:t>
+            </a:r>
+            <a:r>
+              <a:rPr lang="en-US" dirty="0"/>
+              <a:t>L</a:t>
+            </a:r>
+            <a:r>
+              <a:rPr lang="ru-RU" dirty="0" err="1" smtClean="0"/>
+              <a:t>inear</a:t>
+            </a:r>
+            <a:r>
+              <a:rPr lang="ru-RU" dirty="0" smtClean="0"/>
+              <a:t> </a:t>
+            </a:r>
+            <a:r>
+              <a:rPr lang="en-US" dirty="0"/>
+              <a:t>T</a:t>
+            </a:r>
+            <a:r>
+              <a:rPr lang="ru-RU" dirty="0" err="1"/>
+              <a:t>emporal</a:t>
+            </a:r>
+            <a:r>
+              <a:rPr lang="ru-RU" dirty="0"/>
+              <a:t> </a:t>
+            </a:r>
+            <a:r>
+              <a:rPr lang="en-US" dirty="0"/>
+              <a:t>L</a:t>
+            </a:r>
+            <a:r>
+              <a:rPr lang="ru-RU" dirty="0" err="1" smtClean="0"/>
+              <a:t>ogic</a:t>
+            </a:r>
+            <a:r>
+              <a:rPr lang="en-US" dirty="0" smtClean="0"/>
+              <a:t>)</a:t>
+            </a:r>
+            <a:endParaRPr lang="ru-RU" dirty="0"/>
+          </a:p>
+        </p:txBody>
+      </p:sp>
+      <p:sp>
+        <p:nvSpPr>
+          <p:cNvPr id="5" name="Объект 4"/>
+          <p:cNvSpPr>
+            <a:spLocks noGrp="1"/>
+          </p:cNvSpPr>
+          <p:nvPr>
+            <p:ph sz="quarter" idx="13"/>
+          </p:nvPr>
+        </p:nvSpPr>
+        <p:spPr>
+          <a:xfrm>
+            <a:off x="179512" y="1556792"/>
+            <a:ext cx="8784976" cy="4824536"/>
+          </a:xfrm>
+        </p:spPr>
+        <p:txBody>
+          <a:bodyPr>
+            <a:normAutofit fontScale="92500" lnSpcReduction="10000"/>
           </a:bodyPr>
-          <a:lstStyle>
-            <a:lvl1pPr algn="ctr" defTabSz="914400" rtl="0" eaLnBrk="1" latinLnBrk="0" hangingPunct="1">
-              <a:lnSpc>
-                <a:spcPts val="5800"/>
-              </a:lnSpc>
-              <a:spcBef>
-                <a:spcPct val="0"/>
-              </a:spcBef>
+          <a:lstStyle/>
+          <a:p>
+            <a:pPr marL="0" indent="0" algn="ctr">
               <a:buNone/>
-              <a:defRPr sz="5400" kern="1200">
-                <a:solidFill>
-                  <a:schemeClr val="tx2"/>
-                </a:solidFill>
-                <a:effectLst>
-                  <a:outerShdw blurRad="63500" dist="38100" dir="5400000" algn="t" rotWithShape="0">
-                    <a:prstClr val="black">
-                      <a:alpha val="25000"/>
-                    </a:prstClr>
-                  </a:outerShdw>
-                </a:effectLst>
-                <a:latin typeface="+mn-lt"/>
-                <a:ea typeface="+mj-ea"/>
-                <a:cs typeface="+mj-cs"/>
-              </a:defRPr>
-            </a:lvl1pPr>
-          </a:lstStyle>
-          <a:p>
-            <a:r>
-              <a:rPr lang="ru-RU" dirty="0" smtClean="0"/>
-              <a:t>Как работает спин</a:t>
-            </a:r>
-            <a:endParaRPr lang="ru-RU" dirty="0"/>
-          </a:p>
-        </p:txBody>
-      </p:sp>
-      <p:sp>
-        <p:nvSpPr>
-          <p:cNvPr id="15" name="Text Box 5"/>
+            </a:pPr>
+            <a:r>
+              <a:rPr lang="ru-RU" sz="3000" dirty="0" smtClean="0"/>
+              <a:t>Описание свойств</a:t>
+            </a:r>
+          </a:p>
+          <a:p>
+            <a:pPr marL="0" indent="0" algn="ctr">
+              <a:buNone/>
+            </a:pPr>
+            <a:r>
+              <a:rPr lang="ru-RU" sz="3000" dirty="0" smtClean="0"/>
+              <a:t>Позволяет описать как поведение системы представляется  во </a:t>
+            </a:r>
+            <a:r>
+              <a:rPr lang="ru-RU" sz="3000" dirty="0" smtClean="0"/>
+              <a:t>времени</a:t>
+            </a:r>
+          </a:p>
+          <a:p>
+            <a:pPr marL="0" indent="0">
+              <a:buNone/>
+            </a:pPr>
+            <a:endParaRPr lang="ru-RU" sz="2800" dirty="0" smtClean="0"/>
+          </a:p>
+          <a:p>
+            <a:pPr marL="0" indent="0">
+              <a:buNone/>
+            </a:pPr>
+            <a:r>
+              <a:rPr lang="ru-RU" sz="2800" dirty="0" smtClean="0"/>
+              <a:t>Пусть есть набор переменных как-то меняющихся во времени. Темпоральная логика позволяет сформулировать утверждения типа:</a:t>
+            </a:r>
+          </a:p>
+          <a:p>
+            <a:r>
+              <a:rPr lang="ru-RU" sz="2800" dirty="0" smtClean="0"/>
+              <a:t>Значение </a:t>
+            </a:r>
+            <a:r>
+              <a:rPr lang="en-US" sz="2800" i="1" dirty="0" smtClean="0"/>
+              <a:t>a</a:t>
+            </a:r>
+            <a:r>
+              <a:rPr lang="en-US" sz="2800" dirty="0" smtClean="0"/>
+              <a:t> </a:t>
+            </a:r>
+            <a:r>
+              <a:rPr lang="ru-RU" sz="2800" dirty="0" smtClean="0"/>
+              <a:t>всегда будет равно значению </a:t>
+            </a:r>
+            <a:r>
+              <a:rPr lang="en-US" sz="2800" i="1" dirty="0" smtClean="0"/>
+              <a:t>b</a:t>
+            </a:r>
+          </a:p>
+          <a:p>
+            <a:r>
+              <a:rPr lang="ru-RU" sz="2800" dirty="0" smtClean="0"/>
+              <a:t>Наступит момент, когда </a:t>
+            </a:r>
+            <a:r>
+              <a:rPr lang="en-US" sz="2800" i="1" dirty="0" smtClean="0"/>
+              <a:t>c</a:t>
+            </a:r>
+            <a:r>
+              <a:rPr lang="en-US" sz="2800" dirty="0" smtClean="0"/>
+              <a:t> </a:t>
+            </a:r>
+            <a:r>
+              <a:rPr lang="ru-RU" sz="2800" dirty="0" smtClean="0"/>
+              <a:t>станет равна 0</a:t>
+            </a:r>
+          </a:p>
+          <a:p>
+            <a:r>
+              <a:rPr lang="ru-RU" sz="2800" dirty="0" smtClean="0"/>
+              <a:t>Значение </a:t>
+            </a:r>
+            <a:r>
+              <a:rPr lang="en-US" sz="2800" i="1" dirty="0" smtClean="0"/>
+              <a:t>d</a:t>
+            </a:r>
+            <a:r>
+              <a:rPr lang="en-US" sz="2800" dirty="0" smtClean="0"/>
+              <a:t> </a:t>
+            </a:r>
+            <a:r>
+              <a:rPr lang="ru-RU" sz="2800" dirty="0" smtClean="0"/>
+              <a:t>будет становиться 1 бесконечное много раз</a:t>
+            </a:r>
+            <a:endParaRPr lang="ru-RU" sz="2800" dirty="0" smtClean="0"/>
+          </a:p>
+        </p:txBody>
+      </p:sp>
+      <p:sp>
+        <p:nvSpPr>
+          <p:cNvPr id="9" name="Text Box 5"/>
           <p:cNvSpPr txBox="1">
             <a:spLocks noChangeArrowheads="1"/>
           </p:cNvSpPr>
@@ -12726,33 +12140,7 @@
       </p:sp>
       <p:sp>
         <p:nvSpPr>
-          <p:cNvPr id="16" name="TextBox 15"/>
-          <p:cNvSpPr txBox="1"/>
-          <p:nvPr/>
-        </p:nvSpPr>
-        <p:spPr>
-          <a:xfrm>
-            <a:off x="1043608" y="3356992"/>
-            <a:ext cx="184731" cy="369332"/>
-          </a:xfrm>
-          <a:prstGeom prst="rect">
-            <a:avLst/>
-          </a:prstGeom>
-          <a:noFill/>
-        </p:spPr>
-        <p:txBody>
-          <a:bodyPr wrap="none" rtlCol="0">
-            <a:spAutoFit/>
-          </a:bodyPr>
-          <a:lstStyle/>
-          <a:p>
-            <a:endParaRPr lang="ru-RU" dirty="0"/>
-          </a:p>
-        </p:txBody>
-      </p:sp>
-      <p:sp>
-        <p:nvSpPr>
-          <p:cNvPr id="2" name="Номер слайда 1"/>
+          <p:cNvPr id="3" name="Номер слайда 2"/>
           <p:cNvSpPr>
             <a:spLocks noGrp="1"/>
           </p:cNvSpPr>
@@ -12773,35 +12161,24 @@
           </a:p>
         </p:txBody>
       </p:sp>
-      <p:sp>
-        <p:nvSpPr>
-          <p:cNvPr id="3" name="Объект 2"/>
-          <p:cNvSpPr>
-            <a:spLocks noGrp="1"/>
-          </p:cNvSpPr>
-          <p:nvPr>
-            <p:ph sz="quarter" idx="13"/>
-          </p:nvPr>
-        </p:nvSpPr>
-        <p:spPr/>
-        <p:txBody>
-          <a:bodyPr/>
-          <a:lstStyle/>
-          <a:p>
-            <a:endParaRPr lang="ru-RU" dirty="0"/>
-          </a:p>
-        </p:txBody>
-      </p:sp>
     </p:spTree>
     <p:extLst>
       <p:ext uri="{BB962C8B-B14F-4D97-AF65-F5344CB8AC3E}">
-        <p14:creationId xmlns:p14="http://schemas.microsoft.com/office/powerpoint/2010/main" val="1199183469"/>
+        <p14:creationId xmlns:p14="http://schemas.microsoft.com/office/powerpoint/2010/main" val="186383864"/>
       </p:ext>
     </p:extLst>
   </p:cSld>
   <p:clrMapOvr>
     <a:masterClrMapping/>
   </p:clrMapOvr>
+  <mc:AlternateContent xmlns:mc="http://schemas.openxmlformats.org/markup-compatibility/2006">
+    <mc:Choice xmlns:p14="http://schemas.microsoft.com/office/powerpoint/2010/main" Requires="p14">
+      <p:transition spd="slow" p14:dur="2000"/>
+    </mc:Choice>
+    <mc:Fallback>
+      <p:transition spd="slow"/>
+    </mc:Fallback>
+  </mc:AlternateContent>
   <p:timing>
     <p:tnLst>
       <p:par>

</xml_diff>

<commit_message>
Fix errors in speech an slides
</commit_message>
<xml_diff>
--- a/shatilina.pptx
+++ b/shatilina.pptx
@@ -5,7 +5,7 @@
     <p:sldMasterId id="2147483960" r:id="rId1"/>
   </p:sldMasterIdLst>
   <p:notesMasterIdLst>
-    <p:notesMasterId r:id="rId21"/>
+    <p:notesMasterId r:id="rId20"/>
   </p:notesMasterIdLst>
   <p:sldIdLst>
     <p:sldId id="257" r:id="rId2"/>
@@ -21,12 +21,11 @@
     <p:sldId id="281" r:id="rId12"/>
     <p:sldId id="282" r:id="rId13"/>
     <p:sldId id="285" r:id="rId14"/>
-    <p:sldId id="276" r:id="rId15"/>
-    <p:sldId id="283" r:id="rId16"/>
-    <p:sldId id="260" r:id="rId17"/>
-    <p:sldId id="258" r:id="rId18"/>
-    <p:sldId id="259" r:id="rId19"/>
-    <p:sldId id="275" r:id="rId20"/>
+    <p:sldId id="283" r:id="rId15"/>
+    <p:sldId id="260" r:id="rId16"/>
+    <p:sldId id="258" r:id="rId17"/>
+    <p:sldId id="259" r:id="rId18"/>
+    <p:sldId id="275" r:id="rId19"/>
   </p:sldIdLst>
   <p:sldSz cx="9144000" cy="6858000" type="screen4x3"/>
   <p:notesSz cx="6797675" cy="9926638"/>
@@ -708,11 +707,11 @@
             </a:r>
             <a:r>
               <a:rPr lang="ru-RU" baseline="0" dirty="0" smtClean="0"/>
-              <a:t>описания моделей прототипов </a:t>
+              <a:t>описания моделей </a:t>
             </a:r>
             <a:r>
               <a:rPr lang="ru-RU" baseline="0" dirty="0" smtClean="0"/>
-              <a:t>архитектур и специально разработанная структура абстрактного синтаксического дерева.</a:t>
+              <a:t>и специально разработанная структура абстрактного синтаксического дерева.</a:t>
             </a:r>
           </a:p>
         </p:txBody>
@@ -819,7 +818,7 @@
             </a:r>
             <a:r>
               <a:rPr lang="ru-RU" baseline="0" dirty="0" smtClean="0"/>
-              <a:t> информации, содержащейся в абстрактном синтаксическом дереве, в более удобную с точки зрения автоматных языков форму – граф потока исполнения. При построении такого графа для каждому узлу ставится в соответствие состояние в исходной модели, а каждой инструкции перехода между состояниями соответствует направленная дуга между соответствующими состояниями. Кроме того выделяются два базовых состояния, которые должны присутствовать в любой модели прототипа – начальное и конечное. </a:t>
+              <a:t> информации, содержащейся в абстрактном синтаксическом дереве, в более удобную с точки зрения автоматных языков форму – граф потока исполнения. При построении такого графа для каждому узлу ставится в соответствие состояние в исходной модели, а каждой инструкции перехода между состояниями соответствует ребро между состояниями. Кроме того выделяются два базовых состояния, которые должны присутствовать в любой модели прототипа – начальное и конечное. </a:t>
             </a:r>
             <a:endParaRPr lang="ru-RU" dirty="0"/>
           </a:p>
@@ -921,15 +920,7 @@
             </a:r>
             <a:r>
               <a:rPr lang="ru-RU" baseline="0" dirty="0" smtClean="0"/>
-              <a:t> модели описанные с помощью разработанного языка описания </a:t>
-            </a:r>
-            <a:r>
-              <a:rPr lang="ru-RU" baseline="0" dirty="0" err="1" smtClean="0"/>
-              <a:t>моделй</a:t>
-            </a:r>
-            <a:r>
-              <a:rPr lang="ru-RU" baseline="0" dirty="0" smtClean="0"/>
-              <a:t> приводятся к специализированному виду, пригодному для использования верификатором </a:t>
+              <a:t> модели описанные с помощью разработанного языка описания моделей приводятся к специализированному виду, пригодному для использования верификатором </a:t>
             </a:r>
             <a:r>
               <a:rPr lang="en-US" baseline="0" dirty="0" smtClean="0"/>
@@ -1153,14 +1144,20 @@
           <a:p>
             <a:r>
               <a:rPr lang="ru-RU" dirty="0" smtClean="0"/>
-              <a:t>На данном слайде представлен пример</a:t>
+              <a:t>Для удобства работы с разработанной системой был реализован плагин для среды разработки </a:t>
+            </a:r>
+            <a:r>
+              <a:rPr lang="en-US" dirty="0" smtClean="0"/>
+              <a:t>Eclipse, </a:t>
+            </a:r>
+            <a:r>
+              <a:rPr lang="ru-RU" dirty="0" smtClean="0"/>
+              <a:t>осуществляющий</a:t>
             </a:r>
             <a:r>
               <a:rPr lang="ru-RU" baseline="0" dirty="0" smtClean="0"/>
-              <a:t> работы системы</a:t>
-            </a:r>
-          </a:p>
-          <a:p>
+              <a:t> полноценную подсветку синтаксиса, автоматическое завершение ввода, а так же проверку ошибок.</a:t>
+            </a:r>
             <a:endParaRPr lang="ru-RU" dirty="0"/>
           </a:p>
         </p:txBody>
@@ -1245,23 +1242,140 @@
           <a:bodyPr/>
           <a:lstStyle/>
           <a:p>
+            <a:pPr marL="0" marR="0" indent="0" algn="l" defTabSz="914400" rtl="0" eaLnBrk="1" fontAlgn="auto" latinLnBrk="0" hangingPunct="1">
+              <a:lnSpc>
+                <a:spcPct val="100000"/>
+              </a:lnSpc>
+              <a:spcBef>
+                <a:spcPts val="0"/>
+              </a:spcBef>
+              <a:spcAft>
+                <a:spcPts val="0"/>
+              </a:spcAft>
+              <a:buClrTx/>
+              <a:buSzTx/>
+              <a:buFontTx/>
+              <a:buNone/>
+              <a:tabLst/>
+              <a:defRPr/>
+            </a:pPr>
+            <a:r>
+              <a:rPr lang="ru-RU" sz="1200" kern="1200" dirty="0" smtClean="0">
+                <a:solidFill>
+                  <a:schemeClr val="tx1"/>
+                </a:solidFill>
+                <a:effectLst/>
+                <a:latin typeface="+mn-lt"/>
+                <a:ea typeface="+mn-ea"/>
+                <a:cs typeface="+mn-cs"/>
+              </a:rPr>
+              <a:t>В результате работы над дипломным проектом, мною была разработана и формализована модель системы проектирования и тестирования каркасов</a:t>
+            </a:r>
+            <a:r>
+              <a:rPr lang="ru-RU" sz="1200" kern="1200" baseline="0" dirty="0" smtClean="0">
+                <a:solidFill>
+                  <a:schemeClr val="tx1"/>
+                </a:solidFill>
+                <a:effectLst/>
+                <a:latin typeface="+mn-lt"/>
+                <a:ea typeface="+mn-ea"/>
+                <a:cs typeface="+mn-cs"/>
+              </a:rPr>
+              <a:t> программных продуктов.</a:t>
+            </a:r>
+            <a:r>
+              <a:rPr lang="ru-RU" sz="1200" kern="1200" dirty="0" smtClean="0">
+                <a:solidFill>
+                  <a:schemeClr val="tx1"/>
+                </a:solidFill>
+                <a:effectLst/>
+                <a:latin typeface="+mn-lt"/>
+                <a:ea typeface="+mn-ea"/>
+                <a:cs typeface="+mn-cs"/>
+              </a:rPr>
+              <a:t> На базе модели спроектирована архитектура системы. На основе формализованной модели был спроектирован и реализован каркас системы проектирования и тестирования прототипов архитектур, с применением современных подходов и технологий программирования. </a:t>
+            </a:r>
+            <a:endParaRPr lang="en-US" sz="1200" kern="1200" dirty="0" smtClean="0">
+              <a:solidFill>
+                <a:schemeClr val="tx1"/>
+              </a:solidFill>
+              <a:effectLst/>
+              <a:latin typeface="+mn-lt"/>
+              <a:ea typeface="+mn-ea"/>
+              <a:cs typeface="+mn-cs"/>
+            </a:endParaRPr>
+          </a:p>
+          <a:p>
+            <a:pPr marL="0" marR="0" indent="0" algn="l" defTabSz="914400" rtl="0" eaLnBrk="1" fontAlgn="auto" latinLnBrk="0" hangingPunct="1">
+              <a:lnSpc>
+                <a:spcPct val="100000"/>
+              </a:lnSpc>
+              <a:spcBef>
+                <a:spcPts val="0"/>
+              </a:spcBef>
+              <a:spcAft>
+                <a:spcPts val="0"/>
+              </a:spcAft>
+              <a:buClrTx/>
+              <a:buSzTx/>
+              <a:buFontTx/>
+              <a:buNone/>
+              <a:tabLst/>
+              <a:defRPr/>
+            </a:pPr>
+            <a:r>
+              <a:rPr lang="en-US" sz="1200" kern="1200" dirty="0" smtClean="0">
+                <a:solidFill>
+                  <a:schemeClr val="tx1"/>
+                </a:solidFill>
+                <a:effectLst/>
+                <a:latin typeface="+mn-lt"/>
+                <a:ea typeface="+mn-ea"/>
+                <a:cs typeface="+mn-cs"/>
+              </a:rPr>
+              <a:t>{</a:t>
+            </a:r>
             <a:r>
               <a:rPr lang="ru-RU" dirty="0" smtClean="0"/>
-              <a:t>Для удобства работы с разработанной системой был реализован плагин для среды разработки </a:t>
-            </a:r>
-            <a:r>
-              <a:rPr lang="en-US" dirty="0" smtClean="0"/>
-              <a:t>Eclipse, </a:t>
-            </a:r>
-            <a:r>
-              <a:rPr lang="ru-RU" dirty="0" smtClean="0"/>
-              <a:t>осуществляющий</a:t>
+              <a:t>Модель системы, представляющая из</a:t>
             </a:r>
             <a:r>
               <a:rPr lang="ru-RU" baseline="0" dirty="0" smtClean="0"/>
-              <a:t> полноценную подсветку синтаксиса, автоматическое завершение ввода, а так же проверку ошибок.</a:t>
-            </a:r>
-            <a:endParaRPr lang="ru-RU" dirty="0"/>
+              <a:t> себя транслятор из разработанного языка </a:t>
+            </a:r>
+            <a:r>
+              <a:rPr lang="en-US" baseline="0" dirty="0" smtClean="0"/>
+              <a:t>Proto </a:t>
+            </a:r>
+            <a:r>
+              <a:rPr lang="ru-RU" baseline="0" dirty="0" smtClean="0"/>
+              <a:t>в язык автоматного программирования </a:t>
+            </a:r>
+            <a:r>
+              <a:rPr lang="en-US" baseline="0" dirty="0" smtClean="0"/>
+              <a:t>Promela</a:t>
+            </a:r>
+            <a:r>
+              <a:rPr lang="en-US" sz="1200" kern="1200" dirty="0" smtClean="0">
+                <a:solidFill>
+                  <a:schemeClr val="tx1"/>
+                </a:solidFill>
+                <a:effectLst/>
+                <a:latin typeface="+mn-lt"/>
+                <a:ea typeface="+mn-ea"/>
+                <a:cs typeface="+mn-cs"/>
+              </a:rPr>
+              <a:t>}</a:t>
+            </a:r>
+            <a:endParaRPr lang="ru-RU" sz="1200" kern="1200" dirty="0" smtClean="0">
+              <a:solidFill>
+                <a:schemeClr val="tx1"/>
+              </a:solidFill>
+              <a:effectLst/>
+              <a:latin typeface="+mn-lt"/>
+              <a:ea typeface="+mn-ea"/>
+              <a:cs typeface="+mn-cs"/>
+            </a:endParaRPr>
           </a:p>
         </p:txBody>
       </p:sp>
@@ -1291,7 +1405,7 @@
     </p:spTree>
     <p:extLst>
       <p:ext uri="{BB962C8B-B14F-4D97-AF65-F5344CB8AC3E}">
-        <p14:creationId xmlns:p14="http://schemas.microsoft.com/office/powerpoint/2010/main" val="1951951640"/>
+        <p14:creationId xmlns:p14="http://schemas.microsoft.com/office/powerpoint/2010/main" val="673092209"/>
       </p:ext>
     </p:extLst>
   </p:cSld>
@@ -1345,6 +1459,148 @@
           <a:bodyPr/>
           <a:lstStyle/>
           <a:p>
+            <a:r>
+              <a:rPr lang="ru-RU" dirty="0" smtClean="0"/>
+              <a:t>Коротко</a:t>
+            </a:r>
+            <a:r>
+              <a:rPr lang="ru-RU" baseline="0" dirty="0" smtClean="0"/>
+              <a:t> по каждому пункту</a:t>
+            </a:r>
+          </a:p>
+          <a:p>
+            <a:r>
+              <a:rPr lang="ru-RU" sz="1200" kern="1200" dirty="0" smtClean="0">
+                <a:solidFill>
+                  <a:schemeClr val="tx1"/>
+                </a:solidFill>
+                <a:effectLst/>
+                <a:latin typeface="+mn-lt"/>
+                <a:ea typeface="+mn-ea"/>
+                <a:cs typeface="+mn-cs"/>
+              </a:rPr>
+              <a:t>Можно выделить следующие пути развития проекта. </a:t>
+            </a:r>
+          </a:p>
+          <a:p>
+            <a:r>
+              <a:rPr lang="ru-RU" sz="1200" kern="1200" dirty="0" smtClean="0">
+                <a:solidFill>
+                  <a:schemeClr val="tx1"/>
+                </a:solidFill>
+                <a:effectLst/>
+                <a:latin typeface="+mn-lt"/>
+                <a:ea typeface="+mn-ea"/>
+                <a:cs typeface="+mn-cs"/>
+              </a:rPr>
+              <a:t>Во-первых, для наделения системы расширения возможностей</a:t>
+            </a:r>
+            <a:r>
+              <a:rPr lang="ru-RU" sz="1200" kern="1200" baseline="0" dirty="0" smtClean="0">
+                <a:solidFill>
+                  <a:schemeClr val="tx1"/>
+                </a:solidFill>
+                <a:effectLst/>
+                <a:latin typeface="+mn-lt"/>
+                <a:ea typeface="+mn-ea"/>
+                <a:cs typeface="+mn-cs"/>
+              </a:rPr>
+              <a:t> системы</a:t>
+            </a:r>
+            <a:r>
+              <a:rPr lang="ru-RU" sz="1200" kern="1200" dirty="0" smtClean="0">
+                <a:solidFill>
+                  <a:schemeClr val="tx1"/>
+                </a:solidFill>
+                <a:effectLst/>
+                <a:latin typeface="+mn-lt"/>
+                <a:ea typeface="+mn-ea"/>
+                <a:cs typeface="+mn-cs"/>
+              </a:rPr>
+              <a:t> требуется добавить</a:t>
+            </a:r>
+            <a:r>
+              <a:rPr lang="ru-RU" sz="1200" kern="1200" baseline="0" dirty="0" smtClean="0">
+                <a:solidFill>
+                  <a:schemeClr val="tx1"/>
+                </a:solidFill>
+                <a:effectLst/>
+                <a:latin typeface="+mn-lt"/>
+                <a:ea typeface="+mn-ea"/>
+                <a:cs typeface="+mn-cs"/>
+              </a:rPr>
+              <a:t> поддержку верификации </a:t>
+            </a:r>
+            <a:r>
+              <a:rPr lang="ru-RU" sz="1200" kern="1200" baseline="0" dirty="0" err="1" smtClean="0">
+                <a:solidFill>
+                  <a:schemeClr val="tx1"/>
+                </a:solidFill>
+                <a:effectLst/>
+                <a:latin typeface="+mn-lt"/>
+                <a:ea typeface="+mn-ea"/>
+                <a:cs typeface="+mn-cs"/>
+              </a:rPr>
+              <a:t>распределенных</a:t>
+            </a:r>
+            <a:r>
+              <a:rPr lang="ru-RU" sz="1200" kern="1200" baseline="0" dirty="0" smtClean="0">
+                <a:solidFill>
+                  <a:schemeClr val="tx1"/>
+                </a:solidFill>
+                <a:effectLst/>
+                <a:latin typeface="+mn-lt"/>
+                <a:ea typeface="+mn-ea"/>
+                <a:cs typeface="+mn-cs"/>
+              </a:rPr>
+              <a:t> и параллельных систем</a:t>
+            </a:r>
+            <a:r>
+              <a:rPr lang="en-US" sz="1200" kern="1200" baseline="0" dirty="0" smtClean="0">
+                <a:solidFill>
+                  <a:schemeClr val="tx1"/>
+                </a:solidFill>
+                <a:effectLst/>
+                <a:latin typeface="+mn-lt"/>
+                <a:ea typeface="+mn-ea"/>
+                <a:cs typeface="+mn-cs"/>
+              </a:rPr>
+              <a:t>;</a:t>
+            </a:r>
+            <a:endParaRPr lang="ru-RU" sz="1200" kern="1200" baseline="0" dirty="0" smtClean="0">
+              <a:solidFill>
+                <a:schemeClr val="tx1"/>
+              </a:solidFill>
+              <a:effectLst/>
+              <a:latin typeface="+mn-lt"/>
+              <a:ea typeface="+mn-ea"/>
+              <a:cs typeface="+mn-cs"/>
+            </a:endParaRPr>
+          </a:p>
+          <a:p>
+            <a:r>
+              <a:rPr lang="ru-RU" sz="1200" kern="1200" baseline="0" dirty="0" smtClean="0">
+                <a:solidFill>
+                  <a:schemeClr val="tx1"/>
+                </a:solidFill>
+                <a:effectLst/>
+                <a:latin typeface="+mn-lt"/>
+                <a:ea typeface="+mn-ea"/>
+                <a:cs typeface="+mn-cs"/>
+              </a:rPr>
+              <a:t>Во-вторых, генерация других целевых языков позволит расширить список используемых верификаторов</a:t>
+            </a:r>
+            <a:endParaRPr lang="ru-RU" sz="1200" kern="1200" dirty="0" smtClean="0">
+              <a:solidFill>
+                <a:schemeClr val="tx1"/>
+              </a:solidFill>
+              <a:effectLst/>
+              <a:latin typeface="+mn-lt"/>
+              <a:ea typeface="+mn-ea"/>
+              <a:cs typeface="+mn-cs"/>
+            </a:endParaRPr>
+          </a:p>
+          <a:p>
             <a:pPr marL="0" marR="0" indent="0" algn="l" defTabSz="914400" rtl="0" eaLnBrk="1" fontAlgn="auto" latinLnBrk="0" hangingPunct="1">
               <a:lnSpc>
                 <a:spcPct val="100000"/>
@@ -1372,10 +1628,10 @@
                 <a:ea typeface="+mn-ea"/>
                 <a:cs typeface="+mn-cs"/>
               </a:rPr>
-              <a:t>В результате работы над дипломным проектом, мною была разработана и формализована модель системы проектирования и тестирования каркасов</a:t>
-            </a:r>
-            <a:r>
-              <a:rPr lang="ru-RU" sz="1200" kern="1200" baseline="0" dirty="0" smtClean="0">
+              <a:t>Наконец, совершенствование компонентов и оптимизация алгоритмов базовой платформы системы позволит повысить </a:t>
+            </a:r>
+            <a:r>
+              <a:rPr lang="ru-RU" sz="1200" kern="1200" dirty="0" err="1" smtClean="0">
                 <a:solidFill>
                   <a:schemeClr val="tx1"/>
                 </a:solidFill>
@@ -1384,7 +1640,7 @@
                 <a:ea typeface="+mn-ea"/>
                 <a:cs typeface="+mn-cs"/>
               </a:rPr>
-              <a:t> программных продуктов.</a:t>
+              <a:t>эффектиность</a:t>
             </a:r>
             <a:r>
               <a:rPr lang="ru-RU" sz="1200" kern="1200" dirty="0" smtClean="0">
@@ -1396,38 +1652,10 @@
                 <a:ea typeface="+mn-ea"/>
                 <a:cs typeface="+mn-cs"/>
               </a:rPr>
-              <a:t> На базе модели спроектирована архитектура системы. На основе формализованной модели был спроектирован и реализован каркас системы проектирования и тестирования прототипов архитектур, с применением современных подходов и технологий программирования. </a:t>
-            </a:r>
-            <a:endParaRPr lang="en-US" sz="1200" kern="1200" dirty="0" smtClean="0">
-              <a:solidFill>
-                <a:schemeClr val="tx1"/>
-              </a:solidFill>
-              <a:effectLst/>
-              <a:latin typeface="+mn-lt"/>
-              <a:ea typeface="+mn-ea"/>
-              <a:cs typeface="+mn-cs"/>
-            </a:endParaRPr>
-          </a:p>
-          <a:p>
-            <a:pPr marL="0" marR="0" indent="0" algn="l" defTabSz="914400" rtl="0" eaLnBrk="1" fontAlgn="auto" latinLnBrk="0" hangingPunct="1">
-              <a:lnSpc>
-                <a:spcPct val="100000"/>
-              </a:lnSpc>
-              <a:spcBef>
-                <a:spcPts val="0"/>
-              </a:spcBef>
-              <a:spcAft>
-                <a:spcPts val="0"/>
-              </a:spcAft>
-              <a:buClrTx/>
-              <a:buSzTx/>
-              <a:buFontTx/>
-              <a:buNone/>
-              <a:tabLst/>
-              <a:defRPr/>
-            </a:pPr>
-            <a:r>
-              <a:rPr lang="en-US" sz="1200" kern="1200" dirty="0" smtClean="0">
+              <a:t> </a:t>
+            </a:r>
+            <a:r>
+              <a:rPr lang="ru-RU" sz="1200" kern="1200" dirty="0" err="1" smtClean="0">
                 <a:solidFill>
                   <a:schemeClr val="tx1"/>
                 </a:solidFill>
@@ -1436,30 +1664,10 @@
                 <a:ea typeface="+mn-ea"/>
                 <a:cs typeface="+mn-cs"/>
               </a:rPr>
-              <a:t>{</a:t>
-            </a:r>
-            <a:r>
-              <a:rPr lang="ru-RU" dirty="0" smtClean="0"/>
-              <a:t>Модель системы, представляющая из</a:t>
-            </a:r>
-            <a:r>
-              <a:rPr lang="ru-RU" baseline="0" dirty="0" smtClean="0"/>
-              <a:t> себя транслятор из разработанного языка </a:t>
-            </a:r>
-            <a:r>
-              <a:rPr lang="en-US" baseline="0" dirty="0" smtClean="0"/>
-              <a:t>Proto </a:t>
-            </a:r>
-            <a:r>
-              <a:rPr lang="ru-RU" baseline="0" dirty="0" smtClean="0"/>
-              <a:t>в язык автоматного программирования </a:t>
-            </a:r>
-            <a:r>
-              <a:rPr lang="en-US" baseline="0" dirty="0" smtClean="0"/>
-              <a:t>Promela</a:t>
-            </a:r>
-            <a:r>
-              <a:rPr lang="en-US" sz="1200" kern="1200" dirty="0" smtClean="0">
+              <a:t>ее</a:t>
+            </a:r>
+            <a:r>
+              <a:rPr lang="ru-RU" sz="1200" kern="1200" dirty="0" smtClean="0">
                 <a:solidFill>
                   <a:schemeClr val="tx1"/>
                 </a:solidFill>
@@ -1468,17 +1676,8 @@
                 <a:ea typeface="+mn-ea"/>
                 <a:cs typeface="+mn-cs"/>
               </a:rPr>
-              <a:t>}</a:t>
-            </a:r>
-            <a:endParaRPr lang="ru-RU" sz="1200" kern="1200" dirty="0" smtClean="0">
-              <a:solidFill>
-                <a:schemeClr val="tx1"/>
-              </a:solidFill>
-              <a:effectLst/>
-              <a:latin typeface="+mn-lt"/>
-              <a:ea typeface="+mn-ea"/>
-              <a:cs typeface="+mn-cs"/>
-            </a:endParaRPr>
+              <a:t> использования и сократить накладные расходы в работе полезной части. </a:t>
+            </a:r>
           </a:p>
         </p:txBody>
       </p:sp>
@@ -1508,7 +1707,7 @@
     </p:spTree>
     <p:extLst>
       <p:ext uri="{BB962C8B-B14F-4D97-AF65-F5344CB8AC3E}">
-        <p14:creationId xmlns:p14="http://schemas.microsoft.com/office/powerpoint/2010/main" val="673092209"/>
+        <p14:creationId xmlns:p14="http://schemas.microsoft.com/office/powerpoint/2010/main" val="3009207848"/>
       </p:ext>
     </p:extLst>
   </p:cSld>
@@ -1563,16 +1762,6 @@
           <a:lstStyle/>
           <a:p>
             <a:r>
-              <a:rPr lang="ru-RU" dirty="0" smtClean="0"/>
-              <a:t>Коротко</a:t>
-            </a:r>
-            <a:r>
-              <a:rPr lang="ru-RU" baseline="0" dirty="0" smtClean="0"/>
-              <a:t> по каждому пункту</a:t>
-            </a:r>
-          </a:p>
-          <a:p>
-            <a:r>
               <a:rPr lang="ru-RU" sz="1200" kern="1200" dirty="0" smtClean="0">
                 <a:solidFill>
                   <a:schemeClr val="tx1"/>
@@ -1582,205 +1771,9 @@
                 <a:ea typeface="+mn-ea"/>
                 <a:cs typeface="+mn-cs"/>
               </a:rPr>
-              <a:t>Можно выделить следующие пути развития проекта. </a:t>
-            </a:r>
-          </a:p>
-          <a:p>
-            <a:r>
-              <a:rPr lang="ru-RU" sz="1200" kern="1200" dirty="0" smtClean="0">
-                <a:solidFill>
-                  <a:schemeClr val="tx1"/>
-                </a:solidFill>
-                <a:effectLst/>
-                <a:latin typeface="+mn-lt"/>
-                <a:ea typeface="+mn-ea"/>
-                <a:cs typeface="+mn-cs"/>
-              </a:rPr>
-              <a:t>Во-первых, для наделения системы расширения возможностей</a:t>
-            </a:r>
-            <a:r>
-              <a:rPr lang="ru-RU" sz="1200" kern="1200" baseline="0" dirty="0" smtClean="0">
-                <a:solidFill>
-                  <a:schemeClr val="tx1"/>
-                </a:solidFill>
-                <a:effectLst/>
-                <a:latin typeface="+mn-lt"/>
-                <a:ea typeface="+mn-ea"/>
-                <a:cs typeface="+mn-cs"/>
-              </a:rPr>
-              <a:t> системы</a:t>
-            </a:r>
-            <a:r>
-              <a:rPr lang="ru-RU" sz="1200" kern="1200" dirty="0" smtClean="0">
-                <a:solidFill>
-                  <a:schemeClr val="tx1"/>
-                </a:solidFill>
-                <a:effectLst/>
-                <a:latin typeface="+mn-lt"/>
-                <a:ea typeface="+mn-ea"/>
-                <a:cs typeface="+mn-cs"/>
-              </a:rPr>
-              <a:t> требуется добавить</a:t>
-            </a:r>
-            <a:r>
-              <a:rPr lang="ru-RU" sz="1200" kern="1200" baseline="0" dirty="0" smtClean="0">
-                <a:solidFill>
-                  <a:schemeClr val="tx1"/>
-                </a:solidFill>
-                <a:effectLst/>
-                <a:latin typeface="+mn-lt"/>
-                <a:ea typeface="+mn-ea"/>
-                <a:cs typeface="+mn-cs"/>
-              </a:rPr>
-              <a:t> поддержку верификации </a:t>
-            </a:r>
-            <a:r>
-              <a:rPr lang="ru-RU" sz="1200" kern="1200" baseline="0" dirty="0" err="1" smtClean="0">
-                <a:solidFill>
-                  <a:schemeClr val="tx1"/>
-                </a:solidFill>
-                <a:effectLst/>
-                <a:latin typeface="+mn-lt"/>
-                <a:ea typeface="+mn-ea"/>
-                <a:cs typeface="+mn-cs"/>
-              </a:rPr>
-              <a:t>распределенных</a:t>
-            </a:r>
-            <a:r>
-              <a:rPr lang="ru-RU" sz="1200" kern="1200" baseline="0" dirty="0" smtClean="0">
-                <a:solidFill>
-                  <a:schemeClr val="tx1"/>
-                </a:solidFill>
-                <a:effectLst/>
-                <a:latin typeface="+mn-lt"/>
-                <a:ea typeface="+mn-ea"/>
-                <a:cs typeface="+mn-cs"/>
-              </a:rPr>
-              <a:t> и параллельных систем</a:t>
-            </a:r>
-            <a:r>
-              <a:rPr lang="en-US" sz="1200" kern="1200" baseline="0" dirty="0" smtClean="0">
-                <a:solidFill>
-                  <a:schemeClr val="tx1"/>
-                </a:solidFill>
-                <a:effectLst/>
-                <a:latin typeface="+mn-lt"/>
-                <a:ea typeface="+mn-ea"/>
-                <a:cs typeface="+mn-cs"/>
-              </a:rPr>
-              <a:t>;</a:t>
-            </a:r>
-            <a:endParaRPr lang="ru-RU" sz="1200" kern="1200" baseline="0" dirty="0" smtClean="0">
-              <a:solidFill>
-                <a:schemeClr val="tx1"/>
-              </a:solidFill>
-              <a:effectLst/>
-              <a:latin typeface="+mn-lt"/>
-              <a:ea typeface="+mn-ea"/>
-              <a:cs typeface="+mn-cs"/>
-            </a:endParaRPr>
-          </a:p>
-          <a:p>
-            <a:r>
-              <a:rPr lang="ru-RU" sz="1200" kern="1200" baseline="0" dirty="0" smtClean="0">
-                <a:solidFill>
-                  <a:schemeClr val="tx1"/>
-                </a:solidFill>
-                <a:effectLst/>
-                <a:latin typeface="+mn-lt"/>
-                <a:ea typeface="+mn-ea"/>
-                <a:cs typeface="+mn-cs"/>
-              </a:rPr>
-              <a:t>Во-вторых, генерация других целевых языков позволит расширить список используемых верификаторов</a:t>
-            </a:r>
-            <a:endParaRPr lang="ru-RU" sz="1200" kern="1200" dirty="0" smtClean="0">
-              <a:solidFill>
-                <a:schemeClr val="tx1"/>
-              </a:solidFill>
-              <a:effectLst/>
-              <a:latin typeface="+mn-lt"/>
-              <a:ea typeface="+mn-ea"/>
-              <a:cs typeface="+mn-cs"/>
-            </a:endParaRPr>
-          </a:p>
-          <a:p>
-            <a:pPr marL="0" marR="0" indent="0" algn="l" defTabSz="914400" rtl="0" eaLnBrk="1" fontAlgn="auto" latinLnBrk="0" hangingPunct="1">
-              <a:lnSpc>
-                <a:spcPct val="100000"/>
-              </a:lnSpc>
-              <a:spcBef>
-                <a:spcPts val="0"/>
-              </a:spcBef>
-              <a:spcAft>
-                <a:spcPts val="0"/>
-              </a:spcAft>
-              <a:buClrTx/>
-              <a:buSzTx/>
-              <a:buFontTx/>
-              <a:buNone/>
-              <a:tabLst/>
-              <a:defRPr/>
-            </a:pPr>
-            <a:r>
-              <a:rPr lang="ru-RU" sz="1200" kern="1200" dirty="0" smtClean="0">
-                <a:solidFill>
-                  <a:schemeClr val="tx1"/>
-                </a:solidFill>
-                <a:effectLst/>
-                <a:latin typeface="+mn-lt"/>
-                <a:ea typeface="+mn-ea"/>
-                <a:cs typeface="+mn-cs"/>
-              </a:rPr>
-              <a:t>Наконец, совершенствование компонентов и оптимизация алгоритмов базовой платформы системы позволит повысить </a:t>
-            </a:r>
-            <a:r>
-              <a:rPr lang="ru-RU" sz="1200" kern="1200" dirty="0" err="1" smtClean="0">
-                <a:solidFill>
-                  <a:schemeClr val="tx1"/>
-                </a:solidFill>
-                <a:effectLst/>
-                <a:latin typeface="+mn-lt"/>
-                <a:ea typeface="+mn-ea"/>
-                <a:cs typeface="+mn-cs"/>
-              </a:rPr>
-              <a:t>эффектиность</a:t>
-            </a:r>
-            <a:r>
-              <a:rPr lang="ru-RU" sz="1200" kern="1200" dirty="0" smtClean="0">
-                <a:solidFill>
-                  <a:schemeClr val="tx1"/>
-                </a:solidFill>
-                <a:effectLst/>
-                <a:latin typeface="+mn-lt"/>
-                <a:ea typeface="+mn-ea"/>
-                <a:cs typeface="+mn-cs"/>
-              </a:rPr>
-              <a:t> </a:t>
-            </a:r>
-            <a:r>
-              <a:rPr lang="ru-RU" sz="1200" kern="1200" dirty="0" err="1" smtClean="0">
-                <a:solidFill>
-                  <a:schemeClr val="tx1"/>
-                </a:solidFill>
-                <a:effectLst/>
-                <a:latin typeface="+mn-lt"/>
-                <a:ea typeface="+mn-ea"/>
-                <a:cs typeface="+mn-cs"/>
-              </a:rPr>
-              <a:t>ее</a:t>
-            </a:r>
-            <a:r>
-              <a:rPr lang="ru-RU" sz="1200" kern="1200" dirty="0" smtClean="0">
-                <a:solidFill>
-                  <a:schemeClr val="tx1"/>
-                </a:solidFill>
-                <a:effectLst/>
-                <a:latin typeface="+mn-lt"/>
-                <a:ea typeface="+mn-ea"/>
-                <a:cs typeface="+mn-cs"/>
-              </a:rPr>
-              <a:t> использования и сократить накладные расходы в работе полезной части. </a:t>
-            </a:r>
+              <a:t>На этом, у меня все. Спасибо за Ваше внимание. Я готова ответить на возникшие вопросы.</a:t>
+            </a:r>
+            <a:endParaRPr lang="ru-RU" dirty="0"/>
           </a:p>
         </p:txBody>
       </p:sp>
@@ -1810,7 +1803,7 @@
     </p:spTree>
     <p:extLst>
       <p:ext uri="{BB962C8B-B14F-4D97-AF65-F5344CB8AC3E}">
-        <p14:creationId xmlns:p14="http://schemas.microsoft.com/office/powerpoint/2010/main" val="3009207848"/>
+        <p14:creationId xmlns:p14="http://schemas.microsoft.com/office/powerpoint/2010/main" val="3726416636"/>
       </p:ext>
     </p:extLst>
   </p:cSld>
@@ -1864,19 +1857,66 @@
           <a:bodyPr/>
           <a:lstStyle/>
           <a:p>
-            <a:r>
-              <a:rPr lang="ru-RU" sz="1200" kern="1200" dirty="0" smtClean="0">
-                <a:solidFill>
-                  <a:schemeClr val="tx1"/>
-                </a:solidFill>
-                <a:effectLst/>
-                <a:latin typeface="+mn-lt"/>
-                <a:ea typeface="+mn-ea"/>
-                <a:cs typeface="+mn-cs"/>
-              </a:rPr>
-              <a:t>На этом, у меня все. Спасибо за Ваше внимание. Я готова ответить на возникшие вопросы.</a:t>
-            </a:r>
-            <a:endParaRPr lang="ru-RU" dirty="0"/>
+            <a:pPr marL="228600" indent="-228600">
+              <a:buAutoNum type="arabicPeriod"/>
+            </a:pPr>
+            <a:r>
+              <a:rPr lang="ru-RU" dirty="0" smtClean="0"/>
+              <a:t>Хорошо</a:t>
+            </a:r>
+            <a:r>
+              <a:rPr lang="ru-RU" baseline="0" dirty="0" smtClean="0"/>
+              <a:t> автоматизируем – участие человека ограничивается анализом </a:t>
+            </a:r>
+            <a:r>
+              <a:rPr lang="ru-RU" baseline="0" dirty="0" err="1" smtClean="0"/>
+              <a:t>контрпримера</a:t>
+            </a:r>
+            <a:endParaRPr lang="ru-RU" baseline="0" dirty="0" smtClean="0"/>
+          </a:p>
+          <a:p>
+            <a:pPr marL="228600" indent="-228600">
+              <a:buAutoNum type="arabicPeriod"/>
+            </a:pPr>
+            <a:r>
+              <a:rPr lang="ru-RU" dirty="0" smtClean="0"/>
+              <a:t>Если модель конечна, корректна и адекватна проверяемому свойству, то </a:t>
+            </a:r>
+            <a:r>
+              <a:rPr lang="ru-RU" dirty="0" err="1" smtClean="0"/>
+              <a:t>дается</a:t>
+            </a:r>
+            <a:r>
+              <a:rPr lang="ru-RU" dirty="0" smtClean="0"/>
+              <a:t> точный ответ</a:t>
+            </a:r>
+            <a:r>
+              <a:rPr lang="ru-RU" baseline="0" dirty="0" smtClean="0"/>
+              <a:t> – либо ошибок нет, либо </a:t>
+            </a:r>
+            <a:r>
+              <a:rPr lang="ru-RU" baseline="0" dirty="0" err="1" smtClean="0"/>
+              <a:t>выдается</a:t>
+            </a:r>
+            <a:r>
+              <a:rPr lang="ru-RU" baseline="0" dirty="0" smtClean="0"/>
+              <a:t> контрпример с </a:t>
+            </a:r>
+            <a:r>
+              <a:rPr lang="ru-RU" baseline="0" dirty="0" smtClean="0"/>
+              <a:t>ошибкой</a:t>
+            </a:r>
+            <a:endParaRPr lang="ru-RU" baseline="0" dirty="0" smtClean="0"/>
+          </a:p>
+          <a:p>
+            <a:pPr marL="228600" indent="-228600">
+              <a:buAutoNum type="arabicPeriod"/>
+            </a:pPr>
+            <a:r>
+              <a:rPr lang="ru-RU" baseline="0" dirty="0" smtClean="0"/>
+              <a:t>В ряде случаев построить конечную модель системы, при этом адекватную тому свойству, которое мы хотим проверить достаточно сложно</a:t>
+            </a:r>
+            <a:endParaRPr lang="ru-RU" dirty="0" smtClean="0"/>
           </a:p>
         </p:txBody>
       </p:sp>
@@ -1898,149 +1938,6 @@
             <a:fld id="{D2C5C3F3-C17D-45D2-AA34-92C6E86E38D2}" type="slidenum">
               <a:rPr lang="ru-RU" smtClean="0"/>
               <a:t>18</a:t>
-            </a:fld>
-            <a:endParaRPr lang="ru-RU"/>
-          </a:p>
-        </p:txBody>
-      </p:sp>
-    </p:spTree>
-    <p:extLst>
-      <p:ext uri="{BB962C8B-B14F-4D97-AF65-F5344CB8AC3E}">
-        <p14:creationId xmlns:p14="http://schemas.microsoft.com/office/powerpoint/2010/main" val="3726416636"/>
-      </p:ext>
-    </p:extLst>
-  </p:cSld>
-  <p:clrMapOvr>
-    <a:masterClrMapping/>
-  </p:clrMapOvr>
-</p:notes>
-</file>
-
-<file path=ppt/notesSlides/notesSlide19.xml><?xml version="1.0" encoding="utf-8"?>
-<p:notes xmlns:a="http://schemas.openxmlformats.org/drawingml/2006/main" xmlns:r="http://schemas.openxmlformats.org/officeDocument/2006/relationships" xmlns:p="http://schemas.openxmlformats.org/presentationml/2006/main">
-  <p:cSld>
-    <p:spTree>
-      <p:nvGrpSpPr>
-        <p:cNvPr id="1" name=""/>
-        <p:cNvGrpSpPr/>
-        <p:nvPr/>
-      </p:nvGrpSpPr>
-      <p:grpSpPr>
-        <a:xfrm>
-          <a:off x="0" y="0"/>
-          <a:ext cx="0" cy="0"/>
-          <a:chOff x="0" y="0"/>
-          <a:chExt cx="0" cy="0"/>
-        </a:xfrm>
-      </p:grpSpPr>
-      <p:sp>
-        <p:nvSpPr>
-          <p:cNvPr id="2" name="Образ слайда 1"/>
-          <p:cNvSpPr>
-            <a:spLocks noGrp="1" noRot="1" noChangeAspect="1"/>
-          </p:cNvSpPr>
-          <p:nvPr>
-            <p:ph type="sldImg"/>
-          </p:nvPr>
-        </p:nvSpPr>
-        <p:spPr/>
-      </p:sp>
-      <p:sp>
-        <p:nvSpPr>
-          <p:cNvPr id="3" name="Заметки 2"/>
-          <p:cNvSpPr>
-            <a:spLocks noGrp="1"/>
-          </p:cNvSpPr>
-          <p:nvPr>
-            <p:ph type="body" idx="1"/>
-          </p:nvPr>
-        </p:nvSpPr>
-        <p:spPr/>
-        <p:txBody>
-          <a:bodyPr/>
-          <a:lstStyle/>
-          <a:p>
-            <a:pPr marL="228600" indent="-228600">
-              <a:buAutoNum type="arabicPeriod"/>
-            </a:pPr>
-            <a:r>
-              <a:rPr lang="ru-RU" dirty="0" smtClean="0"/>
-              <a:t>Хорошо</a:t>
-            </a:r>
-            <a:r>
-              <a:rPr lang="ru-RU" baseline="0" dirty="0" smtClean="0"/>
-              <a:t> автоматизируем – участие человека ограничивается анализом </a:t>
-            </a:r>
-            <a:r>
-              <a:rPr lang="ru-RU" baseline="0" dirty="0" err="1" smtClean="0"/>
-              <a:t>контрпримера</a:t>
-            </a:r>
-            <a:endParaRPr lang="ru-RU" baseline="0" dirty="0" smtClean="0"/>
-          </a:p>
-          <a:p>
-            <a:pPr marL="228600" indent="-228600">
-              <a:buAutoNum type="arabicPeriod"/>
-            </a:pPr>
-            <a:r>
-              <a:rPr lang="ru-RU" dirty="0" smtClean="0"/>
-              <a:t>Если модель конечна, корректна и адекватна проверяемому свойству, то </a:t>
-            </a:r>
-            <a:r>
-              <a:rPr lang="ru-RU" dirty="0" err="1" smtClean="0"/>
-              <a:t>дается</a:t>
-            </a:r>
-            <a:r>
-              <a:rPr lang="ru-RU" dirty="0" smtClean="0"/>
-              <a:t> точный ответ</a:t>
-            </a:r>
-            <a:r>
-              <a:rPr lang="ru-RU" baseline="0" dirty="0" smtClean="0"/>
-              <a:t> – либо ошибок нет, либо </a:t>
-            </a:r>
-            <a:r>
-              <a:rPr lang="ru-RU" baseline="0" dirty="0" err="1" smtClean="0"/>
-              <a:t>выдается</a:t>
-            </a:r>
-            <a:r>
-              <a:rPr lang="ru-RU" baseline="0" dirty="0" smtClean="0"/>
-              <a:t> контрпример с </a:t>
-            </a:r>
-            <a:r>
-              <a:rPr lang="ru-RU" baseline="0" dirty="0" smtClean="0"/>
-              <a:t>ошибкой</a:t>
-            </a:r>
-            <a:endParaRPr lang="ru-RU" baseline="0" dirty="0" smtClean="0"/>
-          </a:p>
-          <a:p>
-            <a:pPr marL="228600" indent="-228600">
-              <a:buAutoNum type="arabicPeriod"/>
-            </a:pPr>
-            <a:r>
-              <a:rPr lang="ru-RU" baseline="0" dirty="0" smtClean="0"/>
-              <a:t>В ряде случаев построить конечную модель системы, при этом адекватную тому свойству, которое мы хотим проверить достаточно сложно</a:t>
-            </a:r>
-            <a:endParaRPr lang="ru-RU" dirty="0" smtClean="0"/>
-          </a:p>
-        </p:txBody>
-      </p:sp>
-      <p:sp>
-        <p:nvSpPr>
-          <p:cNvPr id="4" name="Номер слайда 3"/>
-          <p:cNvSpPr>
-            <a:spLocks noGrp="1"/>
-          </p:cNvSpPr>
-          <p:nvPr>
-            <p:ph type="sldNum" sz="quarter" idx="10"/>
-          </p:nvPr>
-        </p:nvSpPr>
-        <p:spPr/>
-        <p:txBody>
-          <a:bodyPr/>
-          <a:lstStyle/>
-          <a:p>
-            <a:fld id="{D2C5C3F3-C17D-45D2-AA34-92C6E86E38D2}" type="slidenum">
-              <a:rPr lang="ru-RU" smtClean="0"/>
-              <a:t>19</a:t>
             </a:fld>
             <a:endParaRPr lang="ru-RU"/>
           </a:p>
@@ -2345,7 +2242,7 @@
                 <a:ea typeface="+mn-ea"/>
                 <a:cs typeface="+mn-cs"/>
               </a:rPr>
-              <a:t>Состояние в работе прототипа можно определить как момент в работе прототипа архитектуры, который объединяет в неявной форме все входные воздействия прошлого, а также влияет на реакцию в текущий момент времени. Каждое состояние имеет вполне определённый смысл и качественно отличается от всех других состоянии, и кроме того однозначно определяет действия, которые могут совершаться в этом состоянии.</a:t>
+              <a:t>Состояние можно определить как момент в работе прототипа архитектуры, который объединяет в неявной форме все входные воздействия прошлого, а также влияет на реакцию в текущий момент времени. Каждое состояние имеет вполне определённый смысл и качественно отличается от всех других состоянии, и кроме того однозначно определяет действия, которые могут совершаться в этом состоянии.</a:t>
             </a:r>
             <a:endParaRPr lang="ru-RU" sz="1200" kern="1200" baseline="0" dirty="0" smtClean="0">
               <a:solidFill>
@@ -2358,6 +2255,42 @@
             </a:endParaRPr>
           </a:p>
           <a:p>
+            <a:r>
+              <a:rPr lang="en-US" sz="1200" kern="1200" baseline="0" dirty="0" smtClean="0">
+                <a:solidFill>
+                  <a:schemeClr val="tx1"/>
+                </a:solidFill>
+                <a:effectLst/>
+                <a:latin typeface="+mn-lt"/>
+                <a:ea typeface="+mn-ea"/>
+                <a:cs typeface="+mn-cs"/>
+              </a:rPr>
+              <a:t>{</a:t>
+            </a:r>
+            <a:r>
+              <a:rPr lang="ru-RU" sz="1200" kern="1200" dirty="0" smtClean="0">
+                <a:solidFill>
+                  <a:schemeClr val="tx1"/>
+                </a:solidFill>
+                <a:effectLst/>
+                <a:latin typeface="+mn-lt"/>
+                <a:ea typeface="+mn-ea"/>
+                <a:cs typeface="+mn-cs"/>
+              </a:rPr>
+              <a:t>Сценарий прототипа представляет собой множество правил перехода между состояниями, каждое из которых отражает возможность выполнения каждого требования спецификации. Главная задача сценария состоит в том, чтобы подтвердить или опровергнуть выполнение какого-либо свойства из набора спецификации.</a:t>
+            </a:r>
+            <a:r>
+              <a:rPr lang="en-US" sz="1200" kern="1200" baseline="0" dirty="0" smtClean="0">
+                <a:solidFill>
+                  <a:schemeClr val="tx1"/>
+                </a:solidFill>
+                <a:effectLst/>
+                <a:latin typeface="+mn-lt"/>
+                <a:ea typeface="+mn-ea"/>
+                <a:cs typeface="+mn-cs"/>
+              </a:rPr>
+              <a:t>}</a:t>
+            </a:r>
             <a:endParaRPr lang="ru-RU" sz="1200" kern="1200" baseline="0" dirty="0" smtClean="0">
               <a:solidFill>
                 <a:schemeClr val="tx1"/>
@@ -2370,7 +2303,7 @@
           </a:p>
           <a:p>
             <a:r>
-              <a:rPr lang="en-US" sz="1200" kern="1200" baseline="0" dirty="0" smtClean="0">
+              <a:rPr lang="ru-RU" sz="1200" kern="1200" baseline="0" dirty="0" smtClean="0">
                 <a:solidFill>
                   <a:schemeClr val="tx1"/>
                 </a:solidFill>
@@ -2379,10 +2312,12 @@
                 <a:ea typeface="+mn-ea"/>
                 <a:cs typeface="+mn-cs"/>
               </a:rPr>
-              <a:t>{</a:t>
-            </a:r>
-            <a:r>
-              <a:rPr lang="ru-RU" sz="1200" kern="1200" dirty="0" smtClean="0">
+              <a:t>Такая модель была введена для обобщения описания архитектур систем</a:t>
+            </a:r>
+          </a:p>
+          <a:p>
+            <a:r>
+              <a:rPr lang="ru-RU" sz="1200" b="1" kern="1200" baseline="0" dirty="0" smtClean="0">
                 <a:solidFill>
                   <a:schemeClr val="tx1"/>
                 </a:solidFill>
@@ -2391,69 +2326,8 @@
                 <a:ea typeface="+mn-ea"/>
                 <a:cs typeface="+mn-cs"/>
               </a:rPr>
-              <a:t>Сценарий прототипа представляет собой множество правил перехода между состояниями, каждое из которых отражает возможность выполнения каждого требования спецификации. Главная задача сценария состоит в том, чтобы подтвердить или опровергнуть выполнение какого-либо свойства из набора спецификации.</a:t>
-            </a:r>
-            <a:r>
-              <a:rPr lang="en-US" sz="1200" kern="1200" baseline="0" dirty="0" smtClean="0">
-                <a:solidFill>
-                  <a:schemeClr val="tx1"/>
-                </a:solidFill>
-                <a:effectLst/>
-                <a:latin typeface="+mn-lt"/>
-                <a:ea typeface="+mn-ea"/>
-                <a:cs typeface="+mn-cs"/>
-              </a:rPr>
-              <a:t>}</a:t>
-            </a:r>
-          </a:p>
-          <a:p>
-            <a:endParaRPr lang="ru-RU" sz="1200" kern="1200" baseline="0" dirty="0" smtClean="0">
-              <a:solidFill>
-                <a:schemeClr val="tx1"/>
-              </a:solidFill>
-              <a:effectLst/>
-              <a:latin typeface="+mn-lt"/>
-              <a:ea typeface="+mn-ea"/>
-              <a:cs typeface="+mn-cs"/>
-            </a:endParaRPr>
-          </a:p>
-          <a:p>
-            <a:r>
-              <a:rPr lang="ru-RU" sz="1200" kern="1200" baseline="0" dirty="0" smtClean="0">
-                <a:solidFill>
-                  <a:schemeClr val="tx1"/>
-                </a:solidFill>
-                <a:effectLst/>
-                <a:latin typeface="+mn-lt"/>
-                <a:ea typeface="+mn-ea"/>
-                <a:cs typeface="+mn-cs"/>
-              </a:rPr>
-              <a:t>Понятие модели прототипа архитектуры было введено для обобщения описания архитектур систем</a:t>
-            </a:r>
-          </a:p>
-          <a:p>
-            <a:endParaRPr lang="ru-RU" sz="1200" kern="1200" baseline="0" dirty="0" smtClean="0">
-              <a:solidFill>
-                <a:schemeClr val="tx1"/>
-              </a:solidFill>
-              <a:effectLst/>
-              <a:latin typeface="+mn-lt"/>
-              <a:ea typeface="+mn-ea"/>
-              <a:cs typeface="+mn-cs"/>
-            </a:endParaRPr>
-          </a:p>
-          <a:p>
-            <a:r>
-              <a:rPr lang="ru-RU" b="1" baseline="0" dirty="0" smtClean="0"/>
-              <a:t>Почему так удобно описывать систему</a:t>
-            </a:r>
-          </a:p>
-          <a:p>
-            <a:r>
-              <a:rPr lang="ru-RU" b="1" baseline="0" dirty="0" smtClean="0"/>
-              <a:t>Зачем это надо</a:t>
-            </a:r>
-            <a:endParaRPr lang="en-US" b="1" baseline="0" dirty="0" smtClean="0"/>
+              <a:t>Существует большое количество практик, методологии и инструментов, позволяющих тестировать модели заданные подобным образом</a:t>
+            </a:r>
           </a:p>
         </p:txBody>
       </p:sp>
@@ -2543,7 +2417,7 @@
             </a:r>
             <a:r>
               <a:rPr lang="ru-RU" baseline="0" dirty="0" smtClean="0"/>
-              <a:t> архитектуру приложения можно провести её верификацию, то есть проверить соответствие между прототипом и требованиями к нему.</a:t>
+              <a:t> архитектуру приложения можно провести её тестирование или верификацию, то есть проверить соответствие между прототипом и требованиями к нему.</a:t>
             </a:r>
             <a:endParaRPr lang="ru-RU" dirty="0" smtClean="0"/>
           </a:p>
@@ -2689,7 +2563,7 @@
           <a:p>
             <a:r>
               <a:rPr lang="ru-RU" baseline="0" dirty="0" smtClean="0"/>
-              <a:t>На основе формальной модели мной была спроектирована структура системы проектирования и тестирования.</a:t>
+              <a:t>На основе формальной модели мной была спроектирована структура системы.</a:t>
             </a:r>
           </a:p>
           <a:p>
@@ -2744,7 +2618,7 @@
                 <a:ea typeface="+mn-ea"/>
                 <a:cs typeface="+mn-cs"/>
               </a:rPr>
-              <a:t>прототип архитектуры на специализированном разработанном языке</a:t>
+              <a:t>прототип архитектуры на специализированном языке</a:t>
             </a:r>
             <a:r>
               <a:rPr lang="ru-RU" sz="1200" kern="1200" baseline="0" dirty="0" smtClean="0">
@@ -2756,7 +2630,7 @@
                 <a:ea typeface="+mn-ea"/>
                 <a:cs typeface="+mn-cs"/>
               </a:rPr>
-              <a:t> описания моделей прототипов</a:t>
+              <a:t> описания моделей</a:t>
             </a:r>
             <a:r>
               <a:rPr lang="ru-RU" sz="1200" kern="1200" dirty="0" smtClean="0">
@@ -2780,31 +2654,7 @@
                 <a:ea typeface="+mn-ea"/>
                 <a:cs typeface="+mn-cs"/>
               </a:rPr>
-              <a:t> транслирует полученный прототип архитектуры на выбранный целевой язык автоматного программирования. Полученная модель на целевом языке автоматного программирования является пригодной для верификации существующим верификатором. При помощи верификатора можно получить анализатор модели прототипа и получить результат верификации – узнать что ошибок нет или посмотреть путь, который </a:t>
-            </a:r>
-            <a:r>
-              <a:rPr lang="ru-RU" sz="1200" kern="1200" baseline="0" dirty="0" err="1" smtClean="0">
-                <a:solidFill>
-                  <a:schemeClr val="tx1"/>
-                </a:solidFill>
-                <a:effectLst/>
-                <a:latin typeface="+mn-lt"/>
-                <a:ea typeface="+mn-ea"/>
-                <a:cs typeface="+mn-cs"/>
-              </a:rPr>
-              <a:t>привел</a:t>
-            </a:r>
-            <a:r>
-              <a:rPr lang="ru-RU" sz="1200" kern="1200" baseline="0" dirty="0" smtClean="0">
-                <a:solidFill>
-                  <a:schemeClr val="tx1"/>
-                </a:solidFill>
-                <a:effectLst/>
-                <a:latin typeface="+mn-lt"/>
-                <a:ea typeface="+mn-ea"/>
-                <a:cs typeface="+mn-cs"/>
-              </a:rPr>
-              <a:t> к ошибке (контрпример)</a:t>
+              <a:t> транслирует полученный прототип архитектуры на выбранный целевой язык автоматного программирования. Полученная модель на целевом языке является пригодной для верификации. При помощи верификатора можно получить анализатор для модели прототипа и получить результат верификации или ошибку (контрпример)</a:t>
             </a:r>
             <a:endParaRPr lang="ru-RU" sz="1200" kern="1200" dirty="0" smtClean="0">
               <a:solidFill>
@@ -2921,7 +2771,7 @@
             </a:r>
             <a:r>
               <a:rPr lang="ru-RU" sz="1200" baseline="0" dirty="0" smtClean="0"/>
-              <a:t> будем рассматривать верификатор </a:t>
+              <a:t> будем рассматривать </a:t>
             </a:r>
             <a:r>
               <a:rPr lang="en-US" sz="1200" baseline="0" dirty="0" smtClean="0"/>
@@ -3556,7 +3406,7 @@
                 <a:ea typeface="+mn-ea"/>
                 <a:cs typeface="+mn-cs"/>
               </a:rPr>
-              <a:t> систему</a:t>
+              <a:t> системы</a:t>
             </a:r>
             <a:r>
               <a:rPr lang="ru-RU" sz="1200" kern="1200" dirty="0" smtClean="0">
@@ -3568,7 +3418,7 @@
                 <a:ea typeface="+mn-ea"/>
                 <a:cs typeface="+mn-cs"/>
               </a:rPr>
-              <a:t>, нами была спроектирована архитектура системы проектирования и тестирования каркасов программных продуктов, состоящая из трёх основных компонентов – подсистемы</a:t>
+              <a:t>, мной была спроектирована архитектура системы, состоящая из трёх основных компонентов – подсистемы</a:t>
             </a:r>
             <a:r>
               <a:rPr lang="ru-RU" sz="1200" kern="1200" baseline="0" dirty="0" smtClean="0">
@@ -8169,15 +8019,208 @@
           </a:p>
         </p:txBody>
       </p:sp>
+      <p:sp>
+        <p:nvSpPr>
+          <p:cNvPr id="8" name="Объект 9"/>
+          <p:cNvSpPr txBox="1">
+            <a:spLocks/>
+          </p:cNvSpPr>
+          <p:nvPr/>
+        </p:nvSpPr>
+        <p:spPr>
+          <a:xfrm>
+            <a:off x="827585" y="869405"/>
+            <a:ext cx="7632847" cy="1263451"/>
+          </a:xfrm>
+          <a:prstGeom prst="rect">
+            <a:avLst/>
+          </a:prstGeom>
+        </p:spPr>
+        <p:txBody>
+          <a:bodyPr/>
+          <a:lstStyle>
+            <a:lvl1pPr marL="342900" indent="-342900" algn="l" defTabSz="914400" rtl="0" eaLnBrk="1" latinLnBrk="0" hangingPunct="1">
+              <a:spcBef>
+                <a:spcPct val="20000"/>
+              </a:spcBef>
+              <a:buFont typeface="Arial" pitchFamily="34" charset="0"/>
+              <a:buChar char="•"/>
+              <a:defRPr sz="2400" kern="1200">
+                <a:solidFill>
+                  <a:schemeClr val="tx1">
+                    <a:lumMod val="50000"/>
+                    <a:lumOff val="50000"/>
+                  </a:schemeClr>
+                </a:solidFill>
+                <a:latin typeface="+mj-lt"/>
+                <a:ea typeface="+mn-ea"/>
+                <a:cs typeface="+mn-cs"/>
+              </a:defRPr>
+            </a:lvl1pPr>
+            <a:lvl2pPr marL="742950" indent="-285750" algn="l" defTabSz="914400" rtl="0" eaLnBrk="1" latinLnBrk="0" hangingPunct="1">
+              <a:spcBef>
+                <a:spcPct val="20000"/>
+              </a:spcBef>
+              <a:buFont typeface="Courier New" pitchFamily="49" charset="0"/>
+              <a:buChar char="o"/>
+              <a:defRPr sz="1600" kern="1200">
+                <a:solidFill>
+                  <a:schemeClr val="tx1">
+                    <a:lumMod val="50000"/>
+                    <a:lumOff val="50000"/>
+                  </a:schemeClr>
+                </a:solidFill>
+                <a:latin typeface="+mj-lt"/>
+                <a:ea typeface="+mn-ea"/>
+                <a:cs typeface="+mn-cs"/>
+              </a:defRPr>
+            </a:lvl2pPr>
+            <a:lvl3pPr marL="1143000" indent="-228600" algn="l" defTabSz="914400" rtl="0" eaLnBrk="1" latinLnBrk="0" hangingPunct="1">
+              <a:spcBef>
+                <a:spcPct val="20000"/>
+              </a:spcBef>
+              <a:buFont typeface="Arial" pitchFamily="34" charset="0"/>
+              <a:buChar char="•"/>
+              <a:defRPr sz="1600" kern="1200">
+                <a:solidFill>
+                  <a:schemeClr val="tx1">
+                    <a:lumMod val="50000"/>
+                    <a:lumOff val="50000"/>
+                  </a:schemeClr>
+                </a:solidFill>
+                <a:latin typeface="+mj-lt"/>
+                <a:ea typeface="+mn-ea"/>
+                <a:cs typeface="+mn-cs"/>
+              </a:defRPr>
+            </a:lvl3pPr>
+            <a:lvl4pPr marL="1600200" indent="-228600" algn="l" defTabSz="914400" rtl="0" eaLnBrk="1" latinLnBrk="0" hangingPunct="1">
+              <a:spcBef>
+                <a:spcPct val="20000"/>
+              </a:spcBef>
+              <a:buFont typeface="Courier New" pitchFamily="49" charset="0"/>
+              <a:buChar char="o"/>
+              <a:defRPr sz="1600" kern="1200">
+                <a:solidFill>
+                  <a:schemeClr val="tx1">
+                    <a:lumMod val="50000"/>
+                    <a:lumOff val="50000"/>
+                  </a:schemeClr>
+                </a:solidFill>
+                <a:latin typeface="+mj-lt"/>
+                <a:ea typeface="+mn-ea"/>
+                <a:cs typeface="+mn-cs"/>
+              </a:defRPr>
+            </a:lvl4pPr>
+            <a:lvl5pPr marL="2057400" indent="-228600" algn="l" defTabSz="914400" rtl="0" eaLnBrk="1" latinLnBrk="0" hangingPunct="1">
+              <a:spcBef>
+                <a:spcPct val="20000"/>
+              </a:spcBef>
+              <a:buFont typeface="Arial" pitchFamily="34" charset="0"/>
+              <a:buChar char="•"/>
+              <a:defRPr sz="1600" kern="1200">
+                <a:solidFill>
+                  <a:schemeClr val="tx1">
+                    <a:lumMod val="50000"/>
+                    <a:lumOff val="50000"/>
+                  </a:schemeClr>
+                </a:solidFill>
+                <a:latin typeface="+mj-lt"/>
+                <a:ea typeface="+mn-ea"/>
+                <a:cs typeface="+mn-cs"/>
+              </a:defRPr>
+            </a:lvl5pPr>
+            <a:lvl6pPr marL="2514600" indent="-228600" algn="l" defTabSz="914400" rtl="0" eaLnBrk="1" latinLnBrk="0" hangingPunct="1">
+              <a:spcBef>
+                <a:spcPct val="20000"/>
+              </a:spcBef>
+              <a:buFont typeface="Courier New" pitchFamily="49" charset="0"/>
+              <a:buChar char="o"/>
+              <a:defRPr sz="1600" kern="1200">
+                <a:solidFill>
+                  <a:schemeClr val="tx1">
+                    <a:lumMod val="50000"/>
+                    <a:lumOff val="50000"/>
+                  </a:schemeClr>
+                </a:solidFill>
+                <a:latin typeface="+mj-lt"/>
+                <a:ea typeface="+mn-ea"/>
+                <a:cs typeface="+mn-cs"/>
+              </a:defRPr>
+            </a:lvl6pPr>
+            <a:lvl7pPr marL="2971800" indent="-228600" algn="l" defTabSz="914400" rtl="0" eaLnBrk="1" latinLnBrk="0" hangingPunct="1">
+              <a:spcBef>
+                <a:spcPct val="20000"/>
+              </a:spcBef>
+              <a:buFont typeface="Arial" pitchFamily="34" charset="0"/>
+              <a:buChar char="•"/>
+              <a:defRPr sz="1600" kern="1200">
+                <a:solidFill>
+                  <a:schemeClr val="tx1">
+                    <a:lumMod val="50000"/>
+                    <a:lumOff val="50000"/>
+                  </a:schemeClr>
+                </a:solidFill>
+                <a:latin typeface="+mj-lt"/>
+                <a:ea typeface="+mn-ea"/>
+                <a:cs typeface="+mn-cs"/>
+              </a:defRPr>
+            </a:lvl7pPr>
+            <a:lvl8pPr marL="3429000" indent="-228600" algn="l" defTabSz="914400" rtl="0" eaLnBrk="1" latinLnBrk="0" hangingPunct="1">
+              <a:spcBef>
+                <a:spcPct val="20000"/>
+              </a:spcBef>
+              <a:buFont typeface="Courier New" pitchFamily="49" charset="0"/>
+              <a:buChar char="o"/>
+              <a:defRPr sz="1600" kern="1200">
+                <a:solidFill>
+                  <a:schemeClr val="tx1">
+                    <a:lumMod val="50000"/>
+                    <a:lumOff val="50000"/>
+                  </a:schemeClr>
+                </a:solidFill>
+                <a:latin typeface="+mj-lt"/>
+                <a:ea typeface="+mn-ea"/>
+                <a:cs typeface="+mn-cs"/>
+              </a:defRPr>
+            </a:lvl8pPr>
+            <a:lvl9pPr marL="3886200" indent="-228600" algn="l" defTabSz="914400" rtl="0" eaLnBrk="1" latinLnBrk="0" hangingPunct="1">
+              <a:spcBef>
+                <a:spcPct val="20000"/>
+              </a:spcBef>
+              <a:buFont typeface="Arial" pitchFamily="34" charset="0"/>
+              <a:buChar char="•"/>
+              <a:defRPr sz="1600" kern="1200">
+                <a:solidFill>
+                  <a:schemeClr val="tx1">
+                    <a:lumMod val="50000"/>
+                    <a:lumOff val="50000"/>
+                  </a:schemeClr>
+                </a:solidFill>
+                <a:latin typeface="+mj-lt"/>
+                <a:ea typeface="+mn-ea"/>
+                <a:cs typeface="+mn-cs"/>
+              </a:defRPr>
+            </a:lvl9pPr>
+          </a:lstStyle>
+          <a:p>
+            <a:pPr marL="0" indent="0" algn="ctr">
+              <a:buNone/>
+            </a:pPr>
+            <a:r>
+              <a:rPr lang="ru-RU" b="1" dirty="0" smtClean="0"/>
+              <a:t>Имитация автоматической коробки передач</a:t>
+            </a:r>
+            <a:endParaRPr lang="en-US" b="1" dirty="0" smtClean="0"/>
+          </a:p>
+        </p:txBody>
+      </p:sp>
       <p:pic>
         <p:nvPicPr>
-          <p:cNvPr id="9" name="Объект 8"/>
+          <p:cNvPr id="11" name="Объект 5"/>
           <p:cNvPicPr>
-            <a:picLocks noGrp="1" noChangeAspect="1"/>
+            <a:picLocks noChangeAspect="1"/>
           </p:cNvPicPr>
-          <p:nvPr>
-            <p:ph idx="1"/>
-          </p:nvPr>
+          <p:nvPr/>
         </p:nvPicPr>
         <p:blipFill>
           <a:blip r:embed="rId3">
@@ -8193,432 +8236,7 @@
         </p:blipFill>
         <p:spPr>
           <a:xfrm>
-            <a:off x="4499992" y="1291087"/>
-            <a:ext cx="3798421" cy="5184576"/>
-          </a:xfrm>
-        </p:spPr>
-      </p:pic>
-      <p:sp>
-        <p:nvSpPr>
-          <p:cNvPr id="8" name="Объект 9"/>
-          <p:cNvSpPr txBox="1">
-            <a:spLocks/>
-          </p:cNvSpPr>
-          <p:nvPr/>
-        </p:nvSpPr>
-        <p:spPr>
-          <a:xfrm>
-            <a:off x="827585" y="869405"/>
-            <a:ext cx="7632847" cy="1263451"/>
-          </a:xfrm>
-          <a:prstGeom prst="rect">
-            <a:avLst/>
-          </a:prstGeom>
-        </p:spPr>
-        <p:txBody>
-          <a:bodyPr/>
-          <a:lstStyle>
-            <a:lvl1pPr marL="342900" indent="-342900" algn="l" defTabSz="914400" rtl="0" eaLnBrk="1" latinLnBrk="0" hangingPunct="1">
-              <a:spcBef>
-                <a:spcPct val="20000"/>
-              </a:spcBef>
-              <a:buFont typeface="Arial" pitchFamily="34" charset="0"/>
-              <a:buChar char="•"/>
-              <a:defRPr sz="2400" kern="1200">
-                <a:solidFill>
-                  <a:schemeClr val="tx1">
-                    <a:lumMod val="50000"/>
-                    <a:lumOff val="50000"/>
-                  </a:schemeClr>
-                </a:solidFill>
-                <a:latin typeface="+mj-lt"/>
-                <a:ea typeface="+mn-ea"/>
-                <a:cs typeface="+mn-cs"/>
-              </a:defRPr>
-            </a:lvl1pPr>
-            <a:lvl2pPr marL="742950" indent="-285750" algn="l" defTabSz="914400" rtl="0" eaLnBrk="1" latinLnBrk="0" hangingPunct="1">
-              <a:spcBef>
-                <a:spcPct val="20000"/>
-              </a:spcBef>
-              <a:buFont typeface="Courier New" pitchFamily="49" charset="0"/>
-              <a:buChar char="o"/>
-              <a:defRPr sz="1600" kern="1200">
-                <a:solidFill>
-                  <a:schemeClr val="tx1">
-                    <a:lumMod val="50000"/>
-                    <a:lumOff val="50000"/>
-                  </a:schemeClr>
-                </a:solidFill>
-                <a:latin typeface="+mj-lt"/>
-                <a:ea typeface="+mn-ea"/>
-                <a:cs typeface="+mn-cs"/>
-              </a:defRPr>
-            </a:lvl2pPr>
-            <a:lvl3pPr marL="1143000" indent="-228600" algn="l" defTabSz="914400" rtl="0" eaLnBrk="1" latinLnBrk="0" hangingPunct="1">
-              <a:spcBef>
-                <a:spcPct val="20000"/>
-              </a:spcBef>
-              <a:buFont typeface="Arial" pitchFamily="34" charset="0"/>
-              <a:buChar char="•"/>
-              <a:defRPr sz="1600" kern="1200">
-                <a:solidFill>
-                  <a:schemeClr val="tx1">
-                    <a:lumMod val="50000"/>
-                    <a:lumOff val="50000"/>
-                  </a:schemeClr>
-                </a:solidFill>
-                <a:latin typeface="+mj-lt"/>
-                <a:ea typeface="+mn-ea"/>
-                <a:cs typeface="+mn-cs"/>
-              </a:defRPr>
-            </a:lvl3pPr>
-            <a:lvl4pPr marL="1600200" indent="-228600" algn="l" defTabSz="914400" rtl="0" eaLnBrk="1" latinLnBrk="0" hangingPunct="1">
-              <a:spcBef>
-                <a:spcPct val="20000"/>
-              </a:spcBef>
-              <a:buFont typeface="Courier New" pitchFamily="49" charset="0"/>
-              <a:buChar char="o"/>
-              <a:defRPr sz="1600" kern="1200">
-                <a:solidFill>
-                  <a:schemeClr val="tx1">
-                    <a:lumMod val="50000"/>
-                    <a:lumOff val="50000"/>
-                  </a:schemeClr>
-                </a:solidFill>
-                <a:latin typeface="+mj-lt"/>
-                <a:ea typeface="+mn-ea"/>
-                <a:cs typeface="+mn-cs"/>
-              </a:defRPr>
-            </a:lvl4pPr>
-            <a:lvl5pPr marL="2057400" indent="-228600" algn="l" defTabSz="914400" rtl="0" eaLnBrk="1" latinLnBrk="0" hangingPunct="1">
-              <a:spcBef>
-                <a:spcPct val="20000"/>
-              </a:spcBef>
-              <a:buFont typeface="Arial" pitchFamily="34" charset="0"/>
-              <a:buChar char="•"/>
-              <a:defRPr sz="1600" kern="1200">
-                <a:solidFill>
-                  <a:schemeClr val="tx1">
-                    <a:lumMod val="50000"/>
-                    <a:lumOff val="50000"/>
-                  </a:schemeClr>
-                </a:solidFill>
-                <a:latin typeface="+mj-lt"/>
-                <a:ea typeface="+mn-ea"/>
-                <a:cs typeface="+mn-cs"/>
-              </a:defRPr>
-            </a:lvl5pPr>
-            <a:lvl6pPr marL="2514600" indent="-228600" algn="l" defTabSz="914400" rtl="0" eaLnBrk="1" latinLnBrk="0" hangingPunct="1">
-              <a:spcBef>
-                <a:spcPct val="20000"/>
-              </a:spcBef>
-              <a:buFont typeface="Courier New" pitchFamily="49" charset="0"/>
-              <a:buChar char="o"/>
-              <a:defRPr sz="1600" kern="1200">
-                <a:solidFill>
-                  <a:schemeClr val="tx1">
-                    <a:lumMod val="50000"/>
-                    <a:lumOff val="50000"/>
-                  </a:schemeClr>
-                </a:solidFill>
-                <a:latin typeface="+mj-lt"/>
-                <a:ea typeface="+mn-ea"/>
-                <a:cs typeface="+mn-cs"/>
-              </a:defRPr>
-            </a:lvl6pPr>
-            <a:lvl7pPr marL="2971800" indent="-228600" algn="l" defTabSz="914400" rtl="0" eaLnBrk="1" latinLnBrk="0" hangingPunct="1">
-              <a:spcBef>
-                <a:spcPct val="20000"/>
-              </a:spcBef>
-              <a:buFont typeface="Arial" pitchFamily="34" charset="0"/>
-              <a:buChar char="•"/>
-              <a:defRPr sz="1600" kern="1200">
-                <a:solidFill>
-                  <a:schemeClr val="tx1">
-                    <a:lumMod val="50000"/>
-                    <a:lumOff val="50000"/>
-                  </a:schemeClr>
-                </a:solidFill>
-                <a:latin typeface="+mj-lt"/>
-                <a:ea typeface="+mn-ea"/>
-                <a:cs typeface="+mn-cs"/>
-              </a:defRPr>
-            </a:lvl7pPr>
-            <a:lvl8pPr marL="3429000" indent="-228600" algn="l" defTabSz="914400" rtl="0" eaLnBrk="1" latinLnBrk="0" hangingPunct="1">
-              <a:spcBef>
-                <a:spcPct val="20000"/>
-              </a:spcBef>
-              <a:buFont typeface="Courier New" pitchFamily="49" charset="0"/>
-              <a:buChar char="o"/>
-              <a:defRPr sz="1600" kern="1200">
-                <a:solidFill>
-                  <a:schemeClr val="tx1">
-                    <a:lumMod val="50000"/>
-                    <a:lumOff val="50000"/>
-                  </a:schemeClr>
-                </a:solidFill>
-                <a:latin typeface="+mj-lt"/>
-                <a:ea typeface="+mn-ea"/>
-                <a:cs typeface="+mn-cs"/>
-              </a:defRPr>
-            </a:lvl8pPr>
-            <a:lvl9pPr marL="3886200" indent="-228600" algn="l" defTabSz="914400" rtl="0" eaLnBrk="1" latinLnBrk="0" hangingPunct="1">
-              <a:spcBef>
-                <a:spcPct val="20000"/>
-              </a:spcBef>
-              <a:buFont typeface="Arial" pitchFamily="34" charset="0"/>
-              <a:buChar char="•"/>
-              <a:defRPr sz="1600" kern="1200">
-                <a:solidFill>
-                  <a:schemeClr val="tx1">
-                    <a:lumMod val="50000"/>
-                    <a:lumOff val="50000"/>
-                  </a:schemeClr>
-                </a:solidFill>
-                <a:latin typeface="+mj-lt"/>
-                <a:ea typeface="+mn-ea"/>
-                <a:cs typeface="+mn-cs"/>
-              </a:defRPr>
-            </a:lvl9pPr>
-          </a:lstStyle>
-          <a:p>
-            <a:pPr marL="0" indent="0" algn="ctr">
-              <a:buNone/>
-            </a:pPr>
-            <a:r>
-              <a:rPr lang="ru-RU" b="1" dirty="0" smtClean="0"/>
-              <a:t>Имитация автоматической коробки передач</a:t>
-            </a:r>
-            <a:endParaRPr lang="en-US" b="1" dirty="0" smtClean="0"/>
-          </a:p>
-        </p:txBody>
-      </p:sp>
-      <p:sp>
-        <p:nvSpPr>
-          <p:cNvPr id="10" name="Объект 9"/>
-          <p:cNvSpPr txBox="1">
-            <a:spLocks/>
-          </p:cNvSpPr>
-          <p:nvPr/>
-        </p:nvSpPr>
-        <p:spPr>
-          <a:xfrm>
-            <a:off x="1790400" y="1501130"/>
-            <a:ext cx="2448272" cy="504056"/>
-          </a:xfrm>
-          <a:prstGeom prst="rect">
-            <a:avLst/>
-          </a:prstGeom>
-        </p:spPr>
-        <p:txBody>
-          <a:bodyPr/>
-          <a:lstStyle>
-            <a:lvl1pPr marL="342900" indent="-342900" algn="l" defTabSz="914400" rtl="0" eaLnBrk="1" latinLnBrk="0" hangingPunct="1">
-              <a:spcBef>
-                <a:spcPct val="20000"/>
-              </a:spcBef>
-              <a:buFont typeface="Arial" pitchFamily="34" charset="0"/>
-              <a:buChar char="•"/>
-              <a:defRPr sz="2400" kern="1200">
-                <a:solidFill>
-                  <a:schemeClr val="tx1">
-                    <a:lumMod val="50000"/>
-                    <a:lumOff val="50000"/>
-                  </a:schemeClr>
-                </a:solidFill>
-                <a:latin typeface="+mj-lt"/>
-                <a:ea typeface="+mn-ea"/>
-                <a:cs typeface="+mn-cs"/>
-              </a:defRPr>
-            </a:lvl1pPr>
-            <a:lvl2pPr marL="742950" indent="-285750" algn="l" defTabSz="914400" rtl="0" eaLnBrk="1" latinLnBrk="0" hangingPunct="1">
-              <a:spcBef>
-                <a:spcPct val="20000"/>
-              </a:spcBef>
-              <a:buFont typeface="Courier New" pitchFamily="49" charset="0"/>
-              <a:buChar char="o"/>
-              <a:defRPr sz="1600" kern="1200">
-                <a:solidFill>
-                  <a:schemeClr val="tx1">
-                    <a:lumMod val="50000"/>
-                    <a:lumOff val="50000"/>
-                  </a:schemeClr>
-                </a:solidFill>
-                <a:latin typeface="+mj-lt"/>
-                <a:ea typeface="+mn-ea"/>
-                <a:cs typeface="+mn-cs"/>
-              </a:defRPr>
-            </a:lvl2pPr>
-            <a:lvl3pPr marL="1143000" indent="-228600" algn="l" defTabSz="914400" rtl="0" eaLnBrk="1" latinLnBrk="0" hangingPunct="1">
-              <a:spcBef>
-                <a:spcPct val="20000"/>
-              </a:spcBef>
-              <a:buFont typeface="Arial" pitchFamily="34" charset="0"/>
-              <a:buChar char="•"/>
-              <a:defRPr sz="1600" kern="1200">
-                <a:solidFill>
-                  <a:schemeClr val="tx1">
-                    <a:lumMod val="50000"/>
-                    <a:lumOff val="50000"/>
-                  </a:schemeClr>
-                </a:solidFill>
-                <a:latin typeface="+mj-lt"/>
-                <a:ea typeface="+mn-ea"/>
-                <a:cs typeface="+mn-cs"/>
-              </a:defRPr>
-            </a:lvl3pPr>
-            <a:lvl4pPr marL="1600200" indent="-228600" algn="l" defTabSz="914400" rtl="0" eaLnBrk="1" latinLnBrk="0" hangingPunct="1">
-              <a:spcBef>
-                <a:spcPct val="20000"/>
-              </a:spcBef>
-              <a:buFont typeface="Courier New" pitchFamily="49" charset="0"/>
-              <a:buChar char="o"/>
-              <a:defRPr sz="1600" kern="1200">
-                <a:solidFill>
-                  <a:schemeClr val="tx1">
-                    <a:lumMod val="50000"/>
-                    <a:lumOff val="50000"/>
-                  </a:schemeClr>
-                </a:solidFill>
-                <a:latin typeface="+mj-lt"/>
-                <a:ea typeface="+mn-ea"/>
-                <a:cs typeface="+mn-cs"/>
-              </a:defRPr>
-            </a:lvl4pPr>
-            <a:lvl5pPr marL="2057400" indent="-228600" algn="l" defTabSz="914400" rtl="0" eaLnBrk="1" latinLnBrk="0" hangingPunct="1">
-              <a:spcBef>
-                <a:spcPct val="20000"/>
-              </a:spcBef>
-              <a:buFont typeface="Arial" pitchFamily="34" charset="0"/>
-              <a:buChar char="•"/>
-              <a:defRPr sz="1600" kern="1200">
-                <a:solidFill>
-                  <a:schemeClr val="tx1">
-                    <a:lumMod val="50000"/>
-                    <a:lumOff val="50000"/>
-                  </a:schemeClr>
-                </a:solidFill>
-                <a:latin typeface="+mj-lt"/>
-                <a:ea typeface="+mn-ea"/>
-                <a:cs typeface="+mn-cs"/>
-              </a:defRPr>
-            </a:lvl5pPr>
-            <a:lvl6pPr marL="2514600" indent="-228600" algn="l" defTabSz="914400" rtl="0" eaLnBrk="1" latinLnBrk="0" hangingPunct="1">
-              <a:spcBef>
-                <a:spcPct val="20000"/>
-              </a:spcBef>
-              <a:buFont typeface="Courier New" pitchFamily="49" charset="0"/>
-              <a:buChar char="o"/>
-              <a:defRPr sz="1600" kern="1200">
-                <a:solidFill>
-                  <a:schemeClr val="tx1">
-                    <a:lumMod val="50000"/>
-                    <a:lumOff val="50000"/>
-                  </a:schemeClr>
-                </a:solidFill>
-                <a:latin typeface="+mj-lt"/>
-                <a:ea typeface="+mn-ea"/>
-                <a:cs typeface="+mn-cs"/>
-              </a:defRPr>
-            </a:lvl6pPr>
-            <a:lvl7pPr marL="2971800" indent="-228600" algn="l" defTabSz="914400" rtl="0" eaLnBrk="1" latinLnBrk="0" hangingPunct="1">
-              <a:spcBef>
-                <a:spcPct val="20000"/>
-              </a:spcBef>
-              <a:buFont typeface="Arial" pitchFamily="34" charset="0"/>
-              <a:buChar char="•"/>
-              <a:defRPr sz="1600" kern="1200">
-                <a:solidFill>
-                  <a:schemeClr val="tx1">
-                    <a:lumMod val="50000"/>
-                    <a:lumOff val="50000"/>
-                  </a:schemeClr>
-                </a:solidFill>
-                <a:latin typeface="+mj-lt"/>
-                <a:ea typeface="+mn-ea"/>
-                <a:cs typeface="+mn-cs"/>
-              </a:defRPr>
-            </a:lvl7pPr>
-            <a:lvl8pPr marL="3429000" indent="-228600" algn="l" defTabSz="914400" rtl="0" eaLnBrk="1" latinLnBrk="0" hangingPunct="1">
-              <a:spcBef>
-                <a:spcPct val="20000"/>
-              </a:spcBef>
-              <a:buFont typeface="Courier New" pitchFamily="49" charset="0"/>
-              <a:buChar char="o"/>
-              <a:defRPr sz="1600" kern="1200">
-                <a:solidFill>
-                  <a:schemeClr val="tx1">
-                    <a:lumMod val="50000"/>
-                    <a:lumOff val="50000"/>
-                  </a:schemeClr>
-                </a:solidFill>
-                <a:latin typeface="+mj-lt"/>
-                <a:ea typeface="+mn-ea"/>
-                <a:cs typeface="+mn-cs"/>
-              </a:defRPr>
-            </a:lvl8pPr>
-            <a:lvl9pPr marL="3886200" indent="-228600" algn="l" defTabSz="914400" rtl="0" eaLnBrk="1" latinLnBrk="0" hangingPunct="1">
-              <a:spcBef>
-                <a:spcPct val="20000"/>
-              </a:spcBef>
-              <a:buFont typeface="Arial" pitchFamily="34" charset="0"/>
-              <a:buChar char="•"/>
-              <a:defRPr sz="1600" kern="1200">
-                <a:solidFill>
-                  <a:schemeClr val="tx1">
-                    <a:lumMod val="50000"/>
-                    <a:lumOff val="50000"/>
-                  </a:schemeClr>
-                </a:solidFill>
-                <a:latin typeface="+mj-lt"/>
-                <a:ea typeface="+mn-ea"/>
-                <a:cs typeface="+mn-cs"/>
-              </a:defRPr>
-            </a:lvl9pPr>
-          </a:lstStyle>
-          <a:p>
-            <a:pPr marL="0" indent="0" algn="ctr">
-              <a:buNone/>
-            </a:pPr>
-            <a:r>
-              <a:rPr lang="en-US" sz="3200" b="1" dirty="0" smtClean="0"/>
-              <a:t>[</a:t>
-            </a:r>
-            <a:r>
-              <a:rPr lang="en-US" sz="2000" b="1" dirty="0" err="1" smtClean="0"/>
-              <a:t>Autogear.proto</a:t>
-            </a:r>
-            <a:r>
-              <a:rPr lang="en-US" sz="3200" b="1" dirty="0" smtClean="0"/>
-              <a:t>]</a:t>
-            </a:r>
-            <a:endParaRPr lang="en-US" sz="2000" b="1" dirty="0" smtClean="0"/>
-          </a:p>
-        </p:txBody>
-      </p:sp>
-      <p:pic>
-        <p:nvPicPr>
-          <p:cNvPr id="11" name="Объект 5"/>
-          <p:cNvPicPr>
-            <a:picLocks noChangeAspect="1"/>
-          </p:cNvPicPr>
-          <p:nvPr/>
-        </p:nvPicPr>
-        <p:blipFill>
-          <a:blip r:embed="rId4">
-            <a:extLst>
-              <a:ext uri="{28A0092B-C50C-407E-A947-70E740481C1C}">
-                <a14:useLocalDpi xmlns:a14="http://schemas.microsoft.com/office/drawing/2010/main" val="0"/>
-              </a:ext>
-            </a:extLst>
-          </a:blip>
-          <a:stretch>
-            <a:fillRect/>
-          </a:stretch>
-        </p:blipFill>
-        <p:spPr>
-          <a:xfrm>
-            <a:off x="191008" y="2124533"/>
+            <a:off x="5004048" y="2060848"/>
             <a:ext cx="4019505" cy="3507751"/>
           </a:xfrm>
           <a:prstGeom prst="rect">
@@ -8626,6 +8244,1823 @@
           </a:prstGeom>
         </p:spPr>
       </p:pic>
+      <p:sp>
+        <p:nvSpPr>
+          <p:cNvPr id="12" name="Стрелка вправо с вырезом 11"/>
+          <p:cNvSpPr/>
+          <p:nvPr/>
+        </p:nvSpPr>
+        <p:spPr>
+          <a:xfrm>
+            <a:off x="3716747" y="3477384"/>
+            <a:ext cx="1431317" cy="648072"/>
+          </a:xfrm>
+          <a:prstGeom prst="notchedRightArrow">
+            <a:avLst/>
+          </a:prstGeom>
+        </p:spPr>
+        <p:style>
+          <a:lnRef idx="2">
+            <a:schemeClr val="accent1">
+              <a:shade val="50000"/>
+            </a:schemeClr>
+          </a:lnRef>
+          <a:fillRef idx="1">
+            <a:schemeClr val="accent1"/>
+          </a:fillRef>
+          <a:effectRef idx="0">
+            <a:schemeClr val="accent1"/>
+          </a:effectRef>
+          <a:fontRef idx="minor">
+            <a:schemeClr val="lt1"/>
+          </a:fontRef>
+        </p:style>
+        <p:txBody>
+          <a:bodyPr rtlCol="0" anchor="ctr"/>
+          <a:lstStyle/>
+          <a:p>
+            <a:pPr algn="ctr"/>
+            <a:endParaRPr lang="ru-RU"/>
+          </a:p>
+        </p:txBody>
+      </p:sp>
+      <p:sp>
+        <p:nvSpPr>
+          <p:cNvPr id="3" name="Объект 2"/>
+          <p:cNvSpPr>
+            <a:spLocks noGrp="1"/>
+          </p:cNvSpPr>
+          <p:nvPr>
+            <p:ph idx="1"/>
+          </p:nvPr>
+        </p:nvSpPr>
+        <p:spPr>
+          <a:xfrm>
+            <a:off x="251520" y="1340768"/>
+            <a:ext cx="4032448" cy="5112568"/>
+          </a:xfrm>
+        </p:spPr>
+        <p:txBody>
+          <a:bodyPr>
+            <a:noAutofit/>
+          </a:bodyPr>
+          <a:lstStyle/>
+          <a:p>
+            <a:pPr marL="0" indent="0">
+              <a:buNone/>
+            </a:pPr>
+            <a:r>
+              <a:rPr lang="en-US" sz="1100" b="1" dirty="0" smtClean="0">
+                <a:solidFill>
+                  <a:schemeClr val="accent2">
+                    <a:lumMod val="75000"/>
+                  </a:schemeClr>
+                </a:solidFill>
+                <a:latin typeface="Consolas" pitchFamily="49" charset="0"/>
+                <a:cs typeface="Consolas" pitchFamily="49" charset="0"/>
+              </a:rPr>
+              <a:t>class</a:t>
+            </a:r>
+            <a:r>
+              <a:rPr lang="en-US" sz="1100" dirty="0" smtClean="0">
+                <a:solidFill>
+                  <a:schemeClr val="tx1"/>
+                </a:solidFill>
+                <a:latin typeface="Consolas" pitchFamily="49" charset="0"/>
+                <a:cs typeface="Consolas" pitchFamily="49" charset="0"/>
+              </a:rPr>
+              <a:t> </a:t>
+            </a:r>
+            <a:r>
+              <a:rPr lang="en-US" sz="1100" dirty="0" err="1">
+                <a:solidFill>
+                  <a:schemeClr val="tx1"/>
+                </a:solidFill>
+                <a:latin typeface="Consolas" pitchFamily="49" charset="0"/>
+                <a:cs typeface="Consolas" pitchFamily="49" charset="0"/>
+              </a:rPr>
+              <a:t>AutoGear</a:t>
+            </a:r>
+            <a:r>
+              <a:rPr lang="en-US" sz="1100" dirty="0">
+                <a:solidFill>
+                  <a:schemeClr val="tx1"/>
+                </a:solidFill>
+                <a:latin typeface="Consolas" pitchFamily="49" charset="0"/>
+                <a:cs typeface="Consolas" pitchFamily="49" charset="0"/>
+              </a:rPr>
+              <a:t>() &lt;&lt; Prototype </a:t>
+            </a:r>
+            <a:r>
+              <a:rPr lang="en-US" sz="1100" dirty="0" smtClean="0">
+                <a:solidFill>
+                  <a:schemeClr val="tx1"/>
+                </a:solidFill>
+                <a:latin typeface="Consolas" pitchFamily="49" charset="0"/>
+                <a:cs typeface="Consolas" pitchFamily="49" charset="0"/>
+              </a:rPr>
+              <a:t>{</a:t>
+            </a:r>
+            <a:endParaRPr lang="en-US" sz="1100" dirty="0">
+              <a:solidFill>
+                <a:schemeClr val="tx1"/>
+              </a:solidFill>
+              <a:latin typeface="Consolas" pitchFamily="49" charset="0"/>
+              <a:cs typeface="Consolas" pitchFamily="49" charset="0"/>
+            </a:endParaRPr>
+          </a:p>
+          <a:p>
+            <a:pPr marL="0" indent="0">
+              <a:buNone/>
+            </a:pPr>
+            <a:r>
+              <a:rPr lang="en-US" sz="1100" dirty="0" smtClean="0">
+                <a:solidFill>
+                  <a:schemeClr val="tx1"/>
+                </a:solidFill>
+                <a:latin typeface="Consolas" pitchFamily="49" charset="0"/>
+                <a:cs typeface="Consolas" pitchFamily="49" charset="0"/>
+              </a:rPr>
+              <a:t>    </a:t>
+            </a:r>
+            <a:r>
+              <a:rPr lang="en-US" sz="1100" b="1" dirty="0" smtClean="0">
+                <a:solidFill>
+                  <a:schemeClr val="accent2">
+                    <a:lumMod val="75000"/>
+                  </a:schemeClr>
+                </a:solidFill>
+                <a:latin typeface="Consolas" pitchFamily="49" charset="0"/>
+                <a:cs typeface="Consolas" pitchFamily="49" charset="0"/>
+              </a:rPr>
+              <a:t>state</a:t>
+            </a:r>
+            <a:r>
+              <a:rPr lang="en-US" sz="1100" dirty="0" smtClean="0">
+                <a:solidFill>
+                  <a:schemeClr val="tx1"/>
+                </a:solidFill>
+                <a:latin typeface="Consolas" pitchFamily="49" charset="0"/>
+                <a:cs typeface="Consolas" pitchFamily="49" charset="0"/>
+              </a:rPr>
+              <a:t> </a:t>
+            </a:r>
+            <a:r>
+              <a:rPr lang="en-US" sz="1100" dirty="0">
+                <a:solidFill>
+                  <a:schemeClr val="tx1"/>
+                </a:solidFill>
+                <a:latin typeface="Consolas" pitchFamily="49" charset="0"/>
+                <a:cs typeface="Consolas" pitchFamily="49" charset="0"/>
+              </a:rPr>
+              <a:t>finalize() </a:t>
+            </a:r>
+            <a:r>
+              <a:rPr lang="en-US" sz="1100" dirty="0" smtClean="0">
+                <a:solidFill>
+                  <a:schemeClr val="tx1"/>
+                </a:solidFill>
+                <a:latin typeface="Consolas" pitchFamily="49" charset="0"/>
+                <a:cs typeface="Consolas" pitchFamily="49" charset="0"/>
+              </a:rPr>
+              <a:t>{ </a:t>
+            </a:r>
+            <a:r>
+              <a:rPr lang="en-US" sz="1100" b="1" dirty="0" smtClean="0">
+                <a:solidFill>
+                  <a:schemeClr val="accent2">
+                    <a:lumMod val="75000"/>
+                  </a:schemeClr>
+                </a:solidFill>
+                <a:latin typeface="Consolas" pitchFamily="49" charset="0"/>
+                <a:cs typeface="Consolas" pitchFamily="49" charset="0"/>
+              </a:rPr>
+              <a:t>return</a:t>
+            </a:r>
+            <a:r>
+              <a:rPr lang="en-US" sz="1100" dirty="0" smtClean="0">
+                <a:solidFill>
+                  <a:schemeClr val="tx1"/>
+                </a:solidFill>
+                <a:latin typeface="Consolas" pitchFamily="49" charset="0"/>
+                <a:cs typeface="Consolas" pitchFamily="49" charset="0"/>
+              </a:rPr>
+              <a:t> </a:t>
+            </a:r>
+            <a:r>
+              <a:rPr lang="en-US" sz="1100" dirty="0">
+                <a:solidFill>
+                  <a:schemeClr val="accent1">
+                    <a:lumMod val="75000"/>
+                  </a:schemeClr>
+                </a:solidFill>
+                <a:latin typeface="Consolas" pitchFamily="49" charset="0"/>
+                <a:cs typeface="Consolas" pitchFamily="49" charset="0"/>
+              </a:rPr>
+              <a:t>"End of </a:t>
+            </a:r>
+            <a:r>
+              <a:rPr lang="en-US" sz="1100" dirty="0" smtClean="0">
+                <a:solidFill>
+                  <a:schemeClr val="accent1">
+                    <a:lumMod val="75000"/>
+                  </a:schemeClr>
+                </a:solidFill>
+                <a:latin typeface="Consolas" pitchFamily="49" charset="0"/>
+                <a:cs typeface="Consolas" pitchFamily="49" charset="0"/>
+              </a:rPr>
+              <a:t>work"</a:t>
+            </a:r>
+            <a:r>
+              <a:rPr lang="en-US" sz="1100" dirty="0" smtClean="0">
+                <a:solidFill>
+                  <a:schemeClr val="tx1"/>
+                </a:solidFill>
+                <a:latin typeface="Consolas" pitchFamily="49" charset="0"/>
+                <a:cs typeface="Consolas" pitchFamily="49" charset="0"/>
+              </a:rPr>
+              <a:t>;</a:t>
+            </a:r>
+            <a:r>
+              <a:rPr lang="ru-RU" sz="1100" dirty="0" smtClean="0">
+                <a:solidFill>
+                  <a:schemeClr val="tx1"/>
+                </a:solidFill>
+                <a:latin typeface="Consolas" pitchFamily="49" charset="0"/>
+                <a:cs typeface="Consolas" pitchFamily="49" charset="0"/>
+              </a:rPr>
+              <a:t> </a:t>
+            </a:r>
+            <a:r>
+              <a:rPr lang="en-US" sz="1100" dirty="0" smtClean="0">
+                <a:solidFill>
+                  <a:schemeClr val="tx1"/>
+                </a:solidFill>
+                <a:latin typeface="Consolas" pitchFamily="49" charset="0"/>
+                <a:cs typeface="Consolas" pitchFamily="49" charset="0"/>
+              </a:rPr>
+              <a:t>}</a:t>
+            </a:r>
+            <a:endParaRPr lang="en-US" sz="1100" dirty="0">
+              <a:solidFill>
+                <a:schemeClr val="tx1"/>
+              </a:solidFill>
+              <a:latin typeface="Consolas" pitchFamily="49" charset="0"/>
+              <a:cs typeface="Consolas" pitchFamily="49" charset="0"/>
+            </a:endParaRPr>
+          </a:p>
+          <a:p>
+            <a:pPr marL="0" indent="0">
+              <a:buNone/>
+            </a:pPr>
+            <a:r>
+              <a:rPr lang="ru-RU" sz="1100" dirty="0" smtClean="0">
+                <a:solidFill>
+                  <a:schemeClr val="tx1"/>
+                </a:solidFill>
+                <a:latin typeface="Consolas" pitchFamily="49" charset="0"/>
+                <a:cs typeface="Consolas" pitchFamily="49" charset="0"/>
+              </a:rPr>
+              <a:t>    </a:t>
+            </a:r>
+            <a:r>
+              <a:rPr lang="en-US" sz="1100" b="1" dirty="0" smtClean="0">
+                <a:solidFill>
+                  <a:schemeClr val="accent2">
+                    <a:lumMod val="75000"/>
+                  </a:schemeClr>
+                </a:solidFill>
+                <a:latin typeface="Consolas" pitchFamily="49" charset="0"/>
+                <a:cs typeface="Consolas" pitchFamily="49" charset="0"/>
+              </a:rPr>
+              <a:t>state</a:t>
+            </a:r>
+            <a:r>
+              <a:rPr lang="en-US" sz="1100" dirty="0" smtClean="0">
+                <a:solidFill>
+                  <a:schemeClr val="tx1"/>
+                </a:solidFill>
+                <a:latin typeface="Consolas" pitchFamily="49" charset="0"/>
+                <a:cs typeface="Consolas" pitchFamily="49" charset="0"/>
+              </a:rPr>
+              <a:t> </a:t>
+            </a:r>
+            <a:r>
+              <a:rPr lang="en-US" sz="1100" dirty="0">
+                <a:solidFill>
+                  <a:schemeClr val="tx1"/>
+                </a:solidFill>
+                <a:latin typeface="Consolas" pitchFamily="49" charset="0"/>
+                <a:cs typeface="Consolas" pitchFamily="49" charset="0"/>
+              </a:rPr>
+              <a:t>sleep() </a:t>
+            </a:r>
+            <a:r>
+              <a:rPr lang="en-US" sz="1100" dirty="0" smtClean="0">
+                <a:solidFill>
+                  <a:schemeClr val="tx1"/>
+                </a:solidFill>
+                <a:latin typeface="Consolas" pitchFamily="49" charset="0"/>
+                <a:cs typeface="Consolas" pitchFamily="49" charset="0"/>
+              </a:rPr>
+              <a:t>{</a:t>
+            </a:r>
+            <a:r>
+              <a:rPr lang="ru-RU" sz="1100" dirty="0" smtClean="0">
+                <a:solidFill>
+                  <a:schemeClr val="tx1"/>
+                </a:solidFill>
+                <a:latin typeface="Consolas" pitchFamily="49" charset="0"/>
+                <a:cs typeface="Consolas" pitchFamily="49" charset="0"/>
+              </a:rPr>
+              <a:t>  </a:t>
+            </a:r>
+            <a:r>
+              <a:rPr lang="en-US" sz="1100" b="1" dirty="0" smtClean="0">
+                <a:solidFill>
+                  <a:schemeClr val="accent2">
+                    <a:lumMod val="75000"/>
+                  </a:schemeClr>
+                </a:solidFill>
+                <a:latin typeface="Consolas" pitchFamily="49" charset="0"/>
+                <a:cs typeface="Consolas" pitchFamily="49" charset="0"/>
+              </a:rPr>
+              <a:t>return</a:t>
+            </a:r>
+            <a:r>
+              <a:rPr lang="en-US" sz="1100" dirty="0" smtClean="0">
+                <a:solidFill>
+                  <a:schemeClr val="tx1"/>
+                </a:solidFill>
+                <a:latin typeface="Consolas" pitchFamily="49" charset="0"/>
+                <a:cs typeface="Consolas" pitchFamily="49" charset="0"/>
+              </a:rPr>
+              <a:t> </a:t>
+            </a:r>
+            <a:r>
+              <a:rPr lang="en-US" sz="1100" dirty="0">
+                <a:solidFill>
+                  <a:schemeClr val="tx1"/>
+                </a:solidFill>
+                <a:latin typeface="Consolas" pitchFamily="49" charset="0"/>
+                <a:cs typeface="Consolas" pitchFamily="49" charset="0"/>
+              </a:rPr>
+              <a:t>neutral</a:t>
+            </a:r>
+            <a:r>
+              <a:rPr lang="en-US" sz="1100" dirty="0" smtClean="0">
+                <a:solidFill>
+                  <a:schemeClr val="tx1"/>
+                </a:solidFill>
+                <a:latin typeface="Consolas" pitchFamily="49" charset="0"/>
+                <a:cs typeface="Consolas" pitchFamily="49" charset="0"/>
+              </a:rPr>
+              <a:t>();</a:t>
+            </a:r>
+            <a:r>
+              <a:rPr lang="ru-RU" sz="1100" dirty="0" smtClean="0">
+                <a:solidFill>
+                  <a:schemeClr val="tx1"/>
+                </a:solidFill>
+                <a:latin typeface="Consolas" pitchFamily="49" charset="0"/>
+                <a:cs typeface="Consolas" pitchFamily="49" charset="0"/>
+              </a:rPr>
+              <a:t> </a:t>
+            </a:r>
+            <a:r>
+              <a:rPr lang="en-US" sz="1100" dirty="0" smtClean="0">
+                <a:solidFill>
+                  <a:schemeClr val="tx1"/>
+                </a:solidFill>
+                <a:latin typeface="Consolas" pitchFamily="49" charset="0"/>
+                <a:cs typeface="Consolas" pitchFamily="49" charset="0"/>
+              </a:rPr>
+              <a:t>}</a:t>
+            </a:r>
+            <a:endParaRPr lang="en-US" sz="1100" dirty="0">
+              <a:solidFill>
+                <a:schemeClr val="tx1"/>
+              </a:solidFill>
+              <a:latin typeface="Consolas" pitchFamily="49" charset="0"/>
+              <a:cs typeface="Consolas" pitchFamily="49" charset="0"/>
+            </a:endParaRPr>
+          </a:p>
+          <a:p>
+            <a:pPr marL="0" indent="0">
+              <a:buNone/>
+            </a:pPr>
+            <a:r>
+              <a:rPr lang="ru-RU" sz="1100" dirty="0" smtClean="0">
+                <a:solidFill>
+                  <a:schemeClr val="tx1"/>
+                </a:solidFill>
+                <a:latin typeface="Consolas" pitchFamily="49" charset="0"/>
+                <a:cs typeface="Consolas" pitchFamily="49" charset="0"/>
+              </a:rPr>
+              <a:t>    </a:t>
+            </a:r>
+            <a:r>
+              <a:rPr lang="en-US" sz="1100" b="1" dirty="0" smtClean="0">
+                <a:solidFill>
+                  <a:schemeClr val="accent2">
+                    <a:lumMod val="75000"/>
+                  </a:schemeClr>
+                </a:solidFill>
+                <a:latin typeface="Consolas" pitchFamily="49" charset="0"/>
+                <a:cs typeface="Consolas" pitchFamily="49" charset="0"/>
+              </a:rPr>
+              <a:t>state</a:t>
+            </a:r>
+            <a:r>
+              <a:rPr lang="en-US" sz="1100" dirty="0" smtClean="0">
+                <a:solidFill>
+                  <a:schemeClr val="tx1"/>
+                </a:solidFill>
+                <a:latin typeface="Consolas" pitchFamily="49" charset="0"/>
+                <a:cs typeface="Consolas" pitchFamily="49" charset="0"/>
+              </a:rPr>
+              <a:t> </a:t>
+            </a:r>
+            <a:r>
+              <a:rPr lang="en-US" sz="1100" dirty="0">
+                <a:solidFill>
+                  <a:schemeClr val="tx1"/>
+                </a:solidFill>
+                <a:latin typeface="Consolas" pitchFamily="49" charset="0"/>
+                <a:cs typeface="Consolas" pitchFamily="49" charset="0"/>
+              </a:rPr>
+              <a:t>neutral</a:t>
+            </a:r>
+            <a:r>
+              <a:rPr lang="en-US" sz="1100" dirty="0" smtClean="0">
+                <a:solidFill>
+                  <a:schemeClr val="tx1"/>
+                </a:solidFill>
+                <a:latin typeface="Consolas" pitchFamily="49" charset="0"/>
+                <a:cs typeface="Consolas" pitchFamily="49" charset="0"/>
+              </a:rPr>
+              <a:t>(){</a:t>
+            </a:r>
+            <a:endParaRPr lang="ru-RU" sz="1100" dirty="0" smtClean="0">
+              <a:solidFill>
+                <a:schemeClr val="tx1"/>
+              </a:solidFill>
+              <a:latin typeface="Consolas" pitchFamily="49" charset="0"/>
+              <a:cs typeface="Consolas" pitchFamily="49" charset="0"/>
+            </a:endParaRPr>
+          </a:p>
+          <a:p>
+            <a:pPr marL="0" indent="0">
+              <a:buNone/>
+            </a:pPr>
+            <a:r>
+              <a:rPr lang="ru-RU" sz="1100" dirty="0">
+                <a:solidFill>
+                  <a:schemeClr val="tx1"/>
+                </a:solidFill>
+                <a:latin typeface="Consolas" pitchFamily="49" charset="0"/>
+                <a:cs typeface="Consolas" pitchFamily="49" charset="0"/>
+              </a:rPr>
+              <a:t> </a:t>
+            </a:r>
+            <a:r>
+              <a:rPr lang="ru-RU" sz="1100" dirty="0" smtClean="0">
+                <a:solidFill>
+                  <a:schemeClr val="tx1"/>
+                </a:solidFill>
+                <a:latin typeface="Consolas" pitchFamily="49" charset="0"/>
+                <a:cs typeface="Consolas" pitchFamily="49" charset="0"/>
+              </a:rPr>
+              <a:t>       </a:t>
+            </a:r>
+            <a:r>
+              <a:rPr lang="en-US" sz="1100" b="1" dirty="0" smtClean="0">
+                <a:solidFill>
+                  <a:schemeClr val="accent2">
+                    <a:lumMod val="75000"/>
+                  </a:schemeClr>
+                </a:solidFill>
+                <a:latin typeface="Consolas" pitchFamily="49" charset="0"/>
+                <a:cs typeface="Consolas" pitchFamily="49" charset="0"/>
+              </a:rPr>
+              <a:t>number</a:t>
+            </a:r>
+            <a:r>
+              <a:rPr lang="en-US" sz="1100" dirty="0" smtClean="0">
+                <a:solidFill>
+                  <a:schemeClr val="tx1"/>
+                </a:solidFill>
+                <a:latin typeface="Consolas" pitchFamily="49" charset="0"/>
+                <a:cs typeface="Consolas" pitchFamily="49" charset="0"/>
+              </a:rPr>
+              <a:t> </a:t>
+            </a:r>
+            <a:r>
+              <a:rPr lang="en-US" sz="1100" dirty="0" err="1">
+                <a:solidFill>
+                  <a:schemeClr val="tx1"/>
+                </a:solidFill>
+                <a:latin typeface="Consolas" pitchFamily="49" charset="0"/>
+                <a:cs typeface="Consolas" pitchFamily="49" charset="0"/>
+              </a:rPr>
+              <a:t>cmd</a:t>
+            </a:r>
+            <a:r>
+              <a:rPr lang="en-US" sz="1100" dirty="0">
+                <a:solidFill>
+                  <a:schemeClr val="tx1"/>
+                </a:solidFill>
+                <a:latin typeface="Consolas" pitchFamily="49" charset="0"/>
+                <a:cs typeface="Consolas" pitchFamily="49" charset="0"/>
+              </a:rPr>
+              <a:t> = </a:t>
+            </a:r>
+            <a:r>
+              <a:rPr lang="en-US" sz="1100" dirty="0" err="1">
+                <a:solidFill>
+                  <a:schemeClr val="tx1"/>
+                </a:solidFill>
+                <a:latin typeface="Consolas" pitchFamily="49" charset="0"/>
+                <a:cs typeface="Consolas" pitchFamily="49" charset="0"/>
+              </a:rPr>
+              <a:t>driver.press</a:t>
+            </a:r>
+            <a:r>
+              <a:rPr lang="en-US" sz="1100" dirty="0">
+                <a:solidFill>
+                  <a:schemeClr val="tx1"/>
+                </a:solidFill>
+                <a:latin typeface="Consolas" pitchFamily="49" charset="0"/>
+                <a:cs typeface="Consolas" pitchFamily="49" charset="0"/>
+              </a:rPr>
+              <a:t>(3);</a:t>
+            </a:r>
+          </a:p>
+          <a:p>
+            <a:pPr marL="0" indent="0">
+              <a:buNone/>
+            </a:pPr>
+            <a:r>
+              <a:rPr lang="ru-RU" sz="1100" dirty="0" smtClean="0">
+                <a:solidFill>
+                  <a:schemeClr val="tx1"/>
+                </a:solidFill>
+                <a:latin typeface="Consolas" pitchFamily="49" charset="0"/>
+                <a:cs typeface="Consolas" pitchFamily="49" charset="0"/>
+              </a:rPr>
+              <a:t>        </a:t>
+            </a:r>
+            <a:r>
+              <a:rPr lang="en-US" sz="1100" dirty="0" smtClean="0">
+                <a:solidFill>
+                  <a:schemeClr val="tx1"/>
+                </a:solidFill>
+                <a:latin typeface="Consolas" pitchFamily="49" charset="0"/>
+                <a:cs typeface="Consolas" pitchFamily="49" charset="0"/>
+              </a:rPr>
+              <a:t>if </a:t>
+            </a:r>
+            <a:r>
+              <a:rPr lang="en-US" sz="1100" dirty="0">
+                <a:solidFill>
+                  <a:schemeClr val="tx1"/>
+                </a:solidFill>
+                <a:latin typeface="Consolas" pitchFamily="49" charset="0"/>
+                <a:cs typeface="Consolas" pitchFamily="49" charset="0"/>
+              </a:rPr>
+              <a:t>(</a:t>
+            </a:r>
+            <a:r>
+              <a:rPr lang="en-US" sz="1100" dirty="0" err="1">
+                <a:solidFill>
+                  <a:schemeClr val="tx1"/>
+                </a:solidFill>
+                <a:latin typeface="Consolas" pitchFamily="49" charset="0"/>
+                <a:cs typeface="Consolas" pitchFamily="49" charset="0"/>
+              </a:rPr>
+              <a:t>cmd</a:t>
+            </a:r>
+            <a:r>
+              <a:rPr lang="en-US" sz="1100" dirty="0">
+                <a:solidFill>
+                  <a:schemeClr val="tx1"/>
+                </a:solidFill>
+                <a:latin typeface="Consolas" pitchFamily="49" charset="0"/>
+                <a:cs typeface="Consolas" pitchFamily="49" charset="0"/>
+              </a:rPr>
+              <a:t> == 1</a:t>
+            </a:r>
+            <a:r>
+              <a:rPr lang="en-US" sz="1100" dirty="0" smtClean="0">
+                <a:solidFill>
+                  <a:schemeClr val="tx1"/>
+                </a:solidFill>
+                <a:latin typeface="Consolas" pitchFamily="49" charset="0"/>
+                <a:cs typeface="Consolas" pitchFamily="49" charset="0"/>
+              </a:rPr>
+              <a:t>) { </a:t>
+            </a:r>
+            <a:r>
+              <a:rPr lang="en-US" sz="1100" b="1" dirty="0">
+                <a:solidFill>
+                  <a:schemeClr val="accent2">
+                    <a:lumMod val="75000"/>
+                  </a:schemeClr>
+                </a:solidFill>
+                <a:latin typeface="Consolas" pitchFamily="49" charset="0"/>
+                <a:cs typeface="Consolas" pitchFamily="49" charset="0"/>
+              </a:rPr>
+              <a:t>return</a:t>
+            </a:r>
+            <a:r>
+              <a:rPr lang="en-US" sz="1100" dirty="0">
+                <a:solidFill>
+                  <a:schemeClr val="tx1"/>
+                </a:solidFill>
+                <a:latin typeface="Consolas" pitchFamily="49" charset="0"/>
+                <a:cs typeface="Consolas" pitchFamily="49" charset="0"/>
+              </a:rPr>
+              <a:t> finalize</a:t>
+            </a:r>
+            <a:r>
+              <a:rPr lang="en-US" sz="1100" dirty="0" smtClean="0">
+                <a:solidFill>
+                  <a:schemeClr val="tx1"/>
+                </a:solidFill>
+                <a:latin typeface="Consolas" pitchFamily="49" charset="0"/>
+                <a:cs typeface="Consolas" pitchFamily="49" charset="0"/>
+              </a:rPr>
+              <a:t>(); }</a:t>
+            </a:r>
+          </a:p>
+          <a:p>
+            <a:pPr marL="0" indent="0">
+              <a:buNone/>
+            </a:pPr>
+            <a:r>
+              <a:rPr lang="en-US" sz="1100" dirty="0">
+                <a:solidFill>
+                  <a:schemeClr val="tx1"/>
+                </a:solidFill>
+                <a:latin typeface="Consolas" pitchFamily="49" charset="0"/>
+                <a:cs typeface="Consolas" pitchFamily="49" charset="0"/>
+              </a:rPr>
+              <a:t> </a:t>
+            </a:r>
+            <a:r>
+              <a:rPr lang="en-US" sz="1100" dirty="0" smtClean="0">
+                <a:solidFill>
+                  <a:schemeClr val="tx1"/>
+                </a:solidFill>
+                <a:latin typeface="Consolas" pitchFamily="49" charset="0"/>
+                <a:cs typeface="Consolas" pitchFamily="49" charset="0"/>
+              </a:rPr>
+              <a:t>       else if </a:t>
+            </a:r>
+            <a:r>
+              <a:rPr lang="en-US" sz="1100" dirty="0">
+                <a:solidFill>
+                  <a:schemeClr val="tx1"/>
+                </a:solidFill>
+                <a:latin typeface="Consolas" pitchFamily="49" charset="0"/>
+                <a:cs typeface="Consolas" pitchFamily="49" charset="0"/>
+              </a:rPr>
+              <a:t>(</a:t>
+            </a:r>
+            <a:r>
+              <a:rPr lang="en-US" sz="1100" dirty="0" err="1">
+                <a:solidFill>
+                  <a:schemeClr val="tx1"/>
+                </a:solidFill>
+                <a:latin typeface="Consolas" pitchFamily="49" charset="0"/>
+                <a:cs typeface="Consolas" pitchFamily="49" charset="0"/>
+              </a:rPr>
+              <a:t>cmd</a:t>
+            </a:r>
+            <a:r>
+              <a:rPr lang="en-US" sz="1100" dirty="0">
+                <a:solidFill>
+                  <a:schemeClr val="tx1"/>
+                </a:solidFill>
+                <a:latin typeface="Consolas" pitchFamily="49" charset="0"/>
+                <a:cs typeface="Consolas" pitchFamily="49" charset="0"/>
+              </a:rPr>
+              <a:t> == 2</a:t>
+            </a:r>
+            <a:r>
+              <a:rPr lang="en-US" sz="1100" dirty="0" smtClean="0">
+                <a:solidFill>
+                  <a:schemeClr val="tx1"/>
+                </a:solidFill>
+                <a:latin typeface="Consolas" pitchFamily="49" charset="0"/>
+                <a:cs typeface="Consolas" pitchFamily="49" charset="0"/>
+              </a:rPr>
+              <a:t>) { </a:t>
+            </a:r>
+            <a:r>
+              <a:rPr lang="en-US" sz="1100" b="1" dirty="0" smtClean="0">
+                <a:solidFill>
+                  <a:schemeClr val="accent2">
+                    <a:lumMod val="75000"/>
+                  </a:schemeClr>
+                </a:solidFill>
+                <a:latin typeface="Consolas" pitchFamily="49" charset="0"/>
+                <a:cs typeface="Consolas" pitchFamily="49" charset="0"/>
+              </a:rPr>
+              <a:t>return</a:t>
+            </a:r>
+            <a:r>
+              <a:rPr lang="en-US" sz="1100" dirty="0" smtClean="0">
+                <a:solidFill>
+                  <a:schemeClr val="tx1"/>
+                </a:solidFill>
+                <a:latin typeface="Consolas" pitchFamily="49" charset="0"/>
+                <a:cs typeface="Consolas" pitchFamily="49" charset="0"/>
+              </a:rPr>
+              <a:t> </a:t>
+            </a:r>
+            <a:r>
+              <a:rPr lang="en-US" sz="1100" dirty="0">
+                <a:solidFill>
+                  <a:schemeClr val="tx1"/>
+                </a:solidFill>
+                <a:latin typeface="Consolas" pitchFamily="49" charset="0"/>
+                <a:cs typeface="Consolas" pitchFamily="49" charset="0"/>
+              </a:rPr>
+              <a:t>reverse</a:t>
+            </a:r>
+            <a:r>
+              <a:rPr lang="en-US" sz="1100" dirty="0" smtClean="0">
+                <a:solidFill>
+                  <a:schemeClr val="tx1"/>
+                </a:solidFill>
+                <a:latin typeface="Consolas" pitchFamily="49" charset="0"/>
+                <a:cs typeface="Consolas" pitchFamily="49" charset="0"/>
+              </a:rPr>
+              <a:t>(); } </a:t>
+            </a:r>
+          </a:p>
+          <a:p>
+            <a:pPr marL="0" indent="0">
+              <a:buNone/>
+            </a:pPr>
+            <a:r>
+              <a:rPr lang="en-US" sz="1100" dirty="0">
+                <a:solidFill>
+                  <a:schemeClr val="tx1"/>
+                </a:solidFill>
+                <a:latin typeface="Consolas" pitchFamily="49" charset="0"/>
+                <a:cs typeface="Consolas" pitchFamily="49" charset="0"/>
+              </a:rPr>
+              <a:t> </a:t>
+            </a:r>
+            <a:r>
+              <a:rPr lang="en-US" sz="1100" dirty="0" smtClean="0">
+                <a:solidFill>
+                  <a:schemeClr val="tx1"/>
+                </a:solidFill>
+                <a:latin typeface="Consolas" pitchFamily="49" charset="0"/>
+                <a:cs typeface="Consolas" pitchFamily="49" charset="0"/>
+              </a:rPr>
+              <a:t>       else { </a:t>
+            </a:r>
+            <a:r>
+              <a:rPr lang="en-US" sz="1100" b="1" dirty="0" smtClean="0">
+                <a:solidFill>
+                  <a:schemeClr val="accent2">
+                    <a:lumMod val="75000"/>
+                  </a:schemeClr>
+                </a:solidFill>
+                <a:latin typeface="Consolas" pitchFamily="49" charset="0"/>
+                <a:cs typeface="Consolas" pitchFamily="49" charset="0"/>
+              </a:rPr>
+              <a:t>return</a:t>
+            </a:r>
+            <a:r>
+              <a:rPr lang="en-US" sz="1100" dirty="0" smtClean="0">
+                <a:solidFill>
+                  <a:schemeClr val="tx1"/>
+                </a:solidFill>
+                <a:latin typeface="Consolas" pitchFamily="49" charset="0"/>
+                <a:cs typeface="Consolas" pitchFamily="49" charset="0"/>
+              </a:rPr>
+              <a:t> </a:t>
+            </a:r>
+            <a:r>
+              <a:rPr lang="en-US" sz="1100" dirty="0">
+                <a:solidFill>
+                  <a:schemeClr val="tx1"/>
+                </a:solidFill>
+                <a:latin typeface="Consolas" pitchFamily="49" charset="0"/>
+                <a:cs typeface="Consolas" pitchFamily="49" charset="0"/>
+              </a:rPr>
+              <a:t>gear1</a:t>
+            </a:r>
+            <a:r>
+              <a:rPr lang="en-US" sz="1100" dirty="0" smtClean="0">
+                <a:solidFill>
+                  <a:schemeClr val="tx1"/>
+                </a:solidFill>
+                <a:latin typeface="Consolas" pitchFamily="49" charset="0"/>
+                <a:cs typeface="Consolas" pitchFamily="49" charset="0"/>
+              </a:rPr>
+              <a:t>(); }</a:t>
+            </a:r>
+            <a:endParaRPr lang="en-US" sz="1100" dirty="0">
+              <a:solidFill>
+                <a:schemeClr val="tx1"/>
+              </a:solidFill>
+              <a:latin typeface="Consolas" pitchFamily="49" charset="0"/>
+              <a:cs typeface="Consolas" pitchFamily="49" charset="0"/>
+            </a:endParaRPr>
+          </a:p>
+          <a:p>
+            <a:pPr marL="0" indent="0">
+              <a:buNone/>
+            </a:pPr>
+            <a:r>
+              <a:rPr lang="ru-RU" sz="1100" dirty="0" smtClean="0">
+                <a:solidFill>
+                  <a:schemeClr val="tx1"/>
+                </a:solidFill>
+                <a:latin typeface="Consolas" pitchFamily="49" charset="0"/>
+                <a:cs typeface="Consolas" pitchFamily="49" charset="0"/>
+              </a:rPr>
+              <a:t>    </a:t>
+            </a:r>
+            <a:r>
+              <a:rPr lang="en-US" sz="1100" dirty="0" smtClean="0">
+                <a:solidFill>
+                  <a:schemeClr val="tx1"/>
+                </a:solidFill>
+                <a:latin typeface="Consolas" pitchFamily="49" charset="0"/>
+                <a:cs typeface="Consolas" pitchFamily="49" charset="0"/>
+              </a:rPr>
+              <a:t>}</a:t>
+            </a:r>
+            <a:endParaRPr lang="en-US" sz="1100" dirty="0">
+              <a:solidFill>
+                <a:schemeClr val="tx1"/>
+              </a:solidFill>
+              <a:latin typeface="Consolas" pitchFamily="49" charset="0"/>
+              <a:cs typeface="Consolas" pitchFamily="49" charset="0"/>
+            </a:endParaRPr>
+          </a:p>
+          <a:p>
+            <a:pPr marL="0" indent="0">
+              <a:buNone/>
+            </a:pPr>
+            <a:r>
+              <a:rPr lang="ru-RU" sz="1100" dirty="0" smtClean="0">
+                <a:solidFill>
+                  <a:schemeClr val="tx1"/>
+                </a:solidFill>
+                <a:latin typeface="Consolas" pitchFamily="49" charset="0"/>
+                <a:cs typeface="Consolas" pitchFamily="49" charset="0"/>
+              </a:rPr>
+              <a:t>    </a:t>
+            </a:r>
+            <a:r>
+              <a:rPr lang="en-US" sz="1100" b="1" dirty="0" smtClean="0">
+                <a:solidFill>
+                  <a:schemeClr val="accent2">
+                    <a:lumMod val="75000"/>
+                  </a:schemeClr>
+                </a:solidFill>
+                <a:latin typeface="Consolas" pitchFamily="49" charset="0"/>
+                <a:cs typeface="Consolas" pitchFamily="49" charset="0"/>
+              </a:rPr>
+              <a:t>state</a:t>
+            </a:r>
+            <a:r>
+              <a:rPr lang="en-US" sz="1100" dirty="0" smtClean="0">
+                <a:solidFill>
+                  <a:schemeClr val="tx1"/>
+                </a:solidFill>
+                <a:latin typeface="Consolas" pitchFamily="49" charset="0"/>
+                <a:cs typeface="Consolas" pitchFamily="49" charset="0"/>
+              </a:rPr>
+              <a:t> </a:t>
+            </a:r>
+            <a:r>
+              <a:rPr lang="en-US" sz="1100" dirty="0">
+                <a:solidFill>
+                  <a:schemeClr val="tx1"/>
+                </a:solidFill>
+                <a:latin typeface="Consolas" pitchFamily="49" charset="0"/>
+                <a:cs typeface="Consolas" pitchFamily="49" charset="0"/>
+              </a:rPr>
+              <a:t>reverse</a:t>
+            </a:r>
+            <a:r>
+              <a:rPr lang="en-US" sz="1100" dirty="0" smtClean="0">
+                <a:solidFill>
+                  <a:schemeClr val="tx1"/>
+                </a:solidFill>
+                <a:latin typeface="Consolas" pitchFamily="49" charset="0"/>
+                <a:cs typeface="Consolas" pitchFamily="49" charset="0"/>
+              </a:rPr>
+              <a:t>(){</a:t>
+            </a:r>
+            <a:r>
+              <a:rPr lang="ru-RU" sz="1100" dirty="0" smtClean="0">
+                <a:solidFill>
+                  <a:schemeClr val="tx1"/>
+                </a:solidFill>
+                <a:latin typeface="Consolas" pitchFamily="49" charset="0"/>
+                <a:cs typeface="Consolas" pitchFamily="49" charset="0"/>
+              </a:rPr>
+              <a:t> </a:t>
+            </a:r>
+            <a:r>
+              <a:rPr lang="en-US" sz="1100" b="1" dirty="0" smtClean="0">
+                <a:solidFill>
+                  <a:schemeClr val="accent2">
+                    <a:lumMod val="75000"/>
+                  </a:schemeClr>
+                </a:solidFill>
+                <a:latin typeface="Consolas" pitchFamily="49" charset="0"/>
+                <a:cs typeface="Consolas" pitchFamily="49" charset="0"/>
+              </a:rPr>
+              <a:t>return</a:t>
+            </a:r>
+            <a:r>
+              <a:rPr lang="en-US" sz="1100" dirty="0" smtClean="0">
+                <a:solidFill>
+                  <a:schemeClr val="tx1"/>
+                </a:solidFill>
+                <a:latin typeface="Consolas" pitchFamily="49" charset="0"/>
+                <a:cs typeface="Consolas" pitchFamily="49" charset="0"/>
+              </a:rPr>
+              <a:t> </a:t>
+            </a:r>
+            <a:r>
+              <a:rPr lang="en-US" sz="1100" dirty="0">
+                <a:solidFill>
+                  <a:schemeClr val="tx1"/>
+                </a:solidFill>
+                <a:latin typeface="Consolas" pitchFamily="49" charset="0"/>
+                <a:cs typeface="Consolas" pitchFamily="49" charset="0"/>
+              </a:rPr>
+              <a:t>neutral</a:t>
+            </a:r>
+            <a:r>
+              <a:rPr lang="en-US" sz="1100" dirty="0" smtClean="0">
+                <a:solidFill>
+                  <a:schemeClr val="tx1"/>
+                </a:solidFill>
+                <a:latin typeface="Consolas" pitchFamily="49" charset="0"/>
+                <a:cs typeface="Consolas" pitchFamily="49" charset="0"/>
+              </a:rPr>
+              <a:t>();</a:t>
+            </a:r>
+            <a:r>
+              <a:rPr lang="ru-RU" sz="1100" dirty="0" smtClean="0">
+                <a:solidFill>
+                  <a:schemeClr val="tx1"/>
+                </a:solidFill>
+                <a:latin typeface="Consolas" pitchFamily="49" charset="0"/>
+                <a:cs typeface="Consolas" pitchFamily="49" charset="0"/>
+              </a:rPr>
+              <a:t> </a:t>
+            </a:r>
+            <a:r>
+              <a:rPr lang="en-US" sz="1100" dirty="0" smtClean="0">
+                <a:solidFill>
+                  <a:schemeClr val="tx1"/>
+                </a:solidFill>
+                <a:latin typeface="Consolas" pitchFamily="49" charset="0"/>
+                <a:cs typeface="Consolas" pitchFamily="49" charset="0"/>
+              </a:rPr>
+              <a:t>}</a:t>
+            </a:r>
+            <a:endParaRPr lang="en-US" sz="1100" dirty="0">
+              <a:solidFill>
+                <a:schemeClr val="tx1"/>
+              </a:solidFill>
+              <a:latin typeface="Consolas" pitchFamily="49" charset="0"/>
+              <a:cs typeface="Consolas" pitchFamily="49" charset="0"/>
+            </a:endParaRPr>
+          </a:p>
+          <a:p>
+            <a:pPr marL="0" indent="0">
+              <a:buNone/>
+            </a:pPr>
+            <a:r>
+              <a:rPr lang="ru-RU" sz="1100" b="1" dirty="0" smtClean="0">
+                <a:solidFill>
+                  <a:schemeClr val="accent2">
+                    <a:lumMod val="75000"/>
+                  </a:schemeClr>
+                </a:solidFill>
+                <a:latin typeface="Consolas" pitchFamily="49" charset="0"/>
+                <a:cs typeface="Consolas" pitchFamily="49" charset="0"/>
+              </a:rPr>
+              <a:t>    </a:t>
+            </a:r>
+            <a:r>
+              <a:rPr lang="en-US" sz="1100" b="1" dirty="0" smtClean="0">
+                <a:solidFill>
+                  <a:schemeClr val="accent2">
+                    <a:lumMod val="75000"/>
+                  </a:schemeClr>
+                </a:solidFill>
+                <a:latin typeface="Consolas" pitchFamily="49" charset="0"/>
+                <a:cs typeface="Consolas" pitchFamily="49" charset="0"/>
+              </a:rPr>
+              <a:t>state </a:t>
+            </a:r>
+            <a:r>
+              <a:rPr lang="en-US" sz="1100" dirty="0">
+                <a:solidFill>
+                  <a:schemeClr val="tx1"/>
+                </a:solidFill>
+                <a:latin typeface="Consolas" pitchFamily="49" charset="0"/>
+                <a:cs typeface="Consolas" pitchFamily="49" charset="0"/>
+              </a:rPr>
+              <a:t>gear1(){</a:t>
+            </a:r>
+          </a:p>
+          <a:p>
+            <a:pPr marL="0" indent="0">
+              <a:buNone/>
+            </a:pPr>
+            <a:r>
+              <a:rPr lang="ru-RU" sz="1100" dirty="0" smtClean="0">
+                <a:solidFill>
+                  <a:schemeClr val="tx1"/>
+                </a:solidFill>
+                <a:latin typeface="Consolas" pitchFamily="49" charset="0"/>
+                <a:cs typeface="Consolas" pitchFamily="49" charset="0"/>
+              </a:rPr>
+              <a:t>        </a:t>
+            </a:r>
+            <a:r>
+              <a:rPr lang="en-US" sz="1100" dirty="0" err="1" smtClean="0">
+                <a:solidFill>
+                  <a:schemeClr val="tx1"/>
+                </a:solidFill>
+                <a:latin typeface="Consolas" pitchFamily="49" charset="0"/>
+                <a:cs typeface="Consolas" pitchFamily="49" charset="0"/>
+              </a:rPr>
+              <a:t>cmd</a:t>
+            </a:r>
+            <a:r>
+              <a:rPr lang="en-US" sz="1100" dirty="0" smtClean="0">
+                <a:solidFill>
+                  <a:schemeClr val="tx1"/>
+                </a:solidFill>
+                <a:latin typeface="Consolas" pitchFamily="49" charset="0"/>
+                <a:cs typeface="Consolas" pitchFamily="49" charset="0"/>
+              </a:rPr>
+              <a:t> </a:t>
+            </a:r>
+            <a:r>
+              <a:rPr lang="en-US" sz="1100" dirty="0">
+                <a:solidFill>
+                  <a:schemeClr val="tx1"/>
+                </a:solidFill>
+                <a:latin typeface="Consolas" pitchFamily="49" charset="0"/>
+                <a:cs typeface="Consolas" pitchFamily="49" charset="0"/>
+              </a:rPr>
+              <a:t>= </a:t>
+            </a:r>
+            <a:r>
+              <a:rPr lang="en-US" sz="1100" dirty="0" err="1">
+                <a:solidFill>
+                  <a:schemeClr val="tx1"/>
+                </a:solidFill>
+                <a:latin typeface="Consolas" pitchFamily="49" charset="0"/>
+                <a:cs typeface="Consolas" pitchFamily="49" charset="0"/>
+              </a:rPr>
+              <a:t>driver.press</a:t>
+            </a:r>
+            <a:r>
+              <a:rPr lang="en-US" sz="1100" dirty="0">
+                <a:solidFill>
+                  <a:schemeClr val="tx1"/>
+                </a:solidFill>
+                <a:latin typeface="Consolas" pitchFamily="49" charset="0"/>
+                <a:cs typeface="Consolas" pitchFamily="49" charset="0"/>
+              </a:rPr>
+              <a:t>(2);</a:t>
+            </a:r>
+          </a:p>
+          <a:p>
+            <a:pPr marL="0" indent="0">
+              <a:buNone/>
+            </a:pPr>
+            <a:r>
+              <a:rPr lang="ru-RU" sz="1100" dirty="0" smtClean="0">
+                <a:solidFill>
+                  <a:schemeClr val="tx1"/>
+                </a:solidFill>
+                <a:latin typeface="Consolas" pitchFamily="49" charset="0"/>
+                <a:cs typeface="Consolas" pitchFamily="49" charset="0"/>
+              </a:rPr>
+              <a:t>        </a:t>
+            </a:r>
+            <a:r>
+              <a:rPr lang="en-US" sz="1100" dirty="0" smtClean="0">
+                <a:solidFill>
+                  <a:schemeClr val="tx1"/>
+                </a:solidFill>
+                <a:latin typeface="Consolas" pitchFamily="49" charset="0"/>
+                <a:cs typeface="Consolas" pitchFamily="49" charset="0"/>
+              </a:rPr>
+              <a:t>if </a:t>
+            </a:r>
+            <a:r>
+              <a:rPr lang="en-US" sz="1100" dirty="0">
+                <a:solidFill>
+                  <a:schemeClr val="tx1"/>
+                </a:solidFill>
+                <a:latin typeface="Consolas" pitchFamily="49" charset="0"/>
+                <a:cs typeface="Consolas" pitchFamily="49" charset="0"/>
+              </a:rPr>
+              <a:t>(</a:t>
+            </a:r>
+            <a:r>
+              <a:rPr lang="en-US" sz="1100" dirty="0" err="1">
+                <a:solidFill>
+                  <a:schemeClr val="tx1"/>
+                </a:solidFill>
+                <a:latin typeface="Consolas" pitchFamily="49" charset="0"/>
+                <a:cs typeface="Consolas" pitchFamily="49" charset="0"/>
+              </a:rPr>
+              <a:t>cmd</a:t>
+            </a:r>
+            <a:r>
+              <a:rPr lang="en-US" sz="1100" dirty="0">
+                <a:solidFill>
+                  <a:schemeClr val="tx1"/>
+                </a:solidFill>
+                <a:latin typeface="Consolas" pitchFamily="49" charset="0"/>
+                <a:cs typeface="Consolas" pitchFamily="49" charset="0"/>
+              </a:rPr>
+              <a:t> == 1</a:t>
+            </a:r>
+            <a:r>
+              <a:rPr lang="en-US" sz="1100" dirty="0" smtClean="0">
+                <a:solidFill>
+                  <a:schemeClr val="tx1"/>
+                </a:solidFill>
+                <a:latin typeface="Consolas" pitchFamily="49" charset="0"/>
+                <a:cs typeface="Consolas" pitchFamily="49" charset="0"/>
+              </a:rPr>
+              <a:t>) {</a:t>
+            </a:r>
+            <a:r>
+              <a:rPr lang="ru-RU" sz="1100" dirty="0" smtClean="0">
+                <a:solidFill>
+                  <a:schemeClr val="tx1"/>
+                </a:solidFill>
+                <a:latin typeface="Consolas" pitchFamily="49" charset="0"/>
+                <a:cs typeface="Consolas" pitchFamily="49" charset="0"/>
+              </a:rPr>
+              <a:t> </a:t>
+            </a:r>
+            <a:r>
+              <a:rPr lang="en-US" sz="1100" b="1" dirty="0" smtClean="0">
+                <a:solidFill>
+                  <a:schemeClr val="accent2">
+                    <a:lumMod val="75000"/>
+                  </a:schemeClr>
+                </a:solidFill>
+                <a:latin typeface="Consolas" pitchFamily="49" charset="0"/>
+                <a:cs typeface="Consolas" pitchFamily="49" charset="0"/>
+              </a:rPr>
+              <a:t>return</a:t>
+            </a:r>
+            <a:r>
+              <a:rPr lang="en-US" sz="1100" dirty="0" smtClean="0">
+                <a:solidFill>
+                  <a:schemeClr val="tx1"/>
+                </a:solidFill>
+                <a:latin typeface="Consolas" pitchFamily="49" charset="0"/>
+                <a:cs typeface="Consolas" pitchFamily="49" charset="0"/>
+              </a:rPr>
+              <a:t> </a:t>
+            </a:r>
+            <a:r>
+              <a:rPr lang="en-US" sz="1100" dirty="0">
+                <a:solidFill>
+                  <a:schemeClr val="tx1"/>
+                </a:solidFill>
+                <a:latin typeface="Consolas" pitchFamily="49" charset="0"/>
+                <a:cs typeface="Consolas" pitchFamily="49" charset="0"/>
+              </a:rPr>
+              <a:t>neutral</a:t>
+            </a:r>
+            <a:r>
+              <a:rPr lang="en-US" sz="1100" dirty="0" smtClean="0">
+                <a:solidFill>
+                  <a:schemeClr val="tx1"/>
+                </a:solidFill>
+                <a:latin typeface="Consolas" pitchFamily="49" charset="0"/>
+                <a:cs typeface="Consolas" pitchFamily="49" charset="0"/>
+              </a:rPr>
+              <a:t>(); } </a:t>
+            </a:r>
+          </a:p>
+          <a:p>
+            <a:pPr marL="0" indent="0">
+              <a:buNone/>
+            </a:pPr>
+            <a:r>
+              <a:rPr lang="en-US" sz="1100" dirty="0">
+                <a:solidFill>
+                  <a:schemeClr val="tx1"/>
+                </a:solidFill>
+                <a:latin typeface="Consolas" pitchFamily="49" charset="0"/>
+                <a:cs typeface="Consolas" pitchFamily="49" charset="0"/>
+              </a:rPr>
+              <a:t> </a:t>
+            </a:r>
+            <a:r>
+              <a:rPr lang="en-US" sz="1100" dirty="0" smtClean="0">
+                <a:solidFill>
+                  <a:schemeClr val="tx1"/>
+                </a:solidFill>
+                <a:latin typeface="Consolas" pitchFamily="49" charset="0"/>
+                <a:cs typeface="Consolas" pitchFamily="49" charset="0"/>
+              </a:rPr>
+              <a:t>       else {</a:t>
+            </a:r>
+            <a:r>
+              <a:rPr lang="ru-RU" sz="1100" dirty="0" smtClean="0">
+                <a:solidFill>
+                  <a:schemeClr val="tx1"/>
+                </a:solidFill>
+                <a:latin typeface="Consolas" pitchFamily="49" charset="0"/>
+                <a:cs typeface="Consolas" pitchFamily="49" charset="0"/>
+              </a:rPr>
+              <a:t> </a:t>
+            </a:r>
+            <a:r>
+              <a:rPr lang="en-US" sz="1100" b="1" dirty="0" smtClean="0">
+                <a:solidFill>
+                  <a:schemeClr val="accent2">
+                    <a:lumMod val="75000"/>
+                  </a:schemeClr>
+                </a:solidFill>
+                <a:latin typeface="Consolas" pitchFamily="49" charset="0"/>
+                <a:cs typeface="Consolas" pitchFamily="49" charset="0"/>
+              </a:rPr>
+              <a:t>return</a:t>
+            </a:r>
+            <a:r>
+              <a:rPr lang="en-US" sz="1100" dirty="0" smtClean="0">
+                <a:solidFill>
+                  <a:schemeClr val="tx1"/>
+                </a:solidFill>
+                <a:latin typeface="Consolas" pitchFamily="49" charset="0"/>
+                <a:cs typeface="Consolas" pitchFamily="49" charset="0"/>
+              </a:rPr>
+              <a:t> </a:t>
+            </a:r>
+            <a:r>
+              <a:rPr lang="en-US" sz="1100" dirty="0">
+                <a:solidFill>
+                  <a:schemeClr val="tx1"/>
+                </a:solidFill>
+                <a:latin typeface="Consolas" pitchFamily="49" charset="0"/>
+                <a:cs typeface="Consolas" pitchFamily="49" charset="0"/>
+              </a:rPr>
+              <a:t>gear2</a:t>
+            </a:r>
+            <a:r>
+              <a:rPr lang="en-US" sz="1100" dirty="0" smtClean="0">
+                <a:solidFill>
+                  <a:schemeClr val="tx1"/>
+                </a:solidFill>
+                <a:latin typeface="Consolas" pitchFamily="49" charset="0"/>
+                <a:cs typeface="Consolas" pitchFamily="49" charset="0"/>
+              </a:rPr>
+              <a:t>();</a:t>
+            </a:r>
+            <a:r>
+              <a:rPr lang="ru-RU" sz="1100" dirty="0" smtClean="0">
+                <a:solidFill>
+                  <a:schemeClr val="tx1"/>
+                </a:solidFill>
+                <a:latin typeface="Consolas" pitchFamily="49" charset="0"/>
+                <a:cs typeface="Consolas" pitchFamily="49" charset="0"/>
+              </a:rPr>
+              <a:t> </a:t>
+            </a:r>
+            <a:r>
+              <a:rPr lang="en-US" sz="1100" dirty="0" smtClean="0">
+                <a:solidFill>
+                  <a:schemeClr val="tx1"/>
+                </a:solidFill>
+                <a:latin typeface="Consolas" pitchFamily="49" charset="0"/>
+                <a:cs typeface="Consolas" pitchFamily="49" charset="0"/>
+              </a:rPr>
+              <a:t>}</a:t>
+            </a:r>
+            <a:endParaRPr lang="en-US" sz="1100" dirty="0">
+              <a:solidFill>
+                <a:schemeClr val="tx1"/>
+              </a:solidFill>
+              <a:latin typeface="Consolas" pitchFamily="49" charset="0"/>
+              <a:cs typeface="Consolas" pitchFamily="49" charset="0"/>
+            </a:endParaRPr>
+          </a:p>
+          <a:p>
+            <a:pPr marL="0" indent="0">
+              <a:buNone/>
+            </a:pPr>
+            <a:r>
+              <a:rPr lang="ru-RU" sz="1100" dirty="0" smtClean="0">
+                <a:solidFill>
+                  <a:schemeClr val="tx1"/>
+                </a:solidFill>
+                <a:latin typeface="Consolas" pitchFamily="49" charset="0"/>
+                <a:cs typeface="Consolas" pitchFamily="49" charset="0"/>
+              </a:rPr>
+              <a:t>    </a:t>
+            </a:r>
+            <a:r>
+              <a:rPr lang="en-US" sz="1100" dirty="0" smtClean="0">
+                <a:solidFill>
+                  <a:schemeClr val="tx1"/>
+                </a:solidFill>
+                <a:latin typeface="Consolas" pitchFamily="49" charset="0"/>
+                <a:cs typeface="Consolas" pitchFamily="49" charset="0"/>
+              </a:rPr>
+              <a:t>}</a:t>
+            </a:r>
+            <a:endParaRPr lang="en-US" sz="1100" dirty="0">
+              <a:solidFill>
+                <a:schemeClr val="tx1"/>
+              </a:solidFill>
+              <a:latin typeface="Consolas" pitchFamily="49" charset="0"/>
+              <a:cs typeface="Consolas" pitchFamily="49" charset="0"/>
+            </a:endParaRPr>
+          </a:p>
+          <a:p>
+            <a:pPr marL="0" indent="0">
+              <a:buNone/>
+            </a:pPr>
+            <a:r>
+              <a:rPr lang="en-US" sz="1100" dirty="0" smtClean="0">
+                <a:solidFill>
+                  <a:schemeClr val="tx1"/>
+                </a:solidFill>
+                <a:latin typeface="Consolas" pitchFamily="49" charset="0"/>
+                <a:cs typeface="Consolas" pitchFamily="49" charset="0"/>
+              </a:rPr>
+              <a:t>    </a:t>
+            </a:r>
+            <a:r>
+              <a:rPr lang="en-US" sz="1100" b="1" dirty="0" smtClean="0">
+                <a:solidFill>
+                  <a:schemeClr val="accent2">
+                    <a:lumMod val="75000"/>
+                  </a:schemeClr>
+                </a:solidFill>
+                <a:latin typeface="Consolas" pitchFamily="49" charset="0"/>
+                <a:cs typeface="Consolas" pitchFamily="49" charset="0"/>
+              </a:rPr>
+              <a:t>state</a:t>
+            </a:r>
+            <a:r>
+              <a:rPr lang="en-US" sz="1100" dirty="0" smtClean="0">
+                <a:solidFill>
+                  <a:schemeClr val="tx1"/>
+                </a:solidFill>
+                <a:latin typeface="Consolas" pitchFamily="49" charset="0"/>
+                <a:cs typeface="Consolas" pitchFamily="49" charset="0"/>
+              </a:rPr>
+              <a:t> </a:t>
+            </a:r>
+            <a:r>
+              <a:rPr lang="en-US" sz="1100" dirty="0">
+                <a:solidFill>
+                  <a:schemeClr val="tx1"/>
+                </a:solidFill>
+                <a:latin typeface="Consolas" pitchFamily="49" charset="0"/>
+                <a:cs typeface="Consolas" pitchFamily="49" charset="0"/>
+              </a:rPr>
+              <a:t>gear5</a:t>
+            </a:r>
+            <a:r>
+              <a:rPr lang="en-US" sz="1100" dirty="0" smtClean="0">
+                <a:solidFill>
+                  <a:schemeClr val="tx1"/>
+                </a:solidFill>
+                <a:latin typeface="Consolas" pitchFamily="49" charset="0"/>
+                <a:cs typeface="Consolas" pitchFamily="49" charset="0"/>
+              </a:rPr>
+              <a:t>() { </a:t>
+            </a:r>
+            <a:r>
+              <a:rPr lang="en-US" sz="1100" b="1" dirty="0" smtClean="0">
+                <a:solidFill>
+                  <a:schemeClr val="accent2">
+                    <a:lumMod val="75000"/>
+                  </a:schemeClr>
+                </a:solidFill>
+                <a:latin typeface="Consolas" pitchFamily="49" charset="0"/>
+                <a:cs typeface="Consolas" pitchFamily="49" charset="0"/>
+              </a:rPr>
+              <a:t>return</a:t>
+            </a:r>
+            <a:r>
+              <a:rPr lang="en-US" sz="1100" dirty="0" smtClean="0">
+                <a:solidFill>
+                  <a:schemeClr val="tx1"/>
+                </a:solidFill>
+                <a:latin typeface="Consolas" pitchFamily="49" charset="0"/>
+                <a:cs typeface="Consolas" pitchFamily="49" charset="0"/>
+              </a:rPr>
+              <a:t> </a:t>
+            </a:r>
+            <a:r>
+              <a:rPr lang="en-US" sz="1100" dirty="0">
+                <a:solidFill>
+                  <a:schemeClr val="tx1"/>
+                </a:solidFill>
+                <a:latin typeface="Consolas" pitchFamily="49" charset="0"/>
+                <a:cs typeface="Consolas" pitchFamily="49" charset="0"/>
+              </a:rPr>
+              <a:t>gear4</a:t>
+            </a:r>
+            <a:r>
+              <a:rPr lang="en-US" sz="1100" dirty="0" smtClean="0">
+                <a:solidFill>
+                  <a:schemeClr val="tx1"/>
+                </a:solidFill>
+                <a:latin typeface="Consolas" pitchFamily="49" charset="0"/>
+                <a:cs typeface="Consolas" pitchFamily="49" charset="0"/>
+              </a:rPr>
+              <a:t>(); }</a:t>
+            </a:r>
+            <a:endParaRPr lang="en-US" sz="1100" dirty="0">
+              <a:solidFill>
+                <a:schemeClr val="tx1"/>
+              </a:solidFill>
+              <a:latin typeface="Consolas" pitchFamily="49" charset="0"/>
+              <a:cs typeface="Consolas" pitchFamily="49" charset="0"/>
+            </a:endParaRPr>
+          </a:p>
+          <a:p>
+            <a:pPr marL="0" indent="0">
+              <a:buNone/>
+            </a:pPr>
+            <a:r>
+              <a:rPr lang="ru-RU" sz="1100" dirty="0" smtClean="0">
+                <a:solidFill>
+                  <a:schemeClr val="tx1"/>
+                </a:solidFill>
+                <a:latin typeface="Consolas" pitchFamily="49" charset="0"/>
+                <a:cs typeface="Consolas" pitchFamily="49" charset="0"/>
+              </a:rPr>
+              <a:t>    </a:t>
+            </a:r>
+            <a:r>
+              <a:rPr lang="en-US" sz="1100" b="1" dirty="0" smtClean="0">
+                <a:solidFill>
+                  <a:schemeClr val="accent2">
+                    <a:lumMod val="75000"/>
+                  </a:schemeClr>
+                </a:solidFill>
+                <a:latin typeface="Consolas" pitchFamily="49" charset="0"/>
+                <a:cs typeface="Consolas" pitchFamily="49" charset="0"/>
+              </a:rPr>
+              <a:t>state</a:t>
+            </a:r>
+            <a:r>
+              <a:rPr lang="en-US" sz="1100" dirty="0" smtClean="0">
+                <a:solidFill>
+                  <a:schemeClr val="tx1"/>
+                </a:solidFill>
+                <a:latin typeface="Consolas" pitchFamily="49" charset="0"/>
+                <a:cs typeface="Consolas" pitchFamily="49" charset="0"/>
+              </a:rPr>
+              <a:t> </a:t>
+            </a:r>
+            <a:r>
+              <a:rPr lang="en-US" sz="1100" dirty="0">
+                <a:solidFill>
+                  <a:schemeClr val="tx1"/>
+                </a:solidFill>
+                <a:latin typeface="Consolas" pitchFamily="49" charset="0"/>
+                <a:cs typeface="Consolas" pitchFamily="49" charset="0"/>
+              </a:rPr>
+              <a:t>main</a:t>
+            </a:r>
+            <a:r>
+              <a:rPr lang="en-US" sz="1100" dirty="0" smtClean="0">
+                <a:solidFill>
+                  <a:schemeClr val="tx1"/>
+                </a:solidFill>
+                <a:latin typeface="Consolas" pitchFamily="49" charset="0"/>
+                <a:cs typeface="Consolas" pitchFamily="49" charset="0"/>
+              </a:rPr>
+              <a:t>() { </a:t>
+            </a:r>
+            <a:r>
+              <a:rPr lang="en-US" sz="1100" b="1" dirty="0" smtClean="0">
+                <a:solidFill>
+                  <a:schemeClr val="accent2">
+                    <a:lumMod val="75000"/>
+                  </a:schemeClr>
+                </a:solidFill>
+                <a:latin typeface="Consolas" pitchFamily="49" charset="0"/>
+                <a:cs typeface="Consolas" pitchFamily="49" charset="0"/>
+              </a:rPr>
+              <a:t>return</a:t>
+            </a:r>
+            <a:r>
+              <a:rPr lang="en-US" sz="1100" dirty="0" smtClean="0">
+                <a:solidFill>
+                  <a:schemeClr val="tx1"/>
+                </a:solidFill>
+                <a:latin typeface="Consolas" pitchFamily="49" charset="0"/>
+                <a:cs typeface="Consolas" pitchFamily="49" charset="0"/>
+              </a:rPr>
+              <a:t> </a:t>
+            </a:r>
+            <a:r>
+              <a:rPr lang="en-US" sz="1100" dirty="0">
+                <a:solidFill>
+                  <a:schemeClr val="tx1"/>
+                </a:solidFill>
+                <a:latin typeface="Consolas" pitchFamily="49" charset="0"/>
+                <a:cs typeface="Consolas" pitchFamily="49" charset="0"/>
+              </a:rPr>
+              <a:t>sleep</a:t>
+            </a:r>
+            <a:r>
+              <a:rPr lang="en-US" sz="1100" dirty="0" smtClean="0">
+                <a:solidFill>
+                  <a:schemeClr val="tx1"/>
+                </a:solidFill>
+                <a:latin typeface="Consolas" pitchFamily="49" charset="0"/>
+                <a:cs typeface="Consolas" pitchFamily="49" charset="0"/>
+              </a:rPr>
+              <a:t>(); }</a:t>
+            </a:r>
+            <a:endParaRPr lang="en-US" sz="1100" dirty="0">
+              <a:solidFill>
+                <a:schemeClr val="tx1"/>
+              </a:solidFill>
+              <a:latin typeface="Consolas" pitchFamily="49" charset="0"/>
+              <a:cs typeface="Consolas" pitchFamily="49" charset="0"/>
+            </a:endParaRPr>
+          </a:p>
+          <a:p>
+            <a:pPr marL="0" indent="0">
+              <a:buNone/>
+            </a:pPr>
+            <a:r>
+              <a:rPr lang="en-US" sz="1100" dirty="0" smtClean="0">
+                <a:solidFill>
+                  <a:schemeClr val="tx1"/>
+                </a:solidFill>
+                <a:latin typeface="Consolas" pitchFamily="49" charset="0"/>
+                <a:cs typeface="Consolas" pitchFamily="49" charset="0"/>
+              </a:rPr>
+              <a:t>}</a:t>
+            </a:r>
+            <a:endParaRPr lang="en-US" sz="1100" dirty="0">
+              <a:solidFill>
+                <a:schemeClr val="tx1"/>
+              </a:solidFill>
+              <a:latin typeface="Consolas" pitchFamily="49" charset="0"/>
+              <a:cs typeface="Consolas" pitchFamily="49" charset="0"/>
+            </a:endParaRPr>
+          </a:p>
+          <a:p>
+            <a:pPr marL="0" indent="0">
+              <a:buNone/>
+            </a:pPr>
+            <a:endParaRPr lang="en-US" sz="1100" dirty="0" smtClean="0">
+              <a:solidFill>
+                <a:schemeClr val="tx1"/>
+              </a:solidFill>
+              <a:latin typeface="Consolas" pitchFamily="49" charset="0"/>
+              <a:cs typeface="Consolas" pitchFamily="49" charset="0"/>
+            </a:endParaRPr>
+          </a:p>
+          <a:p>
+            <a:pPr marL="0" indent="0">
+              <a:buNone/>
+            </a:pPr>
+            <a:r>
+              <a:rPr lang="en-US" sz="1100" b="1" dirty="0" smtClean="0">
+                <a:solidFill>
+                  <a:schemeClr val="accent2">
+                    <a:lumMod val="75000"/>
+                  </a:schemeClr>
+                </a:solidFill>
+                <a:latin typeface="Consolas" pitchFamily="49" charset="0"/>
+                <a:cs typeface="Consolas" pitchFamily="49" charset="0"/>
+              </a:rPr>
+              <a:t>prototype</a:t>
+            </a:r>
+            <a:r>
+              <a:rPr lang="en-US" sz="1100" dirty="0" smtClean="0">
+                <a:solidFill>
+                  <a:schemeClr val="tx1"/>
+                </a:solidFill>
+                <a:latin typeface="Consolas" pitchFamily="49" charset="0"/>
+                <a:cs typeface="Consolas" pitchFamily="49" charset="0"/>
+              </a:rPr>
+              <a:t> </a:t>
+            </a:r>
+            <a:r>
+              <a:rPr lang="en-US" sz="1100" dirty="0" err="1">
+                <a:solidFill>
+                  <a:schemeClr val="tx1"/>
+                </a:solidFill>
+                <a:latin typeface="Consolas" pitchFamily="49" charset="0"/>
+                <a:cs typeface="Consolas" pitchFamily="49" charset="0"/>
+              </a:rPr>
+              <a:t>AutoGear</a:t>
+            </a:r>
+            <a:r>
+              <a:rPr lang="en-US" sz="1100" dirty="0">
+                <a:solidFill>
+                  <a:schemeClr val="tx1"/>
+                </a:solidFill>
+                <a:latin typeface="Consolas" pitchFamily="49" charset="0"/>
+                <a:cs typeface="Consolas" pitchFamily="49" charset="0"/>
+              </a:rPr>
+              <a:t>() </a:t>
+            </a:r>
+            <a:r>
+              <a:rPr lang="en-US" sz="1100" dirty="0" smtClean="0">
+                <a:solidFill>
+                  <a:schemeClr val="tx1"/>
+                </a:solidFill>
+                <a:latin typeface="Consolas" pitchFamily="49" charset="0"/>
+                <a:cs typeface="Consolas" pitchFamily="49" charset="0"/>
+              </a:rPr>
+              <a:t>{</a:t>
+            </a:r>
+            <a:r>
+              <a:rPr lang="ru-RU" sz="1100" dirty="0" smtClean="0">
+                <a:solidFill>
+                  <a:schemeClr val="tx1"/>
+                </a:solidFill>
+                <a:latin typeface="Consolas" pitchFamily="49" charset="0"/>
+                <a:cs typeface="Consolas" pitchFamily="49" charset="0"/>
+              </a:rPr>
+              <a:t>    </a:t>
+            </a:r>
+            <a:endParaRPr lang="en-US" sz="1100" dirty="0" smtClean="0">
+              <a:solidFill>
+                <a:schemeClr val="tx1"/>
+              </a:solidFill>
+              <a:latin typeface="Consolas" pitchFamily="49" charset="0"/>
+              <a:cs typeface="Consolas" pitchFamily="49" charset="0"/>
+            </a:endParaRPr>
+          </a:p>
+          <a:p>
+            <a:pPr marL="0" indent="0">
+              <a:buNone/>
+            </a:pPr>
+            <a:r>
+              <a:rPr lang="en-US" sz="1100" dirty="0">
+                <a:solidFill>
+                  <a:schemeClr val="tx1"/>
+                </a:solidFill>
+                <a:latin typeface="Consolas" pitchFamily="49" charset="0"/>
+                <a:cs typeface="Consolas" pitchFamily="49" charset="0"/>
+              </a:rPr>
+              <a:t> </a:t>
+            </a:r>
+            <a:r>
+              <a:rPr lang="en-US" sz="1100" dirty="0" smtClean="0">
+                <a:solidFill>
+                  <a:schemeClr val="tx1"/>
+                </a:solidFill>
+                <a:latin typeface="Consolas" pitchFamily="49" charset="0"/>
+                <a:cs typeface="Consolas" pitchFamily="49" charset="0"/>
+              </a:rPr>
+              <a:t>   </a:t>
+            </a:r>
+            <a:r>
+              <a:rPr lang="en-US" sz="1100" b="1" dirty="0" smtClean="0">
+                <a:solidFill>
+                  <a:schemeClr val="accent2">
+                    <a:lumMod val="75000"/>
+                  </a:schemeClr>
+                </a:solidFill>
+                <a:latin typeface="Consolas" pitchFamily="49" charset="0"/>
+                <a:cs typeface="Consolas" pitchFamily="49" charset="0"/>
+              </a:rPr>
+              <a:t>finally</a:t>
+            </a:r>
+            <a:r>
+              <a:rPr lang="en-US" sz="1100" dirty="0" smtClean="0">
+                <a:solidFill>
+                  <a:schemeClr val="tx1"/>
+                </a:solidFill>
+                <a:latin typeface="Consolas" pitchFamily="49" charset="0"/>
+                <a:cs typeface="Consolas" pitchFamily="49" charset="0"/>
+              </a:rPr>
+              <a:t> { </a:t>
+            </a:r>
+            <a:r>
+              <a:rPr lang="en-US" sz="1100" dirty="0" err="1" smtClean="0">
+                <a:solidFill>
+                  <a:schemeClr val="tx1"/>
+                </a:solidFill>
+                <a:latin typeface="Consolas" pitchFamily="49" charset="0"/>
+                <a:cs typeface="Consolas" pitchFamily="49" charset="0"/>
+              </a:rPr>
+              <a:t>AutoGear</a:t>
+            </a:r>
+            <a:r>
+              <a:rPr lang="en-US" sz="1100" dirty="0">
+                <a:solidFill>
+                  <a:schemeClr val="tx1"/>
+                </a:solidFill>
+                <a:latin typeface="Consolas" pitchFamily="49" charset="0"/>
+                <a:cs typeface="Consolas" pitchFamily="49" charset="0"/>
+              </a:rPr>
+              <a:t>::</a:t>
+            </a:r>
+            <a:r>
+              <a:rPr lang="en-US" sz="1100" dirty="0" smtClean="0">
+                <a:solidFill>
+                  <a:schemeClr val="tx1"/>
+                </a:solidFill>
+                <a:latin typeface="Consolas" pitchFamily="49" charset="0"/>
+                <a:cs typeface="Consolas" pitchFamily="49" charset="0"/>
+              </a:rPr>
+              <a:t>finalize }; </a:t>
+            </a:r>
+          </a:p>
+          <a:p>
+            <a:pPr marL="0" indent="0">
+              <a:buNone/>
+            </a:pPr>
+            <a:r>
+              <a:rPr lang="en-US" sz="1100" dirty="0" smtClean="0">
+                <a:solidFill>
+                  <a:schemeClr val="tx1"/>
+                </a:solidFill>
+                <a:latin typeface="Consolas" pitchFamily="49" charset="0"/>
+                <a:cs typeface="Consolas" pitchFamily="49" charset="0"/>
+              </a:rPr>
+              <a:t>}</a:t>
+            </a:r>
+          </a:p>
+          <a:p>
+            <a:pPr marL="0" indent="0">
+              <a:buNone/>
+            </a:pPr>
+            <a:endParaRPr lang="en-US" sz="1100" dirty="0">
+              <a:solidFill>
+                <a:schemeClr val="tx1"/>
+              </a:solidFill>
+              <a:latin typeface="Consolas" pitchFamily="49" charset="0"/>
+              <a:cs typeface="Consolas" pitchFamily="49" charset="0"/>
+            </a:endParaRPr>
+          </a:p>
+          <a:p>
+            <a:pPr marL="0" indent="0">
+              <a:buNone/>
+            </a:pPr>
+            <a:endParaRPr lang="en-US" sz="1100" dirty="0" smtClean="0">
+              <a:solidFill>
+                <a:schemeClr val="tx1"/>
+              </a:solidFill>
+              <a:latin typeface="Consolas" pitchFamily="49" charset="0"/>
+              <a:cs typeface="Consolas" pitchFamily="49" charset="0"/>
+            </a:endParaRPr>
+          </a:p>
+          <a:p>
+            <a:pPr marL="0" indent="0">
+              <a:buNone/>
+            </a:pPr>
+            <a:endParaRPr lang="en-US" sz="1100" dirty="0">
+              <a:solidFill>
+                <a:schemeClr val="tx1"/>
+              </a:solidFill>
+              <a:latin typeface="Consolas" pitchFamily="49" charset="0"/>
+              <a:cs typeface="Consolas" pitchFamily="49" charset="0"/>
+            </a:endParaRPr>
+          </a:p>
+          <a:p>
+            <a:pPr marL="0" indent="0">
+              <a:buNone/>
+            </a:pPr>
+            <a:endParaRPr lang="ru-RU" sz="1100" dirty="0">
+              <a:solidFill>
+                <a:schemeClr val="tx1"/>
+              </a:solidFill>
+              <a:latin typeface="Consolas" pitchFamily="49" charset="0"/>
+              <a:cs typeface="Consolas" pitchFamily="49" charset="0"/>
+            </a:endParaRPr>
+          </a:p>
+        </p:txBody>
+      </p:sp>
     </p:spTree>
     <p:extLst>
       <p:ext uri="{BB962C8B-B14F-4D97-AF65-F5344CB8AC3E}">
@@ -8673,101 +10108,19 @@
             <p:ph type="title"/>
           </p:nvPr>
         </p:nvSpPr>
-        <p:spPr>
-          <a:xfrm>
-            <a:off x="518864" y="-115416"/>
-            <a:ext cx="8229600" cy="1600200"/>
-          </a:xfrm>
-        </p:spPr>
+        <p:spPr/>
         <p:txBody>
           <a:bodyPr/>
           <a:lstStyle/>
           <a:p>
             <a:r>
-              <a:rPr lang="ru-RU" dirty="0" smtClean="0"/>
-              <a:t>Входные и выходные данные</a:t>
+              <a:rPr lang="en-US" dirty="0" smtClean="0"/>
+              <a:t>Eclipse Plug-in</a:t>
             </a:r>
             <a:endParaRPr lang="ru-RU" dirty="0"/>
           </a:p>
         </p:txBody>
       </p:sp>
-      <p:sp>
-        <p:nvSpPr>
-          <p:cNvPr id="5" name="Текст 4"/>
-          <p:cNvSpPr>
-            <a:spLocks noGrp="1"/>
-          </p:cNvSpPr>
-          <p:nvPr>
-            <p:ph type="body" sz="quarter" idx="3"/>
-          </p:nvPr>
-        </p:nvSpPr>
-        <p:spPr/>
-        <p:txBody>
-          <a:bodyPr/>
-          <a:lstStyle/>
-          <a:p>
-            <a:endParaRPr lang="ru-RU"/>
-          </a:p>
-        </p:txBody>
-      </p:sp>
-      <p:pic>
-        <p:nvPicPr>
-          <p:cNvPr id="8" name="Объект 7"/>
-          <p:cNvPicPr>
-            <a:picLocks noGrp="1" noChangeAspect="1"/>
-          </p:cNvPicPr>
-          <p:nvPr>
-            <p:ph sz="quarter" idx="13"/>
-          </p:nvPr>
-        </p:nvPicPr>
-        <p:blipFill>
-          <a:blip r:embed="rId3">
-            <a:extLst>
-              <a:ext uri="{28A0092B-C50C-407E-A947-70E740481C1C}">
-                <a14:useLocalDpi xmlns:a14="http://schemas.microsoft.com/office/drawing/2010/main" val="0"/>
-              </a:ext>
-            </a:extLst>
-          </a:blip>
-          <a:stretch>
-            <a:fillRect/>
-          </a:stretch>
-        </p:blipFill>
-        <p:spPr>
-          <a:xfrm>
-            <a:off x="107503" y="1412776"/>
-            <a:ext cx="3766331" cy="4968552"/>
-          </a:xfrm>
-        </p:spPr>
-      </p:pic>
-      <p:pic>
-        <p:nvPicPr>
-          <p:cNvPr id="9" name="Объект 8"/>
-          <p:cNvPicPr>
-            <a:picLocks noGrp="1" noChangeAspect="1"/>
-          </p:cNvPicPr>
-          <p:nvPr>
-            <p:ph sz="quarter" idx="14"/>
-          </p:nvPr>
-        </p:nvPicPr>
-        <p:blipFill>
-          <a:blip r:embed="rId4">
-            <a:extLst>
-              <a:ext uri="{28A0092B-C50C-407E-A947-70E740481C1C}">
-                <a14:useLocalDpi xmlns:a14="http://schemas.microsoft.com/office/drawing/2010/main" val="0"/>
-              </a:ext>
-            </a:extLst>
-          </a:blip>
-          <a:stretch>
-            <a:fillRect/>
-          </a:stretch>
-        </p:blipFill>
-        <p:spPr>
-          <a:xfrm>
-            <a:off x="4499992" y="1484784"/>
-            <a:ext cx="4464496" cy="4857312"/>
-          </a:xfrm>
-        </p:spPr>
-      </p:pic>
       <p:sp>
         <p:nvSpPr>
           <p:cNvPr id="4" name="Text Box 5"/>
@@ -8829,46 +10182,6 @@
       </p:sp>
       <p:sp>
         <p:nvSpPr>
-          <p:cNvPr id="12" name="Стрелка вправо с вырезом 11"/>
-          <p:cNvSpPr/>
-          <p:nvPr/>
-        </p:nvSpPr>
-        <p:spPr>
-          <a:xfrm>
-            <a:off x="3716747" y="3477384"/>
-            <a:ext cx="1431317" cy="648072"/>
-          </a:xfrm>
-          <a:prstGeom prst="notchedRightArrow">
-            <a:avLst/>
-          </a:prstGeom>
-        </p:spPr>
-        <p:style>
-          <a:lnRef idx="2">
-            <a:schemeClr val="accent1">
-              <a:shade val="50000"/>
-            </a:schemeClr>
-          </a:lnRef>
-          <a:fillRef idx="1">
-            <a:schemeClr val="accent1"/>
-          </a:fillRef>
-          <a:effectRef idx="0">
-            <a:schemeClr val="accent1"/>
-          </a:effectRef>
-          <a:fontRef idx="minor">
-            <a:schemeClr val="lt1"/>
-          </a:fontRef>
-        </p:style>
-        <p:txBody>
-          <a:bodyPr rtlCol="0" anchor="ctr"/>
-          <a:lstStyle/>
-          <a:p>
-            <a:pPr algn="ctr"/>
-            <a:endParaRPr lang="ru-RU"/>
-          </a:p>
-        </p:txBody>
-      </p:sp>
-      <p:sp>
-        <p:nvSpPr>
           <p:cNvPr id="3" name="Номер слайда 2"/>
           <p:cNvSpPr>
             <a:spLocks noGrp="1"/>
@@ -8885,148 +10198,6 @@
             <a:fld id="{0119AA8D-81DD-40BD-8E0C-7D93F639C7BB}" type="slidenum">
               <a:rPr lang="ru-RU" smtClean="0"/>
               <a:t>14</a:t>
-            </a:fld>
-            <a:endParaRPr lang="ru-RU"/>
-          </a:p>
-        </p:txBody>
-      </p:sp>
-    </p:spTree>
-    <p:extLst>
-      <p:ext uri="{BB962C8B-B14F-4D97-AF65-F5344CB8AC3E}">
-        <p14:creationId xmlns:p14="http://schemas.microsoft.com/office/powerpoint/2010/main" val="3348012950"/>
-      </p:ext>
-    </p:extLst>
-  </p:cSld>
-  <p:clrMapOvr>
-    <a:masterClrMapping/>
-  </p:clrMapOvr>
-  <p:timing>
-    <p:tnLst>
-      <p:par>
-        <p:cTn id="1" dur="indefinite" restart="never" nodeType="tmRoot"/>
-      </p:par>
-    </p:tnLst>
-  </p:timing>
-</p:sld>
-</file>
-
-<file path=ppt/slides/slide15.xml><?xml version="1.0" encoding="utf-8"?>
-<p:sld xmlns:a="http://schemas.openxmlformats.org/drawingml/2006/main" xmlns:r="http://schemas.openxmlformats.org/officeDocument/2006/relationships" xmlns:p="http://schemas.openxmlformats.org/presentationml/2006/main">
-  <p:cSld>
-    <p:spTree>
-      <p:nvGrpSpPr>
-        <p:cNvPr id="1" name=""/>
-        <p:cNvGrpSpPr/>
-        <p:nvPr/>
-      </p:nvGrpSpPr>
-      <p:grpSpPr>
-        <a:xfrm>
-          <a:off x="0" y="0"/>
-          <a:ext cx="0" cy="0"/>
-          <a:chOff x="0" y="0"/>
-          <a:chExt cx="0" cy="0"/>
-        </a:xfrm>
-      </p:grpSpPr>
-      <p:sp>
-        <p:nvSpPr>
-          <p:cNvPr id="2" name="Заголовок 1"/>
-          <p:cNvSpPr>
-            <a:spLocks noGrp="1"/>
-          </p:cNvSpPr>
-          <p:nvPr>
-            <p:ph type="title"/>
-          </p:nvPr>
-        </p:nvSpPr>
-        <p:spPr/>
-        <p:txBody>
-          <a:bodyPr/>
-          <a:lstStyle/>
-          <a:p>
-            <a:r>
-              <a:rPr lang="en-US" dirty="0" smtClean="0"/>
-              <a:t>Eclipse Plug-in</a:t>
-            </a:r>
-            <a:endParaRPr lang="ru-RU" dirty="0"/>
-          </a:p>
-        </p:txBody>
-      </p:sp>
-      <p:sp>
-        <p:nvSpPr>
-          <p:cNvPr id="4" name="Text Box 5"/>
-          <p:cNvSpPr txBox="1">
-            <a:spLocks noChangeArrowheads="1"/>
-          </p:cNvSpPr>
-          <p:nvPr/>
-        </p:nvSpPr>
-        <p:spPr bwMode="auto">
-          <a:xfrm>
-            <a:off x="773262" y="6453336"/>
-            <a:ext cx="5886970" cy="190052"/>
-          </a:xfrm>
-          <a:prstGeom prst="rect">
-            <a:avLst/>
-          </a:prstGeom>
-          <a:noFill/>
-          <a:ln w="9525">
-            <a:noFill/>
-            <a:miter lim="800000"/>
-            <a:headEnd/>
-            <a:tailEnd/>
-          </a:ln>
-        </p:spPr>
-        <p:txBody>
-          <a:bodyPr wrap="square" lIns="0" tIns="0" rIns="0" bIns="0" anchor="b">
-            <a:spAutoFit/>
-          </a:bodyPr>
-          <a:lstStyle/>
-          <a:p>
-            <a:pPr>
-              <a:lnSpc>
-                <a:spcPct val="95000"/>
-              </a:lnSpc>
-            </a:pPr>
-            <a:r>
-              <a:rPr lang="ru-RU" sz="1300" dirty="0">
-                <a:solidFill>
-                  <a:srgbClr val="045C75"/>
-                </a:solidFill>
-              </a:rPr>
-              <a:t>АлтГТУ им. И. И. </a:t>
-            </a:r>
-            <a:r>
-              <a:rPr lang="ru-RU" sz="1300" dirty="0" smtClean="0">
-                <a:solidFill>
-                  <a:srgbClr val="045C75"/>
-                </a:solidFill>
-              </a:rPr>
-              <a:t>Ползунова / ПОВТ, Юлия Шатилина</a:t>
-            </a:r>
-            <a:endParaRPr lang="en-US" sz="1300" dirty="0">
-              <a:solidFill>
-                <a:srgbClr val="045C75"/>
-              </a:solidFill>
-            </a:endParaRPr>
-          </a:p>
-        </p:txBody>
-      </p:sp>
-      <p:sp>
-        <p:nvSpPr>
-          <p:cNvPr id="3" name="Номер слайда 2"/>
-          <p:cNvSpPr>
-            <a:spLocks noGrp="1"/>
-          </p:cNvSpPr>
-          <p:nvPr>
-            <p:ph type="sldNum" sz="quarter" idx="12"/>
-          </p:nvPr>
-        </p:nvSpPr>
-        <p:spPr/>
-        <p:txBody>
-          <a:bodyPr/>
-          <a:lstStyle/>
-          <a:p>
-            <a:fld id="{0119AA8D-81DD-40BD-8E0C-7D93F639C7BB}" type="slidenum">
-              <a:rPr lang="ru-RU" smtClean="0"/>
-              <a:t>15</a:t>
             </a:fld>
             <a:endParaRPr lang="ru-RU"/>
           </a:p>
@@ -9114,7 +10285,7 @@
 </p:sld>
 </file>
 
-<file path=ppt/slides/slide16.xml><?xml version="1.0" encoding="utf-8"?>
+<file path=ppt/slides/slide15.xml><?xml version="1.0" encoding="utf-8"?>
 <p:sld xmlns:a="http://schemas.openxmlformats.org/drawingml/2006/main" xmlns:r="http://schemas.openxmlformats.org/officeDocument/2006/relationships" xmlns:p="http://schemas.openxmlformats.org/presentationml/2006/main">
   <p:cSld>
     <p:spTree>
@@ -9518,7 +10689,7 @@
           <a:p>
             <a:fld id="{0119AA8D-81DD-40BD-8E0C-7D93F639C7BB}" type="slidenum">
               <a:rPr lang="ru-RU" smtClean="0"/>
-              <a:t>16</a:t>
+              <a:t>15</a:t>
             </a:fld>
             <a:endParaRPr lang="ru-RU"/>
           </a:p>
@@ -9544,7 +10715,7 @@
 </p:sld>
 </file>
 
-<file path=ppt/slides/slide17.xml><?xml version="1.0" encoding="utf-8"?>
+<file path=ppt/slides/slide16.xml><?xml version="1.0" encoding="utf-8"?>
 <p:sld xmlns:a="http://schemas.openxmlformats.org/drawingml/2006/main" xmlns:r="http://schemas.openxmlformats.org/officeDocument/2006/relationships" xmlns:p="http://schemas.openxmlformats.org/presentationml/2006/main">
   <p:cSld>
     <p:spTree>
@@ -9777,7 +10948,7 @@
           <a:p>
             <a:fld id="{0119AA8D-81DD-40BD-8E0C-7D93F639C7BB}" type="slidenum">
               <a:rPr lang="ru-RU" smtClean="0"/>
-              <a:t>17</a:t>
+              <a:t>16</a:t>
             </a:fld>
             <a:endParaRPr lang="ru-RU"/>
           </a:p>
@@ -9803,7 +10974,7 @@
 </p:sld>
 </file>
 
-<file path=ppt/slides/slide18.xml><?xml version="1.0" encoding="utf-8"?>
+<file path=ppt/slides/slide17.xml><?xml version="1.0" encoding="utf-8"?>
 <p:sld xmlns:a="http://schemas.openxmlformats.org/drawingml/2006/main" xmlns:r="http://schemas.openxmlformats.org/officeDocument/2006/relationships" xmlns:p="http://schemas.openxmlformats.org/presentationml/2006/main">
   <p:cSld>
     <p:spTree>
@@ -9920,7 +11091,7 @@
           <a:p>
             <a:fld id="{0119AA8D-81DD-40BD-8E0C-7D93F639C7BB}" type="slidenum">
               <a:rPr lang="ru-RU" smtClean="0"/>
-              <a:t>18</a:t>
+              <a:t>17</a:t>
             </a:fld>
             <a:endParaRPr lang="ru-RU"/>
           </a:p>
@@ -9946,7 +11117,7 @@
 </p:sld>
 </file>
 
-<file path=ppt/slides/slide19.xml><?xml version="1.0" encoding="utf-8"?>
+<file path=ppt/slides/slide18.xml><?xml version="1.0" encoding="utf-8"?>
 <p:sld xmlns:a="http://schemas.openxmlformats.org/drawingml/2006/main" xmlns:r="http://schemas.openxmlformats.org/officeDocument/2006/relationships" xmlns:p="http://schemas.openxmlformats.org/presentationml/2006/main" show="0">
   <p:cSld>
     <p:spTree>
@@ -10166,7 +11337,7 @@
           <a:p>
             <a:fld id="{0119AA8D-81DD-40BD-8E0C-7D93F639C7BB}" type="slidenum">
               <a:rPr lang="ru-RU" smtClean="0"/>
-              <a:t>19</a:t>
+              <a:t>18</a:t>
             </a:fld>
             <a:endParaRPr lang="ru-RU"/>
           </a:p>
@@ -11728,22 +12899,12 @@
           </a:p>
           <a:p>
             <a:r>
-              <a:rPr lang="ru-RU" sz="2800" dirty="0"/>
-              <a:t>н</a:t>
-            </a:r>
-            <a:r>
               <a:rPr lang="ru-RU" sz="2800" dirty="0" smtClean="0"/>
-              <a:t>едетерминированный язык с охраняемыми командами</a:t>
-            </a:r>
-          </a:p>
-          <a:p>
-            <a:r>
-              <a:rPr lang="ru-RU" sz="2800" dirty="0"/>
-              <a:t>з</a:t>
+              <a:t>задача </a:t>
             </a:r>
             <a:r>
               <a:rPr lang="ru-RU" sz="2800" dirty="0" smtClean="0"/>
-              <a:t>адача языка – </a:t>
+              <a:t>языка – </a:t>
             </a:r>
             <a:r>
               <a:rPr lang="ru-RU" sz="2800" b="1" dirty="0" smtClean="0"/>

</xml_diff>

<commit_message>
Start to correct errors in main.docx
</commit_message>
<xml_diff>
--- a/shatilina.pptx
+++ b/shatilina.pptx
@@ -6917,36 +6917,6 @@
           </a:p>
         </p:txBody>
       </p:sp>
-      <p:pic>
-        <p:nvPicPr>
-          <p:cNvPr id="6" name="Рисунок 5"/>
-          <p:cNvPicPr>
-            <a:picLocks noChangeAspect="1"/>
-          </p:cNvPicPr>
-          <p:nvPr/>
-        </p:nvPicPr>
-        <p:blipFill>
-          <a:blip r:embed="rId3">
-            <a:extLst>
-              <a:ext uri="{28A0092B-C50C-407E-A947-70E740481C1C}">
-                <a14:useLocalDpi xmlns:a14="http://schemas.microsoft.com/office/drawing/2010/main" val="0"/>
-              </a:ext>
-            </a:extLst>
-          </a:blip>
-          <a:stretch>
-            <a:fillRect/>
-          </a:stretch>
-        </p:blipFill>
-        <p:spPr>
-          <a:xfrm>
-            <a:off x="7735716" y="0"/>
-            <a:ext cx="1419225" cy="1419225"/>
-          </a:xfrm>
-          <a:prstGeom prst="rect">
-            <a:avLst/>
-          </a:prstGeom>
-        </p:spPr>
-      </p:pic>
     </p:spTree>
     <p:extLst>
       <p:ext uri="{BB962C8B-B14F-4D97-AF65-F5344CB8AC3E}">

</xml_diff>

<commit_message>
Correct after EN help
</commit_message>
<xml_diff>
--- a/shatilina.pptx
+++ b/shatilina.pptx
@@ -14,8 +14,8 @@
     <p:sldId id="266" r:id="rId5"/>
     <p:sldId id="261" r:id="rId6"/>
     <p:sldId id="269" r:id="rId7"/>
-    <p:sldId id="288" r:id="rId8"/>
-    <p:sldId id="290" r:id="rId9"/>
+    <p:sldId id="292" r:id="rId8"/>
+    <p:sldId id="291" r:id="rId9"/>
     <p:sldId id="262" r:id="rId10"/>
     <p:sldId id="280" r:id="rId11"/>
     <p:sldId id="281" r:id="rId12"/>
@@ -3221,7 +3221,7 @@
     </p:spTree>
     <p:extLst>
       <p:ext uri="{BB962C8B-B14F-4D97-AF65-F5344CB8AC3E}">
-        <p14:creationId xmlns:p14="http://schemas.microsoft.com/office/powerpoint/2010/main" val="3247691620"/>
+        <p14:creationId xmlns:p14="http://schemas.microsoft.com/office/powerpoint/2010/main" val="3875426799"/>
       </p:ext>
     </p:extLst>
   </p:cSld>
@@ -3313,7 +3313,7 @@
     </p:spTree>
     <p:extLst>
       <p:ext uri="{BB962C8B-B14F-4D97-AF65-F5344CB8AC3E}">
-        <p14:creationId xmlns:p14="http://schemas.microsoft.com/office/powerpoint/2010/main" val="725484770"/>
+        <p14:creationId xmlns:p14="http://schemas.microsoft.com/office/powerpoint/2010/main" val="3875426799"/>
       </p:ext>
     </p:extLst>
   </p:cSld>
@@ -7106,8 +7106,8 @@
         </p:nvSpPr>
         <p:spPr>
           <a:xfrm>
-            <a:off x="245505" y="1772816"/>
-            <a:ext cx="8574967" cy="2100163"/>
+            <a:off x="107505" y="1628800"/>
+            <a:ext cx="8928992" cy="2100163"/>
           </a:xfrm>
           <a:prstGeom prst="rect">
             <a:avLst/>
@@ -7286,8 +7286,21 @@
             </a:r>
             <a:r>
               <a:rPr lang="ru-RU" dirty="0" smtClean="0"/>
-              <a:t>рамматика языка описания моделей прототипов</a:t>
-            </a:r>
+              <a:t>рамматика языка описания моделей </a:t>
+            </a:r>
+            <a:r>
+              <a:rPr lang="ru-RU" dirty="0" smtClean="0"/>
+              <a:t>прототипов</a:t>
+            </a:r>
+            <a:r>
+              <a:rPr lang="en-US" dirty="0" smtClean="0"/>
+              <a:t> </a:t>
+            </a:r>
+            <a:r>
+              <a:rPr lang="en-US" b="1" dirty="0" smtClean="0"/>
+              <a:t>PROTO</a:t>
+            </a:r>
+            <a:endParaRPr lang="ru-RU" b="1" dirty="0" smtClean="0"/>
           </a:p>
           <a:p>
             <a:r>
@@ -12764,138 +12777,93 @@
       </p:grpSpPr>
       <p:sp>
         <p:nvSpPr>
-          <p:cNvPr id="2" name="Заголовок 1"/>
-          <p:cNvSpPr>
-            <a:spLocks noGrp="1"/>
-          </p:cNvSpPr>
-          <p:nvPr>
-            <p:ph type="title"/>
-          </p:nvPr>
+          <p:cNvPr id="8" name="Заголовок 1"/>
+          <p:cNvSpPr txBox="1">
+            <a:spLocks/>
+          </p:cNvSpPr>
+          <p:nvPr/>
         </p:nvSpPr>
         <p:spPr>
           <a:xfrm>
-            <a:off x="457200" y="28600"/>
+            <a:off x="457200" y="-603448"/>
             <a:ext cx="8229600" cy="1600200"/>
           </a:xfrm>
+          <a:prstGeom prst="rect">
+            <a:avLst/>
+          </a:prstGeom>
         </p:spPr>
         <p:txBody>
-          <a:bodyPr/>
-          <a:lstStyle/>
-          <a:p>
-            <a:r>
-              <a:rPr lang="en-US" dirty="0" err="1" smtClean="0"/>
-              <a:t>Promela</a:t>
-            </a:r>
-            <a:r>
-              <a:rPr lang="en-US" dirty="0" smtClean="0"/>
-              <a:t> </a:t>
-            </a:r>
-            <a:br>
-              <a:rPr lang="en-US" dirty="0" smtClean="0"/>
-            </a:br>
-            <a:r>
-              <a:rPr lang="en-US" dirty="0" smtClean="0"/>
-              <a:t>(</a:t>
-            </a:r>
-            <a:r>
-              <a:rPr lang="ru-RU" u="sng" dirty="0" err="1"/>
-              <a:t>Pro</a:t>
-            </a:r>
-            <a:r>
-              <a:rPr lang="ru-RU" dirty="0" err="1"/>
-              <a:t>tocol</a:t>
-            </a:r>
-            <a:r>
-              <a:rPr lang="ru-RU" dirty="0"/>
-              <a:t> </a:t>
-            </a:r>
-            <a:r>
-              <a:rPr lang="ru-RU" u="sng" dirty="0" err="1"/>
-              <a:t>Me</a:t>
-            </a:r>
-            <a:r>
-              <a:rPr lang="ru-RU" dirty="0" err="1"/>
-              <a:t>ta</a:t>
-            </a:r>
-            <a:r>
-              <a:rPr lang="ru-RU" dirty="0"/>
-              <a:t> </a:t>
-            </a:r>
-            <a:r>
-              <a:rPr lang="ru-RU" u="sng" dirty="0" err="1" smtClean="0"/>
-              <a:t>La</a:t>
-            </a:r>
-            <a:r>
-              <a:rPr lang="ru-RU" dirty="0" err="1" smtClean="0"/>
-              <a:t>nguage</a:t>
-            </a:r>
-            <a:r>
-              <a:rPr lang="en-US" dirty="0" smtClean="0"/>
-              <a:t>)</a:t>
+          <a:bodyPr vert="horz" lIns="91440" tIns="45720" rIns="91440" bIns="45720" rtlCol="0" anchor="b">
+            <a:noAutofit/>
+          </a:bodyPr>
+          <a:lstStyle>
+            <a:lvl1pPr algn="ctr" defTabSz="914400" rtl="0" eaLnBrk="1" latinLnBrk="0" hangingPunct="1">
+              <a:lnSpc>
+                <a:spcPts val="5800"/>
+              </a:lnSpc>
+              <a:spcBef>
+                <a:spcPct val="0"/>
+              </a:spcBef>
+              <a:buNone/>
+              <a:defRPr sz="5400" kern="1200">
+                <a:solidFill>
+                  <a:schemeClr val="tx2"/>
+                </a:solidFill>
+                <a:effectLst>
+                  <a:outerShdw blurRad="63500" dist="38100" dir="5400000" algn="t" rotWithShape="0">
+                    <a:prstClr val="black">
+                      <a:alpha val="25000"/>
+                    </a:prstClr>
+                  </a:outerShdw>
+                </a:effectLst>
+                <a:latin typeface="+mn-lt"/>
+                <a:ea typeface="+mj-ea"/>
+                <a:cs typeface="+mj-cs"/>
+              </a:defRPr>
+            </a:lvl1pPr>
+          </a:lstStyle>
+          <a:p>
+            <a:r>
+              <a:rPr lang="en-US" dirty="0"/>
+              <a:t>Promela </a:t>
             </a:r>
             <a:endParaRPr lang="ru-RU" dirty="0"/>
           </a:p>
         </p:txBody>
       </p:sp>
-      <p:sp>
-        <p:nvSpPr>
-          <p:cNvPr id="5" name="Объект 4"/>
-          <p:cNvSpPr>
-            <a:spLocks noGrp="1"/>
-          </p:cNvSpPr>
-          <p:nvPr>
-            <p:ph sz="quarter" idx="13"/>
-          </p:nvPr>
-        </p:nvSpPr>
+      <p:pic>
+        <p:nvPicPr>
+          <p:cNvPr id="13" name="Рисунок 12"/>
+          <p:cNvPicPr>
+            <a:picLocks noChangeAspect="1"/>
+          </p:cNvPicPr>
+          <p:nvPr/>
+        </p:nvPicPr>
+        <p:blipFill>
+          <a:blip r:embed="rId3">
+            <a:extLst>
+              <a:ext uri="{28A0092B-C50C-407E-A947-70E740481C1C}">
+                <a14:useLocalDpi xmlns:a14="http://schemas.microsoft.com/office/drawing/2010/main" val="0"/>
+              </a:ext>
+            </a:extLst>
+          </a:blip>
+          <a:stretch>
+            <a:fillRect/>
+          </a:stretch>
+        </p:blipFill>
         <p:spPr>
           <a:xfrm>
-            <a:off x="179512" y="1556792"/>
-            <a:ext cx="8784976" cy="4896544"/>
+            <a:off x="3861203" y="836712"/>
+            <a:ext cx="5247301" cy="5624117"/>
           </a:xfrm>
+          <a:prstGeom prst="rect">
+            <a:avLst/>
+          </a:prstGeom>
         </p:spPr>
-        <p:txBody>
-          <a:bodyPr>
-            <a:normAutofit/>
-          </a:bodyPr>
-          <a:lstStyle/>
-          <a:p>
-            <a:pPr marL="0" indent="0" algn="ctr">
-              <a:buNone/>
-            </a:pPr>
-            <a:r>
-              <a:rPr lang="ru-RU" sz="2800" dirty="0" smtClean="0"/>
-              <a:t>Описание поведения</a:t>
-            </a:r>
-          </a:p>
-          <a:p>
-            <a:r>
-              <a:rPr lang="ru-RU" sz="2800" dirty="0" smtClean="0"/>
-              <a:t>задача </a:t>
-            </a:r>
-            <a:r>
-              <a:rPr lang="ru-RU" sz="2800" dirty="0" smtClean="0"/>
-              <a:t>языка – </a:t>
-            </a:r>
-            <a:r>
-              <a:rPr lang="ru-RU" sz="2800" b="1" dirty="0" smtClean="0"/>
-              <a:t>не</a:t>
-            </a:r>
-            <a:r>
-              <a:rPr lang="ru-RU" sz="2800" dirty="0" smtClean="0"/>
-              <a:t> предотвратить описание моделей плохих программ</a:t>
-            </a:r>
-          </a:p>
-          <a:p>
-            <a:r>
-              <a:rPr lang="ru-RU" sz="2800" dirty="0" smtClean="0"/>
-              <a:t>задача языка – разрешить описание моделей, которые могут быть верифицированы</a:t>
-            </a:r>
-          </a:p>
-        </p:txBody>
-      </p:sp>
-      <p:sp>
-        <p:nvSpPr>
-          <p:cNvPr id="9" name="Text Box 5"/>
+      </p:pic>
+      <p:sp>
+        <p:nvSpPr>
+          <p:cNvPr id="15" name="Text Box 5"/>
           <p:cNvSpPr txBox="1">
             <a:spLocks noChangeArrowheads="1"/>
           </p:cNvSpPr>
@@ -12954,7 +12922,33 @@
       </p:sp>
       <p:sp>
         <p:nvSpPr>
-          <p:cNvPr id="3" name="Номер слайда 2"/>
+          <p:cNvPr id="16" name="TextBox 15"/>
+          <p:cNvSpPr txBox="1"/>
+          <p:nvPr/>
+        </p:nvSpPr>
+        <p:spPr>
+          <a:xfrm>
+            <a:off x="1043608" y="3356992"/>
+            <a:ext cx="184731" cy="369332"/>
+          </a:xfrm>
+          <a:prstGeom prst="rect">
+            <a:avLst/>
+          </a:prstGeom>
+          <a:noFill/>
+        </p:spPr>
+        <p:txBody>
+          <a:bodyPr wrap="none" rtlCol="0">
+            <a:spAutoFit/>
+          </a:bodyPr>
+          <a:lstStyle/>
+          <a:p>
+            <a:endParaRPr lang="ru-RU" dirty="0"/>
+          </a:p>
+        </p:txBody>
+      </p:sp>
+      <p:sp>
+        <p:nvSpPr>
+          <p:cNvPr id="2" name="Номер слайда 1"/>
           <p:cNvSpPr>
             <a:spLocks noGrp="1"/>
           </p:cNvSpPr>
@@ -12975,24 +12969,110 @@
           </a:p>
         </p:txBody>
       </p:sp>
+      <p:sp>
+        <p:nvSpPr>
+          <p:cNvPr id="3" name="Объект 2"/>
+          <p:cNvSpPr>
+            <a:spLocks noGrp="1"/>
+          </p:cNvSpPr>
+          <p:nvPr>
+            <p:ph sz="quarter" idx="13"/>
+          </p:nvPr>
+        </p:nvSpPr>
+        <p:spPr>
+          <a:xfrm>
+            <a:off x="107504" y="996752"/>
+            <a:ext cx="4041648" cy="5384576"/>
+          </a:xfrm>
+        </p:spPr>
+        <p:txBody>
+          <a:bodyPr/>
+          <a:lstStyle/>
+          <a:p>
+            <a:pPr marL="0" indent="0" algn="ctr">
+              <a:buNone/>
+            </a:pPr>
+            <a:r>
+              <a:rPr lang="en-US" b="1" u="sng" dirty="0" smtClean="0"/>
+              <a:t>Pro</a:t>
+            </a:r>
+            <a:r>
+              <a:rPr lang="en-US" b="1" dirty="0" smtClean="0"/>
+              <a:t>tocol </a:t>
+            </a:r>
+            <a:r>
+              <a:rPr lang="en-US" b="1" u="sng" dirty="0" smtClean="0"/>
+              <a:t>Me</a:t>
+            </a:r>
+            <a:r>
+              <a:rPr lang="en-US" b="1" dirty="0" smtClean="0"/>
+              <a:t>ta </a:t>
+            </a:r>
+            <a:r>
+              <a:rPr lang="en-US" b="1" u="sng" dirty="0" smtClean="0"/>
+              <a:t>La</a:t>
+            </a:r>
+            <a:r>
+              <a:rPr lang="en-US" b="1" dirty="0" smtClean="0"/>
+              <a:t>nguage</a:t>
+            </a:r>
+          </a:p>
+          <a:p>
+            <a:pPr marL="0" indent="0" algn="ctr">
+              <a:buNone/>
+            </a:pPr>
+            <a:r>
+              <a:rPr lang="ru-RU" dirty="0" smtClean="0"/>
+              <a:t>Описание </a:t>
+            </a:r>
+            <a:r>
+              <a:rPr lang="ru-RU" dirty="0"/>
+              <a:t>поведения</a:t>
+            </a:r>
+          </a:p>
+          <a:p>
+            <a:r>
+              <a:rPr lang="ru-RU" dirty="0"/>
+              <a:t>задача языка – </a:t>
+            </a:r>
+            <a:r>
+              <a:rPr lang="ru-RU" b="1" dirty="0"/>
+              <a:t>не</a:t>
+            </a:r>
+            <a:r>
+              <a:rPr lang="ru-RU" dirty="0"/>
+              <a:t> предотвратить описание моделей плохих программ</a:t>
+            </a:r>
+          </a:p>
+          <a:p>
+            <a:r>
+              <a:rPr lang="ru-RU" dirty="0"/>
+              <a:t>задача языка – </a:t>
+            </a:r>
+            <a:r>
+              <a:rPr lang="ru-RU" b="1" dirty="0"/>
+              <a:t>разрешить</a:t>
+            </a:r>
+            <a:r>
+              <a:rPr lang="ru-RU" dirty="0"/>
+              <a:t> описание моделей, которые могут быть верифицированы</a:t>
+            </a:r>
+          </a:p>
+          <a:p>
+            <a:endParaRPr lang="ru-RU" dirty="0"/>
+          </a:p>
+        </p:txBody>
+      </p:sp>
     </p:spTree>
     <p:extLst>
       <p:ext uri="{BB962C8B-B14F-4D97-AF65-F5344CB8AC3E}">
-        <p14:creationId xmlns:p14="http://schemas.microsoft.com/office/powerpoint/2010/main" val="1418351375"/>
+        <p14:creationId xmlns:p14="http://schemas.microsoft.com/office/powerpoint/2010/main" val="77929905"/>
       </p:ext>
     </p:extLst>
   </p:cSld>
   <p:clrMapOvr>
     <a:masterClrMapping/>
   </p:clrMapOvr>
-  <mc:AlternateContent xmlns:mc="http://schemas.openxmlformats.org/markup-compatibility/2006">
-    <mc:Choice xmlns:p14="http://schemas.microsoft.com/office/powerpoint/2010/main" Requires="p14">
-      <p:transition spd="slow" p14:dur="2000"/>
-    </mc:Choice>
-    <mc:Fallback>
-      <p:transition spd="slow"/>
-    </mc:Fallback>
-  </mc:AlternateContent>
   <p:timing>
     <p:tnLst>
       <p:par>
@@ -13022,197 +13102,97 @@
       </p:grpSpPr>
       <p:sp>
         <p:nvSpPr>
-          <p:cNvPr id="2" name="Заголовок 1"/>
-          <p:cNvSpPr>
-            <a:spLocks noGrp="1"/>
-          </p:cNvSpPr>
-          <p:nvPr>
-            <p:ph type="title"/>
-          </p:nvPr>
+          <p:cNvPr id="8" name="Заголовок 1"/>
+          <p:cNvSpPr txBox="1">
+            <a:spLocks/>
+          </p:cNvSpPr>
+          <p:nvPr/>
         </p:nvSpPr>
         <p:spPr>
           <a:xfrm>
-            <a:off x="0" y="-27384"/>
-            <a:ext cx="9144000" cy="1600200"/>
+            <a:off x="457200" y="-603448"/>
+            <a:ext cx="8229600" cy="1600200"/>
           </a:xfrm>
+          <a:prstGeom prst="rect">
+            <a:avLst/>
+          </a:prstGeom>
         </p:spPr>
         <p:txBody>
-          <a:bodyPr/>
-          <a:lstStyle/>
-          <a:p>
+          <a:bodyPr vert="horz" lIns="91440" tIns="45720" rIns="91440" bIns="45720" rtlCol="0" anchor="b">
+            <a:noAutofit/>
+          </a:bodyPr>
+          <a:lstStyle>
+            <a:lvl1pPr algn="ctr" defTabSz="914400" rtl="0" eaLnBrk="1" latinLnBrk="0" hangingPunct="1">
+              <a:lnSpc>
+                <a:spcPts val="5800"/>
+              </a:lnSpc>
+              <a:spcBef>
+                <a:spcPct val="0"/>
+              </a:spcBef>
+              <a:buNone/>
+              <a:defRPr sz="5400" kern="1200">
+                <a:solidFill>
+                  <a:schemeClr val="tx2"/>
+                </a:solidFill>
+                <a:effectLst>
+                  <a:outerShdw blurRad="63500" dist="38100" dir="5400000" algn="t" rotWithShape="0">
+                    <a:prstClr val="black">
+                      <a:alpha val="25000"/>
+                    </a:prstClr>
+                  </a:outerShdw>
+                </a:effectLst>
+                <a:latin typeface="+mn-lt"/>
+                <a:ea typeface="+mj-ea"/>
+                <a:cs typeface="+mj-cs"/>
+              </a:defRPr>
+            </a:lvl1pPr>
+          </a:lstStyle>
+          <a:p>
+            <a:r>
+              <a:rPr lang="ru-RU" dirty="0" smtClean="0"/>
+              <a:t>Темпоральная логика</a:t>
+            </a:r>
             <a:r>
               <a:rPr lang="en-US" dirty="0" smtClean="0"/>
-              <a:t>LTL</a:t>
-            </a:r>
-            <a:br>
-              <a:rPr lang="en-US" dirty="0" smtClean="0"/>
-            </a:br>
-            <a:r>
-              <a:rPr lang="en-US" dirty="0" smtClean="0"/>
-              <a:t>(</a:t>
-            </a:r>
-            <a:r>
-              <a:rPr lang="en-US" dirty="0"/>
-              <a:t>L</a:t>
-            </a:r>
-            <a:r>
-              <a:rPr lang="ru-RU" dirty="0" err="1" smtClean="0"/>
-              <a:t>inear</a:t>
-            </a:r>
-            <a:r>
-              <a:rPr lang="ru-RU" dirty="0" smtClean="0"/>
               <a:t> </a:t>
             </a:r>
-            <a:r>
-              <a:rPr lang="en-US" dirty="0"/>
-              <a:t>T</a:t>
-            </a:r>
-            <a:r>
-              <a:rPr lang="ru-RU" dirty="0" err="1"/>
-              <a:t>emporal</a:t>
-            </a:r>
-            <a:r>
-              <a:rPr lang="ru-RU" dirty="0"/>
-              <a:t> </a:t>
-            </a:r>
-            <a:r>
-              <a:rPr lang="en-US" dirty="0"/>
-              <a:t>L</a:t>
-            </a:r>
-            <a:r>
-              <a:rPr lang="ru-RU" dirty="0" err="1" smtClean="0"/>
-              <a:t>ogic</a:t>
-            </a:r>
-            <a:r>
-              <a:rPr lang="en-US" dirty="0" smtClean="0"/>
-              <a:t>)</a:t>
-            </a:r>
             <a:endParaRPr lang="ru-RU" dirty="0"/>
           </a:p>
         </p:txBody>
       </p:sp>
-      <p:sp>
-        <p:nvSpPr>
-          <p:cNvPr id="5" name="Объект 4"/>
-          <p:cNvSpPr>
-            <a:spLocks noGrp="1"/>
-          </p:cNvSpPr>
-          <p:nvPr>
-            <p:ph sz="quarter" idx="13"/>
-          </p:nvPr>
-        </p:nvSpPr>
+      <p:pic>
+        <p:nvPicPr>
+          <p:cNvPr id="13" name="Рисунок 12"/>
+          <p:cNvPicPr>
+            <a:picLocks noChangeAspect="1"/>
+          </p:cNvPicPr>
+          <p:nvPr/>
+        </p:nvPicPr>
+        <p:blipFill>
+          <a:blip r:embed="rId3">
+            <a:extLst>
+              <a:ext uri="{28A0092B-C50C-407E-A947-70E740481C1C}">
+                <a14:useLocalDpi xmlns:a14="http://schemas.microsoft.com/office/drawing/2010/main" val="0"/>
+              </a:ext>
+            </a:extLst>
+          </a:blip>
+          <a:stretch>
+            <a:fillRect/>
+          </a:stretch>
+        </p:blipFill>
         <p:spPr>
           <a:xfrm>
-            <a:off x="179512" y="1556792"/>
-            <a:ext cx="8784976" cy="4824536"/>
+            <a:off x="3861203" y="836712"/>
+            <a:ext cx="5247301" cy="5624117"/>
           </a:xfrm>
+          <a:prstGeom prst="rect">
+            <a:avLst/>
+          </a:prstGeom>
         </p:spPr>
-        <p:txBody>
-          <a:bodyPr>
-            <a:normAutofit fontScale="92500" lnSpcReduction="10000"/>
-          </a:bodyPr>
-          <a:lstStyle/>
-          <a:p>
-            <a:pPr marL="0" indent="0" algn="ctr">
-              <a:buNone/>
-            </a:pPr>
-            <a:r>
-              <a:rPr lang="ru-RU" sz="3000" dirty="0" smtClean="0"/>
-              <a:t>Описание свойств</a:t>
-            </a:r>
-          </a:p>
-          <a:p>
-            <a:pPr marL="0" indent="0" algn="ctr">
-              <a:buNone/>
-            </a:pPr>
-            <a:r>
-              <a:rPr lang="ru-RU" sz="3000" dirty="0" smtClean="0"/>
-              <a:t>Позволяет описать как поведение системы представляется  во </a:t>
-            </a:r>
-            <a:r>
-              <a:rPr lang="ru-RU" sz="3000" dirty="0" smtClean="0"/>
-              <a:t>времени</a:t>
-            </a:r>
-          </a:p>
-          <a:p>
-            <a:pPr marL="0" indent="0">
-              <a:buNone/>
-            </a:pPr>
-            <a:endParaRPr lang="ru-RU" sz="2800" dirty="0" smtClean="0"/>
-          </a:p>
-          <a:p>
-            <a:pPr marL="0" indent="0">
-              <a:buNone/>
-            </a:pPr>
-            <a:r>
-              <a:rPr lang="ru-RU" sz="2800" dirty="0" smtClean="0"/>
-              <a:t>Пусть есть набор переменных как-то меняющихся во времени. Темпоральная логика позволяет сформулировать утверждения типа:</a:t>
-            </a:r>
-          </a:p>
-          <a:p>
-            <a:r>
-              <a:rPr lang="ru-RU" sz="2800" dirty="0" smtClean="0"/>
-              <a:t>Значение </a:t>
-            </a:r>
-            <a:r>
-              <a:rPr lang="en-US" sz="2800" i="1" dirty="0" smtClean="0"/>
-              <a:t>a</a:t>
-            </a:r>
-            <a:r>
-              <a:rPr lang="en-US" sz="2800" dirty="0" smtClean="0"/>
-              <a:t> </a:t>
-            </a:r>
-            <a:r>
-              <a:rPr lang="ru-RU" sz="2800" dirty="0" smtClean="0"/>
-              <a:t>всегда будет равно значению </a:t>
-            </a:r>
-            <a:r>
-              <a:rPr lang="en-US" sz="2800" i="1" dirty="0" smtClean="0"/>
-              <a:t>b</a:t>
-            </a:r>
-          </a:p>
-          <a:p>
-            <a:r>
-              <a:rPr lang="ru-RU" sz="2800" dirty="0" smtClean="0"/>
-              <a:t>Наступит момент, когда </a:t>
-            </a:r>
-            <a:r>
-              <a:rPr lang="en-US" sz="2800" i="1" dirty="0" smtClean="0"/>
-              <a:t>c</a:t>
-            </a:r>
-            <a:r>
-              <a:rPr lang="en-US" sz="2800" dirty="0" smtClean="0"/>
-              <a:t> </a:t>
-            </a:r>
-            <a:r>
-              <a:rPr lang="ru-RU" sz="2800" dirty="0" smtClean="0"/>
-              <a:t>станет равна 0</a:t>
-            </a:r>
-          </a:p>
-          <a:p>
-            <a:r>
-              <a:rPr lang="ru-RU" sz="2800" dirty="0" smtClean="0"/>
-              <a:t>Значение </a:t>
-            </a:r>
-            <a:r>
-              <a:rPr lang="en-US" sz="2800" i="1" dirty="0" smtClean="0"/>
-              <a:t>d</a:t>
-            </a:r>
-            <a:r>
-              <a:rPr lang="en-US" sz="2800" dirty="0" smtClean="0"/>
-              <a:t> </a:t>
-            </a:r>
-            <a:r>
-              <a:rPr lang="ru-RU" sz="2800" dirty="0" smtClean="0"/>
-              <a:t>будет становиться 1 бесконечное много раз</a:t>
-            </a:r>
-            <a:endParaRPr lang="ru-RU" sz="2800" dirty="0" smtClean="0"/>
-          </a:p>
-        </p:txBody>
-      </p:sp>
-      <p:sp>
-        <p:nvSpPr>
-          <p:cNvPr id="9" name="Text Box 5"/>
+      </p:pic>
+      <p:sp>
+        <p:nvSpPr>
+          <p:cNvPr id="15" name="Text Box 5"/>
           <p:cNvSpPr txBox="1">
             <a:spLocks noChangeArrowheads="1"/>
           </p:cNvSpPr>
@@ -13271,7 +13251,33 @@
       </p:sp>
       <p:sp>
         <p:nvSpPr>
-          <p:cNvPr id="3" name="Номер слайда 2"/>
+          <p:cNvPr id="16" name="TextBox 15"/>
+          <p:cNvSpPr txBox="1"/>
+          <p:nvPr/>
+        </p:nvSpPr>
+        <p:spPr>
+          <a:xfrm>
+            <a:off x="1043608" y="3356992"/>
+            <a:ext cx="184731" cy="369332"/>
+          </a:xfrm>
+          <a:prstGeom prst="rect">
+            <a:avLst/>
+          </a:prstGeom>
+          <a:noFill/>
+        </p:spPr>
+        <p:txBody>
+          <a:bodyPr wrap="none" rtlCol="0">
+            <a:spAutoFit/>
+          </a:bodyPr>
+          <a:lstStyle/>
+          <a:p>
+            <a:endParaRPr lang="ru-RU" dirty="0"/>
+          </a:p>
+        </p:txBody>
+      </p:sp>
+      <p:sp>
+        <p:nvSpPr>
+          <p:cNvPr id="2" name="Номер слайда 1"/>
           <p:cNvSpPr>
             <a:spLocks noGrp="1"/>
           </p:cNvSpPr>
@@ -13292,24 +13298,227 @@
           </a:p>
         </p:txBody>
       </p:sp>
+      <p:sp>
+        <p:nvSpPr>
+          <p:cNvPr id="3" name="Объект 2"/>
+          <p:cNvSpPr>
+            <a:spLocks noGrp="1"/>
+          </p:cNvSpPr>
+          <p:nvPr>
+            <p:ph sz="quarter" idx="13"/>
+          </p:nvPr>
+        </p:nvSpPr>
+        <p:spPr>
+          <a:xfrm>
+            <a:off x="107504" y="1068760"/>
+            <a:ext cx="4176464" cy="5479602"/>
+          </a:xfrm>
+        </p:spPr>
+        <p:txBody>
+          <a:bodyPr>
+            <a:normAutofit fontScale="85000" lnSpcReduction="20000"/>
+          </a:bodyPr>
+          <a:lstStyle/>
+          <a:p>
+            <a:pPr marL="0" indent="0" algn="ctr">
+              <a:buNone/>
+            </a:pPr>
+            <a:r>
+              <a:rPr lang="en-US" b="1" dirty="0" smtClean="0"/>
+              <a:t>LTL</a:t>
+            </a:r>
+            <a:r>
+              <a:rPr lang="ru-RU" b="1" dirty="0" smtClean="0"/>
+              <a:t> </a:t>
+            </a:r>
+            <a:r>
+              <a:rPr lang="en-US" b="1" dirty="0" smtClean="0"/>
+              <a:t>(L</a:t>
+            </a:r>
+            <a:r>
+              <a:rPr lang="ru-RU" b="1" dirty="0" err="1"/>
+              <a:t>inear</a:t>
+            </a:r>
+            <a:r>
+              <a:rPr lang="ru-RU" b="1" dirty="0"/>
+              <a:t> </a:t>
+            </a:r>
+            <a:r>
+              <a:rPr lang="en-US" b="1" dirty="0"/>
+              <a:t>T</a:t>
+            </a:r>
+            <a:r>
+              <a:rPr lang="ru-RU" b="1" dirty="0" err="1"/>
+              <a:t>emporal</a:t>
+            </a:r>
+            <a:r>
+              <a:rPr lang="ru-RU" b="1" dirty="0"/>
+              <a:t> </a:t>
+            </a:r>
+            <a:r>
+              <a:rPr lang="en-US" b="1" dirty="0"/>
+              <a:t>L</a:t>
+            </a:r>
+            <a:r>
+              <a:rPr lang="ru-RU" b="1" dirty="0" err="1"/>
+              <a:t>ogic</a:t>
+            </a:r>
+            <a:r>
+              <a:rPr lang="en-US" b="1" dirty="0" smtClean="0"/>
+              <a:t>)</a:t>
+            </a:r>
+            <a:endParaRPr lang="ru-RU" b="1" dirty="0" smtClean="0"/>
+          </a:p>
+          <a:p>
+            <a:pPr marL="0" indent="0" algn="ctr">
+              <a:buNone/>
+            </a:pPr>
+            <a:endParaRPr lang="ru-RU" dirty="0" smtClean="0"/>
+          </a:p>
+          <a:p>
+            <a:pPr marL="0" indent="0" algn="ctr">
+              <a:buNone/>
+            </a:pPr>
+            <a:r>
+              <a:rPr lang="ru-RU" dirty="0" smtClean="0"/>
+              <a:t>Описание </a:t>
+            </a:r>
+            <a:r>
+              <a:rPr lang="ru-RU" dirty="0"/>
+              <a:t>свойств</a:t>
+            </a:r>
+          </a:p>
+          <a:p>
+            <a:pPr marL="0" indent="0" algn="ctr">
+              <a:buNone/>
+            </a:pPr>
+            <a:r>
+              <a:rPr lang="ru-RU" dirty="0"/>
+              <a:t>Позволяет </a:t>
+            </a:r>
+            <a:r>
+              <a:rPr lang="ru-RU" dirty="0" smtClean="0"/>
+              <a:t>описать </a:t>
+            </a:r>
+            <a:r>
+              <a:rPr lang="ru-RU" dirty="0"/>
+              <a:t>поведение системы </a:t>
+            </a:r>
+            <a:r>
+              <a:rPr lang="ru-RU" dirty="0" smtClean="0"/>
+              <a:t>во времени</a:t>
+            </a:r>
+          </a:p>
+          <a:p>
+            <a:pPr marL="0" indent="0">
+              <a:buNone/>
+            </a:pPr>
+            <a:endParaRPr lang="ru-RU" dirty="0" smtClean="0"/>
+          </a:p>
+          <a:p>
+            <a:pPr marL="0" indent="0">
+              <a:buNone/>
+            </a:pPr>
+            <a:r>
+              <a:rPr lang="ru-RU" dirty="0" smtClean="0"/>
+              <a:t>Пусть </a:t>
+            </a:r>
+            <a:r>
+              <a:rPr lang="ru-RU" dirty="0"/>
+              <a:t>есть набор переменных </a:t>
+            </a:r>
+            <a:r>
+              <a:rPr lang="ru-RU" dirty="0" smtClean="0"/>
+              <a:t> </a:t>
+            </a:r>
+            <a:r>
+              <a:rPr lang="ru-RU" dirty="0"/>
+              <a:t>меняющихся во времени. </a:t>
+            </a:r>
+            <a:r>
+              <a:rPr lang="ru-RU" dirty="0" smtClean="0"/>
+              <a:t>Темпоральной логики </a:t>
+            </a:r>
+            <a:r>
+              <a:rPr lang="ru-RU" dirty="0"/>
+              <a:t>позволяет сформулировать утверждения типа:</a:t>
+            </a:r>
+          </a:p>
+          <a:p>
+            <a:r>
+              <a:rPr lang="ru-RU" dirty="0"/>
+              <a:t>Значение </a:t>
+            </a:r>
+            <a:r>
+              <a:rPr lang="en-US" i="1" dirty="0"/>
+              <a:t>a</a:t>
+            </a:r>
+            <a:r>
+              <a:rPr lang="en-US" dirty="0"/>
+              <a:t> </a:t>
+            </a:r>
+            <a:r>
+              <a:rPr lang="ru-RU" dirty="0"/>
+              <a:t>всегда будет равно значению </a:t>
+            </a:r>
+            <a:r>
+              <a:rPr lang="en-US" i="1" dirty="0"/>
+              <a:t>b</a:t>
+            </a:r>
+          </a:p>
+          <a:p>
+            <a:r>
+              <a:rPr lang="ru-RU" dirty="0"/>
+              <a:t>Наступит момент, когда </a:t>
+            </a:r>
+            <a:r>
+              <a:rPr lang="en-US" i="1" dirty="0"/>
+              <a:t>c</a:t>
+            </a:r>
+            <a:r>
+              <a:rPr lang="en-US" dirty="0"/>
+              <a:t> </a:t>
+            </a:r>
+            <a:r>
+              <a:rPr lang="ru-RU" dirty="0"/>
+              <a:t>станет равна 0</a:t>
+            </a:r>
+          </a:p>
+          <a:p>
+            <a:r>
+              <a:rPr lang="ru-RU" dirty="0"/>
+              <a:t>Значение </a:t>
+            </a:r>
+            <a:r>
+              <a:rPr lang="en-US" i="1" dirty="0"/>
+              <a:t>d</a:t>
+            </a:r>
+            <a:r>
+              <a:rPr lang="en-US" dirty="0"/>
+              <a:t> </a:t>
+            </a:r>
+            <a:r>
+              <a:rPr lang="ru-RU" dirty="0"/>
+              <a:t>будет становиться 1 бесконечное много </a:t>
+            </a:r>
+            <a:r>
+              <a:rPr lang="ru-RU" dirty="0" smtClean="0"/>
+              <a:t>раз</a:t>
+            </a:r>
+            <a:endParaRPr lang="ru-RU" b="1" dirty="0" smtClean="0"/>
+          </a:p>
+        </p:txBody>
+      </p:sp>
     </p:spTree>
     <p:extLst>
       <p:ext uri="{BB962C8B-B14F-4D97-AF65-F5344CB8AC3E}">
-        <p14:creationId xmlns:p14="http://schemas.microsoft.com/office/powerpoint/2010/main" val="186383864"/>
+        <p14:creationId xmlns:p14="http://schemas.microsoft.com/office/powerpoint/2010/main" val="670541016"/>
       </p:ext>
     </p:extLst>
   </p:cSld>
   <p:clrMapOvr>
     <a:masterClrMapping/>
   </p:clrMapOvr>
-  <mc:AlternateContent xmlns:mc="http://schemas.openxmlformats.org/markup-compatibility/2006">
-    <mc:Choice xmlns:p14="http://schemas.microsoft.com/office/powerpoint/2010/main" Requires="p14">
-      <p:transition spd="slow" p14:dur="2000"/>
-    </mc:Choice>
-    <mc:Fallback>
-      <p:transition spd="slow"/>
-    </mc:Fallback>
-  </mc:AlternateContent>
   <p:timing>
     <p:tnLst>
       <p:par>

</xml_diff>

<commit_message>
Speech was rewrited, pics updated
</commit_message>
<xml_diff>
--- a/shatilina.pptx
+++ b/shatilina.pptx
@@ -209,7 +209,7 @@
           <a:p>
             <a:fld id="{FDBFA82E-57DB-4151-B406-A26D33A7B30A}" type="datetimeFigureOut">
               <a:rPr lang="ru-RU" smtClean="0"/>
-              <a:t>12.06.2012</a:t>
+              <a:t>16.06.2012</a:t>
             </a:fld>
             <a:endParaRPr lang="ru-RU"/>
           </a:p>
@@ -527,11 +527,7 @@
             </a:r>
             <a:r>
               <a:rPr lang="ru-RU" baseline="0" dirty="0" smtClean="0"/>
-              <a:t>, уважаемая аттестационная комиссия! Вашему вниманию представляется диплом на тему «Система проектирования и тестирования каркасов программных продуктов</a:t>
-            </a:r>
-            <a:r>
-              <a:rPr lang="ru-RU" baseline="0" dirty="0" smtClean="0"/>
-              <a:t>»</a:t>
+              <a:t>, уважаемая аттестационная комиссия! Вашему вниманию представляется диплом на тему «Система проектирования и тестирования каркасов программных продуктов»</a:t>
             </a:r>
             <a:endParaRPr lang="ru-RU" dirty="0"/>
           </a:p>
@@ -677,42 +673,88 @@
                 <a:ea typeface="+mn-ea"/>
                 <a:cs typeface="+mn-cs"/>
               </a:rPr>
-              <a:t> подсистема отвечает за разбор исходного файла прототипа архитектуры на языке описания моделей прототипов и построение абстрактного синтаксического дерева, соответствующего исходному прототипу архитектуры.</a:t>
-            </a:r>
+              <a:t> подсистема отвечает за разбор исходного файла прототипа архитектуры на языке </a:t>
+            </a:r>
+            <a:r>
+              <a:rPr lang="en-US" dirty="0" smtClean="0"/>
+              <a:t>PROTO </a:t>
+            </a:r>
+            <a:r>
+              <a:rPr lang="ru-RU" sz="1200" kern="1200" baseline="0" dirty="0" smtClean="0">
+                <a:solidFill>
+                  <a:schemeClr val="tx1"/>
+                </a:solidFill>
+                <a:effectLst/>
+                <a:latin typeface="+mn-lt"/>
+                <a:ea typeface="+mn-ea"/>
+                <a:cs typeface="+mn-cs"/>
+              </a:rPr>
+              <a:t>и </a:t>
+            </a:r>
+            <a:r>
+              <a:rPr lang="ru-RU" sz="1200" kern="1200" baseline="0" dirty="0" smtClean="0">
+                <a:solidFill>
+                  <a:schemeClr val="tx1"/>
+                </a:solidFill>
+                <a:effectLst/>
+                <a:latin typeface="+mn-lt"/>
+                <a:ea typeface="+mn-ea"/>
+                <a:cs typeface="+mn-cs"/>
+              </a:rPr>
+              <a:t>построение абстрактного синтаксического дерева, соответствующего исходному прототипу архитектуры</a:t>
+            </a:r>
+            <a:r>
+              <a:rPr lang="ru-RU" sz="1200" kern="1200" baseline="0" dirty="0" smtClean="0">
+                <a:solidFill>
+                  <a:schemeClr val="tx1"/>
+                </a:solidFill>
+                <a:effectLst/>
+                <a:latin typeface="+mn-lt"/>
+                <a:ea typeface="+mn-ea"/>
+                <a:cs typeface="+mn-cs"/>
+              </a:rPr>
+              <a:t>.</a:t>
+            </a:r>
+            <a:endParaRPr lang="en-US" sz="1200" kern="1200" baseline="0" dirty="0" smtClean="0">
+              <a:solidFill>
+                <a:schemeClr val="tx1"/>
+              </a:solidFill>
+              <a:effectLst/>
+              <a:latin typeface="+mn-lt"/>
+              <a:ea typeface="+mn-ea"/>
+              <a:cs typeface="+mn-cs"/>
+            </a:endParaRPr>
           </a:p>
           <a:p>
             <a:r>
               <a:rPr lang="ru-RU" dirty="0" smtClean="0"/>
-              <a:t>В</a:t>
-            </a:r>
-            <a:r>
-              <a:rPr lang="ru-RU" baseline="0" dirty="0" smtClean="0"/>
-              <a:t> </a:t>
-            </a:r>
-            <a:r>
-              <a:rPr lang="ru-RU" baseline="0" dirty="0" smtClean="0"/>
-              <a:t>основе </a:t>
-            </a:r>
-            <a:r>
-              <a:rPr lang="ru-RU" baseline="0" dirty="0" smtClean="0"/>
-              <a:t>рассматриваемой подсистемы лежит </a:t>
-            </a:r>
-            <a:r>
-              <a:rPr lang="ru-RU" baseline="0" dirty="0" smtClean="0"/>
-              <a:t>грамматика разработанного </a:t>
-            </a:r>
-            <a:r>
-              <a:rPr lang="ru-RU" baseline="0" dirty="0" smtClean="0"/>
-              <a:t>языка </a:t>
-            </a:r>
-            <a:r>
-              <a:rPr lang="ru-RU" baseline="0" dirty="0" smtClean="0"/>
-              <a:t>описания моделей </a:t>
-            </a:r>
-            <a:r>
-              <a:rPr lang="ru-RU" baseline="0" dirty="0" smtClean="0"/>
-              <a:t>и специально разработанная структура абстрактного синтаксического дерева.</a:t>
-            </a:r>
+              <a:t>Система преобразует модель в абстрактное синтаксическое дерево, структура которого была выбрана с уч</a:t>
+            </a:r>
+            <a:r>
+              <a:rPr lang="ru-RU" dirty="0"/>
+              <a:t>ё</a:t>
+            </a:r>
+            <a:r>
+              <a:rPr lang="ru-RU" dirty="0" smtClean="0"/>
+              <a:t>том дальнейших алгоритмов его обработки. Процесс построения лексического и синтаксического анализа был автоматизирован с помощью </a:t>
+            </a:r>
+            <a:r>
+              <a:rPr lang="en-US" dirty="0" smtClean="0"/>
+              <a:t>ANTLR. </a:t>
+            </a:r>
+            <a:r>
+              <a:rPr lang="ru-RU" dirty="0" smtClean="0"/>
+              <a:t>Для автоматизации сборки системы был использован </a:t>
+            </a:r>
+            <a:r>
+              <a:rPr lang="en-US" dirty="0" smtClean="0"/>
+              <a:t>Apache Maven</a:t>
+            </a:r>
+            <a:r>
+              <a:rPr lang="ru-RU" dirty="0" smtClean="0"/>
+              <a:t>.</a:t>
+            </a:r>
+            <a:endParaRPr lang="en-US" dirty="0"/>
           </a:p>
         </p:txBody>
       </p:sp>
@@ -818,7 +860,45 @@
             </a:r>
             <a:r>
               <a:rPr lang="ru-RU" baseline="0" dirty="0" smtClean="0"/>
-              <a:t> информации, содержащейся в абстрактном синтаксическом дереве, в более удобную с точки зрения автоматных языков форму – граф потока исполнения. При построении такого графа для каждому узлу ставится в соответствие состояние в исходной модели, а каждой инструкции перехода между состояниями соответствует ребро между состояниями. Кроме того выделяются два базовых состояния, которые должны присутствовать в любой модели прототипа – начальное и конечное. </a:t>
+              <a:t> информации, содержащейся в абстрактном синтаксическом </a:t>
+            </a:r>
+            <a:r>
+              <a:rPr lang="ru-RU" baseline="0" dirty="0" smtClean="0"/>
+              <a:t>дереве. Грамматика языка обеспечивает описание узлов графа и направленных дуг, соответствующих условиям перехода. Эти свойства отражаются в абстрактном синтаксическом дереве,</a:t>
+            </a:r>
+            <a:r>
+              <a:rPr lang="ru-RU" dirty="0" smtClean="0"/>
+              <a:t> которое затем преобразуется </a:t>
+            </a:r>
+            <a:r>
+              <a:rPr lang="ru-RU" baseline="0" dirty="0" smtClean="0"/>
+              <a:t>в </a:t>
+            </a:r>
+            <a:r>
+              <a:rPr lang="ru-RU" baseline="0" dirty="0" smtClean="0"/>
+              <a:t>более удобную с точки зрения автоматных языков форму – граф потока исполнения. </a:t>
+            </a:r>
+            <a:endParaRPr lang="ru-RU" baseline="0" dirty="0" smtClean="0"/>
+          </a:p>
+          <a:p>
+            <a:r>
+              <a:rPr lang="ru-RU" dirty="0" smtClean="0"/>
+              <a:t>?</a:t>
+            </a:r>
+            <a:endParaRPr lang="ru-RU" dirty="0"/>
+          </a:p>
+          <a:p>
+            <a:r>
+              <a:rPr lang="ru-RU" baseline="0" dirty="0" smtClean="0"/>
+              <a:t>При </a:t>
+            </a:r>
+            <a:r>
+              <a:rPr lang="ru-RU" baseline="0" dirty="0" smtClean="0"/>
+              <a:t>построении такого графа для каждому узлу ставится в соответствие состояние в исходной модели, а каждой инструкции перехода между состояниями соответствует ребро между состояниями</a:t>
+            </a:r>
+            <a:r>
+              <a:rPr lang="ru-RU" baseline="0" dirty="0" smtClean="0"/>
+              <a:t>.</a:t>
             </a:r>
             <a:endParaRPr lang="ru-RU" dirty="0"/>
           </a:p>
@@ -948,11 +1028,28 @@
             </a:r>
             <a:r>
               <a:rPr lang="ru-RU" baseline="0" dirty="0" smtClean="0"/>
-              <a:t>которая представляет собой автомат Бюхи, записанный на языке </a:t>
+              <a:t>которая представляет собой автомат Бюхи, записанный на языке промела</a:t>
             </a:r>
             <a:r>
               <a:rPr lang="ru-RU" baseline="0" dirty="0" smtClean="0"/>
-              <a:t>промела.</a:t>
+              <a:t>.</a:t>
+            </a:r>
+          </a:p>
+          <a:p>
+            <a:endParaRPr lang="ru-RU" dirty="0"/>
+          </a:p>
+          <a:p>
+            <a:r>
+              <a:rPr lang="en-US" dirty="0" smtClean="0"/>
+              <a:t>[ </a:t>
+            </a:r>
+            <a:r>
+              <a:rPr lang="ru-RU" dirty="0" smtClean="0"/>
+              <a:t>При вопросах ссылаться на приложение</a:t>
+            </a:r>
+            <a:r>
+              <a:rPr lang="en-US" dirty="0" smtClean="0"/>
+              <a:t> ]</a:t>
             </a:r>
             <a:endParaRPr lang="ru-RU" dirty="0"/>
           </a:p>
@@ -1039,18 +1136,66 @@
           <a:lstStyle/>
           <a:p>
             <a:r>
-              <a:rPr lang="ru-RU" sz="1200" b="0" i="0" u="none" strike="noStrike" kern="1200" baseline="0" dirty="0" smtClean="0">
-                <a:solidFill>
-                  <a:schemeClr val="tx1"/>
-                </a:solidFill>
-                <a:latin typeface="+mn-lt"/>
-                <a:ea typeface="+mn-ea"/>
-                <a:cs typeface="+mn-cs"/>
-              </a:rPr>
-              <a:t>В качестве примера рассмотрим модель прототипа, имитирующую автоматическую коробку передач автомобиля</a:t>
-            </a:r>
-          </a:p>
-          <a:p>
+              <a:rPr lang="ru-RU" dirty="0"/>
+              <a:t>В качестве иллюстрации использования языка рассмотрим описание программы, представляющей из себя имитационную модель некоторого объекта. Поскольку для любой </a:t>
+            </a:r>
+            <a:r>
+              <a:rPr lang="ru-RU" dirty="0" smtClean="0"/>
+              <a:t>программной </a:t>
+            </a:r>
+            <a:r>
+              <a:rPr lang="ru-RU" dirty="0"/>
+              <a:t>системы может быть построен соответствующий ей конечный автомат, то поведение любой программы может быть описано в терминах перехода конечного автомата из состояния в состояние, а, следовательно, эта </a:t>
+            </a:r>
+            <a:r>
+              <a:rPr lang="ru-RU" dirty="0" smtClean="0"/>
+              <a:t>программа </a:t>
+            </a:r>
+            <a:r>
+              <a:rPr lang="ru-RU" dirty="0"/>
+              <a:t>может быть описана на предлагаемом языке </a:t>
+            </a:r>
+            <a:r>
+              <a:rPr lang="en-US" dirty="0"/>
+              <a:t>Proto</a:t>
+            </a:r>
+            <a:r>
+              <a:rPr lang="ru-RU" dirty="0"/>
+              <a:t>.</a:t>
+            </a:r>
+          </a:p>
+          <a:p>
+            <a:r>
+              <a:rPr lang="ru-RU" dirty="0"/>
+              <a:t>В качестве моделируемой программы возьмём прототип, реализующий имитационную модель автоматической коробки </a:t>
+            </a:r>
+            <a:r>
+              <a:rPr lang="ru-RU" dirty="0" smtClean="0"/>
+              <a:t>передач</a:t>
+            </a:r>
+            <a:r>
+              <a:rPr lang="en-US" dirty="0" smtClean="0"/>
+              <a:t>. </a:t>
+            </a:r>
+            <a:r>
+              <a:rPr lang="ru-RU" dirty="0" smtClean="0"/>
+              <a:t>Выбор </a:t>
+            </a:r>
+            <a:r>
+              <a:rPr lang="ru-RU" dirty="0"/>
+              <a:t>этого примера объясняется как простотой реализации данной имитационной модели, так и наличием достаточно большого количества состоянии, что позволяет продемонстрировать основные возможности предлагаемого языка</a:t>
+            </a:r>
+            <a:r>
+              <a:rPr lang="ru-RU" dirty="0" smtClean="0"/>
+              <a:t>.</a:t>
+            </a:r>
+            <a:endParaRPr lang="en-US" dirty="0" smtClean="0"/>
+          </a:p>
+          <a:p>
+            <a:r>
+              <a:rPr lang="ru-RU" dirty="0" smtClean="0"/>
+              <a:t>На данном слайде вы можете видеть взаимно однозначное соответствие между моделью и её изображением в виде конечного автомата.</a:t>
+            </a:r>
             <a:endParaRPr lang="ru-RU" sz="1200" b="0" i="0" u="none" strike="noStrike" kern="1200" baseline="0" dirty="0" smtClean="0">
               <a:solidFill>
                 <a:schemeClr val="tx1"/>
@@ -1144,7 +1289,21 @@
           <a:p>
             <a:r>
               <a:rPr lang="ru-RU" dirty="0" smtClean="0"/>
-              <a:t>Для удобства работы с разработанной системой был реализован плагин для среды разработки </a:t>
+              <a:t>Во время дипломного проектирования были разработаны визуальные средства, </a:t>
+            </a:r>
+            <a:r>
+              <a:rPr lang="ru-RU" dirty="0" smtClean="0"/>
+              <a:t>помогающие разработчику создавать описания проектируемых систем. </a:t>
+            </a:r>
+          </a:p>
+          <a:p>
+            <a:r>
+              <a:rPr lang="ru-RU" dirty="0" smtClean="0"/>
+              <a:t>Был </a:t>
+            </a:r>
+            <a:r>
+              <a:rPr lang="ru-RU" dirty="0" smtClean="0"/>
+              <a:t>реализован плагин для среды разработки </a:t>
             </a:r>
             <a:r>
               <a:rPr lang="en-US" dirty="0" smtClean="0"/>
@@ -1295,6 +1454,66 @@
               </a:rPr>
               <a:t> На базе модели спроектирована архитектура системы. На основе формализованной модели был спроектирован и реализован каркас системы проектирования и тестирования прототипов архитектур, с применением современных подходов и технологий программирования. </a:t>
             </a:r>
+            <a:endParaRPr lang="ru-RU" sz="1200" kern="1200" dirty="0" smtClean="0">
+              <a:solidFill>
+                <a:schemeClr val="tx1"/>
+              </a:solidFill>
+              <a:effectLst/>
+              <a:latin typeface="+mn-lt"/>
+              <a:ea typeface="+mn-ea"/>
+              <a:cs typeface="+mn-cs"/>
+            </a:endParaRPr>
+          </a:p>
+          <a:p>
+            <a:pPr marL="0" marR="0" indent="0" algn="l" defTabSz="914400" rtl="0" eaLnBrk="1" fontAlgn="auto" latinLnBrk="0" hangingPunct="1">
+              <a:lnSpc>
+                <a:spcPct val="100000"/>
+              </a:lnSpc>
+              <a:spcBef>
+                <a:spcPts val="0"/>
+              </a:spcBef>
+              <a:spcAft>
+                <a:spcPts val="0"/>
+              </a:spcAft>
+              <a:buClrTx/>
+              <a:buSzTx/>
+              <a:buFontTx/>
+              <a:buNone/>
+              <a:tabLst/>
+              <a:defRPr/>
+            </a:pPr>
+            <a:r>
+              <a:rPr lang="ru-RU" dirty="0" smtClean="0"/>
+              <a:t>Также был реализован редактор для </a:t>
+            </a:r>
+            <a:r>
+              <a:rPr lang="ru-RU" dirty="0" smtClean="0"/>
+              <a:t>работы с </a:t>
+            </a:r>
+            <a:r>
+              <a:rPr lang="ru-RU" dirty="0" smtClean="0"/>
+              <a:t>языком </a:t>
+            </a:r>
+            <a:r>
+              <a:rPr lang="en-US" dirty="0" smtClean="0"/>
+              <a:t>PROTO </a:t>
+            </a:r>
+            <a:r>
+              <a:rPr lang="ru-RU" dirty="0" smtClean="0"/>
+              <a:t>в виде плагина для среды разработки </a:t>
+            </a:r>
+            <a:r>
+              <a:rPr lang="en-US" dirty="0" smtClean="0"/>
+              <a:t>Eclipse</a:t>
+            </a:r>
+            <a:r>
+              <a:rPr lang="en-US" dirty="0"/>
+              <a:t>.</a:t>
+            </a:r>
+            <a:r>
+              <a:rPr lang="ru-RU" dirty="0" smtClean="0"/>
+              <a:t> </a:t>
+            </a:r>
             <a:endParaRPr lang="en-US" sz="1200" kern="1200" dirty="0" smtClean="0">
               <a:solidFill>
                 <a:schemeClr val="tx1"/>
@@ -1460,16 +1679,6 @@
           <a:lstStyle/>
           <a:p>
             <a:r>
-              <a:rPr lang="ru-RU" dirty="0" smtClean="0"/>
-              <a:t>Коротко</a:t>
-            </a:r>
-            <a:r>
-              <a:rPr lang="ru-RU" baseline="0" dirty="0" smtClean="0"/>
-              <a:t> по каждому пункту</a:t>
-            </a:r>
-          </a:p>
-          <a:p>
-            <a:r>
               <a:rPr lang="ru-RU" sz="1200" kern="1200" dirty="0" smtClean="0">
                 <a:solidFill>
                   <a:schemeClr val="tx1"/>
@@ -1479,10 +1688,8 @@
                 <a:ea typeface="+mn-ea"/>
                 <a:cs typeface="+mn-cs"/>
               </a:rPr>
-              <a:t>Можно выделить следующие пути развития проекта. </a:t>
-            </a:r>
-          </a:p>
-          <a:p>
+              <a:t>Можно </a:t>
+            </a:r>
             <a:r>
               <a:rPr lang="ru-RU" sz="1200" kern="1200" dirty="0" smtClean="0">
                 <a:solidFill>
@@ -1493,10 +1700,12 @@
                 <a:ea typeface="+mn-ea"/>
                 <a:cs typeface="+mn-cs"/>
               </a:rPr>
-              <a:t>Во-первых, для наделения системы расширения возможностей</a:t>
-            </a:r>
-            <a:r>
-              <a:rPr lang="ru-RU" sz="1200" kern="1200" baseline="0" dirty="0" smtClean="0">
+              <a:t>выделить следующие пути развития проекта. </a:t>
+            </a:r>
+          </a:p>
+          <a:p>
+            <a:r>
+              <a:rPr lang="ru-RU" sz="1200" kern="1200" dirty="0" smtClean="0">
                 <a:solidFill>
                   <a:schemeClr val="tx1"/>
                 </a:solidFill>
@@ -1505,7 +1714,7 @@
                 <a:ea typeface="+mn-ea"/>
                 <a:cs typeface="+mn-cs"/>
               </a:rPr>
-              <a:t> системы</a:t>
+              <a:t>Во-первых, </a:t>
             </a:r>
             <a:r>
               <a:rPr lang="ru-RU" sz="1200" kern="1200" dirty="0" smtClean="0">
@@ -1517,10 +1726,10 @@
                 <a:ea typeface="+mn-ea"/>
                 <a:cs typeface="+mn-cs"/>
               </a:rPr>
-              <a:t> требуется добавить</a:t>
-            </a:r>
-            <a:r>
-              <a:rPr lang="ru-RU" sz="1200" kern="1200" baseline="0" dirty="0" smtClean="0">
+              <a:t>для </a:t>
+            </a:r>
+            <a:r>
+              <a:rPr lang="ru-RU" sz="1200" kern="1200" dirty="0" smtClean="0">
                 <a:solidFill>
                   <a:schemeClr val="tx1"/>
                 </a:solidFill>
@@ -1529,10 +1738,10 @@
                 <a:ea typeface="+mn-ea"/>
                 <a:cs typeface="+mn-cs"/>
               </a:rPr>
-              <a:t> поддержку верификации </a:t>
-            </a:r>
-            <a:r>
-              <a:rPr lang="ru-RU" sz="1200" kern="1200" baseline="0" dirty="0" err="1" smtClean="0">
+              <a:t>расширения возможностей</a:t>
+            </a:r>
+            <a:r>
+              <a:rPr lang="ru-RU" sz="1200" kern="1200" baseline="0" dirty="0" smtClean="0">
                 <a:solidFill>
                   <a:schemeClr val="tx1"/>
                 </a:solidFill>
@@ -1541,10 +1750,10 @@
                 <a:ea typeface="+mn-ea"/>
                 <a:cs typeface="+mn-cs"/>
               </a:rPr>
-              <a:t>распределенных</a:t>
-            </a:r>
-            <a:r>
-              <a:rPr lang="ru-RU" sz="1200" kern="1200" baseline="0" dirty="0" smtClean="0">
+              <a:t> системы</a:t>
+            </a:r>
+            <a:r>
+              <a:rPr lang="ru-RU" sz="1200" kern="1200" dirty="0" smtClean="0">
                 <a:solidFill>
                   <a:schemeClr val="tx1"/>
                 </a:solidFill>
@@ -1553,7 +1762,59 @@
                 <a:ea typeface="+mn-ea"/>
                 <a:cs typeface="+mn-cs"/>
               </a:rPr>
-              <a:t> и параллельных систем</a:t>
+              <a:t> требуется добавить</a:t>
+            </a:r>
+            <a:r>
+              <a:rPr lang="ru-RU" sz="1200" kern="1200" baseline="0" dirty="0" smtClean="0">
+                <a:solidFill>
+                  <a:schemeClr val="tx1"/>
+                </a:solidFill>
+                <a:effectLst/>
+                <a:latin typeface="+mn-lt"/>
+                <a:ea typeface="+mn-ea"/>
+                <a:cs typeface="+mn-cs"/>
+              </a:rPr>
+              <a:t> поддержку верификации </a:t>
+            </a:r>
+            <a:r>
+              <a:rPr lang="ru-RU" sz="1200" kern="1200" baseline="0" dirty="0" smtClean="0">
+                <a:solidFill>
+                  <a:schemeClr val="tx1"/>
+                </a:solidFill>
+                <a:effectLst/>
+                <a:latin typeface="+mn-lt"/>
+                <a:ea typeface="+mn-ea"/>
+                <a:cs typeface="+mn-cs"/>
+              </a:rPr>
+              <a:t>распредел</a:t>
+            </a:r>
+            <a:r>
+              <a:rPr lang="ru-RU" dirty="0"/>
+              <a:t>ё</a:t>
+            </a:r>
+            <a:r>
+              <a:rPr lang="ru-RU" sz="1200" kern="1200" baseline="0" dirty="0" smtClean="0">
+                <a:solidFill>
+                  <a:schemeClr val="tx1"/>
+                </a:solidFill>
+                <a:effectLst/>
+                <a:latin typeface="+mn-lt"/>
+                <a:ea typeface="+mn-ea"/>
+                <a:cs typeface="+mn-cs"/>
+              </a:rPr>
+              <a:t>нных </a:t>
+            </a:r>
+            <a:r>
+              <a:rPr lang="ru-RU" sz="1200" kern="1200" baseline="0" dirty="0" smtClean="0">
+                <a:solidFill>
+                  <a:schemeClr val="tx1"/>
+                </a:solidFill>
+                <a:effectLst/>
+                <a:latin typeface="+mn-lt"/>
+                <a:ea typeface="+mn-ea"/>
+                <a:cs typeface="+mn-cs"/>
+              </a:rPr>
+              <a:t>и параллельных систем</a:t>
             </a:r>
             <a:r>
               <a:rPr lang="en-US" sz="1200" kern="1200" baseline="0" dirty="0" smtClean="0">
@@ -1631,7 +1892,7 @@
               <a:t>Наконец, совершенствование компонентов и оптимизация алгоритмов базовой платформы системы позволит повысить </a:t>
             </a:r>
             <a:r>
-              <a:rPr lang="ru-RU" sz="1200" kern="1200" dirty="0" err="1" smtClean="0">
+              <a:rPr lang="ru-RU" sz="1200" kern="1200" dirty="0" smtClean="0">
                 <a:solidFill>
                   <a:schemeClr val="tx1"/>
                 </a:solidFill>
@@ -1640,7 +1901,7 @@
                 <a:ea typeface="+mn-ea"/>
                 <a:cs typeface="+mn-cs"/>
               </a:rPr>
-              <a:t>эффектиность</a:t>
+              <a:t>эффективность её </a:t>
             </a:r>
             <a:r>
               <a:rPr lang="ru-RU" sz="1200" kern="1200" dirty="0" smtClean="0">
@@ -1652,31 +1913,7 @@
                 <a:ea typeface="+mn-ea"/>
                 <a:cs typeface="+mn-cs"/>
               </a:rPr>
-              <a:t> </a:t>
-            </a:r>
-            <a:r>
-              <a:rPr lang="ru-RU" sz="1200" kern="1200" dirty="0" err="1" smtClean="0">
-                <a:solidFill>
-                  <a:schemeClr val="tx1"/>
-                </a:solidFill>
-                <a:effectLst/>
-                <a:latin typeface="+mn-lt"/>
-                <a:ea typeface="+mn-ea"/>
-                <a:cs typeface="+mn-cs"/>
-              </a:rPr>
-              <a:t>ее</a:t>
-            </a:r>
-            <a:r>
-              <a:rPr lang="ru-RU" sz="1200" kern="1200" dirty="0" smtClean="0">
-                <a:solidFill>
-                  <a:schemeClr val="tx1"/>
-                </a:solidFill>
-                <a:effectLst/>
-                <a:latin typeface="+mn-lt"/>
-                <a:ea typeface="+mn-ea"/>
-                <a:cs typeface="+mn-cs"/>
-              </a:rPr>
-              <a:t> использования и сократить накладные расходы в работе полезной части. </a:t>
+              <a:t>использования и сократить накладные расходы в работе полезной части. </a:t>
             </a:r>
           </a:p>
         </p:txBody>
@@ -1771,7 +2008,19 @@
                 <a:ea typeface="+mn-ea"/>
                 <a:cs typeface="+mn-cs"/>
               </a:rPr>
-              <a:t>На этом, у меня все. Спасибо за Ваше внимание. Я готова ответить на возникшие вопросы.</a:t>
+              <a:t>На этом, у меня все. Спасибо за Ваше внимание</a:t>
+            </a:r>
+            <a:r>
+              <a:rPr lang="ru-RU" sz="1200" kern="1200" dirty="0" smtClean="0">
+                <a:solidFill>
+                  <a:schemeClr val="tx1"/>
+                </a:solidFill>
+                <a:effectLst/>
+                <a:latin typeface="+mn-lt"/>
+                <a:ea typeface="+mn-ea"/>
+                <a:cs typeface="+mn-cs"/>
+              </a:rPr>
+              <a:t>.</a:t>
             </a:r>
             <a:endParaRPr lang="ru-RU" dirty="0"/>
           </a:p>
@@ -1900,13 +2149,8 @@
             </a:r>
             <a:r>
               <a:rPr lang="ru-RU" baseline="0" dirty="0" smtClean="0"/>
-              <a:t> контрпример с </a:t>
-            </a:r>
-            <a:r>
-              <a:rPr lang="ru-RU" baseline="0" dirty="0" smtClean="0"/>
-              <a:t>ошибкой</a:t>
-            </a:r>
-            <a:endParaRPr lang="ru-RU" baseline="0" dirty="0" smtClean="0"/>
+              <a:t> контрпример с ошибкой</a:t>
+            </a:r>
           </a:p>
           <a:p>
             <a:pPr marL="228600" indent="-228600">
@@ -2006,109 +2250,35 @@
             </a:r>
             <a:r>
               <a:rPr lang="ru-RU" baseline="0" dirty="0" smtClean="0"/>
-              <a:t> масса подходов к построению и разработке ПО, поэтому </a:t>
+              <a:t> масса подходов к построению и разработке </a:t>
             </a:r>
             <a:r>
               <a:rPr lang="ru-RU" baseline="0" dirty="0" smtClean="0"/>
-              <a:t>опишем </a:t>
-            </a:r>
-            <a:r>
-              <a:rPr lang="ru-RU" baseline="0" dirty="0" smtClean="0"/>
-              <a:t>лишь общие этапы, не вдаваясь в подробности</a:t>
-            </a:r>
-          </a:p>
-          <a:p>
-            <a:r>
-              <a:rPr lang="ru-RU" baseline="0" dirty="0" smtClean="0"/>
-              <a:t>Анализ – включает в себя анализ предметной области, требования к пользователю и завершается разработкой спецификации ПО</a:t>
-            </a:r>
-          </a:p>
-          <a:p>
-            <a:r>
-              <a:rPr lang="ru-RU" baseline="0" dirty="0" smtClean="0"/>
-              <a:t>Проектирование – разрабатываем архитектуру программного средства и </a:t>
-            </a:r>
-            <a:r>
-              <a:rPr lang="ru-RU" baseline="0" dirty="0" smtClean="0"/>
-              <a:t>детализируем её</a:t>
-            </a:r>
-            <a:endParaRPr lang="ru-RU" baseline="0" dirty="0" smtClean="0"/>
-          </a:p>
-          <a:p>
-            <a:r>
-              <a:rPr lang="ru-RU" baseline="0" dirty="0" smtClean="0"/>
-              <a:t>Реализация – кодирование</a:t>
-            </a:r>
-          </a:p>
-          <a:p>
-            <a:r>
-              <a:rPr lang="ru-RU" baseline="0" dirty="0" smtClean="0"/>
-              <a:t>Тестирование </a:t>
-            </a:r>
-            <a:r>
-              <a:rPr lang="ru-RU" baseline="0" dirty="0" smtClean="0"/>
-              <a:t>= </a:t>
-            </a:r>
-            <a:r>
-              <a:rPr lang="ru-RU" baseline="0" dirty="0" smtClean="0"/>
-              <a:t>компонентное </a:t>
-            </a:r>
-            <a:r>
-              <a:rPr lang="ru-RU" baseline="0" dirty="0" smtClean="0"/>
-              <a:t>+ системное</a:t>
-            </a:r>
-            <a:endParaRPr lang="ru-RU" baseline="0" dirty="0" smtClean="0"/>
-          </a:p>
-          <a:p>
-            <a:r>
-              <a:rPr lang="ru-RU" baseline="0" dirty="0" smtClean="0"/>
-              <a:t>Эксплуатация – внедрение, использование и поддержка программы</a:t>
-            </a:r>
-          </a:p>
-          <a:p>
-            <a:r>
-              <a:rPr lang="ru-RU" baseline="0" dirty="0" smtClean="0"/>
-              <a:t>Ошибки могут появится на любом из этапов, но как правило большинство из них возникает </a:t>
-            </a:r>
-            <a:r>
-              <a:rPr lang="ru-RU" baseline="0" dirty="0" smtClean="0"/>
-              <a:t>вследствие </a:t>
-            </a:r>
-            <a:r>
-              <a:rPr lang="ru-RU" baseline="0" dirty="0" smtClean="0"/>
-              <a:t>неправильного решения на этапе проектирования. Цена ошибки </a:t>
-            </a:r>
-            <a:r>
-              <a:rPr lang="ru-RU" baseline="0" dirty="0" err="1" smtClean="0"/>
+              <a:t>ПО</a:t>
+            </a:r>
+            <a:r>
+              <a:rPr lang="en-US" dirty="0" smtClean="0"/>
+              <a:t>.</a:t>
+            </a:r>
+          </a:p>
+          <a:p>
+            <a:r>
+              <a:rPr lang="ru-RU" dirty="0"/>
+              <a:t>Ошибки могут появится на любом из этапов, но как правило большинство из них возникает вследствие неправильного решения на этапе проектирования. Цена ошибки </a:t>
+            </a:r>
+            <a:r>
+              <a:rPr lang="ru-RU" dirty="0" err="1"/>
               <a:t>растет</a:t>
             </a:r>
             <a:r>
-              <a:rPr lang="ru-RU" baseline="0" dirty="0" smtClean="0"/>
+              <a:rPr lang="ru-RU" dirty="0"/>
               <a:t> к концу процесса </a:t>
             </a:r>
             <a:r>
-              <a:rPr lang="ru-RU" baseline="0" dirty="0" smtClean="0"/>
+              <a:rPr lang="ru-RU" dirty="0" smtClean="0"/>
               <a:t>разработки</a:t>
             </a:r>
-            <a:endParaRPr lang="en-US" baseline="0" dirty="0" smtClean="0"/>
-          </a:p>
-          <a:p>
-            <a:endParaRPr lang="en-US" baseline="0" dirty="0" smtClean="0"/>
-          </a:p>
-          <a:p>
-            <a:r>
-              <a:rPr lang="ru-RU" b="1" baseline="0" dirty="0" smtClean="0"/>
-              <a:t>Рассмотрим что же </a:t>
-            </a:r>
-            <a:r>
-              <a:rPr lang="ru-RU" b="1" baseline="0" dirty="0" err="1" smtClean="0"/>
-              <a:t>педставляет</a:t>
-            </a:r>
-            <a:r>
-              <a:rPr lang="ru-RU" b="1" baseline="0" dirty="0" smtClean="0"/>
-              <a:t> из себя модель архитектуры, которая разрабатывается на этапе Проектирования</a:t>
-            </a:r>
-            <a:endParaRPr lang="ru-RU" b="1" dirty="0"/>
+            <a:endParaRPr lang="en-US" dirty="0"/>
           </a:p>
         </p:txBody>
       </p:sp>
@@ -2193,7 +2363,13 @@
           <a:lstStyle/>
           <a:p>
             <a:r>
-              <a:rPr lang="ru-RU" sz="1200" kern="1200" dirty="0" smtClean="0">
+              <a:rPr lang="ru-RU" dirty="0" smtClean="0"/>
+              <a:t>В данной работе предлагается система проектирования и тестирования каркасов программных продуктов, основанная на автоматной модели. </a:t>
+            </a:r>
+          </a:p>
+          <a:p>
+            <a:r>
+              <a:rPr lang="ru-RU" sz="1200" kern="1200" baseline="0" dirty="0" smtClean="0">
                 <a:solidFill>
                   <a:schemeClr val="tx1"/>
                 </a:solidFill>
@@ -2202,10 +2378,10 @@
                 <a:ea typeface="+mn-ea"/>
                 <a:cs typeface="+mn-cs"/>
               </a:rPr>
-              <a:t>Рассмотрим формальное описание модели прототипа</a:t>
-            </a:r>
-            <a:r>
-              <a:rPr lang="ru-RU" sz="1200" kern="1200" baseline="0" dirty="0" smtClean="0">
+              <a:t>На</a:t>
+            </a:r>
+            <a:r>
+              <a:rPr lang="ru-RU" sz="1200" kern="1200" dirty="0" smtClean="0">
                 <a:solidFill>
                   <a:schemeClr val="tx1"/>
                 </a:solidFill>
@@ -2214,12 +2390,21 @@
                 <a:ea typeface="+mn-ea"/>
                 <a:cs typeface="+mn-cs"/>
               </a:rPr>
-              <a:t> архитектуры.</a:t>
-            </a:r>
-          </a:p>
-          <a:p>
-            <a:r>
-              <a:rPr lang="ru-RU" sz="1200" kern="1200" baseline="0" dirty="0" smtClean="0">
+              <a:t> слайде представлена автоматная модель прототипа архитектуры, в которой выделены состояния, спецификации и сценарии. Такая модель была введена для обобщения описания архитектур систем. </a:t>
+            </a:r>
+            <a:r>
+              <a:rPr lang="ru-RU" b="1" dirty="0"/>
+              <a:t>Существует большое количество практик, методологии и инструментов, позволяющих тестировать модели заданные подобным </a:t>
+            </a:r>
+            <a:r>
+              <a:rPr lang="ru-RU" b="1" dirty="0" smtClean="0"/>
+              <a:t>образом</a:t>
+            </a:r>
+            <a:endParaRPr lang="en-US" dirty="0"/>
+          </a:p>
+          <a:p>
+            <a:r>
+              <a:rPr lang="en-US" sz="1200" kern="1200" baseline="0" dirty="0" smtClean="0">
                 <a:solidFill>
                   <a:schemeClr val="tx1"/>
                 </a:solidFill>
@@ -2228,12 +2413,10 @@
                 <a:ea typeface="+mn-ea"/>
                 <a:cs typeface="+mn-cs"/>
               </a:rPr>
-              <a:t>Модель прототипа является результатом отображения исходной архитектуры разрабатываемой системы в программную среду и представляет собой сущность, характеризующуюся: конечным множеством состояний, начальным состоянием, множеством конечных состояний, набором спецификаций требований и множеством сценариев использования. </a:t>
-            </a:r>
-          </a:p>
-          <a:p>
-            <a:r>
-              <a:rPr lang="ru-RU" sz="1200" kern="1200" dirty="0" smtClean="0">
+              <a:t>[ </a:t>
+            </a:r>
+            <a:r>
+              <a:rPr lang="ru-RU" sz="1200" kern="1200" baseline="0" dirty="0" smtClean="0">
                 <a:solidFill>
                   <a:schemeClr val="tx1"/>
                 </a:solidFill>
@@ -2242,7 +2425,67 @@
                 <a:ea typeface="+mn-ea"/>
                 <a:cs typeface="+mn-cs"/>
               </a:rPr>
-              <a:t>Состояние можно определить как момент в работе прототипа архитектуры, который объединяет в неявной форме все входные воздействия прошлого, а также влияет на реакцию в текущий момент времени. Каждое состояние имеет вполне определённый смысл и качественно отличается от всех других состоянии, и кроме того однозначно определяет действия, которые могут совершаться в этом состоянии.</a:t>
+              <a:t>Модель </a:t>
+            </a:r>
+            <a:r>
+              <a:rPr lang="ru-RU" sz="1200" kern="1200" baseline="0" dirty="0" smtClean="0">
+                <a:solidFill>
+                  <a:schemeClr val="tx1"/>
+                </a:solidFill>
+                <a:effectLst/>
+                <a:latin typeface="+mn-lt"/>
+                <a:ea typeface="+mn-ea"/>
+                <a:cs typeface="+mn-cs"/>
+              </a:rPr>
+              <a:t>прототипа является результатом отображения исходной архитектуры разрабатываемой системы в программную среду и представляет собой сущность, характеризующуюся: конечным множеством состояний, начальным состоянием, множеством конечных состояний, набором спецификаций требований и множеством сценариев использования. </a:t>
+            </a:r>
+            <a:r>
+              <a:rPr lang="ru-RU" sz="1200" kern="1200" dirty="0" smtClean="0">
+                <a:solidFill>
+                  <a:schemeClr val="tx1"/>
+                </a:solidFill>
+                <a:effectLst/>
+                <a:latin typeface="+mn-lt"/>
+                <a:ea typeface="+mn-ea"/>
+                <a:cs typeface="+mn-cs"/>
+              </a:rPr>
+              <a:t>Состояние </a:t>
+            </a:r>
+            <a:r>
+              <a:rPr lang="ru-RU" sz="1200" kern="1200" dirty="0" smtClean="0">
+                <a:solidFill>
+                  <a:schemeClr val="tx1"/>
+                </a:solidFill>
+                <a:effectLst/>
+                <a:latin typeface="+mn-lt"/>
+                <a:ea typeface="+mn-ea"/>
+                <a:cs typeface="+mn-cs"/>
+              </a:rPr>
+              <a:t>можно определить как момент в работе прототипа архитектуры, который объединяет в неявной форме все входные воздействия прошлого, а также влияет на реакцию в текущий момент времени. Каждое состояние имеет вполне определённый смысл и качественно отличается от всех других состоянии, и кроме того однозначно определяет действия, которые могут совершаться в этом </a:t>
+            </a:r>
+            <a:r>
+              <a:rPr lang="ru-RU" sz="1200" kern="1200" dirty="0" smtClean="0">
+                <a:solidFill>
+                  <a:schemeClr val="tx1"/>
+                </a:solidFill>
+                <a:effectLst/>
+                <a:latin typeface="+mn-lt"/>
+                <a:ea typeface="+mn-ea"/>
+                <a:cs typeface="+mn-cs"/>
+              </a:rPr>
+              <a:t>состоянии</a:t>
+            </a:r>
+            <a:r>
+              <a:rPr lang="en-US" sz="1200" kern="1200" dirty="0" smtClean="0">
+                <a:solidFill>
+                  <a:schemeClr val="tx1"/>
+                </a:solidFill>
+                <a:effectLst/>
+                <a:latin typeface="+mn-lt"/>
+                <a:ea typeface="+mn-ea"/>
+                <a:cs typeface="+mn-cs"/>
+              </a:rPr>
+              <a:t>]</a:t>
             </a:r>
             <a:endParaRPr lang="ru-RU" sz="1200" kern="1200" baseline="0" dirty="0" smtClean="0">
               <a:solidFill>
@@ -2300,34 +2543,6 @@
               <a:ea typeface="+mn-ea"/>
               <a:cs typeface="+mn-cs"/>
             </a:endParaRPr>
-          </a:p>
-          <a:p>
-            <a:r>
-              <a:rPr lang="ru-RU" sz="1200" kern="1200" baseline="0" dirty="0" smtClean="0">
-                <a:solidFill>
-                  <a:schemeClr val="tx1"/>
-                </a:solidFill>
-                <a:effectLst/>
-                <a:latin typeface="+mn-lt"/>
-                <a:ea typeface="+mn-ea"/>
-                <a:cs typeface="+mn-cs"/>
-              </a:rPr>
-              <a:t>Такая модель была введена для обобщения описания архитектур систем</a:t>
-            </a:r>
-          </a:p>
-          <a:p>
-            <a:r>
-              <a:rPr lang="ru-RU" sz="1200" b="1" kern="1200" baseline="0" dirty="0" smtClean="0">
-                <a:solidFill>
-                  <a:schemeClr val="tx1"/>
-                </a:solidFill>
-                <a:effectLst/>
-                <a:latin typeface="+mn-lt"/>
-                <a:ea typeface="+mn-ea"/>
-                <a:cs typeface="+mn-cs"/>
-              </a:rPr>
-              <a:t>Существует большое количество практик, методологии и инструментов, позволяющих тестировать модели заданные подобным образом</a:t>
-            </a:r>
           </a:p>
         </p:txBody>
       </p:sp>
@@ -2432,11 +2647,7 @@
             </a:r>
             <a:r>
               <a:rPr lang="ru-RU" b="1" baseline="0" dirty="0" smtClean="0"/>
-              <a:t> </a:t>
-            </a:r>
-            <a:r>
-              <a:rPr lang="ru-RU" b="1" baseline="0" dirty="0" smtClean="0"/>
-              <a:t>Возможного поведения программы с неправильным должно быть пусто</a:t>
+              <a:t> Возможного поведения программы с неправильным должно быть пусто</a:t>
             </a:r>
           </a:p>
           <a:p>
@@ -2449,15 +2660,7 @@
             </a:r>
             <a:r>
               <a:rPr lang="ru-RU" baseline="0" dirty="0" smtClean="0"/>
-              <a:t>Верификация </a:t>
-            </a:r>
-            <a:r>
-              <a:rPr lang="ru-RU" baseline="0" dirty="0" smtClean="0"/>
-              <a:t>программ в общем случае алгоритмически неразрешима (см. Теорема Райса</a:t>
-            </a:r>
-            <a:r>
-              <a:rPr lang="ru-RU" baseline="0" dirty="0" smtClean="0"/>
-              <a:t>)</a:t>
+              <a:t>Верификация программ в общем случае алгоритмически неразрешима (см. Теорема Райса)</a:t>
             </a:r>
             <a:r>
               <a:rPr lang="en-US" baseline="0" dirty="0" smtClean="0"/>
@@ -2654,17 +2857,66 @@
                 <a:ea typeface="+mn-ea"/>
                 <a:cs typeface="+mn-cs"/>
               </a:rPr>
-              <a:t> транслирует полученный прототип архитектуры на выбранный целевой язык автоматного программирования. Полученная модель на целевом языке является пригодной для верификации. При помощи верификатора можно получить анализатор для модели прототипа и получить результат верификации или ошибку (контрпример)</a:t>
-            </a:r>
-            <a:endParaRPr lang="ru-RU" sz="1200" kern="1200" dirty="0" smtClean="0">
-              <a:solidFill>
-                <a:schemeClr val="tx1"/>
-              </a:solidFill>
-              <a:effectLst/>
-              <a:latin typeface="+mn-lt"/>
-              <a:ea typeface="+mn-ea"/>
-              <a:cs typeface="+mn-cs"/>
-            </a:endParaRPr>
+              <a:t> транслирует полученный прототип архитектуры на выбранный целевой язык автоматного программирования. Полученная модель на целевом языке является пригодной для верификации. При помощи верификатора можно получить анализатор для модели прототипа и получить результат верификации или ошибку </a:t>
+            </a:r>
+            <a:r>
+              <a:rPr lang="ru-RU" dirty="0" smtClean="0"/>
+              <a:t>в виде </a:t>
+            </a:r>
+            <a:r>
+              <a:rPr lang="ru-RU" sz="1200" kern="1200" baseline="0" dirty="0" smtClean="0">
+                <a:solidFill>
+                  <a:schemeClr val="tx1"/>
+                </a:solidFill>
+                <a:effectLst/>
+                <a:latin typeface="+mn-lt"/>
+                <a:ea typeface="+mn-ea"/>
+                <a:cs typeface="+mn-cs"/>
+              </a:rPr>
+              <a:t>контрпример</a:t>
+            </a:r>
+            <a:r>
+              <a:rPr lang="ru-RU" dirty="0" smtClean="0"/>
+              <a:t>а.</a:t>
+            </a:r>
+          </a:p>
+          <a:p>
+            <a:pPr>
+              <a:defRPr/>
+            </a:pPr>
+            <a:r>
+              <a:rPr lang="ru-RU" sz="1200" kern="1200" dirty="0" smtClean="0">
+                <a:solidFill>
+                  <a:schemeClr val="tx1"/>
+                </a:solidFill>
+                <a:effectLst/>
+                <a:latin typeface="+mn-lt"/>
+                <a:ea typeface="+mn-ea"/>
+                <a:cs typeface="+mn-cs"/>
+              </a:rPr>
+              <a:t>Процесс проектирования циклически повторяется после исправления модели на основе контрпримера.</a:t>
+            </a:r>
+            <a:r>
+              <a:rPr lang="en-US" dirty="0"/>
+              <a:t> {</a:t>
+            </a:r>
+            <a:r>
+              <a:rPr lang="ru-RU" dirty="0"/>
+              <a:t>Контрпример – </a:t>
+            </a:r>
+            <a:r>
+              <a:rPr lang="ru-RU" dirty="0" err="1"/>
+              <a:t>трассса</a:t>
+            </a:r>
+            <a:r>
+              <a:rPr lang="ru-RU" dirty="0"/>
+              <a:t>, содержащая ошибку.</a:t>
+            </a:r>
+            <a:r>
+              <a:rPr lang="en-US" dirty="0" smtClean="0"/>
+              <a:t>}</a:t>
+            </a:r>
+            <a:endParaRPr lang="en-US" dirty="0"/>
           </a:p>
         </p:txBody>
       </p:sp>
@@ -2771,11 +3023,19 @@
             </a:r>
             <a:r>
               <a:rPr lang="ru-RU" sz="1200" baseline="0" dirty="0" smtClean="0"/>
-              <a:t> будем рассматривать </a:t>
+              <a:t> </a:t>
+            </a:r>
+            <a:r>
+              <a:rPr lang="ru-RU" sz="1200" baseline="0" dirty="0" smtClean="0"/>
+              <a:t>был выбран </a:t>
             </a:r>
             <a:r>
               <a:rPr lang="en-US" sz="1200" baseline="0" dirty="0" smtClean="0"/>
-              <a:t>SPIN.</a:t>
+              <a:t>SPIN</a:t>
+            </a:r>
+            <a:r>
+              <a:rPr lang="en-US" sz="1200" baseline="0" dirty="0" smtClean="0"/>
+              <a:t>.</a:t>
             </a:r>
             <a:endParaRPr lang="ru-RU" sz="1200" dirty="0" smtClean="0"/>
           </a:p>
@@ -2807,15 +3067,28 @@
             </a:r>
             <a:r>
               <a:rPr lang="ru-RU" sz="1200" dirty="0" smtClean="0"/>
-              <a:t>средство </a:t>
+              <a:t>средство моделирования и верификации протоколов, параллельных программ и широкого класса дискретных систем</a:t>
             </a:r>
             <a:r>
               <a:rPr lang="ru-RU" sz="1200" dirty="0" smtClean="0"/>
-              <a:t>моделирования и верификации протоколов, параллельных программ и широкого класса дискретных </a:t>
-            </a:r>
-            <a:r>
-              <a:rPr lang="ru-RU" sz="1200" dirty="0" smtClean="0"/>
-              <a:t>систем.</a:t>
+              <a:t>.</a:t>
+            </a:r>
+          </a:p>
+          <a:p>
+            <a:pPr>
+              <a:defRPr/>
+            </a:pPr>
+            <a:r>
+              <a:rPr lang="ru-RU" dirty="0"/>
+              <a:t>Примеры использования: верификация системы управления дамбами в Нидерландах, верификация аэрокосмических </a:t>
+            </a:r>
+            <a:r>
+              <a:rPr lang="ru-RU" dirty="0" smtClean="0"/>
+              <a:t>систем </a:t>
+            </a:r>
+            <a:r>
+              <a:rPr lang="en-US" dirty="0" smtClean="0"/>
+              <a:t>NASA</a:t>
             </a:r>
             <a:endParaRPr lang="ru-RU" baseline="0" dirty="0" smtClean="0"/>
           </a:p>
@@ -2838,71 +3111,12 @@
               <a:defRPr/>
             </a:pPr>
             <a:r>
-              <a:rPr lang="en-US" baseline="0" dirty="0" smtClean="0"/>
-              <a:t>{</a:t>
-            </a:r>
-            <a:r>
-              <a:rPr lang="ru-RU" baseline="0" dirty="0" smtClean="0"/>
-              <a:t>Контрпример </a:t>
-            </a:r>
-            <a:r>
-              <a:rPr lang="ru-RU" baseline="0" dirty="0" smtClean="0"/>
-              <a:t>– </a:t>
-            </a:r>
-            <a:r>
-              <a:rPr lang="ru-RU" baseline="0" dirty="0" err="1" smtClean="0"/>
-              <a:t>трассса</a:t>
-            </a:r>
-            <a:r>
-              <a:rPr lang="ru-RU" baseline="0" dirty="0" smtClean="0"/>
-              <a:t>, содержащая </a:t>
-            </a:r>
-            <a:r>
-              <a:rPr lang="ru-RU" baseline="0" dirty="0" smtClean="0"/>
-              <a:t>ошибку. </a:t>
-            </a:r>
-            <a:r>
-              <a:rPr lang="ru-RU" dirty="0" smtClean="0"/>
-              <a:t>Примеры </a:t>
-            </a:r>
-            <a:r>
-              <a:rPr lang="ru-RU" dirty="0" smtClean="0"/>
-              <a:t>использования: верификация системы управления дамбами в Нидерландах,</a:t>
-            </a:r>
-            <a:r>
-              <a:rPr lang="ru-RU" baseline="0" dirty="0" smtClean="0"/>
-              <a:t> верификация аэрокосмических </a:t>
-            </a:r>
-            <a:r>
-              <a:rPr lang="ru-RU" baseline="0" dirty="0" smtClean="0"/>
-              <a:t>систем</a:t>
-            </a:r>
-            <a:r>
-              <a:rPr lang="en-US" baseline="0" dirty="0" smtClean="0"/>
-              <a:t>}</a:t>
-            </a:r>
-          </a:p>
-          <a:p>
-            <a:pPr marL="0" marR="0" indent="0" algn="l" defTabSz="914400" rtl="0" eaLnBrk="1" fontAlgn="auto" latinLnBrk="0" hangingPunct="1">
-              <a:lnSpc>
-                <a:spcPct val="100000"/>
-              </a:lnSpc>
-              <a:spcBef>
-                <a:spcPts val="0"/>
-              </a:spcBef>
-              <a:spcAft>
-                <a:spcPts val="0"/>
-              </a:spcAft>
-              <a:buClrTx/>
-              <a:buSzTx/>
-              <a:buFontTx/>
-              <a:buNone/>
-              <a:tabLst/>
-              <a:defRPr/>
-            </a:pPr>
-            <a:r>
               <a:rPr lang="ru-RU" sz="1200" dirty="0" smtClean="0"/>
-              <a:t>В основе верификации лежит метод </a:t>
+              <a:t>В </a:t>
+            </a:r>
+            <a:r>
+              <a:rPr lang="ru-RU" sz="1200" dirty="0" smtClean="0"/>
+              <a:t>основе верификации лежит метод </a:t>
             </a:r>
             <a:r>
               <a:rPr lang="en-US" sz="1200" dirty="0" smtClean="0"/>
@@ -2948,16 +3162,6 @@
               <a:rPr lang="ru-RU" baseline="0" dirty="0" smtClean="0"/>
               <a:t>Программа-верификатор проверяет, что устройство системы удовлетворяет свойствам правильности</a:t>
             </a:r>
-          </a:p>
-          <a:p>
-            <a:pPr marL="228600" indent="-228600">
-              <a:buAutoNum type="arabicPeriod"/>
-            </a:pPr>
-            <a:r>
-              <a:rPr lang="ru-RU" baseline="0" dirty="0" smtClean="0"/>
-              <a:t>Выбранная нотация гарантирует разрешимость проверки любого свойства любой модели</a:t>
-            </a:r>
-            <a:endParaRPr lang="en-US" baseline="0" dirty="0" smtClean="0"/>
           </a:p>
           <a:p>
             <a:pPr marL="0" indent="0">
@@ -3066,6 +3270,92 @@
           <a:bodyPr/>
           <a:lstStyle/>
           <a:p>
+            <a:r>
+              <a:rPr lang="ru-RU" dirty="0" smtClean="0"/>
+              <a:t>Верификатор </a:t>
+            </a:r>
+            <a:r>
+              <a:rPr lang="en-US" dirty="0" smtClean="0"/>
+              <a:t>SPIN </a:t>
+            </a:r>
+            <a:r>
+              <a:rPr lang="ru-RU" dirty="0" smtClean="0"/>
+              <a:t>работает с языком автоматного программирования </a:t>
+            </a:r>
+            <a:r>
+              <a:rPr lang="en-US" dirty="0" smtClean="0"/>
+              <a:t>Promela.</a:t>
+            </a:r>
+          </a:p>
+          <a:p>
+            <a:r>
+              <a:rPr lang="ru-RU" dirty="0"/>
+              <a:t>Модель на языке </a:t>
+            </a:r>
+            <a:r>
+              <a:rPr lang="en-US" dirty="0"/>
+              <a:t>Promela</a:t>
+            </a:r>
+            <a:r>
+              <a:rPr lang="ru-RU" dirty="0"/>
+              <a:t>: абстракция реальной системы, содержащая характеристики, которые значимы для описания взаимодействия </a:t>
+            </a:r>
+            <a:r>
+              <a:rPr lang="ru-RU" dirty="0" smtClean="0"/>
+              <a:t>процессов</a:t>
+            </a:r>
+            <a:r>
+              <a:rPr lang="en-US" dirty="0" smtClean="0"/>
+              <a:t>. </a:t>
+            </a:r>
+            <a:r>
+              <a:rPr lang="ru-RU" dirty="0" smtClean="0"/>
+              <a:t>Такая модель не </a:t>
+            </a:r>
+            <a:r>
+              <a:rPr lang="ru-RU" dirty="0"/>
+              <a:t>является программной реализацией </a:t>
+            </a:r>
+            <a:r>
+              <a:rPr lang="ru-RU" dirty="0" smtClean="0"/>
+              <a:t>системы, </a:t>
+            </a:r>
+            <a:r>
+              <a:rPr lang="ru-RU" dirty="0"/>
+              <a:t>может содержать части, которые важны только для </a:t>
+            </a:r>
+            <a:r>
+              <a:rPr lang="ru-RU" dirty="0" smtClean="0"/>
+              <a:t>верификации.</a:t>
+            </a:r>
+            <a:endParaRPr lang="ru-RU" dirty="0"/>
+          </a:p>
+          <a:p>
+            <a:r>
+              <a:rPr lang="ru-RU" dirty="0"/>
+              <a:t>Поскольку способ верификации </a:t>
+            </a:r>
+            <a:r>
+              <a:rPr lang="en-US" dirty="0"/>
+              <a:t>model checking </a:t>
+            </a:r>
+            <a:r>
+              <a:rPr lang="ru-RU" dirty="0"/>
+              <a:t>сказанное означает, что у любой модели описанной с помощью языка </a:t>
+            </a:r>
+            <a:r>
+              <a:rPr lang="en-US" dirty="0"/>
+              <a:t>Promela</a:t>
+            </a:r>
+            <a:r>
+              <a:rPr lang="ru-RU" dirty="0"/>
+              <a:t> конечное число состояний. </a:t>
+            </a:r>
+          </a:p>
+          <a:p>
+            <a:endParaRPr lang="ru-RU" dirty="0" smtClean="0"/>
+          </a:p>
+          <a:p>
             <a:pPr marL="171450" indent="-171450">
               <a:buFont typeface="Arial" pitchFamily="34" charset="0"/>
               <a:buChar char="•"/>
@@ -3076,108 +3366,37 @@
             </a:r>
             <a:r>
               <a:rPr lang="ru-RU" baseline="0" dirty="0" smtClean="0"/>
-              <a:t> языке можем описывать недетерминизм. То есть его удобно использовать для абстракции от несущественных деталей. Охраняемые команды означают реализацию недетерминизма. Это значит что с каждой командой языка связано понятие выполнимости и если в </a:t>
-            </a:r>
-            <a:r>
-              <a:rPr lang="ru-RU" baseline="0" dirty="0" err="1" smtClean="0"/>
-              <a:t>определенном</a:t>
+              <a:t> </a:t>
             </a:r>
             <a:r>
               <a:rPr lang="ru-RU" baseline="0" dirty="0" smtClean="0"/>
-              <a:t> блоке модели присутствует несколько команд, выполнимых одновременно, то может быть выполнена любая из них.</a:t>
-            </a:r>
-          </a:p>
-          <a:p>
-            <a:pPr marL="171450" indent="-171450">
-              <a:buFont typeface="Arial" pitchFamily="34" charset="0"/>
-              <a:buChar char="•"/>
-            </a:pPr>
+              <a:t>языке можем описывать недетерминизм. То есть его удобно использовать для абстракции от несущественных деталей. Охраняемые команды означают реализацию недетерминизма. Это значит что с каждой командой языка связано понятие выполнимости и если в </a:t>
+            </a:r>
             <a:r>
               <a:rPr lang="ru-RU" baseline="0" dirty="0" smtClean="0"/>
-              <a:t>Поскольку способ верификации </a:t>
-            </a:r>
-            <a:r>
-              <a:rPr lang="en-US" baseline="0" dirty="0" smtClean="0"/>
-              <a:t>model checking </a:t>
+              <a:t>определ</a:t>
+            </a:r>
+            <a:r>
+              <a:rPr lang="ru-RU" dirty="0"/>
+              <a:t>ё</a:t>
             </a:r>
             <a:r>
               <a:rPr lang="ru-RU" baseline="0" dirty="0" smtClean="0"/>
-              <a:t>сказанное означает, что у любой модели описанной с помощью языка </a:t>
-            </a:r>
-            <a:r>
-              <a:rPr lang="en-US" baseline="0" dirty="0" smtClean="0"/>
-              <a:t>Promela</a:t>
+              <a:t>нном </a:t>
             </a:r>
             <a:r>
               <a:rPr lang="ru-RU" baseline="0" dirty="0" smtClean="0"/>
-              <a:t> конечное число состояний. За </a:t>
-            </a:r>
-            <a:r>
-              <a:rPr lang="ru-RU" baseline="0" dirty="0" err="1" smtClean="0"/>
-              <a:t>счет</a:t>
-            </a:r>
-            <a:r>
-              <a:rPr lang="ru-RU" baseline="0" dirty="0" smtClean="0"/>
-              <a:t> чего это достигается мы увидим дальше.</a:t>
-            </a:r>
-            <a:endParaRPr lang="ru-RU" dirty="0" smtClean="0"/>
-          </a:p>
-          <a:p>
-            <a:pPr marL="171450" indent="-171450">
-              <a:buFont typeface="Arial" pitchFamily="34" charset="0"/>
-              <a:buChar char="•"/>
-            </a:pPr>
-            <a:endParaRPr lang="ru-RU" dirty="0" smtClean="0"/>
+              <a:t>блоке модели присутствует несколько команд, выполнимых одновременно, то может быть выполнена любая из них.</a:t>
+            </a:r>
           </a:p>
           <a:p>
             <a:r>
               <a:rPr lang="ru-RU" dirty="0" smtClean="0"/>
-              <a:t>Модель на языке </a:t>
-            </a:r>
-            <a:r>
-              <a:rPr lang="en-US" dirty="0" smtClean="0"/>
-              <a:t>Promela</a:t>
+              <a:t> </a:t>
             </a:r>
             <a:r>
               <a:rPr lang="ru-RU" dirty="0" smtClean="0"/>
-              <a:t>: </a:t>
-            </a:r>
-            <a:r>
-              <a:rPr lang="ru-RU" sz="1200" dirty="0" smtClean="0"/>
-              <a:t>абстракция реальной системы, содержащая характеристики, которые значимы для описания взаимодействия процессов</a:t>
-            </a:r>
-          </a:p>
-          <a:p>
-            <a:r>
-              <a:rPr lang="ru-RU" sz="1200" dirty="0" smtClean="0"/>
-              <a:t>не является программной реализацией системы</a:t>
-            </a:r>
-          </a:p>
-          <a:p>
-            <a:r>
-              <a:rPr lang="ru-RU" sz="1200" dirty="0" smtClean="0"/>
-              <a:t>может содержать части, которые важны только для верификации протоколов</a:t>
-            </a:r>
-            <a:endParaRPr lang="en-US" sz="1200" dirty="0" smtClean="0"/>
-          </a:p>
-          <a:p>
-            <a:r>
-              <a:rPr lang="ru-RU" dirty="0" smtClean="0"/>
-              <a:t>Promela включает примитивы для создания процессов и описания </a:t>
-            </a:r>
-            <a:r>
-              <a:rPr lang="ru-RU" dirty="0" err="1" smtClean="0"/>
-              <a:t>межпроцессного</a:t>
-            </a:r>
-            <a:r>
-              <a:rPr lang="ru-RU" dirty="0" smtClean="0"/>
-              <a:t> взаимодействия</a:t>
-            </a:r>
-          </a:p>
-          <a:p>
-            <a:r>
-              <a:rPr lang="ru-RU" dirty="0" smtClean="0"/>
-              <a:t> НО! в нем отсутствует ряд средств, которые есть в языках программирования высокого уровня </a:t>
+              <a:t>НО! в нем отсутствует ряд средств, которые есть в языках программирования высокого уровня </a:t>
             </a:r>
           </a:p>
           <a:p>
@@ -3277,7 +3496,27 @@
           <a:p>
             <a:r>
               <a:rPr lang="ru-RU" dirty="0" smtClean="0"/>
-              <a:t>ПРОБЛЕМА: Полнота спецификации – охватывают</a:t>
+              <a:t>Для описани</a:t>
+            </a:r>
+            <a:r>
+              <a:rPr lang="ru-RU" dirty="0" smtClean="0"/>
+              <a:t>я требований, предъявляемых к модели прототипа, используются формулы темпоральной логики. Особенность этого типа логики заключается в возможности описания поведения системы во времени.</a:t>
+            </a:r>
+          </a:p>
+          <a:p>
+            <a:r>
+              <a:rPr lang="ru-RU" dirty="0" smtClean="0"/>
+              <a:t> </a:t>
+            </a:r>
+          </a:p>
+          <a:p>
+            <a:r>
+              <a:rPr lang="ru-RU" dirty="0" smtClean="0"/>
+              <a:t>ПРОБЛЕМА</a:t>
+            </a:r>
+            <a:r>
+              <a:rPr lang="ru-RU" dirty="0" smtClean="0"/>
+              <a:t>: Полнота спецификации – охватывают</a:t>
             </a:r>
             <a:r>
               <a:rPr lang="ru-RU" baseline="0" dirty="0" smtClean="0"/>
@@ -3444,19 +3683,100 @@
               </a:rPr>
               <a:t>. </a:t>
             </a:r>
+            <a:endParaRPr lang="ru-RU" sz="1200" kern="1200" dirty="0" smtClean="0">
+              <a:solidFill>
+                <a:schemeClr val="tx1"/>
+              </a:solidFill>
+              <a:effectLst/>
+              <a:latin typeface="+mn-lt"/>
+              <a:ea typeface="+mn-ea"/>
+              <a:cs typeface="+mn-cs"/>
+            </a:endParaRPr>
+          </a:p>
+          <a:p>
+            <a:pPr marL="0" marR="0" indent="0" algn="l" defTabSz="914400" rtl="0" eaLnBrk="1" fontAlgn="auto" latinLnBrk="0" hangingPunct="1">
+              <a:lnSpc>
+                <a:spcPct val="100000"/>
+              </a:lnSpc>
+              <a:spcBef>
+                <a:spcPts val="0"/>
+              </a:spcBef>
+              <a:spcAft>
+                <a:spcPts val="0"/>
+              </a:spcAft>
+              <a:buClrTx/>
+              <a:buSzTx/>
+              <a:buFontTx/>
+              <a:buNone/>
+              <a:tabLst/>
+              <a:defRPr/>
+            </a:pPr>
+            <a:r>
+              <a:rPr lang="ru-RU" dirty="0" smtClean="0"/>
+              <a:t>Для того, чтобы описать прототип архитектуры в процессе дипломного проектирования был разработан специализированный язык описания моделей прототипов. Назов</a:t>
+            </a:r>
+            <a:r>
+              <a:rPr lang="ru-RU" dirty="0"/>
+              <a:t>ё</a:t>
+            </a:r>
+            <a:r>
+              <a:rPr lang="ru-RU" dirty="0" smtClean="0"/>
+              <a:t>м этот язык </a:t>
+            </a:r>
+            <a:r>
+              <a:rPr lang="en-US" dirty="0" smtClean="0"/>
+              <a:t>PROTO. </a:t>
+            </a:r>
+            <a:endParaRPr lang="ru-RU" sz="1200" kern="1200" dirty="0" smtClean="0">
+              <a:solidFill>
+                <a:schemeClr val="tx1"/>
+              </a:solidFill>
+              <a:effectLst/>
+              <a:latin typeface="+mn-lt"/>
+              <a:ea typeface="+mn-ea"/>
+              <a:cs typeface="+mn-cs"/>
+            </a:endParaRPr>
           </a:p>
           <a:p>
             <a:r>
               <a:rPr lang="ru-RU" baseline="0" dirty="0" smtClean="0"/>
-              <a:t>В качестве входных данных система принимает описание прототипа архитектуры с использованием специализированного языка описания прототипов архитектур. В качестве выходных данных система </a:t>
-            </a:r>
-            <a:r>
-              <a:rPr lang="ru-RU" baseline="0" dirty="0" err="1" smtClean="0"/>
-              <a:t>отдает</a:t>
+              <a:t>Таким образом, в </a:t>
             </a:r>
             <a:r>
               <a:rPr lang="ru-RU" baseline="0" dirty="0" smtClean="0"/>
-              <a:t> представление исходного прототипа на целевом языке автоматного программирования.</a:t>
+              <a:t>качестве входных данных система принимает описание прототипа архитектуры с использованием </a:t>
+            </a:r>
+            <a:r>
+              <a:rPr lang="ru-RU" baseline="0" dirty="0" smtClean="0"/>
+              <a:t>языка </a:t>
+            </a:r>
+            <a:r>
+              <a:rPr lang="en-US" baseline="0" dirty="0" smtClean="0"/>
+              <a:t>PROTO</a:t>
+            </a:r>
+            <a:r>
+              <a:rPr lang="ru-RU" baseline="0" dirty="0" smtClean="0"/>
+              <a:t>. </a:t>
+            </a:r>
+            <a:r>
+              <a:rPr lang="ru-RU" baseline="0" dirty="0" smtClean="0"/>
+              <a:t>В качестве выходных данных система </a:t>
+            </a:r>
+            <a:r>
+              <a:rPr lang="ru-RU" baseline="0" dirty="0" smtClean="0"/>
+              <a:t>отда</a:t>
+            </a:r>
+            <a:r>
+              <a:rPr lang="ru-RU" dirty="0"/>
+              <a:t>ё</a:t>
+            </a:r>
+            <a:r>
+              <a:rPr lang="ru-RU" baseline="0" dirty="0" smtClean="0"/>
+              <a:t>т </a:t>
+            </a:r>
+            <a:r>
+              <a:rPr lang="ru-RU" baseline="0" dirty="0" smtClean="0"/>
+              <a:t>представление исходного прототипа на целевом языке автоматного программирования.</a:t>
             </a:r>
           </a:p>
         </p:txBody>
@@ -3689,7 +4009,7 @@
           <a:p>
             <a:fld id="{552675F8-BD14-4374-B02F-E97046C6A1D8}" type="datetime1">
               <a:rPr lang="ru-RU" smtClean="0"/>
-              <a:t>12.06.2012</a:t>
+              <a:t>16.06.2012</a:t>
             </a:fld>
             <a:endParaRPr lang="ru-RU"/>
           </a:p>
@@ -3854,7 +4174,7 @@
           <a:p>
             <a:fld id="{13305062-1292-4A0A-901B-840835479DE3}" type="datetime1">
               <a:rPr lang="ru-RU" smtClean="0"/>
-              <a:t>12.06.2012</a:t>
+              <a:t>16.06.2012</a:t>
             </a:fld>
             <a:endParaRPr lang="ru-RU"/>
           </a:p>
@@ -4029,7 +4349,7 @@
           <a:p>
             <a:fld id="{A5E6030C-CC2F-4B88-9E22-1301D15C6E18}" type="datetime1">
               <a:rPr lang="ru-RU" smtClean="0"/>
-              <a:t>12.06.2012</a:t>
+              <a:t>16.06.2012</a:t>
             </a:fld>
             <a:endParaRPr lang="ru-RU"/>
           </a:p>
@@ -4212,7 +4532,7 @@
           <a:p>
             <a:fld id="{0A0FAE21-78CF-42F8-87C9-7DD460720D76}" type="datetime1">
               <a:rPr lang="ru-RU" smtClean="0"/>
-              <a:t>12.06.2012</a:t>
+              <a:t>16.06.2012</a:t>
             </a:fld>
             <a:endParaRPr lang="ru-RU"/>
           </a:p>
@@ -4474,7 +4794,7 @@
           <a:p>
             <a:fld id="{18F12A8A-6C04-42EC-B5A1-B4AFF8CBAF88}" type="datetime1">
               <a:rPr lang="ru-RU" smtClean="0"/>
-              <a:t>12.06.2012</a:t>
+              <a:t>16.06.2012</a:t>
             </a:fld>
             <a:endParaRPr lang="ru-RU"/>
           </a:p>
@@ -4822,7 +5142,7 @@
           <a:p>
             <a:fld id="{19CFC13F-C6B8-4F7A-A899-3C34CBE9DBBB}" type="datetime1">
               <a:rPr lang="ru-RU" smtClean="0"/>
-              <a:t>12.06.2012</a:t>
+              <a:t>16.06.2012</a:t>
             </a:fld>
             <a:endParaRPr lang="ru-RU"/>
           </a:p>
@@ -5130,7 +5450,7 @@
           <a:p>
             <a:fld id="{369881D4-64C9-4E16-B703-8323AC55B24A}" type="datetime1">
               <a:rPr lang="ru-RU" smtClean="0"/>
-              <a:t>12.06.2012</a:t>
+              <a:t>16.06.2012</a:t>
             </a:fld>
             <a:endParaRPr lang="ru-RU"/>
           </a:p>
@@ -5357,7 +5677,7 @@
           <a:p>
             <a:fld id="{B390CDAC-3E70-4C31-AE15-3B712A8B5CDB}" type="datetime1">
               <a:rPr lang="ru-RU" smtClean="0"/>
-              <a:t>12.06.2012</a:t>
+              <a:t>16.06.2012</a:t>
             </a:fld>
             <a:endParaRPr lang="ru-RU"/>
           </a:p>
@@ -5447,7 +5767,7 @@
           <a:p>
             <a:fld id="{ACB1905C-D82E-41CE-9D44-986AF8D5825C}" type="datetime1">
               <a:rPr lang="ru-RU" smtClean="0"/>
-              <a:t>12.06.2012</a:t>
+              <a:t>16.06.2012</a:t>
             </a:fld>
             <a:endParaRPr lang="ru-RU"/>
           </a:p>
@@ -5735,7 +6055,7 @@
           <a:p>
             <a:fld id="{B95BD760-218D-4ADE-BF67-3949E0E07828}" type="datetime1">
               <a:rPr lang="ru-RU" smtClean="0"/>
-              <a:t>12.06.2012</a:t>
+              <a:t>16.06.2012</a:t>
             </a:fld>
             <a:endParaRPr lang="ru-RU"/>
           </a:p>
@@ -6004,7 +6324,7 @@
           <a:p>
             <a:fld id="{F10398F0-CE1C-454F-A887-B107A33F827E}" type="datetime1">
               <a:rPr lang="ru-RU" smtClean="0"/>
-              <a:t>12.06.2012</a:t>
+              <a:t>16.06.2012</a:t>
             </a:fld>
             <a:endParaRPr lang="ru-RU"/>
           </a:p>
@@ -6214,7 +6534,7 @@
           <a:p>
             <a:fld id="{5C0B48E2-D838-453B-B855-F590F6E7746E}" type="datetime1">
               <a:rPr lang="ru-RU" smtClean="0"/>
-              <a:t>12.06.2012</a:t>
+              <a:t>16.06.2012</a:t>
             </a:fld>
             <a:endParaRPr lang="ru-RU"/>
           </a:p>
@@ -7091,8 +7411,8 @@
         </p:blipFill>
         <p:spPr>
           <a:xfrm>
-            <a:off x="395536" y="2890876"/>
-            <a:ext cx="8229600" cy="3562460"/>
+            <a:off x="395536" y="2917304"/>
+            <a:ext cx="8229600" cy="3509604"/>
           </a:xfrm>
         </p:spPr>
       </p:pic>
@@ -7286,11 +7606,7 @@
             </a:r>
             <a:r>
               <a:rPr lang="ru-RU" dirty="0" smtClean="0"/>
-              <a:t>рамматика языка описания моделей </a:t>
-            </a:r>
-            <a:r>
-              <a:rPr lang="ru-RU" dirty="0" smtClean="0"/>
-              <a:t>прототипов</a:t>
+              <a:t>рамматика языка описания моделей прототипов</a:t>
             </a:r>
             <a:r>
               <a:rPr lang="en-US" dirty="0" smtClean="0"/>
@@ -7374,11 +7690,7 @@
           <a:p>
             <a:r>
               <a:rPr lang="ru-RU" dirty="0" smtClean="0"/>
-              <a:t>Подсистема построения </a:t>
-            </a:r>
-            <a:r>
-              <a:rPr lang="ru-RU" dirty="0" smtClean="0"/>
-              <a:t>графа потока исполнения</a:t>
+              <a:t>Подсистема построения графа потока исполнения</a:t>
             </a:r>
             <a:endParaRPr lang="ru-RU" dirty="0"/>
           </a:p>
@@ -7429,15 +7741,7 @@
             <a:pPr lvl="1"/>
             <a:r>
               <a:rPr lang="ru-RU" sz="1800" dirty="0" smtClean="0"/>
-              <a:t>Начальное</a:t>
-            </a:r>
-            <a:r>
-              <a:rPr lang="ru-RU" sz="1800" dirty="0" smtClean="0"/>
-              <a:t> </a:t>
-            </a:r>
-            <a:r>
-              <a:rPr lang="ru-RU" sz="1800" dirty="0" smtClean="0"/>
-              <a:t>– </a:t>
+              <a:t>Начальное – </a:t>
             </a:r>
             <a:r>
               <a:rPr lang="en-US" sz="1800" dirty="0" smtClean="0"/>
@@ -7448,11 +7752,7 @@
             <a:pPr lvl="1"/>
             <a:r>
               <a:rPr lang="ru-RU" sz="1800" dirty="0" smtClean="0"/>
-              <a:t>Конечное </a:t>
-            </a:r>
-            <a:r>
-              <a:rPr lang="ru-RU" sz="1800" dirty="0" smtClean="0"/>
-              <a:t>– </a:t>
+              <a:t>Конечное – </a:t>
             </a:r>
             <a:r>
               <a:rPr lang="en-US" sz="1800" dirty="0" smtClean="0"/>
@@ -7695,11 +7995,7 @@
             </a:r>
             <a:r>
               <a:rPr lang="ru-RU" dirty="0" smtClean="0"/>
-              <a:t>формула) преобразуется </a:t>
-            </a:r>
-            <a:r>
-              <a:rPr lang="ru-RU" dirty="0" smtClean="0"/>
-              <a:t>к виду, понятному </a:t>
+              <a:t>формула) преобразуется к виду, понятному </a:t>
             </a:r>
             <a:r>
               <a:rPr lang="en-US" dirty="0" smtClean="0"/>
@@ -7710,15 +8006,7 @@
           <a:p>
             <a:r>
               <a:rPr lang="ru-RU" dirty="0" smtClean="0"/>
-              <a:t>Для </a:t>
-            </a:r>
-            <a:r>
-              <a:rPr lang="ru-RU" dirty="0" smtClean="0"/>
-              <a:t>каждого требования спецификации с </a:t>
-            </a:r>
-            <a:r>
-              <a:rPr lang="ru-RU" dirty="0" smtClean="0"/>
-              <a:t>помощью </a:t>
+              <a:t>Для каждого требования спецификации с помощью </a:t>
             </a:r>
             <a:r>
               <a:rPr lang="en-US" dirty="0" smtClean="0"/>
@@ -10435,13 +10723,7 @@
               <a:rPr lang="ru-RU" sz="2000" dirty="0" smtClean="0">
                 <a:latin typeface="+mn-lt"/>
               </a:rPr>
-              <a:t>подсистемы построения </a:t>
-            </a:r>
-            <a:r>
-              <a:rPr lang="ru-RU" sz="2000" dirty="0" smtClean="0">
-                <a:latin typeface="+mn-lt"/>
-              </a:rPr>
-              <a:t>графа потока исполнения</a:t>
+              <a:t>подсистемы построения графа потока исполнения</a:t>
             </a:r>
             <a:endParaRPr lang="en-US" sz="2000" dirty="0" smtClean="0">
               <a:latin typeface="+mn-lt"/>
@@ -11575,8 +11857,8 @@
           <a:chExt cx="0" cy="0"/>
         </a:xfrm>
       </p:grpSpPr>
-      <mc:AlternateContent xmlns:mc="http://schemas.openxmlformats.org/markup-compatibility/2006">
-        <mc:Choice xmlns:a14="http://schemas.microsoft.com/office/drawing/2010/main" Requires="a14">
+      <mc:AlternateContent xmlns:mc="http://schemas.openxmlformats.org/markup-compatibility/2006" xmlns:a14="http://schemas.microsoft.com/office/drawing/2010/main">
+        <mc:Choice Requires="a14">
           <p:sp>
             <p:nvSpPr>
               <p:cNvPr id="3" name="Объект 2"/>
@@ -11762,7 +12044,7 @@
             </p:txBody>
           </p:sp>
         </mc:Choice>
-        <mc:Fallback>
+        <mc:Fallback xmlns="">
           <p:sp>
             <p:nvSpPr>
               <p:cNvPr id="3" name="Объект 2"/>
@@ -12358,9 +12640,32 @@
           </a:p>
         </p:txBody>
       </p:sp>
+      <p:sp>
+        <p:nvSpPr>
+          <p:cNvPr id="3" name="Номер слайда 2"/>
+          <p:cNvSpPr>
+            <a:spLocks noGrp="1"/>
+          </p:cNvSpPr>
+          <p:nvPr>
+            <p:ph type="sldNum" sz="quarter" idx="12"/>
+          </p:nvPr>
+        </p:nvSpPr>
+        <p:spPr/>
+        <p:txBody>
+          <a:bodyPr/>
+          <a:lstStyle/>
+          <a:p>
+            <a:fld id="{0119AA8D-81DD-40BD-8E0C-7D93F639C7BB}" type="slidenum">
+              <a:rPr lang="ru-RU" smtClean="0"/>
+              <a:t>5</a:t>
+            </a:fld>
+            <a:endParaRPr lang="ru-RU"/>
+          </a:p>
+        </p:txBody>
+      </p:sp>
       <p:pic>
         <p:nvPicPr>
-          <p:cNvPr id="19" name="Объект 18"/>
+          <p:cNvPr id="8" name="Объект 7"/>
           <p:cNvPicPr>
             <a:picLocks noGrp="1" noChangeAspect="1"/>
           </p:cNvPicPr>
@@ -12382,34 +12687,11 @@
         </p:blipFill>
         <p:spPr>
           <a:xfrm>
-            <a:off x="1631123" y="1124744"/>
-            <a:ext cx="5951627" cy="5328592"/>
+            <a:off x="1492274" y="1052736"/>
+            <a:ext cx="6032054" cy="5400600"/>
           </a:xfrm>
         </p:spPr>
       </p:pic>
-      <p:sp>
-        <p:nvSpPr>
-          <p:cNvPr id="3" name="Номер слайда 2"/>
-          <p:cNvSpPr>
-            <a:spLocks noGrp="1"/>
-          </p:cNvSpPr>
-          <p:nvPr>
-            <p:ph type="sldNum" sz="quarter" idx="12"/>
-          </p:nvPr>
-        </p:nvSpPr>
-        <p:spPr/>
-        <p:txBody>
-          <a:bodyPr/>
-          <a:lstStyle/>
-          <a:p>
-            <a:fld id="{0119AA8D-81DD-40BD-8E0C-7D93F639C7BB}" type="slidenum">
-              <a:rPr lang="ru-RU" smtClean="0"/>
-              <a:t>5</a:t>
-            </a:fld>
-            <a:endParaRPr lang="ru-RU"/>
-          </a:p>
-        </p:txBody>
-      </p:sp>
     </p:spTree>
     <p:extLst>
       <p:ext uri="{BB962C8B-B14F-4D97-AF65-F5344CB8AC3E}">
@@ -12854,7 +13136,7 @@
         <p:spPr>
           <a:xfrm>
             <a:off x="3861203" y="836712"/>
-            <a:ext cx="5247301" cy="5624117"/>
+            <a:ext cx="5247301" cy="5624116"/>
           </a:xfrm>
           <a:prstGeom prst="rect">
             <a:avLst/>
@@ -13183,7 +13465,7 @@
         <p:spPr>
           <a:xfrm>
             <a:off x="3861203" y="836712"/>
-            <a:ext cx="5247301" cy="5624117"/>
+            <a:ext cx="5247301" cy="5624116"/>
           </a:xfrm>
           <a:prstGeom prst="rect">
             <a:avLst/>

</xml_diff>

<commit_message>
Prepare speech for tomorrow
</commit_message>
<xml_diff>
--- a/shatilina.pptx
+++ b/shatilina.pptx
@@ -208,7 +208,7 @@
           <a:p>
             <a:fld id="{FDBFA82E-57DB-4151-B406-A26D33A7B30A}" type="datetimeFigureOut">
               <a:rPr lang="ru-RU" smtClean="0"/>
-              <a:t>16.06.2012</a:t>
+              <a:t>18.06.2012</a:t>
             </a:fld>
             <a:endParaRPr lang="ru-RU"/>
           </a:p>
@@ -688,31 +688,7 @@
                 <a:ea typeface="+mn-ea"/>
                 <a:cs typeface="+mn-cs"/>
               </a:rPr>
-              <a:t>и </a:t>
-            </a:r>
-            <a:r>
-              <a:rPr lang="ru-RU" sz="1200" kern="1200" baseline="0" dirty="0" smtClean="0">
-                <a:solidFill>
-                  <a:schemeClr val="tx1"/>
-                </a:solidFill>
-                <a:effectLst/>
-                <a:latin typeface="+mn-lt"/>
-                <a:ea typeface="+mn-ea"/>
-                <a:cs typeface="+mn-cs"/>
-              </a:rPr>
-              <a:t>построение абстрактного синтаксического дерева, соответствующего исходному прототипу архитектуры</a:t>
-            </a:r>
-            <a:r>
-              <a:rPr lang="ru-RU" sz="1200" kern="1200" baseline="0" dirty="0" smtClean="0">
-                <a:solidFill>
-                  <a:schemeClr val="tx1"/>
-                </a:solidFill>
-                <a:effectLst/>
-                <a:latin typeface="+mn-lt"/>
-                <a:ea typeface="+mn-ea"/>
-                <a:cs typeface="+mn-cs"/>
-              </a:rPr>
-              <a:t>.</a:t>
+              <a:t>и построение абстрактного синтаксического дерева, соответствующего исходному прототипу архитектуры.</a:t>
             </a:r>
             <a:endParaRPr lang="en-US" sz="1200" kern="1200" baseline="0" dirty="0" smtClean="0">
               <a:solidFill>
@@ -859,11 +835,7 @@
             </a:r>
             <a:r>
               <a:rPr lang="ru-RU" baseline="0" dirty="0" smtClean="0"/>
-              <a:t> информации, содержащейся в абстрактном синтаксическом </a:t>
-            </a:r>
-            <a:r>
-              <a:rPr lang="ru-RU" baseline="0" dirty="0" smtClean="0"/>
-              <a:t>дереве. Грамматика языка обеспечивает описание узлов графа и направленных дуг, соответствующих условиям перехода. Эти свойства отражаются в абстрактном синтаксическом дереве,</a:t>
+              <a:t> информации, содержащейся в абстрактном синтаксическом дереве. Грамматика языка обеспечивает описание узлов графа и направленных дуг, соответствующих условиям перехода. Эти свойства отражаются в абстрактном синтаксическом дереве,</a:t>
             </a:r>
             <a:r>
               <a:rPr lang="ru-RU" dirty="0" smtClean="0"/>
@@ -871,13 +843,8 @@
             </a:r>
             <a:r>
               <a:rPr lang="ru-RU" baseline="0" dirty="0" smtClean="0"/>
-              <a:t>в </a:t>
-            </a:r>
-            <a:r>
-              <a:rPr lang="ru-RU" baseline="0" dirty="0" smtClean="0"/>
-              <a:t>более удобную с точки зрения автоматных языков форму – граф потока исполнения. </a:t>
-            </a:r>
-            <a:endParaRPr lang="ru-RU" baseline="0" dirty="0" smtClean="0"/>
+              <a:t>в более удобную с точки зрения автоматных языков форму – граф потока исполнения. </a:t>
+            </a:r>
           </a:p>
           <a:p>
             <a:r>
@@ -889,15 +856,7 @@
           <a:p>
             <a:r>
               <a:rPr lang="ru-RU" baseline="0" dirty="0" smtClean="0"/>
-              <a:t>При </a:t>
-            </a:r>
-            <a:r>
-              <a:rPr lang="ru-RU" baseline="0" dirty="0" smtClean="0"/>
-              <a:t>построении такого графа для каждому узлу ставится в соответствие состояние в исходной модели, а каждой инструкции перехода между состояниями соответствует ребро между состояниями</a:t>
-            </a:r>
-            <a:r>
-              <a:rPr lang="ru-RU" baseline="0" dirty="0" smtClean="0"/>
-              <a:t>.</a:t>
+              <a:t>При построении такого графа для каждому узлу ставится в соответствие состояние в исходной модели, а каждой инструкции перехода между состояниями соответствует ребро между состояниями.</a:t>
             </a:r>
             <a:endParaRPr lang="ru-RU" dirty="0"/>
           </a:p>
@@ -1003,38 +962,12 @@
             </a:r>
             <a:r>
               <a:rPr lang="en-US" baseline="0" dirty="0" smtClean="0"/>
-              <a:t>SPIN. </a:t>
-            </a:r>
-            <a:r>
-              <a:rPr lang="ru-RU" dirty="0" smtClean="0"/>
-              <a:t>Для</a:t>
-            </a:r>
-            <a:r>
-              <a:rPr lang="ru-RU" baseline="0" dirty="0" smtClean="0"/>
-              <a:t> каждого преобразованного требования спецификации модели прототипа, представленного в виде формулы темпоральной логики верификатором </a:t>
+              <a:t>SPIN</a:t>
             </a:r>
             <a:r>
               <a:rPr lang="en-US" baseline="0" dirty="0" smtClean="0"/>
-              <a:t>SPIN </a:t>
-            </a:r>
-            <a:r>
-              <a:rPr lang="ru-RU" baseline="0" dirty="0" smtClean="0"/>
-              <a:t>генерируется специального вида конструкция </a:t>
-            </a:r>
-            <a:r>
-              <a:rPr lang="en-US" baseline="0" dirty="0" smtClean="0"/>
-              <a:t>never claim, </a:t>
-            </a:r>
-            <a:r>
-              <a:rPr lang="ru-RU" baseline="0" dirty="0" smtClean="0"/>
-              <a:t>которая представляет собой автомат Бюхи, записанный на языке промела</a:t>
-            </a:r>
-            <a:r>
-              <a:rPr lang="ru-RU" baseline="0" dirty="0" smtClean="0"/>
               <a:t>.</a:t>
             </a:r>
-          </a:p>
-          <a:p>
             <a:endParaRPr lang="ru-RU" dirty="0"/>
           </a:p>
           <a:p>
@@ -1288,21 +1221,13 @@
           <a:p>
             <a:r>
               <a:rPr lang="ru-RU" dirty="0" smtClean="0"/>
-              <a:t>Во время дипломного проектирования были разработаны визуальные средства, </a:t>
-            </a:r>
+              <a:t>Во время дипломного проектирования были разработаны визуальные средства, помогающие разработчику создавать описания проектируемых систем. </a:t>
+            </a:r>
+          </a:p>
+          <a:p>
             <a:r>
               <a:rPr lang="ru-RU" dirty="0" smtClean="0"/>
-              <a:t>помогающие разработчику создавать описания проектируемых систем. </a:t>
-            </a:r>
-          </a:p>
-          <a:p>
-            <a:r>
-              <a:rPr lang="ru-RU" dirty="0" smtClean="0"/>
-              <a:t>Был </a:t>
-            </a:r>
-            <a:r>
-              <a:rPr lang="ru-RU" dirty="0" smtClean="0"/>
-              <a:t>реализован плагин для среды разработки </a:t>
+              <a:t>Был реализован плагин для среды разработки </a:t>
             </a:r>
             <a:r>
               <a:rPr lang="en-US" dirty="0" smtClean="0"/>
@@ -1451,17 +1376,32 @@
                 <a:ea typeface="+mn-ea"/>
                 <a:cs typeface="+mn-cs"/>
               </a:rPr>
-              <a:t> На базе модели спроектирована архитектура системы. На основе формализованной модели был спроектирован и реализован каркас системы проектирования и тестирования прототипов архитектур, с применением современных подходов и технологий программирования. </a:t>
-            </a:r>
-            <a:endParaRPr lang="ru-RU" sz="1200" kern="1200" dirty="0" smtClean="0">
-              <a:solidFill>
-                <a:schemeClr val="tx1"/>
-              </a:solidFill>
-              <a:effectLst/>
-              <a:latin typeface="+mn-lt"/>
-              <a:ea typeface="+mn-ea"/>
-              <a:cs typeface="+mn-cs"/>
-            </a:endParaRPr>
+              <a:t> На базе модели спроектирована архитектура системы. На основе формализованной модели был спроектирован и реализован каркас системы проектирования и тестирования прототипов </a:t>
+            </a:r>
+            <a:r>
+              <a:rPr lang="ru-RU" sz="1200" kern="1200" dirty="0" smtClean="0">
+                <a:solidFill>
+                  <a:schemeClr val="tx1"/>
+                </a:solidFill>
+                <a:effectLst/>
+                <a:latin typeface="+mn-lt"/>
+                <a:ea typeface="+mn-ea"/>
+                <a:cs typeface="+mn-cs"/>
+              </a:rPr>
+              <a:t>архитектур </a:t>
+            </a:r>
+            <a:r>
+              <a:rPr lang="ru-RU" sz="1200" kern="1200" dirty="0" smtClean="0">
+                <a:solidFill>
+                  <a:schemeClr val="tx1"/>
+                </a:solidFill>
+                <a:effectLst/>
+                <a:latin typeface="+mn-lt"/>
+                <a:ea typeface="+mn-ea"/>
+                <a:cs typeface="+mn-cs"/>
+              </a:rPr>
+              <a:t>с применением современных подходов и технологий программирования. </a:t>
+            </a:r>
           </a:p>
           <a:p>
             <a:pPr marL="0" marR="0" indent="0" algn="l" defTabSz="914400" rtl="0" eaLnBrk="1" fontAlgn="auto" latinLnBrk="0" hangingPunct="1">
@@ -1483,15 +1423,7 @@
             </a:pPr>
             <a:r>
               <a:rPr lang="ru-RU" dirty="0" smtClean="0"/>
-              <a:t>Также был реализован редактор для </a:t>
-            </a:r>
-            <a:r>
-              <a:rPr lang="ru-RU" dirty="0" smtClean="0"/>
-              <a:t>работы с </a:t>
-            </a:r>
-            <a:r>
-              <a:rPr lang="ru-RU" dirty="0" smtClean="0"/>
-              <a:t>языком </a:t>
+              <a:t>Также был реализован редактор для работы с языком </a:t>
             </a:r>
             <a:r>
               <a:rPr lang="en-US" dirty="0" smtClean="0"/>
@@ -1687,8 +1619,10 @@
                 <a:ea typeface="+mn-ea"/>
                 <a:cs typeface="+mn-cs"/>
               </a:rPr>
-              <a:t>Можно </a:t>
-            </a:r>
+              <a:t>Можно выделить следующие пути развития проекта. </a:t>
+            </a:r>
+          </a:p>
+          <a:p>
             <a:r>
               <a:rPr lang="ru-RU" sz="1200" kern="1200" dirty="0" smtClean="0">
                 <a:solidFill>
@@ -1699,12 +1633,10 @@
                 <a:ea typeface="+mn-ea"/>
                 <a:cs typeface="+mn-cs"/>
               </a:rPr>
-              <a:t>выделить следующие пути развития проекта. </a:t>
-            </a:r>
-          </a:p>
-          <a:p>
-            <a:r>
-              <a:rPr lang="ru-RU" sz="1200" kern="1200" dirty="0" smtClean="0">
+              <a:t>Во-первых, для расширения возможностей</a:t>
+            </a:r>
+            <a:r>
+              <a:rPr lang="ru-RU" sz="1200" kern="1200" baseline="0" dirty="0" smtClean="0">
                 <a:solidFill>
                   <a:schemeClr val="tx1"/>
                 </a:solidFill>
@@ -1713,7 +1645,7 @@
                 <a:ea typeface="+mn-ea"/>
                 <a:cs typeface="+mn-cs"/>
               </a:rPr>
-              <a:t>Во-первых, </a:t>
+              <a:t> системы</a:t>
             </a:r>
             <a:r>
               <a:rPr lang="ru-RU" sz="1200" kern="1200" dirty="0" smtClean="0">
@@ -1725,10 +1657,10 @@
                 <a:ea typeface="+mn-ea"/>
                 <a:cs typeface="+mn-cs"/>
               </a:rPr>
-              <a:t>для </a:t>
-            </a:r>
-            <a:r>
-              <a:rPr lang="ru-RU" sz="1200" kern="1200" dirty="0" smtClean="0">
+              <a:t> требуется добавить</a:t>
+            </a:r>
+            <a:r>
+              <a:rPr lang="ru-RU" sz="1200" kern="1200" baseline="0" dirty="0" smtClean="0">
                 <a:solidFill>
                   <a:schemeClr val="tx1"/>
                 </a:solidFill>
@@ -1737,7 +1669,11 @@
                 <a:ea typeface="+mn-ea"/>
                 <a:cs typeface="+mn-cs"/>
               </a:rPr>
-              <a:t>расширения возможностей</a:t>
+              <a:t> поддержку верификации распредел</a:t>
+            </a:r>
+            <a:r>
+              <a:rPr lang="ru-RU" dirty="0"/>
+              <a:t>ё</a:t>
             </a:r>
             <a:r>
               <a:rPr lang="ru-RU" sz="1200" kern="1200" baseline="0" dirty="0" smtClean="0">
@@ -1749,71 +1685,7 @@
                 <a:ea typeface="+mn-ea"/>
                 <a:cs typeface="+mn-cs"/>
               </a:rPr>
-              <a:t> системы</a:t>
-            </a:r>
-            <a:r>
-              <a:rPr lang="ru-RU" sz="1200" kern="1200" dirty="0" smtClean="0">
-                <a:solidFill>
-                  <a:schemeClr val="tx1"/>
-                </a:solidFill>
-                <a:effectLst/>
-                <a:latin typeface="+mn-lt"/>
-                <a:ea typeface="+mn-ea"/>
-                <a:cs typeface="+mn-cs"/>
-              </a:rPr>
-              <a:t> требуется добавить</a:t>
-            </a:r>
-            <a:r>
-              <a:rPr lang="ru-RU" sz="1200" kern="1200" baseline="0" dirty="0" smtClean="0">
-                <a:solidFill>
-                  <a:schemeClr val="tx1"/>
-                </a:solidFill>
-                <a:effectLst/>
-                <a:latin typeface="+mn-lt"/>
-                <a:ea typeface="+mn-ea"/>
-                <a:cs typeface="+mn-cs"/>
-              </a:rPr>
-              <a:t> поддержку верификации </a:t>
-            </a:r>
-            <a:r>
-              <a:rPr lang="ru-RU" sz="1200" kern="1200" baseline="0" dirty="0" smtClean="0">
-                <a:solidFill>
-                  <a:schemeClr val="tx1"/>
-                </a:solidFill>
-                <a:effectLst/>
-                <a:latin typeface="+mn-lt"/>
-                <a:ea typeface="+mn-ea"/>
-                <a:cs typeface="+mn-cs"/>
-              </a:rPr>
-              <a:t>распредел</a:t>
-            </a:r>
-            <a:r>
-              <a:rPr lang="ru-RU" dirty="0"/>
-              <a:t>ё</a:t>
-            </a:r>
-            <a:r>
-              <a:rPr lang="ru-RU" sz="1200" kern="1200" baseline="0" dirty="0" smtClean="0">
-                <a:solidFill>
-                  <a:schemeClr val="tx1"/>
-                </a:solidFill>
-                <a:effectLst/>
-                <a:latin typeface="+mn-lt"/>
-                <a:ea typeface="+mn-ea"/>
-                <a:cs typeface="+mn-cs"/>
-              </a:rPr>
-              <a:t>нных </a:t>
-            </a:r>
-            <a:r>
-              <a:rPr lang="ru-RU" sz="1200" kern="1200" baseline="0" dirty="0" smtClean="0">
-                <a:solidFill>
-                  <a:schemeClr val="tx1"/>
-                </a:solidFill>
-                <a:effectLst/>
-                <a:latin typeface="+mn-lt"/>
-                <a:ea typeface="+mn-ea"/>
-                <a:cs typeface="+mn-cs"/>
-              </a:rPr>
-              <a:t>и параллельных систем</a:t>
+              <a:t>нных и параллельных систем</a:t>
             </a:r>
             <a:r>
               <a:rPr lang="en-US" sz="1200" kern="1200" baseline="0" dirty="0" smtClean="0">
@@ -1888,31 +1760,7 @@
                 <a:ea typeface="+mn-ea"/>
                 <a:cs typeface="+mn-cs"/>
               </a:rPr>
-              <a:t>Наконец, совершенствование компонентов и оптимизация алгоритмов базовой платформы системы позволит повысить </a:t>
-            </a:r>
-            <a:r>
-              <a:rPr lang="ru-RU" sz="1200" kern="1200" dirty="0" smtClean="0">
-                <a:solidFill>
-                  <a:schemeClr val="tx1"/>
-                </a:solidFill>
-                <a:effectLst/>
-                <a:latin typeface="+mn-lt"/>
-                <a:ea typeface="+mn-ea"/>
-                <a:cs typeface="+mn-cs"/>
-              </a:rPr>
-              <a:t>эффективность её </a:t>
-            </a:r>
-            <a:r>
-              <a:rPr lang="ru-RU" sz="1200" kern="1200" dirty="0" smtClean="0">
-                <a:solidFill>
-                  <a:schemeClr val="tx1"/>
-                </a:solidFill>
-                <a:effectLst/>
-                <a:latin typeface="+mn-lt"/>
-                <a:ea typeface="+mn-ea"/>
-                <a:cs typeface="+mn-cs"/>
-              </a:rPr>
-              <a:t>использования и сократить накладные расходы в работе полезной части. </a:t>
+              <a:t>Наконец, совершенствование компонентов и оптимизация алгоритмов базовой платформы системы позволит повысить эффективность её использования и сократить накладные расходы в работе полезной части. </a:t>
             </a:r>
           </a:p>
         </p:txBody>
@@ -2007,19 +1855,7 @@
                 <a:ea typeface="+mn-ea"/>
                 <a:cs typeface="+mn-cs"/>
               </a:rPr>
-              <a:t>На этом, у меня все. Спасибо за Ваше внимание</a:t>
-            </a:r>
-            <a:r>
-              <a:rPr lang="ru-RU" sz="1200" kern="1200" dirty="0" smtClean="0">
-                <a:solidFill>
-                  <a:schemeClr val="tx1"/>
-                </a:solidFill>
-                <a:effectLst/>
-                <a:latin typeface="+mn-lt"/>
-                <a:ea typeface="+mn-ea"/>
-                <a:cs typeface="+mn-cs"/>
-              </a:rPr>
-              <a:t>.</a:t>
+              <a:t>На этом, у меня все. Спасибо за Ваше внимание.</a:t>
             </a:r>
             <a:endParaRPr lang="ru-RU" dirty="0"/>
           </a:p>
@@ -2111,11 +1947,7 @@
             </a:r>
             <a:r>
               <a:rPr lang="ru-RU" baseline="0" dirty="0" smtClean="0"/>
-              <a:t> масса подходов к построению и разработке </a:t>
-            </a:r>
-            <a:r>
-              <a:rPr lang="ru-RU" baseline="0" dirty="0" smtClean="0"/>
-              <a:t>ПО</a:t>
+              <a:t> масса подходов к построению и разработке ПО</a:t>
             </a:r>
             <a:r>
               <a:rPr lang="en-US" dirty="0" smtClean="0"/>
@@ -2251,21 +2083,10 @@
                 <a:ea typeface="+mn-ea"/>
                 <a:cs typeface="+mn-cs"/>
               </a:rPr>
-              <a:t> слайде представлена автоматная модель прототипа архитектуры, в которой выделены состояния, спецификации и сценарии. Такая модель была введена для обобщения описания архитектур систем. </a:t>
-            </a:r>
-            <a:r>
-              <a:rPr lang="ru-RU" b="1" dirty="0"/>
-              <a:t>Существует большое количество практик, методологии и инструментов, позволяющих тестировать модели заданные подобным </a:t>
-            </a:r>
-            <a:r>
-              <a:rPr lang="ru-RU" b="1" dirty="0" smtClean="0"/>
-              <a:t>образом</a:t>
-            </a:r>
-            <a:endParaRPr lang="en-US" dirty="0"/>
-          </a:p>
-          <a:p>
-            <a:r>
-              <a:rPr lang="en-US" sz="1200" kern="1200" baseline="0" dirty="0" smtClean="0">
+              <a:t> слайде представлена автоматная модель прототипа архитектуры, в которой выделены состояния, спецификации и </a:t>
+            </a:r>
+            <a:r>
+              <a:rPr lang="ru-RU" sz="1200" kern="1200" dirty="0" smtClean="0">
                 <a:solidFill>
                   <a:schemeClr val="tx1"/>
                 </a:solidFill>
@@ -2274,10 +2095,10 @@
                 <a:ea typeface="+mn-ea"/>
                 <a:cs typeface="+mn-cs"/>
               </a:rPr>
-              <a:t>[ </a:t>
-            </a:r>
-            <a:r>
-              <a:rPr lang="ru-RU" sz="1200" kern="1200" baseline="0" dirty="0" smtClean="0">
+              <a:t>сценарии</a:t>
+            </a:r>
+            <a:r>
+              <a:rPr lang="en-US" sz="1200" kern="1200" dirty="0" smtClean="0">
                 <a:solidFill>
                   <a:schemeClr val="tx1"/>
                 </a:solidFill>
@@ -2286,10 +2107,10 @@
                 <a:ea typeface="+mn-ea"/>
                 <a:cs typeface="+mn-cs"/>
               </a:rPr>
-              <a:t>Модель </a:t>
-            </a:r>
-            <a:r>
-              <a:rPr lang="ru-RU" sz="1200" kern="1200" baseline="0" dirty="0" smtClean="0">
+              <a:t> </a:t>
+            </a:r>
+            <a:r>
+              <a:rPr lang="ru-RU" sz="1200" kern="1200" dirty="0" smtClean="0">
                 <a:solidFill>
                   <a:schemeClr val="tx1"/>
                 </a:solidFill>
@@ -2298,7 +2119,7 @@
                 <a:ea typeface="+mn-ea"/>
                 <a:cs typeface="+mn-cs"/>
               </a:rPr>
-              <a:t>прототипа является результатом отображения исходной архитектуры разрабатываемой системы в программную среду и представляет собой сущность, характеризующуюся: конечным множеством состояний, начальным состоянием, множеством конечных состояний, набором спецификаций требований и множеством сценариев использования. </a:t>
+              <a:t>использования. </a:t>
             </a:r>
             <a:r>
               <a:rPr lang="ru-RU" sz="1200" kern="1200" dirty="0" smtClean="0">
@@ -2310,7 +2131,7 @@
                 <a:ea typeface="+mn-ea"/>
                 <a:cs typeface="+mn-cs"/>
               </a:rPr>
-              <a:t>Состояние </a:t>
+              <a:t>Такая модель была введена для обобщения описания архитектур систем. </a:t>
             </a:r>
             <a:r>
               <a:rPr lang="ru-RU" sz="1200" kern="1200" dirty="0" smtClean="0">
@@ -2322,10 +2143,15 @@
                 <a:ea typeface="+mn-ea"/>
                 <a:cs typeface="+mn-cs"/>
               </a:rPr>
-              <a:t>можно определить как момент в работе прототипа архитектуры, который объединяет в неявной форме все входные воздействия прошлого, а также влияет на реакцию в текущий момент времени. Каждое состояние имеет вполне определённый смысл и качественно отличается от всех других состоянии, и кроме того однозначно определяет действия, которые могут совершаться в этом </a:t>
-            </a:r>
-            <a:r>
-              <a:rPr lang="ru-RU" sz="1200" kern="1200" dirty="0" smtClean="0">
+              <a:t>В настоящее время ведутся работы по созданию практик, методологии и инструментов, позволяющих тестировать модели, заданные подобным образом, однако идеальное решение пока не получено. </a:t>
+            </a:r>
+          </a:p>
+          <a:p>
+            <a:endParaRPr lang="ru-RU" baseline="0" dirty="0"/>
+          </a:p>
+          <a:p>
+            <a:r>
+              <a:rPr lang="en-US" sz="1200" kern="1200" baseline="0" dirty="0" smtClean="0">
                 <a:solidFill>
                   <a:schemeClr val="tx1"/>
                 </a:solidFill>
@@ -2334,7 +2160,31 @@
                 <a:ea typeface="+mn-ea"/>
                 <a:cs typeface="+mn-cs"/>
               </a:rPr>
-              <a:t>состоянии</a:t>
+              <a:t>[ </a:t>
+            </a:r>
+            <a:r>
+              <a:rPr lang="ru-RU" sz="1200" kern="1200" baseline="0" dirty="0" smtClean="0">
+                <a:solidFill>
+                  <a:schemeClr val="tx1"/>
+                </a:solidFill>
+                <a:effectLst/>
+                <a:latin typeface="+mn-lt"/>
+                <a:ea typeface="+mn-ea"/>
+                <a:cs typeface="+mn-cs"/>
+              </a:rPr>
+              <a:t>Модель прототипа является результатом отображения исходной архитектуры разрабатываемой системы в программную среду и представляет собой сущность, характеризующуюся: конечным множеством состояний, начальным состоянием, множеством конечных состояний, набором спецификаций требований и множеством сценариев использования. </a:t>
+            </a:r>
+            <a:r>
+              <a:rPr lang="ru-RU" sz="1200" kern="1200" dirty="0" smtClean="0">
+                <a:solidFill>
+                  <a:schemeClr val="tx1"/>
+                </a:solidFill>
+                <a:effectLst/>
+                <a:latin typeface="+mn-lt"/>
+                <a:ea typeface="+mn-ea"/>
+                <a:cs typeface="+mn-cs"/>
+              </a:rPr>
+              <a:t>Состояние можно определить как момент в работе прототипа архитектуры, который объединяет в неявной форме все входные воздействия прошлого, а также влияет на реакцию в текущий момент времени. Каждое состояние имеет вполне определённый смысл и качественно отличается от всех других состоянии, и кроме того однозначно определяет действия, которые могут совершаться в этом состоянии</a:t>
             </a:r>
             <a:r>
               <a:rPr lang="en-US" sz="1200" kern="1200" dirty="0" smtClean="0">
@@ -2489,11 +2339,23 @@
           <a:p>
             <a:r>
               <a:rPr lang="ru-RU" dirty="0" smtClean="0"/>
-              <a:t>Описав таким образом</a:t>
+              <a:t>Формальное описание модели программы позволяет провести</a:t>
             </a:r>
             <a:r>
               <a:rPr lang="ru-RU" baseline="0" dirty="0" smtClean="0"/>
-              <a:t> архитектуру приложения можно провести её тестирование или верификацию, то есть проверить соответствие между прототипом и требованиями к нему.</a:t>
+              <a:t> тестирование </a:t>
+            </a:r>
+            <a:r>
+              <a:rPr lang="ru-RU" baseline="0" dirty="0" smtClean="0"/>
+              <a:t>или верификацию, то есть </a:t>
+            </a:r>
+            <a:r>
+              <a:rPr lang="ru-RU" baseline="0" dirty="0" smtClean="0"/>
+              <a:t>появляется возможность проверить </a:t>
+            </a:r>
+            <a:r>
+              <a:rPr lang="ru-RU" baseline="0" dirty="0" smtClean="0"/>
+              <a:t>соответствие между прототипом и требованиями к нему.</a:t>
             </a:r>
             <a:endParaRPr lang="ru-RU" dirty="0" smtClean="0"/>
           </a:p>
@@ -2612,40 +2474,16 @@
           <a:lstStyle/>
           <a:p>
             <a:r>
-              <a:rPr lang="ru-RU" i="1" dirty="0" smtClean="0"/>
-              <a:t>(для удобства описания</a:t>
-            </a:r>
-            <a:r>
-              <a:rPr lang="ru-RU" i="1" baseline="0" dirty="0" smtClean="0"/>
-              <a:t> и верификации разработана такая система</a:t>
-            </a:r>
-            <a:r>
-              <a:rPr lang="ru-RU" i="1" dirty="0" smtClean="0"/>
-              <a:t>)</a:t>
-            </a:r>
-          </a:p>
-          <a:p>
-            <a:r>
               <a:rPr lang="ru-RU" baseline="0" dirty="0" smtClean="0"/>
-              <a:t>На основе формальной модели мной была спроектирована структура системы.</a:t>
-            </a:r>
-          </a:p>
-          <a:p>
-            <a:pPr marL="0" marR="0" indent="0" algn="l" defTabSz="914400" rtl="0" eaLnBrk="1" fontAlgn="auto" latinLnBrk="0" hangingPunct="1">
-              <a:lnSpc>
-                <a:spcPct val="100000"/>
-              </a:lnSpc>
-              <a:spcBef>
-                <a:spcPts val="0"/>
-              </a:spcBef>
-              <a:spcAft>
-                <a:spcPts val="0"/>
-              </a:spcAft>
-              <a:buClrTx/>
-              <a:buSzTx/>
-              <a:buFontTx/>
-              <a:buNone/>
-              <a:tabLst/>
+              <a:t>На </a:t>
+            </a:r>
+            <a:r>
+              <a:rPr lang="ru-RU" baseline="0" dirty="0" smtClean="0"/>
+              <a:t>основе формальной модели мной была спроектирована структура системы.</a:t>
+            </a:r>
+          </a:p>
+          <a:p>
+            <a:pPr>
               <a:defRPr/>
             </a:pPr>
             <a:r>
@@ -2738,8 +2576,21 @@
             </a:r>
             <a:r>
               <a:rPr lang="ru-RU" dirty="0" smtClean="0"/>
-              <a:t>а.</a:t>
-            </a:r>
+              <a:t>а</a:t>
+            </a:r>
+            <a:r>
+              <a:rPr lang="ru-RU" dirty="0"/>
+              <a:t>. Контрпример – </a:t>
+            </a:r>
+            <a:r>
+              <a:rPr lang="ru-RU" dirty="0" smtClean="0"/>
+              <a:t>трасса</a:t>
+            </a:r>
+            <a:r>
+              <a:rPr lang="ru-RU" dirty="0"/>
+              <a:t>, содержащая ошибку.</a:t>
+            </a:r>
+            <a:endParaRPr lang="ru-RU" dirty="0" smtClean="0"/>
           </a:p>
           <a:p>
             <a:pPr>
@@ -2755,27 +2606,19 @@
                 <a:ea typeface="+mn-ea"/>
                 <a:cs typeface="+mn-cs"/>
               </a:rPr>
-              <a:t>Процесс проектирования циклически повторяется после исправления модели на основе контрпримера.</a:t>
-            </a:r>
-            <a:r>
-              <a:rPr lang="en-US" dirty="0"/>
-              <a:t> {</a:t>
-            </a:r>
-            <a:r>
-              <a:rPr lang="ru-RU" dirty="0"/>
-              <a:t>Контрпример – </a:t>
-            </a:r>
-            <a:r>
-              <a:rPr lang="ru-RU" dirty="0" err="1"/>
-              <a:t>трассса</a:t>
-            </a:r>
-            <a:r>
-              <a:rPr lang="ru-RU" dirty="0"/>
-              <a:t>, содержащая ошибку.</a:t>
-            </a:r>
-            <a:r>
-              <a:rPr lang="en-US" dirty="0" smtClean="0"/>
-              <a:t>}</a:t>
+              <a:t>Процесс проектирования циклически повторяется после исправления модели на основе контрпримера</a:t>
+            </a:r>
+            <a:r>
+              <a:rPr lang="ru-RU" sz="1200" kern="1200" dirty="0" smtClean="0">
+                <a:solidFill>
+                  <a:schemeClr val="tx1"/>
+                </a:solidFill>
+                <a:effectLst/>
+                <a:latin typeface="+mn-lt"/>
+                <a:ea typeface="+mn-ea"/>
+                <a:cs typeface="+mn-cs"/>
+              </a:rPr>
+              <a:t>.</a:t>
             </a:r>
             <a:endParaRPr lang="en-US" dirty="0"/>
           </a:p>
@@ -2884,11 +2727,11 @@
             </a:r>
             <a:r>
               <a:rPr lang="ru-RU" sz="1200" baseline="0" dirty="0" smtClean="0"/>
-              <a:t> </a:t>
+              <a:t> был выбран </a:t>
             </a:r>
             <a:r>
               <a:rPr lang="ru-RU" sz="1200" baseline="0" dirty="0" smtClean="0"/>
-              <a:t>был выбран </a:t>
+              <a:t>сторонний верификатор </a:t>
             </a:r>
             <a:r>
               <a:rPr lang="en-US" sz="1200" baseline="0" dirty="0" smtClean="0"/>
@@ -2928,28 +2771,35 @@
             </a:r>
             <a:r>
               <a:rPr lang="ru-RU" sz="1200" dirty="0" smtClean="0"/>
-              <a:t>средство моделирования и верификации протоколов, параллельных программ и широкого класса дискретных систем</a:t>
+              <a:t>средство моделирования и верификации протоколов, параллельных программ и широкого класса дискретных </a:t>
             </a:r>
             <a:r>
               <a:rPr lang="ru-RU" sz="1200" dirty="0" smtClean="0"/>
-              <a:t>.</a:t>
-            </a:r>
-          </a:p>
-          <a:p>
-            <a:pPr>
-              <a:defRPr/>
-            </a:pPr>
-            <a:r>
-              <a:rPr lang="ru-RU" dirty="0"/>
-              <a:t>Примеры использования: верификация системы управления дамбами в Нидерландах, верификация аэрокосмических </a:t>
+              <a:t>систем. </a:t>
+            </a:r>
+            <a:r>
+              <a:rPr lang="ru-RU" dirty="0" smtClean="0"/>
+              <a:t>Он используется для систем, предъявляющих высокие требования к надёжности, например, </a:t>
+            </a:r>
+            <a:r>
+              <a:rPr lang="ru-RU" dirty="0" smtClean="0"/>
+              <a:t>верификация аэрокосмических </a:t>
             </a:r>
             <a:r>
               <a:rPr lang="ru-RU" dirty="0" smtClean="0"/>
               <a:t>систем </a:t>
             </a:r>
             <a:r>
+              <a:rPr lang="ru-RU" dirty="0" smtClean="0"/>
+              <a:t>в </a:t>
+            </a:r>
+            <a:r>
               <a:rPr lang="en-US" dirty="0" smtClean="0"/>
               <a:t>NASA</a:t>
+            </a:r>
+            <a:r>
+              <a:rPr lang="ru-RU" dirty="0" smtClean="0"/>
+              <a:t>. </a:t>
             </a:r>
             <a:endParaRPr lang="ru-RU" baseline="0" dirty="0" smtClean="0"/>
           </a:p>
@@ -2973,19 +2823,35 @@
             </a:pPr>
             <a:r>
               <a:rPr lang="ru-RU" sz="1200" dirty="0" smtClean="0"/>
-              <a:t>В </a:t>
+              <a:t>В основе верификации лежит метод </a:t>
+            </a:r>
+            <a:r>
+              <a:rPr lang="en-US" sz="1200" dirty="0" smtClean="0"/>
+              <a:t>Model </a:t>
+            </a:r>
+            <a:r>
+              <a:rPr lang="en-US" sz="1200" dirty="0" smtClean="0"/>
+              <a:t>Checking</a:t>
             </a:r>
             <a:r>
               <a:rPr lang="ru-RU" sz="1200" dirty="0" smtClean="0"/>
-              <a:t>основе верификации лежит метод </a:t>
-            </a:r>
-            <a:r>
-              <a:rPr lang="en-US" sz="1200" dirty="0" smtClean="0"/>
-              <a:t>Model Checking: </a:t>
+              <a:t>, который представляет собой</a:t>
+            </a:r>
+            <a:r>
+              <a:rPr lang="ru-RU" dirty="0"/>
+              <a:t> </a:t>
             </a:r>
             <a:r>
               <a:rPr lang="ru-RU" sz="1200" dirty="0" smtClean="0"/>
-              <a:t>Метод автоматической формальной верификации систем с конечным числом состояний</a:t>
+              <a:t>Метод </a:t>
+            </a:r>
+            <a:r>
+              <a:rPr lang="ru-RU" sz="1200" dirty="0" smtClean="0"/>
+              <a:t>автоматической формальной верификации систем с конечным числом </a:t>
+            </a:r>
+            <a:r>
+              <a:rPr lang="ru-RU" sz="1200" dirty="0" smtClean="0"/>
+              <a:t>состояний. Для того, чтобы воспользоваться верификатором необходимо</a:t>
             </a:r>
             <a:endParaRPr lang="en-US" dirty="0" smtClean="0"/>
           </a:p>
@@ -2994,12 +2860,16 @@
               <a:buAutoNum type="arabicPeriod"/>
             </a:pPr>
             <a:r>
-              <a:rPr lang="ru-RU" dirty="0" err="1" smtClean="0"/>
-              <a:t>Задаем</a:t>
+              <a:rPr lang="ru-RU" dirty="0" smtClean="0"/>
+              <a:t>Задать</a:t>
             </a:r>
             <a:r>
               <a:rPr lang="ru-RU" baseline="0" dirty="0" smtClean="0"/>
-              <a:t> как система устроена и как она должна быть устроена</a:t>
+              <a:t> </a:t>
+            </a:r>
+            <a:r>
+              <a:rPr lang="ru-RU" baseline="0" dirty="0" smtClean="0"/>
+              <a:t>как система устроена и как она должна быть устроена</a:t>
             </a:r>
           </a:p>
           <a:p>
@@ -3007,13 +2877,58 @@
               <a:buAutoNum type="arabicPeriod"/>
             </a:pPr>
             <a:r>
-              <a:rPr lang="ru-RU" baseline="0" dirty="0" err="1" smtClean="0"/>
-              <a:t>Т.о</a:t>
-            </a:r>
-            <a:r>
               <a:rPr lang="ru-RU" baseline="0" dirty="0" smtClean="0"/>
-              <a:t>. Две нотации: описание поведения(устройство системы), описание требований (свойства правильности)</a:t>
-            </a:r>
+              <a:t>Таким о</a:t>
+            </a:r>
+            <a:r>
+              <a:rPr lang="ru-RU" dirty="0" smtClean="0"/>
+              <a:t>бразом получаем</a:t>
+            </a:r>
+            <a:r>
+              <a:rPr lang="ru-RU" baseline="0" dirty="0" smtClean="0"/>
+              <a:t> </a:t>
+            </a:r>
+            <a:r>
+              <a:rPr lang="ru-RU" dirty="0"/>
+              <a:t>д</a:t>
+            </a:r>
+            <a:r>
+              <a:rPr lang="ru-RU" baseline="0" dirty="0" smtClean="0"/>
+              <a:t>ве </a:t>
+            </a:r>
+            <a:r>
+              <a:rPr lang="ru-RU" baseline="0" dirty="0" smtClean="0"/>
+              <a:t>нотации: описание </a:t>
+            </a:r>
+            <a:r>
+              <a:rPr lang="ru-RU" baseline="0" dirty="0" smtClean="0"/>
+              <a:t>поведения то есть устройство системы</a:t>
+            </a:r>
+            <a:r>
+              <a:rPr lang="ru-RU" dirty="0" smtClean="0"/>
+              <a:t> и </a:t>
+            </a:r>
+            <a:r>
+              <a:rPr lang="ru-RU" baseline="0" dirty="0" smtClean="0"/>
+              <a:t>описание </a:t>
+            </a:r>
+            <a:r>
+              <a:rPr lang="ru-RU" baseline="0" dirty="0" smtClean="0"/>
+              <a:t>требований </a:t>
+            </a:r>
+            <a:r>
+              <a:rPr lang="ru-RU" baseline="0" dirty="0" smtClean="0"/>
+              <a:t>или</a:t>
+            </a:r>
+            <a:r>
+              <a:rPr lang="ru-RU" dirty="0" smtClean="0"/>
+              <a:t> </a:t>
+            </a:r>
+            <a:r>
+              <a:rPr lang="ru-RU" baseline="0" dirty="0" smtClean="0"/>
+              <a:t>свойства правильности</a:t>
+            </a:r>
+            <a:endParaRPr lang="ru-RU" baseline="0" dirty="0" smtClean="0"/>
           </a:p>
           <a:p>
             <a:pPr marL="228600" indent="-228600">
@@ -3133,144 +3048,42 @@
           <a:p>
             <a:r>
               <a:rPr lang="ru-RU" dirty="0" smtClean="0"/>
-              <a:t>Верификатор </a:t>
+              <a:t>Для того чтобы провести тестирование на основе предложенной модели прототипа необходимо было выбрать технологию конвертирования модели на язык </a:t>
             </a:r>
             <a:r>
               <a:rPr lang="en-US" dirty="0" smtClean="0"/>
-              <a:t>SPIN </a:t>
+              <a:t>Promela</a:t>
             </a:r>
             <a:r>
               <a:rPr lang="ru-RU" dirty="0" smtClean="0"/>
-              <a:t>работает с языком автоматного программирования </a:t>
+              <a:t>, с которым работает </a:t>
             </a:r>
             <a:r>
               <a:rPr lang="en-US" dirty="0" smtClean="0"/>
-              <a:t>Promela.</a:t>
-            </a:r>
-          </a:p>
-          <a:p>
-            <a:r>
-              <a:rPr lang="ru-RU" dirty="0"/>
-              <a:t>Модель на языке </a:t>
-            </a:r>
-            <a:r>
-              <a:rPr lang="en-US" dirty="0"/>
-              <a:t>Promela</a:t>
-            </a:r>
-            <a:r>
-              <a:rPr lang="ru-RU" dirty="0"/>
-              <a:t>: абстракция реальной системы, содержащая характеристики, которые значимы для описания взаимодействия </a:t>
+              <a:t>SPIN. </a:t>
+            </a:r>
+          </a:p>
+          <a:p>
+            <a:r>
+              <a:rPr lang="en-US" dirty="0" smtClean="0"/>
+              <a:t>Promela </a:t>
             </a:r>
             <a:r>
               <a:rPr lang="ru-RU" dirty="0" smtClean="0"/>
-              <a:t>процессов</a:t>
-            </a:r>
-            <a:r>
-              <a:rPr lang="en-US" dirty="0" smtClean="0"/>
-              <a:t>. </a:t>
-            </a:r>
+              <a:t>позволяет описывать поведение системы на основе автомата Крипке и поведение системы в терминах темпоральной логики. </a:t>
+            </a:r>
+          </a:p>
+          <a:p>
             <a:r>
               <a:rPr lang="ru-RU" dirty="0" smtClean="0"/>
-              <a:t>Такая модель не </a:t>
-            </a:r>
-            <a:r>
-              <a:rPr lang="ru-RU" dirty="0"/>
-              <a:t>является программной реализацией </a:t>
-            </a:r>
+              <a:t>Поэтому для описания предложенной модели прототипа в процессе дипломного проектирования был разработан специальный язык для описания модели прототипа. </a:t>
+            </a:r>
+          </a:p>
+          <a:p>
             <a:r>
               <a:rPr lang="ru-RU" dirty="0" smtClean="0"/>
-              <a:t>системы, </a:t>
-            </a:r>
-            <a:r>
-              <a:rPr lang="ru-RU" dirty="0"/>
-              <a:t>может содержать части, которые важны только для </a:t>
-            </a:r>
-            <a:r>
-              <a:rPr lang="ru-RU" dirty="0" smtClean="0"/>
-              <a:t>верификации.</a:t>
-            </a:r>
-            <a:endParaRPr lang="ru-RU" dirty="0"/>
-          </a:p>
-          <a:p>
-            <a:r>
-              <a:rPr lang="ru-RU" dirty="0"/>
-              <a:t>Поскольку способ верификации </a:t>
-            </a:r>
-            <a:r>
-              <a:rPr lang="en-US" dirty="0"/>
-              <a:t>model checking </a:t>
-            </a:r>
-            <a:r>
-              <a:rPr lang="ru-RU" dirty="0"/>
-              <a:t>сказанное означает, что у любой модели описанной с помощью языка </a:t>
-            </a:r>
-            <a:r>
-              <a:rPr lang="en-US" dirty="0"/>
-              <a:t>Promela</a:t>
-            </a:r>
-            <a:r>
-              <a:rPr lang="ru-RU" dirty="0"/>
-              <a:t> конечное число состояний. </a:t>
-            </a:r>
-          </a:p>
-          <a:p>
-            <a:endParaRPr lang="ru-RU" dirty="0" smtClean="0"/>
-          </a:p>
-          <a:p>
-            <a:pPr marL="171450" indent="-171450">
-              <a:buFont typeface="Arial" pitchFamily="34" charset="0"/>
-              <a:buChar char="•"/>
-            </a:pPr>
-            <a:r>
-              <a:rPr lang="ru-RU" dirty="0" smtClean="0"/>
-              <a:t>На</a:t>
-            </a:r>
-            <a:r>
-              <a:rPr lang="ru-RU" baseline="0" dirty="0" smtClean="0"/>
-              <a:t> </a:t>
-            </a:r>
-            <a:r>
-              <a:rPr lang="ru-RU" baseline="0" dirty="0" smtClean="0"/>
-              <a:t>языке можем описывать недетерминизм. То есть его удобно использовать для абстракции от несущественных деталей. Охраняемые команды означают реализацию недетерминизма. Это значит что с каждой командой языка связано понятие выполнимости и если в </a:t>
-            </a:r>
-            <a:r>
-              <a:rPr lang="ru-RU" baseline="0" dirty="0" smtClean="0"/>
-              <a:t>определ</a:t>
-            </a:r>
-            <a:r>
-              <a:rPr lang="ru-RU" dirty="0"/>
-              <a:t>ё</a:t>
-            </a:r>
-            <a:r>
-              <a:rPr lang="ru-RU" baseline="0" dirty="0" smtClean="0"/>
-              <a:t>нном </a:t>
-            </a:r>
-            <a:r>
-              <a:rPr lang="ru-RU" baseline="0" dirty="0" smtClean="0"/>
-              <a:t>блоке модели присутствует несколько команд, выполнимых одновременно, то может быть выполнена любая из них.</a:t>
-            </a:r>
-          </a:p>
-          <a:p>
-            <a:r>
-              <a:rPr lang="ru-RU" dirty="0" smtClean="0"/>
-              <a:t> </a:t>
-            </a:r>
-            <a:r>
-              <a:rPr lang="ru-RU" dirty="0" smtClean="0"/>
-              <a:t>НО! в нем отсутствует ряд средств, которые есть в языках программирования высокого уровня </a:t>
-            </a:r>
-          </a:p>
-          <a:p>
-            <a:r>
-              <a:rPr lang="ru-RU" dirty="0" smtClean="0"/>
-              <a:t> Например, указатели на данные и функции, не включено понятие времени или часов, отсутствуют операции с плавающей точкой и пр.</a:t>
-            </a:r>
-          </a:p>
-          <a:p>
-            <a:pPr marL="171450" indent="-171450">
-              <a:buFont typeface="Arial" pitchFamily="34" charset="0"/>
-              <a:buChar char="•"/>
-            </a:pPr>
+              <a:t>Таким образом, процесс верификации проходит 2 стадии: на первой стадии вырабатываются состояния и переходы</a:t>
+            </a:r>
             <a:endParaRPr lang="ru-RU" dirty="0"/>
           </a:p>
         </p:txBody>
@@ -3357,11 +3170,11 @@
           <a:p>
             <a:r>
               <a:rPr lang="ru-RU" dirty="0" smtClean="0"/>
-              <a:t>Для описани</a:t>
+              <a:t>На второй стадии для </a:t>
             </a:r>
             <a:r>
               <a:rPr lang="ru-RU" dirty="0" smtClean="0"/>
-              <a:t>я требований, предъявляемых к модели прототипа, используются формулы темпоральной логики. Особенность этого типа логики заключается в возможности описания поведения системы во времени.</a:t>
+              <a:t>описания требований, предъявляемых к модели прототипа, используются формулы темпоральной логики. Особенность этого типа логики заключается в возможности описания поведения системы во времени.</a:t>
             </a:r>
           </a:p>
           <a:p>
@@ -3372,6 +3185,10 @@
           </a:p>
           <a:p>
             <a:r>
+              <a:rPr lang="en-US" dirty="0"/>
+              <a:t>{</a:t>
+            </a:r>
+            <a:r>
               <a:rPr lang="ru-RU" dirty="0" smtClean="0"/>
               <a:t>ПРОБЛЕМА</a:t>
             </a:r>
@@ -3381,7 +3198,15 @@
             </a:r>
             <a:r>
               <a:rPr lang="ru-RU" baseline="0" dirty="0" smtClean="0"/>
-              <a:t> ли спецификации всё поведение системы</a:t>
+              <a:t> ли спецификации всё поведение </a:t>
+            </a:r>
+            <a:r>
+              <a:rPr lang="ru-RU" baseline="0" dirty="0" smtClean="0"/>
+              <a:t>системы</a:t>
+            </a:r>
+            <a:r>
+              <a:rPr lang="en-US" baseline="0" dirty="0" smtClean="0"/>
+              <a:t>}</a:t>
             </a:r>
             <a:endParaRPr lang="ru-RU" dirty="0"/>
           </a:p>
@@ -3485,6 +3310,10 @@
               <a:defRPr/>
             </a:pPr>
             <a:r>
+              <a:rPr lang="ru-RU" dirty="0" smtClean="0"/>
+              <a:t>М</a:t>
+            </a:r>
+            <a:r>
               <a:rPr lang="ru-RU" sz="1200" kern="1200" dirty="0" smtClean="0">
                 <a:solidFill>
                   <a:schemeClr val="tx1"/>
@@ -3494,10 +3323,10 @@
                 <a:ea typeface="+mn-ea"/>
                 <a:cs typeface="+mn-cs"/>
               </a:rPr>
-              <a:t>На основе структуры</a:t>
-            </a:r>
-            <a:r>
-              <a:rPr lang="ru-RU" sz="1200" kern="1200" baseline="0" dirty="0" smtClean="0">
+              <a:t>ной </a:t>
+            </a:r>
+            <a:r>
+              <a:rPr lang="ru-RU" sz="1200" kern="1200" dirty="0" smtClean="0">
                 <a:solidFill>
                   <a:schemeClr val="tx1"/>
                 </a:solidFill>
@@ -3506,10 +3335,10 @@
                 <a:ea typeface="+mn-ea"/>
                 <a:cs typeface="+mn-cs"/>
               </a:rPr>
-              <a:t> системы</a:t>
-            </a:r>
-            <a:r>
-              <a:rPr lang="ru-RU" sz="1200" kern="1200" dirty="0" smtClean="0">
+              <a:t>была спроектирована архитектура системы, состоящая из трёх основных компонентов – подсистемы</a:t>
+            </a:r>
+            <a:r>
+              <a:rPr lang="ru-RU" sz="1200" kern="1200" baseline="0" dirty="0" smtClean="0">
                 <a:solidFill>
                   <a:schemeClr val="tx1"/>
                 </a:solidFill>
@@ -3518,10 +3347,10 @@
                 <a:ea typeface="+mn-ea"/>
                 <a:cs typeface="+mn-cs"/>
               </a:rPr>
-              <a:t>, мной была спроектирована архитектура системы, состоящая из трёх основных компонентов – подсистемы</a:t>
-            </a:r>
-            <a:r>
-              <a:rPr lang="ru-RU" sz="1200" kern="1200" baseline="0" dirty="0" smtClean="0">
+              <a:t> лексического и синтаксического анализа, подсистемы построения графа потока исполнения и подсистемы кодогенерации</a:t>
+            </a:r>
+            <a:r>
+              <a:rPr lang="ru-RU" sz="1200" kern="1200" dirty="0" smtClean="0">
                 <a:solidFill>
                   <a:schemeClr val="tx1"/>
                 </a:solidFill>
@@ -3530,29 +3359,8 @@
                 <a:ea typeface="+mn-ea"/>
                 <a:cs typeface="+mn-cs"/>
               </a:rPr>
-              <a:t> лексического и синтаксического анализа, подсистемы построения графа потока исполнения и подсистемы кодогенерации</a:t>
-            </a:r>
-            <a:r>
-              <a:rPr lang="ru-RU" sz="1200" kern="1200" dirty="0" smtClean="0">
-                <a:solidFill>
-                  <a:schemeClr val="tx1"/>
-                </a:solidFill>
-                <a:effectLst/>
-                <a:latin typeface="+mn-lt"/>
-                <a:ea typeface="+mn-ea"/>
-                <a:cs typeface="+mn-cs"/>
-              </a:rPr>
               <a:t>. </a:t>
             </a:r>
-            <a:endParaRPr lang="ru-RU" sz="1200" kern="1200" dirty="0" smtClean="0">
-              <a:solidFill>
-                <a:schemeClr val="tx1"/>
-              </a:solidFill>
-              <a:effectLst/>
-              <a:latin typeface="+mn-lt"/>
-              <a:ea typeface="+mn-ea"/>
-              <a:cs typeface="+mn-cs"/>
-            </a:endParaRPr>
           </a:p>
           <a:p>
             <a:pPr marL="0" marR="0" indent="0" algn="l" defTabSz="914400" rtl="0" eaLnBrk="1" fontAlgn="auto" latinLnBrk="0" hangingPunct="1">
@@ -3601,15 +3409,7 @@
           <a:p>
             <a:r>
               <a:rPr lang="ru-RU" baseline="0" dirty="0" smtClean="0"/>
-              <a:t>Таким образом, в </a:t>
-            </a:r>
-            <a:r>
-              <a:rPr lang="ru-RU" baseline="0" dirty="0" smtClean="0"/>
-              <a:t>качестве входных данных система принимает описание прототипа архитектуры с использованием </a:t>
-            </a:r>
-            <a:r>
-              <a:rPr lang="ru-RU" baseline="0" dirty="0" smtClean="0"/>
-              <a:t>языка </a:t>
+              <a:t>Таким образом, в качестве входных данных система принимает описание прототипа архитектуры с использованием языка </a:t>
             </a:r>
             <a:r>
               <a:rPr lang="en-US" baseline="0" dirty="0" smtClean="0"/>
@@ -3617,15 +3417,7 @@
             </a:r>
             <a:r>
               <a:rPr lang="ru-RU" baseline="0" dirty="0" smtClean="0"/>
-              <a:t>. </a:t>
-            </a:r>
-            <a:r>
-              <a:rPr lang="ru-RU" baseline="0" dirty="0" smtClean="0"/>
-              <a:t>В качестве выходных данных система </a:t>
-            </a:r>
-            <a:r>
-              <a:rPr lang="ru-RU" baseline="0" dirty="0" smtClean="0"/>
-              <a:t>отда</a:t>
+              <a:t>. В качестве выходных данных система отда</a:t>
             </a:r>
             <a:r>
               <a:rPr lang="ru-RU" dirty="0"/>
@@ -3633,11 +3425,7 @@
             </a:r>
             <a:r>
               <a:rPr lang="ru-RU" baseline="0" dirty="0" smtClean="0"/>
-              <a:t>т </a:t>
-            </a:r>
-            <a:r>
-              <a:rPr lang="ru-RU" baseline="0" dirty="0" smtClean="0"/>
-              <a:t>представление исходного прототипа на целевом языке автоматного программирования.</a:t>
+              <a:t>т представление исходного прототипа на целевом языке автоматного программирования.</a:t>
             </a:r>
           </a:p>
         </p:txBody>
@@ -3870,7 +3658,7 @@
           <a:p>
             <a:fld id="{552675F8-BD14-4374-B02F-E97046C6A1D8}" type="datetime1">
               <a:rPr lang="ru-RU" smtClean="0"/>
-              <a:t>16.06.2012</a:t>
+              <a:t>18.06.2012</a:t>
             </a:fld>
             <a:endParaRPr lang="ru-RU"/>
           </a:p>
@@ -4035,7 +3823,7 @@
           <a:p>
             <a:fld id="{13305062-1292-4A0A-901B-840835479DE3}" type="datetime1">
               <a:rPr lang="ru-RU" smtClean="0"/>
-              <a:t>16.06.2012</a:t>
+              <a:t>18.06.2012</a:t>
             </a:fld>
             <a:endParaRPr lang="ru-RU"/>
           </a:p>
@@ -4210,7 +3998,7 @@
           <a:p>
             <a:fld id="{A5E6030C-CC2F-4B88-9E22-1301D15C6E18}" type="datetime1">
               <a:rPr lang="ru-RU" smtClean="0"/>
-              <a:t>16.06.2012</a:t>
+              <a:t>18.06.2012</a:t>
             </a:fld>
             <a:endParaRPr lang="ru-RU"/>
           </a:p>
@@ -4393,7 +4181,7 @@
           <a:p>
             <a:fld id="{0A0FAE21-78CF-42F8-87C9-7DD460720D76}" type="datetime1">
               <a:rPr lang="ru-RU" smtClean="0"/>
-              <a:t>16.06.2012</a:t>
+              <a:t>18.06.2012</a:t>
             </a:fld>
             <a:endParaRPr lang="ru-RU"/>
           </a:p>
@@ -4655,7 +4443,7 @@
           <a:p>
             <a:fld id="{18F12A8A-6C04-42EC-B5A1-B4AFF8CBAF88}" type="datetime1">
               <a:rPr lang="ru-RU" smtClean="0"/>
-              <a:t>16.06.2012</a:t>
+              <a:t>18.06.2012</a:t>
             </a:fld>
             <a:endParaRPr lang="ru-RU"/>
           </a:p>
@@ -5003,7 +4791,7 @@
           <a:p>
             <a:fld id="{19CFC13F-C6B8-4F7A-A899-3C34CBE9DBBB}" type="datetime1">
               <a:rPr lang="ru-RU" smtClean="0"/>
-              <a:t>16.06.2012</a:t>
+              <a:t>18.06.2012</a:t>
             </a:fld>
             <a:endParaRPr lang="ru-RU"/>
           </a:p>
@@ -5311,7 +5099,7 @@
           <a:p>
             <a:fld id="{369881D4-64C9-4E16-B703-8323AC55B24A}" type="datetime1">
               <a:rPr lang="ru-RU" smtClean="0"/>
-              <a:t>16.06.2012</a:t>
+              <a:t>18.06.2012</a:t>
             </a:fld>
             <a:endParaRPr lang="ru-RU"/>
           </a:p>
@@ -5538,7 +5326,7 @@
           <a:p>
             <a:fld id="{B390CDAC-3E70-4C31-AE15-3B712A8B5CDB}" type="datetime1">
               <a:rPr lang="ru-RU" smtClean="0"/>
-              <a:t>16.06.2012</a:t>
+              <a:t>18.06.2012</a:t>
             </a:fld>
             <a:endParaRPr lang="ru-RU"/>
           </a:p>
@@ -5628,7 +5416,7 @@
           <a:p>
             <a:fld id="{ACB1905C-D82E-41CE-9D44-986AF8D5825C}" type="datetime1">
               <a:rPr lang="ru-RU" smtClean="0"/>
-              <a:t>16.06.2012</a:t>
+              <a:t>18.06.2012</a:t>
             </a:fld>
             <a:endParaRPr lang="ru-RU"/>
           </a:p>
@@ -5916,7 +5704,7 @@
           <a:p>
             <a:fld id="{B95BD760-218D-4ADE-BF67-3949E0E07828}" type="datetime1">
               <a:rPr lang="ru-RU" smtClean="0"/>
-              <a:t>16.06.2012</a:t>
+              <a:t>18.06.2012</a:t>
             </a:fld>
             <a:endParaRPr lang="ru-RU"/>
           </a:p>
@@ -6185,7 +5973,7 @@
           <a:p>
             <a:fld id="{F10398F0-CE1C-454F-A887-B107A33F827E}" type="datetime1">
               <a:rPr lang="ru-RU" smtClean="0"/>
-              <a:t>16.06.2012</a:t>
+              <a:t>18.06.2012</a:t>
             </a:fld>
             <a:endParaRPr lang="ru-RU"/>
           </a:p>
@@ -6395,7 +6183,7 @@
           <a:p>
             <a:fld id="{5C0B48E2-D838-453B-B855-F590F6E7746E}" type="datetime1">
               <a:rPr lang="ru-RU" smtClean="0"/>
-              <a:t>16.06.2012</a:t>
+              <a:t>18.06.2012</a:t>
             </a:fld>
             <a:endParaRPr lang="ru-RU"/>
           </a:p>
@@ -9723,6 +9511,21 @@
               </a:rPr>
               <a:t>}</a:t>
             </a:r>
+          </a:p>
+          <a:p>
+            <a:pPr marL="0" indent="0">
+              <a:buNone/>
+            </a:pPr>
+            <a:r>
+              <a:rPr lang="en-US" sz="1100" smtClean="0">
+                <a:solidFill>
+                  <a:schemeClr val="tx1"/>
+                </a:solidFill>
+                <a:latin typeface="Consolas" pitchFamily="49" charset="0"/>
+                <a:cs typeface="Consolas" pitchFamily="49" charset="0"/>
+              </a:rPr>
+              <a:t>    … </a:t>
+            </a:r>
             <a:endParaRPr lang="en-US" sz="1100" dirty="0">
               <a:solidFill>
                 <a:schemeClr val="tx1"/>
@@ -13545,7 +13348,7 @@
         <p:spPr>
           <a:xfrm>
             <a:off x="1907981" y="1268759"/>
-            <a:ext cx="4824259" cy="5184577"/>
+            <a:ext cx="4824258" cy="5184577"/>
           </a:xfrm>
           <a:prstGeom prst="rect">
             <a:avLst/>

</xml_diff>